<commit_message>
Issue 172: Update tutorial file for Auto Narrate/Captions Update Issue 172
</commit_message>
<xml_diff>
--- a/doc/PowerPointLabs Quick Tutorial.pptx
+++ b/doc/PowerPointLabs Quick Tutorial.pptx
@@ -4,6 +4,9 @@
   <p:sldMasterIdLst>
     <p:sldMasterId id="2147483648" r:id="rId1"/>
   </p:sldMasterIdLst>
+  <p:notesMasterIdLst>
+    <p:notesMasterId r:id="rId18"/>
+  </p:notesMasterIdLst>
   <p:sldIdLst>
     <p:sldId id="296" r:id="rId2"/>
     <p:sldId id="297" r:id="rId3"/>
@@ -15,8 +18,12 @@
     <p:sldId id="261" r:id="rId9"/>
     <p:sldId id="306" r:id="rId10"/>
     <p:sldId id="304" r:id="rId11"/>
-    <p:sldId id="305" r:id="rId12"/>
-    <p:sldId id="299" r:id="rId13"/>
+    <p:sldId id="308" r:id="rId12"/>
+    <p:sldId id="307" r:id="rId13"/>
+    <p:sldId id="310" r:id="rId14"/>
+    <p:sldId id="309" r:id="rId15"/>
+    <p:sldId id="305" r:id="rId16"/>
+    <p:sldId id="299" r:id="rId17"/>
   </p:sldIdLst>
   <p:sldSz cx="9144000" cy="6858000" type="screen4x3"/>
   <p:notesSz cx="6858000" cy="9144000"/>
@@ -138,6 +145,14 @@
             <p14:sldId id="261"/>
             <p14:sldId id="306"/>
             <p14:sldId id="304"/>
+            <p14:sldId id="308"/>
+            <p14:sldId id="307"/>
+          </p14:sldIdLst>
+        </p14:section>
+        <p14:section name="Auto narrate and auto captions" id="{A9769C45-8345-410D-A2DA-6DEBD5D41D7C}">
+          <p14:sldIdLst>
+            <p14:sldId id="310"/>
+            <p14:sldId id="309"/>
           </p14:sldIdLst>
         </p14:section>
         <p14:section name="Wrap up" id="{5BBA1A93-B239-4917-BAC7-9CBE7A60C0BF}">
@@ -149,7 +164,7 @@
       </p14:sectionLst>
     </p:ext>
     <p:ext uri="{EFAFB233-063F-42B5-8137-9DF3F51BA10A}">
-      <p15:sldGuideLst xmlns="" xmlns:p15="http://schemas.microsoft.com/office/powerpoint/2012/main">
+      <p15:sldGuideLst xmlns:p15="http://schemas.microsoft.com/office/powerpoint/2012/main" xmlns="">
         <p15:guide id="1" orient="horz" pos="2160">
           <p15:clr>
             <a:srgbClr val="A4A3A4"/>
@@ -291,33 +306,554 @@
 </inkml:ink>
 </file>
 
-<file path=ppt/ink/ink5.xml><?xml version="1.0" encoding="utf-8"?>
-<inkml:ink xmlns:inkml="http://www.w3.org/2003/InkML">
-  <inkml:definitions>
-    <inkml:context xml:id="ctx0">
-      <inkml:inkSource xml:id="inkSrc0">
-        <inkml:traceFormat>
-          <inkml:channel name="X" type="integer" max="32767" units="cm"/>
-          <inkml:channel name="Y" type="integer" max="32767" units="cm"/>
-          <inkml:channel name="F" type="integer" max="1023" units="dev"/>
-        </inkml:traceFormat>
-        <inkml:channelProperties>
-          <inkml:channelProperty channel="X" name="resolution" value="5654.35693" units="1/cm"/>
-          <inkml:channelProperty channel="Y" name="resolution" value="9046.65918" units="1/cm"/>
-          <inkml:channelProperty channel="F" name="resolution" value="2.82441E-6" units="1/dev"/>
-        </inkml:channelProperties>
-      </inkml:inkSource>
-      <inkml:timestamp xml:id="ts0" timeString="2014-01-02T04:24:07.419"/>
-    </inkml:context>
-    <inkml:brush xml:id="br0">
-      <inkml:brushProperty name="width" value="0.15875" units="cm"/>
-      <inkml:brushProperty name="height" value="0.15875" units="cm"/>
-      <inkml:brushProperty name="color" value="#E46C0A"/>
-      <inkml:brushProperty name="fitToCurve" value="1"/>
-    </inkml:brush>
-  </inkml:definitions>
-  <inkml:trace contextRef="#ctx0" brushRef="#br0">86-3 82,'0'3'50,"-6"4"-50,-10-7 2,-13 0 10,25 0 4,4 0-13,0 0-6,0 0 0,0 0 4,0 0 2,0 0 5,0 0 7,0 0-2,0 0-4,0 0-3,0 0 0,0 0 1,0 0 1,0 0 6,0 0 4,0 0-1,-3 0 3,3 2-5,0-2-4,0 0-3,0 0-2,-3 0-2,3 3 2,0-3 1,-3 0 0,3 0 0,0 0 1,0 2-3,0-2-1,0 4 0,-3 7-1,-4 2 2,4 10-2,-4-5-1,7 8 1,-3-7 4,3 5-4,0 7-2,0-4 2,0 6 0,0-5-2,0 5 1,0-2 1,3 2-2,7 0-1,0 2 2,-1 3 0,8-1 2,-1 3-2,-7-5-1,4 0 2,3 3 0,7-3 1,-7 0-1,4 0-1,2 1-1,-4-1 4,6-1 0,2 2-8,-5-1 6,5-2-2,3-2 1,0-4 0,-3 1 0,3 0-1,-6-4-2,-4 1 4,7-3-2,3 2 0,-3 3 0,6-5-1,0 4 1,1-2 0,5 0 0,1 5-1,-10-2-1,5-3 1,0 0 0,-5-2 1,5 0 1,-5-2-2,4 1 1,-1-3-1,-6 2-1,-1-4 1,-8-4 0,-5-3 0,-2-4 0,0-1 1,-4 1 0,-3 0-1,7-4 2,-7 2-4,-3-3 2,4 2 0,-4-2 2,3 0 0,-3 0-1,0 0 2,0 0-1,0 0 0,0 0 1,0 0-1,0 0 1,0 0-1,0 0 1,0 0 1,0 0-1,0 0 0,0 0-2,0 0 0,0 0-1,0 0 1,0 0 2,0 0-2,0 0 1,0 0-2,0 0 1,0 0 0,0 0 0,0 0-1,0 0 0,0 0 1,0 0 0,0 0 0,0 0 1,0 0 1,0 0-2,0 0 1,0 0 0,0 0 0,0 0 0,0 0 0,0 0 0,0 0-2,0 0 0,0 0 1,-3-2 1,-4-1-1,-6 2 1,0-4-1,0 2-2,-3-1 1,-3 4 0,-4-2 0,4 2 0,3 0-1,-3 0 1,2 0-1,-5 0-3,2 0 1,-4 0 1,3 0 1,5 0 2,3 2-1,0 0 1,0 0 0,8 1-1,2-3 0,0 0 0,-2 0 0,3 0 0,-1 0 0,3 0 0,-3 0 0,-2 0-1,0 0 1,-1 0 0,6 1 0,-5-1 0,5 0-1,0 0-1,0 0 0,0 0-1,0 0 0,0 0 2,0 0-2,0 0-1,0 0-1,0 0-2,0 0 1,0 0-2,0 0-1,0 0 5,0 0 3,8 0 0,8 0 1,2 0 0,8 0 0,-7 0 1,10 0 0,0 0-1,-6 0-1,3 0 1,-4 0 0,4 0 0,-6 0 0,5 0 1,-12 0-1,0 0 0,0 0 0,0 0 0,3 0 0,-6 0 0,0 5 1,-1-2-1,-2-3-1,-1 2 1,-3 0 0,1-2 0,-1 2 1,0-2-1,0 0 0,0 2 0,1-2 0,-4 0 0,6 0 0,-6 0 0,0 0 1,0 0-1,0 0 1,0 3-1,0-3 1,0 0-1,0 0 1,0 0 0,0 0 3,0 0-2,0 0 1,0 0 0,0 0 0,0 0 1,0 0 0,0 0-2,0 0 1,0 0-1,0 0 1,0 0-2,0 0 1,0 0 0,0 0-1,0 0 0,0 0 0,0 0-1,0 0 2,0 0-1,0 0 0,0-9-2,0-2 2,-6-3-1,-4-1 0,4-1 1,-1 1-2,1-1 1,2 3 0,-2-2-1,3-2 1,0 3 0,3-1 0,-4 2 0,1 4 1,0 3 0,0-3-1,-1 0 0,4 2 0,-3 0 0,3 3 0,0 0 0,-3 0 0,3-1 0,0 3 0,0-3 0,0 5 1,0-2-1,-7 2 0,7 0 0,0 0 1,0 0-1,0 0 1,0 0-1,0 0 1,0 0-1,-3 0 0,3 0-1,0 0 0,-3 0-1,3 0-19,0 0-50,0 0-153</inkml:trace>
-</inkml:ink>
+<file path=ppt/notesMasters/notesMaster1.xml><?xml version="1.0" encoding="utf-8"?>
+<p:notesMaster xmlns:a="http://schemas.openxmlformats.org/drawingml/2006/main" xmlns:r="http://schemas.openxmlformats.org/officeDocument/2006/relationships" xmlns:p="http://schemas.openxmlformats.org/presentationml/2006/main">
+  <p:cSld>
+    <p:bg>
+      <p:bgRef idx="1001">
+        <a:schemeClr val="bg1"/>
+      </p:bgRef>
+    </p:bg>
+    <p:spTree>
+      <p:nvGrpSpPr>
+        <p:cNvPr id="1" name=""/>
+        <p:cNvGrpSpPr/>
+        <p:nvPr/>
+      </p:nvGrpSpPr>
+      <p:grpSpPr>
+        <a:xfrm>
+          <a:off x="0" y="0"/>
+          <a:ext cx="0" cy="0"/>
+          <a:chOff x="0" y="0"/>
+          <a:chExt cx="0" cy="0"/>
+        </a:xfrm>
+      </p:grpSpPr>
+      <p:sp>
+        <p:nvSpPr>
+          <p:cNvPr id="2" name="Header Placeholder 1"/>
+          <p:cNvSpPr>
+            <a:spLocks noGrp="1"/>
+          </p:cNvSpPr>
+          <p:nvPr>
+            <p:ph type="hdr" sz="quarter"/>
+          </p:nvPr>
+        </p:nvSpPr>
+        <p:spPr>
+          <a:xfrm>
+            <a:off x="0" y="0"/>
+            <a:ext cx="2971800" cy="457200"/>
+          </a:xfrm>
+          <a:prstGeom prst="rect">
+            <a:avLst/>
+          </a:prstGeom>
+        </p:spPr>
+        <p:txBody>
+          <a:bodyPr vert="horz" lIns="91440" tIns="45720" rIns="91440" bIns="45720" rtlCol="0"/>
+          <a:lstStyle>
+            <a:lvl1pPr algn="l">
+              <a:defRPr sz="1200"/>
+            </a:lvl1pPr>
+          </a:lstStyle>
+          <a:p>
+            <a:endParaRPr lang="en-SG"/>
+          </a:p>
+        </p:txBody>
+      </p:sp>
+      <p:sp>
+        <p:nvSpPr>
+          <p:cNvPr id="3" name="Date Placeholder 2"/>
+          <p:cNvSpPr>
+            <a:spLocks noGrp="1"/>
+          </p:cNvSpPr>
+          <p:nvPr>
+            <p:ph type="dt" idx="1"/>
+          </p:nvPr>
+        </p:nvSpPr>
+        <p:spPr>
+          <a:xfrm>
+            <a:off x="3884613" y="0"/>
+            <a:ext cx="2971800" cy="457200"/>
+          </a:xfrm>
+          <a:prstGeom prst="rect">
+            <a:avLst/>
+          </a:prstGeom>
+        </p:spPr>
+        <p:txBody>
+          <a:bodyPr vert="horz" lIns="91440" tIns="45720" rIns="91440" bIns="45720" rtlCol="0"/>
+          <a:lstStyle>
+            <a:lvl1pPr algn="r">
+              <a:defRPr sz="1200"/>
+            </a:lvl1pPr>
+          </a:lstStyle>
+          <a:p>
+            <a:fld id="{3E86CC0F-BBF3-4E07-94E0-0549B7D560A9}" type="datetimeFigureOut">
+              <a:rPr lang="en-SG" smtClean="0"/>
+              <a:t>10/2/2014</a:t>
+            </a:fld>
+            <a:endParaRPr lang="en-SG"/>
+          </a:p>
+        </p:txBody>
+      </p:sp>
+      <p:sp>
+        <p:nvSpPr>
+          <p:cNvPr id="4" name="Slide Image Placeholder 3"/>
+          <p:cNvSpPr>
+            <a:spLocks noGrp="1" noRot="1" noChangeAspect="1"/>
+          </p:cNvSpPr>
+          <p:nvPr>
+            <p:ph type="sldImg" idx="2"/>
+          </p:nvPr>
+        </p:nvSpPr>
+        <p:spPr>
+          <a:xfrm>
+            <a:off x="1143000" y="685800"/>
+            <a:ext cx="4572000" cy="3429000"/>
+          </a:xfrm>
+          <a:prstGeom prst="rect">
+            <a:avLst/>
+          </a:prstGeom>
+          <a:noFill/>
+          <a:ln w="12700">
+            <a:solidFill>
+              <a:prstClr val="black"/>
+            </a:solidFill>
+          </a:ln>
+        </p:spPr>
+        <p:txBody>
+          <a:bodyPr vert="horz" lIns="91440" tIns="45720" rIns="91440" bIns="45720" rtlCol="0" anchor="ctr"/>
+          <a:lstStyle/>
+          <a:p>
+            <a:endParaRPr lang="en-SG"/>
+          </a:p>
+        </p:txBody>
+      </p:sp>
+      <p:sp>
+        <p:nvSpPr>
+          <p:cNvPr id="5" name="Notes Placeholder 4"/>
+          <p:cNvSpPr>
+            <a:spLocks noGrp="1"/>
+          </p:cNvSpPr>
+          <p:nvPr>
+            <p:ph type="body" sz="quarter" idx="3"/>
+          </p:nvPr>
+        </p:nvSpPr>
+        <p:spPr>
+          <a:xfrm>
+            <a:off x="685800" y="4343400"/>
+            <a:ext cx="5486400" cy="4114800"/>
+          </a:xfrm>
+          <a:prstGeom prst="rect">
+            <a:avLst/>
+          </a:prstGeom>
+        </p:spPr>
+        <p:txBody>
+          <a:bodyPr vert="horz" lIns="91440" tIns="45720" rIns="91440" bIns="45720" rtlCol="0"/>
+          <a:lstStyle/>
+          <a:p>
+            <a:pPr lvl="0"/>
+            <a:r>
+              <a:rPr lang="en-US" smtClean="0"/>
+              <a:t>Click to edit Master text styles</a:t>
+            </a:r>
+          </a:p>
+          <a:p>
+            <a:pPr lvl="1"/>
+            <a:r>
+              <a:rPr lang="en-US" smtClean="0"/>
+              <a:t>Second level</a:t>
+            </a:r>
+          </a:p>
+          <a:p>
+            <a:pPr lvl="2"/>
+            <a:r>
+              <a:rPr lang="en-US" smtClean="0"/>
+              <a:t>Third level</a:t>
+            </a:r>
+          </a:p>
+          <a:p>
+            <a:pPr lvl="3"/>
+            <a:r>
+              <a:rPr lang="en-US" smtClean="0"/>
+              <a:t>Fourth level</a:t>
+            </a:r>
+          </a:p>
+          <a:p>
+            <a:pPr lvl="4"/>
+            <a:r>
+              <a:rPr lang="en-US" smtClean="0"/>
+              <a:t>Fifth level</a:t>
+            </a:r>
+            <a:endParaRPr lang="en-SG"/>
+          </a:p>
+        </p:txBody>
+      </p:sp>
+      <p:sp>
+        <p:nvSpPr>
+          <p:cNvPr id="6" name="Footer Placeholder 5"/>
+          <p:cNvSpPr>
+            <a:spLocks noGrp="1"/>
+          </p:cNvSpPr>
+          <p:nvPr>
+            <p:ph type="ftr" sz="quarter" idx="4"/>
+          </p:nvPr>
+        </p:nvSpPr>
+        <p:spPr>
+          <a:xfrm>
+            <a:off x="0" y="8685213"/>
+            <a:ext cx="2971800" cy="457200"/>
+          </a:xfrm>
+          <a:prstGeom prst="rect">
+            <a:avLst/>
+          </a:prstGeom>
+        </p:spPr>
+        <p:txBody>
+          <a:bodyPr vert="horz" lIns="91440" tIns="45720" rIns="91440" bIns="45720" rtlCol="0" anchor="b"/>
+          <a:lstStyle>
+            <a:lvl1pPr algn="l">
+              <a:defRPr sz="1200"/>
+            </a:lvl1pPr>
+          </a:lstStyle>
+          <a:p>
+            <a:endParaRPr lang="en-SG"/>
+          </a:p>
+        </p:txBody>
+      </p:sp>
+      <p:sp>
+        <p:nvSpPr>
+          <p:cNvPr id="7" name="Slide Number Placeholder 6"/>
+          <p:cNvSpPr>
+            <a:spLocks noGrp="1"/>
+          </p:cNvSpPr>
+          <p:nvPr>
+            <p:ph type="sldNum" sz="quarter" idx="5"/>
+          </p:nvPr>
+        </p:nvSpPr>
+        <p:spPr>
+          <a:xfrm>
+            <a:off x="3884613" y="8685213"/>
+            <a:ext cx="2971800" cy="457200"/>
+          </a:xfrm>
+          <a:prstGeom prst="rect">
+            <a:avLst/>
+          </a:prstGeom>
+        </p:spPr>
+        <p:txBody>
+          <a:bodyPr vert="horz" lIns="91440" tIns="45720" rIns="91440" bIns="45720" rtlCol="0" anchor="b"/>
+          <a:lstStyle>
+            <a:lvl1pPr algn="r">
+              <a:defRPr sz="1200"/>
+            </a:lvl1pPr>
+          </a:lstStyle>
+          <a:p>
+            <a:fld id="{0015B511-83B7-463E-ACD1-0C1C081EBBC4}" type="slidenum">
+              <a:rPr lang="en-SG" smtClean="0"/>
+              <a:t>‹#›</a:t>
+            </a:fld>
+            <a:endParaRPr lang="en-SG"/>
+          </a:p>
+        </p:txBody>
+      </p:sp>
+    </p:spTree>
+    <p:extLst>
+      <p:ext uri="{BB962C8B-B14F-4D97-AF65-F5344CB8AC3E}">
+        <p14:creationId xmlns:p14="http://schemas.microsoft.com/office/powerpoint/2010/main" val="3812401046"/>
+      </p:ext>
+    </p:extLst>
+  </p:cSld>
+  <p:clrMap bg1="lt1" tx1="dk1" bg2="lt2" tx2="dk2" accent1="accent1" accent2="accent2" accent3="accent3" accent4="accent4" accent5="accent5" accent6="accent6" hlink="hlink" folHlink="folHlink"/>
+  <p:notesStyle>
+    <a:lvl1pPr marL="0" algn="l" defTabSz="914400" rtl="0" eaLnBrk="1" latinLnBrk="0" hangingPunct="1">
+      <a:defRPr sz="1200" kern="1200">
+        <a:solidFill>
+          <a:schemeClr val="tx1"/>
+        </a:solidFill>
+        <a:latin typeface="+mn-lt"/>
+        <a:ea typeface="+mn-ea"/>
+        <a:cs typeface="+mn-cs"/>
+      </a:defRPr>
+    </a:lvl1pPr>
+    <a:lvl2pPr marL="457200" algn="l" defTabSz="914400" rtl="0" eaLnBrk="1" latinLnBrk="0" hangingPunct="1">
+      <a:defRPr sz="1200" kern="1200">
+        <a:solidFill>
+          <a:schemeClr val="tx1"/>
+        </a:solidFill>
+        <a:latin typeface="+mn-lt"/>
+        <a:ea typeface="+mn-ea"/>
+        <a:cs typeface="+mn-cs"/>
+      </a:defRPr>
+    </a:lvl2pPr>
+    <a:lvl3pPr marL="914400" algn="l" defTabSz="914400" rtl="0" eaLnBrk="1" latinLnBrk="0" hangingPunct="1">
+      <a:defRPr sz="1200" kern="1200">
+        <a:solidFill>
+          <a:schemeClr val="tx1"/>
+        </a:solidFill>
+        <a:latin typeface="+mn-lt"/>
+        <a:ea typeface="+mn-ea"/>
+        <a:cs typeface="+mn-cs"/>
+      </a:defRPr>
+    </a:lvl3pPr>
+    <a:lvl4pPr marL="1371600" algn="l" defTabSz="914400" rtl="0" eaLnBrk="1" latinLnBrk="0" hangingPunct="1">
+      <a:defRPr sz="1200" kern="1200">
+        <a:solidFill>
+          <a:schemeClr val="tx1"/>
+        </a:solidFill>
+        <a:latin typeface="+mn-lt"/>
+        <a:ea typeface="+mn-ea"/>
+        <a:cs typeface="+mn-cs"/>
+      </a:defRPr>
+    </a:lvl4pPr>
+    <a:lvl5pPr marL="1828800" algn="l" defTabSz="914400" rtl="0" eaLnBrk="1" latinLnBrk="0" hangingPunct="1">
+      <a:defRPr sz="1200" kern="1200">
+        <a:solidFill>
+          <a:schemeClr val="tx1"/>
+        </a:solidFill>
+        <a:latin typeface="+mn-lt"/>
+        <a:ea typeface="+mn-ea"/>
+        <a:cs typeface="+mn-cs"/>
+      </a:defRPr>
+    </a:lvl5pPr>
+    <a:lvl6pPr marL="2286000" algn="l" defTabSz="914400" rtl="0" eaLnBrk="1" latinLnBrk="0" hangingPunct="1">
+      <a:defRPr sz="1200" kern="1200">
+        <a:solidFill>
+          <a:schemeClr val="tx1"/>
+        </a:solidFill>
+        <a:latin typeface="+mn-lt"/>
+        <a:ea typeface="+mn-ea"/>
+        <a:cs typeface="+mn-cs"/>
+      </a:defRPr>
+    </a:lvl6pPr>
+    <a:lvl7pPr marL="2743200" algn="l" defTabSz="914400" rtl="0" eaLnBrk="1" latinLnBrk="0" hangingPunct="1">
+      <a:defRPr sz="1200" kern="1200">
+        <a:solidFill>
+          <a:schemeClr val="tx1"/>
+        </a:solidFill>
+        <a:latin typeface="+mn-lt"/>
+        <a:ea typeface="+mn-ea"/>
+        <a:cs typeface="+mn-cs"/>
+      </a:defRPr>
+    </a:lvl7pPr>
+    <a:lvl8pPr marL="3200400" algn="l" defTabSz="914400" rtl="0" eaLnBrk="1" latinLnBrk="0" hangingPunct="1">
+      <a:defRPr sz="1200" kern="1200">
+        <a:solidFill>
+          <a:schemeClr val="tx1"/>
+        </a:solidFill>
+        <a:latin typeface="+mn-lt"/>
+        <a:ea typeface="+mn-ea"/>
+        <a:cs typeface="+mn-cs"/>
+      </a:defRPr>
+    </a:lvl8pPr>
+    <a:lvl9pPr marL="3657600" algn="l" defTabSz="914400" rtl="0" eaLnBrk="1" latinLnBrk="0" hangingPunct="1">
+      <a:defRPr sz="1200" kern="1200">
+        <a:solidFill>
+          <a:schemeClr val="tx1"/>
+        </a:solidFill>
+        <a:latin typeface="+mn-lt"/>
+        <a:ea typeface="+mn-ea"/>
+        <a:cs typeface="+mn-cs"/>
+      </a:defRPr>
+    </a:lvl9pPr>
+  </p:notesStyle>
+</p:notesMaster>
+</file>
+
+<file path=ppt/notesSlides/notesSlide1.xml><?xml version="1.0" encoding="utf-8"?>
+<p:notes xmlns:a="http://schemas.openxmlformats.org/drawingml/2006/main" xmlns:r="http://schemas.openxmlformats.org/officeDocument/2006/relationships" xmlns:p="http://schemas.openxmlformats.org/presentationml/2006/main">
+  <p:cSld>
+    <p:spTree>
+      <p:nvGrpSpPr>
+        <p:cNvPr id="1" name=""/>
+        <p:cNvGrpSpPr/>
+        <p:nvPr/>
+      </p:nvGrpSpPr>
+      <p:grpSpPr>
+        <a:xfrm>
+          <a:off x="0" y="0"/>
+          <a:ext cx="0" cy="0"/>
+          <a:chOff x="0" y="0"/>
+          <a:chExt cx="0" cy="0"/>
+        </a:xfrm>
+      </p:grpSpPr>
+      <p:sp>
+        <p:nvSpPr>
+          <p:cNvPr id="2" name="Slide Image Placeholder 1"/>
+          <p:cNvSpPr>
+            <a:spLocks noGrp="1" noRot="1" noChangeAspect="1"/>
+          </p:cNvSpPr>
+          <p:nvPr>
+            <p:ph type="sldImg"/>
+          </p:nvPr>
+        </p:nvSpPr>
+        <p:spPr/>
+      </p:sp>
+      <p:sp>
+        <p:nvSpPr>
+          <p:cNvPr id="3" name="Notes Placeholder 2"/>
+          <p:cNvSpPr>
+            <a:spLocks noGrp="1"/>
+          </p:cNvSpPr>
+          <p:nvPr>
+            <p:ph type="body" idx="1"/>
+          </p:nvPr>
+        </p:nvSpPr>
+        <p:spPr/>
+        <p:txBody>
+          <a:bodyPr/>
+          <a:lstStyle/>
+          <a:p>
+            <a:r>
+              <a:rPr lang="en-US" dirty="0" smtClean="0"/>
+              <a:t>Picture</a:t>
+            </a:r>
+            <a:r>
+              <a:rPr lang="en-US" baseline="0" dirty="0" smtClean="0"/>
+              <a:t> credit: Wikipedia</a:t>
+            </a:r>
+            <a:endParaRPr lang="en-SG" dirty="0"/>
+          </a:p>
+        </p:txBody>
+      </p:sp>
+      <p:sp>
+        <p:nvSpPr>
+          <p:cNvPr id="4" name="Slide Number Placeholder 3"/>
+          <p:cNvSpPr>
+            <a:spLocks noGrp="1"/>
+          </p:cNvSpPr>
+          <p:nvPr>
+            <p:ph type="sldNum" sz="quarter" idx="10"/>
+          </p:nvPr>
+        </p:nvSpPr>
+        <p:spPr/>
+        <p:txBody>
+          <a:bodyPr/>
+          <a:lstStyle/>
+          <a:p>
+            <a:fld id="{0015B511-83B7-463E-ACD1-0C1C081EBBC4}" type="slidenum">
+              <a:rPr lang="en-SG" smtClean="0"/>
+              <a:t>12</a:t>
+            </a:fld>
+            <a:endParaRPr lang="en-SG"/>
+          </a:p>
+        </p:txBody>
+      </p:sp>
+    </p:spTree>
+    <p:extLst>
+      <p:ext uri="{BB962C8B-B14F-4D97-AF65-F5344CB8AC3E}">
+        <p14:creationId xmlns:p14="http://schemas.microsoft.com/office/powerpoint/2010/main" val="1548716900"/>
+      </p:ext>
+    </p:extLst>
+  </p:cSld>
+  <p:clrMapOvr>
+    <a:masterClrMapping/>
+  </p:clrMapOvr>
+</p:notes>
+</file>
+
+<file path=ppt/notesSlides/notesSlide2.xml><?xml version="1.0" encoding="utf-8"?>
+<p:notes xmlns:a="http://schemas.openxmlformats.org/drawingml/2006/main" xmlns:r="http://schemas.openxmlformats.org/officeDocument/2006/relationships" xmlns:p="http://schemas.openxmlformats.org/presentationml/2006/main">
+  <p:cSld>
+    <p:spTree>
+      <p:nvGrpSpPr>
+        <p:cNvPr id="1" name=""/>
+        <p:cNvGrpSpPr/>
+        <p:nvPr/>
+      </p:nvGrpSpPr>
+      <p:grpSpPr>
+        <a:xfrm>
+          <a:off x="0" y="0"/>
+          <a:ext cx="0" cy="0"/>
+          <a:chOff x="0" y="0"/>
+          <a:chExt cx="0" cy="0"/>
+        </a:xfrm>
+      </p:grpSpPr>
+      <p:sp>
+        <p:nvSpPr>
+          <p:cNvPr id="2" name="Slide Image Placeholder 1"/>
+          <p:cNvSpPr>
+            <a:spLocks noGrp="1" noRot="1" noChangeAspect="1"/>
+          </p:cNvSpPr>
+          <p:nvPr>
+            <p:ph type="sldImg"/>
+          </p:nvPr>
+        </p:nvSpPr>
+        <p:spPr/>
+      </p:sp>
+      <p:sp>
+        <p:nvSpPr>
+          <p:cNvPr id="3" name="Notes Placeholder 2"/>
+          <p:cNvSpPr>
+            <a:spLocks noGrp="1"/>
+          </p:cNvSpPr>
+          <p:nvPr>
+            <p:ph type="body" idx="1"/>
+          </p:nvPr>
+        </p:nvSpPr>
+        <p:spPr/>
+        <p:txBody>
+          <a:bodyPr/>
+          <a:lstStyle/>
+          <a:p>
+            <a:r>
+              <a:rPr lang="en-US" dirty="0" smtClean="0"/>
+              <a:t>This will</a:t>
+            </a:r>
+            <a:r>
+              <a:rPr lang="en-US" baseline="0" dirty="0" smtClean="0"/>
+              <a:t> play at the beginning.</a:t>
+            </a:r>
+          </a:p>
+          <a:p>
+            <a:r>
+              <a:rPr lang="en-US" baseline="0" dirty="0" smtClean="0"/>
+              <a:t>[</a:t>
+            </a:r>
+            <a:r>
+              <a:rPr lang="en-US" baseline="0" dirty="0" err="1" smtClean="0"/>
+              <a:t>afterClick</a:t>
+            </a:r>
+            <a:r>
+              <a:rPr lang="en-US" baseline="0" dirty="0" smtClean="0"/>
+              <a:t>] This will play after you click.</a:t>
+            </a:r>
+          </a:p>
+          <a:p>
+            <a:endParaRPr lang="en-SG" dirty="0"/>
+          </a:p>
+        </p:txBody>
+      </p:sp>
+      <p:sp>
+        <p:nvSpPr>
+          <p:cNvPr id="4" name="Slide Number Placeholder 3"/>
+          <p:cNvSpPr>
+            <a:spLocks noGrp="1"/>
+          </p:cNvSpPr>
+          <p:nvPr>
+            <p:ph type="sldNum" sz="quarter" idx="10"/>
+          </p:nvPr>
+        </p:nvSpPr>
+        <p:spPr/>
+        <p:txBody>
+          <a:bodyPr/>
+          <a:lstStyle/>
+          <a:p>
+            <a:fld id="{0015B511-83B7-463E-ACD1-0C1C081EBBC4}" type="slidenum">
+              <a:rPr lang="en-SG" smtClean="0"/>
+              <a:t>14</a:t>
+            </a:fld>
+            <a:endParaRPr lang="en-SG"/>
+          </a:p>
+        </p:txBody>
+      </p:sp>
+    </p:spTree>
+    <p:extLst>
+      <p:ext uri="{BB962C8B-B14F-4D97-AF65-F5344CB8AC3E}">
+        <p14:creationId xmlns:p14="http://schemas.microsoft.com/office/powerpoint/2010/main" val="1548716900"/>
+      </p:ext>
+    </p:extLst>
+  </p:cSld>
+  <p:clrMapOvr>
+    <a:masterClrMapping/>
+  </p:clrMapOvr>
+</p:notes>
 </file>
 
 <file path=ppt/slideLayouts/slideLayout1.xml><?xml version="1.0" encoding="utf-8"?>
@@ -502,7 +1038,7 @@
             <a:fld id="{1D8BD707-D9CF-40AE-B4C6-C98DA3205C09}" type="datetimeFigureOut">
               <a:rPr lang="en-US" smtClean="0"/>
               <a:pPr/>
-              <a:t>1/2/2014</a:t>
+              <a:t>2/10/2014</a:t>
             </a:fld>
             <a:endParaRPr lang="en-US"/>
           </a:p>
@@ -669,7 +1205,7 @@
             <a:fld id="{1D8BD707-D9CF-40AE-B4C6-C98DA3205C09}" type="datetimeFigureOut">
               <a:rPr lang="en-US" smtClean="0"/>
               <a:pPr/>
-              <a:t>1/2/2014</a:t>
+              <a:t>2/10/2014</a:t>
             </a:fld>
             <a:endParaRPr lang="en-US"/>
           </a:p>
@@ -846,7 +1382,7 @@
             <a:fld id="{1D8BD707-D9CF-40AE-B4C6-C98DA3205C09}" type="datetimeFigureOut">
               <a:rPr lang="en-US" smtClean="0"/>
               <a:pPr/>
-              <a:t>1/2/2014</a:t>
+              <a:t>2/10/2014</a:t>
             </a:fld>
             <a:endParaRPr lang="en-US"/>
           </a:p>
@@ -1013,7 +1549,7 @@
             <a:fld id="{1D8BD707-D9CF-40AE-B4C6-C98DA3205C09}" type="datetimeFigureOut">
               <a:rPr lang="en-US" smtClean="0"/>
               <a:pPr/>
-              <a:t>1/2/2014</a:t>
+              <a:t>2/10/2014</a:t>
             </a:fld>
             <a:endParaRPr lang="en-US"/>
           </a:p>
@@ -1256,7 +1792,7 @@
             <a:fld id="{1D8BD707-D9CF-40AE-B4C6-C98DA3205C09}" type="datetimeFigureOut">
               <a:rPr lang="en-US" smtClean="0"/>
               <a:pPr/>
-              <a:t>1/2/2014</a:t>
+              <a:t>2/10/2014</a:t>
             </a:fld>
             <a:endParaRPr lang="en-US"/>
           </a:p>
@@ -1541,7 +2077,7 @@
             <a:fld id="{1D8BD707-D9CF-40AE-B4C6-C98DA3205C09}" type="datetimeFigureOut">
               <a:rPr lang="en-US" smtClean="0"/>
               <a:pPr/>
-              <a:t>1/2/2014</a:t>
+              <a:t>2/10/2014</a:t>
             </a:fld>
             <a:endParaRPr lang="en-US"/>
           </a:p>
@@ -1960,7 +2496,7 @@
             <a:fld id="{1D8BD707-D9CF-40AE-B4C6-C98DA3205C09}" type="datetimeFigureOut">
               <a:rPr lang="en-US" smtClean="0"/>
               <a:pPr/>
-              <a:t>1/2/2014</a:t>
+              <a:t>2/10/2014</a:t>
             </a:fld>
             <a:endParaRPr lang="en-US"/>
           </a:p>
@@ -2075,7 +2611,7 @@
             <a:fld id="{1D8BD707-D9CF-40AE-B4C6-C98DA3205C09}" type="datetimeFigureOut">
               <a:rPr lang="en-US" smtClean="0"/>
               <a:pPr/>
-              <a:t>1/2/2014</a:t>
+              <a:t>2/10/2014</a:t>
             </a:fld>
             <a:endParaRPr lang="en-US"/>
           </a:p>
@@ -2167,7 +2703,7 @@
             <a:fld id="{1D8BD707-D9CF-40AE-B4C6-C98DA3205C09}" type="datetimeFigureOut">
               <a:rPr lang="en-US" smtClean="0"/>
               <a:pPr/>
-              <a:t>1/2/2014</a:t>
+              <a:t>2/10/2014</a:t>
             </a:fld>
             <a:endParaRPr lang="en-US"/>
           </a:p>
@@ -2441,7 +2977,7 @@
             <a:fld id="{1D8BD707-D9CF-40AE-B4C6-C98DA3205C09}" type="datetimeFigureOut">
               <a:rPr lang="en-US" smtClean="0"/>
               <a:pPr/>
-              <a:t>1/2/2014</a:t>
+              <a:t>2/10/2014</a:t>
             </a:fld>
             <a:endParaRPr lang="en-US"/>
           </a:p>
@@ -2691,7 +3227,7 @@
             <a:fld id="{1D8BD707-D9CF-40AE-B4C6-C98DA3205C09}" type="datetimeFigureOut">
               <a:rPr lang="en-US" smtClean="0"/>
               <a:pPr/>
-              <a:t>1/2/2014</a:t>
+              <a:t>2/10/2014</a:t>
             </a:fld>
             <a:endParaRPr lang="en-US"/>
           </a:p>
@@ -2901,7 +3437,7 @@
             <a:fld id="{1D8BD707-D9CF-40AE-B4C6-C98DA3205C09}" type="datetimeFigureOut">
               <a:rPr lang="en-US" smtClean="0"/>
               <a:pPr/>
-              <a:t>1/2/2014</a:t>
+              <a:t>2/10/2014</a:t>
             </a:fld>
             <a:endParaRPr lang="en-US"/>
           </a:p>
@@ -3608,7 +4144,17 @@
                   </a:schemeClr>
                 </a:solidFill>
               </a:rPr>
-              <a:t>Select the slide added by the plugin.</a:t>
+              <a:t>Select </a:t>
+            </a:r>
+            <a:r>
+              <a:rPr lang="en-US" dirty="0" smtClean="0">
+                <a:solidFill>
+                  <a:schemeClr val="accent6">
+                    <a:lumMod val="75000"/>
+                  </a:schemeClr>
+                </a:solidFill>
+              </a:rPr>
+              <a:t>any of the three slides.</a:t>
             </a:r>
             <a:endParaRPr lang="en-SG" dirty="0">
               <a:solidFill>
@@ -4096,45 +4642,6 @@
           </p:pic>
         </mc:Fallback>
       </mc:AlternateContent>
-      <mc:AlternateContent xmlns:mc="http://schemas.openxmlformats.org/markup-compatibility/2006" xmlns:p14="http://schemas.microsoft.com/office/powerpoint/2010/main">
-        <mc:Choice Requires="p14">
-          <p:contentPart p14:bwMode="auto" r:id="rId9">
-            <p14:nvContentPartPr>
-              <p14:cNvPr id="20" name="Ink 19"/>
-              <p14:cNvContentPartPr/>
-              <p14:nvPr/>
-            </p14:nvContentPartPr>
-            <p14:xfrm rot="15106254">
-              <a:off x="4919665" y="4162007"/>
-              <a:ext cx="414720" cy="578080"/>
-            </p14:xfrm>
-          </p:contentPart>
-        </mc:Choice>
-        <mc:Fallback xmlns="">
-          <p:pic>
-            <p:nvPicPr>
-              <p:cNvPr id="20" name="Ink 19"/>
-              <p:cNvPicPr/>
-              <p:nvPr/>
-            </p:nvPicPr>
-            <p:blipFill>
-              <a:blip r:embed="rId10"/>
-              <a:stretch>
-                <a:fillRect/>
-              </a:stretch>
-            </p:blipFill>
-            <p:spPr>
-              <a:xfrm rot="15106254">
-                <a:off x="4894465" y="4144358"/>
-                <a:ext cx="470160" cy="625983"/>
-              </a:xfrm>
-              <a:prstGeom prst="rect">
-                <a:avLst/>
-              </a:prstGeom>
-            </p:spPr>
-          </p:pic>
-        </mc:Fallback>
-      </mc:AlternateContent>
       <p:pic>
         <p:nvPicPr>
           <p:cNvPr id="13317" name="Picture 5"/>
@@ -4144,7 +4651,7 @@
           <p:nvPr/>
         </p:nvPicPr>
         <p:blipFill>
-          <a:blip r:embed="rId11">
+          <a:blip r:embed="rId9">
             <a:extLst>
               <a:ext uri="{28A0092B-C50C-407E-A947-70E740481C1C}">
                 <a14:useLocalDpi xmlns:a14="http://schemas.microsoft.com/office/drawing/2010/main" val="0"/>
@@ -4225,6 +4732,2131 @@
       </p:grpSpPr>
       <p:sp>
         <p:nvSpPr>
+          <p:cNvPr id="4" name="TextBox 3"/>
+          <p:cNvSpPr txBox="1"/>
+          <p:nvPr/>
+        </p:nvSpPr>
+        <p:spPr>
+          <a:xfrm>
+            <a:off x="3139292" y="3124200"/>
+            <a:ext cx="4328307" cy="369332"/>
+          </a:xfrm>
+          <a:prstGeom prst="rect">
+            <a:avLst/>
+          </a:prstGeom>
+          <a:noFill/>
+        </p:spPr>
+        <p:txBody>
+          <a:bodyPr wrap="square" rtlCol="0">
+            <a:spAutoFit/>
+          </a:bodyPr>
+          <a:lstStyle/>
+          <a:p>
+            <a:r>
+              <a:rPr lang="en-US" dirty="0" smtClean="0">
+                <a:solidFill>
+                  <a:schemeClr val="accent6">
+                    <a:lumMod val="75000"/>
+                  </a:schemeClr>
+                </a:solidFill>
+              </a:rPr>
+              <a:t>Next, let’s try the </a:t>
+            </a:r>
+            <a:r>
+              <a:rPr lang="en-US" b="1" dirty="0" smtClean="0">
+                <a:solidFill>
+                  <a:schemeClr val="accent6">
+                    <a:lumMod val="75000"/>
+                  </a:schemeClr>
+                </a:solidFill>
+              </a:rPr>
+              <a:t>Animate in slide</a:t>
+            </a:r>
+            <a:r>
+              <a:rPr lang="en-US" dirty="0" smtClean="0">
+                <a:solidFill>
+                  <a:schemeClr val="accent6">
+                    <a:lumMod val="75000"/>
+                  </a:schemeClr>
+                </a:solidFill>
+              </a:rPr>
+              <a:t> </a:t>
+            </a:r>
+            <a:r>
+              <a:rPr lang="en-US" dirty="0" smtClean="0">
+                <a:solidFill>
+                  <a:schemeClr val="accent6">
+                    <a:lumMod val="75000"/>
+                  </a:schemeClr>
+                </a:solidFill>
+              </a:rPr>
+              <a:t>feature</a:t>
+            </a:r>
+            <a:endParaRPr lang="en-SG" dirty="0">
+              <a:solidFill>
+                <a:schemeClr val="accent6">
+                  <a:lumMod val="75000"/>
+                </a:schemeClr>
+              </a:solidFill>
+            </a:endParaRPr>
+          </a:p>
+        </p:txBody>
+      </p:sp>
+      <p:grpSp>
+        <p:nvGrpSpPr>
+          <p:cNvPr id="18" name="Group 17"/>
+          <p:cNvGrpSpPr/>
+          <p:nvPr/>
+        </p:nvGrpSpPr>
+        <p:grpSpPr>
+          <a:xfrm>
+            <a:off x="2289546" y="2971800"/>
+            <a:ext cx="838200" cy="838200"/>
+            <a:chOff x="276083" y="3844490"/>
+            <a:chExt cx="838200" cy="838200"/>
+          </a:xfrm>
+        </p:grpSpPr>
+        <p:sp>
+          <p:nvSpPr>
+            <p:cNvPr id="19" name="Rectangle 18"/>
+            <p:cNvSpPr/>
+            <p:nvPr/>
+          </p:nvSpPr>
+          <p:spPr>
+            <a:xfrm>
+              <a:off x="322109" y="3894381"/>
+              <a:ext cx="741789" cy="559065"/>
+            </a:xfrm>
+            <a:prstGeom prst="rect">
+              <a:avLst/>
+            </a:prstGeom>
+            <a:solidFill>
+              <a:schemeClr val="accent6"/>
+            </a:solidFill>
+            <a:ln>
+              <a:solidFill>
+                <a:schemeClr val="bg1"/>
+              </a:solidFill>
+            </a:ln>
+          </p:spPr>
+          <p:style>
+            <a:lnRef idx="2">
+              <a:schemeClr val="accent1">
+                <a:shade val="50000"/>
+              </a:schemeClr>
+            </a:lnRef>
+            <a:fillRef idx="1">
+              <a:schemeClr val="accent1"/>
+            </a:fillRef>
+            <a:effectRef idx="0">
+              <a:schemeClr val="accent1"/>
+            </a:effectRef>
+            <a:fontRef idx="minor">
+              <a:schemeClr val="lt1"/>
+            </a:fontRef>
+          </p:style>
+          <p:txBody>
+            <a:bodyPr rtlCol="0" anchor="ctr"/>
+            <a:lstStyle/>
+            <a:p>
+              <a:pPr algn="ctr"/>
+              <a:endParaRPr lang="en-US"/>
+            </a:p>
+          </p:txBody>
+        </p:sp>
+        <p:sp>
+          <p:nvSpPr>
+            <p:cNvPr id="20" name="Rectangle 19"/>
+            <p:cNvSpPr/>
+            <p:nvPr/>
+          </p:nvSpPr>
+          <p:spPr>
+            <a:xfrm>
+              <a:off x="276083" y="3844490"/>
+              <a:ext cx="838200" cy="838200"/>
+            </a:xfrm>
+            <a:prstGeom prst="rect">
+              <a:avLst/>
+            </a:prstGeom>
+            <a:noFill/>
+            <a:ln>
+              <a:noFill/>
+            </a:ln>
+          </p:spPr>
+          <p:style>
+            <a:lnRef idx="2">
+              <a:schemeClr val="accent1">
+                <a:shade val="50000"/>
+              </a:schemeClr>
+            </a:lnRef>
+            <a:fillRef idx="1">
+              <a:schemeClr val="accent1"/>
+            </a:fillRef>
+            <a:effectRef idx="0">
+              <a:schemeClr val="accent1"/>
+            </a:effectRef>
+            <a:fontRef idx="minor">
+              <a:schemeClr val="lt1"/>
+            </a:fontRef>
+          </p:style>
+          <p:txBody>
+            <a:bodyPr rtlCol="0" anchor="ctr"/>
+            <a:lstStyle/>
+            <a:p>
+              <a:pPr algn="ctr"/>
+              <a:endParaRPr lang="en-SG"/>
+            </a:p>
+          </p:txBody>
+        </p:sp>
+        <p:sp>
+          <p:nvSpPr>
+            <p:cNvPr id="21" name="Flowchart: Connector 20"/>
+            <p:cNvSpPr/>
+            <p:nvPr/>
+          </p:nvSpPr>
+          <p:spPr>
+            <a:xfrm rot="5400000">
+              <a:off x="411597" y="3988277"/>
+              <a:ext cx="113312" cy="113312"/>
+            </a:xfrm>
+            <a:prstGeom prst="flowChartConnector">
+              <a:avLst/>
+            </a:prstGeom>
+            <a:solidFill>
+              <a:schemeClr val="bg1"/>
+            </a:solidFill>
+            <a:ln>
+              <a:solidFill>
+                <a:schemeClr val="bg1"/>
+              </a:solidFill>
+            </a:ln>
+          </p:spPr>
+          <p:style>
+            <a:lnRef idx="2">
+              <a:schemeClr val="accent1">
+                <a:shade val="50000"/>
+              </a:schemeClr>
+            </a:lnRef>
+            <a:fillRef idx="1">
+              <a:schemeClr val="accent1"/>
+            </a:fillRef>
+            <a:effectRef idx="0">
+              <a:schemeClr val="accent1"/>
+            </a:effectRef>
+            <a:fontRef idx="minor">
+              <a:schemeClr val="lt1"/>
+            </a:fontRef>
+          </p:style>
+          <p:txBody>
+            <a:bodyPr rtlCol="0" anchor="ctr"/>
+            <a:lstStyle/>
+            <a:p>
+              <a:pPr algn="ctr"/>
+              <a:endParaRPr lang="en-US"/>
+            </a:p>
+          </p:txBody>
+        </p:sp>
+        <p:sp>
+          <p:nvSpPr>
+            <p:cNvPr id="22" name="Flowchart: Connector 21"/>
+            <p:cNvSpPr/>
+            <p:nvPr/>
+          </p:nvSpPr>
+          <p:spPr>
+            <a:xfrm rot="18937352">
+              <a:off x="892189" y="4066817"/>
+              <a:ext cx="113312" cy="113312"/>
+            </a:xfrm>
+            <a:prstGeom prst="flowChartConnector">
+              <a:avLst/>
+            </a:prstGeom>
+            <a:solidFill>
+              <a:schemeClr val="bg1"/>
+            </a:solidFill>
+            <a:ln>
+              <a:solidFill>
+                <a:schemeClr val="bg1"/>
+              </a:solidFill>
+            </a:ln>
+          </p:spPr>
+          <p:style>
+            <a:lnRef idx="2">
+              <a:schemeClr val="accent1">
+                <a:shade val="50000"/>
+              </a:schemeClr>
+            </a:lnRef>
+            <a:fillRef idx="1">
+              <a:schemeClr val="accent1"/>
+            </a:fillRef>
+            <a:effectRef idx="0">
+              <a:schemeClr val="accent1"/>
+            </a:effectRef>
+            <a:fontRef idx="minor">
+              <a:schemeClr val="lt1"/>
+            </a:fontRef>
+          </p:style>
+          <p:txBody>
+            <a:bodyPr rtlCol="0" anchor="ctr"/>
+            <a:lstStyle/>
+            <a:p>
+              <a:pPr algn="ctr"/>
+              <a:endParaRPr lang="en-US"/>
+            </a:p>
+          </p:txBody>
+        </p:sp>
+        <p:sp>
+          <p:nvSpPr>
+            <p:cNvPr id="23" name="Freeform 22"/>
+            <p:cNvSpPr/>
+            <p:nvPr/>
+          </p:nvSpPr>
+          <p:spPr>
+            <a:xfrm>
+              <a:off x="591699" y="3976411"/>
+              <a:ext cx="262435" cy="94707"/>
+            </a:xfrm>
+            <a:custGeom>
+              <a:avLst/>
+              <a:gdLst>
+                <a:gd name="connsiteX0" fmla="*/ 0 w 365125"/>
+                <a:gd name="connsiteY0" fmla="*/ 0 h 79375"/>
+                <a:gd name="connsiteX1" fmla="*/ 196850 w 365125"/>
+                <a:gd name="connsiteY1" fmla="*/ 0 h 79375"/>
+                <a:gd name="connsiteX2" fmla="*/ 365125 w 365125"/>
+                <a:gd name="connsiteY2" fmla="*/ 79375 h 79375"/>
+                <a:gd name="connsiteX0" fmla="*/ 0 w 365125"/>
+                <a:gd name="connsiteY0" fmla="*/ 5879 h 85254"/>
+                <a:gd name="connsiteX1" fmla="*/ 196850 w 365125"/>
+                <a:gd name="connsiteY1" fmla="*/ 5879 h 85254"/>
+                <a:gd name="connsiteX2" fmla="*/ 365125 w 365125"/>
+                <a:gd name="connsiteY2" fmla="*/ 85254 h 85254"/>
+                <a:gd name="connsiteX0" fmla="*/ 0 w 365125"/>
+                <a:gd name="connsiteY0" fmla="*/ 16459 h 95834"/>
+                <a:gd name="connsiteX1" fmla="*/ 142875 w 365125"/>
+                <a:gd name="connsiteY1" fmla="*/ 3759 h 95834"/>
+                <a:gd name="connsiteX2" fmla="*/ 365125 w 365125"/>
+                <a:gd name="connsiteY2" fmla="*/ 95834 h 95834"/>
+                <a:gd name="connsiteX0" fmla="*/ 0 w 365125"/>
+                <a:gd name="connsiteY0" fmla="*/ 13245 h 92620"/>
+                <a:gd name="connsiteX1" fmla="*/ 142875 w 365125"/>
+                <a:gd name="connsiteY1" fmla="*/ 545 h 92620"/>
+                <a:gd name="connsiteX2" fmla="*/ 365125 w 365125"/>
+                <a:gd name="connsiteY2" fmla="*/ 92620 h 92620"/>
+                <a:gd name="connsiteX0" fmla="*/ 0 w 365125"/>
+                <a:gd name="connsiteY0" fmla="*/ 15332 h 94707"/>
+                <a:gd name="connsiteX1" fmla="*/ 142875 w 365125"/>
+                <a:gd name="connsiteY1" fmla="*/ 2632 h 94707"/>
+                <a:gd name="connsiteX2" fmla="*/ 365125 w 365125"/>
+                <a:gd name="connsiteY2" fmla="*/ 94707 h 94707"/>
+              </a:gdLst>
+              <a:ahLst/>
+              <a:cxnLst>
+                <a:cxn ang="0">
+                  <a:pos x="connsiteX0" y="connsiteY0"/>
+                </a:cxn>
+                <a:cxn ang="0">
+                  <a:pos x="connsiteX1" y="connsiteY1"/>
+                </a:cxn>
+                <a:cxn ang="0">
+                  <a:pos x="connsiteX2" y="connsiteY2"/>
+                </a:cxn>
+              </a:cxnLst>
+              <a:rect l="l" t="t" r="r" b="b"/>
+              <a:pathLst>
+                <a:path w="365125" h="94707">
+                  <a:moveTo>
+                    <a:pt x="0" y="15332"/>
+                  </a:moveTo>
+                  <a:cubicBezTo>
+                    <a:pt x="68792" y="-3718"/>
+                    <a:pt x="75671" y="-1072"/>
+                    <a:pt x="142875" y="2632"/>
+                  </a:cubicBezTo>
+                  <a:cubicBezTo>
+                    <a:pt x="210079" y="6336"/>
+                    <a:pt x="309033" y="68249"/>
+                    <a:pt x="365125" y="94707"/>
+                  </a:cubicBezTo>
+                </a:path>
+              </a:pathLst>
+            </a:custGeom>
+            <a:ln w="38100" cap="rnd">
+              <a:solidFill>
+                <a:srgbClr val="0070C0"/>
+              </a:solidFill>
+              <a:headEnd type="none" w="med" len="med"/>
+              <a:tailEnd type="triangle" w="med" len="med"/>
+            </a:ln>
+          </p:spPr>
+          <p:style>
+            <a:lnRef idx="1">
+              <a:schemeClr val="accent1"/>
+            </a:lnRef>
+            <a:fillRef idx="0">
+              <a:schemeClr val="accent1"/>
+            </a:fillRef>
+            <a:effectRef idx="0">
+              <a:schemeClr val="accent1"/>
+            </a:effectRef>
+            <a:fontRef idx="minor">
+              <a:schemeClr val="tx1"/>
+            </a:fontRef>
+          </p:style>
+          <p:txBody>
+            <a:bodyPr rtlCol="0" anchor="ctr"/>
+            <a:lstStyle/>
+            <a:p>
+              <a:pPr algn="ctr"/>
+              <a:endParaRPr lang="en-US"/>
+            </a:p>
+          </p:txBody>
+        </p:sp>
+        <p:sp>
+          <p:nvSpPr>
+            <p:cNvPr id="24" name="Freeform 23"/>
+            <p:cNvSpPr/>
+            <p:nvPr/>
+          </p:nvSpPr>
+          <p:spPr>
+            <a:xfrm rot="685869">
+              <a:off x="587225" y="4208429"/>
+              <a:ext cx="257326" cy="143906"/>
+            </a:xfrm>
+            <a:custGeom>
+              <a:avLst/>
+              <a:gdLst>
+                <a:gd name="connsiteX0" fmla="*/ 361950 w 361950"/>
+                <a:gd name="connsiteY0" fmla="*/ 0 h 190500"/>
+                <a:gd name="connsiteX1" fmla="*/ 225425 w 361950"/>
+                <a:gd name="connsiteY1" fmla="*/ 146050 h 190500"/>
+                <a:gd name="connsiteX2" fmla="*/ 0 w 361950"/>
+                <a:gd name="connsiteY2" fmla="*/ 190500 h 190500"/>
+                <a:gd name="connsiteX0" fmla="*/ 361950 w 361950"/>
+                <a:gd name="connsiteY0" fmla="*/ 0 h 190500"/>
+                <a:gd name="connsiteX1" fmla="*/ 225425 w 361950"/>
+                <a:gd name="connsiteY1" fmla="*/ 146050 h 190500"/>
+                <a:gd name="connsiteX2" fmla="*/ 0 w 361950"/>
+                <a:gd name="connsiteY2" fmla="*/ 190500 h 190500"/>
+                <a:gd name="connsiteX0" fmla="*/ 361950 w 361950"/>
+                <a:gd name="connsiteY0" fmla="*/ 0 h 190500"/>
+                <a:gd name="connsiteX1" fmla="*/ 225425 w 361950"/>
+                <a:gd name="connsiteY1" fmla="*/ 146050 h 190500"/>
+                <a:gd name="connsiteX2" fmla="*/ 0 w 361950"/>
+                <a:gd name="connsiteY2" fmla="*/ 190500 h 190500"/>
+                <a:gd name="connsiteX0" fmla="*/ 358775 w 358775"/>
+                <a:gd name="connsiteY0" fmla="*/ 0 h 177800"/>
+                <a:gd name="connsiteX1" fmla="*/ 225425 w 358775"/>
+                <a:gd name="connsiteY1" fmla="*/ 133350 h 177800"/>
+                <a:gd name="connsiteX2" fmla="*/ 0 w 358775"/>
+                <a:gd name="connsiteY2" fmla="*/ 177800 h 177800"/>
+                <a:gd name="connsiteX0" fmla="*/ 358775 w 358775"/>
+                <a:gd name="connsiteY0" fmla="*/ 0 h 177800"/>
+                <a:gd name="connsiteX1" fmla="*/ 222250 w 358775"/>
+                <a:gd name="connsiteY1" fmla="*/ 120650 h 177800"/>
+                <a:gd name="connsiteX2" fmla="*/ 0 w 358775"/>
+                <a:gd name="connsiteY2" fmla="*/ 177800 h 177800"/>
+              </a:gdLst>
+              <a:ahLst/>
+              <a:cxnLst>
+                <a:cxn ang="0">
+                  <a:pos x="connsiteX0" y="connsiteY0"/>
+                </a:cxn>
+                <a:cxn ang="0">
+                  <a:pos x="connsiteX1" y="connsiteY1"/>
+                </a:cxn>
+                <a:cxn ang="0">
+                  <a:pos x="connsiteX2" y="connsiteY2"/>
+                </a:cxn>
+              </a:cxnLst>
+              <a:rect l="l" t="t" r="r" b="b"/>
+              <a:pathLst>
+                <a:path w="358775" h="177800">
+                  <a:moveTo>
+                    <a:pt x="358775" y="0"/>
+                  </a:moveTo>
+                  <a:cubicBezTo>
+                    <a:pt x="322792" y="67733"/>
+                    <a:pt x="282046" y="91017"/>
+                    <a:pt x="222250" y="120650"/>
+                  </a:cubicBezTo>
+                  <a:cubicBezTo>
+                    <a:pt x="162454" y="150283"/>
+                    <a:pt x="75142" y="162983"/>
+                    <a:pt x="0" y="177800"/>
+                  </a:cubicBezTo>
+                </a:path>
+              </a:pathLst>
+            </a:custGeom>
+            <a:ln w="38100" cap="rnd">
+              <a:solidFill>
+                <a:srgbClr val="0070C0"/>
+              </a:solidFill>
+              <a:headEnd type="none" w="med" len="med"/>
+              <a:tailEnd type="triangle" w="med" len="med"/>
+            </a:ln>
+          </p:spPr>
+          <p:style>
+            <a:lnRef idx="1">
+              <a:schemeClr val="accent1"/>
+            </a:lnRef>
+            <a:fillRef idx="0">
+              <a:schemeClr val="accent1"/>
+            </a:fillRef>
+            <a:effectRef idx="0">
+              <a:schemeClr val="accent1"/>
+            </a:effectRef>
+            <a:fontRef idx="minor">
+              <a:schemeClr val="tx1"/>
+            </a:fontRef>
+          </p:style>
+          <p:txBody>
+            <a:bodyPr rtlCol="0" anchor="ctr"/>
+            <a:lstStyle/>
+            <a:p>
+              <a:pPr algn="ctr"/>
+              <a:endParaRPr lang="en-US">
+                <a:solidFill>
+                  <a:schemeClr val="tx1"/>
+                </a:solidFill>
+              </a:endParaRPr>
+            </a:p>
+          </p:txBody>
+        </p:sp>
+        <p:sp>
+          <p:nvSpPr>
+            <p:cNvPr id="25" name="Flowchart: Connector 24"/>
+            <p:cNvSpPr/>
+            <p:nvPr/>
+          </p:nvSpPr>
+          <p:spPr>
+            <a:xfrm rot="5400000">
+              <a:off x="420087" y="4242858"/>
+              <a:ext cx="113312" cy="113312"/>
+            </a:xfrm>
+            <a:prstGeom prst="flowChartConnector">
+              <a:avLst/>
+            </a:prstGeom>
+            <a:solidFill>
+              <a:schemeClr val="bg1"/>
+            </a:solidFill>
+            <a:ln>
+              <a:solidFill>
+                <a:schemeClr val="bg1"/>
+              </a:solidFill>
+            </a:ln>
+          </p:spPr>
+          <p:style>
+            <a:lnRef idx="2">
+              <a:schemeClr val="accent1">
+                <a:shade val="50000"/>
+              </a:schemeClr>
+            </a:lnRef>
+            <a:fillRef idx="1">
+              <a:schemeClr val="accent1"/>
+            </a:fillRef>
+            <a:effectRef idx="0">
+              <a:schemeClr val="accent1"/>
+            </a:effectRef>
+            <a:fontRef idx="minor">
+              <a:schemeClr val="lt1"/>
+            </a:fontRef>
+          </p:style>
+          <p:txBody>
+            <a:bodyPr rtlCol="0" anchor="ctr"/>
+            <a:lstStyle/>
+            <a:p>
+              <a:pPr algn="ctr"/>
+              <a:endParaRPr lang="en-US"/>
+            </a:p>
+          </p:txBody>
+        </p:sp>
+      </p:grpSp>
+    </p:spTree>
+    <p:extLst>
+      <p:ext uri="{BB962C8B-B14F-4D97-AF65-F5344CB8AC3E}">
+        <p14:creationId xmlns:p14="http://schemas.microsoft.com/office/powerpoint/2010/main" val="1914721199"/>
+      </p:ext>
+    </p:extLst>
+  </p:cSld>
+  <p:clrMapOvr>
+    <a:masterClrMapping/>
+  </p:clrMapOvr>
+  <p:timing>
+    <p:tnLst>
+      <p:par>
+        <p:cTn id="1" dur="indefinite" restart="never" nodeType="tmRoot"/>
+      </p:par>
+    </p:tnLst>
+  </p:timing>
+</p:sld>
+</file>
+
+<file path=ppt/slides/slide12.xml><?xml version="1.0" encoding="utf-8"?>
+<p:sld xmlns:a="http://schemas.openxmlformats.org/drawingml/2006/main" xmlns:r="http://schemas.openxmlformats.org/officeDocument/2006/relationships" xmlns:p="http://schemas.openxmlformats.org/presentationml/2006/main">
+  <p:cSld>
+    <p:spTree>
+      <p:nvGrpSpPr>
+        <p:cNvPr id="1" name=""/>
+        <p:cNvGrpSpPr/>
+        <p:nvPr/>
+      </p:nvGrpSpPr>
+      <p:grpSpPr>
+        <a:xfrm>
+          <a:off x="0" y="0"/>
+          <a:ext cx="0" cy="0"/>
+          <a:chOff x="0" y="0"/>
+          <a:chExt cx="0" cy="0"/>
+        </a:xfrm>
+      </p:grpSpPr>
+      <p:pic>
+        <p:nvPicPr>
+          <p:cNvPr id="5122" name="Picture 2" descr="File:AmineTreating.png"/>
+          <p:cNvPicPr>
+            <a:picLocks noChangeAspect="1" noChangeArrowheads="1"/>
+          </p:cNvPicPr>
+          <p:nvPr/>
+        </p:nvPicPr>
+        <p:blipFill rotWithShape="1">
+          <a:blip r:embed="rId3">
+            <a:duotone>
+              <a:schemeClr val="bg2">
+                <a:shade val="45000"/>
+                <a:satMod val="135000"/>
+              </a:schemeClr>
+              <a:prstClr val="white"/>
+            </a:duotone>
+            <a:extLst>
+              <a:ext uri="{28A0092B-C50C-407E-A947-70E740481C1C}">
+                <a14:useLocalDpi xmlns:a14="http://schemas.microsoft.com/office/drawing/2010/main" val="0"/>
+              </a:ext>
+            </a:extLst>
+          </a:blip>
+          <a:srcRect l="1320" t="1116" r="1244" b="19055"/>
+          <a:stretch/>
+        </p:blipFill>
+        <p:spPr bwMode="auto">
+          <a:xfrm>
+            <a:off x="1752600" y="1535278"/>
+            <a:ext cx="5487764" cy="3932649"/>
+          </a:xfrm>
+          <a:prstGeom prst="rect">
+            <a:avLst/>
+          </a:prstGeom>
+          <a:noFill/>
+          <a:extLst>
+            <a:ext uri="{909E8E84-426E-40DD-AFC4-6F175D3DCCD1}">
+              <a14:hiddenFill xmlns:a14="http://schemas.microsoft.com/office/drawing/2010/main">
+                <a:solidFill>
+                  <a:srgbClr val="FFFFFF"/>
+                </a:solidFill>
+              </a14:hiddenFill>
+            </a:ext>
+          </a:extLst>
+        </p:spPr>
+      </p:pic>
+      <p:sp>
+        <p:nvSpPr>
+          <p:cNvPr id="2" name="Flowchart: Connector 1"/>
+          <p:cNvSpPr/>
+          <p:nvPr/>
+        </p:nvSpPr>
+        <p:spPr>
+          <a:xfrm>
+            <a:off x="2895600" y="1567060"/>
+            <a:ext cx="796703" cy="796703"/>
+          </a:xfrm>
+          <a:prstGeom prst="flowChartConnector">
+            <a:avLst/>
+          </a:prstGeom>
+          <a:noFill/>
+          <a:ln w="38100">
+            <a:solidFill>
+              <a:srgbClr val="0070C0"/>
+            </a:solidFill>
+            <a:prstDash val="solid"/>
+          </a:ln>
+        </p:spPr>
+        <p:style>
+          <a:lnRef idx="2">
+            <a:schemeClr val="accent1">
+              <a:shade val="50000"/>
+            </a:schemeClr>
+          </a:lnRef>
+          <a:fillRef idx="1">
+            <a:schemeClr val="accent1"/>
+          </a:fillRef>
+          <a:effectRef idx="0">
+            <a:schemeClr val="accent1"/>
+          </a:effectRef>
+          <a:fontRef idx="minor">
+            <a:schemeClr val="lt1"/>
+          </a:fontRef>
+        </p:style>
+        <p:txBody>
+          <a:bodyPr rtlCol="0" anchor="ctr"/>
+          <a:lstStyle/>
+          <a:p>
+            <a:pPr algn="ctr"/>
+            <a:endParaRPr lang="en-SG"/>
+          </a:p>
+        </p:txBody>
+      </p:sp>
+      <p:sp>
+        <p:nvSpPr>
+          <p:cNvPr id="6" name="Flowchart: Connector 5"/>
+          <p:cNvSpPr>
+            <a:spLocks/>
+          </p:cNvSpPr>
+          <p:nvPr/>
+        </p:nvSpPr>
+        <p:spPr>
+          <a:xfrm>
+            <a:off x="3563888" y="3531588"/>
+            <a:ext cx="796703" cy="796703"/>
+          </a:xfrm>
+          <a:prstGeom prst="flowChartConnector">
+            <a:avLst/>
+          </a:prstGeom>
+          <a:noFill/>
+          <a:ln w="38100">
+            <a:solidFill>
+              <a:srgbClr val="0070C0"/>
+            </a:solidFill>
+            <a:prstDash val="solid"/>
+          </a:ln>
+        </p:spPr>
+        <p:style>
+          <a:lnRef idx="2">
+            <a:schemeClr val="accent1">
+              <a:shade val="50000"/>
+            </a:schemeClr>
+          </a:lnRef>
+          <a:fillRef idx="1">
+            <a:schemeClr val="accent1"/>
+          </a:fillRef>
+          <a:effectRef idx="0">
+            <a:schemeClr val="accent1"/>
+          </a:effectRef>
+          <a:fontRef idx="minor">
+            <a:schemeClr val="lt1"/>
+          </a:fontRef>
+        </p:style>
+        <p:txBody>
+          <a:bodyPr rtlCol="0" anchor="ctr"/>
+          <a:lstStyle/>
+          <a:p>
+            <a:pPr algn="ctr"/>
+            <a:endParaRPr lang="en-SG"/>
+          </a:p>
+        </p:txBody>
+      </p:sp>
+      <p:sp>
+        <p:nvSpPr>
+          <p:cNvPr id="11" name="Flowchart: Connector 10"/>
+          <p:cNvSpPr>
+            <a:spLocks/>
+          </p:cNvSpPr>
+          <p:nvPr/>
+        </p:nvSpPr>
+        <p:spPr>
+          <a:xfrm>
+            <a:off x="5334000" y="1585533"/>
+            <a:ext cx="796703" cy="796703"/>
+          </a:xfrm>
+          <a:prstGeom prst="flowChartConnector">
+            <a:avLst/>
+          </a:prstGeom>
+          <a:noFill/>
+          <a:ln w="38100">
+            <a:solidFill>
+              <a:srgbClr val="0070C0"/>
+            </a:solidFill>
+            <a:prstDash val="solid"/>
+          </a:ln>
+        </p:spPr>
+        <p:style>
+          <a:lnRef idx="2">
+            <a:schemeClr val="accent1">
+              <a:shade val="50000"/>
+            </a:schemeClr>
+          </a:lnRef>
+          <a:fillRef idx="1">
+            <a:schemeClr val="accent1"/>
+          </a:fillRef>
+          <a:effectRef idx="0">
+            <a:schemeClr val="accent1"/>
+          </a:effectRef>
+          <a:fontRef idx="minor">
+            <a:schemeClr val="lt1"/>
+          </a:fontRef>
+        </p:style>
+        <p:txBody>
+          <a:bodyPr rtlCol="0" anchor="ctr"/>
+          <a:lstStyle/>
+          <a:p>
+            <a:pPr algn="ctr"/>
+            <a:endParaRPr lang="en-SG"/>
+          </a:p>
+        </p:txBody>
+      </p:sp>
+      <p:sp>
+        <p:nvSpPr>
+          <p:cNvPr id="12" name="Flowchart: Connector 11"/>
+          <p:cNvSpPr>
+            <a:spLocks/>
+          </p:cNvSpPr>
+          <p:nvPr/>
+        </p:nvSpPr>
+        <p:spPr>
+          <a:xfrm>
+            <a:off x="5446627" y="3929939"/>
+            <a:ext cx="1368152" cy="1368152"/>
+          </a:xfrm>
+          <a:prstGeom prst="flowChartConnector">
+            <a:avLst/>
+          </a:prstGeom>
+          <a:noFill/>
+          <a:ln w="38100">
+            <a:solidFill>
+              <a:srgbClr val="0070C0"/>
+            </a:solidFill>
+            <a:prstDash val="solid"/>
+          </a:ln>
+        </p:spPr>
+        <p:style>
+          <a:lnRef idx="2">
+            <a:schemeClr val="accent1">
+              <a:shade val="50000"/>
+            </a:schemeClr>
+          </a:lnRef>
+          <a:fillRef idx="1">
+            <a:schemeClr val="accent1"/>
+          </a:fillRef>
+          <a:effectRef idx="0">
+            <a:schemeClr val="accent1"/>
+          </a:effectRef>
+          <a:fontRef idx="minor">
+            <a:schemeClr val="lt1"/>
+          </a:fontRef>
+        </p:style>
+        <p:txBody>
+          <a:bodyPr rtlCol="0" anchor="ctr"/>
+          <a:lstStyle/>
+          <a:p>
+            <a:pPr algn="ctr"/>
+            <a:endParaRPr lang="en-SG"/>
+          </a:p>
+        </p:txBody>
+      </p:sp>
+      <p:sp>
+        <p:nvSpPr>
+          <p:cNvPr id="7" name="TextBox 6"/>
+          <p:cNvSpPr txBox="1"/>
+          <p:nvPr/>
+        </p:nvSpPr>
+        <p:spPr>
+          <a:xfrm>
+            <a:off x="533400" y="479318"/>
+            <a:ext cx="8001000" cy="523220"/>
+          </a:xfrm>
+          <a:prstGeom prst="rect">
+            <a:avLst/>
+          </a:prstGeom>
+          <a:noFill/>
+        </p:spPr>
+        <p:txBody>
+          <a:bodyPr wrap="square" rtlCol="0">
+            <a:spAutoFit/>
+          </a:bodyPr>
+          <a:lstStyle/>
+          <a:p>
+            <a:r>
+              <a:rPr lang="en-US" sz="2800" b="1" dirty="0" smtClean="0">
+                <a:solidFill>
+                  <a:schemeClr val="accent6">
+                    <a:lumMod val="75000"/>
+                  </a:schemeClr>
+                </a:solidFill>
+              </a:rPr>
+              <a:t>1.</a:t>
+            </a:r>
+            <a:r>
+              <a:rPr lang="en-US" dirty="0" smtClean="0">
+                <a:solidFill>
+                  <a:schemeClr val="accent6">
+                    <a:lumMod val="75000"/>
+                  </a:schemeClr>
+                </a:solidFill>
+              </a:rPr>
+              <a:t> </a:t>
+            </a:r>
+            <a:r>
+              <a:rPr lang="en-US" dirty="0" smtClean="0">
+                <a:solidFill>
+                  <a:schemeClr val="accent6">
+                    <a:lumMod val="75000"/>
+                  </a:schemeClr>
+                </a:solidFill>
+              </a:rPr>
+              <a:t>Select the four blue circles in any order and click  the            button.</a:t>
+            </a:r>
+            <a:endParaRPr lang="en-SG" dirty="0">
+              <a:solidFill>
+                <a:schemeClr val="accent6">
+                  <a:lumMod val="75000"/>
+                </a:schemeClr>
+              </a:solidFill>
+            </a:endParaRPr>
+          </a:p>
+        </p:txBody>
+      </p:sp>
+      <p:pic>
+        <p:nvPicPr>
+          <p:cNvPr id="1026" name="Picture 2"/>
+          <p:cNvPicPr>
+            <a:picLocks noChangeAspect="1" noChangeArrowheads="1"/>
+          </p:cNvPicPr>
+          <p:nvPr/>
+        </p:nvPicPr>
+        <p:blipFill>
+          <a:blip r:embed="rId4">
+            <a:extLst>
+              <a:ext uri="{28A0092B-C50C-407E-A947-70E740481C1C}">
+                <a14:useLocalDpi xmlns:a14="http://schemas.microsoft.com/office/drawing/2010/main" val="0"/>
+              </a:ext>
+            </a:extLst>
+          </a:blip>
+          <a:srcRect/>
+          <a:stretch>
+            <a:fillRect/>
+          </a:stretch>
+        </p:blipFill>
+        <p:spPr bwMode="auto">
+          <a:xfrm>
+            <a:off x="5934075" y="509336"/>
+            <a:ext cx="466725" cy="657225"/>
+          </a:xfrm>
+          <a:prstGeom prst="rect">
+            <a:avLst/>
+          </a:prstGeom>
+          <a:noFill/>
+          <a:ln w="9525">
+            <a:solidFill>
+              <a:schemeClr val="bg1">
+                <a:lumMod val="85000"/>
+              </a:schemeClr>
+            </a:solidFill>
+            <a:miter lim="800000"/>
+            <a:headEnd/>
+            <a:tailEnd/>
+          </a:ln>
+          <a:extLst>
+            <a:ext uri="{909E8E84-426E-40DD-AFC4-6F175D3DCCD1}">
+              <a14:hiddenFill xmlns:a14="http://schemas.microsoft.com/office/drawing/2010/main">
+                <a:solidFill>
+                  <a:schemeClr val="accent1"/>
+                </a:solidFill>
+              </a14:hiddenFill>
+            </a:ext>
+            <a:ext uri="{91240B29-F687-4F45-9708-019B960494DF}">
+              <a14:hiddenLine xmlns:a14="http://schemas.microsoft.com/office/drawing/2010/main" w="9525">
+                <a:solidFill>
+                  <a:schemeClr val="tx1"/>
+                </a:solidFill>
+                <a:miter lim="800000"/>
+                <a:headEnd/>
+                <a:tailEnd/>
+              </a14:hiddenLine>
+            </a:ext>
+          </a:extLst>
+        </p:spPr>
+      </p:pic>
+      <p:sp>
+        <p:nvSpPr>
+          <p:cNvPr id="9" name="TextBox 8"/>
+          <p:cNvSpPr txBox="1"/>
+          <p:nvPr/>
+        </p:nvSpPr>
+        <p:spPr>
+          <a:xfrm>
+            <a:off x="457200" y="6019800"/>
+            <a:ext cx="8534400" cy="800219"/>
+          </a:xfrm>
+          <a:prstGeom prst="rect">
+            <a:avLst/>
+          </a:prstGeom>
+          <a:noFill/>
+        </p:spPr>
+        <p:txBody>
+          <a:bodyPr wrap="square" rtlCol="0">
+            <a:spAutoFit/>
+          </a:bodyPr>
+          <a:lstStyle/>
+          <a:p>
+            <a:r>
+              <a:rPr lang="en-US" sz="2800" b="1" dirty="0" smtClean="0">
+                <a:solidFill>
+                  <a:schemeClr val="accent6">
+                    <a:lumMod val="75000"/>
+                  </a:schemeClr>
+                </a:solidFill>
+              </a:rPr>
+              <a:t>2.</a:t>
+            </a:r>
+            <a:r>
+              <a:rPr lang="en-US" dirty="0" smtClean="0">
+                <a:solidFill>
+                  <a:schemeClr val="accent6">
+                    <a:lumMod val="75000"/>
+                  </a:schemeClr>
+                </a:solidFill>
+              </a:rPr>
+              <a:t> When you ‘play the slide, you should see a single circle animated </a:t>
+            </a:r>
+            <a:br>
+              <a:rPr lang="en-US" dirty="0" smtClean="0">
+                <a:solidFill>
+                  <a:schemeClr val="accent6">
+                    <a:lumMod val="75000"/>
+                  </a:schemeClr>
+                </a:solidFill>
+              </a:rPr>
+            </a:br>
+            <a:r>
+              <a:rPr lang="en-US" dirty="0" smtClean="0">
+                <a:solidFill>
+                  <a:schemeClr val="accent6">
+                    <a:lumMod val="75000"/>
+                  </a:schemeClr>
+                </a:solidFill>
+              </a:rPr>
+              <a:t>           in the order you selected the four circles previously. </a:t>
+            </a:r>
+            <a:endParaRPr lang="en-SG" dirty="0">
+              <a:solidFill>
+                <a:schemeClr val="accent6">
+                  <a:lumMod val="75000"/>
+                </a:schemeClr>
+              </a:solidFill>
+            </a:endParaRPr>
+          </a:p>
+        </p:txBody>
+      </p:sp>
+    </p:spTree>
+    <p:extLst>
+      <p:ext uri="{BB962C8B-B14F-4D97-AF65-F5344CB8AC3E}">
+        <p14:creationId xmlns:p14="http://schemas.microsoft.com/office/powerpoint/2010/main" val="2496893479"/>
+      </p:ext>
+    </p:extLst>
+  </p:cSld>
+  <p:clrMapOvr>
+    <a:masterClrMapping/>
+  </p:clrMapOvr>
+  <p:timing>
+    <p:tnLst>
+      <p:par>
+        <p:cTn id="1" dur="indefinite" restart="never" nodeType="tmRoot"/>
+      </p:par>
+    </p:tnLst>
+  </p:timing>
+</p:sld>
+</file>
+
+<file path=ppt/slides/slide13.xml><?xml version="1.0" encoding="utf-8"?>
+<p:sld xmlns:a="http://schemas.openxmlformats.org/drawingml/2006/main" xmlns:r="http://schemas.openxmlformats.org/officeDocument/2006/relationships" xmlns:p="http://schemas.openxmlformats.org/presentationml/2006/main">
+  <p:cSld>
+    <p:spTree>
+      <p:nvGrpSpPr>
+        <p:cNvPr id="1" name=""/>
+        <p:cNvGrpSpPr/>
+        <p:nvPr/>
+      </p:nvGrpSpPr>
+      <p:grpSpPr>
+        <a:xfrm>
+          <a:off x="0" y="0"/>
+          <a:ext cx="0" cy="0"/>
+          <a:chOff x="0" y="0"/>
+          <a:chExt cx="0" cy="0"/>
+        </a:xfrm>
+      </p:grpSpPr>
+      <p:sp>
+        <p:nvSpPr>
+          <p:cNvPr id="4" name="TextBox 3"/>
+          <p:cNvSpPr txBox="1"/>
+          <p:nvPr/>
+        </p:nvSpPr>
+        <p:spPr>
+          <a:xfrm>
+            <a:off x="2362200" y="3124200"/>
+            <a:ext cx="5928508" cy="369332"/>
+          </a:xfrm>
+          <a:prstGeom prst="rect">
+            <a:avLst/>
+          </a:prstGeom>
+          <a:noFill/>
+        </p:spPr>
+        <p:txBody>
+          <a:bodyPr wrap="square" rtlCol="0">
+            <a:spAutoFit/>
+          </a:bodyPr>
+          <a:lstStyle/>
+          <a:p>
+            <a:r>
+              <a:rPr lang="en-US" dirty="0" smtClean="0">
+                <a:solidFill>
+                  <a:schemeClr val="accent6">
+                    <a:lumMod val="75000"/>
+                  </a:schemeClr>
+                </a:solidFill>
+              </a:rPr>
+              <a:t>Next, let’s try the </a:t>
+            </a:r>
+            <a:r>
+              <a:rPr lang="en-US" b="1" dirty="0" smtClean="0">
+                <a:solidFill>
+                  <a:schemeClr val="accent6">
+                    <a:lumMod val="75000"/>
+                  </a:schemeClr>
+                </a:solidFill>
+              </a:rPr>
+              <a:t>Auto narrate </a:t>
+            </a:r>
+            <a:r>
+              <a:rPr lang="en-US" dirty="0" smtClean="0">
+                <a:solidFill>
+                  <a:schemeClr val="accent6">
+                    <a:lumMod val="75000"/>
+                  </a:schemeClr>
+                </a:solidFill>
+              </a:rPr>
+              <a:t>and </a:t>
+            </a:r>
+            <a:r>
+              <a:rPr lang="en-US" b="1" dirty="0" smtClean="0">
+                <a:solidFill>
+                  <a:schemeClr val="accent6">
+                    <a:lumMod val="75000"/>
+                  </a:schemeClr>
+                </a:solidFill>
+              </a:rPr>
+              <a:t>Auto captions </a:t>
+            </a:r>
+            <a:r>
+              <a:rPr lang="en-US" dirty="0" smtClean="0">
+                <a:solidFill>
+                  <a:schemeClr val="accent6">
+                    <a:lumMod val="75000"/>
+                  </a:schemeClr>
+                </a:solidFill>
+              </a:rPr>
+              <a:t>features</a:t>
+            </a:r>
+            <a:endParaRPr lang="en-SG" dirty="0">
+              <a:solidFill>
+                <a:schemeClr val="accent6">
+                  <a:lumMod val="75000"/>
+                </a:schemeClr>
+              </a:solidFill>
+            </a:endParaRPr>
+          </a:p>
+        </p:txBody>
+      </p:sp>
+      <p:grpSp>
+        <p:nvGrpSpPr>
+          <p:cNvPr id="11" name="Group 10"/>
+          <p:cNvGrpSpPr/>
+          <p:nvPr/>
+        </p:nvGrpSpPr>
+        <p:grpSpPr>
+          <a:xfrm>
+            <a:off x="457200" y="2889766"/>
+            <a:ext cx="838200" cy="838200"/>
+            <a:chOff x="3370502" y="5305123"/>
+            <a:chExt cx="838200" cy="838200"/>
+          </a:xfrm>
+        </p:grpSpPr>
+        <p:sp>
+          <p:nvSpPr>
+            <p:cNvPr id="12" name="Rectangle 11"/>
+            <p:cNvSpPr/>
+            <p:nvPr/>
+          </p:nvSpPr>
+          <p:spPr>
+            <a:xfrm>
+              <a:off x="3417276" y="5376568"/>
+              <a:ext cx="741789" cy="559065"/>
+            </a:xfrm>
+            <a:prstGeom prst="rect">
+              <a:avLst/>
+            </a:prstGeom>
+            <a:solidFill>
+              <a:schemeClr val="accent6"/>
+            </a:solidFill>
+            <a:ln>
+              <a:noFill/>
+            </a:ln>
+          </p:spPr>
+          <p:style>
+            <a:lnRef idx="2">
+              <a:schemeClr val="accent1">
+                <a:shade val="50000"/>
+              </a:schemeClr>
+            </a:lnRef>
+            <a:fillRef idx="1">
+              <a:schemeClr val="accent1"/>
+            </a:fillRef>
+            <a:effectRef idx="0">
+              <a:schemeClr val="accent1"/>
+            </a:effectRef>
+            <a:fontRef idx="minor">
+              <a:schemeClr val="lt1"/>
+            </a:fontRef>
+          </p:style>
+          <p:txBody>
+            <a:bodyPr rtlCol="0" anchor="ctr"/>
+            <a:lstStyle/>
+            <a:p>
+              <a:pPr algn="ctr"/>
+              <a:endParaRPr lang="en-US"/>
+            </a:p>
+          </p:txBody>
+        </p:sp>
+        <p:sp>
+          <p:nvSpPr>
+            <p:cNvPr id="13" name="Rectangle 12"/>
+            <p:cNvSpPr/>
+            <p:nvPr/>
+          </p:nvSpPr>
+          <p:spPr>
+            <a:xfrm>
+              <a:off x="3370502" y="5305123"/>
+              <a:ext cx="838200" cy="838200"/>
+            </a:xfrm>
+            <a:prstGeom prst="rect">
+              <a:avLst/>
+            </a:prstGeom>
+            <a:noFill/>
+            <a:ln>
+              <a:noFill/>
+            </a:ln>
+          </p:spPr>
+          <p:style>
+            <a:lnRef idx="2">
+              <a:schemeClr val="accent1">
+                <a:shade val="50000"/>
+              </a:schemeClr>
+            </a:lnRef>
+            <a:fillRef idx="1">
+              <a:schemeClr val="accent1"/>
+            </a:fillRef>
+            <a:effectRef idx="0">
+              <a:schemeClr val="accent1"/>
+            </a:effectRef>
+            <a:fontRef idx="minor">
+              <a:schemeClr val="lt1"/>
+            </a:fontRef>
+          </p:style>
+          <p:txBody>
+            <a:bodyPr rtlCol="0" anchor="ctr"/>
+            <a:lstStyle/>
+            <a:p>
+              <a:pPr algn="ctr"/>
+              <a:endParaRPr lang="en-SG"/>
+            </a:p>
+          </p:txBody>
+        </p:sp>
+        <p:sp>
+          <p:nvSpPr>
+            <p:cNvPr id="14" name="Rectangle 5"/>
+            <p:cNvSpPr/>
+            <p:nvPr/>
+          </p:nvSpPr>
+          <p:spPr>
+            <a:xfrm>
+              <a:off x="3874880" y="5437018"/>
+              <a:ext cx="216424" cy="429245"/>
+            </a:xfrm>
+            <a:custGeom>
+              <a:avLst/>
+              <a:gdLst>
+                <a:gd name="connsiteX0" fmla="*/ 0 w 247861"/>
+                <a:gd name="connsiteY0" fmla="*/ 168438 h 491595"/>
+                <a:gd name="connsiteX1" fmla="*/ 83956 w 247861"/>
+                <a:gd name="connsiteY1" fmla="*/ 162984 h 491595"/>
+                <a:gd name="connsiteX2" fmla="*/ 56685 w 247861"/>
+                <a:gd name="connsiteY2" fmla="*/ 318394 h 491595"/>
+                <a:gd name="connsiteX3" fmla="*/ 0 w 247861"/>
+                <a:gd name="connsiteY3" fmla="*/ 318394 h 491595"/>
+                <a:gd name="connsiteX4" fmla="*/ 0 w 247861"/>
+                <a:gd name="connsiteY4" fmla="*/ 168438 h 491595"/>
+                <a:gd name="connsiteX5" fmla="*/ 247861 w 247861"/>
+                <a:gd name="connsiteY5" fmla="*/ 0 h 491595"/>
+                <a:gd name="connsiteX6" fmla="*/ 242826 w 247861"/>
+                <a:gd name="connsiteY6" fmla="*/ 491595 h 491595"/>
+                <a:gd name="connsiteX7" fmla="*/ 82985 w 247861"/>
+                <a:gd name="connsiteY7" fmla="*/ 327947 h 491595"/>
+                <a:gd name="connsiteX8" fmla="*/ 84711 w 247861"/>
+                <a:gd name="connsiteY8" fmla="*/ 159354 h 491595"/>
+                <a:gd name="connsiteX9" fmla="*/ 247861 w 247861"/>
+                <a:gd name="connsiteY9" fmla="*/ 0 h 491595"/>
+                <a:gd name="connsiteX0" fmla="*/ 0 w 247861"/>
+                <a:gd name="connsiteY0" fmla="*/ 168438 h 491595"/>
+                <a:gd name="connsiteX1" fmla="*/ 83956 w 247861"/>
+                <a:gd name="connsiteY1" fmla="*/ 162984 h 491595"/>
+                <a:gd name="connsiteX2" fmla="*/ 81228 w 247861"/>
+                <a:gd name="connsiteY2" fmla="*/ 326575 h 491595"/>
+                <a:gd name="connsiteX3" fmla="*/ 0 w 247861"/>
+                <a:gd name="connsiteY3" fmla="*/ 318394 h 491595"/>
+                <a:gd name="connsiteX4" fmla="*/ 0 w 247861"/>
+                <a:gd name="connsiteY4" fmla="*/ 168438 h 491595"/>
+                <a:gd name="connsiteX5" fmla="*/ 247861 w 247861"/>
+                <a:gd name="connsiteY5" fmla="*/ 0 h 491595"/>
+                <a:gd name="connsiteX6" fmla="*/ 242826 w 247861"/>
+                <a:gd name="connsiteY6" fmla="*/ 491595 h 491595"/>
+                <a:gd name="connsiteX7" fmla="*/ 82985 w 247861"/>
+                <a:gd name="connsiteY7" fmla="*/ 327947 h 491595"/>
+                <a:gd name="connsiteX8" fmla="*/ 84711 w 247861"/>
+                <a:gd name="connsiteY8" fmla="*/ 159354 h 491595"/>
+                <a:gd name="connsiteX9" fmla="*/ 247861 w 247861"/>
+                <a:gd name="connsiteY9" fmla="*/ 0 h 491595"/>
+              </a:gdLst>
+              <a:ahLst/>
+              <a:cxnLst>
+                <a:cxn ang="0">
+                  <a:pos x="connsiteX0" y="connsiteY0"/>
+                </a:cxn>
+                <a:cxn ang="0">
+                  <a:pos x="connsiteX1" y="connsiteY1"/>
+                </a:cxn>
+                <a:cxn ang="0">
+                  <a:pos x="connsiteX2" y="connsiteY2"/>
+                </a:cxn>
+                <a:cxn ang="0">
+                  <a:pos x="connsiteX3" y="connsiteY3"/>
+                </a:cxn>
+                <a:cxn ang="0">
+                  <a:pos x="connsiteX4" y="connsiteY4"/>
+                </a:cxn>
+                <a:cxn ang="0">
+                  <a:pos x="connsiteX5" y="connsiteY5"/>
+                </a:cxn>
+                <a:cxn ang="0">
+                  <a:pos x="connsiteX6" y="connsiteY6"/>
+                </a:cxn>
+                <a:cxn ang="0">
+                  <a:pos x="connsiteX7" y="connsiteY7"/>
+                </a:cxn>
+                <a:cxn ang="0">
+                  <a:pos x="connsiteX8" y="connsiteY8"/>
+                </a:cxn>
+                <a:cxn ang="0">
+                  <a:pos x="connsiteX9" y="connsiteY9"/>
+                </a:cxn>
+              </a:cxnLst>
+              <a:rect l="l" t="t" r="r" b="b"/>
+              <a:pathLst>
+                <a:path w="247861" h="491595">
+                  <a:moveTo>
+                    <a:pt x="0" y="168438"/>
+                  </a:moveTo>
+                  <a:lnTo>
+                    <a:pt x="83956" y="162984"/>
+                  </a:lnTo>
+                  <a:cubicBezTo>
+                    <a:pt x="83047" y="217514"/>
+                    <a:pt x="82137" y="272045"/>
+                    <a:pt x="81228" y="326575"/>
+                  </a:cubicBezTo>
+                  <a:lnTo>
+                    <a:pt x="0" y="318394"/>
+                  </a:lnTo>
+                  <a:lnTo>
+                    <a:pt x="0" y="168438"/>
+                  </a:lnTo>
+                  <a:close/>
+                  <a:moveTo>
+                    <a:pt x="247861" y="0"/>
+                  </a:moveTo>
+                  <a:cubicBezTo>
+                    <a:pt x="246183" y="163865"/>
+                    <a:pt x="244504" y="327730"/>
+                    <a:pt x="242826" y="491595"/>
+                  </a:cubicBezTo>
+                  <a:lnTo>
+                    <a:pt x="82985" y="327947"/>
+                  </a:lnTo>
+                  <a:cubicBezTo>
+                    <a:pt x="83560" y="271749"/>
+                    <a:pt x="84136" y="215552"/>
+                    <a:pt x="84711" y="159354"/>
+                  </a:cubicBezTo>
+                  <a:lnTo>
+                    <a:pt x="247861" y="0"/>
+                  </a:lnTo>
+                  <a:close/>
+                </a:path>
+              </a:pathLst>
+            </a:custGeom>
+            <a:solidFill>
+              <a:srgbClr val="0070C0"/>
+            </a:solidFill>
+            <a:ln>
+              <a:solidFill>
+                <a:schemeClr val="bg1"/>
+              </a:solidFill>
+            </a:ln>
+          </p:spPr>
+          <p:style>
+            <a:lnRef idx="2">
+              <a:schemeClr val="accent1">
+                <a:shade val="50000"/>
+              </a:schemeClr>
+            </a:lnRef>
+            <a:fillRef idx="1">
+              <a:schemeClr val="accent1"/>
+            </a:fillRef>
+            <a:effectRef idx="0">
+              <a:schemeClr val="accent1"/>
+            </a:effectRef>
+            <a:fontRef idx="minor">
+              <a:schemeClr val="lt1"/>
+            </a:fontRef>
+          </p:style>
+          <p:txBody>
+            <a:bodyPr rtlCol="0" anchor="ctr"/>
+            <a:lstStyle/>
+            <a:p>
+              <a:pPr algn="ctr"/>
+              <a:endParaRPr lang="en-SG"/>
+            </a:p>
+          </p:txBody>
+        </p:sp>
+        <p:sp>
+          <p:nvSpPr>
+            <p:cNvPr id="15" name="Right Arrow 14"/>
+            <p:cNvSpPr>
+              <a:spLocks noChangeAspect="1"/>
+            </p:cNvSpPr>
+            <p:nvPr/>
+          </p:nvSpPr>
+          <p:spPr>
+            <a:xfrm rot="18645116">
+              <a:off x="3570659" y="5714549"/>
+              <a:ext cx="304920" cy="304920"/>
+            </a:xfrm>
+            <a:prstGeom prst="rightArrow">
+              <a:avLst/>
+            </a:prstGeom>
+            <a:solidFill>
+              <a:srgbClr val="0070C0"/>
+            </a:solidFill>
+            <a:ln>
+              <a:solidFill>
+                <a:schemeClr val="bg1"/>
+              </a:solidFill>
+            </a:ln>
+          </p:spPr>
+          <p:style>
+            <a:lnRef idx="2">
+              <a:schemeClr val="accent1">
+                <a:shade val="50000"/>
+              </a:schemeClr>
+            </a:lnRef>
+            <a:fillRef idx="1">
+              <a:schemeClr val="accent1"/>
+            </a:fillRef>
+            <a:effectRef idx="0">
+              <a:schemeClr val="accent1"/>
+            </a:effectRef>
+            <a:fontRef idx="minor">
+              <a:schemeClr val="lt1"/>
+            </a:fontRef>
+          </p:style>
+          <p:txBody>
+            <a:bodyPr rtlCol="0" anchor="ctr"/>
+            <a:lstStyle/>
+            <a:p>
+              <a:pPr algn="ctr"/>
+              <a:endParaRPr lang="en-US"/>
+            </a:p>
+          </p:txBody>
+        </p:sp>
+      </p:grpSp>
+      <p:grpSp>
+        <p:nvGrpSpPr>
+          <p:cNvPr id="16" name="Group 15"/>
+          <p:cNvGrpSpPr/>
+          <p:nvPr/>
+        </p:nvGrpSpPr>
+        <p:grpSpPr>
+          <a:xfrm>
+            <a:off x="1310971" y="2830174"/>
+            <a:ext cx="959458" cy="969053"/>
+            <a:chOff x="5550695" y="3954500"/>
+            <a:chExt cx="838200" cy="838200"/>
+          </a:xfrm>
+        </p:grpSpPr>
+        <p:sp>
+          <p:nvSpPr>
+            <p:cNvPr id="17" name="Rectangle 16"/>
+            <p:cNvSpPr/>
+            <p:nvPr/>
+          </p:nvSpPr>
+          <p:spPr>
+            <a:xfrm>
+              <a:off x="5646013" y="4073734"/>
+              <a:ext cx="642016" cy="379712"/>
+            </a:xfrm>
+            <a:prstGeom prst="rect">
+              <a:avLst/>
+            </a:prstGeom>
+            <a:solidFill>
+              <a:schemeClr val="accent6"/>
+            </a:solidFill>
+            <a:ln>
+              <a:solidFill>
+                <a:schemeClr val="accent6"/>
+              </a:solidFill>
+            </a:ln>
+          </p:spPr>
+          <p:style>
+            <a:lnRef idx="2">
+              <a:schemeClr val="accent1">
+                <a:shade val="50000"/>
+              </a:schemeClr>
+            </a:lnRef>
+            <a:fillRef idx="1">
+              <a:schemeClr val="accent1"/>
+            </a:fillRef>
+            <a:effectRef idx="0">
+              <a:schemeClr val="accent1"/>
+            </a:effectRef>
+            <a:fontRef idx="minor">
+              <a:schemeClr val="lt1"/>
+            </a:fontRef>
+          </p:style>
+          <p:txBody>
+            <a:bodyPr rtlCol="0" anchor="ctr"/>
+            <a:lstStyle/>
+            <a:p>
+              <a:pPr algn="ctr"/>
+              <a:endParaRPr lang="en-US"/>
+            </a:p>
+          </p:txBody>
+        </p:sp>
+        <p:sp>
+          <p:nvSpPr>
+            <p:cNvPr id="26" name="Rectangle 25"/>
+            <p:cNvSpPr/>
+            <p:nvPr/>
+          </p:nvSpPr>
+          <p:spPr>
+            <a:xfrm>
+              <a:off x="5550695" y="3954500"/>
+              <a:ext cx="838200" cy="838200"/>
+            </a:xfrm>
+            <a:prstGeom prst="rect">
+              <a:avLst/>
+            </a:prstGeom>
+            <a:noFill/>
+            <a:ln>
+              <a:noFill/>
+            </a:ln>
+          </p:spPr>
+          <p:style>
+            <a:lnRef idx="2">
+              <a:schemeClr val="accent1">
+                <a:shade val="50000"/>
+              </a:schemeClr>
+            </a:lnRef>
+            <a:fillRef idx="1">
+              <a:schemeClr val="accent1"/>
+            </a:fillRef>
+            <a:effectRef idx="0">
+              <a:schemeClr val="accent1"/>
+            </a:effectRef>
+            <a:fontRef idx="minor">
+              <a:schemeClr val="lt1"/>
+            </a:fontRef>
+          </p:style>
+          <p:txBody>
+            <a:bodyPr rtlCol="0" anchor="ctr"/>
+            <a:lstStyle/>
+            <a:p>
+              <a:pPr algn="ctr"/>
+              <a:endParaRPr lang="en-SG"/>
+            </a:p>
+          </p:txBody>
+        </p:sp>
+        <p:sp>
+          <p:nvSpPr>
+            <p:cNvPr id="27" name="Right Arrow 26"/>
+            <p:cNvSpPr>
+              <a:spLocks noChangeAspect="1"/>
+            </p:cNvSpPr>
+            <p:nvPr/>
+          </p:nvSpPr>
+          <p:spPr>
+            <a:xfrm rot="4632386">
+              <a:off x="5805486" y="4170627"/>
+              <a:ext cx="304920" cy="304920"/>
+            </a:xfrm>
+            <a:prstGeom prst="rightArrow">
+              <a:avLst/>
+            </a:prstGeom>
+            <a:solidFill>
+              <a:srgbClr val="0070C0"/>
+            </a:solidFill>
+            <a:ln>
+              <a:solidFill>
+                <a:schemeClr val="bg1"/>
+              </a:solidFill>
+            </a:ln>
+          </p:spPr>
+          <p:style>
+            <a:lnRef idx="2">
+              <a:schemeClr val="accent1">
+                <a:shade val="50000"/>
+              </a:schemeClr>
+            </a:lnRef>
+            <a:fillRef idx="1">
+              <a:schemeClr val="accent1"/>
+            </a:fillRef>
+            <a:effectRef idx="0">
+              <a:schemeClr val="accent1"/>
+            </a:effectRef>
+            <a:fontRef idx="minor">
+              <a:schemeClr val="lt1"/>
+            </a:fontRef>
+          </p:style>
+          <p:txBody>
+            <a:bodyPr rtlCol="0" anchor="ctr"/>
+            <a:lstStyle/>
+            <a:p>
+              <a:pPr algn="ctr"/>
+              <a:endParaRPr lang="en-US"/>
+            </a:p>
+          </p:txBody>
+        </p:sp>
+        <p:sp>
+          <p:nvSpPr>
+            <p:cNvPr id="28" name="Rectangle 27"/>
+            <p:cNvSpPr/>
+            <p:nvPr/>
+          </p:nvSpPr>
+          <p:spPr>
+            <a:xfrm>
+              <a:off x="5621737" y="4465251"/>
+              <a:ext cx="687682" cy="98991"/>
+            </a:xfrm>
+            <a:prstGeom prst="rect">
+              <a:avLst/>
+            </a:prstGeom>
+            <a:solidFill>
+              <a:srgbClr val="0070C0"/>
+            </a:solidFill>
+            <a:ln>
+              <a:solidFill>
+                <a:schemeClr val="bg1"/>
+              </a:solidFill>
+            </a:ln>
+          </p:spPr>
+          <p:style>
+            <a:lnRef idx="2">
+              <a:schemeClr val="accent1">
+                <a:shade val="50000"/>
+              </a:schemeClr>
+            </a:lnRef>
+            <a:fillRef idx="1">
+              <a:schemeClr val="accent1"/>
+            </a:fillRef>
+            <a:effectRef idx="0">
+              <a:schemeClr val="accent1"/>
+            </a:effectRef>
+            <a:fontRef idx="minor">
+              <a:schemeClr val="lt1"/>
+            </a:fontRef>
+          </p:style>
+          <p:txBody>
+            <a:bodyPr rtlCol="0" anchor="ctr"/>
+            <a:lstStyle/>
+            <a:p>
+              <a:pPr algn="ctr"/>
+              <a:endParaRPr lang="en-US"/>
+            </a:p>
+          </p:txBody>
+        </p:sp>
+      </p:grpSp>
+    </p:spTree>
+    <p:extLst>
+      <p:ext uri="{BB962C8B-B14F-4D97-AF65-F5344CB8AC3E}">
+        <p14:creationId xmlns:p14="http://schemas.microsoft.com/office/powerpoint/2010/main" val="803200160"/>
+      </p:ext>
+    </p:extLst>
+  </p:cSld>
+  <p:clrMapOvr>
+    <a:masterClrMapping/>
+  </p:clrMapOvr>
+  <p:timing>
+    <p:tnLst>
+      <p:par>
+        <p:cTn id="1" dur="indefinite" restart="never" nodeType="tmRoot"/>
+      </p:par>
+    </p:tnLst>
+  </p:timing>
+</p:sld>
+</file>
+
+<file path=ppt/slides/slide14.xml><?xml version="1.0" encoding="utf-8"?>
+<p:sld xmlns:a="http://schemas.openxmlformats.org/drawingml/2006/main" xmlns:r="http://schemas.openxmlformats.org/officeDocument/2006/relationships" xmlns:p="http://schemas.openxmlformats.org/presentationml/2006/main">
+  <p:cSld>
+    <p:spTree>
+      <p:nvGrpSpPr>
+        <p:cNvPr id="1" name=""/>
+        <p:cNvGrpSpPr/>
+        <p:nvPr/>
+      </p:nvGrpSpPr>
+      <p:grpSpPr>
+        <a:xfrm>
+          <a:off x="0" y="0"/>
+          <a:ext cx="0" cy="0"/>
+          <a:chOff x="0" y="0"/>
+          <a:chExt cx="0" cy="0"/>
+        </a:xfrm>
+      </p:grpSpPr>
+      <p:sp>
+        <p:nvSpPr>
+          <p:cNvPr id="7" name="TextBox 6"/>
+          <p:cNvSpPr txBox="1"/>
+          <p:nvPr/>
+        </p:nvSpPr>
+        <p:spPr>
+          <a:xfrm>
+            <a:off x="533400" y="479318"/>
+            <a:ext cx="8001000" cy="1631216"/>
+          </a:xfrm>
+          <a:prstGeom prst="rect">
+            <a:avLst/>
+          </a:prstGeom>
+          <a:noFill/>
+        </p:spPr>
+        <p:txBody>
+          <a:bodyPr wrap="square" rtlCol="0">
+            <a:spAutoFit/>
+          </a:bodyPr>
+          <a:lstStyle/>
+          <a:p>
+            <a:r>
+              <a:rPr lang="en-US" sz="2800" b="1" dirty="0" smtClean="0">
+                <a:solidFill>
+                  <a:schemeClr val="accent6">
+                    <a:lumMod val="75000"/>
+                  </a:schemeClr>
+                </a:solidFill>
+              </a:rPr>
+              <a:t>1.</a:t>
+            </a:r>
+            <a:r>
+              <a:rPr lang="en-US" dirty="0" smtClean="0">
+                <a:solidFill>
+                  <a:schemeClr val="accent6">
+                    <a:lumMod val="75000"/>
+                  </a:schemeClr>
+                </a:solidFill>
+              </a:rPr>
+              <a:t> Click the                 button. </a:t>
+            </a:r>
+            <a:br>
+              <a:rPr lang="en-US" dirty="0" smtClean="0">
+                <a:solidFill>
+                  <a:schemeClr val="accent6">
+                    <a:lumMod val="75000"/>
+                  </a:schemeClr>
+                </a:solidFill>
+              </a:rPr>
+            </a:br>
+            <a:r>
+              <a:rPr lang="en-US" dirty="0" smtClean="0">
+                <a:solidFill>
+                  <a:schemeClr val="accent6">
+                    <a:lumMod val="75000"/>
+                  </a:schemeClr>
+                </a:solidFill>
+              </a:rPr>
+              <a:t/>
+            </a:r>
+            <a:br>
+              <a:rPr lang="en-US" dirty="0" smtClean="0">
+                <a:solidFill>
+                  <a:schemeClr val="accent6">
+                    <a:lumMod val="75000"/>
+                  </a:schemeClr>
+                </a:solidFill>
+              </a:rPr>
+            </a:br>
+            <a:r>
+              <a:rPr lang="en-US" dirty="0" smtClean="0">
+                <a:solidFill>
+                  <a:schemeClr val="accent6">
+                    <a:lumMod val="75000"/>
+                  </a:schemeClr>
+                </a:solidFill>
+              </a:rPr>
+              <a:t/>
+            </a:r>
+            <a:br>
+              <a:rPr lang="en-US" dirty="0" smtClean="0">
+                <a:solidFill>
+                  <a:schemeClr val="accent6">
+                    <a:lumMod val="75000"/>
+                  </a:schemeClr>
+                </a:solidFill>
+              </a:rPr>
+            </a:br>
+            <a:r>
+              <a:rPr lang="en-US" dirty="0" smtClean="0">
+                <a:solidFill>
+                  <a:schemeClr val="accent6">
+                    <a:lumMod val="75000"/>
+                  </a:schemeClr>
+                </a:solidFill>
+              </a:rPr>
+              <a:t>It will generate an audio narration for this slide based on the slide notes. Play the slide and listen to the generated audio narration.</a:t>
+            </a:r>
+            <a:endParaRPr lang="en-SG" dirty="0">
+              <a:solidFill>
+                <a:schemeClr val="accent6">
+                  <a:lumMod val="75000"/>
+                </a:schemeClr>
+              </a:solidFill>
+            </a:endParaRPr>
+          </a:p>
+        </p:txBody>
+      </p:sp>
+      <p:pic>
+        <p:nvPicPr>
+          <p:cNvPr id="2050" name="Picture 2"/>
+          <p:cNvPicPr>
+            <a:picLocks noChangeAspect="1" noChangeArrowheads="1"/>
+          </p:cNvPicPr>
+          <p:nvPr/>
+        </p:nvPicPr>
+        <p:blipFill>
+          <a:blip r:embed="rId3">
+            <a:extLst>
+              <a:ext uri="{28A0092B-C50C-407E-A947-70E740481C1C}">
+                <a14:useLocalDpi xmlns:a14="http://schemas.microsoft.com/office/drawing/2010/main" val="0"/>
+              </a:ext>
+            </a:extLst>
+          </a:blip>
+          <a:srcRect/>
+          <a:stretch>
+            <a:fillRect/>
+          </a:stretch>
+        </p:blipFill>
+        <p:spPr bwMode="auto">
+          <a:xfrm>
+            <a:off x="1905000" y="278642"/>
+            <a:ext cx="533400" cy="914400"/>
+          </a:xfrm>
+          <a:prstGeom prst="rect">
+            <a:avLst/>
+          </a:prstGeom>
+          <a:noFill/>
+          <a:ln w="9525">
+            <a:solidFill>
+              <a:schemeClr val="bg1">
+                <a:lumMod val="85000"/>
+              </a:schemeClr>
+            </a:solidFill>
+            <a:miter lim="800000"/>
+            <a:headEnd/>
+            <a:tailEnd/>
+          </a:ln>
+          <a:extLst>
+            <a:ext uri="{909E8E84-426E-40DD-AFC4-6F175D3DCCD1}">
+              <a14:hiddenFill xmlns:a14="http://schemas.microsoft.com/office/drawing/2010/main">
+                <a:solidFill>
+                  <a:schemeClr val="accent1"/>
+                </a:solidFill>
+              </a14:hiddenFill>
+            </a:ext>
+            <a:ext uri="{91240B29-F687-4F45-9708-019B960494DF}">
+              <a14:hiddenLine xmlns:a14="http://schemas.microsoft.com/office/drawing/2010/main" w="9525">
+                <a:solidFill>
+                  <a:schemeClr val="tx1"/>
+                </a:solidFill>
+                <a:miter lim="800000"/>
+                <a:headEnd/>
+                <a:tailEnd/>
+              </a14:hiddenLine>
+            </a:ext>
+          </a:extLst>
+        </p:spPr>
+      </p:pic>
+      <p:pic>
+        <p:nvPicPr>
+          <p:cNvPr id="2051" name="Picture 3"/>
+          <p:cNvPicPr>
+            <a:picLocks noChangeAspect="1" noChangeArrowheads="1"/>
+          </p:cNvPicPr>
+          <p:nvPr/>
+        </p:nvPicPr>
+        <p:blipFill>
+          <a:blip r:embed="rId4">
+            <a:extLst>
+              <a:ext uri="{28A0092B-C50C-407E-A947-70E740481C1C}">
+                <a14:useLocalDpi xmlns:a14="http://schemas.microsoft.com/office/drawing/2010/main" val="0"/>
+              </a:ext>
+            </a:extLst>
+          </a:blip>
+          <a:srcRect/>
+          <a:stretch>
+            <a:fillRect/>
+          </a:stretch>
+        </p:blipFill>
+        <p:spPr bwMode="auto">
+          <a:xfrm>
+            <a:off x="1905000" y="2200275"/>
+            <a:ext cx="4391025" cy="1914525"/>
+          </a:xfrm>
+          <a:prstGeom prst="rect">
+            <a:avLst/>
+          </a:prstGeom>
+          <a:noFill/>
+          <a:ln>
+            <a:noFill/>
+          </a:ln>
+          <a:extLst>
+            <a:ext uri="{909E8E84-426E-40DD-AFC4-6F175D3DCCD1}">
+              <a14:hiddenFill xmlns:a14="http://schemas.microsoft.com/office/drawing/2010/main">
+                <a:solidFill>
+                  <a:schemeClr val="accent1"/>
+                </a:solidFill>
+              </a14:hiddenFill>
+            </a:ext>
+            <a:ext uri="{91240B29-F687-4F45-9708-019B960494DF}">
+              <a14:hiddenLine xmlns:a14="http://schemas.microsoft.com/office/drawing/2010/main" w="9525">
+                <a:solidFill>
+                  <a:schemeClr val="tx1"/>
+                </a:solidFill>
+                <a:miter lim="800000"/>
+                <a:headEnd/>
+                <a:tailEnd/>
+              </a14:hiddenLine>
+            </a:ext>
+          </a:extLst>
+        </p:spPr>
+      </p:pic>
+      <p:sp>
+        <p:nvSpPr>
+          <p:cNvPr id="14" name="TextBox 13"/>
+          <p:cNvSpPr txBox="1"/>
+          <p:nvPr/>
+        </p:nvSpPr>
+        <p:spPr>
+          <a:xfrm>
+            <a:off x="685800" y="4741783"/>
+            <a:ext cx="8001000" cy="1354217"/>
+          </a:xfrm>
+          <a:prstGeom prst="rect">
+            <a:avLst/>
+          </a:prstGeom>
+          <a:noFill/>
+        </p:spPr>
+        <p:txBody>
+          <a:bodyPr wrap="square" rtlCol="0">
+            <a:spAutoFit/>
+          </a:bodyPr>
+          <a:lstStyle/>
+          <a:p>
+            <a:r>
+              <a:rPr lang="en-US" sz="2800" b="1" dirty="0" smtClean="0">
+                <a:solidFill>
+                  <a:schemeClr val="accent6">
+                    <a:lumMod val="75000"/>
+                  </a:schemeClr>
+                </a:solidFill>
+              </a:rPr>
+              <a:t>2.</a:t>
+            </a:r>
+            <a:r>
+              <a:rPr lang="en-US" dirty="0" smtClean="0">
+                <a:solidFill>
+                  <a:schemeClr val="accent6">
+                    <a:lumMod val="75000"/>
+                  </a:schemeClr>
+                </a:solidFill>
+              </a:rPr>
+              <a:t> Click the                 button to generate sub-titles (captions) as well. </a:t>
+            </a:r>
+            <a:br>
+              <a:rPr lang="en-US" dirty="0" smtClean="0">
+                <a:solidFill>
+                  <a:schemeClr val="accent6">
+                    <a:lumMod val="75000"/>
+                  </a:schemeClr>
+                </a:solidFill>
+              </a:rPr>
+            </a:br>
+            <a:r>
+              <a:rPr lang="en-US" dirty="0" smtClean="0">
+                <a:solidFill>
+                  <a:schemeClr val="accent6">
+                    <a:lumMod val="75000"/>
+                  </a:schemeClr>
+                </a:solidFill>
+              </a:rPr>
+              <a:t/>
+            </a:r>
+            <a:br>
+              <a:rPr lang="en-US" dirty="0" smtClean="0">
+                <a:solidFill>
+                  <a:schemeClr val="accent6">
+                    <a:lumMod val="75000"/>
+                  </a:schemeClr>
+                </a:solidFill>
+              </a:rPr>
+            </a:br>
+            <a:r>
+              <a:rPr lang="en-US" dirty="0" smtClean="0">
+                <a:solidFill>
+                  <a:schemeClr val="accent6">
+                    <a:lumMod val="75000"/>
+                  </a:schemeClr>
+                </a:solidFill>
+              </a:rPr>
+              <a:t/>
+            </a:r>
+            <a:br>
+              <a:rPr lang="en-US" dirty="0" smtClean="0">
+                <a:solidFill>
+                  <a:schemeClr val="accent6">
+                    <a:lumMod val="75000"/>
+                  </a:schemeClr>
+                </a:solidFill>
+              </a:rPr>
+            </a:br>
+            <a:r>
+              <a:rPr lang="en-US" dirty="0" smtClean="0">
+                <a:solidFill>
+                  <a:schemeClr val="accent6">
+                    <a:lumMod val="75000"/>
+                  </a:schemeClr>
+                </a:solidFill>
+              </a:rPr>
+              <a:t>Play again to experience both audio and captions at the same time.</a:t>
+            </a:r>
+            <a:endParaRPr lang="en-SG" dirty="0">
+              <a:solidFill>
+                <a:schemeClr val="accent6">
+                  <a:lumMod val="75000"/>
+                </a:schemeClr>
+              </a:solidFill>
+            </a:endParaRPr>
+          </a:p>
+        </p:txBody>
+      </p:sp>
+      <p:pic>
+        <p:nvPicPr>
+          <p:cNvPr id="2052" name="Picture 4"/>
+          <p:cNvPicPr>
+            <a:picLocks noChangeAspect="1" noChangeArrowheads="1"/>
+          </p:cNvPicPr>
+          <p:nvPr/>
+        </p:nvPicPr>
+        <p:blipFill>
+          <a:blip r:embed="rId5">
+            <a:extLst>
+              <a:ext uri="{28A0092B-C50C-407E-A947-70E740481C1C}">
+                <a14:useLocalDpi xmlns:a14="http://schemas.microsoft.com/office/drawing/2010/main" val="0"/>
+              </a:ext>
+            </a:extLst>
+          </a:blip>
+          <a:srcRect/>
+          <a:stretch>
+            <a:fillRect/>
+          </a:stretch>
+        </p:blipFill>
+        <p:spPr bwMode="auto">
+          <a:xfrm>
+            <a:off x="2057400" y="4665583"/>
+            <a:ext cx="597074" cy="838200"/>
+          </a:xfrm>
+          <a:prstGeom prst="rect">
+            <a:avLst/>
+          </a:prstGeom>
+          <a:noFill/>
+          <a:ln w="9525">
+            <a:solidFill>
+              <a:schemeClr val="bg1">
+                <a:lumMod val="85000"/>
+              </a:schemeClr>
+            </a:solidFill>
+            <a:miter lim="800000"/>
+            <a:headEnd/>
+            <a:tailEnd/>
+          </a:ln>
+          <a:extLst>
+            <a:ext uri="{909E8E84-426E-40DD-AFC4-6F175D3DCCD1}">
+              <a14:hiddenFill xmlns:a14="http://schemas.microsoft.com/office/drawing/2010/main">
+                <a:solidFill>
+                  <a:schemeClr val="accent1"/>
+                </a:solidFill>
+              </a14:hiddenFill>
+            </a:ext>
+            <a:ext uri="{91240B29-F687-4F45-9708-019B960494DF}">
+              <a14:hiddenLine xmlns:a14="http://schemas.microsoft.com/office/drawing/2010/main" w="9525">
+                <a:solidFill>
+                  <a:schemeClr val="tx1"/>
+                </a:solidFill>
+                <a:miter lim="800000"/>
+                <a:headEnd/>
+                <a:tailEnd/>
+              </a14:hiddenLine>
+            </a:ext>
+          </a:extLst>
+        </p:spPr>
+      </p:pic>
+    </p:spTree>
+    <p:extLst>
+      <p:ext uri="{BB962C8B-B14F-4D97-AF65-F5344CB8AC3E}">
+        <p14:creationId xmlns:p14="http://schemas.microsoft.com/office/powerpoint/2010/main" val="1274961499"/>
+      </p:ext>
+    </p:extLst>
+  </p:cSld>
+  <p:clrMapOvr>
+    <a:masterClrMapping/>
+  </p:clrMapOvr>
+  <p:timing>
+    <p:tnLst>
+      <p:par>
+        <p:cTn id="1" dur="indefinite" restart="never" nodeType="tmRoot"/>
+      </p:par>
+    </p:tnLst>
+  </p:timing>
+</p:sld>
+</file>
+
+<file path=ppt/slides/slide15.xml><?xml version="1.0" encoding="utf-8"?>
+<p:sld xmlns:a="http://schemas.openxmlformats.org/drawingml/2006/main" xmlns:r="http://schemas.openxmlformats.org/officeDocument/2006/relationships" xmlns:p="http://schemas.openxmlformats.org/presentationml/2006/main">
+  <p:cSld>
+    <p:spTree>
+      <p:nvGrpSpPr>
+        <p:cNvPr id="1" name=""/>
+        <p:cNvGrpSpPr/>
+        <p:nvPr/>
+      </p:nvGrpSpPr>
+      <p:grpSpPr>
+        <a:xfrm>
+          <a:off x="0" y="0"/>
+          <a:ext cx="0" cy="0"/>
+          <a:chOff x="0" y="0"/>
+          <a:chExt cx="0" cy="0"/>
+        </a:xfrm>
+      </p:grpSpPr>
+      <p:sp>
+        <p:nvSpPr>
           <p:cNvPr id="16" name="TextBox 15"/>
           <p:cNvSpPr txBox="1"/>
           <p:nvPr/>
@@ -4500,7 +7132,7 @@
 </p:sld>
 </file>
 
-<file path=ppt/slides/slide12.xml><?xml version="1.0" encoding="utf-8"?>
+<file path=ppt/slides/slide16.xml><?xml version="1.0" encoding="utf-8"?>
 <p:sld xmlns:a="http://schemas.openxmlformats.org/drawingml/2006/main" xmlns:r="http://schemas.openxmlformats.org/officeDocument/2006/relationships" xmlns:p="http://schemas.openxmlformats.org/presentationml/2006/main" show="0">
   <p:cSld name="PPAck201401021130490549">
     <p:spTree>
@@ -8510,4 +11142,289 @@
   <a:objectDefaults/>
   <a:extraClrSchemeLst/>
 </a:theme>
+</file>
+
+<file path=ppt/theme/theme2.xml><?xml version="1.0" encoding="utf-8"?>
+<a:theme xmlns:a="http://schemas.openxmlformats.org/drawingml/2006/main" name="Office Theme">
+  <a:themeElements>
+    <a:clrScheme name="Office">
+      <a:dk1>
+        <a:sysClr val="windowText" lastClr="000000"/>
+      </a:dk1>
+      <a:lt1>
+        <a:sysClr val="window" lastClr="FFFFFF"/>
+      </a:lt1>
+      <a:dk2>
+        <a:srgbClr val="1F497D"/>
+      </a:dk2>
+      <a:lt2>
+        <a:srgbClr val="EEECE1"/>
+      </a:lt2>
+      <a:accent1>
+        <a:srgbClr val="4F81BD"/>
+      </a:accent1>
+      <a:accent2>
+        <a:srgbClr val="C0504D"/>
+      </a:accent2>
+      <a:accent3>
+        <a:srgbClr val="9BBB59"/>
+      </a:accent3>
+      <a:accent4>
+        <a:srgbClr val="8064A2"/>
+      </a:accent4>
+      <a:accent5>
+        <a:srgbClr val="4BACC6"/>
+      </a:accent5>
+      <a:accent6>
+        <a:srgbClr val="F79646"/>
+      </a:accent6>
+      <a:hlink>
+        <a:srgbClr val="0000FF"/>
+      </a:hlink>
+      <a:folHlink>
+        <a:srgbClr val="800080"/>
+      </a:folHlink>
+    </a:clrScheme>
+    <a:fontScheme name="Office">
+      <a:majorFont>
+        <a:latin typeface="Calibri"/>
+        <a:ea typeface=""/>
+        <a:cs typeface=""/>
+        <a:font script="Jpan" typeface="ＭＳ Ｐゴシック"/>
+        <a:font script="Hang" typeface="맑은 고딕"/>
+        <a:font script="Hans" typeface="宋体"/>
+        <a:font script="Hant" typeface="新細明體"/>
+        <a:font script="Arab" typeface="Times New Roman"/>
+        <a:font script="Hebr" typeface="Times New Roman"/>
+        <a:font script="Thai" typeface="Angsana New"/>
+        <a:font script="Ethi" typeface="Nyala"/>
+        <a:font script="Beng" typeface="Vrinda"/>
+        <a:font script="Gujr" typeface="Shruti"/>
+        <a:font script="Khmr" typeface="MoolBoran"/>
+        <a:font script="Knda" typeface="Tunga"/>
+        <a:font script="Guru" typeface="Raavi"/>
+        <a:font script="Cans" typeface="Euphemia"/>
+        <a:font script="Cher" typeface="Plantagenet Cherokee"/>
+        <a:font script="Yiii" typeface="Microsoft Yi Baiti"/>
+        <a:font script="Tibt" typeface="Microsoft Himalaya"/>
+        <a:font script="Thaa" typeface="MV Boli"/>
+        <a:font script="Deva" typeface="Mangal"/>
+        <a:font script="Telu" typeface="Gautami"/>
+        <a:font script="Taml" typeface="Latha"/>
+        <a:font script="Syrc" typeface="Estrangelo Edessa"/>
+        <a:font script="Orya" typeface="Kalinga"/>
+        <a:font script="Mlym" typeface="Kartika"/>
+        <a:font script="Laoo" typeface="DokChampa"/>
+        <a:font script="Sinh" typeface="Iskoola Pota"/>
+        <a:font script="Mong" typeface="Mongolian Baiti"/>
+        <a:font script="Viet" typeface="Times New Roman"/>
+        <a:font script="Uigh" typeface="Microsoft Uighur"/>
+        <a:font script="Geor" typeface="Sylfaen"/>
+      </a:majorFont>
+      <a:minorFont>
+        <a:latin typeface="Calibri"/>
+        <a:ea typeface=""/>
+        <a:cs typeface=""/>
+        <a:font script="Jpan" typeface="ＭＳ Ｐゴシック"/>
+        <a:font script="Hang" typeface="맑은 고딕"/>
+        <a:font script="Hans" typeface="宋体"/>
+        <a:font script="Hant" typeface="新細明體"/>
+        <a:font script="Arab" typeface="Arial"/>
+        <a:font script="Hebr" typeface="Arial"/>
+        <a:font script="Thai" typeface="Cordia New"/>
+        <a:font script="Ethi" typeface="Nyala"/>
+        <a:font script="Beng" typeface="Vrinda"/>
+        <a:font script="Gujr" typeface="Shruti"/>
+        <a:font script="Khmr" typeface="DaunPenh"/>
+        <a:font script="Knda" typeface="Tunga"/>
+        <a:font script="Guru" typeface="Raavi"/>
+        <a:font script="Cans" typeface="Euphemia"/>
+        <a:font script="Cher" typeface="Plantagenet Cherokee"/>
+        <a:font script="Yiii" typeface="Microsoft Yi Baiti"/>
+        <a:font script="Tibt" typeface="Microsoft Himalaya"/>
+        <a:font script="Thaa" typeface="MV Boli"/>
+        <a:font script="Deva" typeface="Mangal"/>
+        <a:font script="Telu" typeface="Gautami"/>
+        <a:font script="Taml" typeface="Latha"/>
+        <a:font script="Syrc" typeface="Estrangelo Edessa"/>
+        <a:font script="Orya" typeface="Kalinga"/>
+        <a:font script="Mlym" typeface="Kartika"/>
+        <a:font script="Laoo" typeface="DokChampa"/>
+        <a:font script="Sinh" typeface="Iskoola Pota"/>
+        <a:font script="Mong" typeface="Mongolian Baiti"/>
+        <a:font script="Viet" typeface="Arial"/>
+        <a:font script="Uigh" typeface="Microsoft Uighur"/>
+        <a:font script="Geor" typeface="Sylfaen"/>
+      </a:minorFont>
+    </a:fontScheme>
+    <a:fmtScheme name="Office">
+      <a:fillStyleLst>
+        <a:solidFill>
+          <a:schemeClr val="phClr"/>
+        </a:solidFill>
+        <a:gradFill rotWithShape="1">
+          <a:gsLst>
+            <a:gs pos="0">
+              <a:schemeClr val="phClr">
+                <a:tint val="50000"/>
+                <a:satMod val="300000"/>
+              </a:schemeClr>
+            </a:gs>
+            <a:gs pos="35000">
+              <a:schemeClr val="phClr">
+                <a:tint val="37000"/>
+                <a:satMod val="300000"/>
+              </a:schemeClr>
+            </a:gs>
+            <a:gs pos="100000">
+              <a:schemeClr val="phClr">
+                <a:tint val="15000"/>
+                <a:satMod val="350000"/>
+              </a:schemeClr>
+            </a:gs>
+          </a:gsLst>
+          <a:lin ang="16200000" scaled="1"/>
+        </a:gradFill>
+        <a:gradFill rotWithShape="1">
+          <a:gsLst>
+            <a:gs pos="0">
+              <a:schemeClr val="phClr">
+                <a:shade val="51000"/>
+                <a:satMod val="130000"/>
+              </a:schemeClr>
+            </a:gs>
+            <a:gs pos="80000">
+              <a:schemeClr val="phClr">
+                <a:shade val="93000"/>
+                <a:satMod val="130000"/>
+              </a:schemeClr>
+            </a:gs>
+            <a:gs pos="100000">
+              <a:schemeClr val="phClr">
+                <a:shade val="94000"/>
+                <a:satMod val="135000"/>
+              </a:schemeClr>
+            </a:gs>
+          </a:gsLst>
+          <a:lin ang="16200000" scaled="0"/>
+        </a:gradFill>
+      </a:fillStyleLst>
+      <a:lnStyleLst>
+        <a:ln w="9525" cap="flat" cmpd="sng" algn="ctr">
+          <a:solidFill>
+            <a:schemeClr val="phClr">
+              <a:shade val="95000"/>
+              <a:satMod val="105000"/>
+            </a:schemeClr>
+          </a:solidFill>
+          <a:prstDash val="solid"/>
+        </a:ln>
+        <a:ln w="25400" cap="flat" cmpd="sng" algn="ctr">
+          <a:solidFill>
+            <a:schemeClr val="phClr"/>
+          </a:solidFill>
+          <a:prstDash val="solid"/>
+        </a:ln>
+        <a:ln w="38100" cap="flat" cmpd="sng" algn="ctr">
+          <a:solidFill>
+            <a:schemeClr val="phClr"/>
+          </a:solidFill>
+          <a:prstDash val="solid"/>
+        </a:ln>
+      </a:lnStyleLst>
+      <a:effectStyleLst>
+        <a:effectStyle>
+          <a:effectLst>
+            <a:outerShdw blurRad="40000" dist="20000" dir="5400000" rotWithShape="0">
+              <a:srgbClr val="000000">
+                <a:alpha val="38000"/>
+              </a:srgbClr>
+            </a:outerShdw>
+          </a:effectLst>
+        </a:effectStyle>
+        <a:effectStyle>
+          <a:effectLst>
+            <a:outerShdw blurRad="40000" dist="23000" dir="5400000" rotWithShape="0">
+              <a:srgbClr val="000000">
+                <a:alpha val="35000"/>
+              </a:srgbClr>
+            </a:outerShdw>
+          </a:effectLst>
+        </a:effectStyle>
+        <a:effectStyle>
+          <a:effectLst>
+            <a:outerShdw blurRad="40000" dist="23000" dir="5400000" rotWithShape="0">
+              <a:srgbClr val="000000">
+                <a:alpha val="35000"/>
+              </a:srgbClr>
+            </a:outerShdw>
+          </a:effectLst>
+          <a:scene3d>
+            <a:camera prst="orthographicFront">
+              <a:rot lat="0" lon="0" rev="0"/>
+            </a:camera>
+            <a:lightRig rig="threePt" dir="t">
+              <a:rot lat="0" lon="0" rev="1200000"/>
+            </a:lightRig>
+          </a:scene3d>
+          <a:sp3d>
+            <a:bevelT w="63500" h="25400"/>
+          </a:sp3d>
+        </a:effectStyle>
+      </a:effectStyleLst>
+      <a:bgFillStyleLst>
+        <a:solidFill>
+          <a:schemeClr val="phClr"/>
+        </a:solidFill>
+        <a:gradFill rotWithShape="1">
+          <a:gsLst>
+            <a:gs pos="0">
+              <a:schemeClr val="phClr">
+                <a:tint val="40000"/>
+                <a:satMod val="350000"/>
+              </a:schemeClr>
+            </a:gs>
+            <a:gs pos="40000">
+              <a:schemeClr val="phClr">
+                <a:tint val="45000"/>
+                <a:shade val="99000"/>
+                <a:satMod val="350000"/>
+              </a:schemeClr>
+            </a:gs>
+            <a:gs pos="100000">
+              <a:schemeClr val="phClr">
+                <a:shade val="20000"/>
+                <a:satMod val="255000"/>
+              </a:schemeClr>
+            </a:gs>
+          </a:gsLst>
+          <a:path path="circle">
+            <a:fillToRect l="50000" t="-80000" r="50000" b="180000"/>
+          </a:path>
+        </a:gradFill>
+        <a:gradFill rotWithShape="1">
+          <a:gsLst>
+            <a:gs pos="0">
+              <a:schemeClr val="phClr">
+                <a:tint val="80000"/>
+                <a:satMod val="300000"/>
+              </a:schemeClr>
+            </a:gs>
+            <a:gs pos="100000">
+              <a:schemeClr val="phClr">
+                <a:shade val="30000"/>
+                <a:satMod val="200000"/>
+              </a:schemeClr>
+            </a:gs>
+          </a:gsLst>
+          <a:path path="circle">
+            <a:fillToRect l="50000" t="50000" r="50000" b="50000"/>
+          </a:path>
+        </a:gradFill>
+      </a:bgFillStyleLst>
+    </a:fmtScheme>
+  </a:themeElements>
+  <a:objectDefaults/>
+  <a:extraClrSchemeLst/>
+</a:theme>
 </file>
</xml_diff>

<commit_message>
Issue 172 (contd): Update tutorial file for Auto Narrate/Captions Update Issue 172 Minor change to remove frame animation from the tutorial file
</commit_message>
<xml_diff>
--- a/doc/PowerPointLabs Quick Tutorial.pptx
+++ b/doc/PowerPointLabs Quick Tutorial.pptx
@@ -16,7 +16,7 @@
     <p:sldId id="301" r:id="rId7"/>
     <p:sldId id="303" r:id="rId8"/>
     <p:sldId id="261" r:id="rId9"/>
-    <p:sldId id="306" r:id="rId10"/>
+    <p:sldId id="311" r:id="rId10"/>
     <p:sldId id="304" r:id="rId11"/>
     <p:sldId id="308" r:id="rId12"/>
     <p:sldId id="307" r:id="rId13"/>
@@ -143,7 +143,7 @@
           <p14:sldIdLst>
             <p14:sldId id="303"/>
             <p14:sldId id="261"/>
-            <p14:sldId id="306"/>
+            <p14:sldId id="311"/>
             <p14:sldId id="304"/>
             <p14:sldId id="308"/>
             <p14:sldId id="307"/>
@@ -164,7 +164,7 @@
       </p14:sectionLst>
     </p:ext>
     <p:ext uri="{EFAFB233-063F-42B5-8137-9DF3F51BA10A}">
-      <p15:sldGuideLst xmlns:p15="http://schemas.microsoft.com/office/powerpoint/2012/main" xmlns="">
+      <p15:sldGuideLst xmlns="" xmlns:p15="http://schemas.microsoft.com/office/powerpoint/2012/main">
         <p15:guide id="1" orient="horz" pos="2160">
           <p15:clr>
             <a:srgbClr val="A4A3A4"/>
@@ -388,7 +388,7 @@
           <a:p>
             <a:fld id="{3E86CC0F-BBF3-4E07-94E0-0549B7D560A9}" type="datetimeFigureOut">
               <a:rPr lang="en-SG" smtClean="0"/>
-              <a:t>10/2/2014</a:t>
+              <a:t>11/2/2014</a:t>
             </a:fld>
             <a:endParaRPr lang="en-SG"/>
           </a:p>
@@ -1038,7 +1038,7 @@
             <a:fld id="{1D8BD707-D9CF-40AE-B4C6-C98DA3205C09}" type="datetimeFigureOut">
               <a:rPr lang="en-US" smtClean="0"/>
               <a:pPr/>
-              <a:t>2/10/2014</a:t>
+              <a:t>2/11/2014</a:t>
             </a:fld>
             <a:endParaRPr lang="en-US"/>
           </a:p>
@@ -1205,7 +1205,7 @@
             <a:fld id="{1D8BD707-D9CF-40AE-B4C6-C98DA3205C09}" type="datetimeFigureOut">
               <a:rPr lang="en-US" smtClean="0"/>
               <a:pPr/>
-              <a:t>2/10/2014</a:t>
+              <a:t>2/11/2014</a:t>
             </a:fld>
             <a:endParaRPr lang="en-US"/>
           </a:p>
@@ -1382,7 +1382,7 @@
             <a:fld id="{1D8BD707-D9CF-40AE-B4C6-C98DA3205C09}" type="datetimeFigureOut">
               <a:rPr lang="en-US" smtClean="0"/>
               <a:pPr/>
-              <a:t>2/10/2014</a:t>
+              <a:t>2/11/2014</a:t>
             </a:fld>
             <a:endParaRPr lang="en-US"/>
           </a:p>
@@ -1549,7 +1549,7 @@
             <a:fld id="{1D8BD707-D9CF-40AE-B4C6-C98DA3205C09}" type="datetimeFigureOut">
               <a:rPr lang="en-US" smtClean="0"/>
               <a:pPr/>
-              <a:t>2/10/2014</a:t>
+              <a:t>2/11/2014</a:t>
             </a:fld>
             <a:endParaRPr lang="en-US"/>
           </a:p>
@@ -1792,7 +1792,7 @@
             <a:fld id="{1D8BD707-D9CF-40AE-B4C6-C98DA3205C09}" type="datetimeFigureOut">
               <a:rPr lang="en-US" smtClean="0"/>
               <a:pPr/>
-              <a:t>2/10/2014</a:t>
+              <a:t>2/11/2014</a:t>
             </a:fld>
             <a:endParaRPr lang="en-US"/>
           </a:p>
@@ -2077,7 +2077,7 @@
             <a:fld id="{1D8BD707-D9CF-40AE-B4C6-C98DA3205C09}" type="datetimeFigureOut">
               <a:rPr lang="en-US" smtClean="0"/>
               <a:pPr/>
-              <a:t>2/10/2014</a:t>
+              <a:t>2/11/2014</a:t>
             </a:fld>
             <a:endParaRPr lang="en-US"/>
           </a:p>
@@ -2496,7 +2496,7 @@
             <a:fld id="{1D8BD707-D9CF-40AE-B4C6-C98DA3205C09}" type="datetimeFigureOut">
               <a:rPr lang="en-US" smtClean="0"/>
               <a:pPr/>
-              <a:t>2/10/2014</a:t>
+              <a:t>2/11/2014</a:t>
             </a:fld>
             <a:endParaRPr lang="en-US"/>
           </a:p>
@@ -2611,7 +2611,7 @@
             <a:fld id="{1D8BD707-D9CF-40AE-B4C6-C98DA3205C09}" type="datetimeFigureOut">
               <a:rPr lang="en-US" smtClean="0"/>
               <a:pPr/>
-              <a:t>2/10/2014</a:t>
+              <a:t>2/11/2014</a:t>
             </a:fld>
             <a:endParaRPr lang="en-US"/>
           </a:p>
@@ -2703,7 +2703,7 @@
             <a:fld id="{1D8BD707-D9CF-40AE-B4C6-C98DA3205C09}" type="datetimeFigureOut">
               <a:rPr lang="en-US" smtClean="0"/>
               <a:pPr/>
-              <a:t>2/10/2014</a:t>
+              <a:t>2/11/2014</a:t>
             </a:fld>
             <a:endParaRPr lang="en-US"/>
           </a:p>
@@ -2977,7 +2977,7 @@
             <a:fld id="{1D8BD707-D9CF-40AE-B4C6-C98DA3205C09}" type="datetimeFigureOut">
               <a:rPr lang="en-US" smtClean="0"/>
               <a:pPr/>
-              <a:t>2/10/2014</a:t>
+              <a:t>2/11/2014</a:t>
             </a:fld>
             <a:endParaRPr lang="en-US"/>
           </a:p>
@@ -3227,7 +3227,7 @@
             <a:fld id="{1D8BD707-D9CF-40AE-B4C6-C98DA3205C09}" type="datetimeFigureOut">
               <a:rPr lang="en-US" smtClean="0"/>
               <a:pPr/>
-              <a:t>2/10/2014</a:t>
+              <a:t>2/11/2014</a:t>
             </a:fld>
             <a:endParaRPr lang="en-US"/>
           </a:p>
@@ -3437,7 +3437,7 @@
             <a:fld id="{1D8BD707-D9CF-40AE-B4C6-C98DA3205C09}" type="datetimeFigureOut">
               <a:rPr lang="en-US" smtClean="0"/>
               <a:pPr/>
-              <a:t>2/10/2014</a:t>
+              <a:t>2/11/2014</a:t>
             </a:fld>
             <a:endParaRPr lang="en-US"/>
           </a:p>
@@ -4144,17 +4144,7 @@
                   </a:schemeClr>
                 </a:solidFill>
               </a:rPr>
-              <a:t>Select </a:t>
-            </a:r>
-            <a:r>
-              <a:rPr lang="en-US" dirty="0" smtClean="0">
-                <a:solidFill>
-                  <a:schemeClr val="accent6">
-                    <a:lumMod val="75000"/>
-                  </a:schemeClr>
-                </a:solidFill>
-              </a:rPr>
-              <a:t>any of the three slides.</a:t>
+              <a:t>Select any of the three slides.</a:t>
             </a:r>
             <a:endParaRPr lang="en-SG" dirty="0">
               <a:solidFill>
@@ -4780,17 +4770,7 @@
                   </a:schemeClr>
                 </a:solidFill>
               </a:rPr>
-              <a:t> </a:t>
-            </a:r>
-            <a:r>
-              <a:rPr lang="en-US" dirty="0" smtClean="0">
-                <a:solidFill>
-                  <a:schemeClr val="accent6">
-                    <a:lumMod val="75000"/>
-                  </a:schemeClr>
-                </a:solidFill>
-              </a:rPr>
-              <a:t>feature</a:t>
+              <a:t> feature</a:t>
             </a:r>
             <a:endParaRPr lang="en-SG" dirty="0">
               <a:solidFill>
@@ -5588,17 +5568,7 @@
                   </a:schemeClr>
                 </a:solidFill>
               </a:rPr>
-              <a:t> </a:t>
-            </a:r>
-            <a:r>
-              <a:rPr lang="en-US" dirty="0" smtClean="0">
-                <a:solidFill>
-                  <a:schemeClr val="accent6">
-                    <a:lumMod val="75000"/>
-                  </a:schemeClr>
-                </a:solidFill>
-              </a:rPr>
-              <a:t>Select the four blue circles in any order and click  the            button.</a:t>
+              <a:t> Select the four blue circles in any order and click  the            button.</a:t>
             </a:r>
             <a:endParaRPr lang="en-SG" dirty="0">
               <a:solidFill>
@@ -5657,16 +5627,6 @@
                   <a:schemeClr val="accent1"/>
                 </a:solidFill>
               </a14:hiddenFill>
-            </a:ext>
-            <a:ext uri="{91240B29-F687-4F45-9708-019B960494DF}">
-              <a14:hiddenLine xmlns:a14="http://schemas.microsoft.com/office/drawing/2010/main" w="9525">
-                <a:solidFill>
-                  <a:schemeClr val="tx1"/>
-                </a:solidFill>
-                <a:miter lim="800000"/>
-                <a:headEnd/>
-                <a:tailEnd/>
-              </a14:hiddenLine>
             </a:ext>
           </a:extLst>
         </p:spPr>
@@ -6581,16 +6541,6 @@
                 </a:solidFill>
               </a14:hiddenFill>
             </a:ext>
-            <a:ext uri="{91240B29-F687-4F45-9708-019B960494DF}">
-              <a14:hiddenLine xmlns:a14="http://schemas.microsoft.com/office/drawing/2010/main" w="9525">
-                <a:solidFill>
-                  <a:schemeClr val="tx1"/>
-                </a:solidFill>
-                <a:miter lim="800000"/>
-                <a:headEnd/>
-                <a:tailEnd/>
-              </a14:hiddenLine>
-            </a:ext>
           </a:extLst>
         </p:spPr>
       </p:pic>
@@ -6804,16 +6754,6 @@
                   <a:schemeClr val="accent1"/>
                 </a:solidFill>
               </a14:hiddenFill>
-            </a:ext>
-            <a:ext uri="{91240B29-F687-4F45-9708-019B960494DF}">
-              <a14:hiddenLine xmlns:a14="http://schemas.microsoft.com/office/drawing/2010/main" w="9525">
-                <a:solidFill>
-                  <a:schemeClr val="tx1"/>
-                </a:solidFill>
-                <a:miter lim="800000"/>
-                <a:headEnd/>
-                <a:tailEnd/>
-              </a14:hiddenLine>
             </a:ext>
           </a:extLst>
         </p:spPr>
@@ -10630,8 +10570,8 @@
         </p:nvSpPr>
         <p:spPr>
           <a:xfrm>
-            <a:off x="773430" y="3276600"/>
-            <a:ext cx="2133600" cy="838200"/>
+            <a:off x="610509" y="3214411"/>
+            <a:ext cx="2124000" cy="838200"/>
           </a:xfrm>
           <a:prstGeom prst="notchedRightArrow">
             <a:avLst/>
@@ -10666,14 +10606,14 @@
       </p:sp>
       <p:sp>
         <p:nvSpPr>
-          <p:cNvPr id="5" name="Development"/>
+          <p:cNvPr id="5" name="Marketing"/>
           <p:cNvSpPr/>
           <p:nvPr/>
         </p:nvSpPr>
         <p:spPr>
           <a:xfrm>
-            <a:off x="2743200" y="3276600"/>
-            <a:ext cx="2133600" cy="838200"/>
+            <a:off x="2524200" y="3214411"/>
+            <a:ext cx="2124000" cy="838200"/>
           </a:xfrm>
           <a:prstGeom prst="notchedRightArrow">
             <a:avLst/>
@@ -10700,7 +10640,7 @@
             <a:pPr algn="ctr"/>
             <a:r>
               <a:rPr lang="en-US" dirty="0" smtClean="0"/>
-              <a:t>Development</a:t>
+              <a:t>Marketing</a:t>
             </a:r>
             <a:endParaRPr lang="en-SG" dirty="0"/>
           </a:p>
@@ -10708,14 +10648,14 @@
       </p:sp>
       <p:sp>
         <p:nvSpPr>
-          <p:cNvPr id="6" name="Marketing"/>
+          <p:cNvPr id="6" name="Development"/>
           <p:cNvSpPr/>
           <p:nvPr/>
         </p:nvSpPr>
         <p:spPr>
           <a:xfrm>
-            <a:off x="4720590" y="3276600"/>
-            <a:ext cx="2133600" cy="838200"/>
+            <a:off x="4429200" y="3214411"/>
+            <a:ext cx="2124000" cy="838200"/>
           </a:xfrm>
           <a:prstGeom prst="notchedRightArrow">
             <a:avLst/>
@@ -10742,7 +10682,7 @@
             <a:pPr algn="ctr"/>
             <a:r>
               <a:rPr lang="en-US" dirty="0" smtClean="0"/>
-              <a:t>Marketing</a:t>
+              <a:t>Development</a:t>
             </a:r>
             <a:endParaRPr lang="en-SG" dirty="0"/>
           </a:p>
@@ -10756,8 +10696,8 @@
         </p:nvSpPr>
         <p:spPr>
           <a:xfrm>
-            <a:off x="7086600" y="2286000"/>
-            <a:ext cx="1447800" cy="2240442"/>
+            <a:off x="7086600" y="2590800"/>
+            <a:ext cx="1371600" cy="1935642"/>
           </a:xfrm>
           <a:prstGeom prst="flowChartMagneticDisk">
             <a:avLst/>
@@ -10790,13 +10730,13 @@
           <a:lstStyle/>
           <a:p>
             <a:pPr algn="ctr"/>
-            <a:endParaRPr lang="en-SG" sz="3200" dirty="0"/>
-          </a:p>
-        </p:txBody>
-      </p:sp>
-      <p:sp>
-        <p:nvSpPr>
-          <p:cNvPr id="13" name="profit text"/>
+            <a:endParaRPr lang="en-SG" dirty="0"/>
+          </a:p>
+        </p:txBody>
+      </p:sp>
+      <p:sp>
+        <p:nvSpPr>
+          <p:cNvPr id="2" name="profit text"/>
           <p:cNvSpPr txBox="1"/>
           <p:nvPr/>
         </p:nvSpPr>
@@ -10836,7 +10776,7 @@
     </p:spTree>
     <p:extLst>
       <p:ext uri="{BB962C8B-B14F-4D97-AF65-F5344CB8AC3E}">
-        <p14:creationId xmlns:p14="http://schemas.microsoft.com/office/powerpoint/2010/main" val="988854600"/>
+        <p14:creationId xmlns:p14="http://schemas.microsoft.com/office/powerpoint/2010/main" val="1829647045"/>
       </p:ext>
     </p:extLst>
   </p:cSld>
@@ -10845,10 +10785,10 @@
   </p:clrMapOvr>
   <mc:AlternateContent xmlns:mc="http://schemas.openxmlformats.org/markup-compatibility/2006" xmlns:p14="http://schemas.microsoft.com/office/powerpoint/2010/main">
     <mc:Choice Requires="p14">
-      <p:transition spd="slow" p14:dur="2000"/>
+      <p:transition p14:dur="0"/>
     </mc:Choice>
     <mc:Fallback xmlns="">
-      <p:transition spd="slow"/>
+      <p:transition/>
     </mc:Fallback>
   </mc:AlternateContent>
   <p:timing>

</xml_diff>

<commit_message>
Issue 199: draft documentation for auto zoom Update Issue 199
</commit_message>
<xml_diff>
--- a/doc/PowerPointLabs Quick Tutorial.pptx
+++ b/doc/PowerPointLabs Quick Tutorial.pptx
@@ -5,7 +5,7 @@
     <p:sldMasterId id="2147483648" r:id="rId1"/>
   </p:sldMasterIdLst>
   <p:notesMasterIdLst>
-    <p:notesMasterId r:id="rId18"/>
+    <p:notesMasterId r:id="rId22"/>
   </p:notesMasterIdLst>
   <p:sldIdLst>
     <p:sldId id="296" r:id="rId2"/>
@@ -20,10 +20,14 @@
     <p:sldId id="304" r:id="rId11"/>
     <p:sldId id="308" r:id="rId12"/>
     <p:sldId id="307" r:id="rId13"/>
-    <p:sldId id="310" r:id="rId14"/>
-    <p:sldId id="309" r:id="rId15"/>
-    <p:sldId id="305" r:id="rId16"/>
-    <p:sldId id="299" r:id="rId17"/>
+    <p:sldId id="312" r:id="rId14"/>
+    <p:sldId id="313" r:id="rId15"/>
+    <p:sldId id="314" r:id="rId16"/>
+    <p:sldId id="322" r:id="rId17"/>
+    <p:sldId id="310" r:id="rId18"/>
+    <p:sldId id="309" r:id="rId19"/>
+    <p:sldId id="305" r:id="rId20"/>
+    <p:sldId id="299" r:id="rId21"/>
   </p:sldIdLst>
   <p:sldSz cx="9144000" cy="6858000" type="screen4x3"/>
   <p:notesSz cx="6858000" cy="9144000"/>
@@ -149,6 +153,14 @@
             <p14:sldId id="307"/>
           </p14:sldIdLst>
         </p14:section>
+        <p14:section name="Auto zoom feature" id="{9606B9C2-AF7E-4CB4-A456-1CB76A03EF99}">
+          <p14:sldIdLst>
+            <p14:sldId id="312"/>
+            <p14:sldId id="313"/>
+            <p14:sldId id="314"/>
+            <p14:sldId id="322"/>
+          </p14:sldIdLst>
+        </p14:section>
         <p14:section name="Auto narrate and auto captions" id="{A9769C45-8345-410D-A2DA-6DEBD5D41D7C}">
           <p14:sldIdLst>
             <p14:sldId id="310"/>
@@ -164,7 +176,7 @@
       </p14:sectionLst>
     </p:ext>
     <p:ext uri="{EFAFB233-063F-42B5-8137-9DF3F51BA10A}">
-      <p15:sldGuideLst xmlns="" xmlns:p15="http://schemas.microsoft.com/office/powerpoint/2012/main">
+      <p15:sldGuideLst xmlns:p15="http://schemas.microsoft.com/office/powerpoint/2012/main" xmlns="">
         <p15:guide id="1" orient="horz" pos="2160">
           <p15:clr>
             <a:srgbClr val="A4A3A4"/>
@@ -388,7 +400,7 @@
           <a:p>
             <a:fld id="{3E86CC0F-BBF3-4E07-94E0-0549B7D560A9}" type="datetimeFigureOut">
               <a:rPr lang="en-SG" smtClean="0"/>
-              <a:t>11/2/2014</a:t>
+              <a:t>17/2/2014</a:t>
             </a:fld>
             <a:endParaRPr lang="en-SG"/>
           </a:p>
@@ -837,7 +849,7 @@
           <a:p>
             <a:fld id="{0015B511-83B7-463E-ACD1-0C1C081EBBC4}" type="slidenum">
               <a:rPr lang="en-SG" smtClean="0"/>
-              <a:t>14</a:t>
+              <a:t>18</a:t>
             </a:fld>
             <a:endParaRPr lang="en-SG"/>
           </a:p>
@@ -1038,7 +1050,7 @@
             <a:fld id="{1D8BD707-D9CF-40AE-B4C6-C98DA3205C09}" type="datetimeFigureOut">
               <a:rPr lang="en-US" smtClean="0"/>
               <a:pPr/>
-              <a:t>2/11/2014</a:t>
+              <a:t>2/17/2014</a:t>
             </a:fld>
             <a:endParaRPr lang="en-US"/>
           </a:p>
@@ -1205,7 +1217,7 @@
             <a:fld id="{1D8BD707-D9CF-40AE-B4C6-C98DA3205C09}" type="datetimeFigureOut">
               <a:rPr lang="en-US" smtClean="0"/>
               <a:pPr/>
-              <a:t>2/11/2014</a:t>
+              <a:t>2/17/2014</a:t>
             </a:fld>
             <a:endParaRPr lang="en-US"/>
           </a:p>
@@ -1382,7 +1394,7 @@
             <a:fld id="{1D8BD707-D9CF-40AE-B4C6-C98DA3205C09}" type="datetimeFigureOut">
               <a:rPr lang="en-US" smtClean="0"/>
               <a:pPr/>
-              <a:t>2/11/2014</a:t>
+              <a:t>2/17/2014</a:t>
             </a:fld>
             <a:endParaRPr lang="en-US"/>
           </a:p>
@@ -1549,7 +1561,7 @@
             <a:fld id="{1D8BD707-D9CF-40AE-B4C6-C98DA3205C09}" type="datetimeFigureOut">
               <a:rPr lang="en-US" smtClean="0"/>
               <a:pPr/>
-              <a:t>2/11/2014</a:t>
+              <a:t>2/17/2014</a:t>
             </a:fld>
             <a:endParaRPr lang="en-US"/>
           </a:p>
@@ -1792,7 +1804,7 @@
             <a:fld id="{1D8BD707-D9CF-40AE-B4C6-C98DA3205C09}" type="datetimeFigureOut">
               <a:rPr lang="en-US" smtClean="0"/>
               <a:pPr/>
-              <a:t>2/11/2014</a:t>
+              <a:t>2/17/2014</a:t>
             </a:fld>
             <a:endParaRPr lang="en-US"/>
           </a:p>
@@ -2077,7 +2089,7 @@
             <a:fld id="{1D8BD707-D9CF-40AE-B4C6-C98DA3205C09}" type="datetimeFigureOut">
               <a:rPr lang="en-US" smtClean="0"/>
               <a:pPr/>
-              <a:t>2/11/2014</a:t>
+              <a:t>2/17/2014</a:t>
             </a:fld>
             <a:endParaRPr lang="en-US"/>
           </a:p>
@@ -2496,7 +2508,7 @@
             <a:fld id="{1D8BD707-D9CF-40AE-B4C6-C98DA3205C09}" type="datetimeFigureOut">
               <a:rPr lang="en-US" smtClean="0"/>
               <a:pPr/>
-              <a:t>2/11/2014</a:t>
+              <a:t>2/17/2014</a:t>
             </a:fld>
             <a:endParaRPr lang="en-US"/>
           </a:p>
@@ -2611,7 +2623,7 @@
             <a:fld id="{1D8BD707-D9CF-40AE-B4C6-C98DA3205C09}" type="datetimeFigureOut">
               <a:rPr lang="en-US" smtClean="0"/>
               <a:pPr/>
-              <a:t>2/11/2014</a:t>
+              <a:t>2/17/2014</a:t>
             </a:fld>
             <a:endParaRPr lang="en-US"/>
           </a:p>
@@ -2703,7 +2715,7 @@
             <a:fld id="{1D8BD707-D9CF-40AE-B4C6-C98DA3205C09}" type="datetimeFigureOut">
               <a:rPr lang="en-US" smtClean="0"/>
               <a:pPr/>
-              <a:t>2/11/2014</a:t>
+              <a:t>2/17/2014</a:t>
             </a:fld>
             <a:endParaRPr lang="en-US"/>
           </a:p>
@@ -2977,7 +2989,7 @@
             <a:fld id="{1D8BD707-D9CF-40AE-B4C6-C98DA3205C09}" type="datetimeFigureOut">
               <a:rPr lang="en-US" smtClean="0"/>
               <a:pPr/>
-              <a:t>2/11/2014</a:t>
+              <a:t>2/17/2014</a:t>
             </a:fld>
             <a:endParaRPr lang="en-US"/>
           </a:p>
@@ -3227,7 +3239,7 @@
             <a:fld id="{1D8BD707-D9CF-40AE-B4C6-C98DA3205C09}" type="datetimeFigureOut">
               <a:rPr lang="en-US" smtClean="0"/>
               <a:pPr/>
-              <a:t>2/11/2014</a:t>
+              <a:t>2/17/2014</a:t>
             </a:fld>
             <a:endParaRPr lang="en-US"/>
           </a:p>
@@ -3437,7 +3449,7 @@
             <a:fld id="{1D8BD707-D9CF-40AE-B4C6-C98DA3205C09}" type="datetimeFigureOut">
               <a:rPr lang="en-US" smtClean="0"/>
               <a:pPr/>
-              <a:t>2/11/2014</a:t>
+              <a:t>2/17/2014</a:t>
             </a:fld>
             <a:endParaRPr lang="en-US"/>
           </a:p>
@@ -5671,7 +5683,47 @@
                   </a:schemeClr>
                 </a:solidFill>
               </a:rPr>
-              <a:t> When you ‘play the slide, you should see a single circle animated </a:t>
+              <a:t> When you ‘</a:t>
+            </a:r>
+            <a:r>
+              <a:rPr lang="en-US" dirty="0" smtClean="0">
+                <a:solidFill>
+                  <a:schemeClr val="accent6">
+                    <a:lumMod val="75000"/>
+                  </a:schemeClr>
+                </a:solidFill>
+              </a:rPr>
+              <a:t>play’ </a:t>
+            </a:r>
+            <a:r>
+              <a:rPr lang="en-US" dirty="0" smtClean="0">
+                <a:solidFill>
+                  <a:schemeClr val="accent6">
+                    <a:lumMod val="75000"/>
+                  </a:schemeClr>
+                </a:solidFill>
+              </a:rPr>
+              <a:t>the </a:t>
+            </a:r>
+            <a:r>
+              <a:rPr lang="en-US" dirty="0" smtClean="0">
+                <a:solidFill>
+                  <a:schemeClr val="accent6">
+                    <a:lumMod val="75000"/>
+                  </a:schemeClr>
+                </a:solidFill>
+              </a:rPr>
+              <a:t>slide show (      ), </a:t>
+            </a:r>
+            <a:r>
+              <a:rPr lang="en-US" dirty="0" smtClean="0">
+                <a:solidFill>
+                  <a:schemeClr val="accent6">
+                    <a:lumMod val="75000"/>
+                  </a:schemeClr>
+                </a:solidFill>
+              </a:rPr>
+              <a:t>you should see a single circle animated </a:t>
             </a:r>
             <a:br>
               <a:rPr lang="en-US" dirty="0" smtClean="0">
@@ -5702,6 +5754,63 @@
           </a:p>
         </p:txBody>
       </p:sp>
+      <p:pic>
+        <p:nvPicPr>
+          <p:cNvPr id="10" name="Picture 8"/>
+          <p:cNvPicPr>
+            <a:picLocks noChangeAspect="1" noChangeArrowheads="1"/>
+          </p:cNvPicPr>
+          <p:nvPr/>
+        </p:nvPicPr>
+        <p:blipFill>
+          <a:blip r:embed="rId5">
+            <a:extLst>
+              <a:ext uri="{28A0092B-C50C-407E-A947-70E740481C1C}">
+                <a14:useLocalDpi xmlns:a14="http://schemas.microsoft.com/office/drawing/2010/main" val="0"/>
+              </a:ext>
+            </a:extLst>
+          </a:blip>
+          <a:srcRect/>
+          <a:stretch>
+            <a:fillRect/>
+          </a:stretch>
+        </p:blipFill>
+        <p:spPr bwMode="auto">
+          <a:xfrm>
+            <a:off x="3902864" y="6188078"/>
+            <a:ext cx="304800" cy="286871"/>
+          </a:xfrm>
+          <a:prstGeom prst="rect">
+            <a:avLst/>
+          </a:prstGeom>
+          <a:noFill/>
+          <a:ln>
+            <a:noFill/>
+          </a:ln>
+          <a:effectLst>
+            <a:softEdge rad="31750"/>
+          </a:effectLst>
+          <a:extLst>
+            <a:ext uri="{909E8E84-426E-40DD-AFC4-6F175D3DCCD1}">
+              <a14:hiddenFill xmlns:a14="http://schemas.microsoft.com/office/drawing/2010/main">
+                <a:solidFill>
+                  <a:schemeClr val="accent1"/>
+                </a:solidFill>
+              </a14:hiddenFill>
+            </a:ext>
+            <a:ext uri="{91240B29-F687-4F45-9708-019B960494DF}">
+              <a14:hiddenLine xmlns:a14="http://schemas.microsoft.com/office/drawing/2010/main" w="9525">
+                <a:solidFill>
+                  <a:schemeClr val="tx1"/>
+                </a:solidFill>
+                <a:miter lim="800000"/>
+                <a:headEnd/>
+                <a:tailEnd/>
+              </a14:hiddenLine>
+            </a:ext>
+          </a:extLst>
+        </p:spPr>
+      </p:pic>
     </p:spTree>
     <p:extLst>
       <p:ext uri="{BB962C8B-B14F-4D97-AF65-F5344CB8AC3E}">
@@ -5723,6 +5832,3726 @@
 </file>
 
 <file path=ppt/slides/slide13.xml><?xml version="1.0" encoding="utf-8"?>
+<p:sld xmlns:a="http://schemas.openxmlformats.org/drawingml/2006/main" xmlns:r="http://schemas.openxmlformats.org/officeDocument/2006/relationships" xmlns:p="http://schemas.openxmlformats.org/presentationml/2006/main">
+  <p:cSld>
+    <p:spTree>
+      <p:nvGrpSpPr>
+        <p:cNvPr id="1" name=""/>
+        <p:cNvGrpSpPr/>
+        <p:nvPr/>
+      </p:nvGrpSpPr>
+      <p:grpSpPr>
+        <a:xfrm>
+          <a:off x="0" y="0"/>
+          <a:ext cx="0" cy="0"/>
+          <a:chOff x="0" y="0"/>
+          <a:chExt cx="0" cy="0"/>
+        </a:xfrm>
+      </p:grpSpPr>
+      <p:grpSp>
+        <p:nvGrpSpPr>
+          <p:cNvPr id="11" name="Group 10"/>
+          <p:cNvGrpSpPr/>
+          <p:nvPr/>
+        </p:nvGrpSpPr>
+        <p:grpSpPr>
+          <a:xfrm>
+            <a:off x="1447800" y="3037549"/>
+            <a:ext cx="838200" cy="838200"/>
+            <a:chOff x="4234858" y="1066800"/>
+            <a:chExt cx="838200" cy="838200"/>
+          </a:xfrm>
+        </p:grpSpPr>
+        <p:sp>
+          <p:nvSpPr>
+            <p:cNvPr id="12" name="Rectangle 11"/>
+            <p:cNvSpPr/>
+            <p:nvPr/>
+          </p:nvSpPr>
+          <p:spPr>
+            <a:xfrm>
+              <a:off x="4267863" y="1146235"/>
+              <a:ext cx="596266" cy="454165"/>
+            </a:xfrm>
+            <a:prstGeom prst="rect">
+              <a:avLst/>
+            </a:prstGeom>
+            <a:solidFill>
+              <a:srgbClr val="0070C0"/>
+            </a:solidFill>
+            <a:ln>
+              <a:noFill/>
+            </a:ln>
+          </p:spPr>
+          <p:style>
+            <a:lnRef idx="2">
+              <a:schemeClr val="accent1">
+                <a:shade val="50000"/>
+              </a:schemeClr>
+            </a:lnRef>
+            <a:fillRef idx="1">
+              <a:schemeClr val="accent1"/>
+            </a:fillRef>
+            <a:effectRef idx="0">
+              <a:schemeClr val="accent1"/>
+            </a:effectRef>
+            <a:fontRef idx="minor">
+              <a:schemeClr val="lt1"/>
+            </a:fontRef>
+          </p:style>
+          <p:txBody>
+            <a:bodyPr rtlCol="0" anchor="ctr"/>
+            <a:lstStyle/>
+            <a:p>
+              <a:pPr algn="ctr"/>
+              <a:endParaRPr lang="en-US"/>
+            </a:p>
+          </p:txBody>
+        </p:sp>
+        <p:sp>
+          <p:nvSpPr>
+            <p:cNvPr id="13" name="Rectangle 12"/>
+            <p:cNvSpPr/>
+            <p:nvPr/>
+          </p:nvSpPr>
+          <p:spPr>
+            <a:xfrm>
+              <a:off x="4234858" y="1066800"/>
+              <a:ext cx="838200" cy="838200"/>
+            </a:xfrm>
+            <a:prstGeom prst="rect">
+              <a:avLst/>
+            </a:prstGeom>
+            <a:noFill/>
+            <a:ln>
+              <a:noFill/>
+            </a:ln>
+          </p:spPr>
+          <p:style>
+            <a:lnRef idx="2">
+              <a:schemeClr val="accent1">
+                <a:shade val="50000"/>
+              </a:schemeClr>
+            </a:lnRef>
+            <a:fillRef idx="1">
+              <a:schemeClr val="accent1"/>
+            </a:fillRef>
+            <a:effectRef idx="0">
+              <a:schemeClr val="accent1"/>
+            </a:effectRef>
+            <a:fontRef idx="minor">
+              <a:schemeClr val="lt1"/>
+            </a:fontRef>
+          </p:style>
+          <p:txBody>
+            <a:bodyPr rtlCol="0" anchor="ctr"/>
+            <a:lstStyle/>
+            <a:p>
+              <a:pPr algn="ctr"/>
+              <a:endParaRPr lang="en-SG"/>
+            </a:p>
+          </p:txBody>
+        </p:sp>
+        <p:sp>
+          <p:nvSpPr>
+            <p:cNvPr id="14" name="Freeform 13"/>
+            <p:cNvSpPr/>
+            <p:nvPr/>
+          </p:nvSpPr>
+          <p:spPr>
+            <a:xfrm>
+              <a:off x="4264819" y="1147763"/>
+              <a:ext cx="726281" cy="650081"/>
+            </a:xfrm>
+            <a:custGeom>
+              <a:avLst/>
+              <a:gdLst>
+                <a:gd name="connsiteX0" fmla="*/ 4762 w 692944"/>
+                <a:gd name="connsiteY0" fmla="*/ 452437 h 514350"/>
+                <a:gd name="connsiteX1" fmla="*/ 514350 w 692944"/>
+                <a:gd name="connsiteY1" fmla="*/ 514350 h 514350"/>
+                <a:gd name="connsiteX2" fmla="*/ 692944 w 692944"/>
+                <a:gd name="connsiteY2" fmla="*/ 514350 h 514350"/>
+                <a:gd name="connsiteX3" fmla="*/ 692944 w 692944"/>
+                <a:gd name="connsiteY3" fmla="*/ 402431 h 514350"/>
+                <a:gd name="connsiteX4" fmla="*/ 590550 w 692944"/>
+                <a:gd name="connsiteY4" fmla="*/ 0 h 514350"/>
+                <a:gd name="connsiteX5" fmla="*/ 0 w 692944"/>
+                <a:gd name="connsiteY5" fmla="*/ 0 h 514350"/>
+                <a:gd name="connsiteX6" fmla="*/ 4762 w 692944"/>
+                <a:gd name="connsiteY6" fmla="*/ 452437 h 514350"/>
+                <a:gd name="connsiteX0" fmla="*/ 4762 w 692944"/>
+                <a:gd name="connsiteY0" fmla="*/ 452437 h 514350"/>
+                <a:gd name="connsiteX1" fmla="*/ 514350 w 692944"/>
+                <a:gd name="connsiteY1" fmla="*/ 514350 h 514350"/>
+                <a:gd name="connsiteX2" fmla="*/ 692944 w 692944"/>
+                <a:gd name="connsiteY2" fmla="*/ 514350 h 514350"/>
+                <a:gd name="connsiteX3" fmla="*/ 692944 w 692944"/>
+                <a:gd name="connsiteY3" fmla="*/ 402431 h 514350"/>
+                <a:gd name="connsiteX4" fmla="*/ 600075 w 692944"/>
+                <a:gd name="connsiteY4" fmla="*/ 0 h 514350"/>
+                <a:gd name="connsiteX5" fmla="*/ 0 w 692944"/>
+                <a:gd name="connsiteY5" fmla="*/ 0 h 514350"/>
+                <a:gd name="connsiteX6" fmla="*/ 4762 w 692944"/>
+                <a:gd name="connsiteY6" fmla="*/ 452437 h 514350"/>
+                <a:gd name="connsiteX0" fmla="*/ 4762 w 692944"/>
+                <a:gd name="connsiteY0" fmla="*/ 452437 h 514350"/>
+                <a:gd name="connsiteX1" fmla="*/ 514350 w 692944"/>
+                <a:gd name="connsiteY1" fmla="*/ 514350 h 514350"/>
+                <a:gd name="connsiteX2" fmla="*/ 692944 w 692944"/>
+                <a:gd name="connsiteY2" fmla="*/ 514350 h 514350"/>
+                <a:gd name="connsiteX3" fmla="*/ 688181 w 692944"/>
+                <a:gd name="connsiteY3" fmla="*/ 373856 h 514350"/>
+                <a:gd name="connsiteX4" fmla="*/ 600075 w 692944"/>
+                <a:gd name="connsiteY4" fmla="*/ 0 h 514350"/>
+                <a:gd name="connsiteX5" fmla="*/ 0 w 692944"/>
+                <a:gd name="connsiteY5" fmla="*/ 0 h 514350"/>
+                <a:gd name="connsiteX6" fmla="*/ 4762 w 692944"/>
+                <a:gd name="connsiteY6" fmla="*/ 452437 h 514350"/>
+                <a:gd name="connsiteX0" fmla="*/ 4762 w 692944"/>
+                <a:gd name="connsiteY0" fmla="*/ 452437 h 514350"/>
+                <a:gd name="connsiteX1" fmla="*/ 514350 w 692944"/>
+                <a:gd name="connsiteY1" fmla="*/ 514350 h 514350"/>
+                <a:gd name="connsiteX2" fmla="*/ 692944 w 692944"/>
+                <a:gd name="connsiteY2" fmla="*/ 514350 h 514350"/>
+                <a:gd name="connsiteX3" fmla="*/ 692943 w 692944"/>
+                <a:gd name="connsiteY3" fmla="*/ 385762 h 514350"/>
+                <a:gd name="connsiteX4" fmla="*/ 600075 w 692944"/>
+                <a:gd name="connsiteY4" fmla="*/ 0 h 514350"/>
+                <a:gd name="connsiteX5" fmla="*/ 0 w 692944"/>
+                <a:gd name="connsiteY5" fmla="*/ 0 h 514350"/>
+                <a:gd name="connsiteX6" fmla="*/ 4762 w 692944"/>
+                <a:gd name="connsiteY6" fmla="*/ 452437 h 514350"/>
+                <a:gd name="connsiteX0" fmla="*/ 4762 w 692944"/>
+                <a:gd name="connsiteY0" fmla="*/ 452437 h 514350"/>
+                <a:gd name="connsiteX1" fmla="*/ 514350 w 692944"/>
+                <a:gd name="connsiteY1" fmla="*/ 514350 h 514350"/>
+                <a:gd name="connsiteX2" fmla="*/ 692944 w 692944"/>
+                <a:gd name="connsiteY2" fmla="*/ 514350 h 514350"/>
+                <a:gd name="connsiteX3" fmla="*/ 690561 w 692944"/>
+                <a:gd name="connsiteY3" fmla="*/ 373856 h 514350"/>
+                <a:gd name="connsiteX4" fmla="*/ 600075 w 692944"/>
+                <a:gd name="connsiteY4" fmla="*/ 0 h 514350"/>
+                <a:gd name="connsiteX5" fmla="*/ 0 w 692944"/>
+                <a:gd name="connsiteY5" fmla="*/ 0 h 514350"/>
+                <a:gd name="connsiteX6" fmla="*/ 4762 w 692944"/>
+                <a:gd name="connsiteY6" fmla="*/ 452437 h 514350"/>
+                <a:gd name="connsiteX0" fmla="*/ 4762 w 692944"/>
+                <a:gd name="connsiteY0" fmla="*/ 452437 h 647700"/>
+                <a:gd name="connsiteX1" fmla="*/ 528638 w 692944"/>
+                <a:gd name="connsiteY1" fmla="*/ 647700 h 647700"/>
+                <a:gd name="connsiteX2" fmla="*/ 692944 w 692944"/>
+                <a:gd name="connsiteY2" fmla="*/ 514350 h 647700"/>
+                <a:gd name="connsiteX3" fmla="*/ 690561 w 692944"/>
+                <a:gd name="connsiteY3" fmla="*/ 373856 h 647700"/>
+                <a:gd name="connsiteX4" fmla="*/ 600075 w 692944"/>
+                <a:gd name="connsiteY4" fmla="*/ 0 h 647700"/>
+                <a:gd name="connsiteX5" fmla="*/ 0 w 692944"/>
+                <a:gd name="connsiteY5" fmla="*/ 0 h 647700"/>
+                <a:gd name="connsiteX6" fmla="*/ 4762 w 692944"/>
+                <a:gd name="connsiteY6" fmla="*/ 452437 h 647700"/>
+                <a:gd name="connsiteX0" fmla="*/ 4762 w 726281"/>
+                <a:gd name="connsiteY0" fmla="*/ 452437 h 650081"/>
+                <a:gd name="connsiteX1" fmla="*/ 528638 w 726281"/>
+                <a:gd name="connsiteY1" fmla="*/ 647700 h 650081"/>
+                <a:gd name="connsiteX2" fmla="*/ 726281 w 726281"/>
+                <a:gd name="connsiteY2" fmla="*/ 650081 h 650081"/>
+                <a:gd name="connsiteX3" fmla="*/ 690561 w 726281"/>
+                <a:gd name="connsiteY3" fmla="*/ 373856 h 650081"/>
+                <a:gd name="connsiteX4" fmla="*/ 600075 w 726281"/>
+                <a:gd name="connsiteY4" fmla="*/ 0 h 650081"/>
+                <a:gd name="connsiteX5" fmla="*/ 0 w 726281"/>
+                <a:gd name="connsiteY5" fmla="*/ 0 h 650081"/>
+                <a:gd name="connsiteX6" fmla="*/ 4762 w 726281"/>
+                <a:gd name="connsiteY6" fmla="*/ 452437 h 650081"/>
+                <a:gd name="connsiteX0" fmla="*/ 4762 w 726281"/>
+                <a:gd name="connsiteY0" fmla="*/ 452437 h 650081"/>
+                <a:gd name="connsiteX1" fmla="*/ 528638 w 726281"/>
+                <a:gd name="connsiteY1" fmla="*/ 647700 h 650081"/>
+                <a:gd name="connsiteX2" fmla="*/ 726281 w 726281"/>
+                <a:gd name="connsiteY2" fmla="*/ 650081 h 650081"/>
+                <a:gd name="connsiteX3" fmla="*/ 726280 w 726281"/>
+                <a:gd name="connsiteY3" fmla="*/ 514350 h 650081"/>
+                <a:gd name="connsiteX4" fmla="*/ 600075 w 726281"/>
+                <a:gd name="connsiteY4" fmla="*/ 0 h 650081"/>
+                <a:gd name="connsiteX5" fmla="*/ 0 w 726281"/>
+                <a:gd name="connsiteY5" fmla="*/ 0 h 650081"/>
+                <a:gd name="connsiteX6" fmla="*/ 4762 w 726281"/>
+                <a:gd name="connsiteY6" fmla="*/ 452437 h 650081"/>
+              </a:gdLst>
+              <a:ahLst/>
+              <a:cxnLst>
+                <a:cxn ang="0">
+                  <a:pos x="connsiteX0" y="connsiteY0"/>
+                </a:cxn>
+                <a:cxn ang="0">
+                  <a:pos x="connsiteX1" y="connsiteY1"/>
+                </a:cxn>
+                <a:cxn ang="0">
+                  <a:pos x="connsiteX2" y="connsiteY2"/>
+                </a:cxn>
+                <a:cxn ang="0">
+                  <a:pos x="connsiteX3" y="connsiteY3"/>
+                </a:cxn>
+                <a:cxn ang="0">
+                  <a:pos x="connsiteX4" y="connsiteY4"/>
+                </a:cxn>
+                <a:cxn ang="0">
+                  <a:pos x="connsiteX5" y="connsiteY5"/>
+                </a:cxn>
+                <a:cxn ang="0">
+                  <a:pos x="connsiteX6" y="connsiteY6"/>
+                </a:cxn>
+              </a:cxnLst>
+              <a:rect l="l" t="t" r="r" b="b"/>
+              <a:pathLst>
+                <a:path w="726281" h="650081">
+                  <a:moveTo>
+                    <a:pt x="4762" y="452437"/>
+                  </a:moveTo>
+                  <a:lnTo>
+                    <a:pt x="528638" y="647700"/>
+                  </a:lnTo>
+                  <a:lnTo>
+                    <a:pt x="726281" y="650081"/>
+                  </a:lnTo>
+                  <a:cubicBezTo>
+                    <a:pt x="726281" y="607218"/>
+                    <a:pt x="726280" y="557213"/>
+                    <a:pt x="726280" y="514350"/>
+                  </a:cubicBezTo>
+                  <a:lnTo>
+                    <a:pt x="600075" y="0"/>
+                  </a:lnTo>
+                  <a:lnTo>
+                    <a:pt x="0" y="0"/>
+                  </a:lnTo>
+                  <a:cubicBezTo>
+                    <a:pt x="1587" y="150812"/>
+                    <a:pt x="3175" y="301625"/>
+                    <a:pt x="4762" y="452437"/>
+                  </a:cubicBezTo>
+                  <a:close/>
+                </a:path>
+              </a:pathLst>
+            </a:custGeom>
+            <a:solidFill>
+              <a:srgbClr val="0070C0">
+                <a:alpha val="55000"/>
+              </a:srgbClr>
+            </a:solidFill>
+            <a:ln>
+              <a:noFill/>
+            </a:ln>
+          </p:spPr>
+          <p:style>
+            <a:lnRef idx="2">
+              <a:schemeClr val="accent1">
+                <a:shade val="50000"/>
+              </a:schemeClr>
+            </a:lnRef>
+            <a:fillRef idx="1">
+              <a:schemeClr val="accent1"/>
+            </a:fillRef>
+            <a:effectRef idx="0">
+              <a:schemeClr val="accent1"/>
+            </a:effectRef>
+            <a:fontRef idx="minor">
+              <a:schemeClr val="lt1"/>
+            </a:fontRef>
+          </p:style>
+          <p:txBody>
+            <a:bodyPr rtlCol="0" anchor="ctr"/>
+            <a:lstStyle/>
+            <a:p>
+              <a:pPr algn="ctr"/>
+              <a:endParaRPr lang="en-SG"/>
+            </a:p>
+          </p:txBody>
+        </p:sp>
+        <p:sp>
+          <p:nvSpPr>
+            <p:cNvPr id="15" name="Rectangle 14"/>
+            <p:cNvSpPr/>
+            <p:nvPr/>
+          </p:nvSpPr>
+          <p:spPr>
+            <a:xfrm>
+              <a:off x="4472205" y="1449017"/>
+              <a:ext cx="569723" cy="409283"/>
+            </a:xfrm>
+            <a:prstGeom prst="rect">
+              <a:avLst/>
+            </a:prstGeom>
+            <a:solidFill>
+              <a:schemeClr val="accent6">
+                <a:lumMod val="75000"/>
+                <a:alpha val="65000"/>
+              </a:schemeClr>
+            </a:solidFill>
+            <a:ln>
+              <a:solidFill>
+                <a:schemeClr val="bg1"/>
+              </a:solidFill>
+              <a:miter lim="800000"/>
+            </a:ln>
+          </p:spPr>
+          <p:style>
+            <a:lnRef idx="2">
+              <a:schemeClr val="accent1">
+                <a:shade val="50000"/>
+              </a:schemeClr>
+            </a:lnRef>
+            <a:fillRef idx="1">
+              <a:schemeClr val="accent1"/>
+            </a:fillRef>
+            <a:effectRef idx="0">
+              <a:schemeClr val="accent1"/>
+            </a:effectRef>
+            <a:fontRef idx="minor">
+              <a:schemeClr val="lt1"/>
+            </a:fontRef>
+          </p:style>
+          <p:txBody>
+            <a:bodyPr rtlCol="0" anchor="ctr"/>
+            <a:lstStyle/>
+            <a:p>
+              <a:pPr algn="ctr"/>
+              <a:endParaRPr lang="en-US"/>
+            </a:p>
+          </p:txBody>
+        </p:sp>
+        <p:sp>
+          <p:nvSpPr>
+            <p:cNvPr id="16" name="Rectangle 15"/>
+            <p:cNvSpPr/>
+            <p:nvPr/>
+          </p:nvSpPr>
+          <p:spPr>
+            <a:xfrm>
+              <a:off x="4798389" y="1665566"/>
+              <a:ext cx="181322" cy="117043"/>
+            </a:xfrm>
+            <a:prstGeom prst="rect">
+              <a:avLst/>
+            </a:prstGeom>
+            <a:solidFill>
+              <a:srgbClr val="0070C0"/>
+            </a:solidFill>
+            <a:ln>
+              <a:solidFill>
+                <a:schemeClr val="bg1"/>
+              </a:solidFill>
+              <a:miter lim="800000"/>
+            </a:ln>
+          </p:spPr>
+          <p:style>
+            <a:lnRef idx="2">
+              <a:schemeClr val="accent1">
+                <a:shade val="50000"/>
+              </a:schemeClr>
+            </a:lnRef>
+            <a:fillRef idx="1">
+              <a:schemeClr val="accent1"/>
+            </a:fillRef>
+            <a:effectRef idx="0">
+              <a:schemeClr val="accent1"/>
+            </a:effectRef>
+            <a:fontRef idx="minor">
+              <a:schemeClr val="lt1"/>
+            </a:fontRef>
+          </p:style>
+          <p:txBody>
+            <a:bodyPr rtlCol="0" anchor="ctr"/>
+            <a:lstStyle/>
+            <a:p>
+              <a:pPr algn="ctr"/>
+              <a:endParaRPr lang="en-US"/>
+            </a:p>
+          </p:txBody>
+        </p:sp>
+      </p:grpSp>
+      <p:grpSp>
+        <p:nvGrpSpPr>
+          <p:cNvPr id="17" name="Group 16"/>
+          <p:cNvGrpSpPr/>
+          <p:nvPr/>
+        </p:nvGrpSpPr>
+        <p:grpSpPr>
+          <a:xfrm>
+            <a:off x="2362200" y="3036283"/>
+            <a:ext cx="838200" cy="838200"/>
+            <a:chOff x="4238346" y="2360100"/>
+            <a:chExt cx="838200" cy="838200"/>
+          </a:xfrm>
+        </p:grpSpPr>
+        <p:sp>
+          <p:nvSpPr>
+            <p:cNvPr id="26" name="Rectangle 25"/>
+            <p:cNvSpPr/>
+            <p:nvPr/>
+          </p:nvSpPr>
+          <p:spPr>
+            <a:xfrm>
+              <a:off x="4271351" y="2439535"/>
+              <a:ext cx="596266" cy="454165"/>
+            </a:xfrm>
+            <a:prstGeom prst="rect">
+              <a:avLst/>
+            </a:prstGeom>
+            <a:solidFill>
+              <a:schemeClr val="accent6">
+                <a:lumMod val="75000"/>
+                <a:alpha val="65000"/>
+              </a:schemeClr>
+            </a:solidFill>
+            <a:ln>
+              <a:noFill/>
+            </a:ln>
+          </p:spPr>
+          <p:style>
+            <a:lnRef idx="2">
+              <a:schemeClr val="accent1">
+                <a:shade val="50000"/>
+              </a:schemeClr>
+            </a:lnRef>
+            <a:fillRef idx="1">
+              <a:schemeClr val="accent1"/>
+            </a:fillRef>
+            <a:effectRef idx="0">
+              <a:schemeClr val="accent1"/>
+            </a:effectRef>
+            <a:fontRef idx="minor">
+              <a:schemeClr val="lt1"/>
+            </a:fontRef>
+          </p:style>
+          <p:txBody>
+            <a:bodyPr rtlCol="0" anchor="ctr"/>
+            <a:lstStyle/>
+            <a:p>
+              <a:pPr algn="ctr"/>
+              <a:endParaRPr lang="en-US"/>
+            </a:p>
+          </p:txBody>
+        </p:sp>
+        <p:sp>
+          <p:nvSpPr>
+            <p:cNvPr id="27" name="Rectangle 26"/>
+            <p:cNvSpPr/>
+            <p:nvPr/>
+          </p:nvSpPr>
+          <p:spPr>
+            <a:xfrm>
+              <a:off x="4324458" y="2496685"/>
+              <a:ext cx="181322" cy="117043"/>
+            </a:xfrm>
+            <a:prstGeom prst="rect">
+              <a:avLst/>
+            </a:prstGeom>
+            <a:solidFill>
+              <a:srgbClr val="0070C0"/>
+            </a:solidFill>
+            <a:ln>
+              <a:solidFill>
+                <a:schemeClr val="bg1"/>
+              </a:solidFill>
+              <a:miter lim="800000"/>
+            </a:ln>
+          </p:spPr>
+          <p:style>
+            <a:lnRef idx="2">
+              <a:schemeClr val="accent1">
+                <a:shade val="50000"/>
+              </a:schemeClr>
+            </a:lnRef>
+            <a:fillRef idx="1">
+              <a:schemeClr val="accent1"/>
+            </a:fillRef>
+            <a:effectRef idx="0">
+              <a:schemeClr val="accent1"/>
+            </a:effectRef>
+            <a:fontRef idx="minor">
+              <a:schemeClr val="lt1"/>
+            </a:fontRef>
+          </p:style>
+          <p:txBody>
+            <a:bodyPr rtlCol="0" anchor="ctr"/>
+            <a:lstStyle/>
+            <a:p>
+              <a:pPr algn="ctr"/>
+              <a:endParaRPr lang="en-US"/>
+            </a:p>
+          </p:txBody>
+        </p:sp>
+        <p:sp>
+          <p:nvSpPr>
+            <p:cNvPr id="28" name="Freeform 27"/>
+            <p:cNvSpPr/>
+            <p:nvPr/>
+          </p:nvSpPr>
+          <p:spPr>
+            <a:xfrm>
+              <a:off x="4338644" y="2510753"/>
+              <a:ext cx="693452" cy="652320"/>
+            </a:xfrm>
+            <a:custGeom>
+              <a:avLst/>
+              <a:gdLst>
+                <a:gd name="connsiteX0" fmla="*/ 4763 w 1209675"/>
+                <a:gd name="connsiteY0" fmla="*/ 119063 h 838200"/>
+                <a:gd name="connsiteX1" fmla="*/ 171450 w 1209675"/>
+                <a:gd name="connsiteY1" fmla="*/ 838200 h 838200"/>
+                <a:gd name="connsiteX2" fmla="*/ 1209675 w 1209675"/>
+                <a:gd name="connsiteY2" fmla="*/ 838200 h 838200"/>
+                <a:gd name="connsiteX3" fmla="*/ 1209675 w 1209675"/>
+                <a:gd name="connsiteY3" fmla="*/ 247650 h 838200"/>
+                <a:gd name="connsiteX4" fmla="*/ 238125 w 1209675"/>
+                <a:gd name="connsiteY4" fmla="*/ 0 h 838200"/>
+                <a:gd name="connsiteX5" fmla="*/ 0 w 1209675"/>
+                <a:gd name="connsiteY5" fmla="*/ 0 h 838200"/>
+                <a:gd name="connsiteX6" fmla="*/ 4763 w 1209675"/>
+                <a:gd name="connsiteY6" fmla="*/ 119063 h 838200"/>
+                <a:gd name="connsiteX0" fmla="*/ 4763 w 1209675"/>
+                <a:gd name="connsiteY0" fmla="*/ 119063 h 838200"/>
+                <a:gd name="connsiteX1" fmla="*/ 224786 w 1209675"/>
+                <a:gd name="connsiteY1" fmla="*/ 838200 h 838200"/>
+                <a:gd name="connsiteX2" fmla="*/ 1209675 w 1209675"/>
+                <a:gd name="connsiteY2" fmla="*/ 838200 h 838200"/>
+                <a:gd name="connsiteX3" fmla="*/ 1209675 w 1209675"/>
+                <a:gd name="connsiteY3" fmla="*/ 247650 h 838200"/>
+                <a:gd name="connsiteX4" fmla="*/ 238125 w 1209675"/>
+                <a:gd name="connsiteY4" fmla="*/ 0 h 838200"/>
+                <a:gd name="connsiteX5" fmla="*/ 0 w 1209675"/>
+                <a:gd name="connsiteY5" fmla="*/ 0 h 838200"/>
+                <a:gd name="connsiteX6" fmla="*/ 4763 w 1209675"/>
+                <a:gd name="connsiteY6" fmla="*/ 119063 h 838200"/>
+                <a:gd name="connsiteX0" fmla="*/ 4763 w 1209675"/>
+                <a:gd name="connsiteY0" fmla="*/ 119063 h 838200"/>
+                <a:gd name="connsiteX1" fmla="*/ 224786 w 1209675"/>
+                <a:gd name="connsiteY1" fmla="*/ 822358 h 838200"/>
+                <a:gd name="connsiteX2" fmla="*/ 1209675 w 1209675"/>
+                <a:gd name="connsiteY2" fmla="*/ 838200 h 838200"/>
+                <a:gd name="connsiteX3" fmla="*/ 1209675 w 1209675"/>
+                <a:gd name="connsiteY3" fmla="*/ 247650 h 838200"/>
+                <a:gd name="connsiteX4" fmla="*/ 238125 w 1209675"/>
+                <a:gd name="connsiteY4" fmla="*/ 0 h 838200"/>
+                <a:gd name="connsiteX5" fmla="*/ 0 w 1209675"/>
+                <a:gd name="connsiteY5" fmla="*/ 0 h 838200"/>
+                <a:gd name="connsiteX6" fmla="*/ 4763 w 1209675"/>
+                <a:gd name="connsiteY6" fmla="*/ 119063 h 838200"/>
+                <a:gd name="connsiteX0" fmla="*/ 4763 w 1209675"/>
+                <a:gd name="connsiteY0" fmla="*/ 119063 h 838200"/>
+                <a:gd name="connsiteX1" fmla="*/ 224786 w 1209675"/>
+                <a:gd name="connsiteY1" fmla="*/ 822358 h 838200"/>
+                <a:gd name="connsiteX2" fmla="*/ 1209675 w 1209675"/>
+                <a:gd name="connsiteY2" fmla="*/ 838200 h 838200"/>
+                <a:gd name="connsiteX3" fmla="*/ 1188340 w 1209675"/>
+                <a:gd name="connsiteY3" fmla="*/ 247650 h 838200"/>
+                <a:gd name="connsiteX4" fmla="*/ 238125 w 1209675"/>
+                <a:gd name="connsiteY4" fmla="*/ 0 h 838200"/>
+                <a:gd name="connsiteX5" fmla="*/ 0 w 1209675"/>
+                <a:gd name="connsiteY5" fmla="*/ 0 h 838200"/>
+                <a:gd name="connsiteX6" fmla="*/ 4763 w 1209675"/>
+                <a:gd name="connsiteY6" fmla="*/ 119063 h 838200"/>
+                <a:gd name="connsiteX0" fmla="*/ 4763 w 1188340"/>
+                <a:gd name="connsiteY0" fmla="*/ 119063 h 822358"/>
+                <a:gd name="connsiteX1" fmla="*/ 224786 w 1188340"/>
+                <a:gd name="connsiteY1" fmla="*/ 822358 h 822358"/>
+                <a:gd name="connsiteX2" fmla="*/ 1183007 w 1188340"/>
+                <a:gd name="connsiteY2" fmla="*/ 818397 h 822358"/>
+                <a:gd name="connsiteX3" fmla="*/ 1188340 w 1188340"/>
+                <a:gd name="connsiteY3" fmla="*/ 247650 h 822358"/>
+                <a:gd name="connsiteX4" fmla="*/ 238125 w 1188340"/>
+                <a:gd name="connsiteY4" fmla="*/ 0 h 822358"/>
+                <a:gd name="connsiteX5" fmla="*/ 0 w 1188340"/>
+                <a:gd name="connsiteY5" fmla="*/ 0 h 822358"/>
+                <a:gd name="connsiteX6" fmla="*/ 4763 w 1188340"/>
+                <a:gd name="connsiteY6" fmla="*/ 119063 h 822358"/>
+                <a:gd name="connsiteX0" fmla="*/ 4763 w 1188340"/>
+                <a:gd name="connsiteY0" fmla="*/ 119063 h 822358"/>
+                <a:gd name="connsiteX1" fmla="*/ 224786 w 1188340"/>
+                <a:gd name="connsiteY1" fmla="*/ 822358 h 822358"/>
+                <a:gd name="connsiteX2" fmla="*/ 1183007 w 1188340"/>
+                <a:gd name="connsiteY2" fmla="*/ 818397 h 822358"/>
+                <a:gd name="connsiteX3" fmla="*/ 1188340 w 1188340"/>
+                <a:gd name="connsiteY3" fmla="*/ 283674 h 822358"/>
+                <a:gd name="connsiteX4" fmla="*/ 238125 w 1188340"/>
+                <a:gd name="connsiteY4" fmla="*/ 0 h 822358"/>
+                <a:gd name="connsiteX5" fmla="*/ 0 w 1188340"/>
+                <a:gd name="connsiteY5" fmla="*/ 0 h 822358"/>
+                <a:gd name="connsiteX6" fmla="*/ 4763 w 1188340"/>
+                <a:gd name="connsiteY6" fmla="*/ 119063 h 822358"/>
+              </a:gdLst>
+              <a:ahLst/>
+              <a:cxnLst>
+                <a:cxn ang="0">
+                  <a:pos x="connsiteX0" y="connsiteY0"/>
+                </a:cxn>
+                <a:cxn ang="0">
+                  <a:pos x="connsiteX1" y="connsiteY1"/>
+                </a:cxn>
+                <a:cxn ang="0">
+                  <a:pos x="connsiteX2" y="connsiteY2"/>
+                </a:cxn>
+                <a:cxn ang="0">
+                  <a:pos x="connsiteX3" y="connsiteY3"/>
+                </a:cxn>
+                <a:cxn ang="0">
+                  <a:pos x="connsiteX4" y="connsiteY4"/>
+                </a:cxn>
+                <a:cxn ang="0">
+                  <a:pos x="connsiteX5" y="connsiteY5"/>
+                </a:cxn>
+                <a:cxn ang="0">
+                  <a:pos x="connsiteX6" y="connsiteY6"/>
+                </a:cxn>
+              </a:cxnLst>
+              <a:rect l="l" t="t" r="r" b="b"/>
+              <a:pathLst>
+                <a:path w="1188340" h="822358">
+                  <a:moveTo>
+                    <a:pt x="4763" y="119063"/>
+                  </a:moveTo>
+                  <a:lnTo>
+                    <a:pt x="224786" y="822358"/>
+                  </a:lnTo>
+                  <a:lnTo>
+                    <a:pt x="1183007" y="818397"/>
+                  </a:lnTo>
+                  <a:cubicBezTo>
+                    <a:pt x="1184785" y="628148"/>
+                    <a:pt x="1186562" y="473923"/>
+                    <a:pt x="1188340" y="283674"/>
+                  </a:cubicBezTo>
+                  <a:lnTo>
+                    <a:pt x="238125" y="0"/>
+                  </a:lnTo>
+                  <a:lnTo>
+                    <a:pt x="0" y="0"/>
+                  </a:lnTo>
+                  <a:lnTo>
+                    <a:pt x="4763" y="119063"/>
+                  </a:lnTo>
+                  <a:close/>
+                </a:path>
+              </a:pathLst>
+            </a:custGeom>
+            <a:solidFill>
+              <a:srgbClr val="0070C0">
+                <a:alpha val="55000"/>
+              </a:srgbClr>
+            </a:solidFill>
+            <a:ln>
+              <a:noFill/>
+            </a:ln>
+          </p:spPr>
+          <p:style>
+            <a:lnRef idx="2">
+              <a:schemeClr val="accent1">
+                <a:shade val="50000"/>
+              </a:schemeClr>
+            </a:lnRef>
+            <a:fillRef idx="1">
+              <a:schemeClr val="accent1"/>
+            </a:fillRef>
+            <a:effectRef idx="0">
+              <a:schemeClr val="accent1"/>
+            </a:effectRef>
+            <a:fontRef idx="minor">
+              <a:schemeClr val="lt1"/>
+            </a:fontRef>
+          </p:style>
+          <p:txBody>
+            <a:bodyPr rtlCol="0" anchor="ctr"/>
+            <a:lstStyle/>
+            <a:p>
+              <a:pPr algn="ctr"/>
+              <a:endParaRPr lang="en-US"/>
+            </a:p>
+          </p:txBody>
+        </p:sp>
+        <p:sp>
+          <p:nvSpPr>
+            <p:cNvPr id="29" name="Rectangle 28"/>
+            <p:cNvSpPr/>
+            <p:nvPr/>
+          </p:nvSpPr>
+          <p:spPr>
+            <a:xfrm>
+              <a:off x="4238346" y="2360100"/>
+              <a:ext cx="838200" cy="838200"/>
+            </a:xfrm>
+            <a:prstGeom prst="rect">
+              <a:avLst/>
+            </a:prstGeom>
+            <a:noFill/>
+            <a:ln>
+              <a:noFill/>
+            </a:ln>
+          </p:spPr>
+          <p:style>
+            <a:lnRef idx="2">
+              <a:schemeClr val="accent1">
+                <a:shade val="50000"/>
+              </a:schemeClr>
+            </a:lnRef>
+            <a:fillRef idx="1">
+              <a:schemeClr val="accent1"/>
+            </a:fillRef>
+            <a:effectRef idx="0">
+              <a:schemeClr val="accent1"/>
+            </a:effectRef>
+            <a:fontRef idx="minor">
+              <a:schemeClr val="lt1"/>
+            </a:fontRef>
+          </p:style>
+          <p:txBody>
+            <a:bodyPr rtlCol="0" anchor="ctr"/>
+            <a:lstStyle/>
+            <a:p>
+              <a:pPr algn="ctr"/>
+              <a:endParaRPr lang="en-SG"/>
+            </a:p>
+          </p:txBody>
+        </p:sp>
+        <p:sp>
+          <p:nvSpPr>
+            <p:cNvPr id="30" name="Rectangle 29"/>
+            <p:cNvSpPr/>
+            <p:nvPr/>
+          </p:nvSpPr>
+          <p:spPr>
+            <a:xfrm>
+              <a:off x="4475693" y="2742317"/>
+              <a:ext cx="569723" cy="409283"/>
+            </a:xfrm>
+            <a:prstGeom prst="rect">
+              <a:avLst/>
+            </a:prstGeom>
+            <a:solidFill>
+              <a:srgbClr val="00589A">
+                <a:alpha val="60784"/>
+              </a:srgbClr>
+            </a:solidFill>
+            <a:ln>
+              <a:solidFill>
+                <a:schemeClr val="bg1"/>
+              </a:solidFill>
+              <a:miter lim="800000"/>
+            </a:ln>
+          </p:spPr>
+          <p:style>
+            <a:lnRef idx="2">
+              <a:schemeClr val="accent1">
+                <a:shade val="50000"/>
+              </a:schemeClr>
+            </a:lnRef>
+            <a:fillRef idx="1">
+              <a:schemeClr val="accent1"/>
+            </a:fillRef>
+            <a:effectRef idx="0">
+              <a:schemeClr val="accent1"/>
+            </a:effectRef>
+            <a:fontRef idx="minor">
+              <a:schemeClr val="lt1"/>
+            </a:fontRef>
+          </p:style>
+          <p:txBody>
+            <a:bodyPr rtlCol="0" anchor="ctr"/>
+            <a:lstStyle/>
+            <a:p>
+              <a:pPr algn="ctr"/>
+              <a:endParaRPr lang="en-US"/>
+            </a:p>
+          </p:txBody>
+        </p:sp>
+      </p:grpSp>
+      <p:sp>
+        <p:nvSpPr>
+          <p:cNvPr id="31" name="TextBox 30"/>
+          <p:cNvSpPr txBox="1"/>
+          <p:nvPr/>
+        </p:nvSpPr>
+        <p:spPr>
+          <a:xfrm>
+            <a:off x="3429000" y="2971800"/>
+            <a:ext cx="4648200" cy="923330"/>
+          </a:xfrm>
+          <a:prstGeom prst="rect">
+            <a:avLst/>
+          </a:prstGeom>
+          <a:noFill/>
+        </p:spPr>
+        <p:txBody>
+          <a:bodyPr wrap="square" rtlCol="0">
+            <a:spAutoFit/>
+          </a:bodyPr>
+          <a:lstStyle/>
+          <a:p>
+            <a:r>
+              <a:rPr lang="en-US" b="1" dirty="0" smtClean="0">
+                <a:solidFill>
+                  <a:schemeClr val="accent6">
+                    <a:lumMod val="75000"/>
+                  </a:schemeClr>
+                </a:solidFill>
+              </a:rPr>
+              <a:t>Auto zoom </a:t>
+            </a:r>
+            <a:r>
+              <a:rPr lang="en-US" dirty="0" smtClean="0">
+                <a:solidFill>
+                  <a:schemeClr val="accent6">
+                    <a:lumMod val="75000"/>
+                  </a:schemeClr>
+                </a:solidFill>
+              </a:rPr>
+              <a:t>features can be used to show how the content of one slide is related to the previous/next slide. Let’s give them a try now.</a:t>
+            </a:r>
+            <a:endParaRPr lang="en-SG" dirty="0">
+              <a:solidFill>
+                <a:schemeClr val="accent6">
+                  <a:lumMod val="75000"/>
+                </a:schemeClr>
+              </a:solidFill>
+            </a:endParaRPr>
+          </a:p>
+        </p:txBody>
+      </p:sp>
+    </p:spTree>
+    <p:extLst>
+      <p:ext uri="{BB962C8B-B14F-4D97-AF65-F5344CB8AC3E}">
+        <p14:creationId xmlns:p14="http://schemas.microsoft.com/office/powerpoint/2010/main" val="3755739635"/>
+      </p:ext>
+    </p:extLst>
+  </p:cSld>
+  <p:clrMapOvr>
+    <a:masterClrMapping/>
+  </p:clrMapOvr>
+  <p:timing>
+    <p:tnLst>
+      <p:par>
+        <p:cTn id="1" dur="indefinite" restart="never" nodeType="tmRoot"/>
+      </p:par>
+    </p:tnLst>
+  </p:timing>
+</p:sld>
+</file>
+
+<file path=ppt/slides/slide14.xml><?xml version="1.0" encoding="utf-8"?>
+<p:sld xmlns:a="http://schemas.openxmlformats.org/drawingml/2006/main" xmlns:r="http://schemas.openxmlformats.org/officeDocument/2006/relationships" xmlns:p="http://schemas.openxmlformats.org/presentationml/2006/main">
+  <p:cSld>
+    <p:spTree>
+      <p:nvGrpSpPr>
+        <p:cNvPr id="1" name=""/>
+        <p:cNvGrpSpPr/>
+        <p:nvPr/>
+      </p:nvGrpSpPr>
+      <p:grpSpPr>
+        <a:xfrm>
+          <a:off x="0" y="0"/>
+          <a:ext cx="0" cy="0"/>
+          <a:chOff x="0" y="0"/>
+          <a:chExt cx="0" cy="0"/>
+        </a:xfrm>
+      </p:grpSpPr>
+      <p:sp>
+        <p:nvSpPr>
+          <p:cNvPr id="20" name="Rectangle 19"/>
+          <p:cNvSpPr>
+            <a:spLocks noChangeAspect="1"/>
+          </p:cNvSpPr>
+          <p:nvPr/>
+        </p:nvSpPr>
+        <p:spPr>
+          <a:xfrm>
+            <a:off x="5702038" y="2028431"/>
+            <a:ext cx="3302525" cy="1940796"/>
+          </a:xfrm>
+          <a:prstGeom prst="rect">
+            <a:avLst/>
+          </a:prstGeom>
+          <a:solidFill>
+            <a:schemeClr val="accent4">
+              <a:lumMod val="20000"/>
+              <a:lumOff val="80000"/>
+            </a:schemeClr>
+          </a:solidFill>
+          <a:ln w="57150">
+            <a:solidFill>
+              <a:schemeClr val="bg1"/>
+            </a:solidFill>
+          </a:ln>
+        </p:spPr>
+        <p:style>
+          <a:lnRef idx="2">
+            <a:schemeClr val="accent1">
+              <a:shade val="50000"/>
+            </a:schemeClr>
+          </a:lnRef>
+          <a:fillRef idx="1">
+            <a:schemeClr val="accent1"/>
+          </a:fillRef>
+          <a:effectRef idx="0">
+            <a:schemeClr val="accent1"/>
+          </a:effectRef>
+          <a:fontRef idx="minor">
+            <a:schemeClr val="lt1"/>
+          </a:fontRef>
+        </p:style>
+        <p:txBody>
+          <a:bodyPr rtlCol="0" anchor="ctr"/>
+          <a:lstStyle/>
+          <a:p>
+            <a:pPr algn="ctr"/>
+            <a:endParaRPr lang="en-SG"/>
+          </a:p>
+        </p:txBody>
+      </p:sp>
+      <p:sp>
+        <p:nvSpPr>
+          <p:cNvPr id="28" name="Pentagon 27"/>
+          <p:cNvSpPr>
+            <a:spLocks noChangeAspect="1"/>
+          </p:cNvSpPr>
+          <p:nvPr/>
+        </p:nvSpPr>
+        <p:spPr>
+          <a:xfrm>
+            <a:off x="2562615" y="2028431"/>
+            <a:ext cx="3866370" cy="1940796"/>
+          </a:xfrm>
+          <a:prstGeom prst="homePlate">
+            <a:avLst>
+              <a:gd name="adj" fmla="val 24128"/>
+            </a:avLst>
+          </a:prstGeom>
+          <a:solidFill>
+            <a:schemeClr val="accent1">
+              <a:lumMod val="20000"/>
+              <a:lumOff val="80000"/>
+            </a:schemeClr>
+          </a:solidFill>
+          <a:ln w="57150">
+            <a:solidFill>
+              <a:schemeClr val="bg1"/>
+            </a:solidFill>
+          </a:ln>
+        </p:spPr>
+        <p:style>
+          <a:lnRef idx="2">
+            <a:schemeClr val="accent1">
+              <a:shade val="50000"/>
+            </a:schemeClr>
+          </a:lnRef>
+          <a:fillRef idx="1">
+            <a:schemeClr val="accent1"/>
+          </a:fillRef>
+          <a:effectRef idx="0">
+            <a:schemeClr val="accent1"/>
+          </a:effectRef>
+          <a:fontRef idx="minor">
+            <a:schemeClr val="lt1"/>
+          </a:fontRef>
+        </p:style>
+        <p:txBody>
+          <a:bodyPr rtlCol="0" anchor="ctr"/>
+          <a:lstStyle/>
+          <a:p>
+            <a:pPr algn="ctr"/>
+            <a:endParaRPr lang="en-SG"/>
+          </a:p>
+        </p:txBody>
+      </p:sp>
+      <p:sp>
+        <p:nvSpPr>
+          <p:cNvPr id="4" name="Pentagon 3"/>
+          <p:cNvSpPr>
+            <a:spLocks noChangeAspect="1"/>
+          </p:cNvSpPr>
+          <p:nvPr/>
+        </p:nvSpPr>
+        <p:spPr>
+          <a:xfrm>
+            <a:off x="65413" y="2028431"/>
+            <a:ext cx="3221975" cy="1940796"/>
+          </a:xfrm>
+          <a:prstGeom prst="homePlate">
+            <a:avLst>
+              <a:gd name="adj" fmla="val 24128"/>
+            </a:avLst>
+          </a:prstGeom>
+          <a:solidFill>
+            <a:schemeClr val="accent3">
+              <a:lumMod val="20000"/>
+              <a:lumOff val="80000"/>
+            </a:schemeClr>
+          </a:solidFill>
+          <a:ln w="57150">
+            <a:solidFill>
+              <a:schemeClr val="bg1"/>
+            </a:solidFill>
+          </a:ln>
+        </p:spPr>
+        <p:style>
+          <a:lnRef idx="2">
+            <a:schemeClr val="accent1">
+              <a:shade val="50000"/>
+            </a:schemeClr>
+          </a:lnRef>
+          <a:fillRef idx="1">
+            <a:schemeClr val="accent1"/>
+          </a:fillRef>
+          <a:effectRef idx="0">
+            <a:schemeClr val="accent1"/>
+          </a:effectRef>
+          <a:fontRef idx="minor">
+            <a:schemeClr val="lt1"/>
+          </a:fontRef>
+        </p:style>
+        <p:txBody>
+          <a:bodyPr rtlCol="0" anchor="ctr"/>
+          <a:lstStyle/>
+          <a:p>
+            <a:pPr algn="ctr"/>
+            <a:endParaRPr lang="en-SG"/>
+          </a:p>
+        </p:txBody>
+      </p:sp>
+      <p:sp>
+        <p:nvSpPr>
+          <p:cNvPr id="5" name="Rounded Rectangle 4"/>
+          <p:cNvSpPr/>
+          <p:nvPr/>
+        </p:nvSpPr>
+        <p:spPr>
+          <a:xfrm>
+            <a:off x="233550" y="2209800"/>
+            <a:ext cx="2281050" cy="990600"/>
+          </a:xfrm>
+          <a:prstGeom prst="roundRect">
+            <a:avLst/>
+          </a:prstGeom>
+          <a:blipFill>
+            <a:blip r:embed="rId2">
+              <a:extLst>
+                <a:ext uri="{BEBA8EAE-BF5A-486C-A8C5-ECC9F3942E4B}">
+                  <a14:imgProps xmlns:a14="http://schemas.microsoft.com/office/drawing/2010/main">
+                    <a14:imgLayer r:embed="rId3">
+                      <a14:imgEffect>
+                        <a14:saturation sat="0"/>
+                      </a14:imgEffect>
+                      <a14:imgEffect>
+                        <a14:brightnessContrast bright="20000" contrast="-20000"/>
+                      </a14:imgEffect>
+                    </a14:imgLayer>
+                  </a14:imgProps>
+                </a:ext>
+              </a:extLst>
+            </a:blip>
+            <a:tile tx="0" ty="0" sx="100000" sy="100000" flip="none" algn="tl"/>
+          </a:blipFill>
+          <a:ln>
+            <a:solidFill>
+              <a:schemeClr val="bg1">
+                <a:lumMod val="85000"/>
+              </a:schemeClr>
+            </a:solidFill>
+          </a:ln>
+          <a:effectLst>
+            <a:innerShdw blurRad="114300">
+              <a:prstClr val="black"/>
+            </a:innerShdw>
+          </a:effectLst>
+        </p:spPr>
+        <p:style>
+          <a:lnRef idx="2">
+            <a:schemeClr val="accent1">
+              <a:shade val="50000"/>
+            </a:schemeClr>
+          </a:lnRef>
+          <a:fillRef idx="1">
+            <a:schemeClr val="accent1"/>
+          </a:fillRef>
+          <a:effectRef idx="0">
+            <a:schemeClr val="accent1"/>
+          </a:effectRef>
+          <a:fontRef idx="minor">
+            <a:schemeClr val="lt1"/>
+          </a:fontRef>
+        </p:style>
+        <p:txBody>
+          <a:bodyPr rtlCol="0" anchor="ctr"/>
+          <a:lstStyle/>
+          <a:p>
+            <a:pPr algn="ctr"/>
+            <a:r>
+              <a:rPr lang="en-US" sz="2000" b="1" dirty="0" smtClean="0">
+                <a:solidFill>
+                  <a:schemeClr val="tx1">
+                    <a:lumMod val="50000"/>
+                    <a:lumOff val="50000"/>
+                  </a:schemeClr>
+                </a:solidFill>
+              </a:rPr>
+              <a:t>Ingredient A (60%)</a:t>
+            </a:r>
+            <a:endParaRPr lang="en-SG" sz="2000" b="1" dirty="0">
+              <a:solidFill>
+                <a:schemeClr val="tx1">
+                  <a:lumMod val="50000"/>
+                  <a:lumOff val="50000"/>
+                </a:schemeClr>
+              </a:solidFill>
+            </a:endParaRPr>
+          </a:p>
+        </p:txBody>
+      </p:sp>
+      <p:sp>
+        <p:nvSpPr>
+          <p:cNvPr id="6" name="TextBox 5"/>
+          <p:cNvSpPr txBox="1"/>
+          <p:nvPr/>
+        </p:nvSpPr>
+        <p:spPr>
+          <a:xfrm>
+            <a:off x="685800" y="1676400"/>
+            <a:ext cx="1600200" cy="381000"/>
+          </a:xfrm>
+          <a:prstGeom prst="rect">
+            <a:avLst/>
+          </a:prstGeom>
+          <a:noFill/>
+        </p:spPr>
+        <p:txBody>
+          <a:bodyPr wrap="square" rtlCol="0">
+            <a:spAutoFit/>
+          </a:bodyPr>
+          <a:lstStyle/>
+          <a:p>
+            <a:pPr algn="ctr"/>
+            <a:r>
+              <a:rPr lang="en-US" b="1" dirty="0" smtClean="0">
+                <a:solidFill>
+                  <a:schemeClr val="bg1">
+                    <a:lumMod val="65000"/>
+                  </a:schemeClr>
+                </a:solidFill>
+              </a:rPr>
+              <a:t>Inputs</a:t>
+            </a:r>
+            <a:endParaRPr lang="en-SG" b="1" dirty="0">
+              <a:solidFill>
+                <a:schemeClr val="bg1">
+                  <a:lumMod val="65000"/>
+                </a:schemeClr>
+              </a:solidFill>
+            </a:endParaRPr>
+          </a:p>
+        </p:txBody>
+      </p:sp>
+      <p:sp>
+        <p:nvSpPr>
+          <p:cNvPr id="7" name="Rounded Rectangle 6"/>
+          <p:cNvSpPr/>
+          <p:nvPr/>
+        </p:nvSpPr>
+        <p:spPr>
+          <a:xfrm>
+            <a:off x="233550" y="3269354"/>
+            <a:ext cx="1384420" cy="588100"/>
+          </a:xfrm>
+          <a:prstGeom prst="roundRect">
+            <a:avLst/>
+          </a:prstGeom>
+          <a:blipFill>
+            <a:blip r:embed="rId4">
+              <a:extLst>
+                <a:ext uri="{BEBA8EAE-BF5A-486C-A8C5-ECC9F3942E4B}">
+                  <a14:imgProps xmlns:a14="http://schemas.microsoft.com/office/drawing/2010/main">
+                    <a14:imgLayer r:embed="rId5">
+                      <a14:imgEffect>
+                        <a14:artisticLineDrawing/>
+                      </a14:imgEffect>
+                      <a14:imgEffect>
+                        <a14:saturation sat="0"/>
+                      </a14:imgEffect>
+                      <a14:imgEffect>
+                        <a14:brightnessContrast bright="40000"/>
+                      </a14:imgEffect>
+                    </a14:imgLayer>
+                  </a14:imgProps>
+                </a:ext>
+              </a:extLst>
+            </a:blip>
+            <a:tile tx="0" ty="0" sx="100000" sy="100000" flip="none" algn="tl"/>
+          </a:blipFill>
+          <a:ln>
+            <a:solidFill>
+              <a:schemeClr val="bg1">
+                <a:lumMod val="85000"/>
+              </a:schemeClr>
+            </a:solidFill>
+          </a:ln>
+          <a:effectLst>
+            <a:innerShdw blurRad="114300">
+              <a:prstClr val="black"/>
+            </a:innerShdw>
+          </a:effectLst>
+        </p:spPr>
+        <p:style>
+          <a:lnRef idx="2">
+            <a:schemeClr val="accent1">
+              <a:shade val="50000"/>
+            </a:schemeClr>
+          </a:lnRef>
+          <a:fillRef idx="1">
+            <a:schemeClr val="accent1"/>
+          </a:fillRef>
+          <a:effectRef idx="0">
+            <a:schemeClr val="accent1"/>
+          </a:effectRef>
+          <a:fontRef idx="minor">
+            <a:schemeClr val="lt1"/>
+          </a:fontRef>
+        </p:style>
+        <p:txBody>
+          <a:bodyPr rtlCol="0" anchor="ctr"/>
+          <a:lstStyle/>
+          <a:p>
+            <a:pPr algn="ctr"/>
+            <a:r>
+              <a:rPr lang="en-US" b="1" dirty="0" smtClean="0">
+                <a:solidFill>
+                  <a:schemeClr val="tx1">
+                    <a:lumMod val="50000"/>
+                    <a:lumOff val="50000"/>
+                  </a:schemeClr>
+                </a:solidFill>
+              </a:rPr>
+              <a:t>Ingredient B (25%)</a:t>
+            </a:r>
+            <a:endParaRPr lang="en-SG" b="1" dirty="0">
+              <a:solidFill>
+                <a:schemeClr val="tx1">
+                  <a:lumMod val="50000"/>
+                  <a:lumOff val="50000"/>
+                </a:schemeClr>
+              </a:solidFill>
+            </a:endParaRPr>
+          </a:p>
+        </p:txBody>
+      </p:sp>
+      <p:sp>
+        <p:nvSpPr>
+          <p:cNvPr id="8" name="Rounded Rectangle 7"/>
+          <p:cNvSpPr/>
+          <p:nvPr/>
+        </p:nvSpPr>
+        <p:spPr>
+          <a:xfrm>
+            <a:off x="1690950" y="3269354"/>
+            <a:ext cx="823650" cy="588100"/>
+          </a:xfrm>
+          <a:prstGeom prst="roundRect">
+            <a:avLst/>
+          </a:prstGeom>
+          <a:blipFill>
+            <a:blip r:embed="rId6">
+              <a:duotone>
+                <a:schemeClr val="bg2">
+                  <a:shade val="45000"/>
+                  <a:satMod val="135000"/>
+                </a:schemeClr>
+                <a:prstClr val="white"/>
+              </a:duotone>
+              <a:extLst>
+                <a:ext uri="{BEBA8EAE-BF5A-486C-A8C5-ECC9F3942E4B}">
+                  <a14:imgProps xmlns:a14="http://schemas.microsoft.com/office/drawing/2010/main">
+                    <a14:imgLayer r:embed="rId7">
+                      <a14:imgEffect>
+                        <a14:saturation sat="0"/>
+                      </a14:imgEffect>
+                      <a14:imgEffect>
+                        <a14:brightnessContrast bright="40000" contrast="40000"/>
+                      </a14:imgEffect>
+                    </a14:imgLayer>
+                  </a14:imgProps>
+                </a:ext>
+              </a:extLst>
+            </a:blip>
+            <a:tile tx="0" ty="0" sx="100000" sy="100000" flip="none" algn="tl"/>
+          </a:blipFill>
+          <a:ln>
+            <a:solidFill>
+              <a:schemeClr val="bg1">
+                <a:lumMod val="85000"/>
+              </a:schemeClr>
+            </a:solidFill>
+          </a:ln>
+          <a:effectLst>
+            <a:innerShdw blurRad="114300">
+              <a:prstClr val="black"/>
+            </a:innerShdw>
+          </a:effectLst>
+        </p:spPr>
+        <p:style>
+          <a:lnRef idx="2">
+            <a:schemeClr val="accent1">
+              <a:shade val="50000"/>
+            </a:schemeClr>
+          </a:lnRef>
+          <a:fillRef idx="1">
+            <a:schemeClr val="accent1"/>
+          </a:fillRef>
+          <a:effectRef idx="0">
+            <a:schemeClr val="accent1"/>
+          </a:effectRef>
+          <a:fontRef idx="minor">
+            <a:schemeClr val="lt1"/>
+          </a:fontRef>
+        </p:style>
+        <p:txBody>
+          <a:bodyPr rtlCol="0" anchor="ctr"/>
+          <a:lstStyle/>
+          <a:p>
+            <a:pPr algn="ctr"/>
+            <a:r>
+              <a:rPr lang="en-US" sz="1600" b="1" dirty="0" smtClean="0">
+                <a:solidFill>
+                  <a:schemeClr val="tx1">
+                    <a:lumMod val="50000"/>
+                    <a:lumOff val="50000"/>
+                  </a:schemeClr>
+                </a:solidFill>
+              </a:rPr>
+              <a:t>C (15%)</a:t>
+            </a:r>
+            <a:endParaRPr lang="en-SG" sz="1600" b="1" dirty="0">
+              <a:solidFill>
+                <a:schemeClr val="tx1">
+                  <a:lumMod val="50000"/>
+                  <a:lumOff val="50000"/>
+                </a:schemeClr>
+              </a:solidFill>
+            </a:endParaRPr>
+          </a:p>
+        </p:txBody>
+      </p:sp>
+      <p:sp>
+        <p:nvSpPr>
+          <p:cNvPr id="17" name="TextBox 16"/>
+          <p:cNvSpPr txBox="1"/>
+          <p:nvPr/>
+        </p:nvSpPr>
+        <p:spPr>
+          <a:xfrm>
+            <a:off x="3876600" y="1652329"/>
+            <a:ext cx="1600200" cy="381000"/>
+          </a:xfrm>
+          <a:prstGeom prst="rect">
+            <a:avLst/>
+          </a:prstGeom>
+          <a:noFill/>
+        </p:spPr>
+        <p:txBody>
+          <a:bodyPr wrap="square" rtlCol="0">
+            <a:spAutoFit/>
+          </a:bodyPr>
+          <a:lstStyle/>
+          <a:p>
+            <a:pPr algn="ctr"/>
+            <a:r>
+              <a:rPr lang="en-US" b="1" dirty="0" smtClean="0">
+                <a:solidFill>
+                  <a:schemeClr val="bg1">
+                    <a:lumMod val="65000"/>
+                  </a:schemeClr>
+                </a:solidFill>
+              </a:rPr>
+              <a:t>Process</a:t>
+            </a:r>
+            <a:endParaRPr lang="en-SG" b="1" dirty="0">
+              <a:solidFill>
+                <a:schemeClr val="bg1">
+                  <a:lumMod val="65000"/>
+                </a:schemeClr>
+              </a:solidFill>
+            </a:endParaRPr>
+          </a:p>
+        </p:txBody>
+      </p:sp>
+      <p:sp>
+        <p:nvSpPr>
+          <p:cNvPr id="21" name="TextBox 20"/>
+          <p:cNvSpPr txBox="1"/>
+          <p:nvPr/>
+        </p:nvSpPr>
+        <p:spPr>
+          <a:xfrm>
+            <a:off x="7000800" y="1652329"/>
+            <a:ext cx="1600200" cy="381000"/>
+          </a:xfrm>
+          <a:prstGeom prst="rect">
+            <a:avLst/>
+          </a:prstGeom>
+          <a:noFill/>
+        </p:spPr>
+        <p:txBody>
+          <a:bodyPr wrap="square" rtlCol="0">
+            <a:spAutoFit/>
+          </a:bodyPr>
+          <a:lstStyle/>
+          <a:p>
+            <a:pPr algn="ctr"/>
+            <a:r>
+              <a:rPr lang="en-US" b="1" dirty="0" smtClean="0">
+                <a:solidFill>
+                  <a:schemeClr val="bg1">
+                    <a:lumMod val="65000"/>
+                  </a:schemeClr>
+                </a:solidFill>
+              </a:rPr>
+              <a:t>Output</a:t>
+            </a:r>
+            <a:endParaRPr lang="en-SG" b="1" dirty="0">
+              <a:solidFill>
+                <a:schemeClr val="bg1">
+                  <a:lumMod val="65000"/>
+                </a:schemeClr>
+              </a:solidFill>
+            </a:endParaRPr>
+          </a:p>
+        </p:txBody>
+      </p:sp>
+      <p:pic>
+        <p:nvPicPr>
+          <p:cNvPr id="1026" name="Picture 2" descr="C:\Users\dcsdcr\AppData\Local\Microsoft\Windows\Temporary Internet Files\Content.IE5\99JB0IZJ\dglxasset[1].aspx"/>
+          <p:cNvPicPr>
+            <a:picLocks noChangeAspect="1" noChangeArrowheads="1"/>
+          </p:cNvPicPr>
+          <p:nvPr/>
+        </p:nvPicPr>
+        <p:blipFill>
+          <a:blip r:embed="rId8" cstate="print">
+            <a:duotone>
+              <a:schemeClr val="bg2">
+                <a:shade val="45000"/>
+                <a:satMod val="135000"/>
+              </a:schemeClr>
+              <a:prstClr val="white"/>
+            </a:duotone>
+            <a:extLst>
+              <a:ext uri="{28A0092B-C50C-407E-A947-70E740481C1C}">
+                <a14:useLocalDpi xmlns:a14="http://schemas.microsoft.com/office/drawing/2010/main" val="0"/>
+              </a:ext>
+            </a:extLst>
+          </a:blip>
+          <a:srcRect/>
+          <a:stretch>
+            <a:fillRect/>
+          </a:stretch>
+        </p:blipFill>
+        <p:spPr bwMode="auto">
+          <a:xfrm>
+            <a:off x="7691401" y="2179597"/>
+            <a:ext cx="614400" cy="863673"/>
+          </a:xfrm>
+          <a:prstGeom prst="rect">
+            <a:avLst/>
+          </a:prstGeom>
+          <a:noFill/>
+          <a:extLst>
+            <a:ext uri="{909E8E84-426E-40DD-AFC4-6F175D3DCCD1}">
+              <a14:hiddenFill xmlns:a14="http://schemas.microsoft.com/office/drawing/2010/main">
+                <a:solidFill>
+                  <a:srgbClr val="FFFFFF"/>
+                </a:solidFill>
+              </a14:hiddenFill>
+            </a:ext>
+          </a:extLst>
+        </p:spPr>
+      </p:pic>
+      <p:pic>
+        <p:nvPicPr>
+          <p:cNvPr id="1027" name="Picture 3" descr="C:\Users\dcsdcr\AppData\Local\Microsoft\Windows\Temporary Internet Files\Content.IE5\9Z2HL03D\dglxasset[1].aspx"/>
+          <p:cNvPicPr>
+            <a:picLocks noChangeAspect="1" noChangeArrowheads="1"/>
+          </p:cNvPicPr>
+          <p:nvPr/>
+        </p:nvPicPr>
+        <p:blipFill>
+          <a:blip r:embed="rId9" cstate="print">
+            <a:duotone>
+              <a:schemeClr val="bg2">
+                <a:shade val="45000"/>
+                <a:satMod val="135000"/>
+              </a:schemeClr>
+              <a:prstClr val="white"/>
+            </a:duotone>
+            <a:extLst>
+              <a:ext uri="{28A0092B-C50C-407E-A947-70E740481C1C}">
+                <a14:useLocalDpi xmlns:a14="http://schemas.microsoft.com/office/drawing/2010/main" val="0"/>
+              </a:ext>
+            </a:extLst>
+          </a:blip>
+          <a:srcRect/>
+          <a:stretch>
+            <a:fillRect/>
+          </a:stretch>
+        </p:blipFill>
+        <p:spPr bwMode="auto">
+          <a:xfrm>
+            <a:off x="7705785" y="3172639"/>
+            <a:ext cx="718221" cy="684815"/>
+          </a:xfrm>
+          <a:prstGeom prst="rect">
+            <a:avLst/>
+          </a:prstGeom>
+          <a:noFill/>
+          <a:extLst>
+            <a:ext uri="{909E8E84-426E-40DD-AFC4-6F175D3DCCD1}">
+              <a14:hiddenFill xmlns:a14="http://schemas.microsoft.com/office/drawing/2010/main">
+                <a:solidFill>
+                  <a:srgbClr val="FFFFFF"/>
+                </a:solidFill>
+              </a14:hiddenFill>
+            </a:ext>
+          </a:extLst>
+        </p:spPr>
+      </p:pic>
+      <p:pic>
+        <p:nvPicPr>
+          <p:cNvPr id="1029" name="Picture 5" descr="C:\Users\dcsdcr\AppData\Local\Microsoft\Windows\Temporary Internet Files\Content.IE5\X5YV3EZ2\MC900311286[1].wmf"/>
+          <p:cNvPicPr>
+            <a:picLocks noChangeAspect="1" noChangeArrowheads="1"/>
+          </p:cNvPicPr>
+          <p:nvPr/>
+        </p:nvPicPr>
+        <p:blipFill>
+          <a:blip r:embed="rId10" cstate="print">
+            <a:duotone>
+              <a:schemeClr val="bg2">
+                <a:shade val="45000"/>
+                <a:satMod val="135000"/>
+              </a:schemeClr>
+              <a:prstClr val="white"/>
+            </a:duotone>
+            <a:extLst>
+              <a:ext uri="{28A0092B-C50C-407E-A947-70E740481C1C}">
+                <a14:useLocalDpi xmlns:a14="http://schemas.microsoft.com/office/drawing/2010/main" val="0"/>
+              </a:ext>
+            </a:extLst>
+          </a:blip>
+          <a:srcRect/>
+          <a:stretch>
+            <a:fillRect/>
+          </a:stretch>
+        </p:blipFill>
+        <p:spPr bwMode="auto">
+          <a:xfrm>
+            <a:off x="6651672" y="3088541"/>
+            <a:ext cx="784327" cy="689354"/>
+          </a:xfrm>
+          <a:prstGeom prst="rect">
+            <a:avLst/>
+          </a:prstGeom>
+          <a:noFill/>
+          <a:extLst>
+            <a:ext uri="{909E8E84-426E-40DD-AFC4-6F175D3DCCD1}">
+              <a14:hiddenFill xmlns:a14="http://schemas.microsoft.com/office/drawing/2010/main">
+                <a:solidFill>
+                  <a:srgbClr val="FFFFFF"/>
+                </a:solidFill>
+              </a14:hiddenFill>
+            </a:ext>
+          </a:extLst>
+        </p:spPr>
+      </p:pic>
+      <p:pic>
+        <p:nvPicPr>
+          <p:cNvPr id="1030" name="Picture 6" descr="C:\Users\dcsdcr\AppData\Local\Microsoft\Windows\Temporary Internet Files\Content.IE5\99JB0IZJ\MC900038628[1].wmf"/>
+          <p:cNvPicPr>
+            <a:picLocks noChangeAspect="1" noChangeArrowheads="1"/>
+          </p:cNvPicPr>
+          <p:nvPr/>
+        </p:nvPicPr>
+        <p:blipFill>
+          <a:blip r:embed="rId11" cstate="print">
+            <a:duotone>
+              <a:schemeClr val="bg2">
+                <a:shade val="45000"/>
+                <a:satMod val="135000"/>
+              </a:schemeClr>
+              <a:prstClr val="white"/>
+            </a:duotone>
+            <a:extLst>
+              <a:ext uri="{28A0092B-C50C-407E-A947-70E740481C1C}">
+                <a14:useLocalDpi xmlns:a14="http://schemas.microsoft.com/office/drawing/2010/main" val="0"/>
+              </a:ext>
+            </a:extLst>
+          </a:blip>
+          <a:srcRect/>
+          <a:stretch>
+            <a:fillRect/>
+          </a:stretch>
+        </p:blipFill>
+        <p:spPr bwMode="auto">
+          <a:xfrm>
+            <a:off x="6724651" y="2213359"/>
+            <a:ext cx="552298" cy="785470"/>
+          </a:xfrm>
+          <a:prstGeom prst="rect">
+            <a:avLst/>
+          </a:prstGeom>
+          <a:noFill/>
+          <a:extLst>
+            <a:ext uri="{909E8E84-426E-40DD-AFC4-6F175D3DCCD1}">
+              <a14:hiddenFill xmlns:a14="http://schemas.microsoft.com/office/drawing/2010/main">
+                <a:solidFill>
+                  <a:srgbClr val="FFFFFF"/>
+                </a:solidFill>
+              </a14:hiddenFill>
+            </a:ext>
+          </a:extLst>
+        </p:spPr>
+      </p:pic>
+      <p:sp>
+        <p:nvSpPr>
+          <p:cNvPr id="30" name="Rectangle 29"/>
+          <p:cNvSpPr>
+            <a:spLocks noChangeAspect="1"/>
+          </p:cNvSpPr>
+          <p:nvPr/>
+        </p:nvSpPr>
+        <p:spPr>
+          <a:xfrm>
+            <a:off x="3405200" y="2090775"/>
+            <a:ext cx="2448000" cy="1836000"/>
+          </a:xfrm>
+          <a:prstGeom prst="rect">
+            <a:avLst/>
+          </a:prstGeom>
+          <a:solidFill>
+            <a:schemeClr val="accent1">
+              <a:lumMod val="20000"/>
+              <a:lumOff val="80000"/>
+            </a:schemeClr>
+          </a:solidFill>
+          <a:ln>
+            <a:solidFill>
+              <a:srgbClr val="0070C0"/>
+            </a:solidFill>
+          </a:ln>
+        </p:spPr>
+        <p:style>
+          <a:lnRef idx="2">
+            <a:schemeClr val="accent1">
+              <a:shade val="50000"/>
+            </a:schemeClr>
+          </a:lnRef>
+          <a:fillRef idx="1">
+            <a:schemeClr val="accent1"/>
+          </a:fillRef>
+          <a:effectRef idx="0">
+            <a:schemeClr val="accent1"/>
+          </a:effectRef>
+          <a:fontRef idx="minor">
+            <a:schemeClr val="lt1"/>
+          </a:fontRef>
+        </p:style>
+        <p:txBody>
+          <a:bodyPr rtlCol="0" anchor="ctr"/>
+          <a:lstStyle/>
+          <a:p>
+            <a:pPr algn="ctr"/>
+            <a:endParaRPr lang="en-SG"/>
+          </a:p>
+        </p:txBody>
+      </p:sp>
+      <p:sp>
+        <p:nvSpPr>
+          <p:cNvPr id="31" name="TextBox 30"/>
+          <p:cNvSpPr txBox="1"/>
+          <p:nvPr/>
+        </p:nvSpPr>
+        <p:spPr>
+          <a:xfrm>
+            <a:off x="533400" y="479318"/>
+            <a:ext cx="8001000" cy="523220"/>
+          </a:xfrm>
+          <a:prstGeom prst="rect">
+            <a:avLst/>
+          </a:prstGeom>
+          <a:noFill/>
+        </p:spPr>
+        <p:txBody>
+          <a:bodyPr wrap="square" rtlCol="0">
+            <a:spAutoFit/>
+          </a:bodyPr>
+          <a:lstStyle/>
+          <a:p>
+            <a:r>
+              <a:rPr lang="en-US" sz="2800" b="1" dirty="0" smtClean="0">
+                <a:solidFill>
+                  <a:schemeClr val="accent6">
+                    <a:lumMod val="75000"/>
+                  </a:schemeClr>
+                </a:solidFill>
+              </a:rPr>
+              <a:t>1.</a:t>
+            </a:r>
+            <a:r>
+              <a:rPr lang="en-US" dirty="0" smtClean="0">
+                <a:solidFill>
+                  <a:schemeClr val="accent6">
+                    <a:lumMod val="75000"/>
+                  </a:schemeClr>
+                </a:solidFill>
+              </a:rPr>
+              <a:t> Select the </a:t>
+            </a:r>
+            <a:r>
+              <a:rPr lang="en-US" dirty="0" smtClean="0">
+                <a:solidFill>
+                  <a:schemeClr val="accent6">
+                    <a:lumMod val="75000"/>
+                  </a:schemeClr>
+                </a:solidFill>
+              </a:rPr>
+              <a:t>blue rectangle and </a:t>
+            </a:r>
+            <a:r>
+              <a:rPr lang="en-US" dirty="0" smtClean="0">
+                <a:solidFill>
+                  <a:schemeClr val="accent6">
+                    <a:lumMod val="75000"/>
+                  </a:schemeClr>
+                </a:solidFill>
+              </a:rPr>
+              <a:t>click  the           </a:t>
+            </a:r>
+            <a:r>
+              <a:rPr lang="en-US" dirty="0" smtClean="0">
+                <a:solidFill>
+                  <a:schemeClr val="accent6">
+                    <a:lumMod val="75000"/>
+                  </a:schemeClr>
+                </a:solidFill>
+              </a:rPr>
+              <a:t>     button.</a:t>
+            </a:r>
+            <a:endParaRPr lang="en-SG" dirty="0">
+              <a:solidFill>
+                <a:schemeClr val="accent6">
+                  <a:lumMod val="75000"/>
+                </a:schemeClr>
+              </a:solidFill>
+            </a:endParaRPr>
+          </a:p>
+        </p:txBody>
+      </p:sp>
+      <p:pic>
+        <p:nvPicPr>
+          <p:cNvPr id="1031" name="Picture 7"/>
+          <p:cNvPicPr>
+            <a:picLocks noChangeAspect="1" noChangeArrowheads="1"/>
+          </p:cNvPicPr>
+          <p:nvPr/>
+        </p:nvPicPr>
+        <p:blipFill>
+          <a:blip r:embed="rId12">
+            <a:extLst>
+              <a:ext uri="{28A0092B-C50C-407E-A947-70E740481C1C}">
+                <a14:useLocalDpi xmlns:a14="http://schemas.microsoft.com/office/drawing/2010/main" val="0"/>
+              </a:ext>
+            </a:extLst>
+          </a:blip>
+          <a:srcRect/>
+          <a:stretch>
+            <a:fillRect/>
+          </a:stretch>
+        </p:blipFill>
+        <p:spPr bwMode="auto">
+          <a:xfrm>
+            <a:off x="4676700" y="479318"/>
+            <a:ext cx="581100" cy="905435"/>
+          </a:xfrm>
+          <a:prstGeom prst="rect">
+            <a:avLst/>
+          </a:prstGeom>
+          <a:noFill/>
+          <a:ln w="9525">
+            <a:solidFill>
+              <a:schemeClr val="bg1">
+                <a:lumMod val="85000"/>
+              </a:schemeClr>
+            </a:solidFill>
+            <a:miter lim="800000"/>
+            <a:headEnd/>
+            <a:tailEnd/>
+          </a:ln>
+          <a:extLst>
+            <a:ext uri="{909E8E84-426E-40DD-AFC4-6F175D3DCCD1}">
+              <a14:hiddenFill xmlns:a14="http://schemas.microsoft.com/office/drawing/2010/main">
+                <a:solidFill>
+                  <a:schemeClr val="accent1"/>
+                </a:solidFill>
+              </a14:hiddenFill>
+            </a:ext>
+            <a:ext uri="{91240B29-F687-4F45-9708-019B960494DF}">
+              <a14:hiddenLine xmlns:a14="http://schemas.microsoft.com/office/drawing/2010/main" w="9525">
+                <a:solidFill>
+                  <a:schemeClr val="tx1"/>
+                </a:solidFill>
+                <a:miter lim="800000"/>
+                <a:headEnd/>
+                <a:tailEnd/>
+              </a14:hiddenLine>
+            </a:ext>
+          </a:extLst>
+        </p:spPr>
+      </p:pic>
+      <p:sp>
+        <p:nvSpPr>
+          <p:cNvPr id="33" name="TextBox 32"/>
+          <p:cNvSpPr txBox="1"/>
+          <p:nvPr/>
+        </p:nvSpPr>
+        <p:spPr>
+          <a:xfrm>
+            <a:off x="495300" y="4724400"/>
+            <a:ext cx="8001000" cy="1077218"/>
+          </a:xfrm>
+          <a:prstGeom prst="rect">
+            <a:avLst/>
+          </a:prstGeom>
+          <a:noFill/>
+        </p:spPr>
+        <p:txBody>
+          <a:bodyPr wrap="square" rtlCol="0">
+            <a:spAutoFit/>
+          </a:bodyPr>
+          <a:lstStyle/>
+          <a:p>
+            <a:r>
+              <a:rPr lang="en-US" sz="2800" b="1" dirty="0" smtClean="0">
+                <a:solidFill>
+                  <a:schemeClr val="accent6">
+                    <a:lumMod val="75000"/>
+                  </a:schemeClr>
+                </a:solidFill>
+              </a:rPr>
+              <a:t>2.</a:t>
+            </a:r>
+            <a:r>
+              <a:rPr lang="en-US" dirty="0" smtClean="0">
+                <a:solidFill>
+                  <a:schemeClr val="accent6">
+                    <a:lumMod val="75000"/>
+                  </a:schemeClr>
+                </a:solidFill>
+              </a:rPr>
+              <a:t> ‘Play’ the slide show (      ) to see </a:t>
+            </a:r>
+            <a:r>
+              <a:rPr lang="en-US" i="1" dirty="0" smtClean="0">
+                <a:solidFill>
+                  <a:schemeClr val="accent6">
+                    <a:lumMod val="75000"/>
+                  </a:schemeClr>
+                </a:solidFill>
+              </a:rPr>
+              <a:t>zoom in </a:t>
+            </a:r>
+            <a:r>
+              <a:rPr lang="en-US" dirty="0" smtClean="0">
+                <a:solidFill>
+                  <a:schemeClr val="accent6">
+                    <a:lumMod val="75000"/>
+                  </a:schemeClr>
+                </a:solidFill>
+              </a:rPr>
+              <a:t>effect generated by </a:t>
+            </a:r>
+            <a:r>
+              <a:rPr lang="en-US" dirty="0" err="1" smtClean="0">
+                <a:solidFill>
+                  <a:schemeClr val="accent6">
+                    <a:lumMod val="75000"/>
+                  </a:schemeClr>
+                </a:solidFill>
+              </a:rPr>
+              <a:t>PowerPointLabs</a:t>
+            </a:r>
+            <a:r>
+              <a:rPr lang="en-US" dirty="0" smtClean="0">
+                <a:solidFill>
+                  <a:schemeClr val="accent6">
+                    <a:lumMod val="75000"/>
+                  </a:schemeClr>
+                </a:solidFill>
+              </a:rPr>
+              <a:t>. The effect tells the audience which part of this slide corresponds to the content of the nex</a:t>
+            </a:r>
+            <a:r>
+              <a:rPr lang="en-US" dirty="0" smtClean="0">
+                <a:solidFill>
+                  <a:schemeClr val="accent6">
+                    <a:lumMod val="75000"/>
+                  </a:schemeClr>
+                </a:solidFill>
+              </a:rPr>
+              <a:t>t slide.</a:t>
+            </a:r>
+            <a:endParaRPr lang="en-SG" dirty="0">
+              <a:solidFill>
+                <a:schemeClr val="accent6">
+                  <a:lumMod val="75000"/>
+                </a:schemeClr>
+              </a:solidFill>
+            </a:endParaRPr>
+          </a:p>
+        </p:txBody>
+      </p:sp>
+      <p:pic>
+        <p:nvPicPr>
+          <p:cNvPr id="1032" name="Picture 8"/>
+          <p:cNvPicPr>
+            <a:picLocks noChangeAspect="1" noChangeArrowheads="1"/>
+          </p:cNvPicPr>
+          <p:nvPr/>
+        </p:nvPicPr>
+        <p:blipFill>
+          <a:blip r:embed="rId13">
+            <a:extLst>
+              <a:ext uri="{28A0092B-C50C-407E-A947-70E740481C1C}">
+                <a14:useLocalDpi xmlns:a14="http://schemas.microsoft.com/office/drawing/2010/main" val="0"/>
+              </a:ext>
+            </a:extLst>
+          </a:blip>
+          <a:srcRect/>
+          <a:stretch>
+            <a:fillRect/>
+          </a:stretch>
+        </p:blipFill>
+        <p:spPr bwMode="auto">
+          <a:xfrm>
+            <a:off x="2931788" y="4899242"/>
+            <a:ext cx="304800" cy="286871"/>
+          </a:xfrm>
+          <a:prstGeom prst="rect">
+            <a:avLst/>
+          </a:prstGeom>
+          <a:noFill/>
+          <a:ln>
+            <a:noFill/>
+          </a:ln>
+          <a:effectLst>
+            <a:softEdge rad="31750"/>
+          </a:effectLst>
+          <a:extLst>
+            <a:ext uri="{909E8E84-426E-40DD-AFC4-6F175D3DCCD1}">
+              <a14:hiddenFill xmlns:a14="http://schemas.microsoft.com/office/drawing/2010/main">
+                <a:solidFill>
+                  <a:schemeClr val="accent1"/>
+                </a:solidFill>
+              </a14:hiddenFill>
+            </a:ext>
+            <a:ext uri="{91240B29-F687-4F45-9708-019B960494DF}">
+              <a14:hiddenLine xmlns:a14="http://schemas.microsoft.com/office/drawing/2010/main" w="9525">
+                <a:solidFill>
+                  <a:schemeClr val="tx1"/>
+                </a:solidFill>
+                <a:miter lim="800000"/>
+                <a:headEnd/>
+                <a:tailEnd/>
+              </a14:hiddenLine>
+            </a:ext>
+          </a:extLst>
+        </p:spPr>
+      </p:pic>
+    </p:spTree>
+    <p:extLst>
+      <p:ext uri="{BB962C8B-B14F-4D97-AF65-F5344CB8AC3E}">
+        <p14:creationId xmlns:p14="http://schemas.microsoft.com/office/powerpoint/2010/main" val="161054008"/>
+      </p:ext>
+    </p:extLst>
+  </p:cSld>
+  <p:clrMapOvr>
+    <a:masterClrMapping/>
+  </p:clrMapOvr>
+  <p:timing>
+    <p:tnLst>
+      <p:par>
+        <p:cTn id="1" dur="indefinite" restart="never" nodeType="tmRoot"/>
+      </p:par>
+    </p:tnLst>
+  </p:timing>
+</p:sld>
+</file>
+
+<file path=ppt/slides/slide15.xml><?xml version="1.0" encoding="utf-8"?>
+<p:sld xmlns:a="http://schemas.openxmlformats.org/drawingml/2006/main" xmlns:r="http://schemas.openxmlformats.org/officeDocument/2006/relationships" xmlns:p="http://schemas.openxmlformats.org/presentationml/2006/main">
+  <p:cSld>
+    <p:bg>
+      <p:bgPr>
+        <a:solidFill>
+          <a:schemeClr val="accent1">
+            <a:lumMod val="20000"/>
+            <a:lumOff val="80000"/>
+          </a:schemeClr>
+        </a:solidFill>
+        <a:effectLst/>
+      </p:bgPr>
+    </p:bg>
+    <p:spTree>
+      <p:nvGrpSpPr>
+        <p:cNvPr id="1" name=""/>
+        <p:cNvGrpSpPr/>
+        <p:nvPr/>
+      </p:nvGrpSpPr>
+      <p:grpSpPr>
+        <a:xfrm>
+          <a:off x="0" y="0"/>
+          <a:ext cx="0" cy="0"/>
+          <a:chOff x="0" y="0"/>
+          <a:chExt cx="0" cy="0"/>
+        </a:xfrm>
+      </p:grpSpPr>
+      <p:sp>
+        <p:nvSpPr>
+          <p:cNvPr id="4" name="Flowchart: Delay 3"/>
+          <p:cNvSpPr/>
+          <p:nvPr/>
+        </p:nvSpPr>
+        <p:spPr>
+          <a:xfrm>
+            <a:off x="6477000" y="2438400"/>
+            <a:ext cx="1219200" cy="1219200"/>
+          </a:xfrm>
+          <a:prstGeom prst="flowChartDelay">
+            <a:avLst/>
+          </a:prstGeom>
+        </p:spPr>
+        <p:style>
+          <a:lnRef idx="0">
+            <a:schemeClr val="accent1"/>
+          </a:lnRef>
+          <a:fillRef idx="3">
+            <a:schemeClr val="accent1"/>
+          </a:fillRef>
+          <a:effectRef idx="3">
+            <a:schemeClr val="accent1"/>
+          </a:effectRef>
+          <a:fontRef idx="minor">
+            <a:schemeClr val="lt1"/>
+          </a:fontRef>
+        </p:style>
+        <p:txBody>
+          <a:bodyPr rtlCol="0" anchor="ctr"/>
+          <a:lstStyle/>
+          <a:p>
+            <a:pPr algn="ctr"/>
+            <a:r>
+              <a:rPr lang="en-US" sz="3200" b="1" dirty="0" smtClean="0"/>
+              <a:t>Z</a:t>
+            </a:r>
+            <a:endParaRPr lang="en-SG" sz="3200" b="1" dirty="0"/>
+          </a:p>
+        </p:txBody>
+      </p:sp>
+      <p:sp>
+        <p:nvSpPr>
+          <p:cNvPr id="5" name="Flowchart: Alternate Process 4"/>
+          <p:cNvSpPr/>
+          <p:nvPr/>
+        </p:nvSpPr>
+        <p:spPr>
+          <a:xfrm>
+            <a:off x="3200400" y="2476500"/>
+            <a:ext cx="2209800" cy="1143000"/>
+          </a:xfrm>
+          <a:prstGeom prst="flowChartAlternateProcess">
+            <a:avLst/>
+          </a:prstGeom>
+        </p:spPr>
+        <p:style>
+          <a:lnRef idx="0">
+            <a:schemeClr val="accent1"/>
+          </a:lnRef>
+          <a:fillRef idx="3">
+            <a:schemeClr val="accent1"/>
+          </a:fillRef>
+          <a:effectRef idx="3">
+            <a:schemeClr val="accent1"/>
+          </a:effectRef>
+          <a:fontRef idx="minor">
+            <a:schemeClr val="lt1"/>
+          </a:fontRef>
+        </p:style>
+        <p:txBody>
+          <a:bodyPr rtlCol="0" anchor="ctr"/>
+          <a:lstStyle/>
+          <a:p>
+            <a:pPr algn="ctr"/>
+            <a:r>
+              <a:rPr lang="en-US" sz="3200" b="1" dirty="0" smtClean="0"/>
+              <a:t>Y</a:t>
+            </a:r>
+            <a:endParaRPr lang="en-SG" sz="3200" b="1" dirty="0"/>
+          </a:p>
+        </p:txBody>
+      </p:sp>
+      <p:sp>
+        <p:nvSpPr>
+          <p:cNvPr id="7" name="Flowchart: Alternate Process 6"/>
+          <p:cNvSpPr/>
+          <p:nvPr/>
+        </p:nvSpPr>
+        <p:spPr>
+          <a:xfrm>
+            <a:off x="3192483" y="4495800"/>
+            <a:ext cx="2209800" cy="1143000"/>
+          </a:xfrm>
+          <a:prstGeom prst="flowChartAlternateProcess">
+            <a:avLst/>
+          </a:prstGeom>
+        </p:spPr>
+        <p:style>
+          <a:lnRef idx="0">
+            <a:schemeClr val="accent1"/>
+          </a:lnRef>
+          <a:fillRef idx="3">
+            <a:schemeClr val="accent1"/>
+          </a:fillRef>
+          <a:effectRef idx="3">
+            <a:schemeClr val="accent1"/>
+          </a:effectRef>
+          <a:fontRef idx="minor">
+            <a:schemeClr val="lt1"/>
+          </a:fontRef>
+        </p:style>
+        <p:txBody>
+          <a:bodyPr rtlCol="0" anchor="ctr"/>
+          <a:lstStyle/>
+          <a:p>
+            <a:pPr algn="ctr"/>
+            <a:r>
+              <a:rPr lang="en-US" sz="3200" b="1" dirty="0" smtClean="0"/>
+              <a:t>M</a:t>
+            </a:r>
+            <a:endParaRPr lang="en-SG" sz="3200" b="1" dirty="0"/>
+          </a:p>
+        </p:txBody>
+      </p:sp>
+      <p:sp>
+        <p:nvSpPr>
+          <p:cNvPr id="6" name="Flowchart: Manual Input 5"/>
+          <p:cNvSpPr/>
+          <p:nvPr/>
+        </p:nvSpPr>
+        <p:spPr>
+          <a:xfrm>
+            <a:off x="3192483" y="762000"/>
+            <a:ext cx="2209800" cy="838200"/>
+          </a:xfrm>
+          <a:prstGeom prst="flowChartManualInput">
+            <a:avLst/>
+          </a:prstGeom>
+        </p:spPr>
+        <p:style>
+          <a:lnRef idx="0">
+            <a:schemeClr val="accent1"/>
+          </a:lnRef>
+          <a:fillRef idx="3">
+            <a:schemeClr val="accent1"/>
+          </a:fillRef>
+          <a:effectRef idx="3">
+            <a:schemeClr val="accent1"/>
+          </a:effectRef>
+          <a:fontRef idx="minor">
+            <a:schemeClr val="lt1"/>
+          </a:fontRef>
+        </p:style>
+        <p:txBody>
+          <a:bodyPr rtlCol="0" anchor="ctr"/>
+          <a:lstStyle/>
+          <a:p>
+            <a:pPr algn="ctr"/>
+            <a:r>
+              <a:rPr lang="en-US" sz="3200" b="1" dirty="0" smtClean="0"/>
+              <a:t>L</a:t>
+            </a:r>
+            <a:endParaRPr lang="en-SG" sz="3200" b="1" dirty="0"/>
+          </a:p>
+        </p:txBody>
+      </p:sp>
+      <p:sp>
+        <p:nvSpPr>
+          <p:cNvPr id="8" name="Flowchart: Document 7"/>
+          <p:cNvSpPr/>
+          <p:nvPr/>
+        </p:nvSpPr>
+        <p:spPr>
+          <a:xfrm rot="5400000">
+            <a:off x="1447800" y="2514600"/>
+            <a:ext cx="914400" cy="1066800"/>
+          </a:xfrm>
+          <a:prstGeom prst="flowChartDocument">
+            <a:avLst/>
+          </a:prstGeom>
+        </p:spPr>
+        <p:style>
+          <a:lnRef idx="0">
+            <a:schemeClr val="accent1"/>
+          </a:lnRef>
+          <a:fillRef idx="3">
+            <a:schemeClr val="accent1"/>
+          </a:fillRef>
+          <a:effectRef idx="3">
+            <a:schemeClr val="accent1"/>
+          </a:effectRef>
+          <a:fontRef idx="minor">
+            <a:schemeClr val="lt1"/>
+          </a:fontRef>
+        </p:style>
+        <p:txBody>
+          <a:bodyPr vert="vert270" rtlCol="0" anchor="ctr"/>
+          <a:lstStyle/>
+          <a:p>
+            <a:pPr algn="ctr"/>
+            <a:r>
+              <a:rPr lang="en-US" sz="3200" b="1" dirty="0" smtClean="0"/>
+              <a:t>X</a:t>
+            </a:r>
+            <a:endParaRPr lang="en-SG" sz="3200" b="1" dirty="0"/>
+          </a:p>
+        </p:txBody>
+      </p:sp>
+      <p:sp>
+        <p:nvSpPr>
+          <p:cNvPr id="9" name="Right Arrow 8"/>
+          <p:cNvSpPr/>
+          <p:nvPr/>
+        </p:nvSpPr>
+        <p:spPr>
+          <a:xfrm>
+            <a:off x="2619500" y="2819400"/>
+            <a:ext cx="457200" cy="457200"/>
+          </a:xfrm>
+          <a:prstGeom prst="rightArrow">
+            <a:avLst/>
+          </a:prstGeom>
+          <a:solidFill>
+            <a:schemeClr val="accent1"/>
+          </a:solidFill>
+          <a:ln>
+            <a:noFill/>
+          </a:ln>
+        </p:spPr>
+        <p:style>
+          <a:lnRef idx="2">
+            <a:schemeClr val="accent1">
+              <a:shade val="50000"/>
+            </a:schemeClr>
+          </a:lnRef>
+          <a:fillRef idx="1">
+            <a:schemeClr val="accent1"/>
+          </a:fillRef>
+          <a:effectRef idx="0">
+            <a:schemeClr val="accent1"/>
+          </a:effectRef>
+          <a:fontRef idx="minor">
+            <a:schemeClr val="lt1"/>
+          </a:fontRef>
+        </p:style>
+        <p:txBody>
+          <a:bodyPr rtlCol="0" anchor="ctr"/>
+          <a:lstStyle/>
+          <a:p>
+            <a:pPr algn="ctr"/>
+            <a:endParaRPr lang="en-SG" sz="3200" b="1"/>
+          </a:p>
+        </p:txBody>
+      </p:sp>
+      <p:sp>
+        <p:nvSpPr>
+          <p:cNvPr id="11" name="Right Arrow 10"/>
+          <p:cNvSpPr/>
+          <p:nvPr/>
+        </p:nvSpPr>
+        <p:spPr>
+          <a:xfrm>
+            <a:off x="5638800" y="2819400"/>
+            <a:ext cx="685800" cy="457200"/>
+          </a:xfrm>
+          <a:prstGeom prst="rightArrow">
+            <a:avLst/>
+          </a:prstGeom>
+          <a:solidFill>
+            <a:schemeClr val="accent1"/>
+          </a:solidFill>
+          <a:ln>
+            <a:noFill/>
+          </a:ln>
+        </p:spPr>
+        <p:style>
+          <a:lnRef idx="2">
+            <a:schemeClr val="accent1">
+              <a:shade val="50000"/>
+            </a:schemeClr>
+          </a:lnRef>
+          <a:fillRef idx="1">
+            <a:schemeClr val="accent1"/>
+          </a:fillRef>
+          <a:effectRef idx="0">
+            <a:schemeClr val="accent1"/>
+          </a:effectRef>
+          <a:fontRef idx="minor">
+            <a:schemeClr val="lt1"/>
+          </a:fontRef>
+        </p:style>
+        <p:txBody>
+          <a:bodyPr rtlCol="0" anchor="ctr"/>
+          <a:lstStyle/>
+          <a:p>
+            <a:pPr algn="ctr"/>
+            <a:endParaRPr lang="en-SG" sz="3200" b="1"/>
+          </a:p>
+        </p:txBody>
+      </p:sp>
+      <p:sp>
+        <p:nvSpPr>
+          <p:cNvPr id="12" name="Right Arrow 11"/>
+          <p:cNvSpPr/>
+          <p:nvPr/>
+        </p:nvSpPr>
+        <p:spPr>
+          <a:xfrm rot="5400000">
+            <a:off x="4068783" y="1905000"/>
+            <a:ext cx="457200" cy="457200"/>
+          </a:xfrm>
+          <a:prstGeom prst="rightArrow">
+            <a:avLst/>
+          </a:prstGeom>
+          <a:solidFill>
+            <a:schemeClr val="accent1"/>
+          </a:solidFill>
+          <a:ln>
+            <a:noFill/>
+          </a:ln>
+        </p:spPr>
+        <p:style>
+          <a:lnRef idx="2">
+            <a:schemeClr val="accent1">
+              <a:shade val="50000"/>
+            </a:schemeClr>
+          </a:lnRef>
+          <a:fillRef idx="1">
+            <a:schemeClr val="accent1"/>
+          </a:fillRef>
+          <a:effectRef idx="0">
+            <a:schemeClr val="accent1"/>
+          </a:effectRef>
+          <a:fontRef idx="minor">
+            <a:schemeClr val="lt1"/>
+          </a:fontRef>
+        </p:style>
+        <p:txBody>
+          <a:bodyPr rtlCol="0" anchor="ctr"/>
+          <a:lstStyle/>
+          <a:p>
+            <a:pPr algn="ctr"/>
+            <a:endParaRPr lang="en-SG" sz="3200" b="1"/>
+          </a:p>
+        </p:txBody>
+      </p:sp>
+      <p:sp>
+        <p:nvSpPr>
+          <p:cNvPr id="13" name="Right Arrow 12"/>
+          <p:cNvSpPr/>
+          <p:nvPr/>
+        </p:nvSpPr>
+        <p:spPr>
+          <a:xfrm rot="5400000">
+            <a:off x="4078679" y="3886200"/>
+            <a:ext cx="457200" cy="457200"/>
+          </a:xfrm>
+          <a:prstGeom prst="rightArrow">
+            <a:avLst/>
+          </a:prstGeom>
+          <a:solidFill>
+            <a:schemeClr val="accent1"/>
+          </a:solidFill>
+          <a:ln>
+            <a:noFill/>
+          </a:ln>
+        </p:spPr>
+        <p:style>
+          <a:lnRef idx="2">
+            <a:schemeClr val="accent1">
+              <a:shade val="50000"/>
+            </a:schemeClr>
+          </a:lnRef>
+          <a:fillRef idx="1">
+            <a:schemeClr val="accent1"/>
+          </a:fillRef>
+          <a:effectRef idx="0">
+            <a:schemeClr val="accent1"/>
+          </a:effectRef>
+          <a:fontRef idx="minor">
+            <a:schemeClr val="lt1"/>
+          </a:fontRef>
+        </p:style>
+        <p:txBody>
+          <a:bodyPr rtlCol="0" anchor="ctr"/>
+          <a:lstStyle/>
+          <a:p>
+            <a:pPr algn="ctr"/>
+            <a:endParaRPr lang="en-SG" sz="3200" b="1"/>
+          </a:p>
+        </p:txBody>
+      </p:sp>
+      <p:sp>
+        <p:nvSpPr>
+          <p:cNvPr id="14" name="Right Arrow 13"/>
+          <p:cNvSpPr/>
+          <p:nvPr/>
+        </p:nvSpPr>
+        <p:spPr>
+          <a:xfrm>
+            <a:off x="685800" y="2819400"/>
+            <a:ext cx="457200" cy="457200"/>
+          </a:xfrm>
+          <a:prstGeom prst="rightArrow">
+            <a:avLst/>
+          </a:prstGeom>
+          <a:solidFill>
+            <a:schemeClr val="accent1"/>
+          </a:solidFill>
+          <a:ln>
+            <a:noFill/>
+          </a:ln>
+        </p:spPr>
+        <p:style>
+          <a:lnRef idx="2">
+            <a:schemeClr val="accent1">
+              <a:shade val="50000"/>
+            </a:schemeClr>
+          </a:lnRef>
+          <a:fillRef idx="1">
+            <a:schemeClr val="accent1"/>
+          </a:fillRef>
+          <a:effectRef idx="0">
+            <a:schemeClr val="accent1"/>
+          </a:effectRef>
+          <a:fontRef idx="minor">
+            <a:schemeClr val="lt1"/>
+          </a:fontRef>
+        </p:style>
+        <p:txBody>
+          <a:bodyPr rtlCol="0" anchor="ctr"/>
+          <a:lstStyle/>
+          <a:p>
+            <a:pPr algn="ctr"/>
+            <a:endParaRPr lang="en-SG" sz="3200" b="1"/>
+          </a:p>
+        </p:txBody>
+      </p:sp>
+      <p:sp>
+        <p:nvSpPr>
+          <p:cNvPr id="15" name="Right Arrow 14"/>
+          <p:cNvSpPr/>
+          <p:nvPr/>
+        </p:nvSpPr>
+        <p:spPr>
+          <a:xfrm>
+            <a:off x="8153400" y="2803566"/>
+            <a:ext cx="457200" cy="457200"/>
+          </a:xfrm>
+          <a:prstGeom prst="rightArrow">
+            <a:avLst/>
+          </a:prstGeom>
+          <a:solidFill>
+            <a:schemeClr val="accent1"/>
+          </a:solidFill>
+          <a:ln>
+            <a:noFill/>
+          </a:ln>
+        </p:spPr>
+        <p:style>
+          <a:lnRef idx="2">
+            <a:schemeClr val="accent1">
+              <a:shade val="50000"/>
+            </a:schemeClr>
+          </a:lnRef>
+          <a:fillRef idx="1">
+            <a:schemeClr val="accent1"/>
+          </a:fillRef>
+          <a:effectRef idx="0">
+            <a:schemeClr val="accent1"/>
+          </a:effectRef>
+          <a:fontRef idx="minor">
+            <a:schemeClr val="lt1"/>
+          </a:fontRef>
+        </p:style>
+        <p:txBody>
+          <a:bodyPr rtlCol="0" anchor="ctr"/>
+          <a:lstStyle/>
+          <a:p>
+            <a:pPr algn="ctr"/>
+            <a:endParaRPr lang="en-SG" sz="3200" b="1"/>
+          </a:p>
+        </p:txBody>
+      </p:sp>
+    </p:spTree>
+    <p:extLst>
+      <p:ext uri="{BB962C8B-B14F-4D97-AF65-F5344CB8AC3E}">
+        <p14:creationId xmlns:p14="http://schemas.microsoft.com/office/powerpoint/2010/main" val="3510104165"/>
+      </p:ext>
+    </p:extLst>
+  </p:cSld>
+  <p:clrMapOvr>
+    <a:masterClrMapping/>
+  </p:clrMapOvr>
+  <mc:AlternateContent xmlns:mc="http://schemas.openxmlformats.org/markup-compatibility/2006">
+    <mc:Choice xmlns:p14="http://schemas.microsoft.com/office/powerpoint/2010/main" Requires="p14">
+      <p:transition p14:dur="250">
+        <p:fade/>
+      </p:transition>
+    </mc:Choice>
+    <mc:Fallback>
+      <p:transition>
+        <p:fade/>
+      </p:transition>
+    </mc:Fallback>
+  </mc:AlternateContent>
+  <p:timing>
+    <p:tnLst>
+      <p:par>
+        <p:cTn id="1" dur="indefinite" restart="never" nodeType="tmRoot"/>
+      </p:par>
+    </p:tnLst>
+  </p:timing>
+</p:sld>
+</file>
+
+<file path=ppt/slides/slide16.xml><?xml version="1.0" encoding="utf-8"?>
+<p:sld xmlns:a="http://schemas.openxmlformats.org/drawingml/2006/main" xmlns:r="http://schemas.openxmlformats.org/officeDocument/2006/relationships" xmlns:p="http://schemas.openxmlformats.org/presentationml/2006/main">
+  <p:cSld>
+    <p:spTree>
+      <p:nvGrpSpPr>
+        <p:cNvPr id="1" name=""/>
+        <p:cNvGrpSpPr/>
+        <p:nvPr/>
+      </p:nvGrpSpPr>
+      <p:grpSpPr>
+        <a:xfrm>
+          <a:off x="0" y="0"/>
+          <a:ext cx="0" cy="0"/>
+          <a:chOff x="0" y="0"/>
+          <a:chExt cx="0" cy="0"/>
+        </a:xfrm>
+      </p:grpSpPr>
+      <p:sp>
+        <p:nvSpPr>
+          <p:cNvPr id="20" name="Rectangle 19"/>
+          <p:cNvSpPr>
+            <a:spLocks noChangeAspect="1"/>
+          </p:cNvSpPr>
+          <p:nvPr/>
+        </p:nvSpPr>
+        <p:spPr>
+          <a:xfrm>
+            <a:off x="5702038" y="2028431"/>
+            <a:ext cx="3302525" cy="1940796"/>
+          </a:xfrm>
+          <a:prstGeom prst="rect">
+            <a:avLst/>
+          </a:prstGeom>
+          <a:solidFill>
+            <a:schemeClr val="accent4">
+              <a:lumMod val="20000"/>
+              <a:lumOff val="80000"/>
+            </a:schemeClr>
+          </a:solidFill>
+          <a:ln w="57150">
+            <a:solidFill>
+              <a:schemeClr val="bg1"/>
+            </a:solidFill>
+          </a:ln>
+        </p:spPr>
+        <p:style>
+          <a:lnRef idx="2">
+            <a:schemeClr val="accent1">
+              <a:shade val="50000"/>
+            </a:schemeClr>
+          </a:lnRef>
+          <a:fillRef idx="1">
+            <a:schemeClr val="accent1"/>
+          </a:fillRef>
+          <a:effectRef idx="0">
+            <a:schemeClr val="accent1"/>
+          </a:effectRef>
+          <a:fontRef idx="minor">
+            <a:schemeClr val="lt1"/>
+          </a:fontRef>
+        </p:style>
+        <p:txBody>
+          <a:bodyPr rtlCol="0" anchor="ctr"/>
+          <a:lstStyle/>
+          <a:p>
+            <a:pPr algn="ctr"/>
+            <a:endParaRPr lang="en-SG"/>
+          </a:p>
+        </p:txBody>
+      </p:sp>
+      <p:sp>
+        <p:nvSpPr>
+          <p:cNvPr id="28" name="Pentagon 27"/>
+          <p:cNvSpPr>
+            <a:spLocks noChangeAspect="1"/>
+          </p:cNvSpPr>
+          <p:nvPr/>
+        </p:nvSpPr>
+        <p:spPr>
+          <a:xfrm>
+            <a:off x="2562615" y="2028431"/>
+            <a:ext cx="3866370" cy="1940796"/>
+          </a:xfrm>
+          <a:prstGeom prst="homePlate">
+            <a:avLst>
+              <a:gd name="adj" fmla="val 24128"/>
+            </a:avLst>
+          </a:prstGeom>
+          <a:solidFill>
+            <a:schemeClr val="accent1">
+              <a:lumMod val="20000"/>
+              <a:lumOff val="80000"/>
+            </a:schemeClr>
+          </a:solidFill>
+          <a:ln w="57150">
+            <a:solidFill>
+              <a:schemeClr val="bg1"/>
+            </a:solidFill>
+          </a:ln>
+        </p:spPr>
+        <p:style>
+          <a:lnRef idx="2">
+            <a:schemeClr val="accent1">
+              <a:shade val="50000"/>
+            </a:schemeClr>
+          </a:lnRef>
+          <a:fillRef idx="1">
+            <a:schemeClr val="accent1"/>
+          </a:fillRef>
+          <a:effectRef idx="0">
+            <a:schemeClr val="accent1"/>
+          </a:effectRef>
+          <a:fontRef idx="minor">
+            <a:schemeClr val="lt1"/>
+          </a:fontRef>
+        </p:style>
+        <p:txBody>
+          <a:bodyPr rtlCol="0" anchor="ctr"/>
+          <a:lstStyle/>
+          <a:p>
+            <a:pPr algn="ctr"/>
+            <a:endParaRPr lang="en-SG"/>
+          </a:p>
+        </p:txBody>
+      </p:sp>
+      <p:sp>
+        <p:nvSpPr>
+          <p:cNvPr id="17" name="TextBox 16"/>
+          <p:cNvSpPr txBox="1"/>
+          <p:nvPr/>
+        </p:nvSpPr>
+        <p:spPr>
+          <a:xfrm>
+            <a:off x="3876600" y="1652329"/>
+            <a:ext cx="1600200" cy="381000"/>
+          </a:xfrm>
+          <a:prstGeom prst="rect">
+            <a:avLst/>
+          </a:prstGeom>
+          <a:noFill/>
+        </p:spPr>
+        <p:txBody>
+          <a:bodyPr wrap="square" rtlCol="0">
+            <a:spAutoFit/>
+          </a:bodyPr>
+          <a:lstStyle/>
+          <a:p>
+            <a:pPr algn="ctr"/>
+            <a:r>
+              <a:rPr lang="en-US" b="1" dirty="0" smtClean="0">
+                <a:solidFill>
+                  <a:schemeClr val="bg1">
+                    <a:lumMod val="65000"/>
+                  </a:schemeClr>
+                </a:solidFill>
+              </a:rPr>
+              <a:t>Process</a:t>
+            </a:r>
+            <a:endParaRPr lang="en-SG" b="1" dirty="0">
+              <a:solidFill>
+                <a:schemeClr val="bg1">
+                  <a:lumMod val="65000"/>
+                </a:schemeClr>
+              </a:solidFill>
+            </a:endParaRPr>
+          </a:p>
+        </p:txBody>
+      </p:sp>
+      <p:sp>
+        <p:nvSpPr>
+          <p:cNvPr id="21" name="TextBox 20"/>
+          <p:cNvSpPr txBox="1"/>
+          <p:nvPr/>
+        </p:nvSpPr>
+        <p:spPr>
+          <a:xfrm>
+            <a:off x="7000800" y="1652329"/>
+            <a:ext cx="1600200" cy="381000"/>
+          </a:xfrm>
+          <a:prstGeom prst="rect">
+            <a:avLst/>
+          </a:prstGeom>
+          <a:noFill/>
+        </p:spPr>
+        <p:txBody>
+          <a:bodyPr wrap="square" rtlCol="0">
+            <a:spAutoFit/>
+          </a:bodyPr>
+          <a:lstStyle/>
+          <a:p>
+            <a:pPr algn="ctr"/>
+            <a:r>
+              <a:rPr lang="en-US" b="1" dirty="0" smtClean="0">
+                <a:solidFill>
+                  <a:schemeClr val="bg1">
+                    <a:lumMod val="65000"/>
+                  </a:schemeClr>
+                </a:solidFill>
+              </a:rPr>
+              <a:t>Output</a:t>
+            </a:r>
+            <a:endParaRPr lang="en-SG" b="1" dirty="0">
+              <a:solidFill>
+                <a:schemeClr val="bg1">
+                  <a:lumMod val="65000"/>
+                </a:schemeClr>
+              </a:solidFill>
+            </a:endParaRPr>
+          </a:p>
+        </p:txBody>
+      </p:sp>
+      <p:pic>
+        <p:nvPicPr>
+          <p:cNvPr id="1026" name="Picture 2" descr="C:\Users\dcsdcr\AppData\Local\Microsoft\Windows\Temporary Internet Files\Content.IE5\99JB0IZJ\dglxasset[1].aspx"/>
+          <p:cNvPicPr>
+            <a:picLocks noChangeAspect="1" noChangeArrowheads="1"/>
+          </p:cNvPicPr>
+          <p:nvPr/>
+        </p:nvPicPr>
+        <p:blipFill>
+          <a:blip r:embed="rId2" cstate="print">
+            <a:duotone>
+              <a:schemeClr val="bg2">
+                <a:shade val="45000"/>
+                <a:satMod val="135000"/>
+              </a:schemeClr>
+              <a:prstClr val="white"/>
+            </a:duotone>
+            <a:extLst>
+              <a:ext uri="{28A0092B-C50C-407E-A947-70E740481C1C}">
+                <a14:useLocalDpi xmlns:a14="http://schemas.microsoft.com/office/drawing/2010/main" val="0"/>
+              </a:ext>
+            </a:extLst>
+          </a:blip>
+          <a:srcRect/>
+          <a:stretch>
+            <a:fillRect/>
+          </a:stretch>
+        </p:blipFill>
+        <p:spPr bwMode="auto">
+          <a:xfrm>
+            <a:off x="7691401" y="2179597"/>
+            <a:ext cx="614400" cy="863673"/>
+          </a:xfrm>
+          <a:prstGeom prst="rect">
+            <a:avLst/>
+          </a:prstGeom>
+          <a:noFill/>
+          <a:extLst>
+            <a:ext uri="{909E8E84-426E-40DD-AFC4-6F175D3DCCD1}">
+              <a14:hiddenFill xmlns:a14="http://schemas.microsoft.com/office/drawing/2010/main">
+                <a:solidFill>
+                  <a:srgbClr val="FFFFFF"/>
+                </a:solidFill>
+              </a14:hiddenFill>
+            </a:ext>
+          </a:extLst>
+        </p:spPr>
+      </p:pic>
+      <p:pic>
+        <p:nvPicPr>
+          <p:cNvPr id="1027" name="Picture 3" descr="C:\Users\dcsdcr\AppData\Local\Microsoft\Windows\Temporary Internet Files\Content.IE5\9Z2HL03D\dglxasset[1].aspx"/>
+          <p:cNvPicPr>
+            <a:picLocks noChangeAspect="1" noChangeArrowheads="1"/>
+          </p:cNvPicPr>
+          <p:nvPr/>
+        </p:nvPicPr>
+        <p:blipFill>
+          <a:blip r:embed="rId3" cstate="print">
+            <a:duotone>
+              <a:schemeClr val="bg2">
+                <a:shade val="45000"/>
+                <a:satMod val="135000"/>
+              </a:schemeClr>
+              <a:prstClr val="white"/>
+            </a:duotone>
+            <a:extLst>
+              <a:ext uri="{28A0092B-C50C-407E-A947-70E740481C1C}">
+                <a14:useLocalDpi xmlns:a14="http://schemas.microsoft.com/office/drawing/2010/main" val="0"/>
+              </a:ext>
+            </a:extLst>
+          </a:blip>
+          <a:srcRect/>
+          <a:stretch>
+            <a:fillRect/>
+          </a:stretch>
+        </p:blipFill>
+        <p:spPr bwMode="auto">
+          <a:xfrm>
+            <a:off x="7705785" y="3172639"/>
+            <a:ext cx="718221" cy="684815"/>
+          </a:xfrm>
+          <a:prstGeom prst="rect">
+            <a:avLst/>
+          </a:prstGeom>
+          <a:noFill/>
+          <a:extLst>
+            <a:ext uri="{909E8E84-426E-40DD-AFC4-6F175D3DCCD1}">
+              <a14:hiddenFill xmlns:a14="http://schemas.microsoft.com/office/drawing/2010/main">
+                <a:solidFill>
+                  <a:srgbClr val="FFFFFF"/>
+                </a:solidFill>
+              </a14:hiddenFill>
+            </a:ext>
+          </a:extLst>
+        </p:spPr>
+      </p:pic>
+      <p:pic>
+        <p:nvPicPr>
+          <p:cNvPr id="1029" name="Picture 5" descr="C:\Users\dcsdcr\AppData\Local\Microsoft\Windows\Temporary Internet Files\Content.IE5\X5YV3EZ2\MC900311286[1].wmf"/>
+          <p:cNvPicPr>
+            <a:picLocks noChangeAspect="1" noChangeArrowheads="1"/>
+          </p:cNvPicPr>
+          <p:nvPr/>
+        </p:nvPicPr>
+        <p:blipFill>
+          <a:blip r:embed="rId4" cstate="print">
+            <a:duotone>
+              <a:schemeClr val="bg2">
+                <a:shade val="45000"/>
+                <a:satMod val="135000"/>
+              </a:schemeClr>
+              <a:prstClr val="white"/>
+            </a:duotone>
+            <a:extLst>
+              <a:ext uri="{28A0092B-C50C-407E-A947-70E740481C1C}">
+                <a14:useLocalDpi xmlns:a14="http://schemas.microsoft.com/office/drawing/2010/main" val="0"/>
+              </a:ext>
+            </a:extLst>
+          </a:blip>
+          <a:srcRect/>
+          <a:stretch>
+            <a:fillRect/>
+          </a:stretch>
+        </p:blipFill>
+        <p:spPr bwMode="auto">
+          <a:xfrm>
+            <a:off x="6651672" y="3088541"/>
+            <a:ext cx="784327" cy="689354"/>
+          </a:xfrm>
+          <a:prstGeom prst="rect">
+            <a:avLst/>
+          </a:prstGeom>
+          <a:noFill/>
+          <a:extLst>
+            <a:ext uri="{909E8E84-426E-40DD-AFC4-6F175D3DCCD1}">
+              <a14:hiddenFill xmlns:a14="http://schemas.microsoft.com/office/drawing/2010/main">
+                <a:solidFill>
+                  <a:srgbClr val="FFFFFF"/>
+                </a:solidFill>
+              </a14:hiddenFill>
+            </a:ext>
+          </a:extLst>
+        </p:spPr>
+      </p:pic>
+      <p:pic>
+        <p:nvPicPr>
+          <p:cNvPr id="1030" name="Picture 6" descr="C:\Users\dcsdcr\AppData\Local\Microsoft\Windows\Temporary Internet Files\Content.IE5\99JB0IZJ\MC900038628[1].wmf"/>
+          <p:cNvPicPr>
+            <a:picLocks noChangeAspect="1" noChangeArrowheads="1"/>
+          </p:cNvPicPr>
+          <p:nvPr/>
+        </p:nvPicPr>
+        <p:blipFill>
+          <a:blip r:embed="rId5" cstate="print">
+            <a:duotone>
+              <a:schemeClr val="bg2">
+                <a:shade val="45000"/>
+                <a:satMod val="135000"/>
+              </a:schemeClr>
+              <a:prstClr val="white"/>
+            </a:duotone>
+            <a:extLst>
+              <a:ext uri="{28A0092B-C50C-407E-A947-70E740481C1C}">
+                <a14:useLocalDpi xmlns:a14="http://schemas.microsoft.com/office/drawing/2010/main" val="0"/>
+              </a:ext>
+            </a:extLst>
+          </a:blip>
+          <a:srcRect/>
+          <a:stretch>
+            <a:fillRect/>
+          </a:stretch>
+        </p:blipFill>
+        <p:spPr bwMode="auto">
+          <a:xfrm>
+            <a:off x="6724651" y="2213359"/>
+            <a:ext cx="552298" cy="785470"/>
+          </a:xfrm>
+          <a:prstGeom prst="rect">
+            <a:avLst/>
+          </a:prstGeom>
+          <a:noFill/>
+          <a:extLst>
+            <a:ext uri="{909E8E84-426E-40DD-AFC4-6F175D3DCCD1}">
+              <a14:hiddenFill xmlns:a14="http://schemas.microsoft.com/office/drawing/2010/main">
+                <a:solidFill>
+                  <a:srgbClr val="FFFFFF"/>
+                </a:solidFill>
+              </a14:hiddenFill>
+            </a:ext>
+          </a:extLst>
+        </p:spPr>
+      </p:pic>
+      <p:sp>
+        <p:nvSpPr>
+          <p:cNvPr id="30" name="Rectangle 29"/>
+          <p:cNvSpPr>
+            <a:spLocks noChangeAspect="1"/>
+          </p:cNvSpPr>
+          <p:nvPr/>
+        </p:nvSpPr>
+        <p:spPr>
+          <a:xfrm>
+            <a:off x="3405200" y="2090775"/>
+            <a:ext cx="2448000" cy="1836000"/>
+          </a:xfrm>
+          <a:prstGeom prst="rect">
+            <a:avLst/>
+          </a:prstGeom>
+          <a:solidFill>
+            <a:schemeClr val="accent1">
+              <a:lumMod val="20000"/>
+              <a:lumOff val="80000"/>
+            </a:schemeClr>
+          </a:solidFill>
+          <a:ln>
+            <a:solidFill>
+              <a:srgbClr val="0070C0"/>
+            </a:solidFill>
+          </a:ln>
+        </p:spPr>
+        <p:style>
+          <a:lnRef idx="2">
+            <a:schemeClr val="accent1">
+              <a:shade val="50000"/>
+            </a:schemeClr>
+          </a:lnRef>
+          <a:fillRef idx="1">
+            <a:schemeClr val="accent1"/>
+          </a:fillRef>
+          <a:effectRef idx="0">
+            <a:schemeClr val="accent1"/>
+          </a:effectRef>
+          <a:fontRef idx="minor">
+            <a:schemeClr val="lt1"/>
+          </a:fontRef>
+        </p:style>
+        <p:txBody>
+          <a:bodyPr rtlCol="0" anchor="ctr"/>
+          <a:lstStyle/>
+          <a:p>
+            <a:pPr algn="ctr"/>
+            <a:endParaRPr lang="en-SG"/>
+          </a:p>
+        </p:txBody>
+      </p:sp>
+      <p:sp>
+        <p:nvSpPr>
+          <p:cNvPr id="16" name="Pentagon 15"/>
+          <p:cNvSpPr>
+            <a:spLocks noChangeAspect="1"/>
+          </p:cNvSpPr>
+          <p:nvPr/>
+        </p:nvSpPr>
+        <p:spPr>
+          <a:xfrm>
+            <a:off x="65413" y="2028431"/>
+            <a:ext cx="3221975" cy="1940796"/>
+          </a:xfrm>
+          <a:prstGeom prst="homePlate">
+            <a:avLst>
+              <a:gd name="adj" fmla="val 24128"/>
+            </a:avLst>
+          </a:prstGeom>
+          <a:solidFill>
+            <a:schemeClr val="accent3">
+              <a:lumMod val="20000"/>
+              <a:lumOff val="80000"/>
+            </a:schemeClr>
+          </a:solidFill>
+          <a:ln w="57150">
+            <a:solidFill>
+              <a:schemeClr val="bg1"/>
+            </a:solidFill>
+          </a:ln>
+        </p:spPr>
+        <p:style>
+          <a:lnRef idx="2">
+            <a:schemeClr val="accent1">
+              <a:shade val="50000"/>
+            </a:schemeClr>
+          </a:lnRef>
+          <a:fillRef idx="1">
+            <a:schemeClr val="accent1"/>
+          </a:fillRef>
+          <a:effectRef idx="0">
+            <a:schemeClr val="accent1"/>
+          </a:effectRef>
+          <a:fontRef idx="minor">
+            <a:schemeClr val="lt1"/>
+          </a:fontRef>
+        </p:style>
+        <p:txBody>
+          <a:bodyPr rtlCol="0" anchor="ctr"/>
+          <a:lstStyle/>
+          <a:p>
+            <a:pPr algn="ctr"/>
+            <a:endParaRPr lang="en-SG"/>
+          </a:p>
+        </p:txBody>
+      </p:sp>
+      <p:sp>
+        <p:nvSpPr>
+          <p:cNvPr id="18" name="Rounded Rectangle 17"/>
+          <p:cNvSpPr/>
+          <p:nvPr/>
+        </p:nvSpPr>
+        <p:spPr>
+          <a:xfrm>
+            <a:off x="233550" y="2209800"/>
+            <a:ext cx="2281050" cy="990600"/>
+          </a:xfrm>
+          <a:prstGeom prst="roundRect">
+            <a:avLst/>
+          </a:prstGeom>
+          <a:blipFill>
+            <a:blip r:embed="rId6">
+              <a:extLst>
+                <a:ext uri="{BEBA8EAE-BF5A-486C-A8C5-ECC9F3942E4B}">
+                  <a14:imgProps xmlns:a14="http://schemas.microsoft.com/office/drawing/2010/main">
+                    <a14:imgLayer r:embed="rId7">
+                      <a14:imgEffect>
+                        <a14:saturation sat="0"/>
+                      </a14:imgEffect>
+                      <a14:imgEffect>
+                        <a14:brightnessContrast bright="20000" contrast="-20000"/>
+                      </a14:imgEffect>
+                    </a14:imgLayer>
+                  </a14:imgProps>
+                </a:ext>
+              </a:extLst>
+            </a:blip>
+            <a:tile tx="0" ty="0" sx="100000" sy="100000" flip="none" algn="tl"/>
+          </a:blipFill>
+          <a:ln>
+            <a:solidFill>
+              <a:schemeClr val="bg1">
+                <a:lumMod val="85000"/>
+              </a:schemeClr>
+            </a:solidFill>
+          </a:ln>
+          <a:effectLst>
+            <a:innerShdw blurRad="114300">
+              <a:prstClr val="black"/>
+            </a:innerShdw>
+          </a:effectLst>
+        </p:spPr>
+        <p:style>
+          <a:lnRef idx="2">
+            <a:schemeClr val="accent1">
+              <a:shade val="50000"/>
+            </a:schemeClr>
+          </a:lnRef>
+          <a:fillRef idx="1">
+            <a:schemeClr val="accent1"/>
+          </a:fillRef>
+          <a:effectRef idx="0">
+            <a:schemeClr val="accent1"/>
+          </a:effectRef>
+          <a:fontRef idx="minor">
+            <a:schemeClr val="lt1"/>
+          </a:fontRef>
+        </p:style>
+        <p:txBody>
+          <a:bodyPr rtlCol="0" anchor="ctr"/>
+          <a:lstStyle/>
+          <a:p>
+            <a:pPr algn="ctr"/>
+            <a:r>
+              <a:rPr lang="en-US" sz="2000" b="1" dirty="0" smtClean="0">
+                <a:solidFill>
+                  <a:schemeClr val="tx1">
+                    <a:lumMod val="50000"/>
+                    <a:lumOff val="50000"/>
+                  </a:schemeClr>
+                </a:solidFill>
+              </a:rPr>
+              <a:t>Ingredient A (60%)</a:t>
+            </a:r>
+            <a:endParaRPr lang="en-SG" sz="2000" b="1" dirty="0">
+              <a:solidFill>
+                <a:schemeClr val="tx1">
+                  <a:lumMod val="50000"/>
+                  <a:lumOff val="50000"/>
+                </a:schemeClr>
+              </a:solidFill>
+            </a:endParaRPr>
+          </a:p>
+        </p:txBody>
+      </p:sp>
+      <p:sp>
+        <p:nvSpPr>
+          <p:cNvPr id="19" name="TextBox 18"/>
+          <p:cNvSpPr txBox="1"/>
+          <p:nvPr/>
+        </p:nvSpPr>
+        <p:spPr>
+          <a:xfrm>
+            <a:off x="685800" y="1676400"/>
+            <a:ext cx="1600200" cy="381000"/>
+          </a:xfrm>
+          <a:prstGeom prst="rect">
+            <a:avLst/>
+          </a:prstGeom>
+          <a:noFill/>
+        </p:spPr>
+        <p:txBody>
+          <a:bodyPr wrap="square" rtlCol="0">
+            <a:spAutoFit/>
+          </a:bodyPr>
+          <a:lstStyle/>
+          <a:p>
+            <a:pPr algn="ctr"/>
+            <a:r>
+              <a:rPr lang="en-US" b="1" dirty="0" smtClean="0">
+                <a:solidFill>
+                  <a:schemeClr val="bg1">
+                    <a:lumMod val="65000"/>
+                  </a:schemeClr>
+                </a:solidFill>
+              </a:rPr>
+              <a:t>Inputs</a:t>
+            </a:r>
+            <a:endParaRPr lang="en-SG" b="1" dirty="0">
+              <a:solidFill>
+                <a:schemeClr val="bg1">
+                  <a:lumMod val="65000"/>
+                </a:schemeClr>
+              </a:solidFill>
+            </a:endParaRPr>
+          </a:p>
+        </p:txBody>
+      </p:sp>
+      <p:sp>
+        <p:nvSpPr>
+          <p:cNvPr id="22" name="Rounded Rectangle 21"/>
+          <p:cNvSpPr/>
+          <p:nvPr/>
+        </p:nvSpPr>
+        <p:spPr>
+          <a:xfrm>
+            <a:off x="233550" y="3269354"/>
+            <a:ext cx="1384420" cy="588100"/>
+          </a:xfrm>
+          <a:prstGeom prst="roundRect">
+            <a:avLst/>
+          </a:prstGeom>
+          <a:blipFill>
+            <a:blip r:embed="rId8">
+              <a:extLst>
+                <a:ext uri="{BEBA8EAE-BF5A-486C-A8C5-ECC9F3942E4B}">
+                  <a14:imgProps xmlns:a14="http://schemas.microsoft.com/office/drawing/2010/main">
+                    <a14:imgLayer r:embed="rId9">
+                      <a14:imgEffect>
+                        <a14:artisticLineDrawing/>
+                      </a14:imgEffect>
+                      <a14:imgEffect>
+                        <a14:saturation sat="0"/>
+                      </a14:imgEffect>
+                      <a14:imgEffect>
+                        <a14:brightnessContrast bright="40000"/>
+                      </a14:imgEffect>
+                    </a14:imgLayer>
+                  </a14:imgProps>
+                </a:ext>
+              </a:extLst>
+            </a:blip>
+            <a:tile tx="0" ty="0" sx="100000" sy="100000" flip="none" algn="tl"/>
+          </a:blipFill>
+          <a:ln>
+            <a:solidFill>
+              <a:schemeClr val="bg1">
+                <a:lumMod val="85000"/>
+              </a:schemeClr>
+            </a:solidFill>
+          </a:ln>
+          <a:effectLst>
+            <a:innerShdw blurRad="114300">
+              <a:prstClr val="black"/>
+            </a:innerShdw>
+          </a:effectLst>
+        </p:spPr>
+        <p:style>
+          <a:lnRef idx="2">
+            <a:schemeClr val="accent1">
+              <a:shade val="50000"/>
+            </a:schemeClr>
+          </a:lnRef>
+          <a:fillRef idx="1">
+            <a:schemeClr val="accent1"/>
+          </a:fillRef>
+          <a:effectRef idx="0">
+            <a:schemeClr val="accent1"/>
+          </a:effectRef>
+          <a:fontRef idx="minor">
+            <a:schemeClr val="lt1"/>
+          </a:fontRef>
+        </p:style>
+        <p:txBody>
+          <a:bodyPr rtlCol="0" anchor="ctr"/>
+          <a:lstStyle/>
+          <a:p>
+            <a:pPr algn="ctr"/>
+            <a:r>
+              <a:rPr lang="en-US" b="1" dirty="0" smtClean="0">
+                <a:solidFill>
+                  <a:schemeClr val="tx1">
+                    <a:lumMod val="50000"/>
+                    <a:lumOff val="50000"/>
+                  </a:schemeClr>
+                </a:solidFill>
+              </a:rPr>
+              <a:t>Ingredient B (25%)</a:t>
+            </a:r>
+            <a:endParaRPr lang="en-SG" b="1" dirty="0">
+              <a:solidFill>
+                <a:schemeClr val="tx1">
+                  <a:lumMod val="50000"/>
+                  <a:lumOff val="50000"/>
+                </a:schemeClr>
+              </a:solidFill>
+            </a:endParaRPr>
+          </a:p>
+        </p:txBody>
+      </p:sp>
+      <p:sp>
+        <p:nvSpPr>
+          <p:cNvPr id="23" name="Rounded Rectangle 22"/>
+          <p:cNvSpPr/>
+          <p:nvPr/>
+        </p:nvSpPr>
+        <p:spPr>
+          <a:xfrm>
+            <a:off x="1690950" y="3269354"/>
+            <a:ext cx="823650" cy="588100"/>
+          </a:xfrm>
+          <a:prstGeom prst="roundRect">
+            <a:avLst/>
+          </a:prstGeom>
+          <a:blipFill>
+            <a:blip r:embed="rId10">
+              <a:duotone>
+                <a:schemeClr val="bg2">
+                  <a:shade val="45000"/>
+                  <a:satMod val="135000"/>
+                </a:schemeClr>
+                <a:prstClr val="white"/>
+              </a:duotone>
+              <a:extLst>
+                <a:ext uri="{BEBA8EAE-BF5A-486C-A8C5-ECC9F3942E4B}">
+                  <a14:imgProps xmlns:a14="http://schemas.microsoft.com/office/drawing/2010/main">
+                    <a14:imgLayer r:embed="rId11">
+                      <a14:imgEffect>
+                        <a14:saturation sat="0"/>
+                      </a14:imgEffect>
+                      <a14:imgEffect>
+                        <a14:brightnessContrast bright="40000" contrast="40000"/>
+                      </a14:imgEffect>
+                    </a14:imgLayer>
+                  </a14:imgProps>
+                </a:ext>
+              </a:extLst>
+            </a:blip>
+            <a:tile tx="0" ty="0" sx="100000" sy="100000" flip="none" algn="tl"/>
+          </a:blipFill>
+          <a:ln>
+            <a:solidFill>
+              <a:schemeClr val="bg1">
+                <a:lumMod val="85000"/>
+              </a:schemeClr>
+            </a:solidFill>
+          </a:ln>
+          <a:effectLst>
+            <a:innerShdw blurRad="114300">
+              <a:prstClr val="black"/>
+            </a:innerShdw>
+          </a:effectLst>
+        </p:spPr>
+        <p:style>
+          <a:lnRef idx="2">
+            <a:schemeClr val="accent1">
+              <a:shade val="50000"/>
+            </a:schemeClr>
+          </a:lnRef>
+          <a:fillRef idx="1">
+            <a:schemeClr val="accent1"/>
+          </a:fillRef>
+          <a:effectRef idx="0">
+            <a:schemeClr val="accent1"/>
+          </a:effectRef>
+          <a:fontRef idx="minor">
+            <a:schemeClr val="lt1"/>
+          </a:fontRef>
+        </p:style>
+        <p:txBody>
+          <a:bodyPr rtlCol="0" anchor="ctr"/>
+          <a:lstStyle/>
+          <a:p>
+            <a:pPr algn="ctr"/>
+            <a:r>
+              <a:rPr lang="en-US" sz="1600" b="1" dirty="0" smtClean="0">
+                <a:solidFill>
+                  <a:schemeClr val="tx1">
+                    <a:lumMod val="50000"/>
+                    <a:lumOff val="50000"/>
+                  </a:schemeClr>
+                </a:solidFill>
+              </a:rPr>
+              <a:t>C (15%)</a:t>
+            </a:r>
+            <a:endParaRPr lang="en-SG" sz="1600" b="1" dirty="0">
+              <a:solidFill>
+                <a:schemeClr val="tx1">
+                  <a:lumMod val="50000"/>
+                  <a:lumOff val="50000"/>
+                </a:schemeClr>
+              </a:solidFill>
+            </a:endParaRPr>
+          </a:p>
+        </p:txBody>
+      </p:sp>
+      <p:sp>
+        <p:nvSpPr>
+          <p:cNvPr id="24" name="TextBox 23"/>
+          <p:cNvSpPr txBox="1"/>
+          <p:nvPr/>
+        </p:nvSpPr>
+        <p:spPr>
+          <a:xfrm>
+            <a:off x="533400" y="479318"/>
+            <a:ext cx="8001000" cy="800219"/>
+          </a:xfrm>
+          <a:prstGeom prst="rect">
+            <a:avLst/>
+          </a:prstGeom>
+          <a:noFill/>
+        </p:spPr>
+        <p:txBody>
+          <a:bodyPr wrap="square" rtlCol="0">
+            <a:spAutoFit/>
+          </a:bodyPr>
+          <a:lstStyle/>
+          <a:p>
+            <a:r>
+              <a:rPr lang="en-US" sz="2800" b="1" dirty="0" smtClean="0">
+                <a:solidFill>
+                  <a:schemeClr val="accent6">
+                    <a:lumMod val="75000"/>
+                  </a:schemeClr>
+                </a:solidFill>
+              </a:rPr>
+              <a:t>3.</a:t>
+            </a:r>
+            <a:r>
+              <a:rPr lang="en-US" dirty="0" smtClean="0">
+                <a:solidFill>
+                  <a:schemeClr val="accent6">
+                    <a:lumMod val="75000"/>
+                  </a:schemeClr>
+                </a:solidFill>
+              </a:rPr>
+              <a:t> </a:t>
+            </a:r>
+            <a:r>
+              <a:rPr lang="en-US" dirty="0" smtClean="0">
+                <a:solidFill>
+                  <a:schemeClr val="accent6">
+                    <a:lumMod val="75000"/>
+                  </a:schemeClr>
+                </a:solidFill>
+              </a:rPr>
+              <a:t>Select the </a:t>
+            </a:r>
+            <a:r>
+              <a:rPr lang="en-US" dirty="0" smtClean="0">
+                <a:solidFill>
+                  <a:schemeClr val="accent6">
+                    <a:lumMod val="75000"/>
+                  </a:schemeClr>
+                </a:solidFill>
+              </a:rPr>
+              <a:t>blue rectangle and </a:t>
+            </a:r>
+            <a:r>
+              <a:rPr lang="en-US" dirty="0" smtClean="0">
+                <a:solidFill>
+                  <a:schemeClr val="accent6">
+                    <a:lumMod val="75000"/>
+                  </a:schemeClr>
+                </a:solidFill>
+              </a:rPr>
+              <a:t>click  the           </a:t>
+            </a:r>
+            <a:r>
+              <a:rPr lang="en-US" dirty="0" smtClean="0">
+                <a:solidFill>
+                  <a:schemeClr val="accent6">
+                    <a:lumMod val="75000"/>
+                  </a:schemeClr>
+                </a:solidFill>
+              </a:rPr>
+              <a:t>   button to generate a </a:t>
+            </a:r>
+            <a:r>
+              <a:rPr lang="en-US" i="1" dirty="0" smtClean="0">
+                <a:solidFill>
+                  <a:schemeClr val="accent6">
+                    <a:lumMod val="75000"/>
+                  </a:schemeClr>
+                </a:solidFill>
+              </a:rPr>
+              <a:t>zoom out </a:t>
+            </a:r>
+            <a:r>
+              <a:rPr lang="en-US" dirty="0" smtClean="0">
+                <a:solidFill>
+                  <a:schemeClr val="accent6">
+                    <a:lumMod val="75000"/>
+                  </a:schemeClr>
+                </a:solidFill>
+              </a:rPr>
+              <a:t>effect from the previous slide.</a:t>
+            </a:r>
+            <a:endParaRPr lang="en-SG" dirty="0">
+              <a:solidFill>
+                <a:schemeClr val="accent6">
+                  <a:lumMod val="75000"/>
+                </a:schemeClr>
+              </a:solidFill>
+            </a:endParaRPr>
+          </a:p>
+        </p:txBody>
+      </p:sp>
+      <p:pic>
+        <p:nvPicPr>
+          <p:cNvPr id="13314" name="Picture 2"/>
+          <p:cNvPicPr>
+            <a:picLocks noChangeAspect="1" noChangeArrowheads="1"/>
+          </p:cNvPicPr>
+          <p:nvPr/>
+        </p:nvPicPr>
+        <p:blipFill>
+          <a:blip r:embed="rId12">
+            <a:extLst>
+              <a:ext uri="{28A0092B-C50C-407E-A947-70E740481C1C}">
+                <a14:useLocalDpi xmlns:a14="http://schemas.microsoft.com/office/drawing/2010/main" val="0"/>
+              </a:ext>
+            </a:extLst>
+          </a:blip>
+          <a:srcRect/>
+          <a:stretch>
+            <a:fillRect/>
+          </a:stretch>
+        </p:blipFill>
+        <p:spPr bwMode="auto">
+          <a:xfrm>
+            <a:off x="4605448" y="480567"/>
+            <a:ext cx="499951" cy="821348"/>
+          </a:xfrm>
+          <a:prstGeom prst="rect">
+            <a:avLst/>
+          </a:prstGeom>
+          <a:noFill/>
+          <a:ln w="9525">
+            <a:solidFill>
+              <a:schemeClr val="bg1">
+                <a:lumMod val="85000"/>
+              </a:schemeClr>
+            </a:solidFill>
+            <a:miter lim="800000"/>
+            <a:headEnd/>
+            <a:tailEnd/>
+          </a:ln>
+          <a:extLst>
+            <a:ext uri="{909E8E84-426E-40DD-AFC4-6F175D3DCCD1}">
+              <a14:hiddenFill xmlns:a14="http://schemas.microsoft.com/office/drawing/2010/main">
+                <a:solidFill>
+                  <a:schemeClr val="accent1"/>
+                </a:solidFill>
+              </a14:hiddenFill>
+            </a:ext>
+            <a:ext uri="{91240B29-F687-4F45-9708-019B960494DF}">
+              <a14:hiddenLine xmlns:a14="http://schemas.microsoft.com/office/drawing/2010/main" w="9525">
+                <a:solidFill>
+                  <a:schemeClr val="tx1"/>
+                </a:solidFill>
+                <a:miter lim="800000"/>
+                <a:headEnd/>
+                <a:tailEnd/>
+              </a14:hiddenLine>
+            </a:ext>
+          </a:extLst>
+        </p:spPr>
+      </p:pic>
+      <p:sp>
+        <p:nvSpPr>
+          <p:cNvPr id="25" name="TextBox 24"/>
+          <p:cNvSpPr txBox="1"/>
+          <p:nvPr/>
+        </p:nvSpPr>
+        <p:spPr>
+          <a:xfrm>
+            <a:off x="495300" y="4724400"/>
+            <a:ext cx="8001000" cy="800219"/>
+          </a:xfrm>
+          <a:prstGeom prst="rect">
+            <a:avLst/>
+          </a:prstGeom>
+          <a:noFill/>
+        </p:spPr>
+        <p:txBody>
+          <a:bodyPr wrap="square" rtlCol="0">
+            <a:spAutoFit/>
+          </a:bodyPr>
+          <a:lstStyle/>
+          <a:p>
+            <a:r>
+              <a:rPr lang="en-US" sz="2800" b="1" dirty="0" smtClean="0">
+                <a:solidFill>
+                  <a:schemeClr val="accent6">
+                    <a:lumMod val="75000"/>
+                  </a:schemeClr>
+                </a:solidFill>
+              </a:rPr>
+              <a:t>4.</a:t>
+            </a:r>
+            <a:r>
+              <a:rPr lang="en-US" dirty="0" smtClean="0">
+                <a:solidFill>
+                  <a:schemeClr val="accent6">
+                    <a:lumMod val="75000"/>
+                  </a:schemeClr>
+                </a:solidFill>
+              </a:rPr>
+              <a:t> Go back a couple of slides and ‘play’ the slide show to see </a:t>
+            </a:r>
+            <a:r>
+              <a:rPr lang="en-US" i="1" dirty="0" smtClean="0">
+                <a:solidFill>
+                  <a:schemeClr val="accent6">
+                    <a:lumMod val="75000"/>
+                  </a:schemeClr>
+                </a:solidFill>
+              </a:rPr>
+              <a:t>zoom out </a:t>
+            </a:r>
+            <a:r>
+              <a:rPr lang="en-US" dirty="0" smtClean="0">
+                <a:solidFill>
+                  <a:schemeClr val="accent6">
+                    <a:lumMod val="75000"/>
+                  </a:schemeClr>
+                </a:solidFill>
+              </a:rPr>
+              <a:t>effect generated</a:t>
+            </a:r>
+            <a:r>
+              <a:rPr lang="en-US" dirty="0" smtClean="0">
+                <a:solidFill>
+                  <a:schemeClr val="accent6">
+                    <a:lumMod val="75000"/>
+                  </a:schemeClr>
+                </a:solidFill>
+              </a:rPr>
+              <a:t>.</a:t>
+            </a:r>
+            <a:endParaRPr lang="en-SG" dirty="0">
+              <a:solidFill>
+                <a:schemeClr val="accent6">
+                  <a:lumMod val="75000"/>
+                </a:schemeClr>
+              </a:solidFill>
+            </a:endParaRPr>
+          </a:p>
+        </p:txBody>
+      </p:sp>
+    </p:spTree>
+    <p:extLst>
+      <p:ext uri="{BB962C8B-B14F-4D97-AF65-F5344CB8AC3E}">
+        <p14:creationId xmlns:p14="http://schemas.microsoft.com/office/powerpoint/2010/main" val="689572744"/>
+      </p:ext>
+    </p:extLst>
+  </p:cSld>
+  <p:clrMapOvr>
+    <a:masterClrMapping/>
+  </p:clrMapOvr>
+  <mc:AlternateContent xmlns:mc="http://schemas.openxmlformats.org/markup-compatibility/2006">
+    <mc:Choice xmlns:p14="http://schemas.microsoft.com/office/powerpoint/2010/main" Requires="p14">
+      <p:transition spd="slow" p14:dur="2000"/>
+    </mc:Choice>
+    <mc:Fallback>
+      <p:transition spd="slow"/>
+    </mc:Fallback>
+  </mc:AlternateContent>
+  <p:timing>
+    <p:tnLst>
+      <p:par>
+        <p:cTn id="1" dur="indefinite" restart="never" nodeType="tmRoot"/>
+      </p:par>
+    </p:tnLst>
+  </p:timing>
+</p:sld>
+</file>
+
+<file path=ppt/slides/slide17.xml><?xml version="1.0" encoding="utf-8"?>
 <p:sld xmlns:a="http://schemas.openxmlformats.org/drawingml/2006/main" xmlns:r="http://schemas.openxmlformats.org/officeDocument/2006/relationships" xmlns:p="http://schemas.openxmlformats.org/presentationml/2006/main">
   <p:cSld>
     <p:spTree>
@@ -6367,7 +10196,7 @@
 </p:sld>
 </file>
 
-<file path=ppt/slides/slide14.xml><?xml version="1.0" encoding="utf-8"?>
+<file path=ppt/slides/slide18.xml><?xml version="1.0" encoding="utf-8"?>
 <p:sld xmlns:a="http://schemas.openxmlformats.org/drawingml/2006/main" xmlns:r="http://schemas.openxmlformats.org/officeDocument/2006/relationships" xmlns:p="http://schemas.openxmlformats.org/presentationml/2006/main">
   <p:cSld>
     <p:spTree>
@@ -6778,7 +10607,7 @@
 </p:sld>
 </file>
 
-<file path=ppt/slides/slide15.xml><?xml version="1.0" encoding="utf-8"?>
+<file path=ppt/slides/slide19.xml><?xml version="1.0" encoding="utf-8"?>
 <p:sld xmlns:a="http://schemas.openxmlformats.org/drawingml/2006/main" xmlns:r="http://schemas.openxmlformats.org/officeDocument/2006/relationships" xmlns:p="http://schemas.openxmlformats.org/presentationml/2006/main">
   <p:cSld>
     <p:spTree>
@@ -7062,142 +10891,6 @@
   <p:clrMapOvr>
     <a:masterClrMapping/>
   </p:clrMapOvr>
-  <p:timing>
-    <p:tnLst>
-      <p:par>
-        <p:cTn id="1" dur="indefinite" restart="never" nodeType="tmRoot"/>
-      </p:par>
-    </p:tnLst>
-  </p:timing>
-</p:sld>
-</file>
-
-<file path=ppt/slides/slide16.xml><?xml version="1.0" encoding="utf-8"?>
-<p:sld xmlns:a="http://schemas.openxmlformats.org/drawingml/2006/main" xmlns:r="http://schemas.openxmlformats.org/officeDocument/2006/relationships" xmlns:p="http://schemas.openxmlformats.org/presentationml/2006/main" show="0">
-  <p:cSld name="PPAck201401021130490549">
-    <p:spTree>
-      <p:nvGrpSpPr>
-        <p:cNvPr id="1" name=""/>
-        <p:cNvGrpSpPr/>
-        <p:nvPr/>
-      </p:nvGrpSpPr>
-      <p:grpSpPr>
-        <a:xfrm>
-          <a:off x="0" y="0"/>
-          <a:ext cx="0" cy="0"/>
-          <a:chOff x="0" y="0"/>
-          <a:chExt cx="0" cy="0"/>
-        </a:xfrm>
-      </p:grpSpPr>
-      <p:pic>
-        <p:nvPicPr>
-          <p:cNvPr id="4" name="Content Placeholder 3"/>
-          <p:cNvPicPr>
-            <a:picLocks noGrp="1"/>
-          </p:cNvPicPr>
-          <p:nvPr>
-            <p:ph idx="1"/>
-          </p:nvPr>
-        </p:nvPicPr>
-        <p:blipFill>
-          <a:blip r:embed="rId2">
-            <a:extLst>
-              <a:ext uri="{28A0092B-C50C-407E-A947-70E740481C1C}">
-                <a14:useLocalDpi xmlns:a14="http://schemas.microsoft.com/office/drawing/2010/main" val="0"/>
-              </a:ext>
-            </a:extLst>
-          </a:blip>
-          <a:stretch>
-            <a:fillRect/>
-          </a:stretch>
-        </p:blipFill>
-        <p:spPr>
-          <a:xfrm>
-            <a:off x="1074665" y="1600200"/>
-            <a:ext cx="6994670" cy="4525963"/>
-          </a:xfrm>
-        </p:spPr>
-      </p:pic>
-      <p:sp>
-        <p:nvSpPr>
-          <p:cNvPr id="5" name="TextBox 4"/>
-          <p:cNvSpPr txBox="1"/>
-          <p:nvPr/>
-        </p:nvSpPr>
-        <p:spPr>
-          <a:xfrm>
-            <a:off x="533400" y="479318"/>
-            <a:ext cx="8001000" cy="369332"/>
-          </a:xfrm>
-          <a:prstGeom prst="rect">
-            <a:avLst/>
-          </a:prstGeom>
-          <a:noFill/>
-        </p:spPr>
-        <p:txBody>
-          <a:bodyPr wrap="square" rtlCol="0">
-            <a:spAutoFit/>
-          </a:bodyPr>
-          <a:lstStyle/>
-          <a:p>
-            <a:r>
-              <a:rPr lang="en-US" dirty="0" smtClean="0">
-                <a:solidFill>
-                  <a:schemeClr val="accent6">
-                    <a:lumMod val="75000"/>
-                  </a:schemeClr>
-                </a:solidFill>
-              </a:rPr>
-              <a:t>This slide is added by </a:t>
-            </a:r>
-            <a:r>
-              <a:rPr lang="en-US" dirty="0" err="1" smtClean="0">
-                <a:solidFill>
-                  <a:schemeClr val="accent6">
-                    <a:lumMod val="75000"/>
-                  </a:schemeClr>
-                </a:solidFill>
-              </a:rPr>
-              <a:t>PowerPointLabs</a:t>
-            </a:r>
-            <a:r>
-              <a:rPr lang="en-US" dirty="0" smtClean="0">
-                <a:solidFill>
-                  <a:schemeClr val="accent6">
-                    <a:lumMod val="75000"/>
-                  </a:schemeClr>
-                </a:solidFill>
-              </a:rPr>
-              <a:t>. It will not show up during the presentation. </a:t>
-            </a:r>
-            <a:endParaRPr lang="en-SG" dirty="0">
-              <a:solidFill>
-                <a:schemeClr val="accent6">
-                  <a:lumMod val="75000"/>
-                </a:schemeClr>
-              </a:solidFill>
-            </a:endParaRPr>
-          </a:p>
-        </p:txBody>
-      </p:sp>
-    </p:spTree>
-    <p:extLst>
-      <p:ext uri="{BB962C8B-B14F-4D97-AF65-F5344CB8AC3E}">
-        <p14:creationId xmlns:p14="http://schemas.microsoft.com/office/powerpoint/2010/main" val="4191855601"/>
-      </p:ext>
-    </p:extLst>
-  </p:cSld>
-  <p:clrMapOvr>
-    <a:masterClrMapping/>
-  </p:clrMapOvr>
-  <mc:AlternateContent xmlns:mc="http://schemas.openxmlformats.org/markup-compatibility/2006" xmlns:p14="http://schemas.microsoft.com/office/powerpoint/2010/main">
-    <mc:Choice Requires="p14">
-      <p:transition spd="slow" p14:dur="2000"/>
-    </mc:Choice>
-    <mc:Fallback xmlns="">
-      <p:transition spd="slow"/>
-    </mc:Fallback>
-  </mc:AlternateContent>
   <p:timing>
     <p:tnLst>
       <p:par>
@@ -7424,6 +11117,142 @@
   <p:clrMapOvr>
     <a:masterClrMapping/>
   </p:clrMapOvr>
+  <p:timing>
+    <p:tnLst>
+      <p:par>
+        <p:cTn id="1" dur="indefinite" restart="never" nodeType="tmRoot"/>
+      </p:par>
+    </p:tnLst>
+  </p:timing>
+</p:sld>
+</file>
+
+<file path=ppt/slides/slide20.xml><?xml version="1.0" encoding="utf-8"?>
+<p:sld xmlns:a="http://schemas.openxmlformats.org/drawingml/2006/main" xmlns:r="http://schemas.openxmlformats.org/officeDocument/2006/relationships" xmlns:p="http://schemas.openxmlformats.org/presentationml/2006/main" show="0">
+  <p:cSld name="PPAck201401021130490549">
+    <p:spTree>
+      <p:nvGrpSpPr>
+        <p:cNvPr id="1" name=""/>
+        <p:cNvGrpSpPr/>
+        <p:nvPr/>
+      </p:nvGrpSpPr>
+      <p:grpSpPr>
+        <a:xfrm>
+          <a:off x="0" y="0"/>
+          <a:ext cx="0" cy="0"/>
+          <a:chOff x="0" y="0"/>
+          <a:chExt cx="0" cy="0"/>
+        </a:xfrm>
+      </p:grpSpPr>
+      <p:pic>
+        <p:nvPicPr>
+          <p:cNvPr id="4" name="Content Placeholder 3"/>
+          <p:cNvPicPr>
+            <a:picLocks noGrp="1"/>
+          </p:cNvPicPr>
+          <p:nvPr>
+            <p:ph idx="1"/>
+          </p:nvPr>
+        </p:nvPicPr>
+        <p:blipFill>
+          <a:blip r:embed="rId2">
+            <a:extLst>
+              <a:ext uri="{28A0092B-C50C-407E-A947-70E740481C1C}">
+                <a14:useLocalDpi xmlns:a14="http://schemas.microsoft.com/office/drawing/2010/main" val="0"/>
+              </a:ext>
+            </a:extLst>
+          </a:blip>
+          <a:stretch>
+            <a:fillRect/>
+          </a:stretch>
+        </p:blipFill>
+        <p:spPr>
+          <a:xfrm>
+            <a:off x="1074665" y="1600200"/>
+            <a:ext cx="6994670" cy="4525963"/>
+          </a:xfrm>
+        </p:spPr>
+      </p:pic>
+      <p:sp>
+        <p:nvSpPr>
+          <p:cNvPr id="5" name="TextBox 4"/>
+          <p:cNvSpPr txBox="1"/>
+          <p:nvPr/>
+        </p:nvSpPr>
+        <p:spPr>
+          <a:xfrm>
+            <a:off x="533400" y="479318"/>
+            <a:ext cx="8001000" cy="369332"/>
+          </a:xfrm>
+          <a:prstGeom prst="rect">
+            <a:avLst/>
+          </a:prstGeom>
+          <a:noFill/>
+        </p:spPr>
+        <p:txBody>
+          <a:bodyPr wrap="square" rtlCol="0">
+            <a:spAutoFit/>
+          </a:bodyPr>
+          <a:lstStyle/>
+          <a:p>
+            <a:r>
+              <a:rPr lang="en-US" dirty="0" smtClean="0">
+                <a:solidFill>
+                  <a:schemeClr val="accent6">
+                    <a:lumMod val="75000"/>
+                  </a:schemeClr>
+                </a:solidFill>
+              </a:rPr>
+              <a:t>This slide is added by </a:t>
+            </a:r>
+            <a:r>
+              <a:rPr lang="en-US" dirty="0" err="1" smtClean="0">
+                <a:solidFill>
+                  <a:schemeClr val="accent6">
+                    <a:lumMod val="75000"/>
+                  </a:schemeClr>
+                </a:solidFill>
+              </a:rPr>
+              <a:t>PowerPointLabs</a:t>
+            </a:r>
+            <a:r>
+              <a:rPr lang="en-US" dirty="0" smtClean="0">
+                <a:solidFill>
+                  <a:schemeClr val="accent6">
+                    <a:lumMod val="75000"/>
+                  </a:schemeClr>
+                </a:solidFill>
+              </a:rPr>
+              <a:t>. It will not show up during the presentation. </a:t>
+            </a:r>
+            <a:endParaRPr lang="en-SG" dirty="0">
+              <a:solidFill>
+                <a:schemeClr val="accent6">
+                  <a:lumMod val="75000"/>
+                </a:schemeClr>
+              </a:solidFill>
+            </a:endParaRPr>
+          </a:p>
+        </p:txBody>
+      </p:sp>
+    </p:spTree>
+    <p:extLst>
+      <p:ext uri="{BB962C8B-B14F-4D97-AF65-F5344CB8AC3E}">
+        <p14:creationId xmlns:p14="http://schemas.microsoft.com/office/powerpoint/2010/main" val="4191855601"/>
+      </p:ext>
+    </p:extLst>
+  </p:cSld>
+  <p:clrMapOvr>
+    <a:masterClrMapping/>
+  </p:clrMapOvr>
+  <mc:AlternateContent xmlns:mc="http://schemas.openxmlformats.org/markup-compatibility/2006" xmlns:p14="http://schemas.microsoft.com/office/powerpoint/2010/main">
+    <mc:Choice Requires="p14">
+      <p:transition spd="slow" p14:dur="2000"/>
+    </mc:Choice>
+    <mc:Fallback xmlns="">
+      <p:transition spd="slow"/>
+    </mc:Fallback>
+  </mc:AlternateContent>
   <p:timing>
     <p:tnLst>
       <p:par>
@@ -10098,7 +13927,7 @@
 
 <file path=ppt/slides/slide8.xml><?xml version="1.0" encoding="utf-8"?>
 <p:sld xmlns:a="http://schemas.openxmlformats.org/drawingml/2006/main" xmlns:r="http://schemas.openxmlformats.org/officeDocument/2006/relationships" xmlns:p="http://schemas.openxmlformats.org/presentationml/2006/main">
-  <p:cSld>
+  <p:cSld name="PPSlideStart201402171123497521">
     <p:spTree>
       <p:nvGrpSpPr>
         <p:cNvPr id="1" name=""/>
@@ -10547,7 +14376,7 @@
 
 <file path=ppt/slides/slide9.xml><?xml version="1.0" encoding="utf-8"?>
 <p:sld xmlns:a="http://schemas.openxmlformats.org/drawingml/2006/main" xmlns:r="http://schemas.openxmlformats.org/officeDocument/2006/relationships" xmlns:p="http://schemas.openxmlformats.org/presentationml/2006/main">
-  <p:cSld>
+  <p:cSld name="PPSlideEnd201402171123497691">
     <p:spTree>
       <p:nvGrpSpPr>
         <p:cNvPr id="1" name=""/>
@@ -10783,11 +14612,11 @@
   <p:clrMapOvr>
     <a:masterClrMapping/>
   </p:clrMapOvr>
-  <mc:AlternateContent xmlns:mc="http://schemas.openxmlformats.org/markup-compatibility/2006" xmlns:p14="http://schemas.microsoft.com/office/powerpoint/2010/main">
-    <mc:Choice Requires="p14">
+  <mc:AlternateContent xmlns:mc="http://schemas.openxmlformats.org/markup-compatibility/2006">
+    <mc:Choice xmlns:p14="http://schemas.microsoft.com/office/powerpoint/2010/main" Requires="p14">
       <p:transition p14:dur="0"/>
     </mc:Choice>
-    <mc:Fallback xmlns="">
+    <mc:Fallback>
       <p:transition/>
     </mc:Fallback>
   </mc:AlternateContent>

</xml_diff>

<commit_message>
Issue 222: Update quick tutorial for V1.6 Update Issue 222
</commit_message>
<xml_diff>
--- a/doc/PowerPointLabs Quick Tutorial.pptx
+++ b/doc/PowerPointLabs Quick Tutorial.pptx
@@ -5,7 +5,7 @@
     <p:sldMasterId id="2147483648" r:id="rId1"/>
   </p:sldMasterIdLst>
   <p:notesMasterIdLst>
-    <p:notesMasterId r:id="rId22"/>
+    <p:notesMasterId r:id="rId26"/>
   </p:notesMasterIdLst>
   <p:sldIdLst>
     <p:sldId id="296" r:id="rId2"/>
@@ -22,12 +22,16 @@
     <p:sldId id="307" r:id="rId13"/>
     <p:sldId id="312" r:id="rId14"/>
     <p:sldId id="313" r:id="rId15"/>
-    <p:sldId id="314" r:id="rId16"/>
-    <p:sldId id="322" r:id="rId17"/>
-    <p:sldId id="310" r:id="rId18"/>
-    <p:sldId id="309" r:id="rId19"/>
-    <p:sldId id="305" r:id="rId20"/>
-    <p:sldId id="299" r:id="rId21"/>
+    <p:sldId id="324" r:id="rId16"/>
+    <p:sldId id="314" r:id="rId17"/>
+    <p:sldId id="322" r:id="rId18"/>
+    <p:sldId id="325" r:id="rId19"/>
+    <p:sldId id="309" r:id="rId20"/>
+    <p:sldId id="327" r:id="rId21"/>
+    <p:sldId id="310" r:id="rId22"/>
+    <p:sldId id="326" r:id="rId23"/>
+    <p:sldId id="305" r:id="rId24"/>
+    <p:sldId id="299" r:id="rId25"/>
   </p:sldIdLst>
   <p:sldSz cx="9144000" cy="6858000" type="screen4x3"/>
   <p:notesSz cx="6858000" cy="9144000"/>
@@ -129,21 +133,21 @@
   <p:extLst>
     <p:ext uri="{521415D9-36F7-43E2-AB2F-B90AF26B5E84}">
       <p14:sectionLst xmlns:p14="http://schemas.microsoft.com/office/powerpoint/2010/main">
-        <p14:section name="Spotlight" id="{DDE8DD22-B65B-4E28-9F29-690797D3DB05}">
+        <p14:section name="Intro to the tutorial" id="{DDE8DD22-B65B-4E28-9F29-690797D3DB05}">
           <p14:sldIdLst>
             <p14:sldId id="296"/>
             <p14:sldId id="297"/>
             <p14:sldId id="302"/>
           </p14:sldIdLst>
         </p14:section>
-        <p14:section name="Spotlight tutorial" id="{8CD7C399-6355-4158-BCB9-F9597BC1ABA9}">
+        <p14:section name="Spotlight" id="{8CD7C399-6355-4158-BCB9-F9597BC1ABA9}">
           <p14:sldIdLst>
             <p14:sldId id="300"/>
             <p14:sldId id="295"/>
             <p14:sldId id="301"/>
           </p14:sldIdLst>
         </p14:section>
-        <p14:section name="Auto-animate tutorial" id="{6FDF723C-725B-43A9-867B-50B5C5A22F3E}">
+        <p14:section name="Auto animate" id="{6FDF723C-725B-43A9-867B-50B5C5A22F3E}">
           <p14:sldIdLst>
             <p14:sldId id="303"/>
             <p14:sldId id="261"/>
@@ -153,18 +157,26 @@
             <p14:sldId id="307"/>
           </p14:sldIdLst>
         </p14:section>
-        <p14:section name="Auto zoom feature" id="{9606B9C2-AF7E-4CB4-A456-1CB76A03EF99}">
+        <p14:section name="Auto zoom" id="{9606B9C2-AF7E-4CB4-A456-1CB76A03EF99}">
           <p14:sldIdLst>
             <p14:sldId id="312"/>
             <p14:sldId id="313"/>
+            <p14:sldId id="324"/>
             <p14:sldId id="314"/>
             <p14:sldId id="322"/>
+          </p14:sldIdLst>
+        </p14:section>
+        <p14:section name="Auto crop" id="{DDB04417-8152-4521-BA24-82CCACEE4E79}">
+          <p14:sldIdLst>
+            <p14:sldId id="325"/>
+            <p14:sldId id="309"/>
+            <p14:sldId id="327"/>
           </p14:sldIdLst>
         </p14:section>
         <p14:section name="Auto narrate and auto captions" id="{A9769C45-8345-410D-A2DA-6DEBD5D41D7C}">
           <p14:sldIdLst>
             <p14:sldId id="310"/>
-            <p14:sldId id="309"/>
+            <p14:sldId id="326"/>
           </p14:sldIdLst>
         </p14:section>
         <p14:section name="Wrap up" id="{5BBA1A93-B239-4917-BAC7-9CBE7A60C0BF}">
@@ -176,7 +188,7 @@
       </p14:sectionLst>
     </p:ext>
     <p:ext uri="{EFAFB233-063F-42B5-8137-9DF3F51BA10A}">
-      <p15:sldGuideLst xmlns:p15="http://schemas.microsoft.com/office/powerpoint/2012/main" xmlns="">
+      <p15:sldGuideLst xmlns="" xmlns:p15="http://schemas.microsoft.com/office/powerpoint/2012/main">
         <p15:guide id="1" orient="horz" pos="2160">
           <p15:clr>
             <a:srgbClr val="A4A3A4"/>
@@ -400,7 +412,7 @@
           <a:p>
             <a:fld id="{3E86CC0F-BBF3-4E07-94E0-0549B7D560A9}" type="datetimeFigureOut">
               <a:rPr lang="en-SG" smtClean="0"/>
-              <a:t>17/2/2014</a:t>
+              <a:t>24/2/2014</a:t>
             </a:fld>
             <a:endParaRPr lang="en-SG"/>
           </a:p>
@@ -849,7 +861,223 @@
           <a:p>
             <a:fld id="{0015B511-83B7-463E-ACD1-0C1C081EBBC4}" type="slidenum">
               <a:rPr lang="en-SG" smtClean="0"/>
-              <a:t>18</a:t>
+              <a:t>19</a:t>
+            </a:fld>
+            <a:endParaRPr lang="en-SG"/>
+          </a:p>
+        </p:txBody>
+      </p:sp>
+    </p:spTree>
+    <p:extLst>
+      <p:ext uri="{BB962C8B-B14F-4D97-AF65-F5344CB8AC3E}">
+        <p14:creationId xmlns:p14="http://schemas.microsoft.com/office/powerpoint/2010/main" val="1548716900"/>
+      </p:ext>
+    </p:extLst>
+  </p:cSld>
+  <p:clrMapOvr>
+    <a:masterClrMapping/>
+  </p:clrMapOvr>
+</p:notes>
+</file>
+
+<file path=ppt/notesSlides/notesSlide3.xml><?xml version="1.0" encoding="utf-8"?>
+<p:notes xmlns:a="http://schemas.openxmlformats.org/drawingml/2006/main" xmlns:r="http://schemas.openxmlformats.org/officeDocument/2006/relationships" xmlns:p="http://schemas.openxmlformats.org/presentationml/2006/main">
+  <p:cSld>
+    <p:spTree>
+      <p:nvGrpSpPr>
+        <p:cNvPr id="1" name=""/>
+        <p:cNvGrpSpPr/>
+        <p:nvPr/>
+      </p:nvGrpSpPr>
+      <p:grpSpPr>
+        <a:xfrm>
+          <a:off x="0" y="0"/>
+          <a:ext cx="0" cy="0"/>
+          <a:chOff x="0" y="0"/>
+          <a:chExt cx="0" cy="0"/>
+        </a:xfrm>
+      </p:grpSpPr>
+      <p:sp>
+        <p:nvSpPr>
+          <p:cNvPr id="2" name="Slide Image Placeholder 1"/>
+          <p:cNvSpPr>
+            <a:spLocks noGrp="1" noRot="1" noChangeAspect="1"/>
+          </p:cNvSpPr>
+          <p:nvPr>
+            <p:ph type="sldImg"/>
+          </p:nvPr>
+        </p:nvSpPr>
+        <p:spPr/>
+      </p:sp>
+      <p:sp>
+        <p:nvSpPr>
+          <p:cNvPr id="3" name="Notes Placeholder 2"/>
+          <p:cNvSpPr>
+            <a:spLocks noGrp="1"/>
+          </p:cNvSpPr>
+          <p:nvPr>
+            <p:ph type="body" idx="1"/>
+          </p:nvPr>
+        </p:nvSpPr>
+        <p:spPr/>
+        <p:txBody>
+          <a:bodyPr/>
+          <a:lstStyle/>
+          <a:p>
+            <a:r>
+              <a:rPr lang="en-US" dirty="0" smtClean="0"/>
+              <a:t>This will</a:t>
+            </a:r>
+            <a:r>
+              <a:rPr lang="en-US" baseline="0" dirty="0" smtClean="0"/>
+              <a:t> play at the beginning.</a:t>
+            </a:r>
+          </a:p>
+          <a:p>
+            <a:r>
+              <a:rPr lang="en-US" baseline="0" dirty="0" smtClean="0"/>
+              <a:t>[</a:t>
+            </a:r>
+            <a:r>
+              <a:rPr lang="en-US" baseline="0" dirty="0" err="1" smtClean="0"/>
+              <a:t>afterClick</a:t>
+            </a:r>
+            <a:r>
+              <a:rPr lang="en-US" baseline="0" dirty="0" smtClean="0"/>
+              <a:t>] This will play after you click.</a:t>
+            </a:r>
+          </a:p>
+          <a:p>
+            <a:endParaRPr lang="en-SG" dirty="0"/>
+          </a:p>
+        </p:txBody>
+      </p:sp>
+      <p:sp>
+        <p:nvSpPr>
+          <p:cNvPr id="4" name="Slide Number Placeholder 3"/>
+          <p:cNvSpPr>
+            <a:spLocks noGrp="1"/>
+          </p:cNvSpPr>
+          <p:nvPr>
+            <p:ph type="sldNum" sz="quarter" idx="10"/>
+          </p:nvPr>
+        </p:nvSpPr>
+        <p:spPr/>
+        <p:txBody>
+          <a:bodyPr/>
+          <a:lstStyle/>
+          <a:p>
+            <a:fld id="{0015B511-83B7-463E-ACD1-0C1C081EBBC4}" type="slidenum">
+              <a:rPr lang="en-SG" smtClean="0"/>
+              <a:t>20</a:t>
+            </a:fld>
+            <a:endParaRPr lang="en-SG"/>
+          </a:p>
+        </p:txBody>
+      </p:sp>
+    </p:spTree>
+    <p:extLst>
+      <p:ext uri="{BB962C8B-B14F-4D97-AF65-F5344CB8AC3E}">
+        <p14:creationId xmlns:p14="http://schemas.microsoft.com/office/powerpoint/2010/main" val="1548716900"/>
+      </p:ext>
+    </p:extLst>
+  </p:cSld>
+  <p:clrMapOvr>
+    <a:masterClrMapping/>
+  </p:clrMapOvr>
+</p:notes>
+</file>
+
+<file path=ppt/notesSlides/notesSlide4.xml><?xml version="1.0" encoding="utf-8"?>
+<p:notes xmlns:a="http://schemas.openxmlformats.org/drawingml/2006/main" xmlns:r="http://schemas.openxmlformats.org/officeDocument/2006/relationships" xmlns:p="http://schemas.openxmlformats.org/presentationml/2006/main">
+  <p:cSld>
+    <p:spTree>
+      <p:nvGrpSpPr>
+        <p:cNvPr id="1" name=""/>
+        <p:cNvGrpSpPr/>
+        <p:nvPr/>
+      </p:nvGrpSpPr>
+      <p:grpSpPr>
+        <a:xfrm>
+          <a:off x="0" y="0"/>
+          <a:ext cx="0" cy="0"/>
+          <a:chOff x="0" y="0"/>
+          <a:chExt cx="0" cy="0"/>
+        </a:xfrm>
+      </p:grpSpPr>
+      <p:sp>
+        <p:nvSpPr>
+          <p:cNvPr id="2" name="Slide Image Placeholder 1"/>
+          <p:cNvSpPr>
+            <a:spLocks noGrp="1" noRot="1" noChangeAspect="1"/>
+          </p:cNvSpPr>
+          <p:nvPr>
+            <p:ph type="sldImg"/>
+          </p:nvPr>
+        </p:nvSpPr>
+        <p:spPr/>
+      </p:sp>
+      <p:sp>
+        <p:nvSpPr>
+          <p:cNvPr id="3" name="Notes Placeholder 2"/>
+          <p:cNvSpPr>
+            <a:spLocks noGrp="1"/>
+          </p:cNvSpPr>
+          <p:nvPr>
+            <p:ph type="body" idx="1"/>
+          </p:nvPr>
+        </p:nvSpPr>
+        <p:spPr/>
+        <p:txBody>
+          <a:bodyPr/>
+          <a:lstStyle/>
+          <a:p>
+            <a:r>
+              <a:rPr lang="en-US" dirty="0" smtClean="0"/>
+              <a:t>This will</a:t>
+            </a:r>
+            <a:r>
+              <a:rPr lang="en-US" baseline="0" dirty="0" smtClean="0"/>
+              <a:t> play at the beginning.</a:t>
+            </a:r>
+          </a:p>
+          <a:p>
+            <a:r>
+              <a:rPr lang="en-US" baseline="0" dirty="0" smtClean="0"/>
+              <a:t>[</a:t>
+            </a:r>
+            <a:r>
+              <a:rPr lang="en-US" baseline="0" dirty="0" err="1" smtClean="0"/>
+              <a:t>afterClick</a:t>
+            </a:r>
+            <a:r>
+              <a:rPr lang="en-US" baseline="0" dirty="0" smtClean="0"/>
+              <a:t>] This will play after you click.</a:t>
+            </a:r>
+          </a:p>
+          <a:p>
+            <a:endParaRPr lang="en-SG" dirty="0"/>
+          </a:p>
+        </p:txBody>
+      </p:sp>
+      <p:sp>
+        <p:nvSpPr>
+          <p:cNvPr id="4" name="Slide Number Placeholder 3"/>
+          <p:cNvSpPr>
+            <a:spLocks noGrp="1"/>
+          </p:cNvSpPr>
+          <p:nvPr>
+            <p:ph type="sldNum" sz="quarter" idx="10"/>
+          </p:nvPr>
+        </p:nvSpPr>
+        <p:spPr/>
+        <p:txBody>
+          <a:bodyPr/>
+          <a:lstStyle/>
+          <a:p>
+            <a:fld id="{0015B511-83B7-463E-ACD1-0C1C081EBBC4}" type="slidenum">
+              <a:rPr lang="en-SG" smtClean="0"/>
+              <a:t>22</a:t>
             </a:fld>
             <a:endParaRPr lang="en-SG"/>
           </a:p>
@@ -1050,7 +1278,7 @@
             <a:fld id="{1D8BD707-D9CF-40AE-B4C6-C98DA3205C09}" type="datetimeFigureOut">
               <a:rPr lang="en-US" smtClean="0"/>
               <a:pPr/>
-              <a:t>2/17/2014</a:t>
+              <a:t>2/24/2014</a:t>
             </a:fld>
             <a:endParaRPr lang="en-US"/>
           </a:p>
@@ -1217,7 +1445,7 @@
             <a:fld id="{1D8BD707-D9CF-40AE-B4C6-C98DA3205C09}" type="datetimeFigureOut">
               <a:rPr lang="en-US" smtClean="0"/>
               <a:pPr/>
-              <a:t>2/17/2014</a:t>
+              <a:t>2/24/2014</a:t>
             </a:fld>
             <a:endParaRPr lang="en-US"/>
           </a:p>
@@ -1394,7 +1622,7 @@
             <a:fld id="{1D8BD707-D9CF-40AE-B4C6-C98DA3205C09}" type="datetimeFigureOut">
               <a:rPr lang="en-US" smtClean="0"/>
               <a:pPr/>
-              <a:t>2/17/2014</a:t>
+              <a:t>2/24/2014</a:t>
             </a:fld>
             <a:endParaRPr lang="en-US"/>
           </a:p>
@@ -1561,7 +1789,7 @@
             <a:fld id="{1D8BD707-D9CF-40AE-B4C6-C98DA3205C09}" type="datetimeFigureOut">
               <a:rPr lang="en-US" smtClean="0"/>
               <a:pPr/>
-              <a:t>2/17/2014</a:t>
+              <a:t>2/24/2014</a:t>
             </a:fld>
             <a:endParaRPr lang="en-US"/>
           </a:p>
@@ -1804,7 +2032,7 @@
             <a:fld id="{1D8BD707-D9CF-40AE-B4C6-C98DA3205C09}" type="datetimeFigureOut">
               <a:rPr lang="en-US" smtClean="0"/>
               <a:pPr/>
-              <a:t>2/17/2014</a:t>
+              <a:t>2/24/2014</a:t>
             </a:fld>
             <a:endParaRPr lang="en-US"/>
           </a:p>
@@ -2089,7 +2317,7 @@
             <a:fld id="{1D8BD707-D9CF-40AE-B4C6-C98DA3205C09}" type="datetimeFigureOut">
               <a:rPr lang="en-US" smtClean="0"/>
               <a:pPr/>
-              <a:t>2/17/2014</a:t>
+              <a:t>2/24/2014</a:t>
             </a:fld>
             <a:endParaRPr lang="en-US"/>
           </a:p>
@@ -2508,7 +2736,7 @@
             <a:fld id="{1D8BD707-D9CF-40AE-B4C6-C98DA3205C09}" type="datetimeFigureOut">
               <a:rPr lang="en-US" smtClean="0"/>
               <a:pPr/>
-              <a:t>2/17/2014</a:t>
+              <a:t>2/24/2014</a:t>
             </a:fld>
             <a:endParaRPr lang="en-US"/>
           </a:p>
@@ -2623,7 +2851,7 @@
             <a:fld id="{1D8BD707-D9CF-40AE-B4C6-C98DA3205C09}" type="datetimeFigureOut">
               <a:rPr lang="en-US" smtClean="0"/>
               <a:pPr/>
-              <a:t>2/17/2014</a:t>
+              <a:t>2/24/2014</a:t>
             </a:fld>
             <a:endParaRPr lang="en-US"/>
           </a:p>
@@ -2715,7 +2943,7 @@
             <a:fld id="{1D8BD707-D9CF-40AE-B4C6-C98DA3205C09}" type="datetimeFigureOut">
               <a:rPr lang="en-US" smtClean="0"/>
               <a:pPr/>
-              <a:t>2/17/2014</a:t>
+              <a:t>2/24/2014</a:t>
             </a:fld>
             <a:endParaRPr lang="en-US"/>
           </a:p>
@@ -2989,7 +3217,7 @@
             <a:fld id="{1D8BD707-D9CF-40AE-B4C6-C98DA3205C09}" type="datetimeFigureOut">
               <a:rPr lang="en-US" smtClean="0"/>
               <a:pPr/>
-              <a:t>2/17/2014</a:t>
+              <a:t>2/24/2014</a:t>
             </a:fld>
             <a:endParaRPr lang="en-US"/>
           </a:p>
@@ -3239,7 +3467,7 @@
             <a:fld id="{1D8BD707-D9CF-40AE-B4C6-C98DA3205C09}" type="datetimeFigureOut">
               <a:rPr lang="en-US" smtClean="0"/>
               <a:pPr/>
-              <a:t>2/17/2014</a:t>
+              <a:t>2/24/2014</a:t>
             </a:fld>
             <a:endParaRPr lang="en-US"/>
           </a:p>
@@ -3449,7 +3677,7 @@
             <a:fld id="{1D8BD707-D9CF-40AE-B4C6-C98DA3205C09}" type="datetimeFigureOut">
               <a:rPr lang="en-US" smtClean="0"/>
               <a:pPr/>
-              <a:t>2/17/2014</a:t>
+              <a:t>2/24/2014</a:t>
             </a:fld>
             <a:endParaRPr lang="en-US"/>
           </a:p>
@@ -5683,47 +5911,7 @@
                   </a:schemeClr>
                 </a:solidFill>
               </a:rPr>
-              <a:t> When you ‘</a:t>
-            </a:r>
-            <a:r>
-              <a:rPr lang="en-US" dirty="0" smtClean="0">
-                <a:solidFill>
-                  <a:schemeClr val="accent6">
-                    <a:lumMod val="75000"/>
-                  </a:schemeClr>
-                </a:solidFill>
-              </a:rPr>
-              <a:t>play’ </a:t>
-            </a:r>
-            <a:r>
-              <a:rPr lang="en-US" dirty="0" smtClean="0">
-                <a:solidFill>
-                  <a:schemeClr val="accent6">
-                    <a:lumMod val="75000"/>
-                  </a:schemeClr>
-                </a:solidFill>
-              </a:rPr>
-              <a:t>the </a:t>
-            </a:r>
-            <a:r>
-              <a:rPr lang="en-US" dirty="0" smtClean="0">
-                <a:solidFill>
-                  <a:schemeClr val="accent6">
-                    <a:lumMod val="75000"/>
-                  </a:schemeClr>
-                </a:solidFill>
-              </a:rPr>
-              <a:t>slide show (      ), </a:t>
-            </a:r>
-            <a:r>
-              <a:rPr lang="en-US" dirty="0" smtClean="0">
-                <a:solidFill>
-                  <a:schemeClr val="accent6">
-                    <a:lumMod val="75000"/>
-                  </a:schemeClr>
-                </a:solidFill>
-              </a:rPr>
-              <a:t>you should see a single circle animated </a:t>
+              <a:t> When you ‘play’ the slide show (      ), you should see a single circle animated </a:t>
             </a:r>
             <a:br>
               <a:rPr lang="en-US" dirty="0" smtClean="0">
@@ -5856,7 +6044,7 @@
         </p:nvGrpSpPr>
         <p:grpSpPr>
           <a:xfrm>
-            <a:off x="1447800" y="3037549"/>
+            <a:off x="1828800" y="3037549"/>
             <a:ext cx="838200" cy="838200"/>
             <a:chOff x="4234858" y="1066800"/>
             <a:chExt cx="838200" cy="838200"/>
@@ -6279,7 +6467,7 @@
         </p:nvGrpSpPr>
         <p:grpSpPr>
           <a:xfrm>
-            <a:off x="2362200" y="3036283"/>
+            <a:off x="2743200" y="3036283"/>
             <a:ext cx="838200" cy="838200"/>
             <a:chOff x="4238346" y="2360100"/>
             <a:chExt cx="838200" cy="838200"/>
@@ -6674,8 +6862,8 @@
         </p:nvSpPr>
         <p:spPr>
           <a:xfrm>
-            <a:off x="3429000" y="2971800"/>
-            <a:ext cx="4648200" cy="923330"/>
+            <a:off x="3810000" y="2971800"/>
+            <a:ext cx="4648200" cy="369332"/>
           </a:xfrm>
           <a:prstGeom prst="rect">
             <a:avLst/>
@@ -6706,7 +6894,17 @@
                   </a:schemeClr>
                 </a:solidFill>
               </a:rPr>
-              <a:t>features can be used to show how the content of one slide is related to the previous/next slide. Let’s give them a try now.</a:t>
+              <a:t>features </a:t>
+            </a:r>
+            <a:r>
+              <a:rPr lang="en-US" dirty="0" smtClean="0">
+                <a:solidFill>
+                  <a:schemeClr val="accent6">
+                    <a:lumMod val="75000"/>
+                  </a:schemeClr>
+                </a:solidFill>
+              </a:rPr>
+              <a:t>are next.</a:t>
             </a:r>
             <a:endParaRPr lang="en-SG" dirty="0">
               <a:solidFill>
@@ -6718,6 +6916,352 @@
           </a:p>
         </p:txBody>
       </p:sp>
+      <p:grpSp>
+        <p:nvGrpSpPr>
+          <p:cNvPr id="18" name="Group 17"/>
+          <p:cNvGrpSpPr/>
+          <p:nvPr/>
+        </p:nvGrpSpPr>
+        <p:grpSpPr>
+          <a:xfrm>
+            <a:off x="838200" y="3023655"/>
+            <a:ext cx="838200" cy="838200"/>
+            <a:chOff x="5247850" y="1096809"/>
+            <a:chExt cx="838200" cy="838200"/>
+          </a:xfrm>
+        </p:grpSpPr>
+        <p:sp>
+          <p:nvSpPr>
+            <p:cNvPr id="19" name="Rectangle 18"/>
+            <p:cNvSpPr/>
+            <p:nvPr/>
+          </p:nvSpPr>
+          <p:spPr>
+            <a:xfrm>
+              <a:off x="5280854" y="1176244"/>
+              <a:ext cx="774065" cy="547843"/>
+            </a:xfrm>
+            <a:prstGeom prst="rect">
+              <a:avLst/>
+            </a:prstGeom>
+            <a:solidFill>
+              <a:schemeClr val="accent6"/>
+            </a:solidFill>
+            <a:ln>
+              <a:noFill/>
+            </a:ln>
+          </p:spPr>
+          <p:style>
+            <a:lnRef idx="2">
+              <a:schemeClr val="accent1">
+                <a:shade val="50000"/>
+              </a:schemeClr>
+            </a:lnRef>
+            <a:fillRef idx="1">
+              <a:schemeClr val="accent1"/>
+            </a:fillRef>
+            <a:effectRef idx="0">
+              <a:schemeClr val="accent1"/>
+            </a:effectRef>
+            <a:fontRef idx="minor">
+              <a:schemeClr val="lt1"/>
+            </a:fontRef>
+          </p:style>
+          <p:txBody>
+            <a:bodyPr rtlCol="0" anchor="ctr"/>
+            <a:lstStyle/>
+            <a:p>
+              <a:pPr algn="ctr"/>
+              <a:endParaRPr lang="en-US"/>
+            </a:p>
+          </p:txBody>
+        </p:sp>
+        <p:sp>
+          <p:nvSpPr>
+            <p:cNvPr id="20" name="Rectangle 19"/>
+            <p:cNvSpPr/>
+            <p:nvPr/>
+          </p:nvSpPr>
+          <p:spPr>
+            <a:xfrm>
+              <a:off x="5247850" y="1096809"/>
+              <a:ext cx="838200" cy="838200"/>
+            </a:xfrm>
+            <a:prstGeom prst="rect">
+              <a:avLst/>
+            </a:prstGeom>
+            <a:noFill/>
+            <a:ln>
+              <a:noFill/>
+            </a:ln>
+          </p:spPr>
+          <p:style>
+            <a:lnRef idx="2">
+              <a:schemeClr val="accent1">
+                <a:shade val="50000"/>
+              </a:schemeClr>
+            </a:lnRef>
+            <a:fillRef idx="1">
+              <a:schemeClr val="accent1"/>
+            </a:fillRef>
+            <a:effectRef idx="0">
+              <a:schemeClr val="accent1"/>
+            </a:effectRef>
+            <a:fontRef idx="minor">
+              <a:schemeClr val="lt1"/>
+            </a:fontRef>
+          </p:style>
+          <p:txBody>
+            <a:bodyPr rtlCol="0" anchor="ctr"/>
+            <a:lstStyle/>
+            <a:p>
+              <a:pPr algn="ctr"/>
+              <a:endParaRPr lang="en-SG"/>
+            </a:p>
+          </p:txBody>
+        </p:sp>
+        <p:sp>
+          <p:nvSpPr>
+            <p:cNvPr id="21" name="Up Arrow 20"/>
+            <p:cNvSpPr/>
+            <p:nvPr/>
+          </p:nvSpPr>
+          <p:spPr>
+            <a:xfrm>
+              <a:off x="5542805" y="1185743"/>
+              <a:ext cx="144988" cy="220324"/>
+            </a:xfrm>
+            <a:prstGeom prst="upArrow">
+              <a:avLst/>
+            </a:prstGeom>
+            <a:solidFill>
+              <a:schemeClr val="bg1"/>
+            </a:solidFill>
+            <a:ln>
+              <a:solidFill>
+                <a:schemeClr val="bg1"/>
+              </a:solidFill>
+            </a:ln>
+          </p:spPr>
+          <p:style>
+            <a:lnRef idx="2">
+              <a:schemeClr val="accent1">
+                <a:shade val="50000"/>
+              </a:schemeClr>
+            </a:lnRef>
+            <a:fillRef idx="1">
+              <a:schemeClr val="accent1"/>
+            </a:fillRef>
+            <a:effectRef idx="0">
+              <a:schemeClr val="accent1"/>
+            </a:effectRef>
+            <a:fontRef idx="minor">
+              <a:schemeClr val="lt1"/>
+            </a:fontRef>
+          </p:style>
+          <p:txBody>
+            <a:bodyPr rtlCol="0" anchor="ctr"/>
+            <a:lstStyle/>
+            <a:p>
+              <a:pPr algn="ctr"/>
+              <a:endParaRPr lang="en-SG"/>
+            </a:p>
+          </p:txBody>
+        </p:sp>
+        <p:sp>
+          <p:nvSpPr>
+            <p:cNvPr id="22" name="Up Arrow 21"/>
+            <p:cNvSpPr/>
+            <p:nvPr/>
+          </p:nvSpPr>
+          <p:spPr>
+            <a:xfrm rot="10800000">
+              <a:off x="5542805" y="1491856"/>
+              <a:ext cx="144988" cy="220324"/>
+            </a:xfrm>
+            <a:prstGeom prst="upArrow">
+              <a:avLst/>
+            </a:prstGeom>
+            <a:solidFill>
+              <a:schemeClr val="bg1"/>
+            </a:solidFill>
+            <a:ln>
+              <a:solidFill>
+                <a:schemeClr val="bg1"/>
+              </a:solidFill>
+            </a:ln>
+          </p:spPr>
+          <p:style>
+            <a:lnRef idx="2">
+              <a:schemeClr val="accent1">
+                <a:shade val="50000"/>
+              </a:schemeClr>
+            </a:lnRef>
+            <a:fillRef idx="1">
+              <a:schemeClr val="accent1"/>
+            </a:fillRef>
+            <a:effectRef idx="0">
+              <a:schemeClr val="accent1"/>
+            </a:effectRef>
+            <a:fontRef idx="minor">
+              <a:schemeClr val="lt1"/>
+            </a:fontRef>
+          </p:style>
+          <p:txBody>
+            <a:bodyPr rtlCol="0" anchor="ctr"/>
+            <a:lstStyle/>
+            <a:p>
+              <a:pPr algn="ctr"/>
+              <a:endParaRPr lang="en-SG"/>
+            </a:p>
+          </p:txBody>
+        </p:sp>
+        <p:sp>
+          <p:nvSpPr>
+            <p:cNvPr id="23" name="Up Arrow 22"/>
+            <p:cNvSpPr/>
+            <p:nvPr/>
+          </p:nvSpPr>
+          <p:spPr>
+            <a:xfrm rot="5400000">
+              <a:off x="5780554" y="1228522"/>
+              <a:ext cx="144988" cy="379216"/>
+            </a:xfrm>
+            <a:prstGeom prst="upArrow">
+              <a:avLst/>
+            </a:prstGeom>
+            <a:solidFill>
+              <a:schemeClr val="bg1"/>
+            </a:solidFill>
+            <a:ln>
+              <a:solidFill>
+                <a:schemeClr val="bg1"/>
+              </a:solidFill>
+            </a:ln>
+          </p:spPr>
+          <p:style>
+            <a:lnRef idx="2">
+              <a:schemeClr val="accent1">
+                <a:shade val="50000"/>
+              </a:schemeClr>
+            </a:lnRef>
+            <a:fillRef idx="1">
+              <a:schemeClr val="accent1"/>
+            </a:fillRef>
+            <a:effectRef idx="0">
+              <a:schemeClr val="accent1"/>
+            </a:effectRef>
+            <a:fontRef idx="minor">
+              <a:schemeClr val="lt1"/>
+            </a:fontRef>
+          </p:style>
+          <p:txBody>
+            <a:bodyPr rtlCol="0" anchor="ctr"/>
+            <a:lstStyle/>
+            <a:p>
+              <a:pPr algn="ctr"/>
+              <a:endParaRPr lang="en-SG"/>
+            </a:p>
+          </p:txBody>
+        </p:sp>
+        <p:sp>
+          <p:nvSpPr>
+            <p:cNvPr id="24" name="Up Arrow 23"/>
+            <p:cNvSpPr/>
+            <p:nvPr/>
+          </p:nvSpPr>
+          <p:spPr>
+            <a:xfrm rot="16200000" flipH="1">
+              <a:off x="5363324" y="1276712"/>
+              <a:ext cx="144988" cy="274552"/>
+            </a:xfrm>
+            <a:prstGeom prst="upArrow">
+              <a:avLst/>
+            </a:prstGeom>
+            <a:solidFill>
+              <a:schemeClr val="bg1"/>
+            </a:solidFill>
+            <a:ln>
+              <a:solidFill>
+                <a:schemeClr val="bg1"/>
+              </a:solidFill>
+            </a:ln>
+          </p:spPr>
+          <p:style>
+            <a:lnRef idx="2">
+              <a:schemeClr val="accent1">
+                <a:shade val="50000"/>
+              </a:schemeClr>
+            </a:lnRef>
+            <a:fillRef idx="1">
+              <a:schemeClr val="accent1"/>
+            </a:fillRef>
+            <a:effectRef idx="0">
+              <a:schemeClr val="accent1"/>
+            </a:effectRef>
+            <a:fontRef idx="minor">
+              <a:schemeClr val="lt1"/>
+            </a:fontRef>
+          </p:style>
+          <p:txBody>
+            <a:bodyPr rtlCol="0" anchor="ctr"/>
+            <a:lstStyle/>
+            <a:p>
+              <a:pPr algn="ctr"/>
+              <a:endParaRPr lang="en-SG"/>
+            </a:p>
+          </p:txBody>
+        </p:sp>
+        <p:sp>
+          <p:nvSpPr>
+            <p:cNvPr id="25" name="Rectangle 24"/>
+            <p:cNvSpPr/>
+            <p:nvPr/>
+          </p:nvSpPr>
+          <p:spPr>
+            <a:xfrm>
+              <a:off x="5486595" y="1331707"/>
+              <a:ext cx="253034" cy="184202"/>
+            </a:xfrm>
+            <a:prstGeom prst="rect">
+              <a:avLst/>
+            </a:prstGeom>
+            <a:solidFill>
+              <a:srgbClr val="0070C0"/>
+            </a:solidFill>
+            <a:ln>
+              <a:solidFill>
+                <a:schemeClr val="bg1"/>
+              </a:solidFill>
+              <a:miter lim="800000"/>
+            </a:ln>
+          </p:spPr>
+          <p:style>
+            <a:lnRef idx="2">
+              <a:schemeClr val="accent1">
+                <a:shade val="50000"/>
+              </a:schemeClr>
+            </a:lnRef>
+            <a:fillRef idx="1">
+              <a:schemeClr val="accent1"/>
+            </a:fillRef>
+            <a:effectRef idx="0">
+              <a:schemeClr val="accent1"/>
+            </a:effectRef>
+            <a:fontRef idx="minor">
+              <a:schemeClr val="lt1"/>
+            </a:fontRef>
+          </p:style>
+          <p:txBody>
+            <a:bodyPr rtlCol="0" anchor="ctr"/>
+            <a:lstStyle/>
+            <a:p>
+              <a:pPr algn="ctr"/>
+              <a:endParaRPr lang="en-US"/>
+            </a:p>
+          </p:txBody>
+        </p:sp>
+      </p:grpSp>
     </p:spTree>
     <p:extLst>
       <p:ext uri="{BB962C8B-B14F-4D97-AF65-F5344CB8AC3E}">
@@ -6739,6 +7283,834 @@
 </file>
 
 <file path=ppt/slides/slide14.xml><?xml version="1.0" encoding="utf-8"?>
+<p:sld xmlns:a="http://schemas.openxmlformats.org/drawingml/2006/main" xmlns:r="http://schemas.openxmlformats.org/officeDocument/2006/relationships" xmlns:p="http://schemas.openxmlformats.org/presentationml/2006/main">
+  <p:cSld>
+    <p:spTree>
+      <p:nvGrpSpPr>
+        <p:cNvPr id="1" name=""/>
+        <p:cNvGrpSpPr/>
+        <p:nvPr/>
+      </p:nvGrpSpPr>
+      <p:grpSpPr>
+        <a:xfrm>
+          <a:off x="0" y="0"/>
+          <a:ext cx="0" cy="0"/>
+          <a:chOff x="0" y="0"/>
+          <a:chExt cx="0" cy="0"/>
+        </a:xfrm>
+      </p:grpSpPr>
+      <p:sp>
+        <p:nvSpPr>
+          <p:cNvPr id="31" name="TextBox 30"/>
+          <p:cNvSpPr txBox="1"/>
+          <p:nvPr/>
+        </p:nvSpPr>
+        <p:spPr>
+          <a:xfrm>
+            <a:off x="533400" y="479318"/>
+            <a:ext cx="8001000" cy="523220"/>
+          </a:xfrm>
+          <a:prstGeom prst="rect">
+            <a:avLst/>
+          </a:prstGeom>
+          <a:noFill/>
+        </p:spPr>
+        <p:txBody>
+          <a:bodyPr wrap="square" rtlCol="0">
+            <a:spAutoFit/>
+          </a:bodyPr>
+          <a:lstStyle/>
+          <a:p>
+            <a:r>
+              <a:rPr lang="en-US" sz="2800" b="1" dirty="0" smtClean="0">
+                <a:solidFill>
+                  <a:schemeClr val="accent6">
+                    <a:lumMod val="75000"/>
+                  </a:schemeClr>
+                </a:solidFill>
+              </a:rPr>
+              <a:t>1.</a:t>
+            </a:r>
+            <a:r>
+              <a:rPr lang="en-US" dirty="0" smtClean="0">
+                <a:solidFill>
+                  <a:schemeClr val="accent6">
+                    <a:lumMod val="75000"/>
+                  </a:schemeClr>
+                </a:solidFill>
+              </a:rPr>
+              <a:t> Select the blue rectangle and click  the                </a:t>
+            </a:r>
+            <a:r>
+              <a:rPr lang="en-US" dirty="0" smtClean="0">
+                <a:solidFill>
+                  <a:schemeClr val="accent6">
+                    <a:lumMod val="75000"/>
+                  </a:schemeClr>
+                </a:solidFill>
+              </a:rPr>
+              <a:t> </a:t>
+            </a:r>
+            <a:r>
+              <a:rPr lang="en-US" i="1" dirty="0" smtClean="0">
+                <a:solidFill>
+                  <a:schemeClr val="accent6">
+                    <a:lumMod val="75000"/>
+                  </a:schemeClr>
+                </a:solidFill>
+              </a:rPr>
+              <a:t>zoom to area</a:t>
+            </a:r>
+            <a:r>
+              <a:rPr lang="en-US" dirty="0" smtClean="0">
+                <a:solidFill>
+                  <a:schemeClr val="accent6">
+                    <a:lumMod val="75000"/>
+                  </a:schemeClr>
+                </a:solidFill>
+              </a:rPr>
+              <a:t> button</a:t>
+            </a:r>
+            <a:r>
+              <a:rPr lang="en-US" dirty="0" smtClean="0">
+                <a:solidFill>
+                  <a:schemeClr val="accent6">
+                    <a:lumMod val="75000"/>
+                  </a:schemeClr>
+                </a:solidFill>
+              </a:rPr>
+              <a:t>.</a:t>
+            </a:r>
+            <a:endParaRPr lang="en-SG" dirty="0">
+              <a:solidFill>
+                <a:schemeClr val="accent6">
+                  <a:lumMod val="75000"/>
+                </a:schemeClr>
+              </a:solidFill>
+            </a:endParaRPr>
+          </a:p>
+        </p:txBody>
+      </p:sp>
+      <p:sp>
+        <p:nvSpPr>
+          <p:cNvPr id="33" name="TextBox 32"/>
+          <p:cNvSpPr txBox="1"/>
+          <p:nvPr/>
+        </p:nvSpPr>
+        <p:spPr>
+          <a:xfrm>
+            <a:off x="495300" y="5323582"/>
+            <a:ext cx="8001000" cy="1077218"/>
+          </a:xfrm>
+          <a:prstGeom prst="rect">
+            <a:avLst/>
+          </a:prstGeom>
+          <a:noFill/>
+        </p:spPr>
+        <p:txBody>
+          <a:bodyPr wrap="square" rtlCol="0">
+            <a:spAutoFit/>
+          </a:bodyPr>
+          <a:lstStyle/>
+          <a:p>
+            <a:r>
+              <a:rPr lang="en-US" sz="2800" b="1" dirty="0" smtClean="0">
+                <a:solidFill>
+                  <a:schemeClr val="accent6">
+                    <a:lumMod val="75000"/>
+                  </a:schemeClr>
+                </a:solidFill>
+              </a:rPr>
+              <a:t>2.</a:t>
+            </a:r>
+            <a:r>
+              <a:rPr lang="en-US" dirty="0" smtClean="0">
+                <a:solidFill>
+                  <a:schemeClr val="accent6">
+                    <a:lumMod val="75000"/>
+                  </a:schemeClr>
+                </a:solidFill>
+              </a:rPr>
+              <a:t> ‘Play’ the slide show (      ) to see </a:t>
+            </a:r>
+            <a:r>
+              <a:rPr lang="en-US" i="1" dirty="0" smtClean="0">
+                <a:solidFill>
+                  <a:schemeClr val="accent6">
+                    <a:lumMod val="75000"/>
+                  </a:schemeClr>
+                </a:solidFill>
+              </a:rPr>
+              <a:t>zoom </a:t>
+            </a:r>
+            <a:r>
+              <a:rPr lang="en-US" i="1" dirty="0" smtClean="0">
+                <a:solidFill>
+                  <a:schemeClr val="accent6">
+                    <a:lumMod val="75000"/>
+                  </a:schemeClr>
+                </a:solidFill>
+              </a:rPr>
+              <a:t>to area </a:t>
+            </a:r>
+            <a:r>
+              <a:rPr lang="en-US" dirty="0" smtClean="0">
+                <a:solidFill>
+                  <a:schemeClr val="accent6">
+                    <a:lumMod val="75000"/>
+                  </a:schemeClr>
+                </a:solidFill>
+              </a:rPr>
+              <a:t>effect generated by </a:t>
+            </a:r>
+            <a:r>
+              <a:rPr lang="en-US" dirty="0" err="1" smtClean="0">
+                <a:solidFill>
+                  <a:schemeClr val="accent6">
+                    <a:lumMod val="75000"/>
+                  </a:schemeClr>
+                </a:solidFill>
+              </a:rPr>
+              <a:t>PowerPointLabs</a:t>
+            </a:r>
+            <a:r>
+              <a:rPr lang="en-US" dirty="0" smtClean="0">
+                <a:solidFill>
+                  <a:schemeClr val="accent6">
+                    <a:lumMod val="75000"/>
+                  </a:schemeClr>
+                </a:solidFill>
+              </a:rPr>
+              <a:t>. </a:t>
+            </a:r>
+            <a:r>
+              <a:rPr lang="en-US" dirty="0" smtClean="0">
+                <a:solidFill>
+                  <a:schemeClr val="accent6">
+                    <a:lumMod val="75000"/>
+                  </a:schemeClr>
+                </a:solidFill>
+              </a:rPr>
+              <a:t>It generates one slide to zoom in to the area marked by the rectangle as well as another slide to reverse the zooming</a:t>
+            </a:r>
+            <a:r>
+              <a:rPr lang="en-US" dirty="0" smtClean="0">
+                <a:solidFill>
+                  <a:schemeClr val="accent6">
+                    <a:lumMod val="75000"/>
+                  </a:schemeClr>
+                </a:solidFill>
+              </a:rPr>
+              <a:t>.</a:t>
+            </a:r>
+            <a:endParaRPr lang="en-SG" dirty="0">
+              <a:solidFill>
+                <a:schemeClr val="accent6">
+                  <a:lumMod val="75000"/>
+                </a:schemeClr>
+              </a:solidFill>
+            </a:endParaRPr>
+          </a:p>
+        </p:txBody>
+      </p:sp>
+      <p:pic>
+        <p:nvPicPr>
+          <p:cNvPr id="1032" name="Picture 8"/>
+          <p:cNvPicPr>
+            <a:picLocks noChangeAspect="1" noChangeArrowheads="1"/>
+          </p:cNvPicPr>
+          <p:nvPr/>
+        </p:nvPicPr>
+        <p:blipFill>
+          <a:blip r:embed="rId2">
+            <a:extLst>
+              <a:ext uri="{28A0092B-C50C-407E-A947-70E740481C1C}">
+                <a14:useLocalDpi xmlns:a14="http://schemas.microsoft.com/office/drawing/2010/main" val="0"/>
+              </a:ext>
+            </a:extLst>
+          </a:blip>
+          <a:srcRect/>
+          <a:stretch>
+            <a:fillRect/>
+          </a:stretch>
+        </p:blipFill>
+        <p:spPr bwMode="auto">
+          <a:xfrm>
+            <a:off x="2931788" y="5498424"/>
+            <a:ext cx="304800" cy="286871"/>
+          </a:xfrm>
+          <a:prstGeom prst="rect">
+            <a:avLst/>
+          </a:prstGeom>
+          <a:noFill/>
+          <a:ln>
+            <a:noFill/>
+          </a:ln>
+          <a:effectLst>
+            <a:softEdge rad="31750"/>
+          </a:effectLst>
+          <a:extLst>
+            <a:ext uri="{909E8E84-426E-40DD-AFC4-6F175D3DCCD1}">
+              <a14:hiddenFill xmlns:a14="http://schemas.microsoft.com/office/drawing/2010/main">
+                <a:solidFill>
+                  <a:schemeClr val="accent1"/>
+                </a:solidFill>
+              </a14:hiddenFill>
+            </a:ext>
+            <a:ext uri="{91240B29-F687-4F45-9708-019B960494DF}">
+              <a14:hiddenLine xmlns:a14="http://schemas.microsoft.com/office/drawing/2010/main" w="9525">
+                <a:solidFill>
+                  <a:schemeClr val="tx1"/>
+                </a:solidFill>
+                <a:miter lim="800000"/>
+                <a:headEnd/>
+                <a:tailEnd/>
+              </a14:hiddenLine>
+            </a:ext>
+          </a:extLst>
+        </p:spPr>
+      </p:pic>
+      <p:pic>
+        <p:nvPicPr>
+          <p:cNvPr id="22" name="Picture 21" descr="File:AmineTreating.png"/>
+          <p:cNvPicPr>
+            <a:picLocks noChangeAspect="1" noChangeArrowheads="1"/>
+          </p:cNvPicPr>
+          <p:nvPr/>
+        </p:nvPicPr>
+        <p:blipFill rotWithShape="1">
+          <a:blip r:embed="rId3">
+            <a:duotone>
+              <a:schemeClr val="bg2">
+                <a:shade val="45000"/>
+                <a:satMod val="135000"/>
+              </a:schemeClr>
+              <a:prstClr val="white"/>
+            </a:duotone>
+            <a:extLst>
+              <a:ext uri="{28A0092B-C50C-407E-A947-70E740481C1C}">
+                <a14:useLocalDpi xmlns:a14="http://schemas.microsoft.com/office/drawing/2010/main" val="0"/>
+              </a:ext>
+            </a:extLst>
+          </a:blip>
+          <a:srcRect l="1320" t="1116" r="1244" b="19220"/>
+          <a:stretch/>
+        </p:blipFill>
+        <p:spPr bwMode="auto">
+          <a:xfrm>
+            <a:off x="1905000" y="1524000"/>
+            <a:ext cx="5295900" cy="3787324"/>
+          </a:xfrm>
+          <a:prstGeom prst="rect">
+            <a:avLst/>
+          </a:prstGeom>
+          <a:noFill/>
+          <a:extLst>
+            <a:ext uri="{909E8E84-426E-40DD-AFC4-6F175D3DCCD1}">
+              <a14:hiddenFill xmlns:a14="http://schemas.microsoft.com/office/drawing/2010/main">
+                <a:solidFill>
+                  <a:srgbClr val="FFFFFF"/>
+                </a:solidFill>
+              </a14:hiddenFill>
+            </a:ext>
+          </a:extLst>
+        </p:spPr>
+      </p:pic>
+      <p:sp>
+        <p:nvSpPr>
+          <p:cNvPr id="23" name="Rectangle 22"/>
+          <p:cNvSpPr/>
+          <p:nvPr/>
+        </p:nvSpPr>
+        <p:spPr>
+          <a:xfrm>
+            <a:off x="2095499" y="1546148"/>
+            <a:ext cx="2332682" cy="1749511"/>
+          </a:xfrm>
+          <a:prstGeom prst="rect">
+            <a:avLst/>
+          </a:prstGeom>
+          <a:noFill/>
+          <a:ln w="57150">
+            <a:solidFill>
+              <a:srgbClr val="0070C0"/>
+            </a:solidFill>
+          </a:ln>
+        </p:spPr>
+        <p:style>
+          <a:lnRef idx="2">
+            <a:schemeClr val="accent1">
+              <a:shade val="50000"/>
+            </a:schemeClr>
+          </a:lnRef>
+          <a:fillRef idx="1">
+            <a:schemeClr val="accent1"/>
+          </a:fillRef>
+          <a:effectRef idx="0">
+            <a:schemeClr val="accent1"/>
+          </a:effectRef>
+          <a:fontRef idx="minor">
+            <a:schemeClr val="lt1"/>
+          </a:fontRef>
+        </p:style>
+        <p:txBody>
+          <a:bodyPr lIns="228600" tIns="114300" rIns="228600" bIns="114300" rtlCol="0" anchor="ctr"/>
+          <a:lstStyle/>
+          <a:p>
+            <a:pPr algn="ctr"/>
+            <a:endParaRPr lang="en-US"/>
+          </a:p>
+        </p:txBody>
+      </p:sp>
+      <p:grpSp>
+        <p:nvGrpSpPr>
+          <p:cNvPr id="24" name="Group 23"/>
+          <p:cNvGrpSpPr/>
+          <p:nvPr/>
+        </p:nvGrpSpPr>
+        <p:grpSpPr>
+          <a:xfrm>
+            <a:off x="4552950" y="479318"/>
+            <a:ext cx="838200" cy="838200"/>
+            <a:chOff x="5247850" y="1096809"/>
+            <a:chExt cx="838200" cy="838200"/>
+          </a:xfrm>
+        </p:grpSpPr>
+        <p:sp>
+          <p:nvSpPr>
+            <p:cNvPr id="25" name="Rectangle 24"/>
+            <p:cNvSpPr/>
+            <p:nvPr/>
+          </p:nvSpPr>
+          <p:spPr>
+            <a:xfrm>
+              <a:off x="5280854" y="1176244"/>
+              <a:ext cx="774065" cy="547843"/>
+            </a:xfrm>
+            <a:prstGeom prst="rect">
+              <a:avLst/>
+            </a:prstGeom>
+            <a:solidFill>
+              <a:schemeClr val="accent6"/>
+            </a:solidFill>
+            <a:ln>
+              <a:noFill/>
+            </a:ln>
+          </p:spPr>
+          <p:style>
+            <a:lnRef idx="2">
+              <a:schemeClr val="accent1">
+                <a:shade val="50000"/>
+              </a:schemeClr>
+            </a:lnRef>
+            <a:fillRef idx="1">
+              <a:schemeClr val="accent1"/>
+            </a:fillRef>
+            <a:effectRef idx="0">
+              <a:schemeClr val="accent1"/>
+            </a:effectRef>
+            <a:fontRef idx="minor">
+              <a:schemeClr val="lt1"/>
+            </a:fontRef>
+          </p:style>
+          <p:txBody>
+            <a:bodyPr rtlCol="0" anchor="ctr"/>
+            <a:lstStyle/>
+            <a:p>
+              <a:pPr algn="ctr"/>
+              <a:endParaRPr lang="en-US"/>
+            </a:p>
+          </p:txBody>
+        </p:sp>
+        <p:sp>
+          <p:nvSpPr>
+            <p:cNvPr id="26" name="Rectangle 25"/>
+            <p:cNvSpPr/>
+            <p:nvPr/>
+          </p:nvSpPr>
+          <p:spPr>
+            <a:xfrm>
+              <a:off x="5247850" y="1096809"/>
+              <a:ext cx="838200" cy="838200"/>
+            </a:xfrm>
+            <a:prstGeom prst="rect">
+              <a:avLst/>
+            </a:prstGeom>
+            <a:noFill/>
+            <a:ln>
+              <a:noFill/>
+            </a:ln>
+          </p:spPr>
+          <p:style>
+            <a:lnRef idx="2">
+              <a:schemeClr val="accent1">
+                <a:shade val="50000"/>
+              </a:schemeClr>
+            </a:lnRef>
+            <a:fillRef idx="1">
+              <a:schemeClr val="accent1"/>
+            </a:fillRef>
+            <a:effectRef idx="0">
+              <a:schemeClr val="accent1"/>
+            </a:effectRef>
+            <a:fontRef idx="minor">
+              <a:schemeClr val="lt1"/>
+            </a:fontRef>
+          </p:style>
+          <p:txBody>
+            <a:bodyPr rtlCol="0" anchor="ctr"/>
+            <a:lstStyle/>
+            <a:p>
+              <a:pPr algn="ctr"/>
+              <a:endParaRPr lang="en-SG"/>
+            </a:p>
+          </p:txBody>
+        </p:sp>
+        <p:sp>
+          <p:nvSpPr>
+            <p:cNvPr id="27" name="Up Arrow 26"/>
+            <p:cNvSpPr/>
+            <p:nvPr/>
+          </p:nvSpPr>
+          <p:spPr>
+            <a:xfrm>
+              <a:off x="5542805" y="1185743"/>
+              <a:ext cx="144988" cy="220324"/>
+            </a:xfrm>
+            <a:prstGeom prst="upArrow">
+              <a:avLst/>
+            </a:prstGeom>
+            <a:solidFill>
+              <a:schemeClr val="bg1"/>
+            </a:solidFill>
+            <a:ln>
+              <a:solidFill>
+                <a:schemeClr val="bg1"/>
+              </a:solidFill>
+            </a:ln>
+          </p:spPr>
+          <p:style>
+            <a:lnRef idx="2">
+              <a:schemeClr val="accent1">
+                <a:shade val="50000"/>
+              </a:schemeClr>
+            </a:lnRef>
+            <a:fillRef idx="1">
+              <a:schemeClr val="accent1"/>
+            </a:fillRef>
+            <a:effectRef idx="0">
+              <a:schemeClr val="accent1"/>
+            </a:effectRef>
+            <a:fontRef idx="minor">
+              <a:schemeClr val="lt1"/>
+            </a:fontRef>
+          </p:style>
+          <p:txBody>
+            <a:bodyPr rtlCol="0" anchor="ctr"/>
+            <a:lstStyle/>
+            <a:p>
+              <a:pPr algn="ctr"/>
+              <a:endParaRPr lang="en-SG"/>
+            </a:p>
+          </p:txBody>
+        </p:sp>
+        <p:sp>
+          <p:nvSpPr>
+            <p:cNvPr id="29" name="Up Arrow 28"/>
+            <p:cNvSpPr/>
+            <p:nvPr/>
+          </p:nvSpPr>
+          <p:spPr>
+            <a:xfrm rot="10800000">
+              <a:off x="5542805" y="1491856"/>
+              <a:ext cx="144988" cy="220324"/>
+            </a:xfrm>
+            <a:prstGeom prst="upArrow">
+              <a:avLst/>
+            </a:prstGeom>
+            <a:solidFill>
+              <a:schemeClr val="bg1"/>
+            </a:solidFill>
+            <a:ln>
+              <a:solidFill>
+                <a:schemeClr val="bg1"/>
+              </a:solidFill>
+            </a:ln>
+          </p:spPr>
+          <p:style>
+            <a:lnRef idx="2">
+              <a:schemeClr val="accent1">
+                <a:shade val="50000"/>
+              </a:schemeClr>
+            </a:lnRef>
+            <a:fillRef idx="1">
+              <a:schemeClr val="accent1"/>
+            </a:fillRef>
+            <a:effectRef idx="0">
+              <a:schemeClr val="accent1"/>
+            </a:effectRef>
+            <a:fontRef idx="minor">
+              <a:schemeClr val="lt1"/>
+            </a:fontRef>
+          </p:style>
+          <p:txBody>
+            <a:bodyPr rtlCol="0" anchor="ctr"/>
+            <a:lstStyle/>
+            <a:p>
+              <a:pPr algn="ctr"/>
+              <a:endParaRPr lang="en-SG"/>
+            </a:p>
+          </p:txBody>
+        </p:sp>
+        <p:sp>
+          <p:nvSpPr>
+            <p:cNvPr id="32" name="Up Arrow 31"/>
+            <p:cNvSpPr/>
+            <p:nvPr/>
+          </p:nvSpPr>
+          <p:spPr>
+            <a:xfrm rot="5400000">
+              <a:off x="5780554" y="1228522"/>
+              <a:ext cx="144988" cy="379216"/>
+            </a:xfrm>
+            <a:prstGeom prst="upArrow">
+              <a:avLst/>
+            </a:prstGeom>
+            <a:solidFill>
+              <a:schemeClr val="bg1"/>
+            </a:solidFill>
+            <a:ln>
+              <a:solidFill>
+                <a:schemeClr val="bg1"/>
+              </a:solidFill>
+            </a:ln>
+          </p:spPr>
+          <p:style>
+            <a:lnRef idx="2">
+              <a:schemeClr val="accent1">
+                <a:shade val="50000"/>
+              </a:schemeClr>
+            </a:lnRef>
+            <a:fillRef idx="1">
+              <a:schemeClr val="accent1"/>
+            </a:fillRef>
+            <a:effectRef idx="0">
+              <a:schemeClr val="accent1"/>
+            </a:effectRef>
+            <a:fontRef idx="minor">
+              <a:schemeClr val="lt1"/>
+            </a:fontRef>
+          </p:style>
+          <p:txBody>
+            <a:bodyPr rtlCol="0" anchor="ctr"/>
+            <a:lstStyle/>
+            <a:p>
+              <a:pPr algn="ctr"/>
+              <a:endParaRPr lang="en-SG"/>
+            </a:p>
+          </p:txBody>
+        </p:sp>
+        <p:sp>
+          <p:nvSpPr>
+            <p:cNvPr id="34" name="Up Arrow 33"/>
+            <p:cNvSpPr/>
+            <p:nvPr/>
+          </p:nvSpPr>
+          <p:spPr>
+            <a:xfrm rot="16200000" flipH="1">
+              <a:off x="5363324" y="1276712"/>
+              <a:ext cx="144988" cy="274552"/>
+            </a:xfrm>
+            <a:prstGeom prst="upArrow">
+              <a:avLst/>
+            </a:prstGeom>
+            <a:solidFill>
+              <a:schemeClr val="bg1"/>
+            </a:solidFill>
+            <a:ln>
+              <a:solidFill>
+                <a:schemeClr val="bg1"/>
+              </a:solidFill>
+            </a:ln>
+          </p:spPr>
+          <p:style>
+            <a:lnRef idx="2">
+              <a:schemeClr val="accent1">
+                <a:shade val="50000"/>
+              </a:schemeClr>
+            </a:lnRef>
+            <a:fillRef idx="1">
+              <a:schemeClr val="accent1"/>
+            </a:fillRef>
+            <a:effectRef idx="0">
+              <a:schemeClr val="accent1"/>
+            </a:effectRef>
+            <a:fontRef idx="minor">
+              <a:schemeClr val="lt1"/>
+            </a:fontRef>
+          </p:style>
+          <p:txBody>
+            <a:bodyPr rtlCol="0" anchor="ctr"/>
+            <a:lstStyle/>
+            <a:p>
+              <a:pPr algn="ctr"/>
+              <a:endParaRPr lang="en-SG"/>
+            </a:p>
+          </p:txBody>
+        </p:sp>
+        <p:sp>
+          <p:nvSpPr>
+            <p:cNvPr id="35" name="Rectangle 34"/>
+            <p:cNvSpPr/>
+            <p:nvPr/>
+          </p:nvSpPr>
+          <p:spPr>
+            <a:xfrm>
+              <a:off x="5486595" y="1331707"/>
+              <a:ext cx="253034" cy="184202"/>
+            </a:xfrm>
+            <a:prstGeom prst="rect">
+              <a:avLst/>
+            </a:prstGeom>
+            <a:solidFill>
+              <a:srgbClr val="0070C0"/>
+            </a:solidFill>
+            <a:ln>
+              <a:solidFill>
+                <a:schemeClr val="bg1"/>
+              </a:solidFill>
+              <a:miter lim="800000"/>
+            </a:ln>
+          </p:spPr>
+          <p:style>
+            <a:lnRef idx="2">
+              <a:schemeClr val="accent1">
+                <a:shade val="50000"/>
+              </a:schemeClr>
+            </a:lnRef>
+            <a:fillRef idx="1">
+              <a:schemeClr val="accent1"/>
+            </a:fillRef>
+            <a:effectRef idx="0">
+              <a:schemeClr val="accent1"/>
+            </a:effectRef>
+            <a:fontRef idx="minor">
+              <a:schemeClr val="lt1"/>
+            </a:fontRef>
+          </p:style>
+          <p:txBody>
+            <a:bodyPr rtlCol="0" anchor="ctr"/>
+            <a:lstStyle/>
+            <a:p>
+              <a:pPr algn="ctr"/>
+              <a:endParaRPr lang="en-US"/>
+            </a:p>
+          </p:txBody>
+        </p:sp>
+      </p:grpSp>
+    </p:spTree>
+    <p:extLst>
+      <p:ext uri="{BB962C8B-B14F-4D97-AF65-F5344CB8AC3E}">
+        <p14:creationId xmlns:p14="http://schemas.microsoft.com/office/powerpoint/2010/main" val="161054008"/>
+      </p:ext>
+    </p:extLst>
+  </p:cSld>
+  <p:clrMapOvr>
+    <a:masterClrMapping/>
+  </p:clrMapOvr>
+  <p:timing>
+    <p:tnLst>
+      <p:par>
+        <p:cTn id="1" dur="indefinite" restart="never" nodeType="tmRoot">
+          <p:childTnLst>
+            <p:seq concurrent="1" nextAc="seek">
+              <p:cTn id="2" dur="indefinite" nodeType="mainSeq">
+                <p:childTnLst>
+                  <p:par>
+                    <p:cTn id="3" fill="hold">
+                      <p:stCondLst>
+                        <p:cond delay="indefinite"/>
+                        <p:cond evt="onBegin" delay="0">
+                          <p:tn val="2"/>
+                        </p:cond>
+                      </p:stCondLst>
+                      <p:childTnLst>
+                        <p:par>
+                          <p:cTn id="4" fill="hold">
+                            <p:stCondLst>
+                              <p:cond delay="0"/>
+                            </p:stCondLst>
+                            <p:childTnLst>
+                              <p:par>
+                                <p:cTn id="5" presetID="21" presetClass="entr" presetSubtype="1" fill="hold" grpId="0" nodeType="withEffect">
+                                  <p:stCondLst>
+                                    <p:cond delay="0"/>
+                                  </p:stCondLst>
+                                  <p:childTnLst>
+                                    <p:set>
+                                      <p:cBhvr>
+                                        <p:cTn id="6" dur="1" fill="hold">
+                                          <p:stCondLst>
+                                            <p:cond delay="0"/>
+                                          </p:stCondLst>
+                                        </p:cTn>
+                                        <p:tgtEl>
+                                          <p:spTgt spid="23"/>
+                                        </p:tgtEl>
+                                        <p:attrNameLst>
+                                          <p:attrName>style.visibility</p:attrName>
+                                        </p:attrNameLst>
+                                      </p:cBhvr>
+                                      <p:to>
+                                        <p:strVal val="visible"/>
+                                      </p:to>
+                                    </p:set>
+                                    <p:animEffect transition="in" filter="wheel(1)">
+                                      <p:cBhvr>
+                                        <p:cTn id="7" dur="500"/>
+                                        <p:tgtEl>
+                                          <p:spTgt spid="23"/>
+                                        </p:tgtEl>
+                                      </p:cBhvr>
+                                    </p:animEffect>
+                                  </p:childTnLst>
+                                </p:cTn>
+                              </p:par>
+                            </p:childTnLst>
+                          </p:cTn>
+                        </p:par>
+                      </p:childTnLst>
+                    </p:cTn>
+                  </p:par>
+                </p:childTnLst>
+              </p:cTn>
+              <p:prevCondLst>
+                <p:cond evt="onPrev" delay="0">
+                  <p:tgtEl>
+                    <p:sldTgt/>
+                  </p:tgtEl>
+                </p:cond>
+              </p:prevCondLst>
+              <p:nextCondLst>
+                <p:cond evt="onNext" delay="0">
+                  <p:tgtEl>
+                    <p:sldTgt/>
+                  </p:tgtEl>
+                </p:cond>
+              </p:nextCondLst>
+            </p:seq>
+          </p:childTnLst>
+        </p:cTn>
+      </p:par>
+    </p:tnLst>
+    <p:bldLst>
+      <p:bldP spid="23" grpId="0" animBg="1"/>
+    </p:bldLst>
+  </p:timing>
+</p:sld>
+</file>
+
+<file path=ppt/slides/slide15.xml><?xml version="1.0" encoding="utf-8"?>
 <p:sld xmlns:a="http://schemas.openxmlformats.org/drawingml/2006/main" xmlns:r="http://schemas.openxmlformats.org/officeDocument/2006/relationships" xmlns:p="http://schemas.openxmlformats.org/presentationml/2006/main">
   <p:cSld>
     <p:spTree>
@@ -7538,7 +8910,7 @@
               <a:lumOff val="80000"/>
             </a:schemeClr>
           </a:solidFill>
-          <a:ln>
+          <a:ln w="57150">
             <a:solidFill>
               <a:srgbClr val="0070C0"/>
             </a:solidFill>
@@ -7599,7 +8971,7 @@
                   </a:schemeClr>
                 </a:solidFill>
               </a:rPr>
-              <a:t>1.</a:t>
+              <a:t>2.</a:t>
             </a:r>
             <a:r>
               <a:rPr lang="en-US" dirty="0" smtClean="0">
@@ -7609,7 +8981,7 @@
                   </a:schemeClr>
                 </a:solidFill>
               </a:rPr>
-              <a:t> Select the </a:t>
+              <a:t> </a:t>
             </a:r>
             <a:r>
               <a:rPr lang="en-US" dirty="0" smtClean="0">
@@ -7619,27 +8991,7 @@
                   </a:schemeClr>
                 </a:solidFill>
               </a:rPr>
-              <a:t>blue rectangle and </a:t>
-            </a:r>
-            <a:r>
-              <a:rPr lang="en-US" dirty="0" smtClean="0">
-                <a:solidFill>
-                  <a:schemeClr val="accent6">
-                    <a:lumMod val="75000"/>
-                  </a:schemeClr>
-                </a:solidFill>
-              </a:rPr>
-              <a:t>click  the           </a:t>
-            </a:r>
-            <a:r>
-              <a:rPr lang="en-US" dirty="0" smtClean="0">
-                <a:solidFill>
-                  <a:schemeClr val="accent6">
-                    <a:lumMod val="75000"/>
-                  </a:schemeClr>
-                </a:solidFill>
-              </a:rPr>
-              <a:t>     button.</a:t>
+              <a:t>Select the blue rectangle and click  the                button.</a:t>
             </a:r>
             <a:endParaRPr lang="en-SG" dirty="0">
               <a:solidFill>
@@ -7651,9 +9003,151 @@
           </a:p>
         </p:txBody>
       </p:sp>
+      <p:sp>
+        <p:nvSpPr>
+          <p:cNvPr id="33" name="TextBox 32"/>
+          <p:cNvSpPr txBox="1"/>
+          <p:nvPr/>
+        </p:nvSpPr>
+        <p:spPr>
+          <a:xfrm>
+            <a:off x="495300" y="4724400"/>
+            <a:ext cx="8001000" cy="1354217"/>
+          </a:xfrm>
+          <a:prstGeom prst="rect">
+            <a:avLst/>
+          </a:prstGeom>
+          <a:noFill/>
+        </p:spPr>
+        <p:txBody>
+          <a:bodyPr wrap="square" rtlCol="0">
+            <a:spAutoFit/>
+          </a:bodyPr>
+          <a:lstStyle/>
+          <a:p>
+            <a:r>
+              <a:rPr lang="en-US" sz="2800" b="1" dirty="0" smtClean="0">
+                <a:solidFill>
+                  <a:schemeClr val="accent6">
+                    <a:lumMod val="75000"/>
+                  </a:schemeClr>
+                </a:solidFill>
+              </a:rPr>
+              <a:t>3.</a:t>
+            </a:r>
+            <a:r>
+              <a:rPr lang="en-US" dirty="0" smtClean="0">
+                <a:solidFill>
+                  <a:schemeClr val="accent6">
+                    <a:lumMod val="75000"/>
+                  </a:schemeClr>
+                </a:solidFill>
+              </a:rPr>
+              <a:t> </a:t>
+            </a:r>
+            <a:r>
+              <a:rPr lang="en-US" dirty="0" smtClean="0">
+                <a:solidFill>
+                  <a:schemeClr val="accent6">
+                    <a:lumMod val="75000"/>
+                  </a:schemeClr>
+                </a:solidFill>
+              </a:rPr>
+              <a:t>‘Play’ the slide show (      ) to see </a:t>
+            </a:r>
+            <a:r>
+              <a:rPr lang="en-US" i="1" dirty="0" smtClean="0">
+                <a:solidFill>
+                  <a:schemeClr val="accent6">
+                    <a:lumMod val="75000"/>
+                  </a:schemeClr>
+                </a:solidFill>
+              </a:rPr>
+              <a:t>drill down </a:t>
+            </a:r>
+            <a:r>
+              <a:rPr lang="en-US" dirty="0" smtClean="0">
+                <a:solidFill>
+                  <a:schemeClr val="accent6">
+                    <a:lumMod val="75000"/>
+                  </a:schemeClr>
+                </a:solidFill>
+              </a:rPr>
+              <a:t>effect </a:t>
+            </a:r>
+            <a:r>
+              <a:rPr lang="en-US" dirty="0" smtClean="0">
+                <a:solidFill>
+                  <a:schemeClr val="accent6">
+                    <a:lumMod val="75000"/>
+                  </a:schemeClr>
+                </a:solidFill>
+              </a:rPr>
+              <a:t>generated by </a:t>
+            </a:r>
+            <a:r>
+              <a:rPr lang="en-US" dirty="0" err="1" smtClean="0">
+                <a:solidFill>
+                  <a:schemeClr val="accent6">
+                    <a:lumMod val="75000"/>
+                  </a:schemeClr>
+                </a:solidFill>
+              </a:rPr>
+              <a:t>PowerPointLabs</a:t>
+            </a:r>
+            <a:r>
+              <a:rPr lang="en-US" dirty="0" smtClean="0">
+                <a:solidFill>
+                  <a:schemeClr val="accent6">
+                    <a:lumMod val="75000"/>
+                  </a:schemeClr>
+                </a:solidFill>
+              </a:rPr>
+              <a:t>. The effect tells the audience which part of this slide corresponds to the content of the next </a:t>
+            </a:r>
+            <a:r>
+              <a:rPr lang="en-US" dirty="0" smtClean="0">
+                <a:solidFill>
+                  <a:schemeClr val="accent6">
+                    <a:lumMod val="75000"/>
+                  </a:schemeClr>
+                </a:solidFill>
+              </a:rPr>
+              <a:t>slide. For example, here it gives audience the </a:t>
+            </a:r>
+            <a:r>
+              <a:rPr lang="en-US" dirty="0" smtClean="0">
+                <a:solidFill>
+                  <a:schemeClr val="accent6">
+                    <a:lumMod val="75000"/>
+                  </a:schemeClr>
+                </a:solidFill>
+              </a:rPr>
+              <a:t>feeling that you are now drilling down to details about the ‘Process’ part of this slide</a:t>
+            </a:r>
+            <a:r>
+              <a:rPr lang="en-US" dirty="0" smtClean="0">
+                <a:solidFill>
+                  <a:schemeClr val="accent6">
+                    <a:lumMod val="75000"/>
+                  </a:schemeClr>
+                </a:solidFill>
+              </a:rPr>
+              <a:t>.</a:t>
+            </a:r>
+            <a:endParaRPr lang="en-SG" dirty="0">
+              <a:solidFill>
+                <a:schemeClr val="accent6">
+                  <a:lumMod val="75000"/>
+                </a:schemeClr>
+              </a:solidFill>
+            </a:endParaRPr>
+          </a:p>
+        </p:txBody>
+      </p:sp>
       <p:pic>
         <p:nvPicPr>
-          <p:cNvPr id="1031" name="Picture 7"/>
+          <p:cNvPr id="1032" name="Picture 8"/>
           <p:cNvPicPr>
             <a:picLocks noChangeAspect="1" noChangeArrowheads="1"/>
           </p:cNvPicPr>
@@ -7674,23 +9168,19 @@
         </p:blipFill>
         <p:spPr bwMode="auto">
           <a:xfrm>
-            <a:off x="4676700" y="479318"/>
-            <a:ext cx="581100" cy="905435"/>
+            <a:off x="2931788" y="4899242"/>
+            <a:ext cx="304800" cy="286871"/>
           </a:xfrm>
           <a:prstGeom prst="rect">
             <a:avLst/>
           </a:prstGeom>
           <a:noFill/>
-          <a:ln w="9525">
-            <a:solidFill>
-              <a:schemeClr val="bg1">
-                <a:lumMod val="85000"/>
-              </a:schemeClr>
-            </a:solidFill>
-            <a:miter lim="800000"/>
-            <a:headEnd/>
-            <a:tailEnd/>
+          <a:ln>
+            <a:noFill/>
           </a:ln>
+          <a:effectLst>
+            <a:softEdge rad="31750"/>
+          </a:effectLst>
           <a:extLst>
             <a:ext uri="{909E8E84-426E-40DD-AFC4-6F175D3DCCD1}">
               <a14:hiddenFill xmlns:a14="http://schemas.microsoft.com/office/drawing/2010/main">
@@ -7712,111 +9202,9 @@
           </a:extLst>
         </p:spPr>
       </p:pic>
-      <p:sp>
-        <p:nvSpPr>
-          <p:cNvPr id="33" name="TextBox 32"/>
-          <p:cNvSpPr txBox="1"/>
-          <p:nvPr/>
-        </p:nvSpPr>
-        <p:spPr>
-          <a:xfrm>
-            <a:off x="495300" y="4724400"/>
-            <a:ext cx="8001000" cy="1077218"/>
-          </a:xfrm>
-          <a:prstGeom prst="rect">
-            <a:avLst/>
-          </a:prstGeom>
-          <a:noFill/>
-        </p:spPr>
-        <p:txBody>
-          <a:bodyPr wrap="square" rtlCol="0">
-            <a:spAutoFit/>
-          </a:bodyPr>
-          <a:lstStyle/>
-          <a:p>
-            <a:r>
-              <a:rPr lang="en-US" sz="2800" b="1" dirty="0" smtClean="0">
-                <a:solidFill>
-                  <a:schemeClr val="accent6">
-                    <a:lumMod val="75000"/>
-                  </a:schemeClr>
-                </a:solidFill>
-              </a:rPr>
-              <a:t>2.</a:t>
-            </a:r>
-            <a:r>
-              <a:rPr lang="en-US" dirty="0" smtClean="0">
-                <a:solidFill>
-                  <a:schemeClr val="accent6">
-                    <a:lumMod val="75000"/>
-                  </a:schemeClr>
-                </a:solidFill>
-              </a:rPr>
-              <a:t> ‘Play’ the slide show (      ) to see </a:t>
-            </a:r>
-            <a:r>
-              <a:rPr lang="en-US" i="1" dirty="0" smtClean="0">
-                <a:solidFill>
-                  <a:schemeClr val="accent6">
-                    <a:lumMod val="75000"/>
-                  </a:schemeClr>
-                </a:solidFill>
-              </a:rPr>
-              <a:t>zoom in </a:t>
-            </a:r>
-            <a:r>
-              <a:rPr lang="en-US" dirty="0" smtClean="0">
-                <a:solidFill>
-                  <a:schemeClr val="accent6">
-                    <a:lumMod val="75000"/>
-                  </a:schemeClr>
-                </a:solidFill>
-              </a:rPr>
-              <a:t>effect generated by </a:t>
-            </a:r>
-            <a:r>
-              <a:rPr lang="en-US" dirty="0" err="1" smtClean="0">
-                <a:solidFill>
-                  <a:schemeClr val="accent6">
-                    <a:lumMod val="75000"/>
-                  </a:schemeClr>
-                </a:solidFill>
-              </a:rPr>
-              <a:t>PowerPointLabs</a:t>
-            </a:r>
-            <a:r>
-              <a:rPr lang="en-US" dirty="0" smtClean="0">
-                <a:solidFill>
-                  <a:schemeClr val="accent6">
-                    <a:lumMod val="75000"/>
-                  </a:schemeClr>
-                </a:solidFill>
-              </a:rPr>
-              <a:t>. The effect tells the audience which part of this slide corresponds to the content of the nex</a:t>
-            </a:r>
-            <a:r>
-              <a:rPr lang="en-US" dirty="0" smtClean="0">
-                <a:solidFill>
-                  <a:schemeClr val="accent6">
-                    <a:lumMod val="75000"/>
-                  </a:schemeClr>
-                </a:solidFill>
-              </a:rPr>
-              <a:t>t slide.</a:t>
-            </a:r>
-            <a:endParaRPr lang="en-SG" dirty="0">
-              <a:solidFill>
-                <a:schemeClr val="accent6">
-                  <a:lumMod val="75000"/>
-                </a:schemeClr>
-              </a:solidFill>
-            </a:endParaRPr>
-          </a:p>
-        </p:txBody>
-      </p:sp>
       <p:pic>
         <p:nvPicPr>
-          <p:cNvPr id="1032" name="Picture 8"/>
+          <p:cNvPr id="2050" name="Picture 2" descr="https://lh3.googleusercontent.com/R6W83U2d1JkOFMeYLbmqerTI4yEtMf-f4BeMJ3ZypqlW3Hke61IvywGjRmIhYOJClVg6URUsNjxisSc2DbtJd88i8KbNtmC2PJyP7NCLLKi07InZW8BfaCKmUQ"/>
           <p:cNvPicPr>
             <a:picLocks noChangeAspect="1" noChangeArrowheads="1"/>
           </p:cNvPicPr>
@@ -7837,36 +9225,30 @@
         </p:blipFill>
         <p:spPr bwMode="auto">
           <a:xfrm>
-            <a:off x="2931788" y="4899242"/>
-            <a:ext cx="304800" cy="286871"/>
+            <a:off x="4560503" y="513954"/>
+            <a:ext cx="773497" cy="1091996"/>
           </a:xfrm>
           <a:prstGeom prst="rect">
             <a:avLst/>
           </a:prstGeom>
           <a:noFill/>
-          <a:ln>
-            <a:noFill/>
+          <a:ln w="9525">
+            <a:solidFill>
+              <a:schemeClr val="bg1">
+                <a:lumMod val="85000"/>
+              </a:schemeClr>
+            </a:solidFill>
+            <a:miter lim="800000"/>
+            <a:headEnd/>
+            <a:tailEnd/>
           </a:ln>
-          <a:effectLst>
-            <a:softEdge rad="31750"/>
-          </a:effectLst>
           <a:extLst>
             <a:ext uri="{909E8E84-426E-40DD-AFC4-6F175D3DCCD1}">
               <a14:hiddenFill xmlns:a14="http://schemas.microsoft.com/office/drawing/2010/main">
                 <a:solidFill>
-                  <a:schemeClr val="accent1"/>
+                  <a:srgbClr val="FFFFFF"/>
                 </a:solidFill>
               </a14:hiddenFill>
-            </a:ext>
-            <a:ext uri="{91240B29-F687-4F45-9708-019B960494DF}">
-              <a14:hiddenLine xmlns:a14="http://schemas.microsoft.com/office/drawing/2010/main" w="9525">
-                <a:solidFill>
-                  <a:schemeClr val="tx1"/>
-                </a:solidFill>
-                <a:miter lim="800000"/>
-                <a:headEnd/>
-                <a:tailEnd/>
-              </a14:hiddenLine>
             </a:ext>
           </a:extLst>
         </p:spPr>
@@ -7874,7 +9256,7 @@
     </p:spTree>
     <p:extLst>
       <p:ext uri="{BB962C8B-B14F-4D97-AF65-F5344CB8AC3E}">
-        <p14:creationId xmlns:p14="http://schemas.microsoft.com/office/powerpoint/2010/main" val="161054008"/>
+        <p14:creationId xmlns:p14="http://schemas.microsoft.com/office/powerpoint/2010/main" val="2300630979"/>
       </p:ext>
     </p:extLst>
   </p:cSld>
@@ -7891,7 +9273,7 @@
 </p:sld>
 </file>
 
-<file path=ppt/slides/slide15.xml><?xml version="1.0" encoding="utf-8"?>
+<file path=ppt/slides/slide16.xml><?xml version="1.0" encoding="utf-8"?>
 <p:sld xmlns:a="http://schemas.openxmlformats.org/drawingml/2006/main" xmlns:r="http://schemas.openxmlformats.org/officeDocument/2006/relationships" xmlns:p="http://schemas.openxmlformats.org/presentationml/2006/main">
   <p:cSld>
     <p:bg>
@@ -8415,13 +9797,13 @@
   <p:clrMapOvr>
     <a:masterClrMapping/>
   </p:clrMapOvr>
-  <mc:AlternateContent xmlns:mc="http://schemas.openxmlformats.org/markup-compatibility/2006">
-    <mc:Choice xmlns:p14="http://schemas.microsoft.com/office/powerpoint/2010/main" Requires="p14">
+  <mc:AlternateContent xmlns:mc="http://schemas.openxmlformats.org/markup-compatibility/2006" xmlns:p14="http://schemas.microsoft.com/office/powerpoint/2010/main">
+    <mc:Choice Requires="p14">
       <p:transition p14:dur="250">
         <p:fade/>
       </p:transition>
     </mc:Choice>
-    <mc:Fallback>
+    <mc:Fallback xmlns="">
       <p:transition>
         <p:fade/>
       </p:transition>
@@ -8437,7 +9819,7 @@
 </p:sld>
 </file>
 
-<file path=ppt/slides/slide16.xml><?xml version="1.0" encoding="utf-8"?>
+<file path=ppt/slides/slide17.xml><?xml version="1.0" encoding="utf-8"?>
 <p:sld xmlns:a="http://schemas.openxmlformats.org/drawingml/2006/main" xmlns:r="http://schemas.openxmlformats.org/officeDocument/2006/relationships" xmlns:p="http://schemas.openxmlformats.org/presentationml/2006/main">
   <p:cSld>
     <p:spTree>
@@ -9298,7 +10680,7 @@
                   </a:schemeClr>
                 </a:solidFill>
               </a:rPr>
-              <a:t>3.</a:t>
+              <a:t>4.</a:t>
             </a:r>
             <a:r>
               <a:rPr lang="en-US" dirty="0" smtClean="0">
@@ -9318,17 +10700,17 @@
                   </a:schemeClr>
                 </a:solidFill>
               </a:rPr>
-              <a:t>Select the </a:t>
-            </a:r>
-            <a:r>
-              <a:rPr lang="en-US" dirty="0" smtClean="0">
+              <a:t>Select the blue rectangle and click  the              button to generate a </a:t>
+            </a:r>
+            <a:r>
+              <a:rPr lang="en-US" i="1" dirty="0" smtClean="0">
                 <a:solidFill>
                   <a:schemeClr val="accent6">
                     <a:lumMod val="75000"/>
                   </a:schemeClr>
                 </a:solidFill>
               </a:rPr>
-              <a:t>blue rectangle and </a:t>
+              <a:t>step back </a:t>
             </a:r>
             <a:r>
               <a:rPr lang="en-US" dirty="0" smtClean="0">
@@ -9338,7 +10720,7 @@
                   </a:schemeClr>
                 </a:solidFill>
               </a:rPr>
-              <a:t>click  the           </a:t>
+              <a:t>effect </a:t>
             </a:r>
             <a:r>
               <a:rPr lang="en-US" dirty="0" smtClean="0">
@@ -9348,27 +10730,7 @@
                   </a:schemeClr>
                 </a:solidFill>
               </a:rPr>
-              <a:t>   button to generate a </a:t>
-            </a:r>
-            <a:r>
-              <a:rPr lang="en-US" i="1" dirty="0" smtClean="0">
-                <a:solidFill>
-                  <a:schemeClr val="accent6">
-                    <a:lumMod val="75000"/>
-                  </a:schemeClr>
-                </a:solidFill>
-              </a:rPr>
-              <a:t>zoom out </a:t>
-            </a:r>
-            <a:r>
-              <a:rPr lang="en-US" dirty="0" smtClean="0">
-                <a:solidFill>
-                  <a:schemeClr val="accent6">
-                    <a:lumMod val="75000"/>
-                  </a:schemeClr>
-                </a:solidFill>
-              </a:rPr>
-              <a:t>effect from the previous slide.</a:t>
+              <a:t>from the previous slide.</a:t>
             </a:r>
             <a:endParaRPr lang="en-SG" dirty="0">
               <a:solidFill>
@@ -9380,9 +10742,121 @@
           </a:p>
         </p:txBody>
       </p:sp>
+      <p:sp>
+        <p:nvSpPr>
+          <p:cNvPr id="25" name="TextBox 24"/>
+          <p:cNvSpPr txBox="1"/>
+          <p:nvPr/>
+        </p:nvSpPr>
+        <p:spPr>
+          <a:xfrm>
+            <a:off x="495300" y="4724400"/>
+            <a:ext cx="8001000" cy="1077218"/>
+          </a:xfrm>
+          <a:prstGeom prst="rect">
+            <a:avLst/>
+          </a:prstGeom>
+          <a:noFill/>
+        </p:spPr>
+        <p:txBody>
+          <a:bodyPr wrap="square" rtlCol="0">
+            <a:spAutoFit/>
+          </a:bodyPr>
+          <a:lstStyle/>
+          <a:p>
+            <a:r>
+              <a:rPr lang="en-US" sz="2800" b="1" dirty="0" smtClean="0">
+                <a:solidFill>
+                  <a:schemeClr val="accent6">
+                    <a:lumMod val="75000"/>
+                  </a:schemeClr>
+                </a:solidFill>
+              </a:rPr>
+              <a:t>5.</a:t>
+            </a:r>
+            <a:r>
+              <a:rPr lang="en-US" dirty="0" smtClean="0">
+                <a:solidFill>
+                  <a:schemeClr val="accent6">
+                    <a:lumMod val="75000"/>
+                  </a:schemeClr>
+                </a:solidFill>
+              </a:rPr>
+              <a:t> </a:t>
+            </a:r>
+            <a:r>
+              <a:rPr lang="en-US" dirty="0" smtClean="0">
+                <a:solidFill>
+                  <a:schemeClr val="accent6">
+                    <a:lumMod val="75000"/>
+                  </a:schemeClr>
+                </a:solidFill>
+              </a:rPr>
+              <a:t>Go back a couple of slides and ‘play’ the slide show to </a:t>
+            </a:r>
+            <a:r>
+              <a:rPr lang="en-US" dirty="0" smtClean="0">
+                <a:solidFill>
+                  <a:schemeClr val="accent6">
+                    <a:lumMod val="75000"/>
+                  </a:schemeClr>
+                </a:solidFill>
+              </a:rPr>
+              <a:t>see the </a:t>
+            </a:r>
+            <a:r>
+              <a:rPr lang="en-US" i="1" dirty="0" smtClean="0">
+                <a:solidFill>
+                  <a:schemeClr val="accent6">
+                    <a:lumMod val="75000"/>
+                  </a:schemeClr>
+                </a:solidFill>
+              </a:rPr>
+              <a:t>step back </a:t>
+            </a:r>
+            <a:r>
+              <a:rPr lang="en-US" dirty="0" smtClean="0">
+                <a:solidFill>
+                  <a:schemeClr val="accent6">
+                    <a:lumMod val="75000"/>
+                  </a:schemeClr>
+                </a:solidFill>
+              </a:rPr>
+              <a:t>effect </a:t>
+            </a:r>
+            <a:r>
+              <a:rPr lang="en-US" dirty="0" smtClean="0">
+                <a:solidFill>
+                  <a:schemeClr val="accent6">
+                    <a:lumMod val="75000"/>
+                  </a:schemeClr>
+                </a:solidFill>
+              </a:rPr>
+              <a:t>generated</a:t>
+            </a:r>
+            <a:r>
+              <a:rPr lang="en-US" dirty="0" smtClean="0">
+                <a:solidFill>
+                  <a:schemeClr val="accent6">
+                    <a:lumMod val="75000"/>
+                  </a:schemeClr>
+                </a:solidFill>
+              </a:rPr>
+              <a:t>. This effect can be used to indicate that you are stepping back to take a look at where the details you have been discussing fit into the big picture.</a:t>
+            </a:r>
+            <a:endParaRPr lang="en-SG" dirty="0">
+              <a:solidFill>
+                <a:schemeClr val="accent6">
+                  <a:lumMod val="75000"/>
+                </a:schemeClr>
+              </a:solidFill>
+            </a:endParaRPr>
+          </a:p>
+        </p:txBody>
+      </p:sp>
       <p:pic>
         <p:nvPicPr>
-          <p:cNvPr id="13314" name="Picture 2"/>
+          <p:cNvPr id="3074" name="Picture 2" descr="https://lh5.googleusercontent.com/RiGAbJUVjt04HKmNmsqFl1MOYtPUEXRzeG_Vev_sTKVu51FdRzPHJwAanTzIdZtB3O52btkhy_7nJuTZPbaVwwdHd_eOc8_BFVnAyj2rY7IssqTAlfycb-JPJA"/>
           <p:cNvPicPr>
             <a:picLocks noChangeAspect="1" noChangeArrowheads="1"/>
           </p:cNvPicPr>
@@ -9403,8 +10877,8 @@
         </p:blipFill>
         <p:spPr bwMode="auto">
           <a:xfrm>
-            <a:off x="4605448" y="480567"/>
-            <a:ext cx="499951" cy="821348"/>
+            <a:off x="4533900" y="511946"/>
+            <a:ext cx="647700" cy="964661"/>
           </a:xfrm>
           <a:prstGeom prst="rect">
             <a:avLst/>
@@ -9424,105 +10898,13 @@
             <a:ext uri="{909E8E84-426E-40DD-AFC4-6F175D3DCCD1}">
               <a14:hiddenFill xmlns:a14="http://schemas.microsoft.com/office/drawing/2010/main">
                 <a:solidFill>
-                  <a:schemeClr val="accent1"/>
+                  <a:srgbClr val="FFFFFF"/>
                 </a:solidFill>
               </a14:hiddenFill>
-            </a:ext>
-            <a:ext uri="{91240B29-F687-4F45-9708-019B960494DF}">
-              <a14:hiddenLine xmlns:a14="http://schemas.microsoft.com/office/drawing/2010/main" w="9525">
-                <a:solidFill>
-                  <a:schemeClr val="tx1"/>
-                </a:solidFill>
-                <a:miter lim="800000"/>
-                <a:headEnd/>
-                <a:tailEnd/>
-              </a14:hiddenLine>
             </a:ext>
           </a:extLst>
         </p:spPr>
       </p:pic>
-      <p:sp>
-        <p:nvSpPr>
-          <p:cNvPr id="25" name="TextBox 24"/>
-          <p:cNvSpPr txBox="1"/>
-          <p:nvPr/>
-        </p:nvSpPr>
-        <p:spPr>
-          <a:xfrm>
-            <a:off x="495300" y="4724400"/>
-            <a:ext cx="8001000" cy="800219"/>
-          </a:xfrm>
-          <a:prstGeom prst="rect">
-            <a:avLst/>
-          </a:prstGeom>
-          <a:noFill/>
-        </p:spPr>
-        <p:txBody>
-          <a:bodyPr wrap="square" rtlCol="0">
-            <a:spAutoFit/>
-          </a:bodyPr>
-          <a:lstStyle/>
-          <a:p>
-            <a:r>
-              <a:rPr lang="en-US" sz="2800" b="1" dirty="0" smtClean="0">
-                <a:solidFill>
-                  <a:schemeClr val="accent6">
-                    <a:lumMod val="75000"/>
-                  </a:schemeClr>
-                </a:solidFill>
-              </a:rPr>
-              <a:t>4.</a:t>
-            </a:r>
-            <a:r>
-              <a:rPr lang="en-US" dirty="0" smtClean="0">
-                <a:solidFill>
-                  <a:schemeClr val="accent6">
-                    <a:lumMod val="75000"/>
-                  </a:schemeClr>
-                </a:solidFill>
-              </a:rPr>
-              <a:t> Go back a couple of slides and ‘play’ the slide show to see </a:t>
-            </a:r>
-            <a:r>
-              <a:rPr lang="en-US" i="1" dirty="0" smtClean="0">
-                <a:solidFill>
-                  <a:schemeClr val="accent6">
-                    <a:lumMod val="75000"/>
-                  </a:schemeClr>
-                </a:solidFill>
-              </a:rPr>
-              <a:t>zoom out </a:t>
-            </a:r>
-            <a:r>
-              <a:rPr lang="en-US" dirty="0" smtClean="0">
-                <a:solidFill>
-                  <a:schemeClr val="accent6">
-                    <a:lumMod val="75000"/>
-                  </a:schemeClr>
-                </a:solidFill>
-              </a:rPr>
-              <a:t>effect generated</a:t>
-            </a:r>
-            <a:r>
-              <a:rPr lang="en-US" dirty="0" smtClean="0">
-                <a:solidFill>
-                  <a:schemeClr val="accent6">
-                    <a:lumMod val="75000"/>
-                  </a:schemeClr>
-                </a:solidFill>
-              </a:rPr>
-              <a:t>.</a:t>
-            </a:r>
-            <a:endParaRPr lang="en-SG" dirty="0">
-              <a:solidFill>
-                <a:schemeClr val="accent6">
-                  <a:lumMod val="75000"/>
-                </a:schemeClr>
-              </a:solidFill>
-            </a:endParaRPr>
-          </a:p>
-        </p:txBody>
-      </p:sp>
     </p:spTree>
     <p:extLst>
       <p:ext uri="{BB962C8B-B14F-4D97-AF65-F5344CB8AC3E}">
@@ -9533,11 +10915,11 @@
   <p:clrMapOvr>
     <a:masterClrMapping/>
   </p:clrMapOvr>
-  <mc:AlternateContent xmlns:mc="http://schemas.openxmlformats.org/markup-compatibility/2006">
-    <mc:Choice xmlns:p14="http://schemas.microsoft.com/office/powerpoint/2010/main" Requires="p14">
+  <mc:AlternateContent xmlns:mc="http://schemas.openxmlformats.org/markup-compatibility/2006" xmlns:p14="http://schemas.microsoft.com/office/powerpoint/2010/main">
+    <mc:Choice Requires="p14">
       <p:transition spd="slow" p14:dur="2000"/>
     </mc:Choice>
-    <mc:Fallback>
+    <mc:Fallback xmlns="">
       <p:transition spd="slow"/>
     </mc:Fallback>
   </mc:AlternateContent>
@@ -9551,7 +10933,1542 @@
 </p:sld>
 </file>
 
-<file path=ppt/slides/slide17.xml><?xml version="1.0" encoding="utf-8"?>
+<file path=ppt/slides/slide18.xml><?xml version="1.0" encoding="utf-8"?>
+<p:sld xmlns:a="http://schemas.openxmlformats.org/drawingml/2006/main" xmlns:r="http://schemas.openxmlformats.org/officeDocument/2006/relationships" xmlns:p="http://schemas.openxmlformats.org/presentationml/2006/main">
+  <p:cSld>
+    <p:spTree>
+      <p:nvGrpSpPr>
+        <p:cNvPr id="1" name=""/>
+        <p:cNvGrpSpPr/>
+        <p:nvPr/>
+      </p:nvGrpSpPr>
+      <p:grpSpPr>
+        <a:xfrm>
+          <a:off x="0" y="0"/>
+          <a:ext cx="0" cy="0"/>
+          <a:chOff x="0" y="0"/>
+          <a:chExt cx="0" cy="0"/>
+        </a:xfrm>
+      </p:grpSpPr>
+      <p:sp>
+        <p:nvSpPr>
+          <p:cNvPr id="4" name="TextBox 3"/>
+          <p:cNvSpPr txBox="1"/>
+          <p:nvPr/>
+        </p:nvSpPr>
+        <p:spPr>
+          <a:xfrm>
+            <a:off x="3139292" y="3124200"/>
+            <a:ext cx="4328307" cy="369332"/>
+          </a:xfrm>
+          <a:prstGeom prst="rect">
+            <a:avLst/>
+          </a:prstGeom>
+          <a:noFill/>
+        </p:spPr>
+        <p:txBody>
+          <a:bodyPr wrap="square" rtlCol="0">
+            <a:spAutoFit/>
+          </a:bodyPr>
+          <a:lstStyle/>
+          <a:p>
+            <a:r>
+              <a:rPr lang="en-US" dirty="0" smtClean="0">
+                <a:solidFill>
+                  <a:schemeClr val="accent6">
+                    <a:lumMod val="75000"/>
+                  </a:schemeClr>
+                </a:solidFill>
+              </a:rPr>
+              <a:t>Next, let’s try the </a:t>
+            </a:r>
+            <a:r>
+              <a:rPr lang="en-US" b="1" dirty="0" smtClean="0">
+                <a:solidFill>
+                  <a:schemeClr val="accent6">
+                    <a:lumMod val="75000"/>
+                  </a:schemeClr>
+                </a:solidFill>
+              </a:rPr>
+              <a:t>Auto crop</a:t>
+            </a:r>
+            <a:r>
+              <a:rPr lang="en-US" dirty="0" smtClean="0">
+                <a:solidFill>
+                  <a:schemeClr val="accent6">
+                    <a:lumMod val="75000"/>
+                  </a:schemeClr>
+                </a:solidFill>
+              </a:rPr>
+              <a:t> </a:t>
+            </a:r>
+            <a:r>
+              <a:rPr lang="en-US" dirty="0" smtClean="0">
+                <a:solidFill>
+                  <a:schemeClr val="accent6">
+                    <a:lumMod val="75000"/>
+                  </a:schemeClr>
+                </a:solidFill>
+              </a:rPr>
+              <a:t>feature</a:t>
+            </a:r>
+            <a:endParaRPr lang="en-SG" dirty="0">
+              <a:solidFill>
+                <a:schemeClr val="accent6">
+                  <a:lumMod val="75000"/>
+                </a:schemeClr>
+              </a:solidFill>
+            </a:endParaRPr>
+          </a:p>
+        </p:txBody>
+      </p:sp>
+      <p:grpSp>
+        <p:nvGrpSpPr>
+          <p:cNvPr id="18" name="Group 17"/>
+          <p:cNvGrpSpPr/>
+          <p:nvPr/>
+        </p:nvGrpSpPr>
+        <p:grpSpPr>
+          <a:xfrm>
+            <a:off x="2299900" y="2870260"/>
+            <a:ext cx="838200" cy="838200"/>
+            <a:chOff x="5228946" y="2361045"/>
+            <a:chExt cx="838200" cy="838200"/>
+          </a:xfrm>
+        </p:grpSpPr>
+        <p:sp>
+          <p:nvSpPr>
+            <p:cNvPr id="19" name="Rectangle 39"/>
+            <p:cNvSpPr/>
+            <p:nvPr/>
+          </p:nvSpPr>
+          <p:spPr>
+            <a:xfrm>
+              <a:off x="5276698" y="2436461"/>
+              <a:ext cx="590701" cy="494090"/>
+            </a:xfrm>
+            <a:custGeom>
+              <a:avLst/>
+              <a:gdLst/>
+              <a:ahLst/>
+              <a:cxnLst/>
+              <a:rect l="l" t="t" r="r" b="b"/>
+              <a:pathLst>
+                <a:path w="854872" h="762000">
+                  <a:moveTo>
+                    <a:pt x="315122" y="73235"/>
+                  </a:moveTo>
+                  <a:cubicBezTo>
+                    <a:pt x="209912" y="73235"/>
+                    <a:pt x="124622" y="158525"/>
+                    <a:pt x="124622" y="263735"/>
+                  </a:cubicBezTo>
+                  <a:cubicBezTo>
+                    <a:pt x="124622" y="344232"/>
+                    <a:pt x="174550" y="413068"/>
+                    <a:pt x="245272" y="440600"/>
+                  </a:cubicBezTo>
+                  <a:lnTo>
+                    <a:pt x="245272" y="484400"/>
+                  </a:lnTo>
+                  <a:lnTo>
+                    <a:pt x="92872" y="547900"/>
+                  </a:lnTo>
+                  <a:lnTo>
+                    <a:pt x="86522" y="655850"/>
+                  </a:lnTo>
+                  <a:lnTo>
+                    <a:pt x="531022" y="643150"/>
+                  </a:lnTo>
+                  <a:lnTo>
+                    <a:pt x="384972" y="484400"/>
+                  </a:lnTo>
+                  <a:lnTo>
+                    <a:pt x="378974" y="442411"/>
+                  </a:lnTo>
+                  <a:cubicBezTo>
+                    <a:pt x="432013" y="424278"/>
+                    <a:pt x="473931" y="382714"/>
+                    <a:pt x="493073" y="330087"/>
+                  </a:cubicBezTo>
+                  <a:lnTo>
+                    <a:pt x="556422" y="338350"/>
+                  </a:lnTo>
+                  <a:lnTo>
+                    <a:pt x="499272" y="205000"/>
+                  </a:lnTo>
+                  <a:lnTo>
+                    <a:pt x="496531" y="208524"/>
+                  </a:lnTo>
+                  <a:cubicBezTo>
+                    <a:pt x="473664" y="130106"/>
+                    <a:pt x="401034" y="73235"/>
+                    <a:pt x="315122" y="73235"/>
+                  </a:cubicBezTo>
+                  <a:close/>
+                  <a:moveTo>
+                    <a:pt x="0" y="0"/>
+                  </a:moveTo>
+                  <a:lnTo>
+                    <a:pt x="854872" y="0"/>
+                  </a:lnTo>
+                  <a:lnTo>
+                    <a:pt x="854872" y="762000"/>
+                  </a:lnTo>
+                  <a:lnTo>
+                    <a:pt x="0" y="762000"/>
+                  </a:lnTo>
+                  <a:close/>
+                </a:path>
+              </a:pathLst>
+            </a:custGeom>
+            <a:solidFill>
+              <a:schemeClr val="accent6"/>
+            </a:solidFill>
+            <a:ln>
+              <a:noFill/>
+            </a:ln>
+          </p:spPr>
+          <p:style>
+            <a:lnRef idx="2">
+              <a:schemeClr val="accent1">
+                <a:shade val="50000"/>
+              </a:schemeClr>
+            </a:lnRef>
+            <a:fillRef idx="1">
+              <a:schemeClr val="accent1"/>
+            </a:fillRef>
+            <a:effectRef idx="0">
+              <a:schemeClr val="accent1"/>
+            </a:effectRef>
+            <a:fontRef idx="minor">
+              <a:schemeClr val="lt1"/>
+            </a:fontRef>
+          </p:style>
+          <p:txBody>
+            <a:bodyPr rtlCol="0" anchor="ctr"/>
+            <a:lstStyle/>
+            <a:p>
+              <a:pPr algn="ctr"/>
+              <a:endParaRPr lang="en-US"/>
+            </a:p>
+          </p:txBody>
+        </p:sp>
+        <p:sp>
+          <p:nvSpPr>
+            <p:cNvPr id="20" name="Flowchart: Connector 41"/>
+            <p:cNvSpPr/>
+            <p:nvPr/>
+          </p:nvSpPr>
+          <p:spPr>
+            <a:xfrm rot="771170">
+              <a:off x="5635800" y="2669144"/>
+              <a:ext cx="387585" cy="402233"/>
+            </a:xfrm>
+            <a:custGeom>
+              <a:avLst/>
+              <a:gdLst/>
+              <a:ahLst/>
+              <a:cxnLst/>
+              <a:rect l="l" t="t" r="r" b="b"/>
+              <a:pathLst>
+                <a:path w="469900" h="582615">
+                  <a:moveTo>
+                    <a:pt x="228600" y="0"/>
+                  </a:moveTo>
+                  <a:cubicBezTo>
+                    <a:pt x="314512" y="0"/>
+                    <a:pt x="387142" y="56871"/>
+                    <a:pt x="410009" y="135289"/>
+                  </a:cubicBezTo>
+                  <a:lnTo>
+                    <a:pt x="412750" y="131765"/>
+                  </a:lnTo>
+                  <a:lnTo>
+                    <a:pt x="469900" y="265115"/>
+                  </a:lnTo>
+                  <a:lnTo>
+                    <a:pt x="406551" y="256852"/>
+                  </a:lnTo>
+                  <a:cubicBezTo>
+                    <a:pt x="387409" y="309479"/>
+                    <a:pt x="345491" y="351043"/>
+                    <a:pt x="292452" y="369176"/>
+                  </a:cubicBezTo>
+                  <a:lnTo>
+                    <a:pt x="298450" y="411165"/>
+                  </a:lnTo>
+                  <a:lnTo>
+                    <a:pt x="444500" y="569915"/>
+                  </a:lnTo>
+                  <a:lnTo>
+                    <a:pt x="0" y="582615"/>
+                  </a:lnTo>
+                  <a:lnTo>
+                    <a:pt x="6350" y="474665"/>
+                  </a:lnTo>
+                  <a:lnTo>
+                    <a:pt x="158750" y="411165"/>
+                  </a:lnTo>
+                  <a:lnTo>
+                    <a:pt x="158750" y="367365"/>
+                  </a:lnTo>
+                  <a:cubicBezTo>
+                    <a:pt x="88028" y="339833"/>
+                    <a:pt x="38100" y="270997"/>
+                    <a:pt x="38100" y="190500"/>
+                  </a:cubicBezTo>
+                  <a:cubicBezTo>
+                    <a:pt x="38100" y="85290"/>
+                    <a:pt x="123390" y="0"/>
+                    <a:pt x="228600" y="0"/>
+                  </a:cubicBezTo>
+                  <a:close/>
+                </a:path>
+              </a:pathLst>
+            </a:custGeom>
+            <a:solidFill>
+              <a:srgbClr val="0070C0"/>
+            </a:solidFill>
+            <a:ln>
+              <a:solidFill>
+                <a:schemeClr val="bg1">
+                  <a:lumMod val="95000"/>
+                </a:schemeClr>
+              </a:solidFill>
+            </a:ln>
+            <a:effectLst>
+              <a:outerShdw blurRad="63500" sx="102000" sy="102000" algn="ctr" rotWithShape="0">
+                <a:prstClr val="black">
+                  <a:alpha val="40000"/>
+                </a:prstClr>
+              </a:outerShdw>
+            </a:effectLst>
+          </p:spPr>
+          <p:style>
+            <a:lnRef idx="2">
+              <a:schemeClr val="accent1">
+                <a:shade val="50000"/>
+              </a:schemeClr>
+            </a:lnRef>
+            <a:fillRef idx="1">
+              <a:schemeClr val="accent1"/>
+            </a:fillRef>
+            <a:effectRef idx="0">
+              <a:schemeClr val="accent1"/>
+            </a:effectRef>
+            <a:fontRef idx="minor">
+              <a:schemeClr val="lt1"/>
+            </a:fontRef>
+          </p:style>
+          <p:txBody>
+            <a:bodyPr rtlCol="0" anchor="ctr"/>
+            <a:lstStyle/>
+            <a:p>
+              <a:pPr algn="ctr"/>
+              <a:endParaRPr lang="en-US"/>
+            </a:p>
+          </p:txBody>
+        </p:sp>
+        <p:sp>
+          <p:nvSpPr>
+            <p:cNvPr id="21" name="Rectangle 20"/>
+            <p:cNvSpPr/>
+            <p:nvPr/>
+          </p:nvSpPr>
+          <p:spPr>
+            <a:xfrm>
+              <a:off x="5228946" y="2361045"/>
+              <a:ext cx="838200" cy="838200"/>
+            </a:xfrm>
+            <a:prstGeom prst="rect">
+              <a:avLst/>
+            </a:prstGeom>
+            <a:noFill/>
+            <a:ln>
+              <a:noFill/>
+            </a:ln>
+          </p:spPr>
+          <p:style>
+            <a:lnRef idx="2">
+              <a:schemeClr val="accent1">
+                <a:shade val="50000"/>
+              </a:schemeClr>
+            </a:lnRef>
+            <a:fillRef idx="1">
+              <a:schemeClr val="accent1"/>
+            </a:fillRef>
+            <a:effectRef idx="0">
+              <a:schemeClr val="accent1"/>
+            </a:effectRef>
+            <a:fontRef idx="minor">
+              <a:schemeClr val="lt1"/>
+            </a:fontRef>
+          </p:style>
+          <p:txBody>
+            <a:bodyPr rtlCol="0" anchor="ctr"/>
+            <a:lstStyle/>
+            <a:p>
+              <a:pPr algn="ctr"/>
+              <a:endParaRPr lang="en-SG"/>
+            </a:p>
+          </p:txBody>
+        </p:sp>
+      </p:grpSp>
+    </p:spTree>
+    <p:extLst>
+      <p:ext uri="{BB962C8B-B14F-4D97-AF65-F5344CB8AC3E}">
+        <p14:creationId xmlns:p14="http://schemas.microsoft.com/office/powerpoint/2010/main" val="1127885235"/>
+      </p:ext>
+    </p:extLst>
+  </p:cSld>
+  <p:clrMapOvr>
+    <a:masterClrMapping/>
+  </p:clrMapOvr>
+</p:sld>
+</file>
+
+<file path=ppt/slides/slide19.xml><?xml version="1.0" encoding="utf-8"?>
+<p:sld xmlns:a="http://schemas.openxmlformats.org/drawingml/2006/main" xmlns:r="http://schemas.openxmlformats.org/officeDocument/2006/relationships" xmlns:p="http://schemas.openxmlformats.org/presentationml/2006/main">
+  <p:cSld>
+    <p:spTree>
+      <p:nvGrpSpPr>
+        <p:cNvPr id="1" name=""/>
+        <p:cNvGrpSpPr/>
+        <p:nvPr/>
+      </p:nvGrpSpPr>
+      <p:grpSpPr>
+        <a:xfrm>
+          <a:off x="0" y="0"/>
+          <a:ext cx="0" cy="0"/>
+          <a:chOff x="0" y="0"/>
+          <a:chExt cx="0" cy="0"/>
+        </a:xfrm>
+      </p:grpSpPr>
+      <p:pic>
+        <p:nvPicPr>
+          <p:cNvPr id="4101" name="Picture 5" descr="C:\Users\dcsdcr\AppData\Local\Microsoft\Windows\Temporary Internet Files\Content.IE5\X5YV3EZ2\MP900178526[1].jpg"/>
+          <p:cNvPicPr>
+            <a:picLocks noChangeAspect="1" noChangeArrowheads="1"/>
+          </p:cNvPicPr>
+          <p:nvPr/>
+        </p:nvPicPr>
+        <p:blipFill rotWithShape="1">
+          <a:blip r:embed="rId3">
+            <a:extLst>
+              <a:ext uri="{28A0092B-C50C-407E-A947-70E740481C1C}">
+                <a14:useLocalDpi xmlns:a14="http://schemas.microsoft.com/office/drawing/2010/main" val="0"/>
+              </a:ext>
+            </a:extLst>
+          </a:blip>
+          <a:srcRect b="33434"/>
+          <a:stretch/>
+        </p:blipFill>
+        <p:spPr bwMode="auto">
+          <a:xfrm>
+            <a:off x="838200" y="2971800"/>
+            <a:ext cx="2189861" cy="2181101"/>
+          </a:xfrm>
+          <a:prstGeom prst="rect">
+            <a:avLst/>
+          </a:prstGeom>
+          <a:noFill/>
+          <a:extLst>
+            <a:ext uri="{909E8E84-426E-40DD-AFC4-6F175D3DCCD1}">
+              <a14:hiddenFill xmlns:a14="http://schemas.microsoft.com/office/drawing/2010/main">
+                <a:solidFill>
+                  <a:srgbClr val="FFFFFF"/>
+                </a:solidFill>
+              </a14:hiddenFill>
+            </a:ext>
+          </a:extLst>
+        </p:spPr>
+      </p:pic>
+      <p:sp>
+        <p:nvSpPr>
+          <p:cNvPr id="7" name="TextBox 6"/>
+          <p:cNvSpPr txBox="1"/>
+          <p:nvPr/>
+        </p:nvSpPr>
+        <p:spPr>
+          <a:xfrm>
+            <a:off x="533400" y="479318"/>
+            <a:ext cx="8001000" cy="1354217"/>
+          </a:xfrm>
+          <a:prstGeom prst="rect">
+            <a:avLst/>
+          </a:prstGeom>
+          <a:noFill/>
+        </p:spPr>
+        <p:txBody>
+          <a:bodyPr wrap="square" rtlCol="0">
+            <a:spAutoFit/>
+          </a:bodyPr>
+          <a:lstStyle/>
+          <a:p>
+            <a:r>
+              <a:rPr lang="en-US" sz="2800" b="1" dirty="0" smtClean="0">
+                <a:solidFill>
+                  <a:schemeClr val="accent6">
+                    <a:lumMod val="75000"/>
+                  </a:schemeClr>
+                </a:solidFill>
+              </a:rPr>
+              <a:t>1.</a:t>
+            </a:r>
+            <a:r>
+              <a:rPr lang="en-US" dirty="0" smtClean="0">
+                <a:solidFill>
+                  <a:schemeClr val="accent6">
+                    <a:lumMod val="75000"/>
+                  </a:schemeClr>
+                </a:solidFill>
+              </a:rPr>
+              <a:t> </a:t>
+            </a:r>
+            <a:r>
+              <a:rPr lang="en-US" dirty="0" smtClean="0">
+                <a:solidFill>
+                  <a:schemeClr val="accent6">
+                    <a:lumMod val="75000"/>
+                  </a:schemeClr>
+                </a:solidFill>
+              </a:rPr>
+              <a:t>Select the blue shap</a:t>
+            </a:r>
+            <a:r>
+              <a:rPr lang="en-US" dirty="0" smtClean="0">
+                <a:solidFill>
+                  <a:schemeClr val="accent6">
+                    <a:lumMod val="75000"/>
+                  </a:schemeClr>
+                </a:solidFill>
+              </a:rPr>
+              <a:t>es (ctrl + click) and c</a:t>
+            </a:r>
+            <a:r>
+              <a:rPr lang="en-US" dirty="0" smtClean="0">
+                <a:solidFill>
+                  <a:schemeClr val="accent6">
+                    <a:lumMod val="75000"/>
+                  </a:schemeClr>
+                </a:solidFill>
+              </a:rPr>
+              <a:t>lick </a:t>
+            </a:r>
+            <a:r>
+              <a:rPr lang="en-US" dirty="0" smtClean="0">
+                <a:solidFill>
+                  <a:schemeClr val="accent6">
+                    <a:lumMod val="75000"/>
+                  </a:schemeClr>
+                </a:solidFill>
+              </a:rPr>
+              <a:t>the                 button. </a:t>
+            </a:r>
+            <a:br>
+              <a:rPr lang="en-US" dirty="0" smtClean="0">
+                <a:solidFill>
+                  <a:schemeClr val="accent6">
+                    <a:lumMod val="75000"/>
+                  </a:schemeClr>
+                </a:solidFill>
+              </a:rPr>
+            </a:br>
+            <a:r>
+              <a:rPr lang="en-US" dirty="0" smtClean="0">
+                <a:solidFill>
+                  <a:schemeClr val="accent6">
+                    <a:lumMod val="75000"/>
+                  </a:schemeClr>
+                </a:solidFill>
+              </a:rPr>
+              <a:t/>
+            </a:r>
+            <a:br>
+              <a:rPr lang="en-US" dirty="0" smtClean="0">
+                <a:solidFill>
+                  <a:schemeClr val="accent6">
+                    <a:lumMod val="75000"/>
+                  </a:schemeClr>
+                </a:solidFill>
+              </a:rPr>
+            </a:br>
+            <a:r>
+              <a:rPr lang="en-US" dirty="0" smtClean="0">
+                <a:solidFill>
+                  <a:schemeClr val="accent6">
+                    <a:lumMod val="75000"/>
+                  </a:schemeClr>
+                </a:solidFill>
+              </a:rPr>
+              <a:t/>
+            </a:r>
+            <a:br>
+              <a:rPr lang="en-US" dirty="0" smtClean="0">
+                <a:solidFill>
+                  <a:schemeClr val="accent6">
+                    <a:lumMod val="75000"/>
+                  </a:schemeClr>
+                </a:solidFill>
+              </a:rPr>
+            </a:br>
+            <a:r>
+              <a:rPr lang="en-US" dirty="0" smtClean="0">
+                <a:solidFill>
+                  <a:schemeClr val="accent6">
+                    <a:lumMod val="75000"/>
+                  </a:schemeClr>
+                </a:solidFill>
+              </a:rPr>
+              <a:t>It will </a:t>
+            </a:r>
+            <a:r>
+              <a:rPr lang="en-US" dirty="0" smtClean="0">
+                <a:solidFill>
+                  <a:schemeClr val="accent6">
+                    <a:lumMod val="75000"/>
+                  </a:schemeClr>
+                </a:solidFill>
+              </a:rPr>
+              <a:t>crop the images behind to match the outlines of the shapes.</a:t>
+            </a:r>
+            <a:endParaRPr lang="en-SG" dirty="0">
+              <a:solidFill>
+                <a:schemeClr val="accent6">
+                  <a:lumMod val="75000"/>
+                </a:schemeClr>
+              </a:solidFill>
+            </a:endParaRPr>
+          </a:p>
+        </p:txBody>
+      </p:sp>
+      <p:pic>
+        <p:nvPicPr>
+          <p:cNvPr id="4098" name="Picture 2" descr="https://lh5.googleusercontent.com/DTiGBT0_tLq8w9oUQPkuJhJHa8skEBcs9JxuDvMSN69hx3sd03WpEo1NFwYfOH56V1RhgCwGysyGPX8JuJ5Iqa7-3VSN0d6LWtne6SiJcfC4TxOTaRAk-hTAkQ"/>
+          <p:cNvPicPr>
+            <a:picLocks noChangeAspect="1" noChangeArrowheads="1"/>
+          </p:cNvPicPr>
+          <p:nvPr/>
+        </p:nvPicPr>
+        <p:blipFill>
+          <a:blip r:embed="rId4">
+            <a:extLst>
+              <a:ext uri="{28A0092B-C50C-407E-A947-70E740481C1C}">
+                <a14:useLocalDpi xmlns:a14="http://schemas.microsoft.com/office/drawing/2010/main" val="0"/>
+              </a:ext>
+            </a:extLst>
+          </a:blip>
+          <a:srcRect/>
+          <a:stretch>
+            <a:fillRect/>
+          </a:stretch>
+        </p:blipFill>
+        <p:spPr bwMode="auto">
+          <a:xfrm>
+            <a:off x="5474527" y="450660"/>
+            <a:ext cx="621473" cy="844265"/>
+          </a:xfrm>
+          <a:prstGeom prst="rect">
+            <a:avLst/>
+          </a:prstGeom>
+          <a:noFill/>
+          <a:ln w="9525">
+            <a:solidFill>
+              <a:schemeClr val="bg1">
+                <a:lumMod val="85000"/>
+              </a:schemeClr>
+            </a:solidFill>
+            <a:miter lim="800000"/>
+            <a:headEnd/>
+            <a:tailEnd/>
+          </a:ln>
+          <a:extLst>
+            <a:ext uri="{909E8E84-426E-40DD-AFC4-6F175D3DCCD1}">
+              <a14:hiddenFill xmlns:a14="http://schemas.microsoft.com/office/drawing/2010/main">
+                <a:solidFill>
+                  <a:srgbClr val="FFFFFF"/>
+                </a:solidFill>
+              </a14:hiddenFill>
+            </a:ext>
+          </a:extLst>
+        </p:spPr>
+      </p:pic>
+      <p:pic>
+        <p:nvPicPr>
+          <p:cNvPr id="4099" name="Picture 3" descr="C:\Users\dcsdcr\AppData\Local\Microsoft\Windows\Temporary Internet Files\Content.IE5\0BIO7UD5\MP900422113[1].jpg"/>
+          <p:cNvPicPr>
+            <a:picLocks noChangeAspect="1" noChangeArrowheads="1"/>
+          </p:cNvPicPr>
+          <p:nvPr/>
+        </p:nvPicPr>
+        <p:blipFill rotWithShape="1">
+          <a:blip r:embed="rId5">
+            <a:extLst>
+              <a:ext uri="{28A0092B-C50C-407E-A947-70E740481C1C}">
+                <a14:useLocalDpi xmlns:a14="http://schemas.microsoft.com/office/drawing/2010/main" val="0"/>
+              </a:ext>
+            </a:extLst>
+          </a:blip>
+          <a:srcRect l="8254" t="-1" r="8755" b="48283"/>
+          <a:stretch/>
+        </p:blipFill>
+        <p:spPr bwMode="auto">
+          <a:xfrm>
+            <a:off x="2908466" y="1981200"/>
+            <a:ext cx="5778336" cy="3373582"/>
+          </a:xfrm>
+          <a:prstGeom prst="rect">
+            <a:avLst/>
+          </a:prstGeom>
+          <a:noFill/>
+          <a:effectLst>
+            <a:softEdge rad="31750"/>
+          </a:effectLst>
+          <a:extLst>
+            <a:ext uri="{909E8E84-426E-40DD-AFC4-6F175D3DCCD1}">
+              <a14:hiddenFill xmlns:a14="http://schemas.microsoft.com/office/drawing/2010/main">
+                <a:solidFill>
+                  <a:srgbClr val="FFFFFF"/>
+                </a:solidFill>
+              </a14:hiddenFill>
+            </a:ext>
+          </a:extLst>
+        </p:spPr>
+      </p:pic>
+      <p:sp>
+        <p:nvSpPr>
+          <p:cNvPr id="2" name="Flowchart: Connector 1"/>
+          <p:cNvSpPr/>
+          <p:nvPr/>
+        </p:nvSpPr>
+        <p:spPr>
+          <a:xfrm>
+            <a:off x="3048001" y="2743200"/>
+            <a:ext cx="1524000" cy="1524000"/>
+          </a:xfrm>
+          <a:prstGeom prst="flowChartConnector">
+            <a:avLst/>
+          </a:prstGeom>
+          <a:solidFill>
+            <a:schemeClr val="accent1">
+              <a:alpha val="66000"/>
+            </a:schemeClr>
+          </a:solidFill>
+        </p:spPr>
+        <p:style>
+          <a:lnRef idx="2">
+            <a:schemeClr val="accent1">
+              <a:shade val="50000"/>
+            </a:schemeClr>
+          </a:lnRef>
+          <a:fillRef idx="1">
+            <a:schemeClr val="accent1"/>
+          </a:fillRef>
+          <a:effectRef idx="0">
+            <a:schemeClr val="accent1"/>
+          </a:effectRef>
+          <a:fontRef idx="minor">
+            <a:schemeClr val="lt1"/>
+          </a:fontRef>
+        </p:style>
+        <p:txBody>
+          <a:bodyPr rtlCol="0" anchor="ctr"/>
+          <a:lstStyle/>
+          <a:p>
+            <a:pPr algn="ctr"/>
+            <a:endParaRPr lang="en-SG"/>
+          </a:p>
+        </p:txBody>
+      </p:sp>
+      <p:sp>
+        <p:nvSpPr>
+          <p:cNvPr id="10" name="Flowchart: Connector 9"/>
+          <p:cNvSpPr/>
+          <p:nvPr/>
+        </p:nvSpPr>
+        <p:spPr>
+          <a:xfrm>
+            <a:off x="4952999" y="2743200"/>
+            <a:ext cx="1388299" cy="1388299"/>
+          </a:xfrm>
+          <a:prstGeom prst="flowChartConnector">
+            <a:avLst/>
+          </a:prstGeom>
+          <a:solidFill>
+            <a:schemeClr val="accent1">
+              <a:alpha val="66000"/>
+            </a:schemeClr>
+          </a:solidFill>
+        </p:spPr>
+        <p:style>
+          <a:lnRef idx="2">
+            <a:schemeClr val="accent1">
+              <a:shade val="50000"/>
+            </a:schemeClr>
+          </a:lnRef>
+          <a:fillRef idx="1">
+            <a:schemeClr val="accent1"/>
+          </a:fillRef>
+          <a:effectRef idx="0">
+            <a:schemeClr val="accent1"/>
+          </a:effectRef>
+          <a:fontRef idx="minor">
+            <a:schemeClr val="lt1"/>
+          </a:fontRef>
+        </p:style>
+        <p:txBody>
+          <a:bodyPr rtlCol="0" anchor="ctr"/>
+          <a:lstStyle/>
+          <a:p>
+            <a:pPr algn="ctr"/>
+            <a:endParaRPr lang="en-SG"/>
+          </a:p>
+        </p:txBody>
+      </p:sp>
+      <p:sp>
+        <p:nvSpPr>
+          <p:cNvPr id="11" name="Flowchart: Connector 10"/>
+          <p:cNvSpPr/>
+          <p:nvPr/>
+        </p:nvSpPr>
+        <p:spPr>
+          <a:xfrm>
+            <a:off x="6281924" y="2015835"/>
+            <a:ext cx="1354902" cy="1354902"/>
+          </a:xfrm>
+          <a:prstGeom prst="flowChartConnector">
+            <a:avLst/>
+          </a:prstGeom>
+          <a:solidFill>
+            <a:schemeClr val="accent1">
+              <a:alpha val="66000"/>
+            </a:schemeClr>
+          </a:solidFill>
+        </p:spPr>
+        <p:style>
+          <a:lnRef idx="2">
+            <a:schemeClr val="accent1">
+              <a:shade val="50000"/>
+            </a:schemeClr>
+          </a:lnRef>
+          <a:fillRef idx="1">
+            <a:schemeClr val="accent1"/>
+          </a:fillRef>
+          <a:effectRef idx="0">
+            <a:schemeClr val="accent1"/>
+          </a:effectRef>
+          <a:fontRef idx="minor">
+            <a:schemeClr val="lt1"/>
+          </a:fontRef>
+        </p:style>
+        <p:txBody>
+          <a:bodyPr rtlCol="0" anchor="ctr"/>
+          <a:lstStyle/>
+          <a:p>
+            <a:pPr algn="ctr"/>
+            <a:endParaRPr lang="en-SG"/>
+          </a:p>
+        </p:txBody>
+      </p:sp>
+      <p:sp>
+        <p:nvSpPr>
+          <p:cNvPr id="12" name="Flowchart: Connector 11"/>
+          <p:cNvSpPr/>
+          <p:nvPr/>
+        </p:nvSpPr>
+        <p:spPr>
+          <a:xfrm>
+            <a:off x="7305303" y="2733303"/>
+            <a:ext cx="1381497" cy="1381497"/>
+          </a:xfrm>
+          <a:prstGeom prst="flowChartConnector">
+            <a:avLst/>
+          </a:prstGeom>
+          <a:solidFill>
+            <a:schemeClr val="accent1">
+              <a:alpha val="66000"/>
+            </a:schemeClr>
+          </a:solidFill>
+        </p:spPr>
+        <p:style>
+          <a:lnRef idx="2">
+            <a:schemeClr val="accent1">
+              <a:shade val="50000"/>
+            </a:schemeClr>
+          </a:lnRef>
+          <a:fillRef idx="1">
+            <a:schemeClr val="accent1"/>
+          </a:fillRef>
+          <a:effectRef idx="0">
+            <a:schemeClr val="accent1"/>
+          </a:effectRef>
+          <a:fontRef idx="minor">
+            <a:schemeClr val="lt1"/>
+          </a:fontRef>
+        </p:style>
+        <p:txBody>
+          <a:bodyPr rtlCol="0" anchor="ctr"/>
+          <a:lstStyle/>
+          <a:p>
+            <a:pPr algn="ctr"/>
+            <a:endParaRPr lang="en-SG"/>
+          </a:p>
+        </p:txBody>
+      </p:sp>
+      <p:sp>
+        <p:nvSpPr>
+          <p:cNvPr id="3" name="Rectangle 2"/>
+          <p:cNvSpPr/>
+          <p:nvPr/>
+        </p:nvSpPr>
+        <p:spPr>
+          <a:xfrm>
+            <a:off x="2908466" y="3048001"/>
+            <a:ext cx="4787735" cy="609600"/>
+          </a:xfrm>
+          <a:prstGeom prst="rect">
+            <a:avLst/>
+          </a:prstGeom>
+          <a:solidFill>
+            <a:schemeClr val="accent1">
+              <a:alpha val="66000"/>
+            </a:schemeClr>
+          </a:solidFill>
+        </p:spPr>
+        <p:style>
+          <a:lnRef idx="2">
+            <a:schemeClr val="accent1">
+              <a:shade val="50000"/>
+            </a:schemeClr>
+          </a:lnRef>
+          <a:fillRef idx="1">
+            <a:schemeClr val="accent1"/>
+          </a:fillRef>
+          <a:effectRef idx="0">
+            <a:schemeClr val="accent1"/>
+          </a:effectRef>
+          <a:fontRef idx="minor">
+            <a:schemeClr val="lt1"/>
+          </a:fontRef>
+        </p:style>
+        <p:txBody>
+          <a:bodyPr rtlCol="0" anchor="ctr"/>
+          <a:lstStyle/>
+          <a:p>
+            <a:pPr algn="ctr"/>
+            <a:endParaRPr lang="en-SG"/>
+          </a:p>
+        </p:txBody>
+      </p:sp>
+      <p:sp>
+        <p:nvSpPr>
+          <p:cNvPr id="6" name="Teardrop 5"/>
+          <p:cNvSpPr/>
+          <p:nvPr/>
+        </p:nvSpPr>
+        <p:spPr>
+          <a:xfrm>
+            <a:off x="1143000" y="3048000"/>
+            <a:ext cx="1765465" cy="1676400"/>
+          </a:xfrm>
+          <a:prstGeom prst="teardrop">
+            <a:avLst/>
+          </a:prstGeom>
+          <a:solidFill>
+            <a:schemeClr val="accent1">
+              <a:alpha val="66000"/>
+            </a:schemeClr>
+          </a:solidFill>
+        </p:spPr>
+        <p:style>
+          <a:lnRef idx="2">
+            <a:schemeClr val="accent1">
+              <a:shade val="50000"/>
+            </a:schemeClr>
+          </a:lnRef>
+          <a:fillRef idx="1">
+            <a:schemeClr val="accent1"/>
+          </a:fillRef>
+          <a:effectRef idx="0">
+            <a:schemeClr val="accent1"/>
+          </a:effectRef>
+          <a:fontRef idx="minor">
+            <a:schemeClr val="lt1"/>
+          </a:fontRef>
+        </p:style>
+        <p:txBody>
+          <a:bodyPr rtlCol="0" anchor="ctr"/>
+          <a:lstStyle/>
+          <a:p>
+            <a:pPr algn="ctr"/>
+            <a:endParaRPr lang="en-SG"/>
+          </a:p>
+        </p:txBody>
+      </p:sp>
+    </p:spTree>
+    <p:extLst>
+      <p:ext uri="{BB962C8B-B14F-4D97-AF65-F5344CB8AC3E}">
+        <p14:creationId xmlns:p14="http://schemas.microsoft.com/office/powerpoint/2010/main" val="1274961499"/>
+      </p:ext>
+    </p:extLst>
+  </p:cSld>
+  <p:clrMapOvr>
+    <a:masterClrMapping/>
+  </p:clrMapOvr>
+  <p:timing>
+    <p:tnLst>
+      <p:par>
+        <p:cTn id="1" dur="indefinite" restart="never" nodeType="tmRoot"/>
+      </p:par>
+    </p:tnLst>
+  </p:timing>
+</p:sld>
+</file>
+
+<file path=ppt/slides/slide2.xml><?xml version="1.0" encoding="utf-8"?>
+<p:sld xmlns:a="http://schemas.openxmlformats.org/drawingml/2006/main" xmlns:r="http://schemas.openxmlformats.org/officeDocument/2006/relationships" xmlns:p="http://schemas.openxmlformats.org/presentationml/2006/main">
+  <p:cSld>
+    <p:spTree>
+      <p:nvGrpSpPr>
+        <p:cNvPr id="1" name=""/>
+        <p:cNvGrpSpPr/>
+        <p:nvPr/>
+      </p:nvGrpSpPr>
+      <p:grpSpPr>
+        <a:xfrm>
+          <a:off x="0" y="0"/>
+          <a:ext cx="0" cy="0"/>
+          <a:chOff x="0" y="0"/>
+          <a:chExt cx="0" cy="0"/>
+        </a:xfrm>
+      </p:grpSpPr>
+      <p:sp>
+        <p:nvSpPr>
+          <p:cNvPr id="4" name="TextBox 3"/>
+          <p:cNvSpPr txBox="1"/>
+          <p:nvPr/>
+        </p:nvSpPr>
+        <p:spPr>
+          <a:xfrm>
+            <a:off x="533400" y="479318"/>
+            <a:ext cx="8001000" cy="369332"/>
+          </a:xfrm>
+          <a:prstGeom prst="rect">
+            <a:avLst/>
+          </a:prstGeom>
+          <a:noFill/>
+        </p:spPr>
+        <p:txBody>
+          <a:bodyPr wrap="square" rtlCol="0">
+            <a:spAutoFit/>
+          </a:bodyPr>
+          <a:lstStyle/>
+          <a:p>
+            <a:r>
+              <a:rPr lang="en-US" dirty="0" smtClean="0">
+                <a:solidFill>
+                  <a:schemeClr val="accent6">
+                    <a:lumMod val="75000"/>
+                  </a:schemeClr>
+                </a:solidFill>
+              </a:rPr>
+              <a:t>Please go through this tutorial in the ‘edit’ mode, not ‘slideshow’ mode. </a:t>
+            </a:r>
+            <a:endParaRPr lang="en-SG" dirty="0">
+              <a:solidFill>
+                <a:schemeClr val="accent6">
+                  <a:lumMod val="75000"/>
+                </a:schemeClr>
+              </a:solidFill>
+            </a:endParaRPr>
+          </a:p>
+        </p:txBody>
+      </p:sp>
+      <p:pic>
+        <p:nvPicPr>
+          <p:cNvPr id="4099" name="Picture 3"/>
+          <p:cNvPicPr>
+            <a:picLocks noChangeAspect="1" noChangeArrowheads="1"/>
+          </p:cNvPicPr>
+          <p:nvPr/>
+        </p:nvPicPr>
+        <p:blipFill>
+          <a:blip r:embed="rId2">
+            <a:extLst>
+              <a:ext uri="{28A0092B-C50C-407E-A947-70E740481C1C}">
+                <a14:useLocalDpi xmlns:a14="http://schemas.microsoft.com/office/drawing/2010/main" val="0"/>
+              </a:ext>
+            </a:extLst>
+          </a:blip>
+          <a:srcRect/>
+          <a:stretch>
+            <a:fillRect/>
+          </a:stretch>
+        </p:blipFill>
+        <p:spPr bwMode="auto">
+          <a:xfrm>
+            <a:off x="914400" y="1351584"/>
+            <a:ext cx="5943600" cy="2547257"/>
+          </a:xfrm>
+          <a:prstGeom prst="rect">
+            <a:avLst/>
+          </a:prstGeom>
+          <a:noFill/>
+          <a:ln>
+            <a:noFill/>
+          </a:ln>
+          <a:extLst>
+            <a:ext uri="{909E8E84-426E-40DD-AFC4-6F175D3DCCD1}">
+              <a14:hiddenFill xmlns:a14="http://schemas.microsoft.com/office/drawing/2010/main">
+                <a:solidFill>
+                  <a:schemeClr val="accent1"/>
+                </a:solidFill>
+              </a14:hiddenFill>
+            </a:ext>
+            <a:ext uri="{91240B29-F687-4F45-9708-019B960494DF}">
+              <a14:hiddenLine xmlns:a14="http://schemas.microsoft.com/office/drawing/2010/main" w="9525">
+                <a:solidFill>
+                  <a:schemeClr val="tx1"/>
+                </a:solidFill>
+                <a:miter lim="800000"/>
+                <a:headEnd/>
+                <a:tailEnd/>
+              </a14:hiddenLine>
+            </a:ext>
+          </a:extLst>
+        </p:spPr>
+      </p:pic>
+      <p:pic>
+        <p:nvPicPr>
+          <p:cNvPr id="4100" name="Picture 4"/>
+          <p:cNvPicPr>
+            <a:picLocks noChangeAspect="1" noChangeArrowheads="1"/>
+          </p:cNvPicPr>
+          <p:nvPr/>
+        </p:nvPicPr>
+        <p:blipFill>
+          <a:blip r:embed="rId3">
+            <a:extLst>
+              <a:ext uri="{28A0092B-C50C-407E-A947-70E740481C1C}">
+                <a14:useLocalDpi xmlns:a14="http://schemas.microsoft.com/office/drawing/2010/main" val="0"/>
+              </a:ext>
+            </a:extLst>
+          </a:blip>
+          <a:srcRect/>
+          <a:stretch>
+            <a:fillRect/>
+          </a:stretch>
+        </p:blipFill>
+        <p:spPr bwMode="auto">
+          <a:xfrm>
+            <a:off x="2057400" y="4572000"/>
+            <a:ext cx="5886450" cy="1495425"/>
+          </a:xfrm>
+          <a:prstGeom prst="rect">
+            <a:avLst/>
+          </a:prstGeom>
+          <a:noFill/>
+          <a:ln>
+            <a:noFill/>
+          </a:ln>
+          <a:extLst>
+            <a:ext uri="{909E8E84-426E-40DD-AFC4-6F175D3DCCD1}">
+              <a14:hiddenFill xmlns:a14="http://schemas.microsoft.com/office/drawing/2010/main">
+                <a:solidFill>
+                  <a:schemeClr val="accent1"/>
+                </a:solidFill>
+              </a14:hiddenFill>
+            </a:ext>
+            <a:ext uri="{91240B29-F687-4F45-9708-019B960494DF}">
+              <a14:hiddenLine xmlns:a14="http://schemas.microsoft.com/office/drawing/2010/main" w="9525">
+                <a:solidFill>
+                  <a:schemeClr val="tx1"/>
+                </a:solidFill>
+                <a:miter lim="800000"/>
+                <a:headEnd/>
+                <a:tailEnd/>
+              </a14:hiddenLine>
+            </a:ext>
+          </a:extLst>
+        </p:spPr>
+      </p:pic>
+      <mc:AlternateContent xmlns:mc="http://schemas.openxmlformats.org/markup-compatibility/2006" xmlns:p14="http://schemas.microsoft.com/office/powerpoint/2010/main">
+        <mc:Choice Requires="p14">
+          <p:contentPart p14:bwMode="auto" r:id="rId4">
+            <p14:nvContentPartPr>
+              <p14:cNvPr id="7" name="Ink 6"/>
+              <p14:cNvContentPartPr/>
+              <p14:nvPr/>
+            </p14:nvContentPartPr>
+            <p14:xfrm rot="14982472">
+              <a:off x="4609435" y="5997540"/>
+              <a:ext cx="414720" cy="761040"/>
+            </p14:xfrm>
+          </p:contentPart>
+        </mc:Choice>
+        <mc:Fallback xmlns="">
+          <p:pic>
+            <p:nvPicPr>
+              <p:cNvPr id="7" name="Ink 6"/>
+              <p:cNvPicPr/>
+              <p:nvPr/>
+            </p:nvPicPr>
+            <p:blipFill>
+              <a:blip r:embed="rId5"/>
+              <a:stretch>
+                <a:fillRect/>
+              </a:stretch>
+            </p:blipFill>
+            <p:spPr>
+              <a:xfrm rot="14982472">
+                <a:off x="4584235" y="5981700"/>
+                <a:ext cx="470160" cy="807120"/>
+              </a:xfrm>
+              <a:prstGeom prst="rect">
+                <a:avLst/>
+              </a:prstGeom>
+            </p:spPr>
+          </p:pic>
+        </mc:Fallback>
+      </mc:AlternateContent>
+    </p:spTree>
+    <p:extLst>
+      <p:ext uri="{BB962C8B-B14F-4D97-AF65-F5344CB8AC3E}">
+        <p14:creationId xmlns:p14="http://schemas.microsoft.com/office/powerpoint/2010/main" val="2489789640"/>
+      </p:ext>
+    </p:extLst>
+  </p:cSld>
+  <p:clrMapOvr>
+    <a:masterClrMapping/>
+  </p:clrMapOvr>
+  <p:timing>
+    <p:tnLst>
+      <p:par>
+        <p:cTn id="1" dur="indefinite" restart="never" nodeType="tmRoot"/>
+      </p:par>
+    </p:tnLst>
+  </p:timing>
+</p:sld>
+</file>
+
+<file path=ppt/slides/slide20.xml><?xml version="1.0" encoding="utf-8"?>
+<p:sld xmlns:a="http://schemas.openxmlformats.org/drawingml/2006/main" xmlns:r="http://schemas.openxmlformats.org/officeDocument/2006/relationships" xmlns:p="http://schemas.openxmlformats.org/presentationml/2006/main">
+  <p:cSld>
+    <p:spTree>
+      <p:nvGrpSpPr>
+        <p:cNvPr id="1" name=""/>
+        <p:cNvGrpSpPr/>
+        <p:nvPr/>
+      </p:nvGrpSpPr>
+      <p:grpSpPr>
+        <a:xfrm>
+          <a:off x="0" y="0"/>
+          <a:ext cx="0" cy="0"/>
+          <a:chOff x="0" y="0"/>
+          <a:chExt cx="0" cy="0"/>
+        </a:xfrm>
+      </p:grpSpPr>
+      <p:sp>
+        <p:nvSpPr>
+          <p:cNvPr id="8" name="Rectangle 7"/>
+          <p:cNvSpPr/>
+          <p:nvPr/>
+        </p:nvSpPr>
+        <p:spPr>
+          <a:xfrm>
+            <a:off x="914400" y="1295400"/>
+            <a:ext cx="8001000" cy="4800600"/>
+          </a:xfrm>
+          <a:prstGeom prst="rect">
+            <a:avLst/>
+          </a:prstGeom>
+          <a:solidFill>
+            <a:schemeClr val="bg1"/>
+          </a:solidFill>
+          <a:effectLst>
+            <a:outerShdw blurRad="50800" dist="38100" dir="5400000" algn="t" rotWithShape="0">
+              <a:prstClr val="black">
+                <a:alpha val="40000"/>
+              </a:prstClr>
+            </a:outerShdw>
+          </a:effectLst>
+        </p:spPr>
+        <p:style>
+          <a:lnRef idx="2">
+            <a:schemeClr val="accent1">
+              <a:shade val="50000"/>
+            </a:schemeClr>
+          </a:lnRef>
+          <a:fillRef idx="1">
+            <a:schemeClr val="accent1"/>
+          </a:fillRef>
+          <a:effectRef idx="0">
+            <a:schemeClr val="accent1"/>
+          </a:effectRef>
+          <a:fontRef idx="minor">
+            <a:schemeClr val="lt1"/>
+          </a:fontRef>
+        </p:style>
+        <p:txBody>
+          <a:bodyPr rtlCol="0" anchor="ctr"/>
+          <a:lstStyle/>
+          <a:p>
+            <a:pPr algn="ctr"/>
+            <a:endParaRPr lang="en-SG"/>
+          </a:p>
+        </p:txBody>
+      </p:sp>
+      <p:sp>
+        <p:nvSpPr>
+          <p:cNvPr id="13" name="TextBox 12"/>
+          <p:cNvSpPr txBox="1"/>
+          <p:nvPr/>
+        </p:nvSpPr>
+        <p:spPr>
+          <a:xfrm>
+            <a:off x="571501" y="381000"/>
+            <a:ext cx="8001000" cy="800219"/>
+          </a:xfrm>
+          <a:prstGeom prst="rect">
+            <a:avLst/>
+          </a:prstGeom>
+          <a:noFill/>
+        </p:spPr>
+        <p:txBody>
+          <a:bodyPr wrap="square" rtlCol="0">
+            <a:spAutoFit/>
+          </a:bodyPr>
+          <a:lstStyle/>
+          <a:p>
+            <a:r>
+              <a:rPr lang="en-US" sz="2800" b="1" dirty="0" smtClean="0">
+                <a:solidFill>
+                  <a:schemeClr val="accent6">
+                    <a:lumMod val="75000"/>
+                  </a:schemeClr>
+                </a:solidFill>
+              </a:rPr>
+              <a:t>2.</a:t>
+            </a:r>
+            <a:r>
+              <a:rPr lang="en-US" dirty="0" smtClean="0">
+                <a:solidFill>
+                  <a:schemeClr val="accent6">
+                    <a:lumMod val="75000"/>
+                  </a:schemeClr>
+                </a:solidFill>
+              </a:rPr>
+              <a:t> You can apply other default PowerPoint effects such as soft-edges to enhance the resultin</a:t>
+            </a:r>
+            <a:r>
+              <a:rPr lang="en-US" dirty="0" smtClean="0">
+                <a:solidFill>
+                  <a:schemeClr val="accent6">
+                    <a:lumMod val="75000"/>
+                  </a:schemeClr>
+                </a:solidFill>
+              </a:rPr>
+              <a:t>g cropped image even further</a:t>
+            </a:r>
+            <a:r>
+              <a:rPr lang="en-US" dirty="0" smtClean="0">
+                <a:solidFill>
+                  <a:schemeClr val="accent6">
+                    <a:lumMod val="75000"/>
+                  </a:schemeClr>
+                </a:solidFill>
+              </a:rPr>
+              <a:t>.</a:t>
+            </a:r>
+            <a:endParaRPr lang="en-SG" dirty="0">
+              <a:solidFill>
+                <a:schemeClr val="accent6">
+                  <a:lumMod val="75000"/>
+                </a:schemeClr>
+              </a:solidFill>
+            </a:endParaRPr>
+          </a:p>
+        </p:txBody>
+      </p:sp>
+      <p:pic>
+        <p:nvPicPr>
+          <p:cNvPr id="5122" name="Picture 2"/>
+          <p:cNvPicPr>
+            <a:picLocks noChangeAspect="1" noChangeArrowheads="1"/>
+          </p:cNvPicPr>
+          <p:nvPr/>
+        </p:nvPicPr>
+        <p:blipFill>
+          <a:blip r:embed="rId3">
+            <a:extLst>
+              <a:ext uri="{28A0092B-C50C-407E-A947-70E740481C1C}">
+                <a14:useLocalDpi xmlns:a14="http://schemas.microsoft.com/office/drawing/2010/main" val="0"/>
+              </a:ext>
+            </a:extLst>
+          </a:blip>
+          <a:srcRect/>
+          <a:stretch>
+            <a:fillRect/>
+          </a:stretch>
+        </p:blipFill>
+        <p:spPr bwMode="auto">
+          <a:xfrm>
+            <a:off x="1143000" y="2015835"/>
+            <a:ext cx="7540626" cy="2706688"/>
+          </a:xfrm>
+          <a:prstGeom prst="rect">
+            <a:avLst/>
+          </a:prstGeom>
+          <a:ln>
+            <a:noFill/>
+          </a:ln>
+          <a:effectLst>
+            <a:outerShdw blurRad="190500" algn="tl" rotWithShape="0">
+              <a:srgbClr val="000000">
+                <a:alpha val="70000"/>
+              </a:srgbClr>
+            </a:outerShdw>
+          </a:effectLst>
+          <a:extLst>
+            <a:ext uri="{909E8E84-426E-40DD-AFC4-6F175D3DCCD1}">
+              <a14:hiddenFill xmlns:a14="http://schemas.microsoft.com/office/drawing/2010/main">
+                <a:solidFill>
+                  <a:schemeClr val="accent1"/>
+                </a:solidFill>
+              </a14:hiddenFill>
+            </a:ext>
+            <a:ext uri="{91240B29-F687-4F45-9708-019B960494DF}">
+              <a14:hiddenLine xmlns:a14="http://schemas.microsoft.com/office/drawing/2010/main" w="9525">
+                <a:solidFill>
+                  <a:schemeClr val="tx1"/>
+                </a:solidFill>
+                <a:miter lim="800000"/>
+                <a:headEnd/>
+                <a:tailEnd/>
+              </a14:hiddenLine>
+            </a:ext>
+            <a:ext uri="{AF507438-7753-43E0-B8FC-AC1667EBCBE1}">
+              <a14:hiddenEffects xmlns:a14="http://schemas.microsoft.com/office/drawing/2010/main">
+                <a:effectLst>
+                  <a:outerShdw dist="35921" dir="2700000" algn="ctr" rotWithShape="0">
+                    <a:schemeClr val="bg2"/>
+                  </a:outerShdw>
+                </a:effectLst>
+              </a14:hiddenEffects>
+            </a:ext>
+          </a:extLst>
+        </p:spPr>
+      </p:pic>
+      <p:sp>
+        <p:nvSpPr>
+          <p:cNvPr id="9" name="TextBox 8"/>
+          <p:cNvSpPr txBox="1"/>
+          <p:nvPr/>
+        </p:nvSpPr>
+        <p:spPr>
+          <a:xfrm>
+            <a:off x="1066800" y="2133600"/>
+            <a:ext cx="2895600" cy="461665"/>
+          </a:xfrm>
+          <a:prstGeom prst="rect">
+            <a:avLst/>
+          </a:prstGeom>
+          <a:noFill/>
+        </p:spPr>
+        <p:txBody>
+          <a:bodyPr wrap="square" rtlCol="0">
+            <a:spAutoFit/>
+          </a:bodyPr>
+          <a:lstStyle/>
+          <a:p>
+            <a:r>
+              <a:rPr lang="en-US" sz="2400" b="1" dirty="0" smtClean="0">
+                <a:solidFill>
+                  <a:schemeClr val="tx2">
+                    <a:lumMod val="40000"/>
+                    <a:lumOff val="60000"/>
+                  </a:schemeClr>
+                </a:solidFill>
+              </a:rPr>
+              <a:t>Your child today is …</a:t>
+            </a:r>
+            <a:endParaRPr lang="en-SG" sz="2400" b="1" dirty="0">
+              <a:solidFill>
+                <a:schemeClr val="tx2">
+                  <a:lumMod val="40000"/>
+                  <a:lumOff val="60000"/>
+                </a:schemeClr>
+              </a:solidFill>
+            </a:endParaRPr>
+          </a:p>
+        </p:txBody>
+      </p:sp>
+      <p:sp>
+        <p:nvSpPr>
+          <p:cNvPr id="31" name="TextBox 30"/>
+          <p:cNvSpPr txBox="1"/>
+          <p:nvPr/>
+        </p:nvSpPr>
+        <p:spPr>
+          <a:xfrm>
+            <a:off x="3962400" y="4419600"/>
+            <a:ext cx="4610101" cy="461665"/>
+          </a:xfrm>
+          <a:prstGeom prst="rect">
+            <a:avLst/>
+          </a:prstGeom>
+          <a:noFill/>
+        </p:spPr>
+        <p:txBody>
+          <a:bodyPr wrap="square" rtlCol="0">
+            <a:spAutoFit/>
+          </a:bodyPr>
+          <a:lstStyle/>
+          <a:p>
+            <a:r>
+              <a:rPr lang="en-US" sz="2400" b="1" dirty="0" smtClean="0">
+                <a:solidFill>
+                  <a:schemeClr val="tx2">
+                    <a:lumMod val="40000"/>
+                    <a:lumOff val="60000"/>
+                  </a:schemeClr>
+                </a:solidFill>
+              </a:rPr>
+              <a:t>… the young adult of tomorrow.</a:t>
+            </a:r>
+            <a:endParaRPr lang="en-SG" sz="2400" b="1" dirty="0">
+              <a:solidFill>
+                <a:schemeClr val="tx2">
+                  <a:lumMod val="40000"/>
+                  <a:lumOff val="60000"/>
+                </a:schemeClr>
+              </a:solidFill>
+            </a:endParaRPr>
+          </a:p>
+        </p:txBody>
+      </p:sp>
+    </p:spTree>
+    <p:extLst>
+      <p:ext uri="{BB962C8B-B14F-4D97-AF65-F5344CB8AC3E}">
+        <p14:creationId xmlns:p14="http://schemas.microsoft.com/office/powerpoint/2010/main" val="2194308093"/>
+      </p:ext>
+    </p:extLst>
+  </p:cSld>
+  <p:clrMapOvr>
+    <a:masterClrMapping/>
+  </p:clrMapOvr>
+  <p:timing>
+    <p:tnLst>
+      <p:par>
+        <p:cTn id="1" dur="indefinite" restart="never" nodeType="tmRoot"/>
+      </p:par>
+    </p:tnLst>
+  </p:timing>
+</p:sld>
+</file>
+
+<file path=ppt/slides/slide21.xml><?xml version="1.0" encoding="utf-8"?>
 <p:sld xmlns:a="http://schemas.openxmlformats.org/drawingml/2006/main" xmlns:r="http://schemas.openxmlformats.org/officeDocument/2006/relationships" xmlns:p="http://schemas.openxmlformats.org/presentationml/2006/main">
   <p:cSld>
     <p:spTree>
@@ -10196,7 +13113,7 @@
 </p:sld>
 </file>
 
-<file path=ppt/slides/slide18.xml><?xml version="1.0" encoding="utf-8"?>
+<file path=ppt/slides/slide22.xml><?xml version="1.0" encoding="utf-8"?>
 <p:sld xmlns:a="http://schemas.openxmlformats.org/drawingml/2006/main" xmlns:r="http://schemas.openxmlformats.org/officeDocument/2006/relationships" xmlns:p="http://schemas.openxmlformats.org/presentationml/2006/main">
   <p:cSld>
     <p:spTree>
@@ -10590,7 +13507,7 @@
     </p:spTree>
     <p:extLst>
       <p:ext uri="{BB962C8B-B14F-4D97-AF65-F5344CB8AC3E}">
-        <p14:creationId xmlns:p14="http://schemas.microsoft.com/office/powerpoint/2010/main" val="1274961499"/>
+        <p14:creationId xmlns:p14="http://schemas.microsoft.com/office/powerpoint/2010/main" val="1132170986"/>
       </p:ext>
     </p:extLst>
   </p:cSld>
@@ -10607,7 +13524,7 @@
 </p:sld>
 </file>
 
-<file path=ppt/slides/slide19.xml><?xml version="1.0" encoding="utf-8"?>
+<file path=ppt/slides/slide23.xml><?xml version="1.0" encoding="utf-8"?>
 <p:sld xmlns:a="http://schemas.openxmlformats.org/drawingml/2006/main" xmlns:r="http://schemas.openxmlformats.org/officeDocument/2006/relationships" xmlns:p="http://schemas.openxmlformats.org/presentationml/2006/main">
   <p:cSld>
     <p:spTree>
@@ -10901,233 +13818,7 @@
 </p:sld>
 </file>
 
-<file path=ppt/slides/slide2.xml><?xml version="1.0" encoding="utf-8"?>
-<p:sld xmlns:a="http://schemas.openxmlformats.org/drawingml/2006/main" xmlns:r="http://schemas.openxmlformats.org/officeDocument/2006/relationships" xmlns:p="http://schemas.openxmlformats.org/presentationml/2006/main">
-  <p:cSld>
-    <p:spTree>
-      <p:nvGrpSpPr>
-        <p:cNvPr id="1" name=""/>
-        <p:cNvGrpSpPr/>
-        <p:nvPr/>
-      </p:nvGrpSpPr>
-      <p:grpSpPr>
-        <a:xfrm>
-          <a:off x="0" y="0"/>
-          <a:ext cx="0" cy="0"/>
-          <a:chOff x="0" y="0"/>
-          <a:chExt cx="0" cy="0"/>
-        </a:xfrm>
-      </p:grpSpPr>
-      <p:sp>
-        <p:nvSpPr>
-          <p:cNvPr id="4" name="TextBox 3"/>
-          <p:cNvSpPr txBox="1"/>
-          <p:nvPr/>
-        </p:nvSpPr>
-        <p:spPr>
-          <a:xfrm>
-            <a:off x="533400" y="479318"/>
-            <a:ext cx="8001000" cy="369332"/>
-          </a:xfrm>
-          <a:prstGeom prst="rect">
-            <a:avLst/>
-          </a:prstGeom>
-          <a:noFill/>
-        </p:spPr>
-        <p:txBody>
-          <a:bodyPr wrap="square" rtlCol="0">
-            <a:spAutoFit/>
-          </a:bodyPr>
-          <a:lstStyle/>
-          <a:p>
-            <a:r>
-              <a:rPr lang="en-US" dirty="0" smtClean="0">
-                <a:solidFill>
-                  <a:schemeClr val="accent6">
-                    <a:lumMod val="75000"/>
-                  </a:schemeClr>
-                </a:solidFill>
-              </a:rPr>
-              <a:t>Please go through this tutorial in the ‘edit’ mode, not ‘slideshow’ mode. </a:t>
-            </a:r>
-            <a:endParaRPr lang="en-SG" dirty="0">
-              <a:solidFill>
-                <a:schemeClr val="accent6">
-                  <a:lumMod val="75000"/>
-                </a:schemeClr>
-              </a:solidFill>
-            </a:endParaRPr>
-          </a:p>
-        </p:txBody>
-      </p:sp>
-      <p:pic>
-        <p:nvPicPr>
-          <p:cNvPr id="4099" name="Picture 3"/>
-          <p:cNvPicPr>
-            <a:picLocks noChangeAspect="1" noChangeArrowheads="1"/>
-          </p:cNvPicPr>
-          <p:nvPr/>
-        </p:nvPicPr>
-        <p:blipFill>
-          <a:blip r:embed="rId2">
-            <a:extLst>
-              <a:ext uri="{28A0092B-C50C-407E-A947-70E740481C1C}">
-                <a14:useLocalDpi xmlns:a14="http://schemas.microsoft.com/office/drawing/2010/main" val="0"/>
-              </a:ext>
-            </a:extLst>
-          </a:blip>
-          <a:srcRect/>
-          <a:stretch>
-            <a:fillRect/>
-          </a:stretch>
-        </p:blipFill>
-        <p:spPr bwMode="auto">
-          <a:xfrm>
-            <a:off x="914400" y="1351584"/>
-            <a:ext cx="5943600" cy="2547257"/>
-          </a:xfrm>
-          <a:prstGeom prst="rect">
-            <a:avLst/>
-          </a:prstGeom>
-          <a:noFill/>
-          <a:ln>
-            <a:noFill/>
-          </a:ln>
-          <a:extLst>
-            <a:ext uri="{909E8E84-426E-40DD-AFC4-6F175D3DCCD1}">
-              <a14:hiddenFill xmlns:a14="http://schemas.microsoft.com/office/drawing/2010/main">
-                <a:solidFill>
-                  <a:schemeClr val="accent1"/>
-                </a:solidFill>
-              </a14:hiddenFill>
-            </a:ext>
-            <a:ext uri="{91240B29-F687-4F45-9708-019B960494DF}">
-              <a14:hiddenLine xmlns:a14="http://schemas.microsoft.com/office/drawing/2010/main" w="9525">
-                <a:solidFill>
-                  <a:schemeClr val="tx1"/>
-                </a:solidFill>
-                <a:miter lim="800000"/>
-                <a:headEnd/>
-                <a:tailEnd/>
-              </a14:hiddenLine>
-            </a:ext>
-          </a:extLst>
-        </p:spPr>
-      </p:pic>
-      <p:pic>
-        <p:nvPicPr>
-          <p:cNvPr id="4100" name="Picture 4"/>
-          <p:cNvPicPr>
-            <a:picLocks noChangeAspect="1" noChangeArrowheads="1"/>
-          </p:cNvPicPr>
-          <p:nvPr/>
-        </p:nvPicPr>
-        <p:blipFill>
-          <a:blip r:embed="rId3">
-            <a:extLst>
-              <a:ext uri="{28A0092B-C50C-407E-A947-70E740481C1C}">
-                <a14:useLocalDpi xmlns:a14="http://schemas.microsoft.com/office/drawing/2010/main" val="0"/>
-              </a:ext>
-            </a:extLst>
-          </a:blip>
-          <a:srcRect/>
-          <a:stretch>
-            <a:fillRect/>
-          </a:stretch>
-        </p:blipFill>
-        <p:spPr bwMode="auto">
-          <a:xfrm>
-            <a:off x="2057400" y="4572000"/>
-            <a:ext cx="5886450" cy="1495425"/>
-          </a:xfrm>
-          <a:prstGeom prst="rect">
-            <a:avLst/>
-          </a:prstGeom>
-          <a:noFill/>
-          <a:ln>
-            <a:noFill/>
-          </a:ln>
-          <a:extLst>
-            <a:ext uri="{909E8E84-426E-40DD-AFC4-6F175D3DCCD1}">
-              <a14:hiddenFill xmlns:a14="http://schemas.microsoft.com/office/drawing/2010/main">
-                <a:solidFill>
-                  <a:schemeClr val="accent1"/>
-                </a:solidFill>
-              </a14:hiddenFill>
-            </a:ext>
-            <a:ext uri="{91240B29-F687-4F45-9708-019B960494DF}">
-              <a14:hiddenLine xmlns:a14="http://schemas.microsoft.com/office/drawing/2010/main" w="9525">
-                <a:solidFill>
-                  <a:schemeClr val="tx1"/>
-                </a:solidFill>
-                <a:miter lim="800000"/>
-                <a:headEnd/>
-                <a:tailEnd/>
-              </a14:hiddenLine>
-            </a:ext>
-          </a:extLst>
-        </p:spPr>
-      </p:pic>
-      <mc:AlternateContent xmlns:mc="http://schemas.openxmlformats.org/markup-compatibility/2006" xmlns:p14="http://schemas.microsoft.com/office/powerpoint/2010/main">
-        <mc:Choice Requires="p14">
-          <p:contentPart p14:bwMode="auto" r:id="rId4">
-            <p14:nvContentPartPr>
-              <p14:cNvPr id="7" name="Ink 6"/>
-              <p14:cNvContentPartPr/>
-              <p14:nvPr/>
-            </p14:nvContentPartPr>
-            <p14:xfrm rot="14982472">
-              <a:off x="4609435" y="5997540"/>
-              <a:ext cx="414720" cy="761040"/>
-            </p14:xfrm>
-          </p:contentPart>
-        </mc:Choice>
-        <mc:Fallback xmlns="">
-          <p:pic>
-            <p:nvPicPr>
-              <p:cNvPr id="7" name="Ink 6"/>
-              <p:cNvPicPr/>
-              <p:nvPr/>
-            </p:nvPicPr>
-            <p:blipFill>
-              <a:blip r:embed="rId5"/>
-              <a:stretch>
-                <a:fillRect/>
-              </a:stretch>
-            </p:blipFill>
-            <p:spPr>
-              <a:xfrm rot="14982472">
-                <a:off x="4584235" y="5981700"/>
-                <a:ext cx="470160" cy="807120"/>
-              </a:xfrm>
-              <a:prstGeom prst="rect">
-                <a:avLst/>
-              </a:prstGeom>
-            </p:spPr>
-          </p:pic>
-        </mc:Fallback>
-      </mc:AlternateContent>
-    </p:spTree>
-    <p:extLst>
-      <p:ext uri="{BB962C8B-B14F-4D97-AF65-F5344CB8AC3E}">
-        <p14:creationId xmlns:p14="http://schemas.microsoft.com/office/powerpoint/2010/main" val="2489789640"/>
-      </p:ext>
-    </p:extLst>
-  </p:cSld>
-  <p:clrMapOvr>
-    <a:masterClrMapping/>
-  </p:clrMapOvr>
-  <p:timing>
-    <p:tnLst>
-      <p:par>
-        <p:cTn id="1" dur="indefinite" restart="never" nodeType="tmRoot"/>
-      </p:par>
-    </p:tnLst>
-  </p:timing>
-</p:sld>
-</file>
-
-<file path=ppt/slides/slide20.xml><?xml version="1.0" encoding="utf-8"?>
+<file path=ppt/slides/slide24.xml><?xml version="1.0" encoding="utf-8"?>
 <p:sld xmlns:a="http://schemas.openxmlformats.org/drawingml/2006/main" xmlns:r="http://schemas.openxmlformats.org/officeDocument/2006/relationships" xmlns:p="http://schemas.openxmlformats.org/presentationml/2006/main" show="0">
   <p:cSld name="PPAck201401021130490549">
     <p:spTree>
@@ -14612,11 +17303,11 @@
   <p:clrMapOvr>
     <a:masterClrMapping/>
   </p:clrMapOvr>
-  <mc:AlternateContent xmlns:mc="http://schemas.openxmlformats.org/markup-compatibility/2006">
-    <mc:Choice xmlns:p14="http://schemas.microsoft.com/office/powerpoint/2010/main" Requires="p14">
+  <mc:AlternateContent xmlns:mc="http://schemas.openxmlformats.org/markup-compatibility/2006" xmlns:p14="http://schemas.microsoft.com/office/powerpoint/2010/main">
+    <mc:Choice Requires="p14">
       <p:transition p14:dur="0"/>
     </mc:Choice>
-    <mc:Fallback>
+    <mc:Fallback xmlns="">
       <p:transition/>
     </mc:Fallback>
   </mc:AlternateContent>

</xml_diff>

<commit_message>
Issue 271: Update tutorial file for V1.6 Update Issue 271
</commit_message>
<xml_diff>
--- a/doc/PowerPointLabs Quick Tutorial.pptx
+++ b/doc/PowerPointLabs Quick Tutorial.pptx
@@ -188,7 +188,7 @@
       </p14:sectionLst>
     </p:ext>
     <p:ext uri="{EFAFB233-063F-42B5-8137-9DF3F51BA10A}">
-      <p15:sldGuideLst xmlns="" xmlns:p15="http://schemas.microsoft.com/office/powerpoint/2012/main">
+      <p15:sldGuideLst xmlns:p15="http://schemas.microsoft.com/office/powerpoint/2012/main" xmlns="">
         <p15:guide id="1" orient="horz" pos="2160">
           <p15:clr>
             <a:srgbClr val="A4A3A4"/>
@@ -412,7 +412,7 @@
           <a:p>
             <a:fld id="{3E86CC0F-BBF3-4E07-94E0-0549B7D560A9}" type="datetimeFigureOut">
               <a:rPr lang="en-SG" smtClean="0"/>
-              <a:t>24/2/2014</a:t>
+              <a:t>23/3/2014</a:t>
             </a:fld>
             <a:endParaRPr lang="en-SG"/>
           </a:p>
@@ -1278,7 +1278,7 @@
             <a:fld id="{1D8BD707-D9CF-40AE-B4C6-C98DA3205C09}" type="datetimeFigureOut">
               <a:rPr lang="en-US" smtClean="0"/>
               <a:pPr/>
-              <a:t>2/24/2014</a:t>
+              <a:t>3/23/2014</a:t>
             </a:fld>
             <a:endParaRPr lang="en-US"/>
           </a:p>
@@ -1445,7 +1445,7 @@
             <a:fld id="{1D8BD707-D9CF-40AE-B4C6-C98DA3205C09}" type="datetimeFigureOut">
               <a:rPr lang="en-US" smtClean="0"/>
               <a:pPr/>
-              <a:t>2/24/2014</a:t>
+              <a:t>3/23/2014</a:t>
             </a:fld>
             <a:endParaRPr lang="en-US"/>
           </a:p>
@@ -1622,7 +1622,7 @@
             <a:fld id="{1D8BD707-D9CF-40AE-B4C6-C98DA3205C09}" type="datetimeFigureOut">
               <a:rPr lang="en-US" smtClean="0"/>
               <a:pPr/>
-              <a:t>2/24/2014</a:t>
+              <a:t>3/23/2014</a:t>
             </a:fld>
             <a:endParaRPr lang="en-US"/>
           </a:p>
@@ -1789,7 +1789,7 @@
             <a:fld id="{1D8BD707-D9CF-40AE-B4C6-C98DA3205C09}" type="datetimeFigureOut">
               <a:rPr lang="en-US" smtClean="0"/>
               <a:pPr/>
-              <a:t>2/24/2014</a:t>
+              <a:t>3/23/2014</a:t>
             </a:fld>
             <a:endParaRPr lang="en-US"/>
           </a:p>
@@ -2032,7 +2032,7 @@
             <a:fld id="{1D8BD707-D9CF-40AE-B4C6-C98DA3205C09}" type="datetimeFigureOut">
               <a:rPr lang="en-US" smtClean="0"/>
               <a:pPr/>
-              <a:t>2/24/2014</a:t>
+              <a:t>3/23/2014</a:t>
             </a:fld>
             <a:endParaRPr lang="en-US"/>
           </a:p>
@@ -2317,7 +2317,7 @@
             <a:fld id="{1D8BD707-D9CF-40AE-B4C6-C98DA3205C09}" type="datetimeFigureOut">
               <a:rPr lang="en-US" smtClean="0"/>
               <a:pPr/>
-              <a:t>2/24/2014</a:t>
+              <a:t>3/23/2014</a:t>
             </a:fld>
             <a:endParaRPr lang="en-US"/>
           </a:p>
@@ -2736,7 +2736,7 @@
             <a:fld id="{1D8BD707-D9CF-40AE-B4C6-C98DA3205C09}" type="datetimeFigureOut">
               <a:rPr lang="en-US" smtClean="0"/>
               <a:pPr/>
-              <a:t>2/24/2014</a:t>
+              <a:t>3/23/2014</a:t>
             </a:fld>
             <a:endParaRPr lang="en-US"/>
           </a:p>
@@ -2851,7 +2851,7 @@
             <a:fld id="{1D8BD707-D9CF-40AE-B4C6-C98DA3205C09}" type="datetimeFigureOut">
               <a:rPr lang="en-US" smtClean="0"/>
               <a:pPr/>
-              <a:t>2/24/2014</a:t>
+              <a:t>3/23/2014</a:t>
             </a:fld>
             <a:endParaRPr lang="en-US"/>
           </a:p>
@@ -2943,7 +2943,7 @@
             <a:fld id="{1D8BD707-D9CF-40AE-B4C6-C98DA3205C09}" type="datetimeFigureOut">
               <a:rPr lang="en-US" smtClean="0"/>
               <a:pPr/>
-              <a:t>2/24/2014</a:t>
+              <a:t>3/23/2014</a:t>
             </a:fld>
             <a:endParaRPr lang="en-US"/>
           </a:p>
@@ -3217,7 +3217,7 @@
             <a:fld id="{1D8BD707-D9CF-40AE-B4C6-C98DA3205C09}" type="datetimeFigureOut">
               <a:rPr lang="en-US" smtClean="0"/>
               <a:pPr/>
-              <a:t>2/24/2014</a:t>
+              <a:t>3/23/2014</a:t>
             </a:fld>
             <a:endParaRPr lang="en-US"/>
           </a:p>
@@ -3467,7 +3467,7 @@
             <a:fld id="{1D8BD707-D9CF-40AE-B4C6-C98DA3205C09}" type="datetimeFigureOut">
               <a:rPr lang="en-US" smtClean="0"/>
               <a:pPr/>
-              <a:t>2/24/2014</a:t>
+              <a:t>3/23/2014</a:t>
             </a:fld>
             <a:endParaRPr lang="en-US"/>
           </a:p>
@@ -3677,7 +3677,7 @@
             <a:fld id="{1D8BD707-D9CF-40AE-B4C6-C98DA3205C09}" type="datetimeFigureOut">
               <a:rPr lang="en-US" smtClean="0"/>
               <a:pPr/>
-              <a:t>2/24/2014</a:t>
+              <a:t>3/23/2014</a:t>
             </a:fld>
             <a:endParaRPr lang="en-US"/>
           </a:p>
@@ -6894,17 +6894,7 @@
                   </a:schemeClr>
                 </a:solidFill>
               </a:rPr>
-              <a:t>features </a:t>
-            </a:r>
-            <a:r>
-              <a:rPr lang="en-US" dirty="0" smtClean="0">
-                <a:solidFill>
-                  <a:schemeClr val="accent6">
-                    <a:lumMod val="75000"/>
-                  </a:schemeClr>
-                </a:solidFill>
-              </a:rPr>
-              <a:t>are next.</a:t>
+              <a:t>features are next.</a:t>
             </a:r>
             <a:endParaRPr lang="en-SG" dirty="0">
               <a:solidFill>
@@ -7308,7 +7298,7 @@
         <p:spPr>
           <a:xfrm>
             <a:off x="533400" y="479318"/>
-            <a:ext cx="8001000" cy="523220"/>
+            <a:ext cx="8382000" cy="800219"/>
           </a:xfrm>
           <a:prstGeom prst="rect">
             <a:avLst/>
@@ -7339,7 +7329,7 @@
                   </a:schemeClr>
                 </a:solidFill>
               </a:rPr>
-              <a:t> Select the blue rectangle and click  the                </a:t>
+              <a:t> Select the blue rectangle </a:t>
             </a:r>
             <a:r>
               <a:rPr lang="en-US" dirty="0" smtClean="0">
@@ -7349,17 +7339,17 @@
                   </a:schemeClr>
                 </a:solidFill>
               </a:rPr>
-              <a:t> </a:t>
-            </a:r>
-            <a:r>
-              <a:rPr lang="en-US" i="1" dirty="0" smtClean="0">
+              <a:t>s in any order (</a:t>
+            </a:r>
+            <a:r>
+              <a:rPr lang="en-US" dirty="0" err="1" smtClean="0">
                 <a:solidFill>
                   <a:schemeClr val="accent6">
                     <a:lumMod val="75000"/>
                   </a:schemeClr>
                 </a:solidFill>
               </a:rPr>
-              <a:t>zoom to area</a:t>
+              <a:t>Ctrl+click</a:t>
             </a:r>
             <a:r>
               <a:rPr lang="en-US" dirty="0" smtClean="0">
@@ -7369,7 +7359,7 @@
                   </a:schemeClr>
                 </a:solidFill>
               </a:rPr>
-              <a:t> button</a:t>
+              <a:t>) a</a:t>
             </a:r>
             <a:r>
               <a:rPr lang="en-US" dirty="0" smtClean="0">
@@ -7379,7 +7369,47 @@
                   </a:schemeClr>
                 </a:solidFill>
               </a:rPr>
-              <a:t>.</a:t>
+              <a:t>nd </a:t>
+            </a:r>
+            <a:r>
+              <a:rPr lang="en-US" dirty="0" smtClean="0">
+                <a:solidFill>
+                  <a:schemeClr val="accent6">
+                    <a:lumMod val="75000"/>
+                  </a:schemeClr>
+                </a:solidFill>
+              </a:rPr>
+              <a:t>click  </a:t>
+            </a:r>
+            <a:r>
+              <a:rPr lang="en-US" dirty="0" smtClean="0">
+                <a:solidFill>
+                  <a:schemeClr val="accent6">
+                    <a:lumMod val="75000"/>
+                  </a:schemeClr>
+                </a:solidFill>
+              </a:rPr>
+              <a:t>the                   </a:t>
+            </a:r>
+            <a:r>
+              <a:rPr lang="en-US" i="1" dirty="0" smtClean="0">
+                <a:solidFill>
+                  <a:schemeClr val="accent6">
+                    <a:lumMod val="75000"/>
+                  </a:schemeClr>
+                </a:solidFill>
+              </a:rPr>
+              <a:t>zoom to area</a:t>
+            </a:r>
+            <a:r>
+              <a:rPr lang="en-US" dirty="0" smtClean="0">
+                <a:solidFill>
+                  <a:schemeClr val="accent6">
+                    <a:lumMod val="75000"/>
+                  </a:schemeClr>
+                </a:solidFill>
+              </a:rPr>
+              <a:t> button.</a:t>
             </a:r>
             <a:endParaRPr lang="en-SG" dirty="0">
               <a:solidFill>
@@ -7400,7 +7430,7 @@
         <p:spPr>
           <a:xfrm>
             <a:off x="495300" y="5323582"/>
-            <a:ext cx="8001000" cy="1077218"/>
+            <a:ext cx="8001000" cy="1354217"/>
           </a:xfrm>
           <a:prstGeom prst="rect">
             <a:avLst/>
@@ -7431,47 +7461,47 @@
                   </a:schemeClr>
                 </a:solidFill>
               </a:rPr>
-              <a:t> ‘Play’ the slide show (      ) to see </a:t>
-            </a:r>
-            <a:r>
-              <a:rPr lang="en-US" i="1" dirty="0" smtClean="0">
+              <a:t> ‘Play’ the slide show (      ) to </a:t>
+            </a:r>
+            <a:r>
+              <a:rPr lang="en-US" dirty="0" smtClean="0">
                 <a:solidFill>
                   <a:schemeClr val="accent6">
                     <a:lumMod val="75000"/>
                   </a:schemeClr>
                 </a:solidFill>
               </a:rPr>
-              <a:t>zoom </a:t>
-            </a:r>
-            <a:r>
-              <a:rPr lang="en-US" i="1" dirty="0" smtClean="0">
+              <a:t>see the zooming and panning effects </a:t>
+            </a:r>
+            <a:r>
+              <a:rPr lang="en-US" dirty="0" smtClean="0">
                 <a:solidFill>
                   <a:schemeClr val="accent6">
                     <a:lumMod val="75000"/>
                   </a:schemeClr>
                 </a:solidFill>
               </a:rPr>
-              <a:t>to area </a:t>
-            </a:r>
-            <a:r>
-              <a:rPr lang="en-US" dirty="0" smtClean="0">
+              <a:t>generated by </a:t>
+            </a:r>
+            <a:r>
+              <a:rPr lang="en-US" dirty="0" err="1" smtClean="0">
                 <a:solidFill>
                   <a:schemeClr val="accent6">
                     <a:lumMod val="75000"/>
                   </a:schemeClr>
                 </a:solidFill>
               </a:rPr>
-              <a:t>effect generated by </a:t>
-            </a:r>
-            <a:r>
-              <a:rPr lang="en-US" dirty="0" err="1" smtClean="0">
+              <a:t>PowerPointLabs</a:t>
+            </a:r>
+            <a:r>
+              <a:rPr lang="en-US" dirty="0" smtClean="0">
                 <a:solidFill>
                   <a:schemeClr val="accent6">
                     <a:lumMod val="75000"/>
                   </a:schemeClr>
                 </a:solidFill>
               </a:rPr>
-              <a:t>PowerPointLabs</a:t>
+              <a:t>. </a:t>
             </a:r>
             <a:r>
               <a:rPr lang="en-US" dirty="0" smtClean="0">
@@ -7481,17 +7511,17 @@
                   </a:schemeClr>
                 </a:solidFill>
               </a:rPr>
-              <a:t>. </a:t>
-            </a:r>
-            <a:r>
-              <a:rPr lang="en-US" dirty="0" smtClean="0">
+              <a:t>If you would like each zoom/pan effect to be put in a separate slide, click the expand (      )  icon below the </a:t>
+            </a:r>
+            <a:r>
+              <a:rPr lang="en-US" i="1" dirty="0" smtClean="0">
                 <a:solidFill>
                   <a:schemeClr val="accent6">
                     <a:lumMod val="75000"/>
                   </a:schemeClr>
                 </a:solidFill>
               </a:rPr>
-              <a:t>It generates one slide to zoom in to the area marked by the rectangle as well as another slide to reverse the zooming</a:t>
+              <a:t>Zoom to Area </a:t>
             </a:r>
             <a:r>
               <a:rPr lang="en-US" dirty="0" smtClean="0">
@@ -7501,7 +7531,17 @@
                   </a:schemeClr>
                 </a:solidFill>
               </a:rPr>
-              <a:t>.</a:t>
+              <a:t>button </a:t>
+            </a:r>
+            <a:r>
+              <a:rPr lang="en-US" dirty="0" smtClean="0">
+                <a:solidFill>
+                  <a:schemeClr val="accent6">
+                    <a:lumMod val="75000"/>
+                  </a:schemeClr>
+                </a:solidFill>
+              </a:rPr>
+              <a:t>to access settings and select  ‘Put all zoom effects on separate slides’ option.</a:t>
             </a:r>
             <a:endParaRPr lang="en-SG" dirty="0">
               <a:solidFill>
@@ -7670,7 +7710,7 @@
         </p:nvGrpSpPr>
         <p:grpSpPr>
           <a:xfrm>
-            <a:off x="4552950" y="479318"/>
+            <a:off x="7010400" y="492370"/>
             <a:ext cx="838200" cy="838200"/>
             <a:chOff x="5247850" y="1096809"/>
             <a:chExt cx="838200" cy="838200"/>
@@ -8008,6 +8048,162 @@
           </p:txBody>
         </p:sp>
       </p:grpSp>
+      <p:sp>
+        <p:nvSpPr>
+          <p:cNvPr id="15" name="Rectangle 14"/>
+          <p:cNvSpPr/>
+          <p:nvPr/>
+        </p:nvSpPr>
+        <p:spPr>
+          <a:xfrm>
+            <a:off x="5347756" y="2104677"/>
+            <a:ext cx="1787357" cy="1340517"/>
+          </a:xfrm>
+          <a:prstGeom prst="rect">
+            <a:avLst/>
+          </a:prstGeom>
+          <a:noFill/>
+          <a:ln w="57150">
+            <a:solidFill>
+              <a:srgbClr val="0070C0"/>
+            </a:solidFill>
+          </a:ln>
+        </p:spPr>
+        <p:style>
+          <a:lnRef idx="2">
+            <a:schemeClr val="accent1">
+              <a:shade val="50000"/>
+            </a:schemeClr>
+          </a:lnRef>
+          <a:fillRef idx="1">
+            <a:schemeClr val="accent1"/>
+          </a:fillRef>
+          <a:effectRef idx="0">
+            <a:schemeClr val="accent1"/>
+          </a:effectRef>
+          <a:fontRef idx="minor">
+            <a:schemeClr val="lt1"/>
+          </a:fontRef>
+        </p:style>
+        <p:txBody>
+          <a:bodyPr lIns="228600" tIns="114300" rIns="228600" bIns="114300" rtlCol="0" anchor="ctr"/>
+          <a:lstStyle/>
+          <a:p>
+            <a:pPr algn="ctr"/>
+            <a:endParaRPr lang="en-US"/>
+          </a:p>
+        </p:txBody>
+      </p:sp>
+      <p:sp>
+        <p:nvSpPr>
+          <p:cNvPr id="16" name="Rectangle 15"/>
+          <p:cNvSpPr/>
+          <p:nvPr/>
+        </p:nvSpPr>
+        <p:spPr>
+          <a:xfrm>
+            <a:off x="4267200" y="3695323"/>
+            <a:ext cx="2123799" cy="1592848"/>
+          </a:xfrm>
+          <a:prstGeom prst="rect">
+            <a:avLst/>
+          </a:prstGeom>
+          <a:noFill/>
+          <a:ln w="57150">
+            <a:solidFill>
+              <a:srgbClr val="0070C0"/>
+            </a:solidFill>
+          </a:ln>
+        </p:spPr>
+        <p:style>
+          <a:lnRef idx="2">
+            <a:schemeClr val="accent1">
+              <a:shade val="50000"/>
+            </a:schemeClr>
+          </a:lnRef>
+          <a:fillRef idx="1">
+            <a:schemeClr val="accent1"/>
+          </a:fillRef>
+          <a:effectRef idx="0">
+            <a:schemeClr val="accent1"/>
+          </a:effectRef>
+          <a:fontRef idx="minor">
+            <a:schemeClr val="lt1"/>
+          </a:fontRef>
+        </p:style>
+        <p:txBody>
+          <a:bodyPr lIns="228600" tIns="114300" rIns="228600" bIns="114300" rtlCol="0" anchor="ctr"/>
+          <a:lstStyle/>
+          <a:p>
+            <a:pPr algn="ctr"/>
+            <a:endParaRPr lang="en-US"/>
+          </a:p>
+        </p:txBody>
+      </p:sp>
+      <p:pic>
+        <p:nvPicPr>
+          <p:cNvPr id="3074" name="Picture 2"/>
+          <p:cNvPicPr>
+            <a:picLocks noChangeAspect="1" noChangeArrowheads="1"/>
+          </p:cNvPicPr>
+          <p:nvPr/>
+        </p:nvPicPr>
+        <p:blipFill rotWithShape="1">
+          <a:blip r:embed="rId4">
+            <a:extLst>
+              <a:ext uri="{28A0092B-C50C-407E-A947-70E740481C1C}">
+                <a14:useLocalDpi xmlns:a14="http://schemas.microsoft.com/office/drawing/2010/main" val="0"/>
+              </a:ext>
+            </a:extLst>
+          </a:blip>
+          <a:srcRect l="62977" t="64673" r="8220" b="7793"/>
+          <a:stretch/>
+        </p:blipFill>
+        <p:spPr bwMode="auto">
+          <a:xfrm>
+            <a:off x="2752364" y="6056437"/>
+            <a:ext cx="308048" cy="289022"/>
+          </a:xfrm>
+          <a:prstGeom prst="rect">
+            <a:avLst/>
+          </a:prstGeom>
+          <a:noFill/>
+          <a:ln>
+            <a:noFill/>
+          </a:ln>
+          <a:effectLst>
+            <a:softEdge rad="31750"/>
+          </a:effectLst>
+          <a:extLst>
+            <a:ext uri="{909E8E84-426E-40DD-AFC4-6F175D3DCCD1}">
+              <a14:hiddenFill xmlns:a14="http://schemas.microsoft.com/office/drawing/2010/main">
+                <a:solidFill>
+                  <a:schemeClr val="accent1"/>
+                </a:solidFill>
+              </a14:hiddenFill>
+            </a:ext>
+            <a:ext uri="{91240B29-F687-4F45-9708-019B960494DF}">
+              <a14:hiddenLine xmlns:a14="http://schemas.microsoft.com/office/drawing/2010/main" w="9525">
+                <a:solidFill>
+                  <a:schemeClr val="tx1"/>
+                </a:solidFill>
+                <a:miter lim="800000"/>
+                <a:headEnd/>
+                <a:tailEnd/>
+              </a14:hiddenLine>
+            </a:ext>
+            <a:ext uri="{AF507438-7753-43E0-B8FC-AC1667EBCBE1}">
+              <a14:hiddenEffects xmlns:a14="http://schemas.microsoft.com/office/drawing/2010/main">
+                <a:effectLst>
+                  <a:outerShdw dist="35921" dir="2700000" algn="ctr" rotWithShape="0">
+                    <a:schemeClr val="bg2"/>
+                  </a:outerShdw>
+                </a:effectLst>
+              </a14:hiddenEffects>
+            </a:ext>
+          </a:extLst>
+        </p:spPr>
+      </p:pic>
     </p:spTree>
     <p:extLst>
       <p:ext uri="{BB962C8B-B14F-4D97-AF65-F5344CB8AC3E}">
@@ -8076,6 +8272,76 @@
                                   </p:childTnLst>
                                 </p:cTn>
                               </p:par>
+                              <p:par>
+                                <p:cTn id="8" presetID="21" presetClass="entr" presetSubtype="1" fill="hold" grpId="0" nodeType="withEffect">
+                                  <p:stCondLst>
+                                    <p:cond delay="0"/>
+                                  </p:stCondLst>
+                                  <p:childTnLst>
+                                    <p:set>
+                                      <p:cBhvr>
+                                        <p:cTn id="9" dur="1" fill="hold">
+                                          <p:stCondLst>
+                                            <p:cond delay="0"/>
+                                          </p:stCondLst>
+                                        </p:cTn>
+                                        <p:tgtEl>
+                                          <p:spTgt spid="15"/>
+                                        </p:tgtEl>
+                                        <p:attrNameLst>
+                                          <p:attrName>style.visibility</p:attrName>
+                                        </p:attrNameLst>
+                                      </p:cBhvr>
+                                      <p:to>
+                                        <p:strVal val="visible"/>
+                                      </p:to>
+                                    </p:set>
+                                    <p:animEffect transition="in" filter="wheel(1)">
+                                      <p:cBhvr>
+                                        <p:cTn id="10" dur="500"/>
+                                        <p:tgtEl>
+                                          <p:spTgt spid="15"/>
+                                        </p:tgtEl>
+                                      </p:cBhvr>
+                                    </p:animEffect>
+                                  </p:childTnLst>
+                                </p:cTn>
+                              </p:par>
+                              <p:par>
+                                <p:cTn id="11" presetID="21" presetClass="entr" presetSubtype="1" fill="hold" grpId="0" nodeType="withEffect">
+                                  <p:stCondLst>
+                                    <p:cond delay="0"/>
+                                  </p:stCondLst>
+                                  <p:childTnLst>
+                                    <p:set>
+                                      <p:cBhvr>
+                                        <p:cTn id="12" dur="1" fill="hold">
+                                          <p:stCondLst>
+                                            <p:cond delay="0"/>
+                                          </p:stCondLst>
+                                        </p:cTn>
+                                        <p:tgtEl>
+                                          <p:spTgt spid="16"/>
+                                        </p:tgtEl>
+                                        <p:attrNameLst>
+                                          <p:attrName>style.visibility</p:attrName>
+                                        </p:attrNameLst>
+                                      </p:cBhvr>
+                                      <p:to>
+                                        <p:strVal val="visible"/>
+                                      </p:to>
+                                    </p:set>
+                                    <p:animEffect transition="in" filter="wheel(1)">
+                                      <p:cBhvr>
+                                        <p:cTn id="13" dur="500"/>
+                                        <p:tgtEl>
+                                          <p:spTgt spid="16"/>
+                                        </p:tgtEl>
+                                      </p:cBhvr>
+                                    </p:animEffect>
+                                  </p:childTnLst>
+                                </p:cTn>
+                              </p:par>
                             </p:childTnLst>
                           </p:cTn>
                         </p:par>
@@ -8105,6 +8371,8 @@
     </p:tnLst>
     <p:bldLst>
       <p:bldP spid="23" grpId="0" animBg="1"/>
+      <p:bldP spid="15" grpId="0" animBg="1"/>
+      <p:bldP spid="16" grpId="0" animBg="1"/>
     </p:bldLst>
   </p:timing>
 </p:sld>
@@ -8981,17 +9249,7 @@
                   </a:schemeClr>
                 </a:solidFill>
               </a:rPr>
-              <a:t> </a:t>
-            </a:r>
-            <a:r>
-              <a:rPr lang="en-US" dirty="0" smtClean="0">
-                <a:solidFill>
-                  <a:schemeClr val="accent6">
-                    <a:lumMod val="75000"/>
-                  </a:schemeClr>
-                </a:solidFill>
-              </a:rPr>
-              <a:t>Select the blue rectangle and click  the                button.</a:t>
+              <a:t> Select the blue rectangle and click  the                button.</a:t>
             </a:r>
             <a:endParaRPr lang="en-SG" dirty="0">
               <a:solidFill>
@@ -9043,37 +9301,37 @@
                   </a:schemeClr>
                 </a:solidFill>
               </a:rPr>
-              <a:t> </a:t>
-            </a:r>
-            <a:r>
-              <a:rPr lang="en-US" dirty="0" smtClean="0">
+              <a:t> ‘Play’ the slide show (      ) to see </a:t>
+            </a:r>
+            <a:r>
+              <a:rPr lang="en-US" i="1" dirty="0" smtClean="0">
                 <a:solidFill>
                   <a:schemeClr val="accent6">
                     <a:lumMod val="75000"/>
                   </a:schemeClr>
                 </a:solidFill>
               </a:rPr>
-              <a:t>‘Play’ the slide show (      ) to see </a:t>
-            </a:r>
-            <a:r>
-              <a:rPr lang="en-US" i="1" dirty="0" smtClean="0">
+              <a:t>drill down </a:t>
+            </a:r>
+            <a:r>
+              <a:rPr lang="en-US" dirty="0" smtClean="0">
                 <a:solidFill>
                   <a:schemeClr val="accent6">
                     <a:lumMod val="75000"/>
                   </a:schemeClr>
                 </a:solidFill>
               </a:rPr>
-              <a:t>drill down </a:t>
-            </a:r>
-            <a:r>
-              <a:rPr lang="en-US" dirty="0" smtClean="0">
+              <a:t>effect generated by </a:t>
+            </a:r>
+            <a:r>
+              <a:rPr lang="en-US" dirty="0" err="1" smtClean="0">
                 <a:solidFill>
                   <a:schemeClr val="accent6">
                     <a:lumMod val="75000"/>
                   </a:schemeClr>
                 </a:solidFill>
               </a:rPr>
-              <a:t>effect </a:t>
+              <a:t>PowerPointLabs</a:t>
             </a:r>
             <a:r>
               <a:rPr lang="en-US" dirty="0" smtClean="0">
@@ -9083,57 +9341,7 @@
                   </a:schemeClr>
                 </a:solidFill>
               </a:rPr>
-              <a:t>generated by </a:t>
-            </a:r>
-            <a:r>
-              <a:rPr lang="en-US" dirty="0" err="1" smtClean="0">
-                <a:solidFill>
-                  <a:schemeClr val="accent6">
-                    <a:lumMod val="75000"/>
-                  </a:schemeClr>
-                </a:solidFill>
-              </a:rPr>
-              <a:t>PowerPointLabs</a:t>
-            </a:r>
-            <a:r>
-              <a:rPr lang="en-US" dirty="0" smtClean="0">
-                <a:solidFill>
-                  <a:schemeClr val="accent6">
-                    <a:lumMod val="75000"/>
-                  </a:schemeClr>
-                </a:solidFill>
-              </a:rPr>
-              <a:t>. The effect tells the audience which part of this slide corresponds to the content of the next </a:t>
-            </a:r>
-            <a:r>
-              <a:rPr lang="en-US" dirty="0" smtClean="0">
-                <a:solidFill>
-                  <a:schemeClr val="accent6">
-                    <a:lumMod val="75000"/>
-                  </a:schemeClr>
-                </a:solidFill>
-              </a:rPr>
-              <a:t>slide. For example, here it gives audience the </a:t>
-            </a:r>
-            <a:r>
-              <a:rPr lang="en-US" dirty="0" smtClean="0">
-                <a:solidFill>
-                  <a:schemeClr val="accent6">
-                    <a:lumMod val="75000"/>
-                  </a:schemeClr>
-                </a:solidFill>
-              </a:rPr>
-              <a:t>feeling that you are now drilling down to details about the ‘Process’ part of this slide</a:t>
-            </a:r>
-            <a:r>
-              <a:rPr lang="en-US" dirty="0" smtClean="0">
-                <a:solidFill>
-                  <a:schemeClr val="accent6">
-                    <a:lumMod val="75000"/>
-                  </a:schemeClr>
-                </a:solidFill>
-              </a:rPr>
-              <a:t>.</a:t>
+              <a:t>. The effect tells the audience which part of this slide corresponds to the content of the next slide. For example, here it gives audience the feeling that you are now drilling down to details about the ‘Process’ part of this slide.</a:t>
             </a:r>
             <a:endParaRPr lang="en-SG" dirty="0">
               <a:solidFill>
@@ -10690,47 +10898,27 @@
                   </a:schemeClr>
                 </a:solidFill>
               </a:rPr>
-              <a:t> </a:t>
-            </a:r>
-            <a:r>
-              <a:rPr lang="en-US" dirty="0" smtClean="0">
+              <a:t> Select the blue rectangle and click  the              button to generate a </a:t>
+            </a:r>
+            <a:r>
+              <a:rPr lang="en-US" i="1" dirty="0" smtClean="0">
                 <a:solidFill>
                   <a:schemeClr val="accent6">
                     <a:lumMod val="75000"/>
                   </a:schemeClr>
                 </a:solidFill>
               </a:rPr>
-              <a:t>Select the blue rectangle and click  the              button to generate a </a:t>
-            </a:r>
-            <a:r>
-              <a:rPr lang="en-US" i="1" dirty="0" smtClean="0">
+              <a:t>step back </a:t>
+            </a:r>
+            <a:r>
+              <a:rPr lang="en-US" dirty="0" smtClean="0">
                 <a:solidFill>
                   <a:schemeClr val="accent6">
                     <a:lumMod val="75000"/>
                   </a:schemeClr>
                 </a:solidFill>
               </a:rPr>
-              <a:t>step back </a:t>
-            </a:r>
-            <a:r>
-              <a:rPr lang="en-US" dirty="0" smtClean="0">
-                <a:solidFill>
-                  <a:schemeClr val="accent6">
-                    <a:lumMod val="75000"/>
-                  </a:schemeClr>
-                </a:solidFill>
-              </a:rPr>
-              <a:t>effect </a:t>
-            </a:r>
-            <a:r>
-              <a:rPr lang="en-US" dirty="0" smtClean="0">
-                <a:solidFill>
-                  <a:schemeClr val="accent6">
-                    <a:lumMod val="75000"/>
-                  </a:schemeClr>
-                </a:solidFill>
-              </a:rPr>
-              <a:t>from the previous slide.</a:t>
+              <a:t>effect from the previous slide.</a:t>
             </a:r>
             <a:endParaRPr lang="en-SG" dirty="0">
               <a:solidFill>
@@ -10782,17 +10970,17 @@
                   </a:schemeClr>
                 </a:solidFill>
               </a:rPr>
-              <a:t> </a:t>
-            </a:r>
-            <a:r>
-              <a:rPr lang="en-US" dirty="0" smtClean="0">
+              <a:t> Go back a couple of slides and ‘play’ the slide show to see the </a:t>
+            </a:r>
+            <a:r>
+              <a:rPr lang="en-US" i="1" dirty="0" smtClean="0">
                 <a:solidFill>
                   <a:schemeClr val="accent6">
                     <a:lumMod val="75000"/>
                   </a:schemeClr>
                 </a:solidFill>
               </a:rPr>
-              <a:t>Go back a couple of slides and ‘play’ the slide show to </a:t>
+              <a:t>step back </a:t>
             </a:r>
             <a:r>
               <a:rPr lang="en-US" dirty="0" smtClean="0">
@@ -10802,47 +10990,7 @@
                   </a:schemeClr>
                 </a:solidFill>
               </a:rPr>
-              <a:t>see the </a:t>
-            </a:r>
-            <a:r>
-              <a:rPr lang="en-US" i="1" dirty="0" smtClean="0">
-                <a:solidFill>
-                  <a:schemeClr val="accent6">
-                    <a:lumMod val="75000"/>
-                  </a:schemeClr>
-                </a:solidFill>
-              </a:rPr>
-              <a:t>step back </a:t>
-            </a:r>
-            <a:r>
-              <a:rPr lang="en-US" dirty="0" smtClean="0">
-                <a:solidFill>
-                  <a:schemeClr val="accent6">
-                    <a:lumMod val="75000"/>
-                  </a:schemeClr>
-                </a:solidFill>
-              </a:rPr>
-              <a:t>effect </a:t>
-            </a:r>
-            <a:r>
-              <a:rPr lang="en-US" dirty="0" smtClean="0">
-                <a:solidFill>
-                  <a:schemeClr val="accent6">
-                    <a:lumMod val="75000"/>
-                  </a:schemeClr>
-                </a:solidFill>
-              </a:rPr>
-              <a:t>generated</a:t>
-            </a:r>
-            <a:r>
-              <a:rPr lang="en-US" dirty="0" smtClean="0">
-                <a:solidFill>
-                  <a:schemeClr val="accent6">
-                    <a:lumMod val="75000"/>
-                  </a:schemeClr>
-                </a:solidFill>
-              </a:rPr>
-              <a:t>. This effect can be used to indicate that you are stepping back to take a look at where the details you have been discussing fit into the big picture.</a:t>
+              <a:t>effect generated. This effect can be used to indicate that you are stepping back to take a look at where the details you have been discussing fit into the big picture.</a:t>
             </a:r>
             <a:endParaRPr lang="en-SG" dirty="0">
               <a:solidFill>
@@ -11000,17 +11148,7 @@
                   </a:schemeClr>
                 </a:solidFill>
               </a:rPr>
-              <a:t> </a:t>
-            </a:r>
-            <a:r>
-              <a:rPr lang="en-US" dirty="0" smtClean="0">
-                <a:solidFill>
-                  <a:schemeClr val="accent6">
-                    <a:lumMod val="75000"/>
-                  </a:schemeClr>
-                </a:solidFill>
-              </a:rPr>
-              <a:t>feature</a:t>
+              <a:t> feature</a:t>
             </a:r>
             <a:endParaRPr lang="en-SG" dirty="0">
               <a:solidFill>
@@ -11424,9 +11562,9 @@
                   </a:schemeClr>
                 </a:solidFill>
               </a:rPr>
-              <a:t> </a:t>
-            </a:r>
-            <a:r>
+              <a:t> Select the blue shapes (ctrl + click) and click the                 button. </a:t>
+            </a:r>
+            <a:br>
               <a:rPr lang="en-US" dirty="0" smtClean="0">
                 <a:solidFill>
                   <a:schemeClr val="accent6">
@@ -11434,8 +11572,7 @@
                   </a:schemeClr>
                 </a:solidFill>
               </a:rPr>
-              <a:t>Select the blue shap</a:t>
-            </a:r>
+            </a:br>
             <a:r>
               <a:rPr lang="en-US" dirty="0" smtClean="0">
                 <a:solidFill>
@@ -11444,9 +11581,9 @@
                   </a:schemeClr>
                 </a:solidFill>
               </a:rPr>
-              <a:t>es (ctrl + click) and c</a:t>
-            </a:r>
-            <a:r>
+              <a:t/>
+            </a:r>
+            <a:br>
               <a:rPr lang="en-US" dirty="0" smtClean="0">
                 <a:solidFill>
                   <a:schemeClr val="accent6">
@@ -11454,8 +11591,7 @@
                   </a:schemeClr>
                 </a:solidFill>
               </a:rPr>
-              <a:t>lick </a:t>
-            </a:r>
+            </a:br>
             <a:r>
               <a:rPr lang="en-US" dirty="0" smtClean="0">
                 <a:solidFill>
@@ -11464,7 +11600,7 @@
                   </a:schemeClr>
                 </a:solidFill>
               </a:rPr>
-              <a:t>the                 button. </a:t>
+              <a:t/>
             </a:r>
             <a:br>
               <a:rPr lang="en-US" dirty="0" smtClean="0">
@@ -11483,55 +11619,7 @@
                   </a:schemeClr>
                 </a:solidFill>
               </a:rPr>
-              <a:t/>
-            </a:r>
-            <a:br>
-              <a:rPr lang="en-US" dirty="0" smtClean="0">
-                <a:solidFill>
-                  <a:schemeClr val="accent6">
-                    <a:lumMod val="75000"/>
-                  </a:schemeClr>
-                </a:solidFill>
-              </a:rPr>
-            </a:br>
-            <a:r>
-              <a:rPr lang="en-US" dirty="0" smtClean="0">
-                <a:solidFill>
-                  <a:schemeClr val="accent6">
-                    <a:lumMod val="75000"/>
-                  </a:schemeClr>
-                </a:solidFill>
-              </a:rPr>
-              <a:t/>
-            </a:r>
-            <a:br>
-              <a:rPr lang="en-US" dirty="0" smtClean="0">
-                <a:solidFill>
-                  <a:schemeClr val="accent6">
-                    <a:lumMod val="75000"/>
-                  </a:schemeClr>
-                </a:solidFill>
-              </a:rPr>
-            </a:br>
-            <a:r>
-              <a:rPr lang="en-US" dirty="0" smtClean="0">
-                <a:solidFill>
-                  <a:schemeClr val="accent6">
-                    <a:lumMod val="75000"/>
-                  </a:schemeClr>
-                </a:solidFill>
-              </a:rPr>
-              <a:t>It will </a:t>
-            </a:r>
-            <a:r>
-              <a:rPr lang="en-US" dirty="0" smtClean="0">
-                <a:solidFill>
-                  <a:schemeClr val="accent6">
-                    <a:lumMod val="75000"/>
-                  </a:schemeClr>
-                </a:solidFill>
-              </a:rPr>
-              <a:t>crop the images behind to match the outlines of the shapes.</a:t>
+              <a:t>It will crop the images behind to match the outlines of the shapes.</a:t>
             </a:r>
             <a:endParaRPr lang="en-SG" dirty="0">
               <a:solidFill>
@@ -12259,27 +12347,7 @@
                   </a:schemeClr>
                 </a:solidFill>
               </a:rPr>
-              <a:t> You can apply other default PowerPoint effects such as soft-edges to enhance the resultin</a:t>
-            </a:r>
-            <a:r>
-              <a:rPr lang="en-US" dirty="0" smtClean="0">
-                <a:solidFill>
-                  <a:schemeClr val="accent6">
-                    <a:lumMod val="75000"/>
-                  </a:schemeClr>
-                </a:solidFill>
-              </a:rPr>
-              <a:t>g cropped image even further</a:t>
-            </a:r>
-            <a:r>
-              <a:rPr lang="en-US" dirty="0" smtClean="0">
-                <a:solidFill>
-                  <a:schemeClr val="accent6">
-                    <a:lumMod val="75000"/>
-                  </a:schemeClr>
-                </a:solidFill>
-              </a:rPr>
-              <a:t>.</a:t>
+              <a:t> You can apply other default PowerPoint effects such as soft-edges to enhance the resulting cropped image even further.</a:t>
             </a:r>
             <a:endParaRPr lang="en-SG" dirty="0">
               <a:solidFill>
@@ -12347,15 +12415,6 @@
                 <a:headEnd/>
                 <a:tailEnd/>
               </a14:hiddenLine>
-            </a:ext>
-            <a:ext uri="{AF507438-7753-43E0-B8FC-AC1667EBCBE1}">
-              <a14:hiddenEffects xmlns:a14="http://schemas.microsoft.com/office/drawing/2010/main">
-                <a:effectLst>
-                  <a:outerShdw dist="35921" dir="2700000" algn="ctr" rotWithShape="0">
-                    <a:schemeClr val="bg2"/>
-                  </a:outerShdw>
-                </a:effectLst>
-              </a14:hiddenEffects>
             </a:ext>
           </a:extLst>
         </p:spPr>
@@ -15757,7 +15816,7 @@
         </p:nvSpPr>
         <p:spPr>
           <a:xfrm>
-            <a:off x="746760" y="5849171"/>
+            <a:off x="5257800" y="5849171"/>
             <a:ext cx="2226136" cy="738664"/>
           </a:xfrm>
           <a:prstGeom prst="rect">
@@ -15779,7 +15838,7 @@
                   </a:schemeClr>
                 </a:solidFill>
               </a:rPr>
-              <a:t>a.</a:t>
+              <a:t>b.</a:t>
             </a:r>
             <a:r>
               <a:rPr lang="en-US" sz="1600" dirty="0" smtClean="0">
@@ -15819,8 +15878,8 @@
         </p:nvSpPr>
         <p:spPr>
           <a:xfrm>
-            <a:off x="3483943" y="5849171"/>
-            <a:ext cx="2226136" cy="738664"/>
+            <a:off x="381000" y="5849171"/>
+            <a:ext cx="1995311" cy="738664"/>
           </a:xfrm>
           <a:prstGeom prst="rect">
             <a:avLst/>
@@ -15841,7 +15900,7 @@
                   </a:schemeClr>
                 </a:solidFill>
               </a:rPr>
-              <a:t>b.</a:t>
+              <a:t>a.</a:t>
             </a:r>
             <a:r>
               <a:rPr lang="en-US" sz="1600" dirty="0" smtClean="0">
@@ -15861,7 +15920,46 @@
                   </a:schemeClr>
                 </a:solidFill>
               </a:rPr>
-              <a:t>Adjust these settings.</a:t>
+              <a:t>Adjust these </a:t>
+            </a:r>
+            <a:r>
+              <a:rPr lang="en-US" dirty="0" smtClean="0">
+                <a:solidFill>
+                  <a:schemeClr val="accent6">
+                    <a:lumMod val="75000"/>
+                  </a:schemeClr>
+                </a:solidFill>
+              </a:rPr>
+              <a:t/>
+            </a:r>
+            <a:br>
+              <a:rPr lang="en-US" dirty="0" smtClean="0">
+                <a:solidFill>
+                  <a:schemeClr val="accent6">
+                    <a:lumMod val="75000"/>
+                  </a:schemeClr>
+                </a:solidFill>
+              </a:rPr>
+            </a:br>
+            <a:r>
+              <a:rPr lang="en-US" dirty="0" smtClean="0">
+                <a:solidFill>
+                  <a:schemeClr val="accent6">
+                    <a:lumMod val="75000"/>
+                  </a:schemeClr>
+                </a:solidFill>
+              </a:rPr>
+              <a:t>settings</a:t>
+            </a:r>
+            <a:r>
+              <a:rPr lang="en-US" dirty="0" smtClean="0">
+                <a:solidFill>
+                  <a:schemeClr val="accent6">
+                    <a:lumMod val="75000"/>
+                  </a:schemeClr>
+                </a:solidFill>
+              </a:rPr>
+              <a:t>.</a:t>
             </a:r>
             <a:endParaRPr lang="en-SG" dirty="0">
               <a:solidFill>
@@ -15875,7 +15973,7 @@
       </p:sp>
       <p:pic>
         <p:nvPicPr>
-          <p:cNvPr id="10243" name="Picture 3"/>
+          <p:cNvPr id="10244" name="Picture 4"/>
           <p:cNvPicPr>
             <a:picLocks noChangeAspect="1" noChangeArrowheads="1"/>
           </p:cNvPicPr>
@@ -15896,8 +15994,8 @@
         </p:blipFill>
         <p:spPr bwMode="auto">
           <a:xfrm>
-            <a:off x="3383827" y="4600985"/>
-            <a:ext cx="2426368" cy="838200"/>
+            <a:off x="7848600" y="4419599"/>
+            <a:ext cx="838200" cy="1167493"/>
           </a:xfrm>
           <a:prstGeom prst="rect">
             <a:avLst/>
@@ -15927,16 +16025,117 @@
           </a:extLst>
         </p:spPr>
       </p:pic>
+      <p:sp>
+        <p:nvSpPr>
+          <p:cNvPr id="24" name="TextBox 23"/>
+          <p:cNvSpPr txBox="1"/>
+          <p:nvPr/>
+        </p:nvSpPr>
+        <p:spPr>
+          <a:xfrm>
+            <a:off x="7756064" y="5849171"/>
+            <a:ext cx="1311736" cy="738664"/>
+          </a:xfrm>
+          <a:prstGeom prst="rect">
+            <a:avLst/>
+          </a:prstGeom>
+          <a:noFill/>
+        </p:spPr>
+        <p:txBody>
+          <a:bodyPr wrap="square" rtlCol="0">
+            <a:spAutoFit/>
+          </a:bodyPr>
+          <a:lstStyle/>
+          <a:p>
+            <a:r>
+              <a:rPr lang="en-US" sz="2400" b="1" dirty="0" smtClean="0">
+                <a:solidFill>
+                  <a:schemeClr val="accent6">
+                    <a:lumMod val="75000"/>
+                  </a:schemeClr>
+                </a:solidFill>
+              </a:rPr>
+              <a:t>c.</a:t>
+            </a:r>
+            <a:r>
+              <a:rPr lang="en-US" sz="1600" dirty="0" smtClean="0">
+                <a:solidFill>
+                  <a:schemeClr val="accent6">
+                    <a:lumMod val="75000"/>
+                  </a:schemeClr>
+                </a:solidFill>
+              </a:rPr>
+              <a:t> </a:t>
+            </a:r>
+            <a:r>
+              <a:rPr lang="en-US" dirty="0" smtClean="0">
+                <a:solidFill>
+                  <a:schemeClr val="accent6">
+                    <a:lumMod val="75000"/>
+                  </a:schemeClr>
+                </a:solidFill>
+              </a:rPr>
+              <a:t>Click </a:t>
+            </a:r>
+            <a:r>
+              <a:rPr lang="en-US" dirty="0" smtClean="0">
+                <a:solidFill>
+                  <a:schemeClr val="accent6">
+                    <a:lumMod val="75000"/>
+                  </a:schemeClr>
+                </a:solidFill>
+              </a:rPr>
+              <a:t/>
+            </a:r>
+            <a:br>
+              <a:rPr lang="en-US" dirty="0" smtClean="0">
+                <a:solidFill>
+                  <a:schemeClr val="accent6">
+                    <a:lumMod val="75000"/>
+                  </a:schemeClr>
+                </a:solidFill>
+              </a:rPr>
+            </a:br>
+            <a:r>
+              <a:rPr lang="en-US" dirty="0" smtClean="0">
+                <a:solidFill>
+                  <a:schemeClr val="accent6">
+                    <a:lumMod val="75000"/>
+                  </a:schemeClr>
+                </a:solidFill>
+              </a:rPr>
+              <a:t>this </a:t>
+            </a:r>
+            <a:r>
+              <a:rPr lang="en-US" dirty="0" smtClean="0">
+                <a:solidFill>
+                  <a:schemeClr val="accent6">
+                    <a:lumMod val="75000"/>
+                  </a:schemeClr>
+                </a:solidFill>
+              </a:rPr>
+              <a:t>button.</a:t>
+            </a:r>
+            <a:endParaRPr lang="en-SG" dirty="0">
+              <a:solidFill>
+                <a:schemeClr val="accent6">
+                  <a:lumMod val="75000"/>
+                </a:schemeClr>
+              </a:solidFill>
+            </a:endParaRPr>
+          </a:p>
+        </p:txBody>
+      </p:sp>
       <p:pic>
         <p:nvPicPr>
-          <p:cNvPr id="10244" name="Picture 4"/>
+          <p:cNvPr id="10245" name="Picture 5"/>
           <p:cNvPicPr>
             <a:picLocks noChangeAspect="1" noChangeArrowheads="1"/>
           </p:cNvPicPr>
           <p:nvPr/>
         </p:nvPicPr>
         <p:blipFill>
-          <a:blip r:embed="rId4">
+          <a:blip r:embed="rId4" cstate="print">
             <a:extLst>
               <a:ext uri="{28A0092B-C50C-407E-A947-70E740481C1C}">
                 <a14:useLocalDpi xmlns:a14="http://schemas.microsoft.com/office/drawing/2010/main" val="0"/>
@@ -15950,123 +16149,7 @@
         </p:blipFill>
         <p:spPr bwMode="auto">
           <a:xfrm>
-            <a:off x="6705600" y="4419599"/>
-            <a:ext cx="838200" cy="1167493"/>
-          </a:xfrm>
-          <a:prstGeom prst="rect">
-            <a:avLst/>
-          </a:prstGeom>
-          <a:noFill/>
-          <a:ln>
-            <a:noFill/>
-          </a:ln>
-          <a:extLst>
-            <a:ext uri="{909E8E84-426E-40DD-AFC4-6F175D3DCCD1}">
-              <a14:hiddenFill xmlns:a14="http://schemas.microsoft.com/office/drawing/2010/main">
-                <a:solidFill>
-                  <a:schemeClr val="accent1"/>
-                </a:solidFill>
-              </a14:hiddenFill>
-            </a:ext>
-            <a:ext uri="{91240B29-F687-4F45-9708-019B960494DF}">
-              <a14:hiddenLine xmlns:a14="http://schemas.microsoft.com/office/drawing/2010/main" w="9525">
-                <a:solidFill>
-                  <a:schemeClr val="tx1"/>
-                </a:solidFill>
-                <a:miter lim="800000"/>
-                <a:headEnd/>
-                <a:tailEnd/>
-              </a14:hiddenLine>
-            </a:ext>
-          </a:extLst>
-        </p:spPr>
-      </p:pic>
-      <p:sp>
-        <p:nvSpPr>
-          <p:cNvPr id="24" name="TextBox 23"/>
-          <p:cNvSpPr txBox="1"/>
-          <p:nvPr/>
-        </p:nvSpPr>
-        <p:spPr>
-          <a:xfrm>
-            <a:off x="6232064" y="5849171"/>
-            <a:ext cx="2226136" cy="461665"/>
-          </a:xfrm>
-          <a:prstGeom prst="rect">
-            <a:avLst/>
-          </a:prstGeom>
-          <a:noFill/>
-        </p:spPr>
-        <p:txBody>
-          <a:bodyPr wrap="square" rtlCol="0">
-            <a:spAutoFit/>
-          </a:bodyPr>
-          <a:lstStyle/>
-          <a:p>
-            <a:r>
-              <a:rPr lang="en-US" sz="2400" b="1" dirty="0" smtClean="0">
-                <a:solidFill>
-                  <a:schemeClr val="accent6">
-                    <a:lumMod val="75000"/>
-                  </a:schemeClr>
-                </a:solidFill>
-              </a:rPr>
-              <a:t>c.</a:t>
-            </a:r>
-            <a:r>
-              <a:rPr lang="en-US" sz="1600" dirty="0" smtClean="0">
-                <a:solidFill>
-                  <a:schemeClr val="accent6">
-                    <a:lumMod val="75000"/>
-                  </a:schemeClr>
-                </a:solidFill>
-              </a:rPr>
-              <a:t> </a:t>
-            </a:r>
-            <a:r>
-              <a:rPr lang="en-US" dirty="0" smtClean="0">
-                <a:solidFill>
-                  <a:schemeClr val="accent6">
-                    <a:lumMod val="75000"/>
-                  </a:schemeClr>
-                </a:solidFill>
-              </a:rPr>
-              <a:t>Click this button.</a:t>
-            </a:r>
-            <a:endParaRPr lang="en-SG" dirty="0">
-              <a:solidFill>
-                <a:schemeClr val="accent6">
-                  <a:lumMod val="75000"/>
-                </a:schemeClr>
-              </a:solidFill>
-            </a:endParaRPr>
-          </a:p>
-        </p:txBody>
-      </p:sp>
-      <p:pic>
-        <p:nvPicPr>
-          <p:cNvPr id="10245" name="Picture 5"/>
-          <p:cNvPicPr>
-            <a:picLocks noChangeAspect="1" noChangeArrowheads="1"/>
-          </p:cNvPicPr>
-          <p:nvPr/>
-        </p:nvPicPr>
-        <p:blipFill>
-          <a:blip r:embed="rId5" cstate="print">
-            <a:extLst>
-              <a:ext uri="{28A0092B-C50C-407E-A947-70E740481C1C}">
-                <a14:useLocalDpi xmlns:a14="http://schemas.microsoft.com/office/drawing/2010/main" val="0"/>
-              </a:ext>
-            </a:extLst>
-          </a:blip>
-          <a:srcRect/>
-          <a:stretch>
-            <a:fillRect/>
-          </a:stretch>
-        </p:blipFill>
-        <p:spPr bwMode="auto">
-          <a:xfrm>
-            <a:off x="716280" y="4419599"/>
+            <a:off x="5227320" y="4424138"/>
             <a:ext cx="1904689" cy="1429572"/>
           </a:xfrm>
           <a:prstGeom prst="rect">
@@ -16107,6 +16190,268 @@
           </a:extLst>
         </p:spPr>
       </p:pic>
+      <p:pic>
+        <p:nvPicPr>
+          <p:cNvPr id="1026" name="Picture 2"/>
+          <p:cNvPicPr>
+            <a:picLocks noChangeAspect="1" noChangeArrowheads="1"/>
+          </p:cNvPicPr>
+          <p:nvPr/>
+        </p:nvPicPr>
+        <p:blipFill>
+          <a:blip r:embed="rId5">
+            <a:extLst>
+              <a:ext uri="{28A0092B-C50C-407E-A947-70E740481C1C}">
+                <a14:useLocalDpi xmlns:a14="http://schemas.microsoft.com/office/drawing/2010/main" val="0"/>
+              </a:ext>
+            </a:extLst>
+          </a:blip>
+          <a:srcRect/>
+          <a:stretch>
+            <a:fillRect/>
+          </a:stretch>
+        </p:blipFill>
+        <p:spPr bwMode="auto">
+          <a:xfrm>
+            <a:off x="2376311" y="4976954"/>
+            <a:ext cx="2500489" cy="1119046"/>
+          </a:xfrm>
+          <a:prstGeom prst="roundRect">
+            <a:avLst>
+              <a:gd name="adj" fmla="val 3977"/>
+            </a:avLst>
+          </a:prstGeom>
+          <a:noFill/>
+          <a:ln>
+            <a:noFill/>
+          </a:ln>
+          <a:effectLst/>
+          <a:extLst>
+            <a:ext uri="{909E8E84-426E-40DD-AFC4-6F175D3DCCD1}">
+              <a14:hiddenFill xmlns:a14="http://schemas.microsoft.com/office/drawing/2010/main">
+                <a:solidFill>
+                  <a:schemeClr val="accent1"/>
+                </a:solidFill>
+              </a14:hiddenFill>
+            </a:ext>
+            <a:ext uri="{91240B29-F687-4F45-9708-019B960494DF}">
+              <a14:hiddenLine xmlns:a14="http://schemas.microsoft.com/office/drawing/2010/main" w="9525">
+                <a:solidFill>
+                  <a:schemeClr val="tx1"/>
+                </a:solidFill>
+                <a:miter lim="800000"/>
+                <a:headEnd/>
+                <a:tailEnd/>
+              </a14:hiddenLine>
+            </a:ext>
+            <a:ext uri="{AF507438-7753-43E0-B8FC-AC1667EBCBE1}">
+              <a14:hiddenEffects xmlns:a14="http://schemas.microsoft.com/office/drawing/2010/main">
+                <a:effectLst>
+                  <a:outerShdw dist="35921" dir="2700000" algn="ctr" rotWithShape="0">
+                    <a:schemeClr val="bg2"/>
+                  </a:outerShdw>
+                </a:effectLst>
+              </a14:hiddenEffects>
+            </a:ext>
+          </a:extLst>
+        </p:spPr>
+      </p:pic>
+      <p:pic>
+        <p:nvPicPr>
+          <p:cNvPr id="1027" name="Picture 3"/>
+          <p:cNvPicPr>
+            <a:picLocks noChangeAspect="1" noChangeArrowheads="1"/>
+          </p:cNvPicPr>
+          <p:nvPr/>
+        </p:nvPicPr>
+        <p:blipFill>
+          <a:blip r:embed="rId6">
+            <a:extLst>
+              <a:ext uri="{28A0092B-C50C-407E-A947-70E740481C1C}">
+                <a14:useLocalDpi xmlns:a14="http://schemas.microsoft.com/office/drawing/2010/main" val="0"/>
+              </a:ext>
+            </a:extLst>
+          </a:blip>
+          <a:srcRect/>
+          <a:stretch>
+            <a:fillRect/>
+          </a:stretch>
+        </p:blipFill>
+        <p:spPr bwMode="auto">
+          <a:xfrm>
+            <a:off x="416065" y="4280964"/>
+            <a:ext cx="1694356" cy="1270767"/>
+          </a:xfrm>
+          <a:prstGeom prst="rect">
+            <a:avLst/>
+          </a:prstGeom>
+          <a:noFill/>
+          <a:ln>
+            <a:noFill/>
+          </a:ln>
+          <a:effectLst/>
+          <a:extLst>
+            <a:ext uri="{909E8E84-426E-40DD-AFC4-6F175D3DCCD1}">
+              <a14:hiddenFill xmlns:a14="http://schemas.microsoft.com/office/drawing/2010/main">
+                <a:solidFill>
+                  <a:schemeClr val="accent1"/>
+                </a:solidFill>
+              </a14:hiddenFill>
+            </a:ext>
+            <a:ext uri="{91240B29-F687-4F45-9708-019B960494DF}">
+              <a14:hiddenLine xmlns:a14="http://schemas.microsoft.com/office/drawing/2010/main" w="9525">
+                <a:solidFill>
+                  <a:schemeClr val="tx1"/>
+                </a:solidFill>
+                <a:miter lim="800000"/>
+                <a:headEnd/>
+                <a:tailEnd/>
+              </a14:hiddenLine>
+            </a:ext>
+            <a:ext uri="{AF507438-7753-43E0-B8FC-AC1667EBCBE1}">
+              <a14:hiddenEffects xmlns:a14="http://schemas.microsoft.com/office/drawing/2010/main">
+                <a:effectLst>
+                  <a:outerShdw dist="35921" dir="2700000" algn="ctr" rotWithShape="0">
+                    <a:schemeClr val="bg2"/>
+                  </a:outerShdw>
+                </a:effectLst>
+              </a14:hiddenEffects>
+            </a:ext>
+          </a:extLst>
+        </p:spPr>
+      </p:pic>
+      <p:sp>
+        <p:nvSpPr>
+          <p:cNvPr id="2" name="Flowchart: Connector 1"/>
+          <p:cNvSpPr/>
+          <p:nvPr/>
+        </p:nvSpPr>
+        <p:spPr>
+          <a:xfrm>
+            <a:off x="1825520" y="5276419"/>
+            <a:ext cx="368721" cy="368721"/>
+          </a:xfrm>
+          <a:prstGeom prst="flowChartConnector">
+            <a:avLst/>
+          </a:prstGeom>
+          <a:noFill/>
+          <a:ln w="38100">
+            <a:solidFill>
+              <a:schemeClr val="accent6"/>
+            </a:solidFill>
+          </a:ln>
+        </p:spPr>
+        <p:style>
+          <a:lnRef idx="2">
+            <a:schemeClr val="accent1">
+              <a:shade val="50000"/>
+            </a:schemeClr>
+          </a:lnRef>
+          <a:fillRef idx="1">
+            <a:schemeClr val="accent1"/>
+          </a:fillRef>
+          <a:effectRef idx="0">
+            <a:schemeClr val="accent1"/>
+          </a:effectRef>
+          <a:fontRef idx="minor">
+            <a:schemeClr val="lt1"/>
+          </a:fontRef>
+        </p:style>
+        <p:txBody>
+          <a:bodyPr rtlCol="0" anchor="ctr"/>
+          <a:lstStyle/>
+          <a:p>
+            <a:pPr algn="ctr"/>
+            <a:endParaRPr lang="en-US"/>
+          </a:p>
+        </p:txBody>
+      </p:sp>
+      <p:sp>
+        <p:nvSpPr>
+          <p:cNvPr id="3" name="Freeform 2"/>
+          <p:cNvSpPr/>
+          <p:nvPr/>
+        </p:nvSpPr>
+        <p:spPr>
+          <a:xfrm>
+            <a:off x="2003320" y="5653834"/>
+            <a:ext cx="304800" cy="203200"/>
+          </a:xfrm>
+          <a:custGeom>
+            <a:avLst/>
+            <a:gdLst>
+              <a:gd name="connsiteX0" fmla="*/ 0 w 304800"/>
+              <a:gd name="connsiteY0" fmla="*/ 0 h 203200"/>
+              <a:gd name="connsiteX1" fmla="*/ 76200 w 304800"/>
+              <a:gd name="connsiteY1" fmla="*/ 165100 h 203200"/>
+              <a:gd name="connsiteX2" fmla="*/ 304800 w 304800"/>
+              <a:gd name="connsiteY2" fmla="*/ 203200 h 203200"/>
+            </a:gdLst>
+            <a:ahLst/>
+            <a:cxnLst>
+              <a:cxn ang="0">
+                <a:pos x="connsiteX0" y="connsiteY0"/>
+              </a:cxn>
+              <a:cxn ang="0">
+                <a:pos x="connsiteX1" y="connsiteY1"/>
+              </a:cxn>
+              <a:cxn ang="0">
+                <a:pos x="connsiteX2" y="connsiteY2"/>
+              </a:cxn>
+            </a:cxnLst>
+            <a:rect l="l" t="t" r="r" b="b"/>
+            <a:pathLst>
+              <a:path w="304800" h="203200">
+                <a:moveTo>
+                  <a:pt x="0" y="0"/>
+                </a:moveTo>
+                <a:cubicBezTo>
+                  <a:pt x="12700" y="65616"/>
+                  <a:pt x="25400" y="131233"/>
+                  <a:pt x="76200" y="165100"/>
+                </a:cubicBezTo>
+                <a:cubicBezTo>
+                  <a:pt x="127000" y="198967"/>
+                  <a:pt x="215900" y="201083"/>
+                  <a:pt x="304800" y="203200"/>
+                </a:cubicBezTo>
+              </a:path>
+            </a:pathLst>
+          </a:custGeom>
+          <a:noFill/>
+          <a:ln w="38100">
+            <a:solidFill>
+              <a:schemeClr val="accent6"/>
+            </a:solidFill>
+            <a:headEnd type="none" w="med" len="med"/>
+            <a:tailEnd type="triangle" w="med" len="med"/>
+          </a:ln>
+        </p:spPr>
+        <p:style>
+          <a:lnRef idx="2">
+            <a:schemeClr val="accent1">
+              <a:shade val="50000"/>
+            </a:schemeClr>
+          </a:lnRef>
+          <a:fillRef idx="1">
+            <a:schemeClr val="accent1"/>
+          </a:fillRef>
+          <a:effectRef idx="0">
+            <a:schemeClr val="accent1"/>
+          </a:effectRef>
+          <a:fontRef idx="minor">
+            <a:schemeClr val="lt1"/>
+          </a:fontRef>
+        </p:style>
+        <p:txBody>
+          <a:bodyPr rtlCol="0" anchor="ctr"/>
+          <a:lstStyle/>
+          <a:p>
+            <a:pPr algn="ctr"/>
+            <a:endParaRPr lang="en-US"/>
+          </a:p>
+        </p:txBody>
+      </p:sp>
     </p:spTree>
     <p:extLst>
       <p:ext uri="{BB962C8B-B14F-4D97-AF65-F5344CB8AC3E}">

</xml_diff>

<commit_message>
fixes some word usage in tutorial; update tutorial in doc
</commit_message>
<xml_diff>
--- a/doc/PowerPointLabs Quick Tutorial.pptx
+++ b/doc/PowerPointLabs Quick Tutorial.pptx
@@ -5,7 +5,7 @@
     <p:sldMasterId id="2147483648" r:id="rId1"/>
   </p:sldMasterIdLst>
   <p:notesMasterIdLst>
-    <p:notesMasterId r:id="rId29"/>
+    <p:notesMasterId r:id="rId35"/>
   </p:notesMasterIdLst>
   <p:sldIdLst>
     <p:sldId id="296" r:id="rId2"/>
@@ -33,8 +33,14 @@
     <p:sldId id="327" r:id="rId24"/>
     <p:sldId id="310" r:id="rId25"/>
     <p:sldId id="326" r:id="rId26"/>
-    <p:sldId id="305" r:id="rId27"/>
-    <p:sldId id="299" r:id="rId28"/>
+    <p:sldId id="331" r:id="rId27"/>
+    <p:sldId id="332" r:id="rId28"/>
+    <p:sldId id="333" r:id="rId29"/>
+    <p:sldId id="334" r:id="rId30"/>
+    <p:sldId id="335" r:id="rId31"/>
+    <p:sldId id="336" r:id="rId32"/>
+    <p:sldId id="305" r:id="rId33"/>
+    <p:sldId id="299" r:id="rId34"/>
   </p:sldIdLst>
   <p:sldSz cx="9144000" cy="6858000" type="screen4x3"/>
   <p:notesSz cx="6858000" cy="9144000"/>
@@ -187,6 +193,20 @@
           <p14:sldIdLst>
             <p14:sldId id="310"/>
             <p14:sldId id="326"/>
+            <p14:sldId id="331"/>
+          </p14:sldIdLst>
+        </p14:section>
+        <p14:section name="Shapes Lab" id="{5FA21AB1-D2E0-43AB-9D6E-D4B133EACC31}">
+          <p14:sldIdLst>
+            <p14:sldId id="332"/>
+            <p14:sldId id="333"/>
+            <p14:sldId id="334"/>
+          </p14:sldIdLst>
+        </p14:section>
+        <p14:section name="Colors Lab" id="{4D9F6F7A-AD11-477C-BD7D-CDEDBF639F04}">
+          <p14:sldIdLst>
+            <p14:sldId id="335"/>
+            <p14:sldId id="336"/>
           </p14:sldIdLst>
         </p14:section>
         <p14:section name="Wrap up" id="{5BBA1A93-B239-4917-BAC7-9CBE7A60C0BF}">
@@ -198,7 +218,7 @@
       </p14:sectionLst>
     </p:ext>
     <p:ext uri="{EFAFB233-063F-42B5-8137-9DF3F51BA10A}">
-      <p15:sldGuideLst xmlns="" xmlns:p15="http://schemas.microsoft.com/office/powerpoint/2012/main">
+      <p15:sldGuideLst xmlns:p15="http://schemas.microsoft.com/office/powerpoint/2012/main">
         <p15:guide id="1" orient="horz" pos="2160">
           <p15:clr>
             <a:srgbClr val="A4A3A4"/>
@@ -422,7 +442,7 @@
           <a:p>
             <a:fld id="{3E86CC0F-BBF3-4E07-94E0-0549B7D560A9}" type="datetimeFigureOut">
               <a:rPr lang="en-SG" smtClean="0"/>
-              <a:t>2/4/2014</a:t>
+              <a:t>18/7/2014</a:t>
             </a:fld>
             <a:endParaRPr lang="en-SG"/>
           </a:p>
@@ -1106,6 +1126,279 @@
 </p:notes>
 </file>
 
+<file path=ppt/notesSlides/notesSlide5.xml><?xml version="1.0" encoding="utf-8"?>
+<p:notes xmlns:a="http://schemas.openxmlformats.org/drawingml/2006/main" xmlns:r="http://schemas.openxmlformats.org/officeDocument/2006/relationships" xmlns:p="http://schemas.openxmlformats.org/presentationml/2006/main">
+  <p:cSld>
+    <p:spTree>
+      <p:nvGrpSpPr>
+        <p:cNvPr id="1" name=""/>
+        <p:cNvGrpSpPr/>
+        <p:nvPr/>
+      </p:nvGrpSpPr>
+      <p:grpSpPr>
+        <a:xfrm>
+          <a:off x="0" y="0"/>
+          <a:ext cx="0" cy="0"/>
+          <a:chOff x="0" y="0"/>
+          <a:chExt cx="0" cy="0"/>
+        </a:xfrm>
+      </p:grpSpPr>
+      <p:sp>
+        <p:nvSpPr>
+          <p:cNvPr id="2" name="Slide Image Placeholder 1"/>
+          <p:cNvSpPr>
+            <a:spLocks noGrp="1" noRot="1" noChangeAspect="1"/>
+          </p:cNvSpPr>
+          <p:nvPr>
+            <p:ph type="sldImg"/>
+          </p:nvPr>
+        </p:nvSpPr>
+        <p:spPr/>
+      </p:sp>
+      <p:sp>
+        <p:nvSpPr>
+          <p:cNvPr id="3" name="Notes Placeholder 2"/>
+          <p:cNvSpPr>
+            <a:spLocks noGrp="1"/>
+          </p:cNvSpPr>
+          <p:nvPr>
+            <p:ph type="body" idx="1"/>
+          </p:nvPr>
+        </p:nvSpPr>
+        <p:spPr/>
+        <p:txBody>
+          <a:bodyPr/>
+          <a:lstStyle/>
+          <a:p>
+            <a:r>
+              <a:rPr lang="en-US" altLang="zh-CN" dirty="0" smtClean="0"/>
+              <a:t>This will</a:t>
+            </a:r>
+            <a:r>
+              <a:rPr lang="en-US" altLang="zh-CN" baseline="0" dirty="0" smtClean="0"/>
+              <a:t> play at the beginning.</a:t>
+            </a:r>
+          </a:p>
+          <a:p>
+            <a:r>
+              <a:rPr lang="en-US" altLang="zh-CN" baseline="0" dirty="0" smtClean="0"/>
+              <a:t>[</a:t>
+            </a:r>
+            <a:r>
+              <a:rPr lang="en-US" altLang="zh-CN" baseline="0" dirty="0" err="1" smtClean="0"/>
+              <a:t>afterClick</a:t>
+            </a:r>
+            <a:r>
+              <a:rPr lang="en-US" altLang="zh-CN" baseline="0" dirty="0" smtClean="0"/>
+              <a:t>] This will play after you click.</a:t>
+            </a:r>
+          </a:p>
+        </p:txBody>
+      </p:sp>
+      <p:sp>
+        <p:nvSpPr>
+          <p:cNvPr id="4" name="Slide Number Placeholder 3"/>
+          <p:cNvSpPr>
+            <a:spLocks noGrp="1"/>
+          </p:cNvSpPr>
+          <p:nvPr>
+            <p:ph type="sldNum" sz="quarter" idx="10"/>
+          </p:nvPr>
+        </p:nvSpPr>
+        <p:spPr/>
+        <p:txBody>
+          <a:bodyPr/>
+          <a:lstStyle/>
+          <a:p>
+            <a:fld id="{0015B511-83B7-463E-ACD1-0C1C081EBBC4}" type="slidenum">
+              <a:rPr lang="en-SG" smtClean="0"/>
+              <a:t>26</a:t>
+            </a:fld>
+            <a:endParaRPr lang="en-SG"/>
+          </a:p>
+        </p:txBody>
+      </p:sp>
+    </p:spTree>
+    <p:extLst>
+      <p:ext uri="{BB962C8B-B14F-4D97-AF65-F5344CB8AC3E}">
+        <p14:creationId xmlns:p14="http://schemas.microsoft.com/office/powerpoint/2010/main" val="2911926025"/>
+      </p:ext>
+    </p:extLst>
+  </p:cSld>
+  <p:clrMapOvr>
+    <a:masterClrMapping/>
+  </p:clrMapOvr>
+</p:notes>
+</file>
+
+<file path=ppt/notesSlides/notesSlide6.xml><?xml version="1.0" encoding="utf-8"?>
+<p:notes xmlns:a="http://schemas.openxmlformats.org/drawingml/2006/main" xmlns:r="http://schemas.openxmlformats.org/officeDocument/2006/relationships" xmlns:p="http://schemas.openxmlformats.org/presentationml/2006/main">
+  <p:cSld>
+    <p:spTree>
+      <p:nvGrpSpPr>
+        <p:cNvPr id="1" name=""/>
+        <p:cNvGrpSpPr/>
+        <p:nvPr/>
+      </p:nvGrpSpPr>
+      <p:grpSpPr>
+        <a:xfrm>
+          <a:off x="0" y="0"/>
+          <a:ext cx="0" cy="0"/>
+          <a:chOff x="0" y="0"/>
+          <a:chExt cx="0" cy="0"/>
+        </a:xfrm>
+      </p:grpSpPr>
+      <p:sp>
+        <p:nvSpPr>
+          <p:cNvPr id="2" name="Slide Image Placeholder 1"/>
+          <p:cNvSpPr>
+            <a:spLocks noGrp="1" noRot="1" noChangeAspect="1"/>
+          </p:cNvSpPr>
+          <p:nvPr>
+            <p:ph type="sldImg"/>
+          </p:nvPr>
+        </p:nvSpPr>
+        <p:spPr/>
+      </p:sp>
+      <p:sp>
+        <p:nvSpPr>
+          <p:cNvPr id="3" name="Notes Placeholder 2"/>
+          <p:cNvSpPr>
+            <a:spLocks noGrp="1"/>
+          </p:cNvSpPr>
+          <p:nvPr>
+            <p:ph type="body" idx="1"/>
+          </p:nvPr>
+        </p:nvSpPr>
+        <p:spPr/>
+        <p:txBody>
+          <a:bodyPr/>
+          <a:lstStyle/>
+          <a:p>
+            <a:endParaRPr lang="en-SG" dirty="0"/>
+          </a:p>
+        </p:txBody>
+      </p:sp>
+      <p:sp>
+        <p:nvSpPr>
+          <p:cNvPr id="4" name="Slide Number Placeholder 3"/>
+          <p:cNvSpPr>
+            <a:spLocks noGrp="1"/>
+          </p:cNvSpPr>
+          <p:nvPr>
+            <p:ph type="sldNum" sz="quarter" idx="10"/>
+          </p:nvPr>
+        </p:nvSpPr>
+        <p:spPr/>
+        <p:txBody>
+          <a:bodyPr/>
+          <a:lstStyle/>
+          <a:p>
+            <a:fld id="{0015B511-83B7-463E-ACD1-0C1C081EBBC4}" type="slidenum">
+              <a:rPr lang="en-SG" smtClean="0"/>
+              <a:t>28</a:t>
+            </a:fld>
+            <a:endParaRPr lang="en-SG"/>
+          </a:p>
+        </p:txBody>
+      </p:sp>
+    </p:spTree>
+    <p:extLst>
+      <p:ext uri="{BB962C8B-B14F-4D97-AF65-F5344CB8AC3E}">
+        <p14:creationId xmlns:p14="http://schemas.microsoft.com/office/powerpoint/2010/main" val="2803535550"/>
+      </p:ext>
+    </p:extLst>
+  </p:cSld>
+  <p:clrMapOvr>
+    <a:masterClrMapping/>
+  </p:clrMapOvr>
+</p:notes>
+</file>
+
+<file path=ppt/notesSlides/notesSlide7.xml><?xml version="1.0" encoding="utf-8"?>
+<p:notes xmlns:a="http://schemas.openxmlformats.org/drawingml/2006/main" xmlns:r="http://schemas.openxmlformats.org/officeDocument/2006/relationships" xmlns:p="http://schemas.openxmlformats.org/presentationml/2006/main">
+  <p:cSld>
+    <p:spTree>
+      <p:nvGrpSpPr>
+        <p:cNvPr id="1" name=""/>
+        <p:cNvGrpSpPr/>
+        <p:nvPr/>
+      </p:nvGrpSpPr>
+      <p:grpSpPr>
+        <a:xfrm>
+          <a:off x="0" y="0"/>
+          <a:ext cx="0" cy="0"/>
+          <a:chOff x="0" y="0"/>
+          <a:chExt cx="0" cy="0"/>
+        </a:xfrm>
+      </p:grpSpPr>
+      <p:sp>
+        <p:nvSpPr>
+          <p:cNvPr id="2" name="Slide Image Placeholder 1"/>
+          <p:cNvSpPr>
+            <a:spLocks noGrp="1" noRot="1" noChangeAspect="1"/>
+          </p:cNvSpPr>
+          <p:nvPr>
+            <p:ph type="sldImg"/>
+          </p:nvPr>
+        </p:nvSpPr>
+        <p:spPr/>
+      </p:sp>
+      <p:sp>
+        <p:nvSpPr>
+          <p:cNvPr id="3" name="Notes Placeholder 2"/>
+          <p:cNvSpPr>
+            <a:spLocks noGrp="1"/>
+          </p:cNvSpPr>
+          <p:nvPr>
+            <p:ph type="body" idx="1"/>
+          </p:nvPr>
+        </p:nvSpPr>
+        <p:spPr/>
+        <p:txBody>
+          <a:bodyPr/>
+          <a:lstStyle/>
+          <a:p>
+            <a:endParaRPr lang="en-SG" dirty="0"/>
+          </a:p>
+        </p:txBody>
+      </p:sp>
+      <p:sp>
+        <p:nvSpPr>
+          <p:cNvPr id="4" name="Slide Number Placeholder 3"/>
+          <p:cNvSpPr>
+            <a:spLocks noGrp="1"/>
+          </p:cNvSpPr>
+          <p:nvPr>
+            <p:ph type="sldNum" sz="quarter" idx="10"/>
+          </p:nvPr>
+        </p:nvSpPr>
+        <p:spPr/>
+        <p:txBody>
+          <a:bodyPr/>
+          <a:lstStyle/>
+          <a:p>
+            <a:fld id="{0015B511-83B7-463E-ACD1-0C1C081EBBC4}" type="slidenum">
+              <a:rPr lang="en-SG" smtClean="0"/>
+              <a:t>29</a:t>
+            </a:fld>
+            <a:endParaRPr lang="en-SG"/>
+          </a:p>
+        </p:txBody>
+      </p:sp>
+    </p:spTree>
+    <p:extLst>
+      <p:ext uri="{BB962C8B-B14F-4D97-AF65-F5344CB8AC3E}">
+        <p14:creationId xmlns:p14="http://schemas.microsoft.com/office/powerpoint/2010/main" val="1473495396"/>
+      </p:ext>
+    </p:extLst>
+  </p:cSld>
+  <p:clrMapOvr>
+    <a:masterClrMapping/>
+  </p:clrMapOvr>
+</p:notes>
+</file>
+
 <file path=ppt/slideLayouts/slideLayout1.xml><?xml version="1.0" encoding="utf-8"?>
 <p:sldLayout xmlns:a="http://schemas.openxmlformats.org/drawingml/2006/main" xmlns:r="http://schemas.openxmlformats.org/officeDocument/2006/relationships" xmlns:p="http://schemas.openxmlformats.org/presentationml/2006/main" type="title" preserve="1">
   <p:cSld name="Title Slide">
@@ -1288,7 +1581,7 @@
             <a:fld id="{1D8BD707-D9CF-40AE-B4C6-C98DA3205C09}" type="datetimeFigureOut">
               <a:rPr lang="en-US" smtClean="0"/>
               <a:pPr/>
-              <a:t>4/2/2014</a:t>
+              <a:t>7/18/2014</a:t>
             </a:fld>
             <a:endParaRPr lang="en-US"/>
           </a:p>
@@ -1455,7 +1748,7 @@
             <a:fld id="{1D8BD707-D9CF-40AE-B4C6-C98DA3205C09}" type="datetimeFigureOut">
               <a:rPr lang="en-US" smtClean="0"/>
               <a:pPr/>
-              <a:t>4/2/2014</a:t>
+              <a:t>7/18/2014</a:t>
             </a:fld>
             <a:endParaRPr lang="en-US"/>
           </a:p>
@@ -1632,7 +1925,7 @@
             <a:fld id="{1D8BD707-D9CF-40AE-B4C6-C98DA3205C09}" type="datetimeFigureOut">
               <a:rPr lang="en-US" smtClean="0"/>
               <a:pPr/>
-              <a:t>4/2/2014</a:t>
+              <a:t>7/18/2014</a:t>
             </a:fld>
             <a:endParaRPr lang="en-US"/>
           </a:p>
@@ -1799,7 +2092,7 @@
             <a:fld id="{1D8BD707-D9CF-40AE-B4C6-C98DA3205C09}" type="datetimeFigureOut">
               <a:rPr lang="en-US" smtClean="0"/>
               <a:pPr/>
-              <a:t>4/2/2014</a:t>
+              <a:t>7/18/2014</a:t>
             </a:fld>
             <a:endParaRPr lang="en-US"/>
           </a:p>
@@ -2042,7 +2335,7 @@
             <a:fld id="{1D8BD707-D9CF-40AE-B4C6-C98DA3205C09}" type="datetimeFigureOut">
               <a:rPr lang="en-US" smtClean="0"/>
               <a:pPr/>
-              <a:t>4/2/2014</a:t>
+              <a:t>7/18/2014</a:t>
             </a:fld>
             <a:endParaRPr lang="en-US"/>
           </a:p>
@@ -2327,7 +2620,7 @@
             <a:fld id="{1D8BD707-D9CF-40AE-B4C6-C98DA3205C09}" type="datetimeFigureOut">
               <a:rPr lang="en-US" smtClean="0"/>
               <a:pPr/>
-              <a:t>4/2/2014</a:t>
+              <a:t>7/18/2014</a:t>
             </a:fld>
             <a:endParaRPr lang="en-US"/>
           </a:p>
@@ -2746,7 +3039,7 @@
             <a:fld id="{1D8BD707-D9CF-40AE-B4C6-C98DA3205C09}" type="datetimeFigureOut">
               <a:rPr lang="en-US" smtClean="0"/>
               <a:pPr/>
-              <a:t>4/2/2014</a:t>
+              <a:t>7/18/2014</a:t>
             </a:fld>
             <a:endParaRPr lang="en-US"/>
           </a:p>
@@ -2861,7 +3154,7 @@
             <a:fld id="{1D8BD707-D9CF-40AE-B4C6-C98DA3205C09}" type="datetimeFigureOut">
               <a:rPr lang="en-US" smtClean="0"/>
               <a:pPr/>
-              <a:t>4/2/2014</a:t>
+              <a:t>7/18/2014</a:t>
             </a:fld>
             <a:endParaRPr lang="en-US"/>
           </a:p>
@@ -2953,7 +3246,7 @@
             <a:fld id="{1D8BD707-D9CF-40AE-B4C6-C98DA3205C09}" type="datetimeFigureOut">
               <a:rPr lang="en-US" smtClean="0"/>
               <a:pPr/>
-              <a:t>4/2/2014</a:t>
+              <a:t>7/18/2014</a:t>
             </a:fld>
             <a:endParaRPr lang="en-US"/>
           </a:p>
@@ -3227,7 +3520,7 @@
             <a:fld id="{1D8BD707-D9CF-40AE-B4C6-C98DA3205C09}" type="datetimeFigureOut">
               <a:rPr lang="en-US" smtClean="0"/>
               <a:pPr/>
-              <a:t>4/2/2014</a:t>
+              <a:t>7/18/2014</a:t>
             </a:fld>
             <a:endParaRPr lang="en-US"/>
           </a:p>
@@ -3477,7 +3770,7 @@
             <a:fld id="{1D8BD707-D9CF-40AE-B4C6-C98DA3205C09}" type="datetimeFigureOut">
               <a:rPr lang="en-US" smtClean="0"/>
               <a:pPr/>
-              <a:t>4/2/2014</a:t>
+              <a:t>7/18/2014</a:t>
             </a:fld>
             <a:endParaRPr lang="en-US"/>
           </a:p>
@@ -3687,7 +3980,7 @@
             <a:fld id="{1D8BD707-D9CF-40AE-B4C6-C98DA3205C09}" type="datetimeFigureOut">
               <a:rPr lang="en-US" smtClean="0"/>
               <a:pPr/>
-              <a:t>4/2/2014</a:t>
+              <a:t>7/18/2014</a:t>
             </a:fld>
             <a:endParaRPr lang="en-US"/>
           </a:p>
@@ -7019,7 +7312,17 @@
                   </a:schemeClr>
                 </a:solidFill>
               </a:rPr>
-              <a:t> Select the four blue circles in any </a:t>
+              <a:t> Select the four blue circles in any order (</a:t>
+            </a:r>
+            <a:r>
+              <a:rPr lang="en-US" dirty="0" err="1" smtClean="0">
+                <a:solidFill>
+                  <a:schemeClr val="accent6">
+                    <a:lumMod val="75000"/>
+                  </a:schemeClr>
+                </a:solidFill>
+              </a:rPr>
+              <a:t>Ctrl+click</a:t>
             </a:r>
             <a:r>
               <a:rPr lang="en-US" dirty="0" smtClean="0">
@@ -7029,37 +7332,7 @@
                   </a:schemeClr>
                 </a:solidFill>
               </a:rPr>
-              <a:t>order (</a:t>
-            </a:r>
-            <a:r>
-              <a:rPr lang="en-US" dirty="0" err="1" smtClean="0">
-                <a:solidFill>
-                  <a:schemeClr val="accent6">
-                    <a:lumMod val="75000"/>
-                  </a:schemeClr>
-                </a:solidFill>
-              </a:rPr>
-              <a:t>Ctrl+click</a:t>
-            </a:r>
-            <a:r>
-              <a:rPr lang="en-US" dirty="0" smtClean="0">
-                <a:solidFill>
-                  <a:schemeClr val="accent6">
-                    <a:lumMod val="75000"/>
-                  </a:schemeClr>
-                </a:solidFill>
-              </a:rPr>
-              <a:t>) </a:t>
-            </a:r>
-            <a:r>
-              <a:rPr lang="en-US" dirty="0" smtClean="0">
-                <a:solidFill>
-                  <a:schemeClr val="accent6">
-                    <a:lumMod val="75000"/>
-                  </a:schemeClr>
-                </a:solidFill>
-              </a:rPr>
-              <a:t>and click  the            button.</a:t>
+              <a:t>) and click  the            button.</a:t>
             </a:r>
             <a:endParaRPr lang="en-SG" dirty="0">
               <a:solidFill>
@@ -12387,17 +12660,7 @@
                   </a:schemeClr>
                 </a:solidFill>
               </a:rPr>
-              <a:t>effect generated. This effect can be used to indicate that you are stepping back to take a look at where the details you have been discussing fit into the </a:t>
-            </a:r>
-            <a:r>
-              <a:rPr lang="en-US" dirty="0" smtClean="0">
-                <a:solidFill>
-                  <a:schemeClr val="accent6">
-                    <a:lumMod val="75000"/>
-                  </a:schemeClr>
-                </a:solidFill>
-              </a:rPr>
-              <a:t>‘big picture’.</a:t>
+              <a:t>effect generated. This effect can be used to indicate that you are stepping back to take a look at where the details you have been discussing fit into the ‘big picture’.</a:t>
             </a:r>
             <a:endParaRPr lang="en-SG" dirty="0">
               <a:solidFill>
@@ -14379,7 +14642,7 @@
       </p:grpSpPr>
       <p:sp>
         <p:nvSpPr>
-          <p:cNvPr id="7" name="TextBox 6"/>
+          <p:cNvPr id="7" name="[TextBox 6]"/>
           <p:cNvSpPr txBox="1"/>
           <p:nvPr/>
         </p:nvSpPr>
@@ -14488,7 +14751,7 @@
       </p:sp>
       <p:pic>
         <p:nvPicPr>
-          <p:cNvPr id="2050" name="Picture 2"/>
+          <p:cNvPr id="2050" name="[Picture 2]"/>
           <p:cNvPicPr>
             <a:picLocks noChangeAspect="1" noChangeArrowheads="1"/>
           </p:cNvPicPr>
@@ -14539,7 +14802,7 @@
       </p:pic>
       <p:pic>
         <p:nvPicPr>
-          <p:cNvPr id="2051" name="Picture 3"/>
+          <p:cNvPr id="2051" name="[Picture 3]"/>
           <p:cNvPicPr>
             <a:picLocks noChangeAspect="1" noChangeArrowheads="1"/>
           </p:cNvPicPr>
@@ -14593,7 +14856,7 @@
       </p:pic>
       <p:sp>
         <p:nvSpPr>
-          <p:cNvPr id="14" name="TextBox 13"/>
+          <p:cNvPr id="14" name="[TextBox 13]"/>
           <p:cNvSpPr txBox="1"/>
           <p:nvPr/>
         </p:nvSpPr>
@@ -14702,7 +14965,7 @@
       </p:sp>
       <p:pic>
         <p:nvPicPr>
-          <p:cNvPr id="2052" name="Picture 4"/>
+          <p:cNvPr id="2052" name="[Picture 4]"/>
           <p:cNvPicPr>
             <a:picLocks noChangeAspect="1" noChangeArrowheads="1"/>
           </p:cNvPicPr>
@@ -14790,6 +15053,3798 @@
       </p:grpSpPr>
       <p:sp>
         <p:nvSpPr>
+          <p:cNvPr id="4" name="[TextBox 6]"/>
+          <p:cNvSpPr txBox="1"/>
+          <p:nvPr/>
+        </p:nvSpPr>
+        <p:spPr>
+          <a:xfrm>
+            <a:off x="685800" y="1044410"/>
+            <a:ext cx="5105400" cy="2462213"/>
+          </a:xfrm>
+          <a:prstGeom prst="rect">
+            <a:avLst/>
+          </a:prstGeom>
+          <a:noFill/>
+        </p:spPr>
+        <p:txBody>
+          <a:bodyPr wrap="square" rtlCol="0">
+            <a:spAutoFit/>
+          </a:bodyPr>
+          <a:lstStyle/>
+          <a:p>
+            <a:r>
+              <a:rPr lang="en-US" sz="2800" b="1" dirty="0" smtClean="0">
+                <a:solidFill>
+                  <a:schemeClr val="accent6">
+                    <a:lumMod val="75000"/>
+                  </a:schemeClr>
+                </a:solidFill>
+              </a:rPr>
+              <a:t>3.</a:t>
+            </a:r>
+            <a:r>
+              <a:rPr lang="en-US" dirty="0" smtClean="0">
+                <a:solidFill>
+                  <a:schemeClr val="accent6">
+                    <a:lumMod val="75000"/>
+                  </a:schemeClr>
+                </a:solidFill>
+              </a:rPr>
+              <a:t> To record an audio, click the drop down menu </a:t>
+            </a:r>
+          </a:p>
+          <a:p>
+            <a:endParaRPr lang="en-US" dirty="0">
+              <a:solidFill>
+                <a:schemeClr val="accent6">
+                  <a:lumMod val="75000"/>
+                </a:schemeClr>
+              </a:solidFill>
+            </a:endParaRPr>
+          </a:p>
+          <a:p>
+            <a:r>
+              <a:rPr lang="en-US" dirty="0" smtClean="0">
+                <a:solidFill>
+                  <a:schemeClr val="accent6">
+                    <a:lumMod val="75000"/>
+                  </a:schemeClr>
+                </a:solidFill>
+              </a:rPr>
+              <a:t>of                 button. </a:t>
+            </a:r>
+          </a:p>
+          <a:p>
+            <a:r>
+              <a:rPr lang="en-US" dirty="0" smtClean="0">
+                <a:solidFill>
+                  <a:schemeClr val="accent6">
+                    <a:lumMod val="75000"/>
+                  </a:schemeClr>
+                </a:solidFill>
+              </a:rPr>
+              <a:t/>
+            </a:r>
+            <a:br>
+              <a:rPr lang="en-US" dirty="0" smtClean="0">
+                <a:solidFill>
+                  <a:schemeClr val="accent6">
+                    <a:lumMod val="75000"/>
+                  </a:schemeClr>
+                </a:solidFill>
+              </a:rPr>
+            </a:br>
+            <a:r>
+              <a:rPr lang="en-US" dirty="0" smtClean="0">
+                <a:solidFill>
+                  <a:schemeClr val="accent6">
+                    <a:lumMod val="75000"/>
+                  </a:schemeClr>
+                </a:solidFill>
+              </a:rPr>
+              <a:t/>
+            </a:r>
+            <a:br>
+              <a:rPr lang="en-US" dirty="0" smtClean="0">
+                <a:solidFill>
+                  <a:schemeClr val="accent6">
+                    <a:lumMod val="75000"/>
+                  </a:schemeClr>
+                </a:solidFill>
+              </a:rPr>
+            </a:br>
+            <a:r>
+              <a:rPr lang="en-US" dirty="0" smtClean="0">
+                <a:solidFill>
+                  <a:schemeClr val="accent6">
+                    <a:lumMod val="75000"/>
+                  </a:schemeClr>
+                </a:solidFill>
+              </a:rPr>
+              <a:t>It will show Recorder Script Panel at right side of your screen, showing the recording status of the scripts of current slide.</a:t>
+            </a:r>
+            <a:endParaRPr lang="en-SG" dirty="0">
+              <a:solidFill>
+                <a:schemeClr val="accent6">
+                  <a:lumMod val="75000"/>
+                </a:schemeClr>
+              </a:solidFill>
+            </a:endParaRPr>
+          </a:p>
+        </p:txBody>
+      </p:sp>
+      <p:sp>
+        <p:nvSpPr>
+          <p:cNvPr id="7" name="[Picture 3]"/>
+          <p:cNvSpPr txBox="1"/>
+          <p:nvPr/>
+        </p:nvSpPr>
+        <p:spPr>
+          <a:xfrm>
+            <a:off x="685800" y="4038600"/>
+            <a:ext cx="4800600" cy="2462213"/>
+          </a:xfrm>
+          <a:prstGeom prst="rect">
+            <a:avLst/>
+          </a:prstGeom>
+          <a:noFill/>
+        </p:spPr>
+        <p:txBody>
+          <a:bodyPr wrap="square" rtlCol="0">
+            <a:spAutoFit/>
+          </a:bodyPr>
+          <a:lstStyle/>
+          <a:p>
+            <a:r>
+              <a:rPr lang="en-US" sz="2800" b="1" dirty="0" smtClean="0">
+                <a:solidFill>
+                  <a:schemeClr val="accent6">
+                    <a:lumMod val="75000"/>
+                  </a:schemeClr>
+                </a:solidFill>
+              </a:rPr>
+              <a:t>4.</a:t>
+            </a:r>
+            <a:r>
+              <a:rPr lang="en-US" dirty="0" smtClean="0">
+                <a:solidFill>
+                  <a:schemeClr val="accent6">
+                    <a:lumMod val="75000"/>
+                  </a:schemeClr>
+                </a:solidFill>
+              </a:rPr>
+              <a:t> Click on the script you want to record and </a:t>
+            </a:r>
+          </a:p>
+          <a:p>
+            <a:endParaRPr lang="en-US" dirty="0">
+              <a:solidFill>
+                <a:schemeClr val="accent6">
+                  <a:lumMod val="75000"/>
+                </a:schemeClr>
+              </a:solidFill>
+            </a:endParaRPr>
+          </a:p>
+          <a:p>
+            <a:r>
+              <a:rPr lang="en-US" dirty="0" smtClean="0">
+                <a:solidFill>
+                  <a:schemeClr val="accent6">
+                    <a:lumMod val="75000"/>
+                  </a:schemeClr>
+                </a:solidFill>
+              </a:rPr>
+              <a:t>click           button to start recording. When you </a:t>
+            </a:r>
+          </a:p>
+          <a:p>
+            <a:endParaRPr lang="en-US" dirty="0">
+              <a:solidFill>
+                <a:schemeClr val="accent6">
+                  <a:lumMod val="75000"/>
+                </a:schemeClr>
+              </a:solidFill>
+            </a:endParaRPr>
+          </a:p>
+          <a:p>
+            <a:r>
+              <a:rPr lang="en-US" dirty="0" smtClean="0">
+                <a:solidFill>
+                  <a:schemeClr val="accent6">
+                    <a:lumMod val="75000"/>
+                  </a:schemeClr>
+                </a:solidFill>
+              </a:rPr>
+              <a:t>click          button, the record will be auto-</a:t>
+            </a:r>
+          </a:p>
+          <a:p>
+            <a:endParaRPr lang="en-US" dirty="0">
+              <a:solidFill>
+                <a:schemeClr val="accent6">
+                  <a:lumMod val="75000"/>
+                </a:schemeClr>
+              </a:solidFill>
+            </a:endParaRPr>
+          </a:p>
+          <a:p>
+            <a:r>
+              <a:rPr lang="en-US" dirty="0" smtClean="0">
+                <a:solidFill>
+                  <a:schemeClr val="accent6">
+                    <a:lumMod val="75000"/>
+                  </a:schemeClr>
+                </a:solidFill>
+              </a:rPr>
+              <a:t>embedded on the slide, and you can check it in the panel.</a:t>
+            </a:r>
+            <a:endParaRPr lang="en-SG" dirty="0">
+              <a:solidFill>
+                <a:schemeClr val="accent6">
+                  <a:lumMod val="75000"/>
+                </a:schemeClr>
+              </a:solidFill>
+            </a:endParaRPr>
+          </a:p>
+        </p:txBody>
+      </p:sp>
+      <p:pic>
+        <p:nvPicPr>
+          <p:cNvPr id="9" name="Picture 8"/>
+          <p:cNvPicPr>
+            <a:picLocks noChangeAspect="1"/>
+          </p:cNvPicPr>
+          <p:nvPr/>
+        </p:nvPicPr>
+        <p:blipFill rotWithShape="1">
+          <a:blip r:embed="rId3"/>
+          <a:srcRect l="11111" t="7310"/>
+          <a:stretch/>
+        </p:blipFill>
+        <p:spPr>
+          <a:xfrm>
+            <a:off x="1143000" y="1447800"/>
+            <a:ext cx="609600" cy="966216"/>
+          </a:xfrm>
+          <a:prstGeom prst="rect">
+            <a:avLst/>
+          </a:prstGeom>
+        </p:spPr>
+      </p:pic>
+      <p:pic>
+        <p:nvPicPr>
+          <p:cNvPr id="14" name="Picture 13"/>
+          <p:cNvPicPr>
+            <a:picLocks noChangeAspect="1"/>
+          </p:cNvPicPr>
+          <p:nvPr/>
+        </p:nvPicPr>
+        <p:blipFill rotWithShape="1">
+          <a:blip r:embed="rId4"/>
+          <a:srcRect b="1229"/>
+          <a:stretch/>
+        </p:blipFill>
+        <p:spPr>
+          <a:xfrm>
+            <a:off x="5730854" y="252984"/>
+            <a:ext cx="3184546" cy="6376416"/>
+          </a:xfrm>
+          <a:prstGeom prst="rect">
+            <a:avLst/>
+          </a:prstGeom>
+        </p:spPr>
+      </p:pic>
+      <p:pic>
+        <p:nvPicPr>
+          <p:cNvPr id="16" name="Picture 15"/>
+          <p:cNvPicPr>
+            <a:picLocks noChangeAspect="1"/>
+          </p:cNvPicPr>
+          <p:nvPr/>
+        </p:nvPicPr>
+        <p:blipFill>
+          <a:blip r:embed="rId5">
+            <a:extLst>
+              <a:ext uri="{28A0092B-C50C-407E-A947-70E740481C1C}">
+                <a14:useLocalDpi xmlns:a14="http://schemas.microsoft.com/office/drawing/2010/main" val="0"/>
+              </a:ext>
+            </a:extLst>
+          </a:blip>
+          <a:stretch>
+            <a:fillRect/>
+          </a:stretch>
+        </p:blipFill>
+        <p:spPr>
+          <a:xfrm>
+            <a:off x="1244625" y="4724400"/>
+            <a:ext cx="406349" cy="406349"/>
+          </a:xfrm>
+          <a:prstGeom prst="rect">
+            <a:avLst/>
+          </a:prstGeom>
+        </p:spPr>
+      </p:pic>
+      <p:pic>
+        <p:nvPicPr>
+          <p:cNvPr id="17" name="Picture 16"/>
+          <p:cNvPicPr>
+            <a:picLocks noChangeAspect="1"/>
+          </p:cNvPicPr>
+          <p:nvPr/>
+        </p:nvPicPr>
+        <p:blipFill>
+          <a:blip r:embed="rId6">
+            <a:extLst>
+              <a:ext uri="{28A0092B-C50C-407E-A947-70E740481C1C}">
+                <a14:useLocalDpi xmlns:a14="http://schemas.microsoft.com/office/drawing/2010/main" val="0"/>
+              </a:ext>
+            </a:extLst>
+          </a:blip>
+          <a:stretch>
+            <a:fillRect/>
+          </a:stretch>
+        </p:blipFill>
+        <p:spPr>
+          <a:xfrm>
+            <a:off x="1244624" y="5289106"/>
+            <a:ext cx="406349" cy="406349"/>
+          </a:xfrm>
+          <a:prstGeom prst="rect">
+            <a:avLst/>
+          </a:prstGeom>
+        </p:spPr>
+      </p:pic>
+      <p:pic>
+        <p:nvPicPr>
+          <p:cNvPr id="20" name="Picture 19"/>
+          <p:cNvPicPr>
+            <a:picLocks noChangeAspect="1"/>
+          </p:cNvPicPr>
+          <p:nvPr/>
+        </p:nvPicPr>
+        <p:blipFill>
+          <a:blip r:embed="rId7"/>
+          <a:stretch>
+            <a:fillRect/>
+          </a:stretch>
+        </p:blipFill>
+        <p:spPr>
+          <a:xfrm>
+            <a:off x="5730854" y="252984"/>
+            <a:ext cx="3184546" cy="6445173"/>
+          </a:xfrm>
+          <a:prstGeom prst="rect">
+            <a:avLst/>
+          </a:prstGeom>
+        </p:spPr>
+      </p:pic>
+    </p:spTree>
+    <p:extLst>
+      <p:ext uri="{BB962C8B-B14F-4D97-AF65-F5344CB8AC3E}">
+        <p14:creationId xmlns:p14="http://schemas.microsoft.com/office/powerpoint/2010/main" val="1999255668"/>
+      </p:ext>
+    </p:extLst>
+  </p:cSld>
+  <p:clrMapOvr>
+    <a:masterClrMapping/>
+  </p:clrMapOvr>
+  <p:timing>
+    <p:tnLst>
+      <p:par>
+        <p:cTn id="1" dur="indefinite" restart="never" nodeType="tmRoot">
+          <p:childTnLst>
+            <p:seq concurrent="1" nextAc="seek">
+              <p:cTn id="2" dur="indefinite" nodeType="mainSeq">
+                <p:childTnLst>
+                  <p:par>
+                    <p:cTn id="3" fill="hold">
+                      <p:stCondLst>
+                        <p:cond delay="indefinite"/>
+                      </p:stCondLst>
+                      <p:childTnLst>
+                        <p:par>
+                          <p:cTn id="4" fill="hold">
+                            <p:stCondLst>
+                              <p:cond delay="0"/>
+                            </p:stCondLst>
+                            <p:childTnLst>
+                              <p:par>
+                                <p:cTn id="5" presetID="10" presetClass="entr" presetSubtype="0" fill="hold" nodeType="clickEffect">
+                                  <p:stCondLst>
+                                    <p:cond delay="0"/>
+                                  </p:stCondLst>
+                                  <p:childTnLst>
+                                    <p:set>
+                                      <p:cBhvr>
+                                        <p:cTn id="6" dur="1" fill="hold">
+                                          <p:stCondLst>
+                                            <p:cond delay="0"/>
+                                          </p:stCondLst>
+                                        </p:cTn>
+                                        <p:tgtEl>
+                                          <p:spTgt spid="9"/>
+                                        </p:tgtEl>
+                                        <p:attrNameLst>
+                                          <p:attrName>style.visibility</p:attrName>
+                                        </p:attrNameLst>
+                                      </p:cBhvr>
+                                      <p:to>
+                                        <p:strVal val="visible"/>
+                                      </p:to>
+                                    </p:set>
+                                    <p:animEffect transition="in" filter="fade">
+                                      <p:cBhvr>
+                                        <p:cTn id="7" dur="500"/>
+                                        <p:tgtEl>
+                                          <p:spTgt spid="9"/>
+                                        </p:tgtEl>
+                                      </p:cBhvr>
+                                    </p:animEffect>
+                                  </p:childTnLst>
+                                </p:cTn>
+                              </p:par>
+                              <p:par>
+                                <p:cTn id="8" presetID="10" presetClass="entr" presetSubtype="0" fill="hold" grpId="0" nodeType="withEffect">
+                                  <p:stCondLst>
+                                    <p:cond delay="0"/>
+                                  </p:stCondLst>
+                                  <p:childTnLst>
+                                    <p:set>
+                                      <p:cBhvr>
+                                        <p:cTn id="9" dur="1" fill="hold">
+                                          <p:stCondLst>
+                                            <p:cond delay="0"/>
+                                          </p:stCondLst>
+                                        </p:cTn>
+                                        <p:tgtEl>
+                                          <p:spTgt spid="4"/>
+                                        </p:tgtEl>
+                                        <p:attrNameLst>
+                                          <p:attrName>style.visibility</p:attrName>
+                                        </p:attrNameLst>
+                                      </p:cBhvr>
+                                      <p:to>
+                                        <p:strVal val="visible"/>
+                                      </p:to>
+                                    </p:set>
+                                    <p:animEffect transition="in" filter="fade">
+                                      <p:cBhvr>
+                                        <p:cTn id="10" dur="500"/>
+                                        <p:tgtEl>
+                                          <p:spTgt spid="4"/>
+                                        </p:tgtEl>
+                                      </p:cBhvr>
+                                    </p:animEffect>
+                                  </p:childTnLst>
+                                </p:cTn>
+                              </p:par>
+                              <p:par>
+                                <p:cTn id="11" presetID="10" presetClass="entr" presetSubtype="0" fill="hold" nodeType="withEffect">
+                                  <p:stCondLst>
+                                    <p:cond delay="0"/>
+                                  </p:stCondLst>
+                                  <p:childTnLst>
+                                    <p:set>
+                                      <p:cBhvr>
+                                        <p:cTn id="12" dur="1" fill="hold">
+                                          <p:stCondLst>
+                                            <p:cond delay="0"/>
+                                          </p:stCondLst>
+                                        </p:cTn>
+                                        <p:tgtEl>
+                                          <p:spTgt spid="14"/>
+                                        </p:tgtEl>
+                                        <p:attrNameLst>
+                                          <p:attrName>style.visibility</p:attrName>
+                                        </p:attrNameLst>
+                                      </p:cBhvr>
+                                      <p:to>
+                                        <p:strVal val="visible"/>
+                                      </p:to>
+                                    </p:set>
+                                    <p:animEffect transition="in" filter="fade">
+                                      <p:cBhvr>
+                                        <p:cTn id="13" dur="500"/>
+                                        <p:tgtEl>
+                                          <p:spTgt spid="14"/>
+                                        </p:tgtEl>
+                                      </p:cBhvr>
+                                    </p:animEffect>
+                                  </p:childTnLst>
+                                </p:cTn>
+                              </p:par>
+                            </p:childTnLst>
+                          </p:cTn>
+                        </p:par>
+                      </p:childTnLst>
+                    </p:cTn>
+                  </p:par>
+                  <p:par>
+                    <p:cTn id="14" fill="hold">
+                      <p:stCondLst>
+                        <p:cond delay="indefinite"/>
+                      </p:stCondLst>
+                      <p:childTnLst>
+                        <p:par>
+                          <p:cTn id="15" fill="hold">
+                            <p:stCondLst>
+                              <p:cond delay="0"/>
+                            </p:stCondLst>
+                            <p:childTnLst>
+                              <p:par>
+                                <p:cTn id="16" presetID="10" presetClass="entr" presetSubtype="0" fill="hold" grpId="0" nodeType="clickEffect">
+                                  <p:stCondLst>
+                                    <p:cond delay="0"/>
+                                  </p:stCondLst>
+                                  <p:childTnLst>
+                                    <p:set>
+                                      <p:cBhvr>
+                                        <p:cTn id="17" dur="1" fill="hold">
+                                          <p:stCondLst>
+                                            <p:cond delay="0"/>
+                                          </p:stCondLst>
+                                        </p:cTn>
+                                        <p:tgtEl>
+                                          <p:spTgt spid="7"/>
+                                        </p:tgtEl>
+                                        <p:attrNameLst>
+                                          <p:attrName>style.visibility</p:attrName>
+                                        </p:attrNameLst>
+                                      </p:cBhvr>
+                                      <p:to>
+                                        <p:strVal val="visible"/>
+                                      </p:to>
+                                    </p:set>
+                                    <p:animEffect transition="in" filter="fade">
+                                      <p:cBhvr>
+                                        <p:cTn id="18" dur="500"/>
+                                        <p:tgtEl>
+                                          <p:spTgt spid="7"/>
+                                        </p:tgtEl>
+                                      </p:cBhvr>
+                                    </p:animEffect>
+                                  </p:childTnLst>
+                                </p:cTn>
+                              </p:par>
+                              <p:par>
+                                <p:cTn id="19" presetID="10" presetClass="entr" presetSubtype="0" fill="hold" nodeType="withEffect">
+                                  <p:stCondLst>
+                                    <p:cond delay="0"/>
+                                  </p:stCondLst>
+                                  <p:childTnLst>
+                                    <p:set>
+                                      <p:cBhvr>
+                                        <p:cTn id="20" dur="1" fill="hold">
+                                          <p:stCondLst>
+                                            <p:cond delay="0"/>
+                                          </p:stCondLst>
+                                        </p:cTn>
+                                        <p:tgtEl>
+                                          <p:spTgt spid="16"/>
+                                        </p:tgtEl>
+                                        <p:attrNameLst>
+                                          <p:attrName>style.visibility</p:attrName>
+                                        </p:attrNameLst>
+                                      </p:cBhvr>
+                                      <p:to>
+                                        <p:strVal val="visible"/>
+                                      </p:to>
+                                    </p:set>
+                                    <p:animEffect transition="in" filter="fade">
+                                      <p:cBhvr>
+                                        <p:cTn id="21" dur="500"/>
+                                        <p:tgtEl>
+                                          <p:spTgt spid="16"/>
+                                        </p:tgtEl>
+                                      </p:cBhvr>
+                                    </p:animEffect>
+                                  </p:childTnLst>
+                                </p:cTn>
+                              </p:par>
+                              <p:par>
+                                <p:cTn id="22" presetID="10" presetClass="entr" presetSubtype="0" fill="hold" nodeType="withEffect">
+                                  <p:stCondLst>
+                                    <p:cond delay="0"/>
+                                  </p:stCondLst>
+                                  <p:childTnLst>
+                                    <p:set>
+                                      <p:cBhvr>
+                                        <p:cTn id="23" dur="1" fill="hold">
+                                          <p:stCondLst>
+                                            <p:cond delay="0"/>
+                                          </p:stCondLst>
+                                        </p:cTn>
+                                        <p:tgtEl>
+                                          <p:spTgt spid="17"/>
+                                        </p:tgtEl>
+                                        <p:attrNameLst>
+                                          <p:attrName>style.visibility</p:attrName>
+                                        </p:attrNameLst>
+                                      </p:cBhvr>
+                                      <p:to>
+                                        <p:strVal val="visible"/>
+                                      </p:to>
+                                    </p:set>
+                                    <p:animEffect transition="in" filter="fade">
+                                      <p:cBhvr>
+                                        <p:cTn id="24" dur="500"/>
+                                        <p:tgtEl>
+                                          <p:spTgt spid="17"/>
+                                        </p:tgtEl>
+                                      </p:cBhvr>
+                                    </p:animEffect>
+                                  </p:childTnLst>
+                                </p:cTn>
+                              </p:par>
+                              <p:par>
+                                <p:cTn id="25" presetID="10" presetClass="entr" presetSubtype="0" fill="hold" nodeType="withEffect">
+                                  <p:stCondLst>
+                                    <p:cond delay="0"/>
+                                  </p:stCondLst>
+                                  <p:childTnLst>
+                                    <p:set>
+                                      <p:cBhvr>
+                                        <p:cTn id="26" dur="1" fill="hold">
+                                          <p:stCondLst>
+                                            <p:cond delay="0"/>
+                                          </p:stCondLst>
+                                        </p:cTn>
+                                        <p:tgtEl>
+                                          <p:spTgt spid="20"/>
+                                        </p:tgtEl>
+                                        <p:attrNameLst>
+                                          <p:attrName>style.visibility</p:attrName>
+                                        </p:attrNameLst>
+                                      </p:cBhvr>
+                                      <p:to>
+                                        <p:strVal val="visible"/>
+                                      </p:to>
+                                    </p:set>
+                                    <p:animEffect transition="in" filter="fade">
+                                      <p:cBhvr>
+                                        <p:cTn id="27" dur="500"/>
+                                        <p:tgtEl>
+                                          <p:spTgt spid="20"/>
+                                        </p:tgtEl>
+                                      </p:cBhvr>
+                                    </p:animEffect>
+                                  </p:childTnLst>
+                                </p:cTn>
+                              </p:par>
+                            </p:childTnLst>
+                          </p:cTn>
+                        </p:par>
+                      </p:childTnLst>
+                    </p:cTn>
+                  </p:par>
+                </p:childTnLst>
+              </p:cTn>
+              <p:prevCondLst>
+                <p:cond evt="onPrev" delay="0">
+                  <p:tgtEl>
+                    <p:sldTgt/>
+                  </p:tgtEl>
+                </p:cond>
+              </p:prevCondLst>
+              <p:nextCondLst>
+                <p:cond evt="onNext" delay="0">
+                  <p:tgtEl>
+                    <p:sldTgt/>
+                  </p:tgtEl>
+                </p:cond>
+              </p:nextCondLst>
+            </p:seq>
+          </p:childTnLst>
+        </p:cTn>
+      </p:par>
+    </p:tnLst>
+    <p:bldLst>
+      <p:bldP spid="4" grpId="0"/>
+      <p:bldP spid="7" grpId="0"/>
+    </p:bldLst>
+  </p:timing>
+</p:sld>
+</file>
+
+<file path=ppt/slides/slide27.xml><?xml version="1.0" encoding="utf-8"?>
+<p:sld xmlns:a="http://schemas.openxmlformats.org/drawingml/2006/main" xmlns:r="http://schemas.openxmlformats.org/officeDocument/2006/relationships" xmlns:p="http://schemas.openxmlformats.org/presentationml/2006/main">
+  <p:cSld>
+    <p:spTree>
+      <p:nvGrpSpPr>
+        <p:cNvPr id="1" name=""/>
+        <p:cNvGrpSpPr/>
+        <p:nvPr/>
+      </p:nvGrpSpPr>
+      <p:grpSpPr>
+        <a:xfrm>
+          <a:off x="0" y="0"/>
+          <a:ext cx="0" cy="0"/>
+          <a:chOff x="0" y="0"/>
+          <a:chExt cx="0" cy="0"/>
+        </a:xfrm>
+      </p:grpSpPr>
+      <p:sp>
+        <p:nvSpPr>
+          <p:cNvPr id="4" name="TextBox 3"/>
+          <p:cNvSpPr txBox="1"/>
+          <p:nvPr/>
+        </p:nvSpPr>
+        <p:spPr>
+          <a:xfrm>
+            <a:off x="3429000" y="3130034"/>
+            <a:ext cx="3657600" cy="369332"/>
+          </a:xfrm>
+          <a:prstGeom prst="rect">
+            <a:avLst/>
+          </a:prstGeom>
+          <a:noFill/>
+        </p:spPr>
+        <p:txBody>
+          <a:bodyPr wrap="square" rtlCol="0">
+            <a:spAutoFit/>
+          </a:bodyPr>
+          <a:lstStyle/>
+          <a:p>
+            <a:r>
+              <a:rPr lang="en-US" dirty="0" smtClean="0">
+                <a:solidFill>
+                  <a:schemeClr val="accent6">
+                    <a:lumMod val="75000"/>
+                  </a:schemeClr>
+                </a:solidFill>
+              </a:rPr>
+              <a:t>Next, let’s try the </a:t>
+            </a:r>
+            <a:r>
+              <a:rPr lang="en-US" b="1" dirty="0" smtClean="0">
+                <a:solidFill>
+                  <a:schemeClr val="accent6">
+                    <a:lumMod val="75000"/>
+                  </a:schemeClr>
+                </a:solidFill>
+              </a:rPr>
+              <a:t>Shapes Lab </a:t>
+            </a:r>
+            <a:r>
+              <a:rPr lang="en-US" dirty="0" smtClean="0">
+                <a:solidFill>
+                  <a:schemeClr val="accent6">
+                    <a:lumMod val="75000"/>
+                  </a:schemeClr>
+                </a:solidFill>
+              </a:rPr>
+              <a:t>feature</a:t>
+            </a:r>
+            <a:endParaRPr lang="en-SG" dirty="0">
+              <a:solidFill>
+                <a:schemeClr val="accent6">
+                  <a:lumMod val="75000"/>
+                </a:schemeClr>
+              </a:solidFill>
+            </a:endParaRPr>
+          </a:p>
+        </p:txBody>
+      </p:sp>
+      <p:grpSp>
+        <p:nvGrpSpPr>
+          <p:cNvPr id="9" name="[Group 8]"/>
+          <p:cNvGrpSpPr/>
+          <p:nvPr/>
+        </p:nvGrpSpPr>
+        <p:grpSpPr>
+          <a:xfrm>
+            <a:off x="2438400" y="2895600"/>
+            <a:ext cx="838200" cy="838200"/>
+            <a:chOff x="375266" y="5397326"/>
+            <a:chExt cx="838200" cy="838200"/>
+          </a:xfrm>
+        </p:grpSpPr>
+        <p:sp>
+          <p:nvSpPr>
+            <p:cNvPr id="10" name="Rectangle 9"/>
+            <p:cNvSpPr/>
+            <p:nvPr/>
+          </p:nvSpPr>
+          <p:spPr>
+            <a:xfrm>
+              <a:off x="375266" y="5397326"/>
+              <a:ext cx="838200" cy="838200"/>
+            </a:xfrm>
+            <a:prstGeom prst="rect">
+              <a:avLst/>
+            </a:prstGeom>
+            <a:noFill/>
+            <a:ln>
+              <a:noFill/>
+            </a:ln>
+          </p:spPr>
+          <p:style>
+            <a:lnRef idx="2">
+              <a:schemeClr val="accent1">
+                <a:shade val="50000"/>
+              </a:schemeClr>
+            </a:lnRef>
+            <a:fillRef idx="1">
+              <a:schemeClr val="accent1"/>
+            </a:fillRef>
+            <a:effectRef idx="0">
+              <a:schemeClr val="accent1"/>
+            </a:effectRef>
+            <a:fontRef idx="minor">
+              <a:schemeClr val="lt1"/>
+            </a:fontRef>
+          </p:style>
+          <p:txBody>
+            <a:bodyPr rtlCol="0" anchor="ctr"/>
+            <a:lstStyle/>
+            <a:p>
+              <a:pPr algn="ctr"/>
+              <a:endParaRPr lang="en-SG"/>
+            </a:p>
+          </p:txBody>
+        </p:sp>
+        <p:sp>
+          <p:nvSpPr>
+            <p:cNvPr id="11" name="Rectangle 4"/>
+            <p:cNvSpPr/>
+            <p:nvPr/>
+          </p:nvSpPr>
+          <p:spPr>
+            <a:xfrm rot="16200000">
+              <a:off x="444221" y="5470529"/>
+              <a:ext cx="700291" cy="690781"/>
+            </a:xfrm>
+            <a:custGeom>
+              <a:avLst/>
+              <a:gdLst/>
+              <a:ahLst/>
+              <a:cxnLst/>
+              <a:rect l="l" t="t" r="r" b="b"/>
+              <a:pathLst>
+                <a:path w="1752603" h="1752600">
+                  <a:moveTo>
+                    <a:pt x="533400" y="0"/>
+                  </a:moveTo>
+                  <a:lnTo>
+                    <a:pt x="533403" y="0"/>
+                  </a:lnTo>
+                  <a:lnTo>
+                    <a:pt x="1066800" y="0"/>
+                  </a:lnTo>
+                  <a:lnTo>
+                    <a:pt x="1752603" y="0"/>
+                  </a:lnTo>
+                  <a:lnTo>
+                    <a:pt x="1752603" y="1752600"/>
+                  </a:lnTo>
+                  <a:lnTo>
+                    <a:pt x="1219203" y="1752600"/>
+                  </a:lnTo>
+                  <a:lnTo>
+                    <a:pt x="533403" y="1752600"/>
+                  </a:lnTo>
+                  <a:lnTo>
+                    <a:pt x="3" y="1752600"/>
+                  </a:lnTo>
+                  <a:lnTo>
+                    <a:pt x="3" y="533430"/>
+                  </a:lnTo>
+                  <a:cubicBezTo>
+                    <a:pt x="0" y="533420"/>
+                    <a:pt x="0" y="533410"/>
+                    <a:pt x="0" y="533400"/>
+                  </a:cubicBezTo>
+                  <a:cubicBezTo>
+                    <a:pt x="0" y="238811"/>
+                    <a:pt x="238811" y="0"/>
+                    <a:pt x="533400" y="0"/>
+                  </a:cubicBezTo>
+                  <a:close/>
+                </a:path>
+              </a:pathLst>
+            </a:custGeom>
+            <a:noFill/>
+            <a:ln w="76200" cmpd="sng">
+              <a:solidFill>
+                <a:srgbClr val="0070C0"/>
+              </a:solidFill>
+              <a:miter lim="800000"/>
+            </a:ln>
+          </p:spPr>
+          <p:style>
+            <a:lnRef idx="2">
+              <a:schemeClr val="accent1">
+                <a:shade val="50000"/>
+              </a:schemeClr>
+            </a:lnRef>
+            <a:fillRef idx="1">
+              <a:schemeClr val="accent1"/>
+            </a:fillRef>
+            <a:effectRef idx="0">
+              <a:schemeClr val="accent1"/>
+            </a:effectRef>
+            <a:fontRef idx="minor">
+              <a:schemeClr val="lt1"/>
+            </a:fontRef>
+          </p:style>
+          <p:txBody>
+            <a:bodyPr rtlCol="0" anchor="ctr"/>
+            <a:lstStyle/>
+            <a:p>
+              <a:pPr algn="ctr"/>
+              <a:endParaRPr lang="en-US"/>
+            </a:p>
+          </p:txBody>
+        </p:sp>
+        <p:sp>
+          <p:nvSpPr>
+            <p:cNvPr id="12" name="Teardrop 11"/>
+            <p:cNvSpPr/>
+            <p:nvPr/>
+          </p:nvSpPr>
+          <p:spPr>
+            <a:xfrm>
+              <a:off x="747877" y="5557049"/>
+              <a:ext cx="309672" cy="307175"/>
+            </a:xfrm>
+            <a:prstGeom prst="teardrop">
+              <a:avLst/>
+            </a:prstGeom>
+            <a:solidFill>
+              <a:srgbClr val="0070C0"/>
+            </a:solidFill>
+            <a:ln w="19050">
+              <a:solidFill>
+                <a:schemeClr val="bg1"/>
+              </a:solidFill>
+            </a:ln>
+            <a:effectLst/>
+          </p:spPr>
+          <p:style>
+            <a:lnRef idx="2">
+              <a:schemeClr val="accent1">
+                <a:shade val="50000"/>
+              </a:schemeClr>
+            </a:lnRef>
+            <a:fillRef idx="1">
+              <a:schemeClr val="accent1"/>
+            </a:fillRef>
+            <a:effectRef idx="0">
+              <a:schemeClr val="accent1"/>
+            </a:effectRef>
+            <a:fontRef idx="minor">
+              <a:schemeClr val="lt1"/>
+            </a:fontRef>
+          </p:style>
+          <p:txBody>
+            <a:bodyPr rtlCol="0" anchor="ctr"/>
+            <a:lstStyle/>
+            <a:p>
+              <a:pPr algn="ctr"/>
+              <a:endParaRPr lang="en-SG"/>
+            </a:p>
+          </p:txBody>
+        </p:sp>
+        <p:sp>
+          <p:nvSpPr>
+            <p:cNvPr id="13" name="Flowchart: Process 12"/>
+            <p:cNvSpPr/>
+            <p:nvPr/>
+          </p:nvSpPr>
+          <p:spPr>
+            <a:xfrm>
+              <a:off x="544174" y="5670551"/>
+              <a:ext cx="299506" cy="256598"/>
+            </a:xfrm>
+            <a:prstGeom prst="flowChartProcess">
+              <a:avLst/>
+            </a:prstGeom>
+            <a:solidFill>
+              <a:schemeClr val="accent6"/>
+            </a:solidFill>
+            <a:ln w="19050">
+              <a:solidFill>
+                <a:schemeClr val="bg1"/>
+              </a:solidFill>
+            </a:ln>
+            <a:effectLst/>
+          </p:spPr>
+          <p:style>
+            <a:lnRef idx="2">
+              <a:schemeClr val="accent1">
+                <a:shade val="50000"/>
+              </a:schemeClr>
+            </a:lnRef>
+            <a:fillRef idx="1">
+              <a:schemeClr val="accent1"/>
+            </a:fillRef>
+            <a:effectRef idx="0">
+              <a:schemeClr val="accent1"/>
+            </a:effectRef>
+            <a:fontRef idx="minor">
+              <a:schemeClr val="lt1"/>
+            </a:fontRef>
+          </p:style>
+          <p:txBody>
+            <a:bodyPr rtlCol="0" anchor="ctr"/>
+            <a:lstStyle/>
+            <a:p>
+              <a:pPr algn="ctr"/>
+              <a:endParaRPr lang="en-SG"/>
+            </a:p>
+          </p:txBody>
+        </p:sp>
+        <p:sp>
+          <p:nvSpPr>
+            <p:cNvPr id="14" name="Flowchart: Magnetic Disk 13"/>
+            <p:cNvSpPr/>
+            <p:nvPr/>
+          </p:nvSpPr>
+          <p:spPr>
+            <a:xfrm>
+              <a:off x="721676" y="5747165"/>
+              <a:ext cx="258469" cy="315518"/>
+            </a:xfrm>
+            <a:prstGeom prst="flowChartMagneticDisk">
+              <a:avLst/>
+            </a:prstGeom>
+            <a:solidFill>
+              <a:schemeClr val="accent6"/>
+            </a:solidFill>
+            <a:ln w="19050">
+              <a:solidFill>
+                <a:schemeClr val="bg1"/>
+              </a:solidFill>
+            </a:ln>
+            <a:effectLst/>
+          </p:spPr>
+          <p:style>
+            <a:lnRef idx="2">
+              <a:schemeClr val="accent1">
+                <a:shade val="50000"/>
+              </a:schemeClr>
+            </a:lnRef>
+            <a:fillRef idx="1">
+              <a:schemeClr val="accent1"/>
+            </a:fillRef>
+            <a:effectRef idx="0">
+              <a:schemeClr val="accent1"/>
+            </a:effectRef>
+            <a:fontRef idx="minor">
+              <a:schemeClr val="lt1"/>
+            </a:fontRef>
+          </p:style>
+          <p:txBody>
+            <a:bodyPr rtlCol="0" anchor="ctr"/>
+            <a:lstStyle/>
+            <a:p>
+              <a:pPr algn="ctr"/>
+              <a:endParaRPr lang="en-SG"/>
+            </a:p>
+          </p:txBody>
+        </p:sp>
+      </p:grpSp>
+    </p:spTree>
+    <p:extLst>
+      <p:ext uri="{BB962C8B-B14F-4D97-AF65-F5344CB8AC3E}">
+        <p14:creationId xmlns:p14="http://schemas.microsoft.com/office/powerpoint/2010/main" val="568570799"/>
+      </p:ext>
+    </p:extLst>
+  </p:cSld>
+  <p:clrMapOvr>
+    <a:masterClrMapping/>
+  </p:clrMapOvr>
+  <p:timing>
+    <p:tnLst>
+      <p:par>
+        <p:cTn id="1" dur="indefinite" restart="never" nodeType="tmRoot"/>
+      </p:par>
+    </p:tnLst>
+  </p:timing>
+</p:sld>
+</file>
+
+<file path=ppt/slides/slide28.xml><?xml version="1.0" encoding="utf-8"?>
+<p:sld xmlns:a="http://schemas.openxmlformats.org/drawingml/2006/main" xmlns:r="http://schemas.openxmlformats.org/officeDocument/2006/relationships" xmlns:p="http://schemas.openxmlformats.org/presentationml/2006/main">
+  <p:cSld>
+    <p:spTree>
+      <p:nvGrpSpPr>
+        <p:cNvPr id="1" name=""/>
+        <p:cNvGrpSpPr/>
+        <p:nvPr/>
+      </p:nvGrpSpPr>
+      <p:grpSpPr>
+        <a:xfrm>
+          <a:off x="0" y="0"/>
+          <a:ext cx="0" cy="0"/>
+          <a:chOff x="0" y="0"/>
+          <a:chExt cx="0" cy="0"/>
+        </a:xfrm>
+      </p:grpSpPr>
+      <p:sp>
+        <p:nvSpPr>
+          <p:cNvPr id="7" name="[TextBox 6]"/>
+          <p:cNvSpPr txBox="1"/>
+          <p:nvPr/>
+        </p:nvSpPr>
+        <p:spPr>
+          <a:xfrm>
+            <a:off x="457200" y="907022"/>
+            <a:ext cx="3505200" cy="1077218"/>
+          </a:xfrm>
+          <a:prstGeom prst="rect">
+            <a:avLst/>
+          </a:prstGeom>
+          <a:noFill/>
+        </p:spPr>
+        <p:txBody>
+          <a:bodyPr wrap="square" rtlCol="0">
+            <a:spAutoFit/>
+          </a:bodyPr>
+          <a:lstStyle/>
+          <a:p>
+            <a:r>
+              <a:rPr lang="en-US" sz="2800" b="1" dirty="0" smtClean="0">
+                <a:solidFill>
+                  <a:schemeClr val="accent6">
+                    <a:lumMod val="75000"/>
+                  </a:schemeClr>
+                </a:solidFill>
+              </a:rPr>
+              <a:t>1.</a:t>
+            </a:r>
+            <a:r>
+              <a:rPr lang="en-US" dirty="0" smtClean="0">
+                <a:solidFill>
+                  <a:schemeClr val="accent6">
+                    <a:lumMod val="75000"/>
+                  </a:schemeClr>
+                </a:solidFill>
+              </a:rPr>
+              <a:t> Click the                button, it will </a:t>
+            </a:r>
+          </a:p>
+          <a:p>
+            <a:endParaRPr lang="en-US" dirty="0" smtClean="0">
+              <a:solidFill>
+                <a:schemeClr val="accent6">
+                  <a:lumMod val="75000"/>
+                </a:schemeClr>
+              </a:solidFill>
+            </a:endParaRPr>
+          </a:p>
+          <a:p>
+            <a:r>
+              <a:rPr lang="en-US" dirty="0" smtClean="0">
+                <a:solidFill>
+                  <a:schemeClr val="accent6">
+                    <a:lumMod val="75000"/>
+                  </a:schemeClr>
+                </a:solidFill>
+              </a:rPr>
+              <a:t>bring you the Shapes Lab Panel.</a:t>
+            </a:r>
+            <a:endParaRPr lang="en-SG" dirty="0">
+              <a:solidFill>
+                <a:schemeClr val="accent6">
+                  <a:lumMod val="75000"/>
+                </a:schemeClr>
+              </a:solidFill>
+            </a:endParaRPr>
+          </a:p>
+        </p:txBody>
+      </p:sp>
+      <p:pic>
+        <p:nvPicPr>
+          <p:cNvPr id="2" name="Picture 1"/>
+          <p:cNvPicPr>
+            <a:picLocks noChangeAspect="1"/>
+          </p:cNvPicPr>
+          <p:nvPr/>
+        </p:nvPicPr>
+        <p:blipFill>
+          <a:blip r:embed="rId3"/>
+          <a:stretch>
+            <a:fillRect/>
+          </a:stretch>
+        </p:blipFill>
+        <p:spPr>
+          <a:xfrm>
+            <a:off x="1752600" y="732504"/>
+            <a:ext cx="609600" cy="975360"/>
+          </a:xfrm>
+          <a:prstGeom prst="rect">
+            <a:avLst/>
+          </a:prstGeom>
+        </p:spPr>
+      </p:pic>
+      <p:pic>
+        <p:nvPicPr>
+          <p:cNvPr id="3" name="Picture 2"/>
+          <p:cNvPicPr>
+            <a:picLocks noChangeAspect="1"/>
+          </p:cNvPicPr>
+          <p:nvPr/>
+        </p:nvPicPr>
+        <p:blipFill rotWithShape="1">
+          <a:blip r:embed="rId4"/>
+          <a:srcRect b="70506"/>
+          <a:stretch/>
+        </p:blipFill>
+        <p:spPr>
+          <a:xfrm>
+            <a:off x="3962399" y="363363"/>
+            <a:ext cx="4907639" cy="1977788"/>
+          </a:xfrm>
+          <a:prstGeom prst="rect">
+            <a:avLst/>
+          </a:prstGeom>
+          <a:ln>
+            <a:noFill/>
+          </a:ln>
+          <a:effectLst>
+            <a:softEdge rad="112500"/>
+          </a:effectLst>
+        </p:spPr>
+      </p:pic>
+      <p:sp>
+        <p:nvSpPr>
+          <p:cNvPr id="9" name="[TextBox 6]"/>
+          <p:cNvSpPr txBox="1"/>
+          <p:nvPr/>
+        </p:nvSpPr>
+        <p:spPr>
+          <a:xfrm>
+            <a:off x="457199" y="2968585"/>
+            <a:ext cx="3505200" cy="1908215"/>
+          </a:xfrm>
+          <a:prstGeom prst="rect">
+            <a:avLst/>
+          </a:prstGeom>
+          <a:noFill/>
+        </p:spPr>
+        <p:txBody>
+          <a:bodyPr wrap="square" rtlCol="0">
+            <a:spAutoFit/>
+          </a:bodyPr>
+          <a:lstStyle/>
+          <a:p>
+            <a:r>
+              <a:rPr lang="en-US" sz="2800" b="1" dirty="0" smtClean="0">
+                <a:solidFill>
+                  <a:schemeClr val="accent6">
+                    <a:lumMod val="75000"/>
+                  </a:schemeClr>
+                </a:solidFill>
+              </a:rPr>
+              <a:t>2.</a:t>
+            </a:r>
+            <a:r>
+              <a:rPr lang="en-US" dirty="0" smtClean="0">
+                <a:solidFill>
+                  <a:schemeClr val="accent6">
+                    <a:lumMod val="75000"/>
+                  </a:schemeClr>
+                </a:solidFill>
+              </a:rPr>
+              <a:t> Right click on the shape you want to add into the Lab, and select “Add to Custom Shapes”. Then you should see your shape in the panel and waiting for name editing.</a:t>
+            </a:r>
+            <a:endParaRPr lang="en-SG" dirty="0">
+              <a:solidFill>
+                <a:schemeClr val="accent6">
+                  <a:lumMod val="75000"/>
+                </a:schemeClr>
+              </a:solidFill>
+            </a:endParaRPr>
+          </a:p>
+        </p:txBody>
+      </p:sp>
+      <p:grpSp>
+        <p:nvGrpSpPr>
+          <p:cNvPr id="22" name="Group 21"/>
+          <p:cNvGrpSpPr/>
+          <p:nvPr/>
+        </p:nvGrpSpPr>
+        <p:grpSpPr>
+          <a:xfrm>
+            <a:off x="2382672" y="5373574"/>
+            <a:ext cx="3810000" cy="897017"/>
+            <a:chOff x="228600" y="4817982"/>
+            <a:chExt cx="3810000" cy="897017"/>
+          </a:xfrm>
+        </p:grpSpPr>
+        <p:sp>
+          <p:nvSpPr>
+            <p:cNvPr id="23" name="Rounded Rectangle 22"/>
+            <p:cNvSpPr/>
+            <p:nvPr/>
+          </p:nvSpPr>
+          <p:spPr>
+            <a:xfrm>
+              <a:off x="228600" y="4894183"/>
+              <a:ext cx="1219200" cy="762000"/>
+            </a:xfrm>
+            <a:prstGeom prst="roundRect">
+              <a:avLst/>
+            </a:prstGeom>
+            <a:solidFill>
+              <a:srgbClr val="00B050"/>
+            </a:solidFill>
+          </p:spPr>
+          <p:style>
+            <a:lnRef idx="2">
+              <a:schemeClr val="accent1">
+                <a:shade val="50000"/>
+              </a:schemeClr>
+            </a:lnRef>
+            <a:fillRef idx="1">
+              <a:schemeClr val="accent1"/>
+            </a:fillRef>
+            <a:effectRef idx="0">
+              <a:schemeClr val="accent1"/>
+            </a:effectRef>
+            <a:fontRef idx="minor">
+              <a:schemeClr val="lt1"/>
+            </a:fontRef>
+          </p:style>
+          <p:txBody>
+            <a:bodyPr rtlCol="0" anchor="ctr"/>
+            <a:lstStyle/>
+            <a:p>
+              <a:pPr algn="ctr"/>
+              <a:r>
+                <a:rPr lang="en-US" altLang="zh-CN" sz="3200" b="1" dirty="0" smtClean="0">
+                  <a:ln w="10160">
+                    <a:solidFill>
+                      <a:schemeClr val="accent5"/>
+                    </a:solidFill>
+                    <a:prstDash val="solid"/>
+                  </a:ln>
+                  <a:solidFill>
+                    <a:srgbClr val="FFFFFF"/>
+                  </a:solidFill>
+                  <a:effectLst>
+                    <a:outerShdw blurRad="38100" dist="22860" dir="5400000" algn="tl" rotWithShape="0">
+                      <a:srgbClr val="000000">
+                        <a:alpha val="30000"/>
+                      </a:srgbClr>
+                    </a:outerShdw>
+                  </a:effectLst>
+                </a:rPr>
+                <a:t>Right</a:t>
+              </a:r>
+              <a:endParaRPr lang="zh-CN" altLang="en-US" sz="3200" b="1" dirty="0">
+                <a:ln w="10160">
+                  <a:solidFill>
+                    <a:schemeClr val="accent5"/>
+                  </a:solidFill>
+                  <a:prstDash val="solid"/>
+                </a:ln>
+                <a:solidFill>
+                  <a:srgbClr val="FFFFFF"/>
+                </a:solidFill>
+                <a:effectLst>
+                  <a:outerShdw blurRad="38100" dist="22860" dir="5400000" algn="tl" rotWithShape="0">
+                    <a:srgbClr val="000000">
+                      <a:alpha val="30000"/>
+                    </a:srgbClr>
+                  </a:outerShdw>
+                </a:effectLst>
+              </a:endParaRPr>
+            </a:p>
+          </p:txBody>
+        </p:sp>
+        <p:sp>
+          <p:nvSpPr>
+            <p:cNvPr id="24" name="Rectangle 23"/>
+            <p:cNvSpPr/>
+            <p:nvPr/>
+          </p:nvSpPr>
+          <p:spPr>
+            <a:xfrm>
+              <a:off x="1600200" y="4894183"/>
+              <a:ext cx="1219200" cy="744617"/>
+            </a:xfrm>
+            <a:prstGeom prst="rect">
+              <a:avLst/>
+            </a:prstGeom>
+            <a:solidFill>
+              <a:srgbClr val="00B0F0"/>
+            </a:solidFill>
+          </p:spPr>
+          <p:style>
+            <a:lnRef idx="2">
+              <a:schemeClr val="accent1">
+                <a:shade val="50000"/>
+              </a:schemeClr>
+            </a:lnRef>
+            <a:fillRef idx="1">
+              <a:schemeClr val="accent1"/>
+            </a:fillRef>
+            <a:effectRef idx="0">
+              <a:schemeClr val="accent1"/>
+            </a:effectRef>
+            <a:fontRef idx="minor">
+              <a:schemeClr val="lt1"/>
+            </a:fontRef>
+          </p:style>
+          <p:txBody>
+            <a:bodyPr rtlCol="0" anchor="ctr"/>
+            <a:lstStyle/>
+            <a:p>
+              <a:pPr algn="ctr"/>
+              <a:r>
+                <a:rPr lang="en-US" altLang="zh-CN" sz="3200" b="1" dirty="0" smtClean="0">
+                  <a:ln w="10160">
+                    <a:solidFill>
+                      <a:schemeClr val="accent5"/>
+                    </a:solidFill>
+                    <a:prstDash val="solid"/>
+                  </a:ln>
+                  <a:solidFill>
+                    <a:srgbClr val="FFFFFF"/>
+                  </a:solidFill>
+                  <a:effectLst>
+                    <a:outerShdw blurRad="38100" dist="22860" dir="5400000" algn="tl" rotWithShape="0">
+                      <a:srgbClr val="000000">
+                        <a:alpha val="30000"/>
+                      </a:srgbClr>
+                    </a:outerShdw>
+                  </a:effectLst>
+                </a:rPr>
+                <a:t>Click</a:t>
+              </a:r>
+              <a:endParaRPr lang="zh-CN" altLang="en-US" sz="3200" dirty="0"/>
+            </a:p>
+          </p:txBody>
+        </p:sp>
+        <p:sp>
+          <p:nvSpPr>
+            <p:cNvPr id="25" name="Oval 24"/>
+            <p:cNvSpPr/>
+            <p:nvPr/>
+          </p:nvSpPr>
+          <p:spPr>
+            <a:xfrm>
+              <a:off x="2971800" y="4817982"/>
+              <a:ext cx="1066800" cy="897017"/>
+            </a:xfrm>
+            <a:prstGeom prst="ellipse">
+              <a:avLst/>
+            </a:prstGeom>
+            <a:solidFill>
+              <a:srgbClr val="FFC000"/>
+            </a:solidFill>
+          </p:spPr>
+          <p:style>
+            <a:lnRef idx="2">
+              <a:schemeClr val="accent1">
+                <a:shade val="50000"/>
+              </a:schemeClr>
+            </a:lnRef>
+            <a:fillRef idx="1">
+              <a:schemeClr val="accent1"/>
+            </a:fillRef>
+            <a:effectRef idx="0">
+              <a:schemeClr val="accent1"/>
+            </a:effectRef>
+            <a:fontRef idx="minor">
+              <a:schemeClr val="lt1"/>
+            </a:fontRef>
+          </p:style>
+          <p:txBody>
+            <a:bodyPr rtlCol="0" anchor="ctr"/>
+            <a:lstStyle/>
+            <a:p>
+              <a:pPr algn="ctr"/>
+              <a:r>
+                <a:rPr lang="en-US" altLang="zh-CN" sz="3200" b="1" dirty="0">
+                  <a:ln w="10160">
+                    <a:solidFill>
+                      <a:schemeClr val="accent5"/>
+                    </a:solidFill>
+                    <a:prstDash val="solid"/>
+                  </a:ln>
+                  <a:solidFill>
+                    <a:srgbClr val="FFFFFF"/>
+                  </a:solidFill>
+                  <a:effectLst>
+                    <a:outerShdw blurRad="38100" dist="22860" dir="5400000" algn="tl" rotWithShape="0">
+                      <a:srgbClr val="000000">
+                        <a:alpha val="30000"/>
+                      </a:srgbClr>
+                    </a:outerShdw>
+                  </a:effectLst>
+                </a:rPr>
+                <a:t>Me!</a:t>
+              </a:r>
+              <a:endParaRPr lang="zh-CN" altLang="en-US" sz="3200" dirty="0"/>
+            </a:p>
+          </p:txBody>
+        </p:sp>
+      </p:grpSp>
+      <p:pic>
+        <p:nvPicPr>
+          <p:cNvPr id="26" name="[Picture 25]"/>
+          <p:cNvPicPr>
+            <a:picLocks noChangeAspect="1"/>
+          </p:cNvPicPr>
+          <p:nvPr/>
+        </p:nvPicPr>
+        <p:blipFill>
+          <a:blip r:embed="rId5"/>
+          <a:stretch>
+            <a:fillRect/>
+          </a:stretch>
+        </p:blipFill>
+        <p:spPr>
+          <a:xfrm>
+            <a:off x="3962399" y="2891380"/>
+            <a:ext cx="4907639" cy="1766910"/>
+          </a:xfrm>
+          <a:prstGeom prst="rect">
+            <a:avLst/>
+          </a:prstGeom>
+          <a:ln>
+            <a:noFill/>
+          </a:ln>
+          <a:effectLst>
+            <a:softEdge rad="112500"/>
+          </a:effectLst>
+        </p:spPr>
+      </p:pic>
+    </p:spTree>
+    <p:extLst>
+      <p:ext uri="{BB962C8B-B14F-4D97-AF65-F5344CB8AC3E}">
+        <p14:creationId xmlns:p14="http://schemas.microsoft.com/office/powerpoint/2010/main" val="2356246644"/>
+      </p:ext>
+    </p:extLst>
+  </p:cSld>
+  <p:clrMapOvr>
+    <a:masterClrMapping/>
+  </p:clrMapOvr>
+  <p:timing>
+    <p:tnLst>
+      <p:par>
+        <p:cTn id="1" dur="indefinite" restart="never" nodeType="tmRoot"/>
+      </p:par>
+    </p:tnLst>
+  </p:timing>
+</p:sld>
+</file>
+
+<file path=ppt/slides/slide29.xml><?xml version="1.0" encoding="utf-8"?>
+<p:sld xmlns:a="http://schemas.openxmlformats.org/drawingml/2006/main" xmlns:r="http://schemas.openxmlformats.org/officeDocument/2006/relationships" xmlns:p="http://schemas.openxmlformats.org/presentationml/2006/main">
+  <p:cSld>
+    <p:spTree>
+      <p:nvGrpSpPr>
+        <p:cNvPr id="1" name=""/>
+        <p:cNvGrpSpPr/>
+        <p:nvPr/>
+      </p:nvGrpSpPr>
+      <p:grpSpPr>
+        <a:xfrm>
+          <a:off x="0" y="0"/>
+          <a:ext cx="0" cy="0"/>
+          <a:chOff x="0" y="0"/>
+          <a:chExt cx="0" cy="0"/>
+        </a:xfrm>
+      </p:grpSpPr>
+      <p:sp>
+        <p:nvSpPr>
+          <p:cNvPr id="10" name="[TextBox 6]"/>
+          <p:cNvSpPr txBox="1"/>
+          <p:nvPr/>
+        </p:nvSpPr>
+        <p:spPr>
+          <a:xfrm>
+            <a:off x="457200" y="838200"/>
+            <a:ext cx="3505200" cy="1354217"/>
+          </a:xfrm>
+          <a:prstGeom prst="rect">
+            <a:avLst/>
+          </a:prstGeom>
+          <a:noFill/>
+        </p:spPr>
+        <p:txBody>
+          <a:bodyPr wrap="square" rtlCol="0">
+            <a:spAutoFit/>
+          </a:bodyPr>
+          <a:lstStyle/>
+          <a:p>
+            <a:r>
+              <a:rPr lang="en-US" sz="2800" b="1" dirty="0" smtClean="0">
+                <a:solidFill>
+                  <a:schemeClr val="accent6">
+                    <a:lumMod val="75000"/>
+                  </a:schemeClr>
+                </a:solidFill>
+              </a:rPr>
+              <a:t>3.</a:t>
+            </a:r>
+            <a:r>
+              <a:rPr lang="en-US" dirty="0" smtClean="0">
+                <a:solidFill>
+                  <a:schemeClr val="accent6">
+                    <a:lumMod val="75000"/>
+                  </a:schemeClr>
+                </a:solidFill>
+              </a:rPr>
+              <a:t> After finishing name editing, press enter to confirm. Alternatively, you could click on any where else to confirm the change.</a:t>
+            </a:r>
+          </a:p>
+        </p:txBody>
+      </p:sp>
+      <p:pic>
+        <p:nvPicPr>
+          <p:cNvPr id="2" name="Picture 1"/>
+          <p:cNvPicPr>
+            <a:picLocks noChangeAspect="1"/>
+          </p:cNvPicPr>
+          <p:nvPr/>
+        </p:nvPicPr>
+        <p:blipFill>
+          <a:blip r:embed="rId3"/>
+          <a:stretch>
+            <a:fillRect/>
+          </a:stretch>
+        </p:blipFill>
+        <p:spPr>
+          <a:xfrm>
+            <a:off x="3962399" y="762000"/>
+            <a:ext cx="4907639" cy="1447800"/>
+          </a:xfrm>
+          <a:prstGeom prst="rect">
+            <a:avLst/>
+          </a:prstGeom>
+          <a:ln>
+            <a:noFill/>
+          </a:ln>
+          <a:effectLst>
+            <a:softEdge rad="112500"/>
+          </a:effectLst>
+        </p:spPr>
+      </p:pic>
+      <p:sp>
+        <p:nvSpPr>
+          <p:cNvPr id="12" name="[TextBox 6]"/>
+          <p:cNvSpPr txBox="1"/>
+          <p:nvPr/>
+        </p:nvSpPr>
+        <p:spPr>
+          <a:xfrm>
+            <a:off x="449237" y="3128090"/>
+            <a:ext cx="3505201" cy="1631216"/>
+          </a:xfrm>
+          <a:prstGeom prst="rect">
+            <a:avLst/>
+          </a:prstGeom>
+          <a:noFill/>
+        </p:spPr>
+        <p:txBody>
+          <a:bodyPr wrap="square" rtlCol="0">
+            <a:spAutoFit/>
+          </a:bodyPr>
+          <a:lstStyle/>
+          <a:p>
+            <a:r>
+              <a:rPr lang="en-US" sz="2800" b="1" dirty="0" smtClean="0">
+                <a:solidFill>
+                  <a:schemeClr val="accent6">
+                    <a:lumMod val="75000"/>
+                  </a:schemeClr>
+                </a:solidFill>
+              </a:rPr>
+              <a:t>4.</a:t>
+            </a:r>
+            <a:r>
+              <a:rPr lang="en-US" dirty="0" smtClean="0">
+                <a:solidFill>
+                  <a:schemeClr val="accent6">
+                    <a:lumMod val="75000"/>
+                  </a:schemeClr>
+                </a:solidFill>
+              </a:rPr>
+              <a:t> B</a:t>
+            </a:r>
+            <a:r>
+              <a:rPr lang="en-US" altLang="zh-CN" dirty="0" smtClean="0">
+                <a:solidFill>
+                  <a:schemeClr val="accent6">
+                    <a:lumMod val="75000"/>
+                  </a:schemeClr>
+                </a:solidFill>
+              </a:rPr>
+              <a:t>y </a:t>
+            </a:r>
+            <a:r>
+              <a:rPr lang="en-US" altLang="zh-CN" dirty="0">
+                <a:solidFill>
+                  <a:schemeClr val="accent6">
+                    <a:lumMod val="75000"/>
+                  </a:schemeClr>
+                </a:solidFill>
+              </a:rPr>
+              <a:t>right clicking on the </a:t>
+            </a:r>
+            <a:r>
+              <a:rPr lang="en-US" altLang="zh-CN" dirty="0" smtClean="0">
+                <a:solidFill>
+                  <a:schemeClr val="accent6">
+                    <a:lumMod val="75000"/>
+                  </a:schemeClr>
+                </a:solidFill>
+              </a:rPr>
+              <a:t>shape,</a:t>
+            </a:r>
+            <a:r>
+              <a:rPr lang="en-US" dirty="0" smtClean="0">
+                <a:solidFill>
+                  <a:schemeClr val="accent6">
+                    <a:lumMod val="75000"/>
+                  </a:schemeClr>
+                </a:solidFill>
+              </a:rPr>
+              <a:t> you can Add, Remove or Rename the shape. As a short cut to </a:t>
+            </a:r>
+            <a:r>
+              <a:rPr lang="en-US" altLang="zh-CN" dirty="0" smtClean="0">
+                <a:solidFill>
+                  <a:schemeClr val="accent6">
+                    <a:lumMod val="75000"/>
+                  </a:schemeClr>
+                </a:solidFill>
+              </a:rPr>
+              <a:t>add a shape </a:t>
+            </a:r>
+            <a:r>
+              <a:rPr lang="en-US" altLang="zh-CN" dirty="0">
+                <a:solidFill>
+                  <a:schemeClr val="accent6">
+                    <a:lumMod val="75000"/>
+                  </a:schemeClr>
+                </a:solidFill>
+              </a:rPr>
+              <a:t>into the </a:t>
+            </a:r>
+            <a:r>
+              <a:rPr lang="en-US" altLang="zh-CN" dirty="0" smtClean="0">
+                <a:solidFill>
+                  <a:schemeClr val="accent6">
+                    <a:lumMod val="75000"/>
+                  </a:schemeClr>
+                </a:solidFill>
+              </a:rPr>
+              <a:t>slide, simply double click on the shape.</a:t>
+            </a:r>
+            <a:endParaRPr lang="en-US" dirty="0" smtClean="0">
+              <a:solidFill>
+                <a:schemeClr val="accent6">
+                  <a:lumMod val="75000"/>
+                </a:schemeClr>
+              </a:solidFill>
+            </a:endParaRPr>
+          </a:p>
+        </p:txBody>
+      </p:sp>
+      <p:pic>
+        <p:nvPicPr>
+          <p:cNvPr id="6" name="Picture 5"/>
+          <p:cNvPicPr>
+            <a:picLocks noChangeAspect="1"/>
+          </p:cNvPicPr>
+          <p:nvPr/>
+        </p:nvPicPr>
+        <p:blipFill>
+          <a:blip r:embed="rId4"/>
+          <a:stretch>
+            <a:fillRect/>
+          </a:stretch>
+        </p:blipFill>
+        <p:spPr>
+          <a:xfrm>
+            <a:off x="3962398" y="2930506"/>
+            <a:ext cx="4907639" cy="2174894"/>
+          </a:xfrm>
+          <a:prstGeom prst="rect">
+            <a:avLst/>
+          </a:prstGeom>
+          <a:ln>
+            <a:noFill/>
+          </a:ln>
+          <a:effectLst>
+            <a:softEdge rad="112500"/>
+          </a:effectLst>
+        </p:spPr>
+      </p:pic>
+    </p:spTree>
+    <p:extLst>
+      <p:ext uri="{BB962C8B-B14F-4D97-AF65-F5344CB8AC3E}">
+        <p14:creationId xmlns:p14="http://schemas.microsoft.com/office/powerpoint/2010/main" val="3860146555"/>
+      </p:ext>
+    </p:extLst>
+  </p:cSld>
+  <p:clrMapOvr>
+    <a:masterClrMapping/>
+  </p:clrMapOvr>
+  <p:timing>
+    <p:tnLst>
+      <p:par>
+        <p:cTn id="1" dur="indefinite" restart="never" nodeType="tmRoot"/>
+      </p:par>
+    </p:tnLst>
+  </p:timing>
+</p:sld>
+</file>
+
+<file path=ppt/slides/slide3.xml><?xml version="1.0" encoding="utf-8"?>
+<p:sld xmlns:a="http://schemas.openxmlformats.org/drawingml/2006/main" xmlns:r="http://schemas.openxmlformats.org/officeDocument/2006/relationships" xmlns:p="http://schemas.openxmlformats.org/presentationml/2006/main">
+  <p:cSld>
+    <p:spTree>
+      <p:nvGrpSpPr>
+        <p:cNvPr id="1" name=""/>
+        <p:cNvGrpSpPr/>
+        <p:nvPr/>
+      </p:nvGrpSpPr>
+      <p:grpSpPr>
+        <a:xfrm>
+          <a:off x="0" y="0"/>
+          <a:ext cx="0" cy="0"/>
+          <a:chOff x="0" y="0"/>
+          <a:chExt cx="0" cy="0"/>
+        </a:xfrm>
+      </p:grpSpPr>
+      <p:sp>
+        <p:nvSpPr>
+          <p:cNvPr id="4" name="TextBox 3"/>
+          <p:cNvSpPr txBox="1"/>
+          <p:nvPr/>
+        </p:nvSpPr>
+        <p:spPr>
+          <a:xfrm>
+            <a:off x="762000" y="2362200"/>
+            <a:ext cx="7543800" cy="1754326"/>
+          </a:xfrm>
+          <a:prstGeom prst="rect">
+            <a:avLst/>
+          </a:prstGeom>
+          <a:noFill/>
+        </p:spPr>
+        <p:txBody>
+          <a:bodyPr wrap="square" rtlCol="0">
+            <a:spAutoFit/>
+          </a:bodyPr>
+          <a:lstStyle/>
+          <a:p>
+            <a:r>
+              <a:rPr lang="en-US" dirty="0" smtClean="0">
+                <a:solidFill>
+                  <a:schemeClr val="accent6">
+                    <a:lumMod val="75000"/>
+                  </a:schemeClr>
+                </a:solidFill>
+              </a:rPr>
+              <a:t>This tutorial explains </a:t>
+            </a:r>
+            <a:r>
+              <a:rPr lang="en-US" dirty="0" err="1" smtClean="0">
+                <a:solidFill>
+                  <a:schemeClr val="accent6">
+                    <a:lumMod val="75000"/>
+                  </a:schemeClr>
+                </a:solidFill>
+              </a:rPr>
+              <a:t>PowerPointLabs</a:t>
+            </a:r>
+            <a:r>
+              <a:rPr lang="en-US" dirty="0" smtClean="0">
+                <a:solidFill>
+                  <a:schemeClr val="accent6">
+                    <a:lumMod val="75000"/>
+                  </a:schemeClr>
+                </a:solidFill>
+              </a:rPr>
+              <a:t>’ features at the point you installed the plugin. </a:t>
+            </a:r>
+          </a:p>
+          <a:p>
+            <a:endParaRPr lang="en-US" dirty="0" smtClean="0">
+              <a:solidFill>
+                <a:schemeClr val="accent6">
+                  <a:lumMod val="75000"/>
+                </a:schemeClr>
+              </a:solidFill>
+            </a:endParaRPr>
+          </a:p>
+          <a:p>
+            <a:endParaRPr lang="en-US" dirty="0">
+              <a:solidFill>
+                <a:schemeClr val="accent6">
+                  <a:lumMod val="75000"/>
+                </a:schemeClr>
+              </a:solidFill>
+            </a:endParaRPr>
+          </a:p>
+          <a:p>
+            <a:r>
+              <a:rPr lang="en-US" dirty="0" smtClean="0">
+                <a:solidFill>
+                  <a:schemeClr val="accent6">
+                    <a:lumMod val="75000"/>
+                  </a:schemeClr>
+                </a:solidFill>
+              </a:rPr>
+              <a:t>If you installed the plugin some time back, please refer to the </a:t>
+            </a:r>
+            <a:r>
+              <a:rPr lang="en-US" i="1" dirty="0" smtClean="0">
+                <a:solidFill>
+                  <a:schemeClr val="accent6">
+                    <a:lumMod val="75000"/>
+                  </a:schemeClr>
+                </a:solidFill>
+              </a:rPr>
+              <a:t>Documentation</a:t>
+            </a:r>
+            <a:r>
+              <a:rPr lang="en-US" dirty="0" smtClean="0">
+                <a:solidFill>
+                  <a:schemeClr val="accent6">
+                    <a:lumMod val="75000"/>
+                  </a:schemeClr>
+                </a:solidFill>
+              </a:rPr>
+              <a:t> page of </a:t>
+            </a:r>
+            <a:r>
+              <a:rPr lang="en-US" dirty="0" smtClean="0">
+                <a:solidFill>
+                  <a:schemeClr val="accent6">
+                    <a:lumMod val="75000"/>
+                  </a:schemeClr>
+                </a:solidFill>
+                <a:hlinkClick r:id="rId2"/>
+              </a:rPr>
+              <a:t>our website</a:t>
+            </a:r>
+            <a:r>
+              <a:rPr lang="en-US" dirty="0" smtClean="0">
+                <a:solidFill>
+                  <a:schemeClr val="accent6">
+                    <a:lumMod val="75000"/>
+                  </a:schemeClr>
+                </a:solidFill>
+              </a:rPr>
+              <a:t> for more up-to-date instructions.</a:t>
+            </a:r>
+            <a:endParaRPr lang="en-SG" dirty="0">
+              <a:solidFill>
+                <a:schemeClr val="accent6">
+                  <a:lumMod val="75000"/>
+                </a:schemeClr>
+              </a:solidFill>
+            </a:endParaRPr>
+          </a:p>
+        </p:txBody>
+      </p:sp>
+    </p:spTree>
+    <p:extLst>
+      <p:ext uri="{BB962C8B-B14F-4D97-AF65-F5344CB8AC3E}">
+        <p14:creationId xmlns:p14="http://schemas.microsoft.com/office/powerpoint/2010/main" val="1906505232"/>
+      </p:ext>
+    </p:extLst>
+  </p:cSld>
+  <p:clrMapOvr>
+    <a:masterClrMapping/>
+  </p:clrMapOvr>
+  <p:timing>
+    <p:tnLst>
+      <p:par>
+        <p:cTn id="1" dur="indefinite" restart="never" nodeType="tmRoot"/>
+      </p:par>
+    </p:tnLst>
+  </p:timing>
+</p:sld>
+</file>
+
+<file path=ppt/slides/slide30.xml><?xml version="1.0" encoding="utf-8"?>
+<p:sld xmlns:a="http://schemas.openxmlformats.org/drawingml/2006/main" xmlns:r="http://schemas.openxmlformats.org/officeDocument/2006/relationships" xmlns:p="http://schemas.openxmlformats.org/presentationml/2006/main">
+  <p:cSld>
+    <p:spTree>
+      <p:nvGrpSpPr>
+        <p:cNvPr id="1" name=""/>
+        <p:cNvGrpSpPr/>
+        <p:nvPr/>
+      </p:nvGrpSpPr>
+      <p:grpSpPr>
+        <a:xfrm>
+          <a:off x="0" y="0"/>
+          <a:ext cx="0" cy="0"/>
+          <a:chOff x="0" y="0"/>
+          <a:chExt cx="0" cy="0"/>
+        </a:xfrm>
+      </p:grpSpPr>
+      <p:sp>
+        <p:nvSpPr>
+          <p:cNvPr id="4" name="[TextBox 3]"/>
+          <p:cNvSpPr txBox="1"/>
+          <p:nvPr/>
+        </p:nvSpPr>
+        <p:spPr>
+          <a:xfrm>
+            <a:off x="3206527" y="3119165"/>
+            <a:ext cx="5928508" cy="369332"/>
+          </a:xfrm>
+          <a:prstGeom prst="rect">
+            <a:avLst/>
+          </a:prstGeom>
+          <a:noFill/>
+        </p:spPr>
+        <p:txBody>
+          <a:bodyPr wrap="square" rtlCol="0">
+            <a:spAutoFit/>
+          </a:bodyPr>
+          <a:lstStyle/>
+          <a:p>
+            <a:r>
+              <a:rPr lang="en-US" dirty="0" smtClean="0">
+                <a:solidFill>
+                  <a:schemeClr val="accent6">
+                    <a:lumMod val="75000"/>
+                  </a:schemeClr>
+                </a:solidFill>
+              </a:rPr>
+              <a:t>Next, let’s try the </a:t>
+            </a:r>
+            <a:r>
+              <a:rPr lang="en-US" b="1" dirty="0" smtClean="0">
+                <a:solidFill>
+                  <a:schemeClr val="accent6">
+                    <a:lumMod val="75000"/>
+                  </a:schemeClr>
+                </a:solidFill>
+              </a:rPr>
+              <a:t>Colors Lab </a:t>
+            </a:r>
+            <a:r>
+              <a:rPr lang="en-US" dirty="0" smtClean="0">
+                <a:solidFill>
+                  <a:schemeClr val="accent6">
+                    <a:lumMod val="75000"/>
+                  </a:schemeClr>
+                </a:solidFill>
+              </a:rPr>
+              <a:t>feature</a:t>
+            </a:r>
+            <a:endParaRPr lang="en-SG" dirty="0">
+              <a:solidFill>
+                <a:schemeClr val="accent6">
+                  <a:lumMod val="75000"/>
+                </a:schemeClr>
+              </a:solidFill>
+            </a:endParaRPr>
+          </a:p>
+        </p:txBody>
+      </p:sp>
+      <p:sp>
+        <p:nvSpPr>
+          <p:cNvPr id="15" name="Rectangle 212"/>
+          <p:cNvSpPr/>
+          <p:nvPr/>
+        </p:nvSpPr>
+        <p:spPr>
+          <a:xfrm>
+            <a:off x="2336951" y="2819400"/>
+            <a:ext cx="838200" cy="838200"/>
+          </a:xfrm>
+          <a:prstGeom prst="rect">
+            <a:avLst/>
+          </a:prstGeom>
+          <a:noFill/>
+          <a:ln>
+            <a:noFill/>
+          </a:ln>
+        </p:spPr>
+        <p:style>
+          <a:lnRef idx="2">
+            <a:schemeClr val="accent1">
+              <a:shade val="50000"/>
+            </a:schemeClr>
+          </a:lnRef>
+          <a:fillRef idx="1">
+            <a:schemeClr val="accent1"/>
+          </a:fillRef>
+          <a:effectRef idx="0">
+            <a:schemeClr val="accent1"/>
+          </a:effectRef>
+          <a:fontRef idx="minor">
+            <a:schemeClr val="lt1"/>
+          </a:fontRef>
+        </p:style>
+        <p:txBody>
+          <a:bodyPr rtlCol="0" anchor="ctr"/>
+          <a:lstStyle/>
+          <a:p>
+            <a:pPr algn="ctr"/>
+            <a:endParaRPr lang="en-SG"/>
+          </a:p>
+        </p:txBody>
+      </p:sp>
+      <p:sp>
+        <p:nvSpPr>
+          <p:cNvPr id="17" name="Rectangle 4"/>
+          <p:cNvSpPr/>
+          <p:nvPr/>
+        </p:nvSpPr>
+        <p:spPr>
+          <a:xfrm rot="16200000">
+            <a:off x="2405906" y="2892603"/>
+            <a:ext cx="700291" cy="690781"/>
+          </a:xfrm>
+          <a:custGeom>
+            <a:avLst/>
+            <a:gdLst/>
+            <a:ahLst/>
+            <a:cxnLst/>
+            <a:rect l="l" t="t" r="r" b="b"/>
+            <a:pathLst>
+              <a:path w="1752603" h="1752600">
+                <a:moveTo>
+                  <a:pt x="533400" y="0"/>
+                </a:moveTo>
+                <a:lnTo>
+                  <a:pt x="533403" y="0"/>
+                </a:lnTo>
+                <a:lnTo>
+                  <a:pt x="1066800" y="0"/>
+                </a:lnTo>
+                <a:lnTo>
+                  <a:pt x="1752603" y="0"/>
+                </a:lnTo>
+                <a:lnTo>
+                  <a:pt x="1752603" y="1752600"/>
+                </a:lnTo>
+                <a:lnTo>
+                  <a:pt x="1219203" y="1752600"/>
+                </a:lnTo>
+                <a:lnTo>
+                  <a:pt x="533403" y="1752600"/>
+                </a:lnTo>
+                <a:lnTo>
+                  <a:pt x="3" y="1752600"/>
+                </a:lnTo>
+                <a:lnTo>
+                  <a:pt x="3" y="533430"/>
+                </a:lnTo>
+                <a:cubicBezTo>
+                  <a:pt x="0" y="533420"/>
+                  <a:pt x="0" y="533410"/>
+                  <a:pt x="0" y="533400"/>
+                </a:cubicBezTo>
+                <a:cubicBezTo>
+                  <a:pt x="0" y="238811"/>
+                  <a:pt x="238811" y="0"/>
+                  <a:pt x="533400" y="0"/>
+                </a:cubicBezTo>
+                <a:close/>
+              </a:path>
+            </a:pathLst>
+          </a:custGeom>
+          <a:noFill/>
+          <a:ln w="76200" cmpd="sng">
+            <a:solidFill>
+              <a:srgbClr val="0070C0"/>
+            </a:solidFill>
+            <a:miter lim="800000"/>
+          </a:ln>
+        </p:spPr>
+        <p:style>
+          <a:lnRef idx="2">
+            <a:schemeClr val="accent1">
+              <a:shade val="50000"/>
+            </a:schemeClr>
+          </a:lnRef>
+          <a:fillRef idx="1">
+            <a:schemeClr val="accent1"/>
+          </a:fillRef>
+          <a:effectRef idx="0">
+            <a:schemeClr val="accent1"/>
+          </a:effectRef>
+          <a:fontRef idx="minor">
+            <a:schemeClr val="lt1"/>
+          </a:fontRef>
+        </p:style>
+        <p:txBody>
+          <a:bodyPr rtlCol="0" anchor="ctr"/>
+          <a:lstStyle/>
+          <a:p>
+            <a:pPr algn="ctr"/>
+            <a:endParaRPr lang="en-US"/>
+          </a:p>
+        </p:txBody>
+      </p:sp>
+      <p:sp>
+        <p:nvSpPr>
+          <p:cNvPr id="18" name="Freeform 70"/>
+          <p:cNvSpPr/>
+          <p:nvPr/>
+        </p:nvSpPr>
+        <p:spPr>
+          <a:xfrm>
+            <a:off x="2810529" y="2878437"/>
+            <a:ext cx="282242" cy="315901"/>
+          </a:xfrm>
+          <a:custGeom>
+            <a:avLst/>
+            <a:gdLst>
+              <a:gd name="connsiteX0" fmla="*/ 0 w 266700"/>
+              <a:gd name="connsiteY0" fmla="*/ 23813 h 302419"/>
+              <a:gd name="connsiteX1" fmla="*/ 259556 w 266700"/>
+              <a:gd name="connsiteY1" fmla="*/ 302419 h 302419"/>
+              <a:gd name="connsiteX2" fmla="*/ 266700 w 266700"/>
+              <a:gd name="connsiteY2" fmla="*/ 0 h 302419"/>
+              <a:gd name="connsiteX3" fmla="*/ 0 w 266700"/>
+              <a:gd name="connsiteY3" fmla="*/ 23813 h 302419"/>
+            </a:gdLst>
+            <a:ahLst/>
+            <a:cxnLst>
+              <a:cxn ang="0">
+                <a:pos x="connsiteX0" y="connsiteY0"/>
+              </a:cxn>
+              <a:cxn ang="0">
+                <a:pos x="connsiteX1" y="connsiteY1"/>
+              </a:cxn>
+              <a:cxn ang="0">
+                <a:pos x="connsiteX2" y="connsiteY2"/>
+              </a:cxn>
+              <a:cxn ang="0">
+                <a:pos x="connsiteX3" y="connsiteY3"/>
+              </a:cxn>
+            </a:cxnLst>
+            <a:rect l="l" t="t" r="r" b="b"/>
+            <a:pathLst>
+              <a:path w="266700" h="302419">
+                <a:moveTo>
+                  <a:pt x="0" y="23813"/>
+                </a:moveTo>
+                <a:lnTo>
+                  <a:pt x="259556" y="302419"/>
+                </a:lnTo>
+                <a:lnTo>
+                  <a:pt x="266700" y="0"/>
+                </a:lnTo>
+                <a:lnTo>
+                  <a:pt x="0" y="23813"/>
+                </a:lnTo>
+                <a:close/>
+              </a:path>
+            </a:pathLst>
+          </a:custGeom>
+          <a:solidFill>
+            <a:srgbClr val="0070C0"/>
+          </a:solidFill>
+          <a:ln>
+            <a:noFill/>
+          </a:ln>
+        </p:spPr>
+        <p:style>
+          <a:lnRef idx="2">
+            <a:schemeClr val="accent1">
+              <a:shade val="50000"/>
+            </a:schemeClr>
+          </a:lnRef>
+          <a:fillRef idx="1">
+            <a:schemeClr val="accent1"/>
+          </a:fillRef>
+          <a:effectRef idx="0">
+            <a:schemeClr val="accent1"/>
+          </a:effectRef>
+          <a:fontRef idx="minor">
+            <a:schemeClr val="lt1"/>
+          </a:fontRef>
+        </p:style>
+        <p:txBody>
+          <a:bodyPr rtlCol="0" anchor="ctr"/>
+          <a:lstStyle/>
+          <a:p>
+            <a:pPr algn="ctr"/>
+            <a:endParaRPr lang="en-SG"/>
+          </a:p>
+        </p:txBody>
+      </p:sp>
+      <p:grpSp>
+        <p:nvGrpSpPr>
+          <p:cNvPr id="19" name="Group 69"/>
+          <p:cNvGrpSpPr/>
+          <p:nvPr/>
+        </p:nvGrpSpPr>
+        <p:grpSpPr>
+          <a:xfrm rot="2832674">
+            <a:off x="2559710" y="2958969"/>
+            <a:ext cx="354223" cy="575756"/>
+            <a:chOff x="2833184" y="5597530"/>
+            <a:chExt cx="354106" cy="575566"/>
+          </a:xfrm>
+        </p:grpSpPr>
+        <p:sp>
+          <p:nvSpPr>
+            <p:cNvPr id="20" name="Rounded Rectangle 215"/>
+            <p:cNvSpPr/>
+            <p:nvPr/>
+          </p:nvSpPr>
+          <p:spPr>
+            <a:xfrm>
+              <a:off x="2833184" y="5833301"/>
+              <a:ext cx="354106" cy="339795"/>
+            </a:xfrm>
+            <a:custGeom>
+              <a:avLst/>
+              <a:gdLst>
+                <a:gd name="connsiteX0" fmla="*/ 0 w 277919"/>
+                <a:gd name="connsiteY0" fmla="*/ 0 h 246465"/>
+                <a:gd name="connsiteX1" fmla="*/ 277919 w 277919"/>
+                <a:gd name="connsiteY1" fmla="*/ 0 h 246465"/>
+                <a:gd name="connsiteX2" fmla="*/ 277919 w 277919"/>
+                <a:gd name="connsiteY2" fmla="*/ 29657 h 246465"/>
+                <a:gd name="connsiteX3" fmla="*/ 243947 w 277919"/>
+                <a:gd name="connsiteY3" fmla="*/ 63629 h 246465"/>
+                <a:gd name="connsiteX4" fmla="*/ 168190 w 277919"/>
+                <a:gd name="connsiteY4" fmla="*/ 63629 h 246465"/>
+                <a:gd name="connsiteX5" fmla="*/ 183567 w 277919"/>
+                <a:gd name="connsiteY5" fmla="*/ 246465 h 246465"/>
+                <a:gd name="connsiteX6" fmla="*/ 94350 w 277919"/>
+                <a:gd name="connsiteY6" fmla="*/ 246465 h 246465"/>
+                <a:gd name="connsiteX7" fmla="*/ 109728 w 277919"/>
+                <a:gd name="connsiteY7" fmla="*/ 63629 h 246465"/>
+                <a:gd name="connsiteX8" fmla="*/ 33972 w 277919"/>
+                <a:gd name="connsiteY8" fmla="*/ 63629 h 246465"/>
+                <a:gd name="connsiteX9" fmla="*/ 0 w 277919"/>
+                <a:gd name="connsiteY9" fmla="*/ 29657 h 246465"/>
+                <a:gd name="connsiteX10" fmla="*/ 0 w 277919"/>
+                <a:gd name="connsiteY10" fmla="*/ 0 h 246465"/>
+                <a:gd name="connsiteX0" fmla="*/ 0 w 277919"/>
+                <a:gd name="connsiteY0" fmla="*/ 0 h 246465"/>
+                <a:gd name="connsiteX1" fmla="*/ 277919 w 277919"/>
+                <a:gd name="connsiteY1" fmla="*/ 0 h 246465"/>
+                <a:gd name="connsiteX2" fmla="*/ 277919 w 277919"/>
+                <a:gd name="connsiteY2" fmla="*/ 29657 h 246465"/>
+                <a:gd name="connsiteX3" fmla="*/ 243947 w 277919"/>
+                <a:gd name="connsiteY3" fmla="*/ 63629 h 246465"/>
+                <a:gd name="connsiteX4" fmla="*/ 168190 w 277919"/>
+                <a:gd name="connsiteY4" fmla="*/ 63629 h 246465"/>
+                <a:gd name="connsiteX5" fmla="*/ 183567 w 277919"/>
+                <a:gd name="connsiteY5" fmla="*/ 246465 h 246465"/>
+                <a:gd name="connsiteX6" fmla="*/ 94350 w 277919"/>
+                <a:gd name="connsiteY6" fmla="*/ 246465 h 246465"/>
+                <a:gd name="connsiteX7" fmla="*/ 109728 w 277919"/>
+                <a:gd name="connsiteY7" fmla="*/ 63629 h 246465"/>
+                <a:gd name="connsiteX8" fmla="*/ 33972 w 277919"/>
+                <a:gd name="connsiteY8" fmla="*/ 63629 h 246465"/>
+                <a:gd name="connsiteX9" fmla="*/ 0 w 277919"/>
+                <a:gd name="connsiteY9" fmla="*/ 29657 h 246465"/>
+                <a:gd name="connsiteX10" fmla="*/ 0 w 277919"/>
+                <a:gd name="connsiteY10" fmla="*/ 0 h 246465"/>
+              </a:gdLst>
+              <a:ahLst/>
+              <a:cxnLst>
+                <a:cxn ang="0">
+                  <a:pos x="connsiteX0" y="connsiteY0"/>
+                </a:cxn>
+                <a:cxn ang="0">
+                  <a:pos x="connsiteX1" y="connsiteY1"/>
+                </a:cxn>
+                <a:cxn ang="0">
+                  <a:pos x="connsiteX2" y="connsiteY2"/>
+                </a:cxn>
+                <a:cxn ang="0">
+                  <a:pos x="connsiteX3" y="connsiteY3"/>
+                </a:cxn>
+                <a:cxn ang="0">
+                  <a:pos x="connsiteX4" y="connsiteY4"/>
+                </a:cxn>
+                <a:cxn ang="0">
+                  <a:pos x="connsiteX5" y="connsiteY5"/>
+                </a:cxn>
+                <a:cxn ang="0">
+                  <a:pos x="connsiteX6" y="connsiteY6"/>
+                </a:cxn>
+                <a:cxn ang="0">
+                  <a:pos x="connsiteX7" y="connsiteY7"/>
+                </a:cxn>
+                <a:cxn ang="0">
+                  <a:pos x="connsiteX8" y="connsiteY8"/>
+                </a:cxn>
+                <a:cxn ang="0">
+                  <a:pos x="connsiteX9" y="connsiteY9"/>
+                </a:cxn>
+                <a:cxn ang="0">
+                  <a:pos x="connsiteX10" y="connsiteY10"/>
+                </a:cxn>
+              </a:cxnLst>
+              <a:rect l="l" t="t" r="r" b="b"/>
+              <a:pathLst>
+                <a:path w="277919" h="246465">
+                  <a:moveTo>
+                    <a:pt x="0" y="0"/>
+                  </a:moveTo>
+                  <a:lnTo>
+                    <a:pt x="277919" y="0"/>
+                  </a:lnTo>
+                  <a:lnTo>
+                    <a:pt x="277919" y="29657"/>
+                  </a:lnTo>
+                  <a:cubicBezTo>
+                    <a:pt x="277919" y="48419"/>
+                    <a:pt x="262709" y="63629"/>
+                    <a:pt x="243947" y="63629"/>
+                  </a:cubicBezTo>
+                  <a:lnTo>
+                    <a:pt x="168190" y="63629"/>
+                  </a:lnTo>
+                  <a:cubicBezTo>
+                    <a:pt x="158127" y="94102"/>
+                    <a:pt x="195874" y="215992"/>
+                    <a:pt x="183567" y="246465"/>
+                  </a:cubicBezTo>
+                  <a:cubicBezTo>
+                    <a:pt x="171260" y="276938"/>
+                    <a:pt x="106657" y="276938"/>
+                    <a:pt x="94350" y="246465"/>
+                  </a:cubicBezTo>
+                  <a:cubicBezTo>
+                    <a:pt x="82043" y="215992"/>
+                    <a:pt x="119791" y="94102"/>
+                    <a:pt x="109728" y="63629"/>
+                  </a:cubicBezTo>
+                  <a:lnTo>
+                    <a:pt x="33972" y="63629"/>
+                  </a:lnTo>
+                  <a:cubicBezTo>
+                    <a:pt x="15210" y="63629"/>
+                    <a:pt x="0" y="48419"/>
+                    <a:pt x="0" y="29657"/>
+                  </a:cubicBezTo>
+                  <a:lnTo>
+                    <a:pt x="0" y="0"/>
+                  </a:lnTo>
+                  <a:close/>
+                </a:path>
+              </a:pathLst>
+            </a:custGeom>
+            <a:solidFill>
+              <a:schemeClr val="accent6"/>
+            </a:solidFill>
+            <a:ln w="19050">
+              <a:solidFill>
+                <a:schemeClr val="bg1"/>
+              </a:solidFill>
+            </a:ln>
+            <a:effectLst/>
+          </p:spPr>
+          <p:style>
+            <a:lnRef idx="2">
+              <a:schemeClr val="accent1">
+                <a:shade val="50000"/>
+              </a:schemeClr>
+            </a:lnRef>
+            <a:fillRef idx="1">
+              <a:schemeClr val="accent1"/>
+            </a:fillRef>
+            <a:effectRef idx="0">
+              <a:schemeClr val="accent1"/>
+            </a:effectRef>
+            <a:fontRef idx="minor">
+              <a:schemeClr val="lt1"/>
+            </a:fontRef>
+          </p:style>
+          <p:txBody>
+            <a:bodyPr rtlCol="0" anchor="ctr"/>
+            <a:lstStyle/>
+            <a:p>
+              <a:pPr algn="ctr"/>
+              <a:endParaRPr lang="en-SG"/>
+            </a:p>
+          </p:txBody>
+        </p:sp>
+        <p:sp>
+          <p:nvSpPr>
+            <p:cNvPr id="21" name="Rectangle 67"/>
+            <p:cNvSpPr/>
+            <p:nvPr/>
+          </p:nvSpPr>
+          <p:spPr>
+            <a:xfrm>
+              <a:off x="2833184" y="5597530"/>
+              <a:ext cx="354106" cy="230801"/>
+            </a:xfrm>
+            <a:prstGeom prst="rect">
+              <a:avLst/>
+            </a:prstGeom>
+            <a:solidFill>
+              <a:srgbClr val="0070C0"/>
+            </a:solidFill>
+            <a:ln w="19050">
+              <a:solidFill>
+                <a:schemeClr val="bg1"/>
+              </a:solidFill>
+            </a:ln>
+            <a:effectLst/>
+          </p:spPr>
+          <p:style>
+            <a:lnRef idx="2">
+              <a:schemeClr val="accent1">
+                <a:shade val="50000"/>
+              </a:schemeClr>
+            </a:lnRef>
+            <a:fillRef idx="1">
+              <a:schemeClr val="accent1"/>
+            </a:fillRef>
+            <a:effectRef idx="0">
+              <a:schemeClr val="accent1"/>
+            </a:effectRef>
+            <a:fontRef idx="minor">
+              <a:schemeClr val="lt1"/>
+            </a:fontRef>
+          </p:style>
+          <p:txBody>
+            <a:bodyPr rtlCol="0" anchor="ctr"/>
+            <a:lstStyle/>
+            <a:p>
+              <a:pPr algn="ctr"/>
+              <a:endParaRPr lang="en-SG"/>
+            </a:p>
+          </p:txBody>
+        </p:sp>
+        <p:sp>
+          <p:nvSpPr>
+            <p:cNvPr id="22" name="Flowchart: Manual Input 68"/>
+            <p:cNvSpPr/>
+            <p:nvPr/>
+          </p:nvSpPr>
+          <p:spPr>
+            <a:xfrm>
+              <a:off x="2833184" y="5657689"/>
+              <a:ext cx="354106" cy="175610"/>
+            </a:xfrm>
+            <a:custGeom>
+              <a:avLst/>
+              <a:gdLst>
+                <a:gd name="connsiteX0" fmla="*/ 0 w 10000"/>
+                <a:gd name="connsiteY0" fmla="*/ 2000 h 10000"/>
+                <a:gd name="connsiteX1" fmla="*/ 10000 w 10000"/>
+                <a:gd name="connsiteY1" fmla="*/ 0 h 10000"/>
+                <a:gd name="connsiteX2" fmla="*/ 10000 w 10000"/>
+                <a:gd name="connsiteY2" fmla="*/ 10000 h 10000"/>
+                <a:gd name="connsiteX3" fmla="*/ 0 w 10000"/>
+                <a:gd name="connsiteY3" fmla="*/ 10000 h 10000"/>
+                <a:gd name="connsiteX4" fmla="*/ 0 w 10000"/>
+                <a:gd name="connsiteY4" fmla="*/ 2000 h 10000"/>
+                <a:gd name="connsiteX0" fmla="*/ 0 w 10000"/>
+                <a:gd name="connsiteY0" fmla="*/ 2000 h 10000"/>
+                <a:gd name="connsiteX1" fmla="*/ 2906 w 10000"/>
+                <a:gd name="connsiteY1" fmla="*/ 1528 h 10000"/>
+                <a:gd name="connsiteX2" fmla="*/ 10000 w 10000"/>
+                <a:gd name="connsiteY2" fmla="*/ 0 h 10000"/>
+                <a:gd name="connsiteX3" fmla="*/ 10000 w 10000"/>
+                <a:gd name="connsiteY3" fmla="*/ 10000 h 10000"/>
+                <a:gd name="connsiteX4" fmla="*/ 0 w 10000"/>
+                <a:gd name="connsiteY4" fmla="*/ 10000 h 10000"/>
+                <a:gd name="connsiteX5" fmla="*/ 0 w 10000"/>
+                <a:gd name="connsiteY5" fmla="*/ 2000 h 10000"/>
+                <a:gd name="connsiteX0" fmla="*/ 0 w 10000"/>
+                <a:gd name="connsiteY0" fmla="*/ 2000 h 10000"/>
+                <a:gd name="connsiteX1" fmla="*/ 2906 w 10000"/>
+                <a:gd name="connsiteY1" fmla="*/ 1528 h 10000"/>
+                <a:gd name="connsiteX2" fmla="*/ 6470 w 10000"/>
+                <a:gd name="connsiteY2" fmla="*/ 652 h 10000"/>
+                <a:gd name="connsiteX3" fmla="*/ 10000 w 10000"/>
+                <a:gd name="connsiteY3" fmla="*/ 0 h 10000"/>
+                <a:gd name="connsiteX4" fmla="*/ 10000 w 10000"/>
+                <a:gd name="connsiteY4" fmla="*/ 10000 h 10000"/>
+                <a:gd name="connsiteX5" fmla="*/ 0 w 10000"/>
+                <a:gd name="connsiteY5" fmla="*/ 10000 h 10000"/>
+                <a:gd name="connsiteX6" fmla="*/ 0 w 10000"/>
+                <a:gd name="connsiteY6" fmla="*/ 2000 h 10000"/>
+                <a:gd name="connsiteX0" fmla="*/ 0 w 10000"/>
+                <a:gd name="connsiteY0" fmla="*/ 7262 h 15262"/>
+                <a:gd name="connsiteX1" fmla="*/ 2906 w 10000"/>
+                <a:gd name="connsiteY1" fmla="*/ 6790 h 15262"/>
+                <a:gd name="connsiteX2" fmla="*/ 6470 w 10000"/>
+                <a:gd name="connsiteY2" fmla="*/ 0 h 15262"/>
+                <a:gd name="connsiteX3" fmla="*/ 10000 w 10000"/>
+                <a:gd name="connsiteY3" fmla="*/ 5262 h 15262"/>
+                <a:gd name="connsiteX4" fmla="*/ 10000 w 10000"/>
+                <a:gd name="connsiteY4" fmla="*/ 15262 h 15262"/>
+                <a:gd name="connsiteX5" fmla="*/ 0 w 10000"/>
+                <a:gd name="connsiteY5" fmla="*/ 15262 h 15262"/>
+                <a:gd name="connsiteX6" fmla="*/ 0 w 10000"/>
+                <a:gd name="connsiteY6" fmla="*/ 7262 h 15262"/>
+                <a:gd name="connsiteX0" fmla="*/ 0 w 10000"/>
+                <a:gd name="connsiteY0" fmla="*/ 7262 h 15262"/>
+                <a:gd name="connsiteX1" fmla="*/ 2772 w 10000"/>
+                <a:gd name="connsiteY1" fmla="*/ 3943 h 15262"/>
+                <a:gd name="connsiteX2" fmla="*/ 6470 w 10000"/>
+                <a:gd name="connsiteY2" fmla="*/ 0 h 15262"/>
+                <a:gd name="connsiteX3" fmla="*/ 10000 w 10000"/>
+                <a:gd name="connsiteY3" fmla="*/ 5262 h 15262"/>
+                <a:gd name="connsiteX4" fmla="*/ 10000 w 10000"/>
+                <a:gd name="connsiteY4" fmla="*/ 15262 h 15262"/>
+                <a:gd name="connsiteX5" fmla="*/ 0 w 10000"/>
+                <a:gd name="connsiteY5" fmla="*/ 15262 h 15262"/>
+                <a:gd name="connsiteX6" fmla="*/ 0 w 10000"/>
+                <a:gd name="connsiteY6" fmla="*/ 7262 h 15262"/>
+                <a:gd name="connsiteX0" fmla="*/ 0 w 10000"/>
+                <a:gd name="connsiteY0" fmla="*/ 7262 h 15262"/>
+                <a:gd name="connsiteX1" fmla="*/ 2772 w 10000"/>
+                <a:gd name="connsiteY1" fmla="*/ 3943 h 15262"/>
+                <a:gd name="connsiteX2" fmla="*/ 4453 w 10000"/>
+                <a:gd name="connsiteY2" fmla="*/ 2190 h 15262"/>
+                <a:gd name="connsiteX3" fmla="*/ 6470 w 10000"/>
+                <a:gd name="connsiteY3" fmla="*/ 0 h 15262"/>
+                <a:gd name="connsiteX4" fmla="*/ 10000 w 10000"/>
+                <a:gd name="connsiteY4" fmla="*/ 5262 h 15262"/>
+                <a:gd name="connsiteX5" fmla="*/ 10000 w 10000"/>
+                <a:gd name="connsiteY5" fmla="*/ 15262 h 15262"/>
+                <a:gd name="connsiteX6" fmla="*/ 0 w 10000"/>
+                <a:gd name="connsiteY6" fmla="*/ 15262 h 15262"/>
+                <a:gd name="connsiteX7" fmla="*/ 0 w 10000"/>
+                <a:gd name="connsiteY7" fmla="*/ 7262 h 15262"/>
+                <a:gd name="connsiteX0" fmla="*/ 0 w 10000"/>
+                <a:gd name="connsiteY0" fmla="*/ 7262 h 15262"/>
+                <a:gd name="connsiteX1" fmla="*/ 2772 w 10000"/>
+                <a:gd name="connsiteY1" fmla="*/ 3943 h 15262"/>
+                <a:gd name="connsiteX2" fmla="*/ 4722 w 10000"/>
+                <a:gd name="connsiteY2" fmla="*/ 3942 h 15262"/>
+                <a:gd name="connsiteX3" fmla="*/ 6470 w 10000"/>
+                <a:gd name="connsiteY3" fmla="*/ 0 h 15262"/>
+                <a:gd name="connsiteX4" fmla="*/ 10000 w 10000"/>
+                <a:gd name="connsiteY4" fmla="*/ 5262 h 15262"/>
+                <a:gd name="connsiteX5" fmla="*/ 10000 w 10000"/>
+                <a:gd name="connsiteY5" fmla="*/ 15262 h 15262"/>
+                <a:gd name="connsiteX6" fmla="*/ 0 w 10000"/>
+                <a:gd name="connsiteY6" fmla="*/ 15262 h 15262"/>
+                <a:gd name="connsiteX7" fmla="*/ 0 w 10000"/>
+                <a:gd name="connsiteY7" fmla="*/ 7262 h 15262"/>
+                <a:gd name="connsiteX0" fmla="*/ 0 w 10000"/>
+                <a:gd name="connsiteY0" fmla="*/ 7262 h 15262"/>
+                <a:gd name="connsiteX1" fmla="*/ 2772 w 10000"/>
+                <a:gd name="connsiteY1" fmla="*/ 3943 h 15262"/>
+                <a:gd name="connsiteX2" fmla="*/ 4722 w 10000"/>
+                <a:gd name="connsiteY2" fmla="*/ 3942 h 15262"/>
+                <a:gd name="connsiteX3" fmla="*/ 6470 w 10000"/>
+                <a:gd name="connsiteY3" fmla="*/ 0 h 15262"/>
+                <a:gd name="connsiteX4" fmla="*/ 10000 w 10000"/>
+                <a:gd name="connsiteY4" fmla="*/ 5262 h 15262"/>
+                <a:gd name="connsiteX5" fmla="*/ 10000 w 10000"/>
+                <a:gd name="connsiteY5" fmla="*/ 15262 h 15262"/>
+                <a:gd name="connsiteX6" fmla="*/ 0 w 10000"/>
+                <a:gd name="connsiteY6" fmla="*/ 15262 h 15262"/>
+                <a:gd name="connsiteX7" fmla="*/ 0 w 10000"/>
+                <a:gd name="connsiteY7" fmla="*/ 7262 h 15262"/>
+                <a:gd name="connsiteX0" fmla="*/ 0 w 10000"/>
+                <a:gd name="connsiteY0" fmla="*/ 7262 h 15262"/>
+                <a:gd name="connsiteX1" fmla="*/ 2772 w 10000"/>
+                <a:gd name="connsiteY1" fmla="*/ 3943 h 15262"/>
+                <a:gd name="connsiteX2" fmla="*/ 4722 w 10000"/>
+                <a:gd name="connsiteY2" fmla="*/ 3942 h 15262"/>
+                <a:gd name="connsiteX3" fmla="*/ 6470 w 10000"/>
+                <a:gd name="connsiteY3" fmla="*/ 0 h 15262"/>
+                <a:gd name="connsiteX4" fmla="*/ 10000 w 10000"/>
+                <a:gd name="connsiteY4" fmla="*/ 5262 h 15262"/>
+                <a:gd name="connsiteX5" fmla="*/ 10000 w 10000"/>
+                <a:gd name="connsiteY5" fmla="*/ 15262 h 15262"/>
+                <a:gd name="connsiteX6" fmla="*/ 0 w 10000"/>
+                <a:gd name="connsiteY6" fmla="*/ 15262 h 15262"/>
+                <a:gd name="connsiteX7" fmla="*/ 0 w 10000"/>
+                <a:gd name="connsiteY7" fmla="*/ 7262 h 15262"/>
+                <a:gd name="connsiteX0" fmla="*/ 0 w 10000"/>
+                <a:gd name="connsiteY0" fmla="*/ 7518 h 15518"/>
+                <a:gd name="connsiteX1" fmla="*/ 2772 w 10000"/>
+                <a:gd name="connsiteY1" fmla="*/ 4199 h 15518"/>
+                <a:gd name="connsiteX2" fmla="*/ 4722 w 10000"/>
+                <a:gd name="connsiteY2" fmla="*/ 4198 h 15518"/>
+                <a:gd name="connsiteX3" fmla="*/ 6470 w 10000"/>
+                <a:gd name="connsiteY3" fmla="*/ 256 h 15518"/>
+                <a:gd name="connsiteX4" fmla="*/ 10000 w 10000"/>
+                <a:gd name="connsiteY4" fmla="*/ 5518 h 15518"/>
+                <a:gd name="connsiteX5" fmla="*/ 10000 w 10000"/>
+                <a:gd name="connsiteY5" fmla="*/ 15518 h 15518"/>
+                <a:gd name="connsiteX6" fmla="*/ 0 w 10000"/>
+                <a:gd name="connsiteY6" fmla="*/ 15518 h 15518"/>
+                <a:gd name="connsiteX7" fmla="*/ 0 w 10000"/>
+                <a:gd name="connsiteY7" fmla="*/ 7518 h 15518"/>
+                <a:gd name="connsiteX0" fmla="*/ 0 w 10000"/>
+                <a:gd name="connsiteY0" fmla="*/ 7518 h 15518"/>
+                <a:gd name="connsiteX1" fmla="*/ 2772 w 10000"/>
+                <a:gd name="connsiteY1" fmla="*/ 4199 h 15518"/>
+                <a:gd name="connsiteX2" fmla="*/ 4722 w 10000"/>
+                <a:gd name="connsiteY2" fmla="*/ 4198 h 15518"/>
+                <a:gd name="connsiteX3" fmla="*/ 6470 w 10000"/>
+                <a:gd name="connsiteY3" fmla="*/ 256 h 15518"/>
+                <a:gd name="connsiteX4" fmla="*/ 10000 w 10000"/>
+                <a:gd name="connsiteY4" fmla="*/ 5518 h 15518"/>
+                <a:gd name="connsiteX5" fmla="*/ 10000 w 10000"/>
+                <a:gd name="connsiteY5" fmla="*/ 15518 h 15518"/>
+                <a:gd name="connsiteX6" fmla="*/ 0 w 10000"/>
+                <a:gd name="connsiteY6" fmla="*/ 15518 h 15518"/>
+                <a:gd name="connsiteX7" fmla="*/ 0 w 10000"/>
+                <a:gd name="connsiteY7" fmla="*/ 7518 h 15518"/>
+                <a:gd name="connsiteX0" fmla="*/ 0 w 10000"/>
+                <a:gd name="connsiteY0" fmla="*/ 7282 h 15282"/>
+                <a:gd name="connsiteX1" fmla="*/ 2772 w 10000"/>
+                <a:gd name="connsiteY1" fmla="*/ 3963 h 15282"/>
+                <a:gd name="connsiteX2" fmla="*/ 4722 w 10000"/>
+                <a:gd name="connsiteY2" fmla="*/ 7028 h 15282"/>
+                <a:gd name="connsiteX3" fmla="*/ 6470 w 10000"/>
+                <a:gd name="connsiteY3" fmla="*/ 20 h 15282"/>
+                <a:gd name="connsiteX4" fmla="*/ 10000 w 10000"/>
+                <a:gd name="connsiteY4" fmla="*/ 5282 h 15282"/>
+                <a:gd name="connsiteX5" fmla="*/ 10000 w 10000"/>
+                <a:gd name="connsiteY5" fmla="*/ 15282 h 15282"/>
+                <a:gd name="connsiteX6" fmla="*/ 0 w 10000"/>
+                <a:gd name="connsiteY6" fmla="*/ 15282 h 15282"/>
+                <a:gd name="connsiteX7" fmla="*/ 0 w 10000"/>
+                <a:gd name="connsiteY7" fmla="*/ 7282 h 15282"/>
+                <a:gd name="connsiteX0" fmla="*/ 0 w 10000"/>
+                <a:gd name="connsiteY0" fmla="*/ 7282 h 15282"/>
+                <a:gd name="connsiteX1" fmla="*/ 2772 w 10000"/>
+                <a:gd name="connsiteY1" fmla="*/ 3963 h 15282"/>
+                <a:gd name="connsiteX2" fmla="*/ 4722 w 10000"/>
+                <a:gd name="connsiteY2" fmla="*/ 7028 h 15282"/>
+                <a:gd name="connsiteX3" fmla="*/ 6470 w 10000"/>
+                <a:gd name="connsiteY3" fmla="*/ 20 h 15282"/>
+                <a:gd name="connsiteX4" fmla="*/ 10000 w 10000"/>
+                <a:gd name="connsiteY4" fmla="*/ 5282 h 15282"/>
+                <a:gd name="connsiteX5" fmla="*/ 10000 w 10000"/>
+                <a:gd name="connsiteY5" fmla="*/ 15282 h 15282"/>
+                <a:gd name="connsiteX6" fmla="*/ 0 w 10000"/>
+                <a:gd name="connsiteY6" fmla="*/ 15282 h 15282"/>
+                <a:gd name="connsiteX7" fmla="*/ 0 w 10000"/>
+                <a:gd name="connsiteY7" fmla="*/ 7282 h 15282"/>
+                <a:gd name="connsiteX0" fmla="*/ 0 w 10000"/>
+                <a:gd name="connsiteY0" fmla="*/ 8153 h 16153"/>
+                <a:gd name="connsiteX1" fmla="*/ 2772 w 10000"/>
+                <a:gd name="connsiteY1" fmla="*/ 4834 h 16153"/>
+                <a:gd name="connsiteX2" fmla="*/ 4722 w 10000"/>
+                <a:gd name="connsiteY2" fmla="*/ 7899 h 16153"/>
+                <a:gd name="connsiteX3" fmla="*/ 6941 w 10000"/>
+                <a:gd name="connsiteY3" fmla="*/ 15 h 16153"/>
+                <a:gd name="connsiteX4" fmla="*/ 10000 w 10000"/>
+                <a:gd name="connsiteY4" fmla="*/ 6153 h 16153"/>
+                <a:gd name="connsiteX5" fmla="*/ 10000 w 10000"/>
+                <a:gd name="connsiteY5" fmla="*/ 16153 h 16153"/>
+                <a:gd name="connsiteX6" fmla="*/ 0 w 10000"/>
+                <a:gd name="connsiteY6" fmla="*/ 16153 h 16153"/>
+                <a:gd name="connsiteX7" fmla="*/ 0 w 10000"/>
+                <a:gd name="connsiteY7" fmla="*/ 8153 h 16153"/>
+                <a:gd name="connsiteX0" fmla="*/ 0 w 10000"/>
+                <a:gd name="connsiteY0" fmla="*/ 8153 h 16153"/>
+                <a:gd name="connsiteX1" fmla="*/ 2100 w 10000"/>
+                <a:gd name="connsiteY1" fmla="*/ 3958 h 16153"/>
+                <a:gd name="connsiteX2" fmla="*/ 4722 w 10000"/>
+                <a:gd name="connsiteY2" fmla="*/ 7899 h 16153"/>
+                <a:gd name="connsiteX3" fmla="*/ 6941 w 10000"/>
+                <a:gd name="connsiteY3" fmla="*/ 15 h 16153"/>
+                <a:gd name="connsiteX4" fmla="*/ 10000 w 10000"/>
+                <a:gd name="connsiteY4" fmla="*/ 6153 h 16153"/>
+                <a:gd name="connsiteX5" fmla="*/ 10000 w 10000"/>
+                <a:gd name="connsiteY5" fmla="*/ 16153 h 16153"/>
+                <a:gd name="connsiteX6" fmla="*/ 0 w 10000"/>
+                <a:gd name="connsiteY6" fmla="*/ 16153 h 16153"/>
+                <a:gd name="connsiteX7" fmla="*/ 0 w 10000"/>
+                <a:gd name="connsiteY7" fmla="*/ 8153 h 16153"/>
+              </a:gdLst>
+              <a:ahLst/>
+              <a:cxnLst>
+                <a:cxn ang="0">
+                  <a:pos x="connsiteX0" y="connsiteY0"/>
+                </a:cxn>
+                <a:cxn ang="0">
+                  <a:pos x="connsiteX1" y="connsiteY1"/>
+                </a:cxn>
+                <a:cxn ang="0">
+                  <a:pos x="connsiteX2" y="connsiteY2"/>
+                </a:cxn>
+                <a:cxn ang="0">
+                  <a:pos x="connsiteX3" y="connsiteY3"/>
+                </a:cxn>
+                <a:cxn ang="0">
+                  <a:pos x="connsiteX4" y="connsiteY4"/>
+                </a:cxn>
+                <a:cxn ang="0">
+                  <a:pos x="connsiteX5" y="connsiteY5"/>
+                </a:cxn>
+                <a:cxn ang="0">
+                  <a:pos x="connsiteX6" y="connsiteY6"/>
+                </a:cxn>
+                <a:cxn ang="0">
+                  <a:pos x="connsiteX7" y="connsiteY7"/>
+                </a:cxn>
+              </a:cxnLst>
+              <a:rect l="l" t="t" r="r" b="b"/>
+              <a:pathLst>
+                <a:path w="10000" h="16153">
+                  <a:moveTo>
+                    <a:pt x="0" y="8153"/>
+                  </a:moveTo>
+                  <a:cubicBezTo>
+                    <a:pt x="462" y="6267"/>
+                    <a:pt x="1313" y="4000"/>
+                    <a:pt x="2100" y="3958"/>
+                  </a:cubicBezTo>
+                  <a:cubicBezTo>
+                    <a:pt x="2887" y="3916"/>
+                    <a:pt x="3915" y="8556"/>
+                    <a:pt x="4722" y="7899"/>
+                  </a:cubicBezTo>
+                  <a:cubicBezTo>
+                    <a:pt x="5529" y="7242"/>
+                    <a:pt x="6061" y="306"/>
+                    <a:pt x="6941" y="15"/>
+                  </a:cubicBezTo>
+                  <a:cubicBezTo>
+                    <a:pt x="7821" y="-276"/>
+                    <a:pt x="9412" y="3609"/>
+                    <a:pt x="10000" y="6153"/>
+                  </a:cubicBezTo>
+                  <a:lnTo>
+                    <a:pt x="10000" y="16153"/>
+                  </a:lnTo>
+                  <a:lnTo>
+                    <a:pt x="0" y="16153"/>
+                  </a:lnTo>
+                  <a:lnTo>
+                    <a:pt x="0" y="8153"/>
+                  </a:lnTo>
+                  <a:close/>
+                </a:path>
+              </a:pathLst>
+            </a:custGeom>
+            <a:solidFill>
+              <a:schemeClr val="accent6"/>
+            </a:solidFill>
+            <a:ln w="19050">
+              <a:solidFill>
+                <a:schemeClr val="bg1"/>
+              </a:solidFill>
+            </a:ln>
+            <a:effectLst/>
+          </p:spPr>
+          <p:style>
+            <a:lnRef idx="2">
+              <a:schemeClr val="accent1">
+                <a:shade val="50000"/>
+              </a:schemeClr>
+            </a:lnRef>
+            <a:fillRef idx="1">
+              <a:schemeClr val="accent1"/>
+            </a:fillRef>
+            <a:effectRef idx="0">
+              <a:schemeClr val="accent1"/>
+            </a:effectRef>
+            <a:fontRef idx="minor">
+              <a:schemeClr val="lt1"/>
+            </a:fontRef>
+          </p:style>
+          <p:txBody>
+            <a:bodyPr rtlCol="0" anchor="ctr"/>
+            <a:lstStyle/>
+            <a:p>
+              <a:pPr algn="ctr"/>
+              <a:endParaRPr lang="en-SG"/>
+            </a:p>
+          </p:txBody>
+        </p:sp>
+      </p:grpSp>
+    </p:spTree>
+    <p:extLst>
+      <p:ext uri="{BB962C8B-B14F-4D97-AF65-F5344CB8AC3E}">
+        <p14:creationId xmlns:p14="http://schemas.microsoft.com/office/powerpoint/2010/main" val="3022866012"/>
+      </p:ext>
+    </p:extLst>
+  </p:cSld>
+  <p:clrMapOvr>
+    <a:masterClrMapping/>
+  </p:clrMapOvr>
+</p:sld>
+</file>
+
+<file path=ppt/slides/slide31.xml><?xml version="1.0" encoding="utf-8"?>
+<p:sld xmlns:a="http://schemas.openxmlformats.org/drawingml/2006/main" xmlns:r="http://schemas.openxmlformats.org/officeDocument/2006/relationships" xmlns:p="http://schemas.openxmlformats.org/presentationml/2006/main">
+  <p:cSld>
+    <p:spTree>
+      <p:nvGrpSpPr>
+        <p:cNvPr id="1" name=""/>
+        <p:cNvGrpSpPr/>
+        <p:nvPr/>
+      </p:nvGrpSpPr>
+      <p:grpSpPr>
+        <a:xfrm>
+          <a:off x="0" y="0"/>
+          <a:ext cx="0" cy="0"/>
+          <a:chOff x="0" y="0"/>
+          <a:chExt cx="0" cy="0"/>
+        </a:xfrm>
+      </p:grpSpPr>
+      <p:pic>
+        <p:nvPicPr>
+          <p:cNvPr id="6" name="图片 5"/>
+          <p:cNvPicPr>
+            <a:picLocks noChangeAspect="1"/>
+          </p:cNvPicPr>
+          <p:nvPr/>
+        </p:nvPicPr>
+        <p:blipFill>
+          <a:blip r:embed="rId2">
+            <a:extLst>
+              <a:ext uri="{28A0092B-C50C-407E-A947-70E740481C1C}">
+                <a14:useLocalDpi xmlns:a14="http://schemas.microsoft.com/office/drawing/2010/main" val="0"/>
+              </a:ext>
+            </a:extLst>
+          </a:blip>
+          <a:stretch>
+            <a:fillRect/>
+          </a:stretch>
+        </p:blipFill>
+        <p:spPr>
+          <a:xfrm>
+            <a:off x="5715000" y="457200"/>
+            <a:ext cx="3208953" cy="5952409"/>
+          </a:xfrm>
+          <a:prstGeom prst="rect">
+            <a:avLst/>
+          </a:prstGeom>
+        </p:spPr>
+      </p:pic>
+      <p:sp>
+        <p:nvSpPr>
+          <p:cNvPr id="7" name="[TextBox 6]"/>
+          <p:cNvSpPr txBox="1"/>
+          <p:nvPr/>
+        </p:nvSpPr>
+        <p:spPr>
+          <a:xfrm>
+            <a:off x="685800" y="1044410"/>
+            <a:ext cx="5105400" cy="1354217"/>
+          </a:xfrm>
+          <a:prstGeom prst="rect">
+            <a:avLst/>
+          </a:prstGeom>
+          <a:noFill/>
+        </p:spPr>
+        <p:txBody>
+          <a:bodyPr wrap="square" rtlCol="0">
+            <a:spAutoFit/>
+          </a:bodyPr>
+          <a:lstStyle/>
+          <a:p>
+            <a:r>
+              <a:rPr lang="en-US" sz="2800" b="1" dirty="0" smtClean="0">
+                <a:solidFill>
+                  <a:schemeClr val="accent6">
+                    <a:lumMod val="75000"/>
+                  </a:schemeClr>
+                </a:solidFill>
+              </a:rPr>
+              <a:t>1.</a:t>
+            </a:r>
+            <a:r>
+              <a:rPr lang="en-US" dirty="0" smtClean="0">
+                <a:solidFill>
+                  <a:schemeClr val="accent6">
+                    <a:lumMod val="75000"/>
+                  </a:schemeClr>
+                </a:solidFill>
+              </a:rPr>
+              <a:t> Click the               button.</a:t>
+            </a:r>
+          </a:p>
+          <a:p>
+            <a:r>
+              <a:rPr lang="en-US" dirty="0" smtClean="0">
+                <a:solidFill>
+                  <a:schemeClr val="accent6">
+                    <a:lumMod val="75000"/>
+                  </a:schemeClr>
+                </a:solidFill>
+              </a:rPr>
+              <a:t/>
+            </a:r>
+            <a:br>
+              <a:rPr lang="en-US" dirty="0" smtClean="0">
+                <a:solidFill>
+                  <a:schemeClr val="accent6">
+                    <a:lumMod val="75000"/>
+                  </a:schemeClr>
+                </a:solidFill>
+              </a:rPr>
+            </a:br>
+            <a:r>
+              <a:rPr lang="en-US" dirty="0" smtClean="0">
+                <a:solidFill>
+                  <a:schemeClr val="accent6">
+                    <a:lumMod val="75000"/>
+                  </a:schemeClr>
+                </a:solidFill>
+              </a:rPr>
+              <a:t>It will show  the </a:t>
+            </a:r>
+            <a:r>
+              <a:rPr lang="en-US" b="1" dirty="0" smtClean="0">
+                <a:solidFill>
+                  <a:schemeClr val="accent6">
+                    <a:lumMod val="75000"/>
+                  </a:schemeClr>
+                </a:solidFill>
+              </a:rPr>
+              <a:t>Colors Lab Panel</a:t>
+            </a:r>
+            <a:r>
+              <a:rPr lang="en-US" dirty="0" smtClean="0">
+                <a:solidFill>
+                  <a:schemeClr val="accent6">
+                    <a:lumMod val="75000"/>
+                  </a:schemeClr>
+                </a:solidFill>
+              </a:rPr>
+              <a:t> at the right side of </a:t>
+            </a:r>
+          </a:p>
+          <a:p>
+            <a:r>
+              <a:rPr lang="en-US" dirty="0" smtClean="0">
+                <a:solidFill>
+                  <a:schemeClr val="accent6">
+                    <a:lumMod val="75000"/>
+                  </a:schemeClr>
+                </a:solidFill>
+              </a:rPr>
+              <a:t>your screen.</a:t>
+            </a:r>
+            <a:endParaRPr lang="en-SG" dirty="0">
+              <a:solidFill>
+                <a:schemeClr val="accent6">
+                  <a:lumMod val="75000"/>
+                </a:schemeClr>
+              </a:solidFill>
+            </a:endParaRPr>
+          </a:p>
+        </p:txBody>
+      </p:sp>
+      <p:pic>
+        <p:nvPicPr>
+          <p:cNvPr id="8" name="图片 7"/>
+          <p:cNvPicPr>
+            <a:picLocks noChangeAspect="1"/>
+          </p:cNvPicPr>
+          <p:nvPr/>
+        </p:nvPicPr>
+        <p:blipFill>
+          <a:blip r:embed="rId3">
+            <a:extLst>
+              <a:ext uri="{28A0092B-C50C-407E-A947-70E740481C1C}">
+                <a14:useLocalDpi xmlns:a14="http://schemas.microsoft.com/office/drawing/2010/main" val="0"/>
+              </a:ext>
+            </a:extLst>
+          </a:blip>
+          <a:stretch>
+            <a:fillRect/>
+          </a:stretch>
+        </p:blipFill>
+        <p:spPr>
+          <a:xfrm>
+            <a:off x="1959395" y="838200"/>
+            <a:ext cx="622852" cy="914400"/>
+          </a:xfrm>
+          <a:prstGeom prst="rect">
+            <a:avLst/>
+          </a:prstGeom>
+        </p:spPr>
+      </p:pic>
+      <p:sp>
+        <p:nvSpPr>
+          <p:cNvPr id="9" name="[Picture 3]"/>
+          <p:cNvSpPr txBox="1"/>
+          <p:nvPr/>
+        </p:nvSpPr>
+        <p:spPr>
+          <a:xfrm>
+            <a:off x="685800" y="2435733"/>
+            <a:ext cx="4800600" cy="523220"/>
+          </a:xfrm>
+          <a:prstGeom prst="rect">
+            <a:avLst/>
+          </a:prstGeom>
+          <a:noFill/>
+        </p:spPr>
+        <p:txBody>
+          <a:bodyPr wrap="square" rtlCol="0">
+            <a:spAutoFit/>
+          </a:bodyPr>
+          <a:lstStyle/>
+          <a:p>
+            <a:r>
+              <a:rPr lang="en-US" sz="2800" b="1" dirty="0" smtClean="0">
+                <a:solidFill>
+                  <a:schemeClr val="accent6">
+                    <a:lumMod val="75000"/>
+                  </a:schemeClr>
+                </a:solidFill>
+              </a:rPr>
+              <a:t>2.</a:t>
+            </a:r>
+            <a:r>
+              <a:rPr lang="en-US" dirty="0" smtClean="0">
+                <a:solidFill>
+                  <a:schemeClr val="accent6">
+                    <a:lumMod val="75000"/>
+                  </a:schemeClr>
+                </a:solidFill>
+              </a:rPr>
+              <a:t> Select the following shape:</a:t>
+            </a:r>
+            <a:endParaRPr lang="en-SG" dirty="0">
+              <a:solidFill>
+                <a:schemeClr val="accent6">
+                  <a:lumMod val="75000"/>
+                </a:schemeClr>
+              </a:solidFill>
+            </a:endParaRPr>
+          </a:p>
+        </p:txBody>
+      </p:sp>
+      <p:sp>
+        <p:nvSpPr>
+          <p:cNvPr id="11" name="[Picture 3]"/>
+          <p:cNvSpPr txBox="1"/>
+          <p:nvPr/>
+        </p:nvSpPr>
+        <p:spPr>
+          <a:xfrm>
+            <a:off x="685800" y="4059294"/>
+            <a:ext cx="4953000" cy="2185214"/>
+          </a:xfrm>
+          <a:prstGeom prst="rect">
+            <a:avLst/>
+          </a:prstGeom>
+          <a:noFill/>
+        </p:spPr>
+        <p:txBody>
+          <a:bodyPr wrap="square" rtlCol="0">
+            <a:spAutoFit/>
+          </a:bodyPr>
+          <a:lstStyle/>
+          <a:p>
+            <a:r>
+              <a:rPr lang="en-US" sz="2800" b="1" dirty="0" smtClean="0">
+                <a:solidFill>
+                  <a:schemeClr val="accent6">
+                    <a:lumMod val="75000"/>
+                  </a:schemeClr>
+                </a:solidFill>
+              </a:rPr>
+              <a:t>3.</a:t>
+            </a:r>
+            <a:r>
+              <a:rPr lang="en-US" dirty="0" smtClean="0">
+                <a:solidFill>
+                  <a:schemeClr val="accent6">
+                    <a:lumMod val="75000"/>
+                  </a:schemeClr>
+                </a:solidFill>
+              </a:rPr>
+              <a:t> Then you can </a:t>
+            </a:r>
+            <a:r>
+              <a:rPr lang="en-US" b="1" dirty="0" smtClean="0">
+                <a:solidFill>
+                  <a:schemeClr val="accent6">
+                    <a:lumMod val="75000"/>
+                  </a:schemeClr>
+                </a:solidFill>
+              </a:rPr>
+              <a:t>drag</a:t>
+            </a:r>
+            <a:r>
+              <a:rPr lang="en-US" dirty="0" smtClean="0">
+                <a:solidFill>
+                  <a:schemeClr val="accent6">
+                    <a:lumMod val="75000"/>
+                  </a:schemeClr>
+                </a:solidFill>
+              </a:rPr>
+              <a:t> or </a:t>
+            </a:r>
+            <a:r>
+              <a:rPr lang="en-US" b="1" dirty="0" smtClean="0">
+                <a:solidFill>
+                  <a:schemeClr val="accent6">
+                    <a:lumMod val="75000"/>
+                  </a:schemeClr>
+                </a:solidFill>
+              </a:rPr>
+              <a:t>click</a:t>
+            </a:r>
+            <a:r>
+              <a:rPr lang="en-US" dirty="0" smtClean="0">
+                <a:solidFill>
+                  <a:schemeClr val="accent6">
+                    <a:lumMod val="75000"/>
+                  </a:schemeClr>
+                </a:solidFill>
+              </a:rPr>
+              <a:t> this            button in </a:t>
+            </a:r>
+          </a:p>
+          <a:p>
+            <a:endParaRPr lang="en-US" dirty="0">
+              <a:solidFill>
+                <a:schemeClr val="accent6">
+                  <a:lumMod val="75000"/>
+                </a:schemeClr>
+              </a:solidFill>
+            </a:endParaRPr>
+          </a:p>
+          <a:p>
+            <a:r>
+              <a:rPr lang="en-US" dirty="0" smtClean="0">
+                <a:solidFill>
+                  <a:schemeClr val="accent6">
+                    <a:lumMod val="75000"/>
+                  </a:schemeClr>
+                </a:solidFill>
+              </a:rPr>
+              <a:t>the panel to change the selected shape’s </a:t>
+            </a:r>
+            <a:r>
+              <a:rPr lang="en-US" b="1" dirty="0" smtClean="0">
+                <a:solidFill>
+                  <a:schemeClr val="accent6">
+                    <a:lumMod val="75000"/>
+                  </a:schemeClr>
+                </a:solidFill>
+              </a:rPr>
+              <a:t>FONT</a:t>
+            </a:r>
+            <a:r>
+              <a:rPr lang="en-US" dirty="0">
+                <a:solidFill>
+                  <a:schemeClr val="accent6">
+                    <a:lumMod val="75000"/>
+                  </a:schemeClr>
+                </a:solidFill>
+              </a:rPr>
+              <a:t> </a:t>
+            </a:r>
+            <a:endParaRPr lang="en-US" dirty="0" smtClean="0">
+              <a:solidFill>
+                <a:schemeClr val="accent6">
+                  <a:lumMod val="75000"/>
+                </a:schemeClr>
+              </a:solidFill>
+            </a:endParaRPr>
+          </a:p>
+          <a:p>
+            <a:endParaRPr lang="en-US" dirty="0">
+              <a:solidFill>
+                <a:schemeClr val="accent6">
+                  <a:lumMod val="75000"/>
+                </a:schemeClr>
+              </a:solidFill>
+            </a:endParaRPr>
+          </a:p>
+          <a:p>
+            <a:r>
+              <a:rPr lang="en-US" dirty="0" smtClean="0">
+                <a:solidFill>
+                  <a:schemeClr val="accent6">
+                    <a:lumMod val="75000"/>
+                  </a:schemeClr>
+                </a:solidFill>
+              </a:rPr>
+              <a:t>color, or this</a:t>
+            </a:r>
+            <a:r>
+              <a:rPr lang="en-SG" dirty="0" smtClean="0">
+                <a:solidFill>
+                  <a:schemeClr val="accent6">
+                    <a:lumMod val="75000"/>
+                  </a:schemeClr>
+                </a:solidFill>
+              </a:rPr>
+              <a:t>             button to change its </a:t>
+            </a:r>
+            <a:r>
+              <a:rPr lang="en-SG" b="1" dirty="0" smtClean="0">
+                <a:solidFill>
+                  <a:schemeClr val="accent6">
+                    <a:lumMod val="75000"/>
+                  </a:schemeClr>
+                </a:solidFill>
+              </a:rPr>
+              <a:t>LINE</a:t>
+            </a:r>
+            <a:r>
+              <a:rPr lang="en-SG" dirty="0">
+                <a:solidFill>
+                  <a:schemeClr val="accent6">
+                    <a:lumMod val="75000"/>
+                  </a:schemeClr>
+                </a:solidFill>
+              </a:rPr>
+              <a:t> </a:t>
+            </a:r>
+            <a:r>
+              <a:rPr lang="en-SG" dirty="0" err="1" smtClean="0">
+                <a:solidFill>
+                  <a:schemeClr val="accent6">
+                    <a:lumMod val="75000"/>
+                  </a:schemeClr>
+                </a:solidFill>
+              </a:rPr>
+              <a:t>color</a:t>
+            </a:r>
+            <a:r>
+              <a:rPr lang="en-SG" dirty="0" smtClean="0">
+                <a:solidFill>
+                  <a:schemeClr val="accent6">
+                    <a:lumMod val="75000"/>
+                  </a:schemeClr>
+                </a:solidFill>
+              </a:rPr>
+              <a:t>, </a:t>
+            </a:r>
+          </a:p>
+          <a:p>
+            <a:endParaRPr lang="en-SG" dirty="0">
+              <a:solidFill>
+                <a:schemeClr val="accent6">
+                  <a:lumMod val="75000"/>
+                </a:schemeClr>
+              </a:solidFill>
+            </a:endParaRPr>
+          </a:p>
+          <a:p>
+            <a:r>
+              <a:rPr lang="en-SG" dirty="0" smtClean="0">
+                <a:solidFill>
+                  <a:schemeClr val="accent6">
+                    <a:lumMod val="75000"/>
+                  </a:schemeClr>
+                </a:solidFill>
+              </a:rPr>
+              <a:t>or this            button to change its </a:t>
+            </a:r>
+            <a:r>
+              <a:rPr lang="en-SG" b="1" dirty="0" smtClean="0">
+                <a:solidFill>
+                  <a:schemeClr val="accent6">
+                    <a:lumMod val="75000"/>
+                  </a:schemeClr>
+                </a:solidFill>
+              </a:rPr>
+              <a:t>FILL</a:t>
+            </a:r>
+            <a:r>
+              <a:rPr lang="en-SG" dirty="0" smtClean="0">
+                <a:solidFill>
+                  <a:schemeClr val="accent6">
+                    <a:lumMod val="75000"/>
+                  </a:schemeClr>
+                </a:solidFill>
+              </a:rPr>
+              <a:t> </a:t>
+            </a:r>
+            <a:r>
+              <a:rPr lang="en-SG" dirty="0" err="1" smtClean="0">
+                <a:solidFill>
+                  <a:schemeClr val="accent6">
+                    <a:lumMod val="75000"/>
+                  </a:schemeClr>
+                </a:solidFill>
+              </a:rPr>
+              <a:t>color</a:t>
+            </a:r>
+            <a:r>
+              <a:rPr lang="en-SG" dirty="0" smtClean="0">
+                <a:solidFill>
+                  <a:schemeClr val="accent6">
+                    <a:lumMod val="75000"/>
+                  </a:schemeClr>
+                </a:solidFill>
+              </a:rPr>
+              <a:t>.</a:t>
+            </a:r>
+            <a:endParaRPr lang="en-SG" dirty="0">
+              <a:solidFill>
+                <a:schemeClr val="accent6">
+                  <a:lumMod val="75000"/>
+                </a:schemeClr>
+              </a:solidFill>
+            </a:endParaRPr>
+          </a:p>
+        </p:txBody>
+      </p:sp>
+      <p:sp>
+        <p:nvSpPr>
+          <p:cNvPr id="12" name="圆角矩形 11"/>
+          <p:cNvSpPr/>
+          <p:nvPr/>
+        </p:nvSpPr>
+        <p:spPr>
+          <a:xfrm>
+            <a:off x="1314450" y="3053602"/>
+            <a:ext cx="3516134" cy="803374"/>
+          </a:xfrm>
+          <a:prstGeom prst="roundRect">
+            <a:avLst/>
+          </a:prstGeom>
+          <a:solidFill>
+            <a:srgbClr val="4D74B9"/>
+          </a:solidFill>
+          <a:ln>
+            <a:solidFill>
+              <a:srgbClr val="4D74B9"/>
+            </a:solidFill>
+          </a:ln>
+        </p:spPr>
+        <p:style>
+          <a:lnRef idx="2">
+            <a:schemeClr val="accent1">
+              <a:shade val="50000"/>
+            </a:schemeClr>
+          </a:lnRef>
+          <a:fillRef idx="1">
+            <a:schemeClr val="accent1"/>
+          </a:fillRef>
+          <a:effectRef idx="0">
+            <a:schemeClr val="accent1"/>
+          </a:effectRef>
+          <a:fontRef idx="minor">
+            <a:schemeClr val="lt1"/>
+          </a:fontRef>
+        </p:style>
+        <p:txBody>
+          <a:bodyPr rtlCol="0" anchor="ctr"/>
+          <a:lstStyle/>
+          <a:p>
+            <a:pPr algn="ctr"/>
+            <a:r>
+              <a:rPr lang="en-US" altLang="zh-CN" sz="4000" dirty="0" smtClean="0">
+                <a:solidFill>
+                  <a:srgbClr val="FFFFFF"/>
+                </a:solidFill>
+              </a:rPr>
+              <a:t>Select me!</a:t>
+            </a:r>
+            <a:endParaRPr lang="zh-CN" altLang="en-US" sz="4000" dirty="0">
+              <a:solidFill>
+                <a:srgbClr val="FFFFFF"/>
+              </a:solidFill>
+            </a:endParaRPr>
+          </a:p>
+        </p:txBody>
+      </p:sp>
+      <p:pic>
+        <p:nvPicPr>
+          <p:cNvPr id="2" name="图片 1"/>
+          <p:cNvPicPr>
+            <a:picLocks noChangeAspect="1"/>
+          </p:cNvPicPr>
+          <p:nvPr/>
+        </p:nvPicPr>
+        <p:blipFill>
+          <a:blip r:embed="rId4">
+            <a:extLst>
+              <a:ext uri="{28A0092B-C50C-407E-A947-70E740481C1C}">
+                <a14:useLocalDpi xmlns:a14="http://schemas.microsoft.com/office/drawing/2010/main" val="0"/>
+              </a:ext>
+            </a:extLst>
+          </a:blip>
+          <a:stretch>
+            <a:fillRect/>
+          </a:stretch>
+        </p:blipFill>
+        <p:spPr>
+          <a:xfrm>
+            <a:off x="4000552" y="4153943"/>
+            <a:ext cx="419048" cy="428571"/>
+          </a:xfrm>
+          <a:prstGeom prst="rect">
+            <a:avLst/>
+          </a:prstGeom>
+        </p:spPr>
+      </p:pic>
+      <p:pic>
+        <p:nvPicPr>
+          <p:cNvPr id="3" name="图片 2"/>
+          <p:cNvPicPr>
+            <a:picLocks noChangeAspect="1"/>
+          </p:cNvPicPr>
+          <p:nvPr/>
+        </p:nvPicPr>
+        <p:blipFill>
+          <a:blip r:embed="rId5">
+            <a:extLst>
+              <a:ext uri="{28A0092B-C50C-407E-A947-70E740481C1C}">
+                <a14:useLocalDpi xmlns:a14="http://schemas.microsoft.com/office/drawing/2010/main" val="0"/>
+              </a:ext>
+            </a:extLst>
+          </a:blip>
+          <a:stretch>
+            <a:fillRect/>
+          </a:stretch>
+        </p:blipFill>
+        <p:spPr>
+          <a:xfrm>
+            <a:off x="2040077" y="5272315"/>
+            <a:ext cx="419048" cy="428571"/>
+          </a:xfrm>
+          <a:prstGeom prst="rect">
+            <a:avLst/>
+          </a:prstGeom>
+        </p:spPr>
+      </p:pic>
+      <p:pic>
+        <p:nvPicPr>
+          <p:cNvPr id="4" name="图片 3"/>
+          <p:cNvPicPr>
+            <a:picLocks noChangeAspect="1"/>
+          </p:cNvPicPr>
+          <p:nvPr/>
+        </p:nvPicPr>
+        <p:blipFill>
+          <a:blip r:embed="rId6">
+            <a:extLst>
+              <a:ext uri="{28A0092B-C50C-407E-A947-70E740481C1C}">
+                <a14:useLocalDpi xmlns:a14="http://schemas.microsoft.com/office/drawing/2010/main" val="0"/>
+              </a:ext>
+            </a:extLst>
+          </a:blip>
+          <a:stretch>
+            <a:fillRect/>
+          </a:stretch>
+        </p:blipFill>
+        <p:spPr>
+          <a:xfrm>
+            <a:off x="1447800" y="5815937"/>
+            <a:ext cx="419048" cy="428571"/>
+          </a:xfrm>
+          <a:prstGeom prst="rect">
+            <a:avLst/>
+          </a:prstGeom>
+        </p:spPr>
+      </p:pic>
+    </p:spTree>
+    <p:extLst>
+      <p:ext uri="{BB962C8B-B14F-4D97-AF65-F5344CB8AC3E}">
+        <p14:creationId xmlns:p14="http://schemas.microsoft.com/office/powerpoint/2010/main" val="731680432"/>
+      </p:ext>
+    </p:extLst>
+  </p:cSld>
+  <p:clrMapOvr>
+    <a:masterClrMapping/>
+  </p:clrMapOvr>
+  <p:timing>
+    <p:tnLst>
+      <p:par>
+        <p:cTn id="1" dur="indefinite" restart="never" nodeType="tmRoot">
+          <p:childTnLst>
+            <p:seq concurrent="1" nextAc="seek">
+              <p:cTn id="2" dur="indefinite" nodeType="mainSeq">
+                <p:childTnLst>
+                  <p:par>
+                    <p:cTn id="3" fill="hold">
+                      <p:stCondLst>
+                        <p:cond delay="indefinite"/>
+                        <p:cond evt="onBegin" delay="0">
+                          <p:tn val="2"/>
+                        </p:cond>
+                      </p:stCondLst>
+                      <p:childTnLst>
+                        <p:par>
+                          <p:cTn id="4" fill="hold">
+                            <p:stCondLst>
+                              <p:cond delay="0"/>
+                            </p:stCondLst>
+                            <p:childTnLst>
+                              <p:par>
+                                <p:cTn id="5" presetID="10" presetClass="entr" presetSubtype="0" fill="hold" grpId="0" nodeType="withEffect">
+                                  <p:stCondLst>
+                                    <p:cond delay="0"/>
+                                  </p:stCondLst>
+                                  <p:childTnLst>
+                                    <p:set>
+                                      <p:cBhvr>
+                                        <p:cTn id="6" dur="1" fill="hold">
+                                          <p:stCondLst>
+                                            <p:cond delay="0"/>
+                                          </p:stCondLst>
+                                        </p:cTn>
+                                        <p:tgtEl>
+                                          <p:spTgt spid="7"/>
+                                        </p:tgtEl>
+                                        <p:attrNameLst>
+                                          <p:attrName>style.visibility</p:attrName>
+                                        </p:attrNameLst>
+                                      </p:cBhvr>
+                                      <p:to>
+                                        <p:strVal val="visible"/>
+                                      </p:to>
+                                    </p:set>
+                                    <p:animEffect transition="in" filter="fade">
+                                      <p:cBhvr>
+                                        <p:cTn id="7" dur="500"/>
+                                        <p:tgtEl>
+                                          <p:spTgt spid="7"/>
+                                        </p:tgtEl>
+                                      </p:cBhvr>
+                                    </p:animEffect>
+                                  </p:childTnLst>
+                                </p:cTn>
+                              </p:par>
+                            </p:childTnLst>
+                          </p:cTn>
+                        </p:par>
+                      </p:childTnLst>
+                    </p:cTn>
+                  </p:par>
+                  <p:par>
+                    <p:cTn id="8" fill="hold">
+                      <p:stCondLst>
+                        <p:cond delay="indefinite"/>
+                      </p:stCondLst>
+                      <p:childTnLst>
+                        <p:par>
+                          <p:cTn id="9" fill="hold">
+                            <p:stCondLst>
+                              <p:cond delay="0"/>
+                            </p:stCondLst>
+                            <p:childTnLst>
+                              <p:par>
+                                <p:cTn id="10" presetID="10" presetClass="entr" presetSubtype="0" fill="hold" grpId="0" nodeType="clickEffect">
+                                  <p:stCondLst>
+                                    <p:cond delay="0"/>
+                                  </p:stCondLst>
+                                  <p:childTnLst>
+                                    <p:set>
+                                      <p:cBhvr>
+                                        <p:cTn id="11" dur="1" fill="hold">
+                                          <p:stCondLst>
+                                            <p:cond delay="0"/>
+                                          </p:stCondLst>
+                                        </p:cTn>
+                                        <p:tgtEl>
+                                          <p:spTgt spid="9"/>
+                                        </p:tgtEl>
+                                        <p:attrNameLst>
+                                          <p:attrName>style.visibility</p:attrName>
+                                        </p:attrNameLst>
+                                      </p:cBhvr>
+                                      <p:to>
+                                        <p:strVal val="visible"/>
+                                      </p:to>
+                                    </p:set>
+                                    <p:animEffect transition="in" filter="fade">
+                                      <p:cBhvr>
+                                        <p:cTn id="12" dur="500"/>
+                                        <p:tgtEl>
+                                          <p:spTgt spid="9"/>
+                                        </p:tgtEl>
+                                      </p:cBhvr>
+                                    </p:animEffect>
+                                  </p:childTnLst>
+                                </p:cTn>
+                              </p:par>
+                            </p:childTnLst>
+                          </p:cTn>
+                        </p:par>
+                      </p:childTnLst>
+                    </p:cTn>
+                  </p:par>
+                  <p:par>
+                    <p:cTn id="13" fill="hold">
+                      <p:stCondLst>
+                        <p:cond delay="indefinite"/>
+                      </p:stCondLst>
+                      <p:childTnLst>
+                        <p:par>
+                          <p:cTn id="14" fill="hold">
+                            <p:stCondLst>
+                              <p:cond delay="0"/>
+                            </p:stCondLst>
+                            <p:childTnLst>
+                              <p:par>
+                                <p:cTn id="15" presetID="10" presetClass="entr" presetSubtype="0" fill="hold" grpId="0" nodeType="clickEffect">
+                                  <p:stCondLst>
+                                    <p:cond delay="0"/>
+                                  </p:stCondLst>
+                                  <p:childTnLst>
+                                    <p:set>
+                                      <p:cBhvr>
+                                        <p:cTn id="16" dur="1" fill="hold">
+                                          <p:stCondLst>
+                                            <p:cond delay="0"/>
+                                          </p:stCondLst>
+                                        </p:cTn>
+                                        <p:tgtEl>
+                                          <p:spTgt spid="11"/>
+                                        </p:tgtEl>
+                                        <p:attrNameLst>
+                                          <p:attrName>style.visibility</p:attrName>
+                                        </p:attrNameLst>
+                                      </p:cBhvr>
+                                      <p:to>
+                                        <p:strVal val="visible"/>
+                                      </p:to>
+                                    </p:set>
+                                    <p:animEffect transition="in" filter="fade">
+                                      <p:cBhvr>
+                                        <p:cTn id="17" dur="500"/>
+                                        <p:tgtEl>
+                                          <p:spTgt spid="11"/>
+                                        </p:tgtEl>
+                                      </p:cBhvr>
+                                    </p:animEffect>
+                                  </p:childTnLst>
+                                </p:cTn>
+                              </p:par>
+                            </p:childTnLst>
+                          </p:cTn>
+                        </p:par>
+                      </p:childTnLst>
+                    </p:cTn>
+                  </p:par>
+                </p:childTnLst>
+              </p:cTn>
+              <p:prevCondLst>
+                <p:cond evt="onPrev" delay="0">
+                  <p:tgtEl>
+                    <p:sldTgt/>
+                  </p:tgtEl>
+                </p:cond>
+              </p:prevCondLst>
+              <p:nextCondLst>
+                <p:cond evt="onNext" delay="0">
+                  <p:tgtEl>
+                    <p:sldTgt/>
+                  </p:tgtEl>
+                </p:cond>
+              </p:nextCondLst>
+            </p:seq>
+          </p:childTnLst>
+        </p:cTn>
+      </p:par>
+    </p:tnLst>
+    <p:bldLst>
+      <p:bldP spid="7" grpId="0"/>
+      <p:bldP spid="9" grpId="0"/>
+      <p:bldP spid="11" grpId="0"/>
+    </p:bldLst>
+  </p:timing>
+</p:sld>
+</file>
+
+<file path=ppt/slides/slide32.xml><?xml version="1.0" encoding="utf-8"?>
+<p:sld xmlns:a="http://schemas.openxmlformats.org/drawingml/2006/main" xmlns:r="http://schemas.openxmlformats.org/officeDocument/2006/relationships" xmlns:p="http://schemas.openxmlformats.org/presentationml/2006/main">
+  <p:cSld>
+    <p:spTree>
+      <p:nvGrpSpPr>
+        <p:cNvPr id="1" name=""/>
+        <p:cNvGrpSpPr/>
+        <p:nvPr/>
+      </p:nvGrpSpPr>
+      <p:grpSpPr>
+        <a:xfrm>
+          <a:off x="0" y="0"/>
+          <a:ext cx="0" cy="0"/>
+          <a:chOff x="0" y="0"/>
+          <a:chExt cx="0" cy="0"/>
+        </a:xfrm>
+      </p:grpSpPr>
+      <p:sp>
+        <p:nvSpPr>
           <p:cNvPr id="16" name="TextBox 15"/>
           <p:cNvSpPr txBox="1"/>
           <p:nvPr/>
@@ -15065,7 +19120,7 @@
 </p:sld>
 </file>
 
-<file path=ppt/slides/slide27.xml><?xml version="1.0" encoding="utf-8"?>
+<file path=ppt/slides/slide33.xml><?xml version="1.0" encoding="utf-8"?>
 <p:sld xmlns:a="http://schemas.openxmlformats.org/drawingml/2006/main" xmlns:r="http://schemas.openxmlformats.org/officeDocument/2006/relationships" xmlns:p="http://schemas.openxmlformats.org/presentationml/2006/main" show="0">
   <p:cSld name="PPAck201401021130490549">
     <p:spTree>
@@ -15201,176 +19256,6 @@
 </p:sld>
 </file>
 
-<file path=ppt/slides/slide3.xml><?xml version="1.0" encoding="utf-8"?>
-<p:sld xmlns:a="http://schemas.openxmlformats.org/drawingml/2006/main" xmlns:r="http://schemas.openxmlformats.org/officeDocument/2006/relationships" xmlns:p="http://schemas.openxmlformats.org/presentationml/2006/main">
-  <p:cSld>
-    <p:spTree>
-      <p:nvGrpSpPr>
-        <p:cNvPr id="1" name=""/>
-        <p:cNvGrpSpPr/>
-        <p:nvPr/>
-      </p:nvGrpSpPr>
-      <p:grpSpPr>
-        <a:xfrm>
-          <a:off x="0" y="0"/>
-          <a:ext cx="0" cy="0"/>
-          <a:chOff x="0" y="0"/>
-          <a:chExt cx="0" cy="0"/>
-        </a:xfrm>
-      </p:grpSpPr>
-      <p:sp>
-        <p:nvSpPr>
-          <p:cNvPr id="4" name="TextBox 3"/>
-          <p:cNvSpPr txBox="1"/>
-          <p:nvPr/>
-        </p:nvSpPr>
-        <p:spPr>
-          <a:xfrm>
-            <a:off x="762000" y="2362200"/>
-            <a:ext cx="7543800" cy="1754326"/>
-          </a:xfrm>
-          <a:prstGeom prst="rect">
-            <a:avLst/>
-          </a:prstGeom>
-          <a:noFill/>
-        </p:spPr>
-        <p:txBody>
-          <a:bodyPr wrap="square" rtlCol="0">
-            <a:spAutoFit/>
-          </a:bodyPr>
-          <a:lstStyle/>
-          <a:p>
-            <a:r>
-              <a:rPr lang="en-US" dirty="0" smtClean="0">
-                <a:solidFill>
-                  <a:schemeClr val="accent6">
-                    <a:lumMod val="75000"/>
-                  </a:schemeClr>
-                </a:solidFill>
-              </a:rPr>
-              <a:t>This tutorial explains </a:t>
-            </a:r>
-            <a:r>
-              <a:rPr lang="en-US" dirty="0" err="1" smtClean="0">
-                <a:solidFill>
-                  <a:schemeClr val="accent6">
-                    <a:lumMod val="75000"/>
-                  </a:schemeClr>
-                </a:solidFill>
-              </a:rPr>
-              <a:t>PowerPointLabs</a:t>
-            </a:r>
-            <a:r>
-              <a:rPr lang="en-US" dirty="0" smtClean="0">
-                <a:solidFill>
-                  <a:schemeClr val="accent6">
-                    <a:lumMod val="75000"/>
-                  </a:schemeClr>
-                </a:solidFill>
-              </a:rPr>
-              <a:t>’ features at the point you installed the plugin. </a:t>
-            </a:r>
-          </a:p>
-          <a:p>
-            <a:endParaRPr lang="en-US" dirty="0" smtClean="0">
-              <a:solidFill>
-                <a:schemeClr val="accent6">
-                  <a:lumMod val="75000"/>
-                </a:schemeClr>
-              </a:solidFill>
-            </a:endParaRPr>
-          </a:p>
-          <a:p>
-            <a:endParaRPr lang="en-US" dirty="0">
-              <a:solidFill>
-                <a:schemeClr val="accent6">
-                  <a:lumMod val="75000"/>
-                </a:schemeClr>
-              </a:solidFill>
-            </a:endParaRPr>
-          </a:p>
-          <a:p>
-            <a:r>
-              <a:rPr lang="en-US" dirty="0" smtClean="0">
-                <a:solidFill>
-                  <a:schemeClr val="accent6">
-                    <a:lumMod val="75000"/>
-                  </a:schemeClr>
-                </a:solidFill>
-              </a:rPr>
-              <a:t>If you installed the plugin some time back, please refer to the </a:t>
-            </a:r>
-            <a:r>
-              <a:rPr lang="en-US" i="1" dirty="0" smtClean="0">
-                <a:solidFill>
-                  <a:schemeClr val="accent6">
-                    <a:lumMod val="75000"/>
-                  </a:schemeClr>
-                </a:solidFill>
-              </a:rPr>
-              <a:t>Documentation</a:t>
-            </a:r>
-            <a:r>
-              <a:rPr lang="en-US" dirty="0" smtClean="0">
-                <a:solidFill>
-                  <a:schemeClr val="accent6">
-                    <a:lumMod val="75000"/>
-                  </a:schemeClr>
-                </a:solidFill>
-              </a:rPr>
-              <a:t> page of </a:t>
-            </a:r>
-            <a:r>
-              <a:rPr lang="en-US" dirty="0" smtClean="0">
-                <a:solidFill>
-                  <a:schemeClr val="accent6">
-                    <a:lumMod val="75000"/>
-                  </a:schemeClr>
-                </a:solidFill>
-                <a:hlinkClick r:id="rId2"/>
-              </a:rPr>
-              <a:t>our website</a:t>
-            </a:r>
-            <a:r>
-              <a:rPr lang="en-US" dirty="0" smtClean="0">
-                <a:solidFill>
-                  <a:schemeClr val="accent6">
-                    <a:lumMod val="75000"/>
-                  </a:schemeClr>
-                </a:solidFill>
-              </a:rPr>
-              <a:t> for more up-to-date instructions.</a:t>
-            </a:r>
-            <a:endParaRPr lang="en-SG" dirty="0">
-              <a:solidFill>
-                <a:schemeClr val="accent6">
-                  <a:lumMod val="75000"/>
-                </a:schemeClr>
-              </a:solidFill>
-            </a:endParaRPr>
-          </a:p>
-        </p:txBody>
-      </p:sp>
-    </p:spTree>
-    <p:extLst>
-      <p:ext uri="{BB962C8B-B14F-4D97-AF65-F5344CB8AC3E}">
-        <p14:creationId xmlns:p14="http://schemas.microsoft.com/office/powerpoint/2010/main" val="1906505232"/>
-      </p:ext>
-    </p:extLst>
-  </p:cSld>
-  <p:clrMapOvr>
-    <a:masterClrMapping/>
-  </p:clrMapOvr>
-  <p:timing>
-    <p:tnLst>
-      <p:par>
-        <p:cTn id="1" dur="indefinite" restart="never" nodeType="tmRoot"/>
-      </p:par>
-    </p:tnLst>
-  </p:timing>
-</p:sld>
-</file>
-
 <file path=ppt/slides/slide4.xml><?xml version="1.0" encoding="utf-8"?>
 <p:sld xmlns:a="http://schemas.openxmlformats.org/drawingml/2006/main" xmlns:r="http://schemas.openxmlformats.org/officeDocument/2006/relationships" xmlns:p="http://schemas.openxmlformats.org/presentationml/2006/main">
   <p:cSld>
@@ -15418,7 +19303,17 @@
                   </a:schemeClr>
                 </a:solidFill>
               </a:rPr>
-              <a:t>First up, let’s </a:t>
+              <a:t>First up, let’s try the </a:t>
+            </a:r>
+            <a:r>
+              <a:rPr lang="en-US" b="1" dirty="0" smtClean="0">
+                <a:solidFill>
+                  <a:schemeClr val="accent6">
+                    <a:lumMod val="75000"/>
+                  </a:schemeClr>
+                </a:solidFill>
+              </a:rPr>
+              <a:t>Highlight bullet points</a:t>
             </a:r>
             <a:r>
               <a:rPr lang="en-US" dirty="0" smtClean="0">
@@ -15428,37 +19323,7 @@
                   </a:schemeClr>
                 </a:solidFill>
               </a:rPr>
-              <a:t>try the </a:t>
-            </a:r>
-            <a:r>
-              <a:rPr lang="en-US" b="1" dirty="0" smtClean="0">
-                <a:solidFill>
-                  <a:schemeClr val="accent6">
-                    <a:lumMod val="75000"/>
-                  </a:schemeClr>
-                </a:solidFill>
-              </a:rPr>
-              <a:t>Highlight bullet points</a:t>
-            </a:r>
-            <a:r>
-              <a:rPr lang="en-US" dirty="0" smtClean="0">
-                <a:solidFill>
-                  <a:schemeClr val="accent6">
-                    <a:lumMod val="75000"/>
-                  </a:schemeClr>
-                </a:solidFill>
-              </a:rPr>
-              <a:t> </a:t>
-            </a:r>
-            <a:r>
-              <a:rPr lang="en-US" dirty="0" smtClean="0">
-                <a:solidFill>
-                  <a:schemeClr val="accent6">
-                    <a:lumMod val="75000"/>
-                  </a:schemeClr>
-                </a:solidFill>
-              </a:rPr>
-              <a:t>feature</a:t>
+              <a:t> feature</a:t>
             </a:r>
             <a:endParaRPr lang="en-SG" dirty="0">
               <a:solidFill>
@@ -16530,77 +20395,7 @@
                   </a:schemeClr>
                 </a:solidFill>
               </a:rPr>
-              <a:t> </a:t>
-            </a:r>
-            <a:r>
-              <a:rPr lang="en-US" dirty="0" smtClean="0">
-                <a:solidFill>
-                  <a:schemeClr val="accent6">
-                    <a:lumMod val="75000"/>
-                  </a:schemeClr>
-                </a:solidFill>
-              </a:rPr>
-              <a:t>While </a:t>
-            </a:r>
-            <a:r>
-              <a:rPr lang="en-US" dirty="0" smtClean="0">
-                <a:solidFill>
-                  <a:schemeClr val="accent6">
-                    <a:lumMod val="75000"/>
-                  </a:schemeClr>
-                </a:solidFill>
-              </a:rPr>
-              <a:t>this slide is </a:t>
-            </a:r>
-            <a:r>
-              <a:rPr lang="en-US" dirty="0" smtClean="0">
-                <a:solidFill>
-                  <a:schemeClr val="accent6">
-                    <a:lumMod val="75000"/>
-                  </a:schemeClr>
-                </a:solidFill>
-              </a:rPr>
-              <a:t>selected, </a:t>
-            </a:r>
-            <a:r>
-              <a:rPr lang="en-US" dirty="0" smtClean="0">
-                <a:solidFill>
-                  <a:schemeClr val="accent6">
-                    <a:lumMod val="75000"/>
-                  </a:schemeClr>
-                </a:solidFill>
-              </a:rPr>
-              <a:t>click </a:t>
-            </a:r>
-            <a:r>
-              <a:rPr lang="en-US" dirty="0" smtClean="0">
-                <a:solidFill>
-                  <a:schemeClr val="accent6">
-                    <a:lumMod val="75000"/>
-                  </a:schemeClr>
-                </a:solidFill>
-              </a:rPr>
-              <a:t>the              </a:t>
-            </a:r>
-            <a:r>
-              <a:rPr lang="en-US" dirty="0" smtClean="0">
-                <a:solidFill>
-                  <a:schemeClr val="accent6">
-                    <a:lumMod val="75000"/>
-                  </a:schemeClr>
-                </a:solidFill>
-              </a:rPr>
-              <a:t> button </a:t>
-            </a:r>
-            <a:r>
-              <a:rPr lang="en-US" dirty="0" smtClean="0">
-                <a:solidFill>
-                  <a:schemeClr val="accent6">
-                    <a:lumMod val="75000"/>
-                  </a:schemeClr>
-                </a:solidFill>
-              </a:rPr>
-              <a:t>in the                        ribbon</a:t>
+              <a:t> While this slide is selected, click the               button in the                        ribbon</a:t>
             </a:r>
             <a:endParaRPr lang="en-SG" dirty="0">
               <a:solidFill>
@@ -16711,16 +20506,6 @@
                   <a:schemeClr val="accent1"/>
                 </a:solidFill>
               </a14:hiddenFill>
-            </a:ext>
-            <a:ext uri="{91240B29-F687-4F45-9708-019B960494DF}">
-              <a14:hiddenLine xmlns:a14="http://schemas.microsoft.com/office/drawing/2010/main" w="9525">
-                <a:solidFill>
-                  <a:schemeClr val="tx1"/>
-                </a:solidFill>
-                <a:miter lim="800000"/>
-                <a:headEnd/>
-                <a:tailEnd/>
-              </a14:hiddenLine>
             </a:ext>
           </a:extLst>
         </p:spPr>
@@ -17069,67 +20854,7 @@
                   </a:schemeClr>
                 </a:solidFill>
               </a:rPr>
-              <a:t> </a:t>
-            </a:r>
-            <a:r>
-              <a:rPr lang="en-US" dirty="0" smtClean="0">
-                <a:solidFill>
-                  <a:schemeClr val="accent6">
-                    <a:lumMod val="75000"/>
-                  </a:schemeClr>
-                </a:solidFill>
-              </a:rPr>
-              <a:t>While </a:t>
-            </a:r>
-            <a:r>
-              <a:rPr lang="en-US" dirty="0" smtClean="0">
-                <a:solidFill>
-                  <a:schemeClr val="accent6">
-                    <a:lumMod val="75000"/>
-                  </a:schemeClr>
-                </a:solidFill>
-              </a:rPr>
-              <a:t>this slide is </a:t>
-            </a:r>
-            <a:r>
-              <a:rPr lang="en-US" dirty="0" smtClean="0">
-                <a:solidFill>
-                  <a:schemeClr val="accent6">
-                    <a:lumMod val="75000"/>
-                  </a:schemeClr>
-                </a:solidFill>
-              </a:rPr>
-              <a:t>selected, </a:t>
-            </a:r>
-            <a:r>
-              <a:rPr lang="en-US" dirty="0" smtClean="0">
-                <a:solidFill>
-                  <a:schemeClr val="accent6">
-                    <a:lumMod val="75000"/>
-                  </a:schemeClr>
-                </a:solidFill>
-              </a:rPr>
-              <a:t>click </a:t>
-            </a:r>
-            <a:r>
-              <a:rPr lang="en-US" dirty="0" smtClean="0">
-                <a:solidFill>
-                  <a:schemeClr val="accent6">
-                    <a:lumMod val="75000"/>
-                  </a:schemeClr>
-                </a:solidFill>
-              </a:rPr>
-              <a:t>the              </a:t>
-            </a:r>
-            <a:r>
-              <a:rPr lang="en-US" dirty="0" smtClean="0">
-                <a:solidFill>
-                  <a:schemeClr val="accent6">
-                    <a:lumMod val="75000"/>
-                  </a:schemeClr>
-                </a:solidFill>
-              </a:rPr>
-              <a:t>   button instead.</a:t>
+              <a:t> While this slide is selected, click the                 button instead.</a:t>
             </a:r>
             <a:endParaRPr lang="en-SG" dirty="0">
               <a:solidFill>
@@ -17186,16 +20911,6 @@
                   <a:schemeClr val="accent1"/>
                 </a:solidFill>
               </a14:hiddenFill>
-            </a:ext>
-            <a:ext uri="{91240B29-F687-4F45-9708-019B960494DF}">
-              <a14:hiddenLine xmlns:a14="http://schemas.microsoft.com/office/drawing/2010/main" w="9525">
-                <a:solidFill>
-                  <a:schemeClr val="tx1"/>
-                </a:solidFill>
-                <a:miter lim="800000"/>
-                <a:headEnd/>
-                <a:tailEnd/>
-              </a14:hiddenLine>
             </a:ext>
           </a:extLst>
         </p:spPr>
@@ -17489,17 +21204,7 @@
                   </a:schemeClr>
                 </a:solidFill>
               </a:rPr>
-              <a:t>Next, let’s </a:t>
-            </a:r>
-            <a:r>
-              <a:rPr lang="en-US" dirty="0" smtClean="0">
-                <a:solidFill>
-                  <a:schemeClr val="accent6">
-                    <a:lumMod val="75000"/>
-                  </a:schemeClr>
-                </a:solidFill>
-              </a:rPr>
-              <a:t>try the </a:t>
+              <a:t>Next, let’s try the </a:t>
             </a:r>
             <a:r>
               <a:rPr lang="en-US" b="1" dirty="0" smtClean="0">

</xml_diff>

<commit_message>
Fixed #521: Add a slide in the tutorial to tell users why some buttons appear disabled
</commit_message>
<xml_diff>
--- a/doc/PowerPointLabs Quick Tutorial.pptx
+++ b/doc/PowerPointLabs Quick Tutorial.pptx
@@ -5,42 +5,43 @@
     <p:sldMasterId id="2147483648" r:id="rId1"/>
   </p:sldMasterIdLst>
   <p:notesMasterIdLst>
-    <p:notesMasterId r:id="rId35"/>
+    <p:notesMasterId r:id="rId36"/>
   </p:notesMasterIdLst>
   <p:sldIdLst>
     <p:sldId id="296" r:id="rId2"/>
     <p:sldId id="297" r:id="rId3"/>
     <p:sldId id="302" r:id="rId4"/>
-    <p:sldId id="328" r:id="rId5"/>
-    <p:sldId id="329" r:id="rId6"/>
-    <p:sldId id="330" r:id="rId7"/>
-    <p:sldId id="300" r:id="rId8"/>
-    <p:sldId id="295" r:id="rId9"/>
-    <p:sldId id="301" r:id="rId10"/>
-    <p:sldId id="303" r:id="rId11"/>
-    <p:sldId id="261" r:id="rId12"/>
-    <p:sldId id="311" r:id="rId13"/>
-    <p:sldId id="304" r:id="rId14"/>
-    <p:sldId id="308" r:id="rId15"/>
-    <p:sldId id="307" r:id="rId16"/>
-    <p:sldId id="312" r:id="rId17"/>
-    <p:sldId id="313" r:id="rId18"/>
-    <p:sldId id="324" r:id="rId19"/>
-    <p:sldId id="314" r:id="rId20"/>
-    <p:sldId id="322" r:id="rId21"/>
-    <p:sldId id="325" r:id="rId22"/>
-    <p:sldId id="309" r:id="rId23"/>
-    <p:sldId id="327" r:id="rId24"/>
-    <p:sldId id="310" r:id="rId25"/>
-    <p:sldId id="326" r:id="rId26"/>
-    <p:sldId id="331" r:id="rId27"/>
-    <p:sldId id="332" r:id="rId28"/>
-    <p:sldId id="333" r:id="rId29"/>
-    <p:sldId id="334" r:id="rId30"/>
-    <p:sldId id="335" r:id="rId31"/>
-    <p:sldId id="336" r:id="rId32"/>
-    <p:sldId id="305" r:id="rId33"/>
-    <p:sldId id="299" r:id="rId34"/>
+    <p:sldId id="337" r:id="rId5"/>
+    <p:sldId id="328" r:id="rId6"/>
+    <p:sldId id="329" r:id="rId7"/>
+    <p:sldId id="330" r:id="rId8"/>
+    <p:sldId id="300" r:id="rId9"/>
+    <p:sldId id="295" r:id="rId10"/>
+    <p:sldId id="301" r:id="rId11"/>
+    <p:sldId id="303" r:id="rId12"/>
+    <p:sldId id="261" r:id="rId13"/>
+    <p:sldId id="311" r:id="rId14"/>
+    <p:sldId id="304" r:id="rId15"/>
+    <p:sldId id="308" r:id="rId16"/>
+    <p:sldId id="307" r:id="rId17"/>
+    <p:sldId id="312" r:id="rId18"/>
+    <p:sldId id="313" r:id="rId19"/>
+    <p:sldId id="324" r:id="rId20"/>
+    <p:sldId id="314" r:id="rId21"/>
+    <p:sldId id="322" r:id="rId22"/>
+    <p:sldId id="325" r:id="rId23"/>
+    <p:sldId id="309" r:id="rId24"/>
+    <p:sldId id="327" r:id="rId25"/>
+    <p:sldId id="310" r:id="rId26"/>
+    <p:sldId id="326" r:id="rId27"/>
+    <p:sldId id="331" r:id="rId28"/>
+    <p:sldId id="332" r:id="rId29"/>
+    <p:sldId id="333" r:id="rId30"/>
+    <p:sldId id="334" r:id="rId31"/>
+    <p:sldId id="335" r:id="rId32"/>
+    <p:sldId id="336" r:id="rId33"/>
+    <p:sldId id="305" r:id="rId34"/>
+    <p:sldId id="299" r:id="rId35"/>
   </p:sldIdLst>
   <p:sldSz cx="9144000" cy="6858000" type="screen4x3"/>
   <p:notesSz cx="6858000" cy="9144000"/>
@@ -147,6 +148,7 @@
             <p14:sldId id="296"/>
             <p14:sldId id="297"/>
             <p14:sldId id="302"/>
+            <p14:sldId id="337"/>
           </p14:sldIdLst>
         </p14:section>
         <p14:section name="Highlight bullet points" id="{12666BEC-665C-4E56-87DC-9427DEF860FB}">
@@ -442,7 +444,7 @@
           <a:p>
             <a:fld id="{3E86CC0F-BBF3-4E07-94E0-0549B7D560A9}" type="datetimeFigureOut">
               <a:rPr lang="en-SG" smtClean="0"/>
-              <a:t>18/7/2014</a:t>
+              <a:t>22/7/2014</a:t>
             </a:fld>
             <a:endParaRPr lang="en-SG"/>
           </a:p>
@@ -783,7 +785,7 @@
           <a:p>
             <a:fld id="{0015B511-83B7-463E-ACD1-0C1C081EBBC4}" type="slidenum">
               <a:rPr lang="en-SG" smtClean="0"/>
-              <a:t>15</a:t>
+              <a:t>16</a:t>
             </a:fld>
             <a:endParaRPr lang="en-SG"/>
           </a:p>
@@ -891,7 +893,7 @@
           <a:p>
             <a:fld id="{0015B511-83B7-463E-ACD1-0C1C081EBBC4}" type="slidenum">
               <a:rPr lang="en-SG" smtClean="0"/>
-              <a:t>22</a:t>
+              <a:t>23</a:t>
             </a:fld>
             <a:endParaRPr lang="en-SG"/>
           </a:p>
@@ -999,7 +1001,7 @@
           <a:p>
             <a:fld id="{0015B511-83B7-463E-ACD1-0C1C081EBBC4}" type="slidenum">
               <a:rPr lang="en-SG" smtClean="0"/>
-              <a:t>23</a:t>
+              <a:t>24</a:t>
             </a:fld>
             <a:endParaRPr lang="en-SG"/>
           </a:p>
@@ -1107,7 +1109,7 @@
           <a:p>
             <a:fld id="{0015B511-83B7-463E-ACD1-0C1C081EBBC4}" type="slidenum">
               <a:rPr lang="en-SG" smtClean="0"/>
-              <a:t>25</a:t>
+              <a:t>26</a:t>
             </a:fld>
             <a:endParaRPr lang="en-SG"/>
           </a:p>
@@ -1212,7 +1214,7 @@
           <a:p>
             <a:fld id="{0015B511-83B7-463E-ACD1-0C1C081EBBC4}" type="slidenum">
               <a:rPr lang="en-SG" smtClean="0"/>
-              <a:t>26</a:t>
+              <a:t>27</a:t>
             </a:fld>
             <a:endParaRPr lang="en-SG"/>
           </a:p>
@@ -1296,7 +1298,7 @@
           <a:p>
             <a:fld id="{0015B511-83B7-463E-ACD1-0C1C081EBBC4}" type="slidenum">
               <a:rPr lang="en-SG" smtClean="0"/>
-              <a:t>28</a:t>
+              <a:t>29</a:t>
             </a:fld>
             <a:endParaRPr lang="en-SG"/>
           </a:p>
@@ -1380,7 +1382,7 @@
           <a:p>
             <a:fld id="{0015B511-83B7-463E-ACD1-0C1C081EBBC4}" type="slidenum">
               <a:rPr lang="en-SG" smtClean="0"/>
-              <a:t>29</a:t>
+              <a:t>30</a:t>
             </a:fld>
             <a:endParaRPr lang="en-SG"/>
           </a:p>
@@ -1581,7 +1583,7 @@
             <a:fld id="{1D8BD707-D9CF-40AE-B4C6-C98DA3205C09}" type="datetimeFigureOut">
               <a:rPr lang="en-US" smtClean="0"/>
               <a:pPr/>
-              <a:t>7/18/2014</a:t>
+              <a:t>7/22/2014</a:t>
             </a:fld>
             <a:endParaRPr lang="en-US"/>
           </a:p>
@@ -1748,7 +1750,7 @@
             <a:fld id="{1D8BD707-D9CF-40AE-B4C6-C98DA3205C09}" type="datetimeFigureOut">
               <a:rPr lang="en-US" smtClean="0"/>
               <a:pPr/>
-              <a:t>7/18/2014</a:t>
+              <a:t>7/22/2014</a:t>
             </a:fld>
             <a:endParaRPr lang="en-US"/>
           </a:p>
@@ -1925,7 +1927,7 @@
             <a:fld id="{1D8BD707-D9CF-40AE-B4C6-C98DA3205C09}" type="datetimeFigureOut">
               <a:rPr lang="en-US" smtClean="0"/>
               <a:pPr/>
-              <a:t>7/18/2014</a:t>
+              <a:t>7/22/2014</a:t>
             </a:fld>
             <a:endParaRPr lang="en-US"/>
           </a:p>
@@ -2092,7 +2094,7 @@
             <a:fld id="{1D8BD707-D9CF-40AE-B4C6-C98DA3205C09}" type="datetimeFigureOut">
               <a:rPr lang="en-US" smtClean="0"/>
               <a:pPr/>
-              <a:t>7/18/2014</a:t>
+              <a:t>7/22/2014</a:t>
             </a:fld>
             <a:endParaRPr lang="en-US"/>
           </a:p>
@@ -2335,7 +2337,7 @@
             <a:fld id="{1D8BD707-D9CF-40AE-B4C6-C98DA3205C09}" type="datetimeFigureOut">
               <a:rPr lang="en-US" smtClean="0"/>
               <a:pPr/>
-              <a:t>7/18/2014</a:t>
+              <a:t>7/22/2014</a:t>
             </a:fld>
             <a:endParaRPr lang="en-US"/>
           </a:p>
@@ -2620,7 +2622,7 @@
             <a:fld id="{1D8BD707-D9CF-40AE-B4C6-C98DA3205C09}" type="datetimeFigureOut">
               <a:rPr lang="en-US" smtClean="0"/>
               <a:pPr/>
-              <a:t>7/18/2014</a:t>
+              <a:t>7/22/2014</a:t>
             </a:fld>
             <a:endParaRPr lang="en-US"/>
           </a:p>
@@ -3039,7 +3041,7 @@
             <a:fld id="{1D8BD707-D9CF-40AE-B4C6-C98DA3205C09}" type="datetimeFigureOut">
               <a:rPr lang="en-US" smtClean="0"/>
               <a:pPr/>
-              <a:t>7/18/2014</a:t>
+              <a:t>7/22/2014</a:t>
             </a:fld>
             <a:endParaRPr lang="en-US"/>
           </a:p>
@@ -3154,7 +3156,7 @@
             <a:fld id="{1D8BD707-D9CF-40AE-B4C6-C98DA3205C09}" type="datetimeFigureOut">
               <a:rPr lang="en-US" smtClean="0"/>
               <a:pPr/>
-              <a:t>7/18/2014</a:t>
+              <a:t>7/22/2014</a:t>
             </a:fld>
             <a:endParaRPr lang="en-US"/>
           </a:p>
@@ -3246,7 +3248,7 @@
             <a:fld id="{1D8BD707-D9CF-40AE-B4C6-C98DA3205C09}" type="datetimeFigureOut">
               <a:rPr lang="en-US" smtClean="0"/>
               <a:pPr/>
-              <a:t>7/18/2014</a:t>
+              <a:t>7/22/2014</a:t>
             </a:fld>
             <a:endParaRPr lang="en-US"/>
           </a:p>
@@ -3520,7 +3522,7 @@
             <a:fld id="{1D8BD707-D9CF-40AE-B4C6-C98DA3205C09}" type="datetimeFigureOut">
               <a:rPr lang="en-US" smtClean="0"/>
               <a:pPr/>
-              <a:t>7/18/2014</a:t>
+              <a:t>7/22/2014</a:t>
             </a:fld>
             <a:endParaRPr lang="en-US"/>
           </a:p>
@@ -3770,7 +3772,7 @@
             <a:fld id="{1D8BD707-D9CF-40AE-B4C6-C98DA3205C09}" type="datetimeFigureOut">
               <a:rPr lang="en-US" smtClean="0"/>
               <a:pPr/>
-              <a:t>7/18/2014</a:t>
+              <a:t>7/22/2014</a:t>
             </a:fld>
             <a:endParaRPr lang="en-US"/>
           </a:p>
@@ -3980,7 +3982,7 @@
             <a:fld id="{1D8BD707-D9CF-40AE-B4C6-C98DA3205C09}" type="datetimeFigureOut">
               <a:rPr lang="en-US" smtClean="0"/>
               <a:pPr/>
-              <a:t>7/18/2014</a:t>
+              <a:t>7/22/2014</a:t>
             </a:fld>
             <a:endParaRPr lang="en-US"/>
           </a:p>
@@ -4507,6 +4509,831 @@
 </file>
 
 <file path=ppt/slides/slide10.xml><?xml version="1.0" encoding="utf-8"?>
+<p:sld xmlns:a="http://schemas.openxmlformats.org/drawingml/2006/main" xmlns:r="http://schemas.openxmlformats.org/officeDocument/2006/relationships" xmlns:p="http://schemas.openxmlformats.org/presentationml/2006/main">
+  <p:cSld>
+    <p:spTree>
+      <p:nvGrpSpPr>
+        <p:cNvPr id="1" name=""/>
+        <p:cNvGrpSpPr/>
+        <p:nvPr/>
+      </p:nvGrpSpPr>
+      <p:grpSpPr>
+        <a:xfrm>
+          <a:off x="0" y="0"/>
+          <a:ext cx="0" cy="0"/>
+          <a:chOff x="0" y="0"/>
+          <a:chExt cx="0" cy="0"/>
+        </a:xfrm>
+      </p:grpSpPr>
+      <p:sp>
+        <p:nvSpPr>
+          <p:cNvPr id="31" name="TextBox 30"/>
+          <p:cNvSpPr txBox="1"/>
+          <p:nvPr/>
+        </p:nvSpPr>
+        <p:spPr>
+          <a:xfrm>
+            <a:off x="304800" y="533400"/>
+            <a:ext cx="8384190" cy="800219"/>
+          </a:xfrm>
+          <a:prstGeom prst="rect">
+            <a:avLst/>
+          </a:prstGeom>
+          <a:noFill/>
+        </p:spPr>
+        <p:txBody>
+          <a:bodyPr wrap="square" rtlCol="0">
+            <a:spAutoFit/>
+          </a:bodyPr>
+          <a:lstStyle/>
+          <a:p>
+            <a:r>
+              <a:rPr lang="en-US" sz="2800" b="1" dirty="0" smtClean="0">
+                <a:solidFill>
+                  <a:schemeClr val="accent6">
+                    <a:lumMod val="75000"/>
+                  </a:schemeClr>
+                </a:solidFill>
+              </a:rPr>
+              <a:t>3.</a:t>
+            </a:r>
+            <a:r>
+              <a:rPr lang="en-US" dirty="0" smtClean="0">
+                <a:solidFill>
+                  <a:schemeClr val="accent6">
+                    <a:lumMod val="75000"/>
+                  </a:schemeClr>
+                </a:solidFill>
+              </a:rPr>
+              <a:t> Did you notice the new slide with a spotlight? You can press </a:t>
+            </a:r>
+            <a:r>
+              <a:rPr lang="en-US" dirty="0" err="1" smtClean="0">
+                <a:solidFill>
+                  <a:schemeClr val="accent6">
+                    <a:lumMod val="75000"/>
+                  </a:schemeClr>
+                </a:solidFill>
+              </a:rPr>
+              <a:t>Ctrl+Z</a:t>
+            </a:r>
+            <a:r>
+              <a:rPr lang="en-US" dirty="0" smtClean="0">
+                <a:solidFill>
+                  <a:schemeClr val="accent6">
+                    <a:lumMod val="75000"/>
+                  </a:schemeClr>
+                </a:solidFill>
+              </a:rPr>
+              <a:t> (Undo) to reverse the effect.</a:t>
+            </a:r>
+            <a:endParaRPr lang="en-SG" dirty="0">
+              <a:solidFill>
+                <a:schemeClr val="accent6">
+                  <a:lumMod val="75000"/>
+                </a:schemeClr>
+              </a:solidFill>
+            </a:endParaRPr>
+          </a:p>
+        </p:txBody>
+      </p:sp>
+      <p:pic>
+        <p:nvPicPr>
+          <p:cNvPr id="10242" name="Picture 2"/>
+          <p:cNvPicPr>
+            <a:picLocks noChangeAspect="1" noChangeArrowheads="1"/>
+          </p:cNvPicPr>
+          <p:nvPr/>
+        </p:nvPicPr>
+        <p:blipFill>
+          <a:blip r:embed="rId2">
+            <a:extLst>
+              <a:ext uri="{28A0092B-C50C-407E-A947-70E740481C1C}">
+                <a14:useLocalDpi xmlns:a14="http://schemas.microsoft.com/office/drawing/2010/main" val="0"/>
+              </a:ext>
+            </a:extLst>
+          </a:blip>
+          <a:srcRect/>
+          <a:stretch>
+            <a:fillRect/>
+          </a:stretch>
+        </p:blipFill>
+        <p:spPr bwMode="auto">
+          <a:xfrm>
+            <a:off x="762000" y="1447800"/>
+            <a:ext cx="2210895" cy="1658171"/>
+          </a:xfrm>
+          <a:prstGeom prst="rect">
+            <a:avLst/>
+          </a:prstGeom>
+          <a:ln>
+            <a:noFill/>
+          </a:ln>
+          <a:effectLst>
+            <a:outerShdw blurRad="190500" algn="tl" rotWithShape="0">
+              <a:srgbClr val="000000">
+                <a:alpha val="70000"/>
+              </a:srgbClr>
+            </a:outerShdw>
+          </a:effectLst>
+          <a:extLst>
+            <a:ext uri="{909E8E84-426E-40DD-AFC4-6F175D3DCCD1}">
+              <a14:hiddenFill xmlns:a14="http://schemas.microsoft.com/office/drawing/2010/main">
+                <a:solidFill>
+                  <a:schemeClr val="accent1"/>
+                </a:solidFill>
+              </a14:hiddenFill>
+            </a:ext>
+            <a:ext uri="{91240B29-F687-4F45-9708-019B960494DF}">
+              <a14:hiddenLine xmlns:a14="http://schemas.microsoft.com/office/drawing/2010/main" w="9525">
+                <a:solidFill>
+                  <a:schemeClr val="tx1"/>
+                </a:solidFill>
+                <a:miter lim="800000"/>
+                <a:headEnd/>
+                <a:tailEnd/>
+              </a14:hiddenLine>
+            </a:ext>
+          </a:extLst>
+        </p:spPr>
+      </p:pic>
+      <p:sp>
+        <p:nvSpPr>
+          <p:cNvPr id="18" name="TextBox 17"/>
+          <p:cNvSpPr txBox="1"/>
+          <p:nvPr/>
+        </p:nvSpPr>
+        <p:spPr>
+          <a:xfrm>
+            <a:off x="304800" y="3505200"/>
+            <a:ext cx="8384190" cy="800219"/>
+          </a:xfrm>
+          <a:prstGeom prst="rect">
+            <a:avLst/>
+          </a:prstGeom>
+          <a:noFill/>
+        </p:spPr>
+        <p:txBody>
+          <a:bodyPr wrap="square" rtlCol="0">
+            <a:spAutoFit/>
+          </a:bodyPr>
+          <a:lstStyle/>
+          <a:p>
+            <a:r>
+              <a:rPr lang="en-US" sz="2800" b="1" dirty="0" smtClean="0">
+                <a:solidFill>
+                  <a:schemeClr val="accent6">
+                    <a:lumMod val="75000"/>
+                  </a:schemeClr>
+                </a:solidFill>
+              </a:rPr>
+              <a:t>4.</a:t>
+            </a:r>
+            <a:r>
+              <a:rPr lang="en-US" dirty="0" smtClean="0">
+                <a:solidFill>
+                  <a:schemeClr val="accent6">
+                    <a:lumMod val="75000"/>
+                  </a:schemeClr>
+                </a:solidFill>
+              </a:rPr>
+              <a:t> You can also adjust the darkness (transparency) and softness (soft edges) of the spotlight.</a:t>
+            </a:r>
+            <a:endParaRPr lang="en-SG" dirty="0">
+              <a:solidFill>
+                <a:schemeClr val="accent6">
+                  <a:lumMod val="75000"/>
+                </a:schemeClr>
+              </a:solidFill>
+            </a:endParaRPr>
+          </a:p>
+        </p:txBody>
+      </p:sp>
+      <p:sp>
+        <p:nvSpPr>
+          <p:cNvPr id="20" name="TextBox 19"/>
+          <p:cNvSpPr txBox="1"/>
+          <p:nvPr/>
+        </p:nvSpPr>
+        <p:spPr>
+          <a:xfrm>
+            <a:off x="5257800" y="5849171"/>
+            <a:ext cx="2226136" cy="738664"/>
+          </a:xfrm>
+          <a:prstGeom prst="rect">
+            <a:avLst/>
+          </a:prstGeom>
+          <a:noFill/>
+        </p:spPr>
+        <p:txBody>
+          <a:bodyPr wrap="square" rtlCol="0">
+            <a:spAutoFit/>
+          </a:bodyPr>
+          <a:lstStyle/>
+          <a:p>
+            <a:r>
+              <a:rPr lang="en-US" sz="2400" b="1" dirty="0" smtClean="0">
+                <a:solidFill>
+                  <a:schemeClr val="accent6">
+                    <a:lumMod val="75000"/>
+                  </a:schemeClr>
+                </a:solidFill>
+              </a:rPr>
+              <a:t>b.</a:t>
+            </a:r>
+            <a:r>
+              <a:rPr lang="en-US" sz="1600" dirty="0" smtClean="0">
+                <a:solidFill>
+                  <a:schemeClr val="accent6">
+                    <a:lumMod val="75000"/>
+                  </a:schemeClr>
+                </a:solidFill>
+              </a:rPr>
+              <a:t> </a:t>
+            </a:r>
+            <a:r>
+              <a:rPr lang="en-US" dirty="0" smtClean="0">
+                <a:solidFill>
+                  <a:schemeClr val="accent6">
+                    <a:lumMod val="75000"/>
+                  </a:schemeClr>
+                </a:solidFill>
+              </a:rPr>
+              <a:t>Select the shadow-like shape.</a:t>
+            </a:r>
+            <a:endParaRPr lang="en-SG" dirty="0">
+              <a:solidFill>
+                <a:schemeClr val="accent6">
+                  <a:lumMod val="75000"/>
+                </a:schemeClr>
+              </a:solidFill>
+            </a:endParaRPr>
+          </a:p>
+        </p:txBody>
+      </p:sp>
+      <p:sp>
+        <p:nvSpPr>
+          <p:cNvPr id="21" name="TextBox 20"/>
+          <p:cNvSpPr txBox="1"/>
+          <p:nvPr/>
+        </p:nvSpPr>
+        <p:spPr>
+          <a:xfrm>
+            <a:off x="381000" y="5849171"/>
+            <a:ext cx="1995311" cy="738664"/>
+          </a:xfrm>
+          <a:prstGeom prst="rect">
+            <a:avLst/>
+          </a:prstGeom>
+          <a:noFill/>
+        </p:spPr>
+        <p:txBody>
+          <a:bodyPr wrap="square" rtlCol="0">
+            <a:spAutoFit/>
+          </a:bodyPr>
+          <a:lstStyle/>
+          <a:p>
+            <a:r>
+              <a:rPr lang="en-US" sz="2400" b="1" dirty="0" smtClean="0">
+                <a:solidFill>
+                  <a:schemeClr val="accent6">
+                    <a:lumMod val="75000"/>
+                  </a:schemeClr>
+                </a:solidFill>
+              </a:rPr>
+              <a:t>a.</a:t>
+            </a:r>
+            <a:r>
+              <a:rPr lang="en-US" sz="1600" dirty="0" smtClean="0">
+                <a:solidFill>
+                  <a:schemeClr val="accent6">
+                    <a:lumMod val="75000"/>
+                  </a:schemeClr>
+                </a:solidFill>
+              </a:rPr>
+              <a:t> </a:t>
+            </a:r>
+            <a:r>
+              <a:rPr lang="en-US" dirty="0" smtClean="0">
+                <a:solidFill>
+                  <a:schemeClr val="accent6">
+                    <a:lumMod val="75000"/>
+                  </a:schemeClr>
+                </a:solidFill>
+              </a:rPr>
+              <a:t>Adjust these </a:t>
+            </a:r>
+            <a:br>
+              <a:rPr lang="en-US" dirty="0" smtClean="0">
+                <a:solidFill>
+                  <a:schemeClr val="accent6">
+                    <a:lumMod val="75000"/>
+                  </a:schemeClr>
+                </a:solidFill>
+              </a:rPr>
+            </a:br>
+            <a:r>
+              <a:rPr lang="en-US" dirty="0" smtClean="0">
+                <a:solidFill>
+                  <a:schemeClr val="accent6">
+                    <a:lumMod val="75000"/>
+                  </a:schemeClr>
+                </a:solidFill>
+              </a:rPr>
+              <a:t>settings.</a:t>
+            </a:r>
+            <a:endParaRPr lang="en-SG" dirty="0">
+              <a:solidFill>
+                <a:schemeClr val="accent6">
+                  <a:lumMod val="75000"/>
+                </a:schemeClr>
+              </a:solidFill>
+            </a:endParaRPr>
+          </a:p>
+        </p:txBody>
+      </p:sp>
+      <p:pic>
+        <p:nvPicPr>
+          <p:cNvPr id="10244" name="Picture 4"/>
+          <p:cNvPicPr>
+            <a:picLocks noChangeAspect="1" noChangeArrowheads="1"/>
+          </p:cNvPicPr>
+          <p:nvPr/>
+        </p:nvPicPr>
+        <p:blipFill>
+          <a:blip r:embed="rId3">
+            <a:extLst>
+              <a:ext uri="{28A0092B-C50C-407E-A947-70E740481C1C}">
+                <a14:useLocalDpi xmlns:a14="http://schemas.microsoft.com/office/drawing/2010/main" val="0"/>
+              </a:ext>
+            </a:extLst>
+          </a:blip>
+          <a:srcRect/>
+          <a:stretch>
+            <a:fillRect/>
+          </a:stretch>
+        </p:blipFill>
+        <p:spPr bwMode="auto">
+          <a:xfrm>
+            <a:off x="7848600" y="4419599"/>
+            <a:ext cx="838200" cy="1167493"/>
+          </a:xfrm>
+          <a:prstGeom prst="rect">
+            <a:avLst/>
+          </a:prstGeom>
+          <a:noFill/>
+          <a:ln>
+            <a:noFill/>
+          </a:ln>
+          <a:extLst>
+            <a:ext uri="{909E8E84-426E-40DD-AFC4-6F175D3DCCD1}">
+              <a14:hiddenFill xmlns:a14="http://schemas.microsoft.com/office/drawing/2010/main">
+                <a:solidFill>
+                  <a:schemeClr val="accent1"/>
+                </a:solidFill>
+              </a14:hiddenFill>
+            </a:ext>
+            <a:ext uri="{91240B29-F687-4F45-9708-019B960494DF}">
+              <a14:hiddenLine xmlns:a14="http://schemas.microsoft.com/office/drawing/2010/main" w="9525">
+                <a:solidFill>
+                  <a:schemeClr val="tx1"/>
+                </a:solidFill>
+                <a:miter lim="800000"/>
+                <a:headEnd/>
+                <a:tailEnd/>
+              </a14:hiddenLine>
+            </a:ext>
+          </a:extLst>
+        </p:spPr>
+      </p:pic>
+      <p:sp>
+        <p:nvSpPr>
+          <p:cNvPr id="24" name="TextBox 23"/>
+          <p:cNvSpPr txBox="1"/>
+          <p:nvPr/>
+        </p:nvSpPr>
+        <p:spPr>
+          <a:xfrm>
+            <a:off x="7756064" y="5849171"/>
+            <a:ext cx="1311736" cy="738664"/>
+          </a:xfrm>
+          <a:prstGeom prst="rect">
+            <a:avLst/>
+          </a:prstGeom>
+          <a:noFill/>
+        </p:spPr>
+        <p:txBody>
+          <a:bodyPr wrap="square" rtlCol="0">
+            <a:spAutoFit/>
+          </a:bodyPr>
+          <a:lstStyle/>
+          <a:p>
+            <a:r>
+              <a:rPr lang="en-US" sz="2400" b="1" dirty="0" smtClean="0">
+                <a:solidFill>
+                  <a:schemeClr val="accent6">
+                    <a:lumMod val="75000"/>
+                  </a:schemeClr>
+                </a:solidFill>
+              </a:rPr>
+              <a:t>c.</a:t>
+            </a:r>
+            <a:r>
+              <a:rPr lang="en-US" sz="1600" dirty="0" smtClean="0">
+                <a:solidFill>
+                  <a:schemeClr val="accent6">
+                    <a:lumMod val="75000"/>
+                  </a:schemeClr>
+                </a:solidFill>
+              </a:rPr>
+              <a:t> </a:t>
+            </a:r>
+            <a:r>
+              <a:rPr lang="en-US" dirty="0" smtClean="0">
+                <a:solidFill>
+                  <a:schemeClr val="accent6">
+                    <a:lumMod val="75000"/>
+                  </a:schemeClr>
+                </a:solidFill>
+              </a:rPr>
+              <a:t>Click </a:t>
+            </a:r>
+            <a:br>
+              <a:rPr lang="en-US" dirty="0" smtClean="0">
+                <a:solidFill>
+                  <a:schemeClr val="accent6">
+                    <a:lumMod val="75000"/>
+                  </a:schemeClr>
+                </a:solidFill>
+              </a:rPr>
+            </a:br>
+            <a:r>
+              <a:rPr lang="en-US" dirty="0" smtClean="0">
+                <a:solidFill>
+                  <a:schemeClr val="accent6">
+                    <a:lumMod val="75000"/>
+                  </a:schemeClr>
+                </a:solidFill>
+              </a:rPr>
+              <a:t>this button.</a:t>
+            </a:r>
+            <a:endParaRPr lang="en-SG" dirty="0">
+              <a:solidFill>
+                <a:schemeClr val="accent6">
+                  <a:lumMod val="75000"/>
+                </a:schemeClr>
+              </a:solidFill>
+            </a:endParaRPr>
+          </a:p>
+        </p:txBody>
+      </p:sp>
+      <p:pic>
+        <p:nvPicPr>
+          <p:cNvPr id="10245" name="Picture 5"/>
+          <p:cNvPicPr>
+            <a:picLocks noChangeAspect="1" noChangeArrowheads="1"/>
+          </p:cNvPicPr>
+          <p:nvPr/>
+        </p:nvPicPr>
+        <p:blipFill>
+          <a:blip r:embed="rId4" cstate="print">
+            <a:extLst>
+              <a:ext uri="{28A0092B-C50C-407E-A947-70E740481C1C}">
+                <a14:useLocalDpi xmlns:a14="http://schemas.microsoft.com/office/drawing/2010/main" val="0"/>
+              </a:ext>
+            </a:extLst>
+          </a:blip>
+          <a:srcRect/>
+          <a:stretch>
+            <a:fillRect/>
+          </a:stretch>
+        </p:blipFill>
+        <p:spPr bwMode="auto">
+          <a:xfrm>
+            <a:off x="5227320" y="4424138"/>
+            <a:ext cx="1904689" cy="1429572"/>
+          </a:xfrm>
+          <a:prstGeom prst="rect">
+            <a:avLst/>
+          </a:prstGeom>
+          <a:noFill/>
+          <a:ln>
+            <a:noFill/>
+          </a:ln>
+          <a:effectLst/>
+          <a:extLst>
+            <a:ext uri="{909E8E84-426E-40DD-AFC4-6F175D3DCCD1}">
+              <a14:hiddenFill xmlns:a14="http://schemas.microsoft.com/office/drawing/2010/main">
+                <a:solidFill>
+                  <a:schemeClr val="accent1"/>
+                </a:solidFill>
+              </a14:hiddenFill>
+            </a:ext>
+            <a:ext uri="{91240B29-F687-4F45-9708-019B960494DF}">
+              <a14:hiddenLine xmlns:a14="http://schemas.microsoft.com/office/drawing/2010/main" w="9525">
+                <a:solidFill>
+                  <a:schemeClr val="tx1"/>
+                </a:solidFill>
+                <a:miter lim="800000"/>
+                <a:headEnd/>
+                <a:tailEnd/>
+              </a14:hiddenLine>
+            </a:ext>
+            <a:ext uri="{AF507438-7753-43E0-B8FC-AC1667EBCBE1}">
+              <a14:hiddenEffects xmlns:a14="http://schemas.microsoft.com/office/drawing/2010/main">
+                <a:effectLst>
+                  <a:outerShdw dist="35921" dir="2700000" algn="ctr" rotWithShape="0">
+                    <a:schemeClr val="bg2"/>
+                  </a:outerShdw>
+                </a:effectLst>
+              </a14:hiddenEffects>
+            </a:ext>
+          </a:extLst>
+        </p:spPr>
+      </p:pic>
+      <p:pic>
+        <p:nvPicPr>
+          <p:cNvPr id="1026" name="Picture 2"/>
+          <p:cNvPicPr>
+            <a:picLocks noChangeAspect="1" noChangeArrowheads="1"/>
+          </p:cNvPicPr>
+          <p:nvPr/>
+        </p:nvPicPr>
+        <p:blipFill>
+          <a:blip r:embed="rId5">
+            <a:extLst>
+              <a:ext uri="{28A0092B-C50C-407E-A947-70E740481C1C}">
+                <a14:useLocalDpi xmlns:a14="http://schemas.microsoft.com/office/drawing/2010/main" val="0"/>
+              </a:ext>
+            </a:extLst>
+          </a:blip>
+          <a:srcRect/>
+          <a:stretch>
+            <a:fillRect/>
+          </a:stretch>
+        </p:blipFill>
+        <p:spPr bwMode="auto">
+          <a:xfrm>
+            <a:off x="2376311" y="4976954"/>
+            <a:ext cx="2500489" cy="1119046"/>
+          </a:xfrm>
+          <a:prstGeom prst="roundRect">
+            <a:avLst>
+              <a:gd name="adj" fmla="val 3977"/>
+            </a:avLst>
+          </a:prstGeom>
+          <a:noFill/>
+          <a:ln>
+            <a:noFill/>
+          </a:ln>
+          <a:effectLst/>
+          <a:extLst>
+            <a:ext uri="{909E8E84-426E-40DD-AFC4-6F175D3DCCD1}">
+              <a14:hiddenFill xmlns:a14="http://schemas.microsoft.com/office/drawing/2010/main">
+                <a:solidFill>
+                  <a:schemeClr val="accent1"/>
+                </a:solidFill>
+              </a14:hiddenFill>
+            </a:ext>
+            <a:ext uri="{91240B29-F687-4F45-9708-019B960494DF}">
+              <a14:hiddenLine xmlns:a14="http://schemas.microsoft.com/office/drawing/2010/main" w="9525">
+                <a:solidFill>
+                  <a:schemeClr val="tx1"/>
+                </a:solidFill>
+                <a:miter lim="800000"/>
+                <a:headEnd/>
+                <a:tailEnd/>
+              </a14:hiddenLine>
+            </a:ext>
+            <a:ext uri="{AF507438-7753-43E0-B8FC-AC1667EBCBE1}">
+              <a14:hiddenEffects xmlns:a14="http://schemas.microsoft.com/office/drawing/2010/main">
+                <a:effectLst>
+                  <a:outerShdw dist="35921" dir="2700000" algn="ctr" rotWithShape="0">
+                    <a:schemeClr val="bg2"/>
+                  </a:outerShdw>
+                </a:effectLst>
+              </a14:hiddenEffects>
+            </a:ext>
+          </a:extLst>
+        </p:spPr>
+      </p:pic>
+      <p:pic>
+        <p:nvPicPr>
+          <p:cNvPr id="1027" name="Picture 3"/>
+          <p:cNvPicPr>
+            <a:picLocks noChangeAspect="1" noChangeArrowheads="1"/>
+          </p:cNvPicPr>
+          <p:nvPr/>
+        </p:nvPicPr>
+        <p:blipFill>
+          <a:blip r:embed="rId6">
+            <a:extLst>
+              <a:ext uri="{28A0092B-C50C-407E-A947-70E740481C1C}">
+                <a14:useLocalDpi xmlns:a14="http://schemas.microsoft.com/office/drawing/2010/main" val="0"/>
+              </a:ext>
+            </a:extLst>
+          </a:blip>
+          <a:srcRect/>
+          <a:stretch>
+            <a:fillRect/>
+          </a:stretch>
+        </p:blipFill>
+        <p:spPr bwMode="auto">
+          <a:xfrm>
+            <a:off x="416065" y="4280964"/>
+            <a:ext cx="1694356" cy="1270767"/>
+          </a:xfrm>
+          <a:prstGeom prst="rect">
+            <a:avLst/>
+          </a:prstGeom>
+          <a:noFill/>
+          <a:ln>
+            <a:noFill/>
+          </a:ln>
+          <a:effectLst/>
+          <a:extLst>
+            <a:ext uri="{909E8E84-426E-40DD-AFC4-6F175D3DCCD1}">
+              <a14:hiddenFill xmlns:a14="http://schemas.microsoft.com/office/drawing/2010/main">
+                <a:solidFill>
+                  <a:schemeClr val="accent1"/>
+                </a:solidFill>
+              </a14:hiddenFill>
+            </a:ext>
+            <a:ext uri="{91240B29-F687-4F45-9708-019B960494DF}">
+              <a14:hiddenLine xmlns:a14="http://schemas.microsoft.com/office/drawing/2010/main" w="9525">
+                <a:solidFill>
+                  <a:schemeClr val="tx1"/>
+                </a:solidFill>
+                <a:miter lim="800000"/>
+                <a:headEnd/>
+                <a:tailEnd/>
+              </a14:hiddenLine>
+            </a:ext>
+            <a:ext uri="{AF507438-7753-43E0-B8FC-AC1667EBCBE1}">
+              <a14:hiddenEffects xmlns:a14="http://schemas.microsoft.com/office/drawing/2010/main">
+                <a:effectLst>
+                  <a:outerShdw dist="35921" dir="2700000" algn="ctr" rotWithShape="0">
+                    <a:schemeClr val="bg2"/>
+                  </a:outerShdw>
+                </a:effectLst>
+              </a14:hiddenEffects>
+            </a:ext>
+          </a:extLst>
+        </p:spPr>
+      </p:pic>
+      <p:sp>
+        <p:nvSpPr>
+          <p:cNvPr id="2" name="Flowchart: Connector 1"/>
+          <p:cNvSpPr/>
+          <p:nvPr/>
+        </p:nvSpPr>
+        <p:spPr>
+          <a:xfrm>
+            <a:off x="1825520" y="5276419"/>
+            <a:ext cx="368721" cy="368721"/>
+          </a:xfrm>
+          <a:prstGeom prst="flowChartConnector">
+            <a:avLst/>
+          </a:prstGeom>
+          <a:noFill/>
+          <a:ln w="38100">
+            <a:solidFill>
+              <a:schemeClr val="accent6"/>
+            </a:solidFill>
+          </a:ln>
+        </p:spPr>
+        <p:style>
+          <a:lnRef idx="2">
+            <a:schemeClr val="accent1">
+              <a:shade val="50000"/>
+            </a:schemeClr>
+          </a:lnRef>
+          <a:fillRef idx="1">
+            <a:schemeClr val="accent1"/>
+          </a:fillRef>
+          <a:effectRef idx="0">
+            <a:schemeClr val="accent1"/>
+          </a:effectRef>
+          <a:fontRef idx="minor">
+            <a:schemeClr val="lt1"/>
+          </a:fontRef>
+        </p:style>
+        <p:txBody>
+          <a:bodyPr rtlCol="0" anchor="ctr"/>
+          <a:lstStyle/>
+          <a:p>
+            <a:pPr algn="ctr"/>
+            <a:endParaRPr lang="en-US"/>
+          </a:p>
+        </p:txBody>
+      </p:sp>
+      <p:sp>
+        <p:nvSpPr>
+          <p:cNvPr id="3" name="Freeform 2"/>
+          <p:cNvSpPr/>
+          <p:nvPr/>
+        </p:nvSpPr>
+        <p:spPr>
+          <a:xfrm>
+            <a:off x="2003320" y="5653834"/>
+            <a:ext cx="304800" cy="203200"/>
+          </a:xfrm>
+          <a:custGeom>
+            <a:avLst/>
+            <a:gdLst>
+              <a:gd name="connsiteX0" fmla="*/ 0 w 304800"/>
+              <a:gd name="connsiteY0" fmla="*/ 0 h 203200"/>
+              <a:gd name="connsiteX1" fmla="*/ 76200 w 304800"/>
+              <a:gd name="connsiteY1" fmla="*/ 165100 h 203200"/>
+              <a:gd name="connsiteX2" fmla="*/ 304800 w 304800"/>
+              <a:gd name="connsiteY2" fmla="*/ 203200 h 203200"/>
+            </a:gdLst>
+            <a:ahLst/>
+            <a:cxnLst>
+              <a:cxn ang="0">
+                <a:pos x="connsiteX0" y="connsiteY0"/>
+              </a:cxn>
+              <a:cxn ang="0">
+                <a:pos x="connsiteX1" y="connsiteY1"/>
+              </a:cxn>
+              <a:cxn ang="0">
+                <a:pos x="connsiteX2" y="connsiteY2"/>
+              </a:cxn>
+            </a:cxnLst>
+            <a:rect l="l" t="t" r="r" b="b"/>
+            <a:pathLst>
+              <a:path w="304800" h="203200">
+                <a:moveTo>
+                  <a:pt x="0" y="0"/>
+                </a:moveTo>
+                <a:cubicBezTo>
+                  <a:pt x="12700" y="65616"/>
+                  <a:pt x="25400" y="131233"/>
+                  <a:pt x="76200" y="165100"/>
+                </a:cubicBezTo>
+                <a:cubicBezTo>
+                  <a:pt x="127000" y="198967"/>
+                  <a:pt x="215900" y="201083"/>
+                  <a:pt x="304800" y="203200"/>
+                </a:cubicBezTo>
+              </a:path>
+            </a:pathLst>
+          </a:custGeom>
+          <a:noFill/>
+          <a:ln w="38100">
+            <a:solidFill>
+              <a:schemeClr val="accent6"/>
+            </a:solidFill>
+            <a:headEnd type="none" w="med" len="med"/>
+            <a:tailEnd type="triangle" w="med" len="med"/>
+          </a:ln>
+        </p:spPr>
+        <p:style>
+          <a:lnRef idx="2">
+            <a:schemeClr val="accent1">
+              <a:shade val="50000"/>
+            </a:schemeClr>
+          </a:lnRef>
+          <a:fillRef idx="1">
+            <a:schemeClr val="accent1"/>
+          </a:fillRef>
+          <a:effectRef idx="0">
+            <a:schemeClr val="accent1"/>
+          </a:effectRef>
+          <a:fontRef idx="minor">
+            <a:schemeClr val="lt1"/>
+          </a:fontRef>
+        </p:style>
+        <p:txBody>
+          <a:bodyPr rtlCol="0" anchor="ctr"/>
+          <a:lstStyle/>
+          <a:p>
+            <a:pPr algn="ctr"/>
+            <a:endParaRPr lang="en-US"/>
+          </a:p>
+        </p:txBody>
+      </p:sp>
+    </p:spTree>
+    <p:extLst>
+      <p:ext uri="{BB962C8B-B14F-4D97-AF65-F5344CB8AC3E}">
+        <p14:creationId xmlns:p14="http://schemas.microsoft.com/office/powerpoint/2010/main" val="2709547285"/>
+      </p:ext>
+    </p:extLst>
+  </p:cSld>
+  <p:clrMapOvr>
+    <a:masterClrMapping/>
+  </p:clrMapOvr>
+  <p:timing>
+    <p:tnLst>
+      <p:par>
+        <p:cTn id="1" dur="indefinite" restart="never" nodeType="tmRoot"/>
+      </p:par>
+    </p:tnLst>
+  </p:timing>
+</p:sld>
+</file>
+
+<file path=ppt/slides/slide11.xml><?xml version="1.0" encoding="utf-8"?>
 <p:sld xmlns:a="http://schemas.openxmlformats.org/drawingml/2006/main" xmlns:r="http://schemas.openxmlformats.org/officeDocument/2006/relationships" xmlns:p="http://schemas.openxmlformats.org/presentationml/2006/main">
   <p:cSld>
     <p:spTree>
@@ -5002,7 +5829,7 @@
 </p:sld>
 </file>
 
-<file path=ppt/slides/slide11.xml><?xml version="1.0" encoding="utf-8"?>
+<file path=ppt/slides/slide12.xml><?xml version="1.0" encoding="utf-8"?>
 <p:sld xmlns:a="http://schemas.openxmlformats.org/drawingml/2006/main" xmlns:r="http://schemas.openxmlformats.org/officeDocument/2006/relationships" xmlns:p="http://schemas.openxmlformats.org/presentationml/2006/main">
   <p:cSld name="PPSlideStart201402171123497521">
     <p:spTree>
@@ -5451,7 +6278,7 @@
 </p:sld>
 </file>
 
-<file path=ppt/slides/slide12.xml><?xml version="1.0" encoding="utf-8"?>
+<file path=ppt/slides/slide13.xml><?xml version="1.0" encoding="utf-8"?>
 <p:sld xmlns:a="http://schemas.openxmlformats.org/drawingml/2006/main" xmlns:r="http://schemas.openxmlformats.org/officeDocument/2006/relationships" xmlns:p="http://schemas.openxmlformats.org/presentationml/2006/main">
   <p:cSld name="PPSlideEnd201402171123497691">
     <p:spTree>
@@ -5707,7 +6534,7 @@
 </p:sld>
 </file>
 
-<file path=ppt/slides/slide13.xml><?xml version="1.0" encoding="utf-8"?>
+<file path=ppt/slides/slide14.xml><?xml version="1.0" encoding="utf-8"?>
 <p:sld xmlns:a="http://schemas.openxmlformats.org/drawingml/2006/main" xmlns:r="http://schemas.openxmlformats.org/officeDocument/2006/relationships" xmlns:p="http://schemas.openxmlformats.org/presentationml/2006/main">
   <p:cSld>
     <p:spTree>
@@ -6447,7 +7274,7 @@
 </p:sld>
 </file>
 
-<file path=ppt/slides/slide14.xml><?xml version="1.0" encoding="utf-8"?>
+<file path=ppt/slides/slide15.xml><?xml version="1.0" encoding="utf-8"?>
 <p:sld xmlns:a="http://schemas.openxmlformats.org/drawingml/2006/main" xmlns:r="http://schemas.openxmlformats.org/officeDocument/2006/relationships" xmlns:p="http://schemas.openxmlformats.org/presentationml/2006/main">
   <p:cSld>
     <p:spTree>
@@ -7015,7 +7842,7 @@
 </p:sld>
 </file>
 
-<file path=ppt/slides/slide15.xml><?xml version="1.0" encoding="utf-8"?>
+<file path=ppt/slides/slide16.xml><?xml version="1.0" encoding="utf-8"?>
 <p:sld xmlns:a="http://schemas.openxmlformats.org/drawingml/2006/main" xmlns:r="http://schemas.openxmlformats.org/officeDocument/2006/relationships" xmlns:p="http://schemas.openxmlformats.org/presentationml/2006/main">
   <p:cSld>
     <p:spTree>
@@ -7543,7 +8370,7 @@
 </p:sld>
 </file>
 
-<file path=ppt/slides/slide16.xml><?xml version="1.0" encoding="utf-8"?>
+<file path=ppt/slides/slide17.xml><?xml version="1.0" encoding="utf-8"?>
 <p:sld xmlns:a="http://schemas.openxmlformats.org/drawingml/2006/main" xmlns:r="http://schemas.openxmlformats.org/officeDocument/2006/relationships" xmlns:p="http://schemas.openxmlformats.org/presentationml/2006/main">
   <p:cSld>
     <p:spTree>
@@ -8796,7 +9623,7 @@
 </p:sld>
 </file>
 
-<file path=ppt/slides/slide17.xml><?xml version="1.0" encoding="utf-8"?>
+<file path=ppt/slides/slide18.xml><?xml version="1.0" encoding="utf-8"?>
 <p:sld xmlns:a="http://schemas.openxmlformats.org/drawingml/2006/main" xmlns:r="http://schemas.openxmlformats.org/officeDocument/2006/relationships" xmlns:p="http://schemas.openxmlformats.org/presentationml/2006/main">
   <p:cSld>
     <p:spTree>
@@ -9822,7 +10649,7 @@
 </p:sld>
 </file>
 
-<file path=ppt/slides/slide18.xml><?xml version="1.0" encoding="utf-8"?>
+<file path=ppt/slides/slide19.xml><?xml version="1.0" encoding="utf-8"?>
 <p:sld xmlns:a="http://schemas.openxmlformats.org/drawingml/2006/main" xmlns:r="http://schemas.openxmlformats.org/officeDocument/2006/relationships" xmlns:p="http://schemas.openxmlformats.org/presentationml/2006/main">
   <p:cSld>
     <p:spTree>
@@ -10925,552 +11752,6 @@
 </p:sld>
 </file>
 
-<file path=ppt/slides/slide19.xml><?xml version="1.0" encoding="utf-8"?>
-<p:sld xmlns:a="http://schemas.openxmlformats.org/drawingml/2006/main" xmlns:r="http://schemas.openxmlformats.org/officeDocument/2006/relationships" xmlns:p="http://schemas.openxmlformats.org/presentationml/2006/main">
-  <p:cSld>
-    <p:bg>
-      <p:bgPr>
-        <a:solidFill>
-          <a:schemeClr val="accent1">
-            <a:lumMod val="20000"/>
-            <a:lumOff val="80000"/>
-          </a:schemeClr>
-        </a:solidFill>
-        <a:effectLst/>
-      </p:bgPr>
-    </p:bg>
-    <p:spTree>
-      <p:nvGrpSpPr>
-        <p:cNvPr id="1" name=""/>
-        <p:cNvGrpSpPr/>
-        <p:nvPr/>
-      </p:nvGrpSpPr>
-      <p:grpSpPr>
-        <a:xfrm>
-          <a:off x="0" y="0"/>
-          <a:ext cx="0" cy="0"/>
-          <a:chOff x="0" y="0"/>
-          <a:chExt cx="0" cy="0"/>
-        </a:xfrm>
-      </p:grpSpPr>
-      <p:sp>
-        <p:nvSpPr>
-          <p:cNvPr id="4" name="Flowchart: Delay 3"/>
-          <p:cNvSpPr/>
-          <p:nvPr/>
-        </p:nvSpPr>
-        <p:spPr>
-          <a:xfrm>
-            <a:off x="6477000" y="2438400"/>
-            <a:ext cx="1219200" cy="1219200"/>
-          </a:xfrm>
-          <a:prstGeom prst="flowChartDelay">
-            <a:avLst/>
-          </a:prstGeom>
-        </p:spPr>
-        <p:style>
-          <a:lnRef idx="0">
-            <a:schemeClr val="accent1"/>
-          </a:lnRef>
-          <a:fillRef idx="3">
-            <a:schemeClr val="accent1"/>
-          </a:fillRef>
-          <a:effectRef idx="3">
-            <a:schemeClr val="accent1"/>
-          </a:effectRef>
-          <a:fontRef idx="minor">
-            <a:schemeClr val="lt1"/>
-          </a:fontRef>
-        </p:style>
-        <p:txBody>
-          <a:bodyPr rtlCol="0" anchor="ctr"/>
-          <a:lstStyle/>
-          <a:p>
-            <a:pPr algn="ctr"/>
-            <a:r>
-              <a:rPr lang="en-US" sz="3200" b="1" dirty="0" smtClean="0"/>
-              <a:t>Z</a:t>
-            </a:r>
-            <a:endParaRPr lang="en-SG" sz="3200" b="1" dirty="0"/>
-          </a:p>
-        </p:txBody>
-      </p:sp>
-      <p:sp>
-        <p:nvSpPr>
-          <p:cNvPr id="5" name="Flowchart: Alternate Process 4"/>
-          <p:cNvSpPr/>
-          <p:nvPr/>
-        </p:nvSpPr>
-        <p:spPr>
-          <a:xfrm>
-            <a:off x="3200400" y="2476500"/>
-            <a:ext cx="2209800" cy="1143000"/>
-          </a:xfrm>
-          <a:prstGeom prst="flowChartAlternateProcess">
-            <a:avLst/>
-          </a:prstGeom>
-        </p:spPr>
-        <p:style>
-          <a:lnRef idx="0">
-            <a:schemeClr val="accent1"/>
-          </a:lnRef>
-          <a:fillRef idx="3">
-            <a:schemeClr val="accent1"/>
-          </a:fillRef>
-          <a:effectRef idx="3">
-            <a:schemeClr val="accent1"/>
-          </a:effectRef>
-          <a:fontRef idx="minor">
-            <a:schemeClr val="lt1"/>
-          </a:fontRef>
-        </p:style>
-        <p:txBody>
-          <a:bodyPr rtlCol="0" anchor="ctr"/>
-          <a:lstStyle/>
-          <a:p>
-            <a:pPr algn="ctr"/>
-            <a:r>
-              <a:rPr lang="en-US" sz="3200" b="1" dirty="0" smtClean="0"/>
-              <a:t>Y</a:t>
-            </a:r>
-            <a:endParaRPr lang="en-SG" sz="3200" b="1" dirty="0"/>
-          </a:p>
-        </p:txBody>
-      </p:sp>
-      <p:sp>
-        <p:nvSpPr>
-          <p:cNvPr id="7" name="Flowchart: Alternate Process 6"/>
-          <p:cNvSpPr/>
-          <p:nvPr/>
-        </p:nvSpPr>
-        <p:spPr>
-          <a:xfrm>
-            <a:off x="3192483" y="4495800"/>
-            <a:ext cx="2209800" cy="1143000"/>
-          </a:xfrm>
-          <a:prstGeom prst="flowChartAlternateProcess">
-            <a:avLst/>
-          </a:prstGeom>
-        </p:spPr>
-        <p:style>
-          <a:lnRef idx="0">
-            <a:schemeClr val="accent1"/>
-          </a:lnRef>
-          <a:fillRef idx="3">
-            <a:schemeClr val="accent1"/>
-          </a:fillRef>
-          <a:effectRef idx="3">
-            <a:schemeClr val="accent1"/>
-          </a:effectRef>
-          <a:fontRef idx="minor">
-            <a:schemeClr val="lt1"/>
-          </a:fontRef>
-        </p:style>
-        <p:txBody>
-          <a:bodyPr rtlCol="0" anchor="ctr"/>
-          <a:lstStyle/>
-          <a:p>
-            <a:pPr algn="ctr"/>
-            <a:r>
-              <a:rPr lang="en-US" sz="3200" b="1" dirty="0" smtClean="0"/>
-              <a:t>M</a:t>
-            </a:r>
-            <a:endParaRPr lang="en-SG" sz="3200" b="1" dirty="0"/>
-          </a:p>
-        </p:txBody>
-      </p:sp>
-      <p:sp>
-        <p:nvSpPr>
-          <p:cNvPr id="6" name="Flowchart: Manual Input 5"/>
-          <p:cNvSpPr/>
-          <p:nvPr/>
-        </p:nvSpPr>
-        <p:spPr>
-          <a:xfrm>
-            <a:off x="3192483" y="762000"/>
-            <a:ext cx="2209800" cy="838200"/>
-          </a:xfrm>
-          <a:prstGeom prst="flowChartManualInput">
-            <a:avLst/>
-          </a:prstGeom>
-        </p:spPr>
-        <p:style>
-          <a:lnRef idx="0">
-            <a:schemeClr val="accent1"/>
-          </a:lnRef>
-          <a:fillRef idx="3">
-            <a:schemeClr val="accent1"/>
-          </a:fillRef>
-          <a:effectRef idx="3">
-            <a:schemeClr val="accent1"/>
-          </a:effectRef>
-          <a:fontRef idx="minor">
-            <a:schemeClr val="lt1"/>
-          </a:fontRef>
-        </p:style>
-        <p:txBody>
-          <a:bodyPr rtlCol="0" anchor="ctr"/>
-          <a:lstStyle/>
-          <a:p>
-            <a:pPr algn="ctr"/>
-            <a:r>
-              <a:rPr lang="en-US" sz="3200" b="1" dirty="0" smtClean="0"/>
-              <a:t>L</a:t>
-            </a:r>
-            <a:endParaRPr lang="en-SG" sz="3200" b="1" dirty="0"/>
-          </a:p>
-        </p:txBody>
-      </p:sp>
-      <p:sp>
-        <p:nvSpPr>
-          <p:cNvPr id="8" name="Flowchart: Document 7"/>
-          <p:cNvSpPr/>
-          <p:nvPr/>
-        </p:nvSpPr>
-        <p:spPr>
-          <a:xfrm rot="5400000">
-            <a:off x="1447800" y="2514600"/>
-            <a:ext cx="914400" cy="1066800"/>
-          </a:xfrm>
-          <a:prstGeom prst="flowChartDocument">
-            <a:avLst/>
-          </a:prstGeom>
-        </p:spPr>
-        <p:style>
-          <a:lnRef idx="0">
-            <a:schemeClr val="accent1"/>
-          </a:lnRef>
-          <a:fillRef idx="3">
-            <a:schemeClr val="accent1"/>
-          </a:fillRef>
-          <a:effectRef idx="3">
-            <a:schemeClr val="accent1"/>
-          </a:effectRef>
-          <a:fontRef idx="minor">
-            <a:schemeClr val="lt1"/>
-          </a:fontRef>
-        </p:style>
-        <p:txBody>
-          <a:bodyPr vert="vert270" rtlCol="0" anchor="ctr"/>
-          <a:lstStyle/>
-          <a:p>
-            <a:pPr algn="ctr"/>
-            <a:r>
-              <a:rPr lang="en-US" sz="3200" b="1" dirty="0" smtClean="0"/>
-              <a:t>X</a:t>
-            </a:r>
-            <a:endParaRPr lang="en-SG" sz="3200" b="1" dirty="0"/>
-          </a:p>
-        </p:txBody>
-      </p:sp>
-      <p:sp>
-        <p:nvSpPr>
-          <p:cNvPr id="9" name="Right Arrow 8"/>
-          <p:cNvSpPr/>
-          <p:nvPr/>
-        </p:nvSpPr>
-        <p:spPr>
-          <a:xfrm>
-            <a:off x="2619500" y="2819400"/>
-            <a:ext cx="457200" cy="457200"/>
-          </a:xfrm>
-          <a:prstGeom prst="rightArrow">
-            <a:avLst/>
-          </a:prstGeom>
-          <a:solidFill>
-            <a:schemeClr val="accent1"/>
-          </a:solidFill>
-          <a:ln>
-            <a:noFill/>
-          </a:ln>
-        </p:spPr>
-        <p:style>
-          <a:lnRef idx="2">
-            <a:schemeClr val="accent1">
-              <a:shade val="50000"/>
-            </a:schemeClr>
-          </a:lnRef>
-          <a:fillRef idx="1">
-            <a:schemeClr val="accent1"/>
-          </a:fillRef>
-          <a:effectRef idx="0">
-            <a:schemeClr val="accent1"/>
-          </a:effectRef>
-          <a:fontRef idx="minor">
-            <a:schemeClr val="lt1"/>
-          </a:fontRef>
-        </p:style>
-        <p:txBody>
-          <a:bodyPr rtlCol="0" anchor="ctr"/>
-          <a:lstStyle/>
-          <a:p>
-            <a:pPr algn="ctr"/>
-            <a:endParaRPr lang="en-SG" sz="3200" b="1"/>
-          </a:p>
-        </p:txBody>
-      </p:sp>
-      <p:sp>
-        <p:nvSpPr>
-          <p:cNvPr id="11" name="Right Arrow 10"/>
-          <p:cNvSpPr/>
-          <p:nvPr/>
-        </p:nvSpPr>
-        <p:spPr>
-          <a:xfrm>
-            <a:off x="5638800" y="2819400"/>
-            <a:ext cx="685800" cy="457200"/>
-          </a:xfrm>
-          <a:prstGeom prst="rightArrow">
-            <a:avLst/>
-          </a:prstGeom>
-          <a:solidFill>
-            <a:schemeClr val="accent1"/>
-          </a:solidFill>
-          <a:ln>
-            <a:noFill/>
-          </a:ln>
-        </p:spPr>
-        <p:style>
-          <a:lnRef idx="2">
-            <a:schemeClr val="accent1">
-              <a:shade val="50000"/>
-            </a:schemeClr>
-          </a:lnRef>
-          <a:fillRef idx="1">
-            <a:schemeClr val="accent1"/>
-          </a:fillRef>
-          <a:effectRef idx="0">
-            <a:schemeClr val="accent1"/>
-          </a:effectRef>
-          <a:fontRef idx="minor">
-            <a:schemeClr val="lt1"/>
-          </a:fontRef>
-        </p:style>
-        <p:txBody>
-          <a:bodyPr rtlCol="0" anchor="ctr"/>
-          <a:lstStyle/>
-          <a:p>
-            <a:pPr algn="ctr"/>
-            <a:endParaRPr lang="en-SG" sz="3200" b="1"/>
-          </a:p>
-        </p:txBody>
-      </p:sp>
-      <p:sp>
-        <p:nvSpPr>
-          <p:cNvPr id="12" name="Right Arrow 11"/>
-          <p:cNvSpPr/>
-          <p:nvPr/>
-        </p:nvSpPr>
-        <p:spPr>
-          <a:xfrm rot="5400000">
-            <a:off x="4068783" y="1905000"/>
-            <a:ext cx="457200" cy="457200"/>
-          </a:xfrm>
-          <a:prstGeom prst="rightArrow">
-            <a:avLst/>
-          </a:prstGeom>
-          <a:solidFill>
-            <a:schemeClr val="accent1"/>
-          </a:solidFill>
-          <a:ln>
-            <a:noFill/>
-          </a:ln>
-        </p:spPr>
-        <p:style>
-          <a:lnRef idx="2">
-            <a:schemeClr val="accent1">
-              <a:shade val="50000"/>
-            </a:schemeClr>
-          </a:lnRef>
-          <a:fillRef idx="1">
-            <a:schemeClr val="accent1"/>
-          </a:fillRef>
-          <a:effectRef idx="0">
-            <a:schemeClr val="accent1"/>
-          </a:effectRef>
-          <a:fontRef idx="minor">
-            <a:schemeClr val="lt1"/>
-          </a:fontRef>
-        </p:style>
-        <p:txBody>
-          <a:bodyPr rtlCol="0" anchor="ctr"/>
-          <a:lstStyle/>
-          <a:p>
-            <a:pPr algn="ctr"/>
-            <a:endParaRPr lang="en-SG" sz="3200" b="1"/>
-          </a:p>
-        </p:txBody>
-      </p:sp>
-      <p:sp>
-        <p:nvSpPr>
-          <p:cNvPr id="13" name="Right Arrow 12"/>
-          <p:cNvSpPr/>
-          <p:nvPr/>
-        </p:nvSpPr>
-        <p:spPr>
-          <a:xfrm rot="5400000">
-            <a:off x="4078679" y="3886200"/>
-            <a:ext cx="457200" cy="457200"/>
-          </a:xfrm>
-          <a:prstGeom prst="rightArrow">
-            <a:avLst/>
-          </a:prstGeom>
-          <a:solidFill>
-            <a:schemeClr val="accent1"/>
-          </a:solidFill>
-          <a:ln>
-            <a:noFill/>
-          </a:ln>
-        </p:spPr>
-        <p:style>
-          <a:lnRef idx="2">
-            <a:schemeClr val="accent1">
-              <a:shade val="50000"/>
-            </a:schemeClr>
-          </a:lnRef>
-          <a:fillRef idx="1">
-            <a:schemeClr val="accent1"/>
-          </a:fillRef>
-          <a:effectRef idx="0">
-            <a:schemeClr val="accent1"/>
-          </a:effectRef>
-          <a:fontRef idx="minor">
-            <a:schemeClr val="lt1"/>
-          </a:fontRef>
-        </p:style>
-        <p:txBody>
-          <a:bodyPr rtlCol="0" anchor="ctr"/>
-          <a:lstStyle/>
-          <a:p>
-            <a:pPr algn="ctr"/>
-            <a:endParaRPr lang="en-SG" sz="3200" b="1"/>
-          </a:p>
-        </p:txBody>
-      </p:sp>
-      <p:sp>
-        <p:nvSpPr>
-          <p:cNvPr id="14" name="Right Arrow 13"/>
-          <p:cNvSpPr/>
-          <p:nvPr/>
-        </p:nvSpPr>
-        <p:spPr>
-          <a:xfrm>
-            <a:off x="685800" y="2819400"/>
-            <a:ext cx="457200" cy="457200"/>
-          </a:xfrm>
-          <a:prstGeom prst="rightArrow">
-            <a:avLst/>
-          </a:prstGeom>
-          <a:solidFill>
-            <a:schemeClr val="accent1"/>
-          </a:solidFill>
-          <a:ln>
-            <a:noFill/>
-          </a:ln>
-        </p:spPr>
-        <p:style>
-          <a:lnRef idx="2">
-            <a:schemeClr val="accent1">
-              <a:shade val="50000"/>
-            </a:schemeClr>
-          </a:lnRef>
-          <a:fillRef idx="1">
-            <a:schemeClr val="accent1"/>
-          </a:fillRef>
-          <a:effectRef idx="0">
-            <a:schemeClr val="accent1"/>
-          </a:effectRef>
-          <a:fontRef idx="minor">
-            <a:schemeClr val="lt1"/>
-          </a:fontRef>
-        </p:style>
-        <p:txBody>
-          <a:bodyPr rtlCol="0" anchor="ctr"/>
-          <a:lstStyle/>
-          <a:p>
-            <a:pPr algn="ctr"/>
-            <a:endParaRPr lang="en-SG" sz="3200" b="1"/>
-          </a:p>
-        </p:txBody>
-      </p:sp>
-      <p:sp>
-        <p:nvSpPr>
-          <p:cNvPr id="15" name="Right Arrow 14"/>
-          <p:cNvSpPr/>
-          <p:nvPr/>
-        </p:nvSpPr>
-        <p:spPr>
-          <a:xfrm>
-            <a:off x="8153400" y="2803566"/>
-            <a:ext cx="457200" cy="457200"/>
-          </a:xfrm>
-          <a:prstGeom prst="rightArrow">
-            <a:avLst/>
-          </a:prstGeom>
-          <a:solidFill>
-            <a:schemeClr val="accent1"/>
-          </a:solidFill>
-          <a:ln>
-            <a:noFill/>
-          </a:ln>
-        </p:spPr>
-        <p:style>
-          <a:lnRef idx="2">
-            <a:schemeClr val="accent1">
-              <a:shade val="50000"/>
-            </a:schemeClr>
-          </a:lnRef>
-          <a:fillRef idx="1">
-            <a:schemeClr val="accent1"/>
-          </a:fillRef>
-          <a:effectRef idx="0">
-            <a:schemeClr val="accent1"/>
-          </a:effectRef>
-          <a:fontRef idx="minor">
-            <a:schemeClr val="lt1"/>
-          </a:fontRef>
-        </p:style>
-        <p:txBody>
-          <a:bodyPr rtlCol="0" anchor="ctr"/>
-          <a:lstStyle/>
-          <a:p>
-            <a:pPr algn="ctr"/>
-            <a:endParaRPr lang="en-SG" sz="3200" b="1"/>
-          </a:p>
-        </p:txBody>
-      </p:sp>
-    </p:spTree>
-    <p:extLst>
-      <p:ext uri="{BB962C8B-B14F-4D97-AF65-F5344CB8AC3E}">
-        <p14:creationId xmlns:p14="http://schemas.microsoft.com/office/powerpoint/2010/main" val="3510104165"/>
-      </p:ext>
-    </p:extLst>
-  </p:cSld>
-  <p:clrMapOvr>
-    <a:masterClrMapping/>
-  </p:clrMapOvr>
-  <mc:AlternateContent xmlns:mc="http://schemas.openxmlformats.org/markup-compatibility/2006" xmlns:p14="http://schemas.microsoft.com/office/powerpoint/2010/main">
-    <mc:Choice Requires="p14">
-      <p:transition p14:dur="250">
-        <p:fade/>
-      </p:transition>
-    </mc:Choice>
-    <mc:Fallback xmlns="">
-      <p:transition>
-        <p:fade/>
-      </p:transition>
-    </mc:Fallback>
-  </mc:AlternateContent>
-  <p:timing>
-    <p:tnLst>
-      <p:par>
-        <p:cTn id="1" dur="indefinite" restart="never" nodeType="tmRoot"/>
-      </p:par>
-    </p:tnLst>
-  </p:timing>
-</p:sld>
-</file>
-
 <file path=ppt/slides/slide2.xml><?xml version="1.0" encoding="utf-8"?>
 <p:sld xmlns:a="http://schemas.openxmlformats.org/drawingml/2006/main" xmlns:r="http://schemas.openxmlformats.org/officeDocument/2006/relationships" xmlns:p="http://schemas.openxmlformats.org/presentationml/2006/main">
   <p:cSld>
@@ -11698,6 +11979,552 @@
 </file>
 
 <file path=ppt/slides/slide20.xml><?xml version="1.0" encoding="utf-8"?>
+<p:sld xmlns:a="http://schemas.openxmlformats.org/drawingml/2006/main" xmlns:r="http://schemas.openxmlformats.org/officeDocument/2006/relationships" xmlns:p="http://schemas.openxmlformats.org/presentationml/2006/main">
+  <p:cSld>
+    <p:bg>
+      <p:bgPr>
+        <a:solidFill>
+          <a:schemeClr val="accent1">
+            <a:lumMod val="20000"/>
+            <a:lumOff val="80000"/>
+          </a:schemeClr>
+        </a:solidFill>
+        <a:effectLst/>
+      </p:bgPr>
+    </p:bg>
+    <p:spTree>
+      <p:nvGrpSpPr>
+        <p:cNvPr id="1" name=""/>
+        <p:cNvGrpSpPr/>
+        <p:nvPr/>
+      </p:nvGrpSpPr>
+      <p:grpSpPr>
+        <a:xfrm>
+          <a:off x="0" y="0"/>
+          <a:ext cx="0" cy="0"/>
+          <a:chOff x="0" y="0"/>
+          <a:chExt cx="0" cy="0"/>
+        </a:xfrm>
+      </p:grpSpPr>
+      <p:sp>
+        <p:nvSpPr>
+          <p:cNvPr id="4" name="Flowchart: Delay 3"/>
+          <p:cNvSpPr/>
+          <p:nvPr/>
+        </p:nvSpPr>
+        <p:spPr>
+          <a:xfrm>
+            <a:off x="6477000" y="2438400"/>
+            <a:ext cx="1219200" cy="1219200"/>
+          </a:xfrm>
+          <a:prstGeom prst="flowChartDelay">
+            <a:avLst/>
+          </a:prstGeom>
+        </p:spPr>
+        <p:style>
+          <a:lnRef idx="0">
+            <a:schemeClr val="accent1"/>
+          </a:lnRef>
+          <a:fillRef idx="3">
+            <a:schemeClr val="accent1"/>
+          </a:fillRef>
+          <a:effectRef idx="3">
+            <a:schemeClr val="accent1"/>
+          </a:effectRef>
+          <a:fontRef idx="minor">
+            <a:schemeClr val="lt1"/>
+          </a:fontRef>
+        </p:style>
+        <p:txBody>
+          <a:bodyPr rtlCol="0" anchor="ctr"/>
+          <a:lstStyle/>
+          <a:p>
+            <a:pPr algn="ctr"/>
+            <a:r>
+              <a:rPr lang="en-US" sz="3200" b="1" dirty="0" smtClean="0"/>
+              <a:t>Z</a:t>
+            </a:r>
+            <a:endParaRPr lang="en-SG" sz="3200" b="1" dirty="0"/>
+          </a:p>
+        </p:txBody>
+      </p:sp>
+      <p:sp>
+        <p:nvSpPr>
+          <p:cNvPr id="5" name="Flowchart: Alternate Process 4"/>
+          <p:cNvSpPr/>
+          <p:nvPr/>
+        </p:nvSpPr>
+        <p:spPr>
+          <a:xfrm>
+            <a:off x="3200400" y="2476500"/>
+            <a:ext cx="2209800" cy="1143000"/>
+          </a:xfrm>
+          <a:prstGeom prst="flowChartAlternateProcess">
+            <a:avLst/>
+          </a:prstGeom>
+        </p:spPr>
+        <p:style>
+          <a:lnRef idx="0">
+            <a:schemeClr val="accent1"/>
+          </a:lnRef>
+          <a:fillRef idx="3">
+            <a:schemeClr val="accent1"/>
+          </a:fillRef>
+          <a:effectRef idx="3">
+            <a:schemeClr val="accent1"/>
+          </a:effectRef>
+          <a:fontRef idx="minor">
+            <a:schemeClr val="lt1"/>
+          </a:fontRef>
+        </p:style>
+        <p:txBody>
+          <a:bodyPr rtlCol="0" anchor="ctr"/>
+          <a:lstStyle/>
+          <a:p>
+            <a:pPr algn="ctr"/>
+            <a:r>
+              <a:rPr lang="en-US" sz="3200" b="1" dirty="0" smtClean="0"/>
+              <a:t>Y</a:t>
+            </a:r>
+            <a:endParaRPr lang="en-SG" sz="3200" b="1" dirty="0"/>
+          </a:p>
+        </p:txBody>
+      </p:sp>
+      <p:sp>
+        <p:nvSpPr>
+          <p:cNvPr id="7" name="Flowchart: Alternate Process 6"/>
+          <p:cNvSpPr/>
+          <p:nvPr/>
+        </p:nvSpPr>
+        <p:spPr>
+          <a:xfrm>
+            <a:off x="3192483" y="4495800"/>
+            <a:ext cx="2209800" cy="1143000"/>
+          </a:xfrm>
+          <a:prstGeom prst="flowChartAlternateProcess">
+            <a:avLst/>
+          </a:prstGeom>
+        </p:spPr>
+        <p:style>
+          <a:lnRef idx="0">
+            <a:schemeClr val="accent1"/>
+          </a:lnRef>
+          <a:fillRef idx="3">
+            <a:schemeClr val="accent1"/>
+          </a:fillRef>
+          <a:effectRef idx="3">
+            <a:schemeClr val="accent1"/>
+          </a:effectRef>
+          <a:fontRef idx="minor">
+            <a:schemeClr val="lt1"/>
+          </a:fontRef>
+        </p:style>
+        <p:txBody>
+          <a:bodyPr rtlCol="0" anchor="ctr"/>
+          <a:lstStyle/>
+          <a:p>
+            <a:pPr algn="ctr"/>
+            <a:r>
+              <a:rPr lang="en-US" sz="3200" b="1" dirty="0" smtClean="0"/>
+              <a:t>M</a:t>
+            </a:r>
+            <a:endParaRPr lang="en-SG" sz="3200" b="1" dirty="0"/>
+          </a:p>
+        </p:txBody>
+      </p:sp>
+      <p:sp>
+        <p:nvSpPr>
+          <p:cNvPr id="6" name="Flowchart: Manual Input 5"/>
+          <p:cNvSpPr/>
+          <p:nvPr/>
+        </p:nvSpPr>
+        <p:spPr>
+          <a:xfrm>
+            <a:off x="3192483" y="762000"/>
+            <a:ext cx="2209800" cy="838200"/>
+          </a:xfrm>
+          <a:prstGeom prst="flowChartManualInput">
+            <a:avLst/>
+          </a:prstGeom>
+        </p:spPr>
+        <p:style>
+          <a:lnRef idx="0">
+            <a:schemeClr val="accent1"/>
+          </a:lnRef>
+          <a:fillRef idx="3">
+            <a:schemeClr val="accent1"/>
+          </a:fillRef>
+          <a:effectRef idx="3">
+            <a:schemeClr val="accent1"/>
+          </a:effectRef>
+          <a:fontRef idx="minor">
+            <a:schemeClr val="lt1"/>
+          </a:fontRef>
+        </p:style>
+        <p:txBody>
+          <a:bodyPr rtlCol="0" anchor="ctr"/>
+          <a:lstStyle/>
+          <a:p>
+            <a:pPr algn="ctr"/>
+            <a:r>
+              <a:rPr lang="en-US" sz="3200" b="1" dirty="0" smtClean="0"/>
+              <a:t>L</a:t>
+            </a:r>
+            <a:endParaRPr lang="en-SG" sz="3200" b="1" dirty="0"/>
+          </a:p>
+        </p:txBody>
+      </p:sp>
+      <p:sp>
+        <p:nvSpPr>
+          <p:cNvPr id="8" name="Flowchart: Document 7"/>
+          <p:cNvSpPr/>
+          <p:nvPr/>
+        </p:nvSpPr>
+        <p:spPr>
+          <a:xfrm rot="5400000">
+            <a:off x="1447800" y="2514600"/>
+            <a:ext cx="914400" cy="1066800"/>
+          </a:xfrm>
+          <a:prstGeom prst="flowChartDocument">
+            <a:avLst/>
+          </a:prstGeom>
+        </p:spPr>
+        <p:style>
+          <a:lnRef idx="0">
+            <a:schemeClr val="accent1"/>
+          </a:lnRef>
+          <a:fillRef idx="3">
+            <a:schemeClr val="accent1"/>
+          </a:fillRef>
+          <a:effectRef idx="3">
+            <a:schemeClr val="accent1"/>
+          </a:effectRef>
+          <a:fontRef idx="minor">
+            <a:schemeClr val="lt1"/>
+          </a:fontRef>
+        </p:style>
+        <p:txBody>
+          <a:bodyPr vert="vert270" rtlCol="0" anchor="ctr"/>
+          <a:lstStyle/>
+          <a:p>
+            <a:pPr algn="ctr"/>
+            <a:r>
+              <a:rPr lang="en-US" sz="3200" b="1" dirty="0" smtClean="0"/>
+              <a:t>X</a:t>
+            </a:r>
+            <a:endParaRPr lang="en-SG" sz="3200" b="1" dirty="0"/>
+          </a:p>
+        </p:txBody>
+      </p:sp>
+      <p:sp>
+        <p:nvSpPr>
+          <p:cNvPr id="9" name="Right Arrow 8"/>
+          <p:cNvSpPr/>
+          <p:nvPr/>
+        </p:nvSpPr>
+        <p:spPr>
+          <a:xfrm>
+            <a:off x="2619500" y="2819400"/>
+            <a:ext cx="457200" cy="457200"/>
+          </a:xfrm>
+          <a:prstGeom prst="rightArrow">
+            <a:avLst/>
+          </a:prstGeom>
+          <a:solidFill>
+            <a:schemeClr val="accent1"/>
+          </a:solidFill>
+          <a:ln>
+            <a:noFill/>
+          </a:ln>
+        </p:spPr>
+        <p:style>
+          <a:lnRef idx="2">
+            <a:schemeClr val="accent1">
+              <a:shade val="50000"/>
+            </a:schemeClr>
+          </a:lnRef>
+          <a:fillRef idx="1">
+            <a:schemeClr val="accent1"/>
+          </a:fillRef>
+          <a:effectRef idx="0">
+            <a:schemeClr val="accent1"/>
+          </a:effectRef>
+          <a:fontRef idx="minor">
+            <a:schemeClr val="lt1"/>
+          </a:fontRef>
+        </p:style>
+        <p:txBody>
+          <a:bodyPr rtlCol="0" anchor="ctr"/>
+          <a:lstStyle/>
+          <a:p>
+            <a:pPr algn="ctr"/>
+            <a:endParaRPr lang="en-SG" sz="3200" b="1"/>
+          </a:p>
+        </p:txBody>
+      </p:sp>
+      <p:sp>
+        <p:nvSpPr>
+          <p:cNvPr id="11" name="Right Arrow 10"/>
+          <p:cNvSpPr/>
+          <p:nvPr/>
+        </p:nvSpPr>
+        <p:spPr>
+          <a:xfrm>
+            <a:off x="5638800" y="2819400"/>
+            <a:ext cx="685800" cy="457200"/>
+          </a:xfrm>
+          <a:prstGeom prst="rightArrow">
+            <a:avLst/>
+          </a:prstGeom>
+          <a:solidFill>
+            <a:schemeClr val="accent1"/>
+          </a:solidFill>
+          <a:ln>
+            <a:noFill/>
+          </a:ln>
+        </p:spPr>
+        <p:style>
+          <a:lnRef idx="2">
+            <a:schemeClr val="accent1">
+              <a:shade val="50000"/>
+            </a:schemeClr>
+          </a:lnRef>
+          <a:fillRef idx="1">
+            <a:schemeClr val="accent1"/>
+          </a:fillRef>
+          <a:effectRef idx="0">
+            <a:schemeClr val="accent1"/>
+          </a:effectRef>
+          <a:fontRef idx="minor">
+            <a:schemeClr val="lt1"/>
+          </a:fontRef>
+        </p:style>
+        <p:txBody>
+          <a:bodyPr rtlCol="0" anchor="ctr"/>
+          <a:lstStyle/>
+          <a:p>
+            <a:pPr algn="ctr"/>
+            <a:endParaRPr lang="en-SG" sz="3200" b="1"/>
+          </a:p>
+        </p:txBody>
+      </p:sp>
+      <p:sp>
+        <p:nvSpPr>
+          <p:cNvPr id="12" name="Right Arrow 11"/>
+          <p:cNvSpPr/>
+          <p:nvPr/>
+        </p:nvSpPr>
+        <p:spPr>
+          <a:xfrm rot="5400000">
+            <a:off x="4068783" y="1905000"/>
+            <a:ext cx="457200" cy="457200"/>
+          </a:xfrm>
+          <a:prstGeom prst="rightArrow">
+            <a:avLst/>
+          </a:prstGeom>
+          <a:solidFill>
+            <a:schemeClr val="accent1"/>
+          </a:solidFill>
+          <a:ln>
+            <a:noFill/>
+          </a:ln>
+        </p:spPr>
+        <p:style>
+          <a:lnRef idx="2">
+            <a:schemeClr val="accent1">
+              <a:shade val="50000"/>
+            </a:schemeClr>
+          </a:lnRef>
+          <a:fillRef idx="1">
+            <a:schemeClr val="accent1"/>
+          </a:fillRef>
+          <a:effectRef idx="0">
+            <a:schemeClr val="accent1"/>
+          </a:effectRef>
+          <a:fontRef idx="minor">
+            <a:schemeClr val="lt1"/>
+          </a:fontRef>
+        </p:style>
+        <p:txBody>
+          <a:bodyPr rtlCol="0" anchor="ctr"/>
+          <a:lstStyle/>
+          <a:p>
+            <a:pPr algn="ctr"/>
+            <a:endParaRPr lang="en-SG" sz="3200" b="1"/>
+          </a:p>
+        </p:txBody>
+      </p:sp>
+      <p:sp>
+        <p:nvSpPr>
+          <p:cNvPr id="13" name="Right Arrow 12"/>
+          <p:cNvSpPr/>
+          <p:nvPr/>
+        </p:nvSpPr>
+        <p:spPr>
+          <a:xfrm rot="5400000">
+            <a:off x="4078679" y="3886200"/>
+            <a:ext cx="457200" cy="457200"/>
+          </a:xfrm>
+          <a:prstGeom prst="rightArrow">
+            <a:avLst/>
+          </a:prstGeom>
+          <a:solidFill>
+            <a:schemeClr val="accent1"/>
+          </a:solidFill>
+          <a:ln>
+            <a:noFill/>
+          </a:ln>
+        </p:spPr>
+        <p:style>
+          <a:lnRef idx="2">
+            <a:schemeClr val="accent1">
+              <a:shade val="50000"/>
+            </a:schemeClr>
+          </a:lnRef>
+          <a:fillRef idx="1">
+            <a:schemeClr val="accent1"/>
+          </a:fillRef>
+          <a:effectRef idx="0">
+            <a:schemeClr val="accent1"/>
+          </a:effectRef>
+          <a:fontRef idx="minor">
+            <a:schemeClr val="lt1"/>
+          </a:fontRef>
+        </p:style>
+        <p:txBody>
+          <a:bodyPr rtlCol="0" anchor="ctr"/>
+          <a:lstStyle/>
+          <a:p>
+            <a:pPr algn="ctr"/>
+            <a:endParaRPr lang="en-SG" sz="3200" b="1"/>
+          </a:p>
+        </p:txBody>
+      </p:sp>
+      <p:sp>
+        <p:nvSpPr>
+          <p:cNvPr id="14" name="Right Arrow 13"/>
+          <p:cNvSpPr/>
+          <p:nvPr/>
+        </p:nvSpPr>
+        <p:spPr>
+          <a:xfrm>
+            <a:off x="685800" y="2819400"/>
+            <a:ext cx="457200" cy="457200"/>
+          </a:xfrm>
+          <a:prstGeom prst="rightArrow">
+            <a:avLst/>
+          </a:prstGeom>
+          <a:solidFill>
+            <a:schemeClr val="accent1"/>
+          </a:solidFill>
+          <a:ln>
+            <a:noFill/>
+          </a:ln>
+        </p:spPr>
+        <p:style>
+          <a:lnRef idx="2">
+            <a:schemeClr val="accent1">
+              <a:shade val="50000"/>
+            </a:schemeClr>
+          </a:lnRef>
+          <a:fillRef idx="1">
+            <a:schemeClr val="accent1"/>
+          </a:fillRef>
+          <a:effectRef idx="0">
+            <a:schemeClr val="accent1"/>
+          </a:effectRef>
+          <a:fontRef idx="minor">
+            <a:schemeClr val="lt1"/>
+          </a:fontRef>
+        </p:style>
+        <p:txBody>
+          <a:bodyPr rtlCol="0" anchor="ctr"/>
+          <a:lstStyle/>
+          <a:p>
+            <a:pPr algn="ctr"/>
+            <a:endParaRPr lang="en-SG" sz="3200" b="1"/>
+          </a:p>
+        </p:txBody>
+      </p:sp>
+      <p:sp>
+        <p:nvSpPr>
+          <p:cNvPr id="15" name="Right Arrow 14"/>
+          <p:cNvSpPr/>
+          <p:nvPr/>
+        </p:nvSpPr>
+        <p:spPr>
+          <a:xfrm>
+            <a:off x="8153400" y="2803566"/>
+            <a:ext cx="457200" cy="457200"/>
+          </a:xfrm>
+          <a:prstGeom prst="rightArrow">
+            <a:avLst/>
+          </a:prstGeom>
+          <a:solidFill>
+            <a:schemeClr val="accent1"/>
+          </a:solidFill>
+          <a:ln>
+            <a:noFill/>
+          </a:ln>
+        </p:spPr>
+        <p:style>
+          <a:lnRef idx="2">
+            <a:schemeClr val="accent1">
+              <a:shade val="50000"/>
+            </a:schemeClr>
+          </a:lnRef>
+          <a:fillRef idx="1">
+            <a:schemeClr val="accent1"/>
+          </a:fillRef>
+          <a:effectRef idx="0">
+            <a:schemeClr val="accent1"/>
+          </a:effectRef>
+          <a:fontRef idx="minor">
+            <a:schemeClr val="lt1"/>
+          </a:fontRef>
+        </p:style>
+        <p:txBody>
+          <a:bodyPr rtlCol="0" anchor="ctr"/>
+          <a:lstStyle/>
+          <a:p>
+            <a:pPr algn="ctr"/>
+            <a:endParaRPr lang="en-SG" sz="3200" b="1"/>
+          </a:p>
+        </p:txBody>
+      </p:sp>
+    </p:spTree>
+    <p:extLst>
+      <p:ext uri="{BB962C8B-B14F-4D97-AF65-F5344CB8AC3E}">
+        <p14:creationId xmlns:p14="http://schemas.microsoft.com/office/powerpoint/2010/main" val="3510104165"/>
+      </p:ext>
+    </p:extLst>
+  </p:cSld>
+  <p:clrMapOvr>
+    <a:masterClrMapping/>
+  </p:clrMapOvr>
+  <mc:AlternateContent xmlns:mc="http://schemas.openxmlformats.org/markup-compatibility/2006" xmlns:p14="http://schemas.microsoft.com/office/powerpoint/2010/main">
+    <mc:Choice Requires="p14">
+      <p:transition p14:dur="250">
+        <p:fade/>
+      </p:transition>
+    </mc:Choice>
+    <mc:Fallback xmlns="">
+      <p:transition>
+        <p:fade/>
+      </p:transition>
+    </mc:Fallback>
+  </mc:AlternateContent>
+  <p:timing>
+    <p:tnLst>
+      <p:par>
+        <p:cTn id="1" dur="indefinite" restart="never" nodeType="tmRoot"/>
+      </p:par>
+    </p:tnLst>
+  </p:timing>
+</p:sld>
+</file>
+
+<file path=ppt/slides/slide21.xml><?xml version="1.0" encoding="utf-8"?>
 <p:sld xmlns:a="http://schemas.openxmlformats.org/drawingml/2006/main" xmlns:r="http://schemas.openxmlformats.org/officeDocument/2006/relationships" xmlns:p="http://schemas.openxmlformats.org/presentationml/2006/main">
   <p:cSld>
     <p:spTree>
@@ -12751,7 +13578,7 @@
 </p:sld>
 </file>
 
-<file path=ppt/slides/slide21.xml><?xml version="1.0" encoding="utf-8"?>
+<file path=ppt/slides/slide22.xml><?xml version="1.0" encoding="utf-8"?>
 <p:sld xmlns:a="http://schemas.openxmlformats.org/drawingml/2006/main" xmlns:r="http://schemas.openxmlformats.org/officeDocument/2006/relationships" xmlns:p="http://schemas.openxmlformats.org/presentationml/2006/main">
   <p:cSld>
     <p:spTree>
@@ -13143,7 +13970,7 @@
 </p:sld>
 </file>
 
-<file path=ppt/slides/slide22.xml><?xml version="1.0" encoding="utf-8"?>
+<file path=ppt/slides/slide23.xml><?xml version="1.0" encoding="utf-8"?>
 <p:sld xmlns:a="http://schemas.openxmlformats.org/drawingml/2006/main" xmlns:r="http://schemas.openxmlformats.org/officeDocument/2006/relationships" xmlns:p="http://schemas.openxmlformats.org/presentationml/2006/main">
   <p:cSld>
     <p:spTree>
@@ -13691,7 +14518,7 @@
 </p:sld>
 </file>
 
-<file path=ppt/slides/slide23.xml><?xml version="1.0" encoding="utf-8"?>
+<file path=ppt/slides/slide24.xml><?xml version="1.0" encoding="utf-8"?>
 <p:sld xmlns:a="http://schemas.openxmlformats.org/drawingml/2006/main" xmlns:r="http://schemas.openxmlformats.org/officeDocument/2006/relationships" xmlns:p="http://schemas.openxmlformats.org/presentationml/2006/main">
   <p:cSld>
     <p:spTree>
@@ -13978,7 +14805,7 @@
 </p:sld>
 </file>
 
-<file path=ppt/slides/slide24.xml><?xml version="1.0" encoding="utf-8"?>
+<file path=ppt/slides/slide25.xml><?xml version="1.0" encoding="utf-8"?>
 <p:sld xmlns:a="http://schemas.openxmlformats.org/drawingml/2006/main" xmlns:r="http://schemas.openxmlformats.org/officeDocument/2006/relationships" xmlns:p="http://schemas.openxmlformats.org/presentationml/2006/main">
   <p:cSld>
     <p:spTree>
@@ -14623,7 +15450,7 @@
 </p:sld>
 </file>
 
-<file path=ppt/slides/slide25.xml><?xml version="1.0" encoding="utf-8"?>
+<file path=ppt/slides/slide26.xml><?xml version="1.0" encoding="utf-8"?>
 <p:sld xmlns:a="http://schemas.openxmlformats.org/drawingml/2006/main" xmlns:r="http://schemas.openxmlformats.org/officeDocument/2006/relationships" xmlns:p="http://schemas.openxmlformats.org/presentationml/2006/main">
   <p:cSld>
     <p:spTree>
@@ -15034,7 +15861,7 @@
 </p:sld>
 </file>
 
-<file path=ppt/slides/slide26.xml><?xml version="1.0" encoding="utf-8"?>
+<file path=ppt/slides/slide27.xml><?xml version="1.0" encoding="utf-8"?>
 <p:sld xmlns:a="http://schemas.openxmlformats.org/drawingml/2006/main" xmlns:r="http://schemas.openxmlformats.org/officeDocument/2006/relationships" xmlns:p="http://schemas.openxmlformats.org/presentationml/2006/main">
   <p:cSld>
     <p:spTree>
@@ -15747,7 +16574,7 @@
 </p:sld>
 </file>
 
-<file path=ppt/slides/slide27.xml><?xml version="1.0" encoding="utf-8"?>
+<file path=ppt/slides/slide28.xml><?xml version="1.0" encoding="utf-8"?>
 <p:sld xmlns:a="http://schemas.openxmlformats.org/drawingml/2006/main" xmlns:r="http://schemas.openxmlformats.org/officeDocument/2006/relationships" xmlns:p="http://schemas.openxmlformats.org/presentationml/2006/main">
   <p:cSld>
     <p:spTree>
@@ -16145,7 +16972,7 @@
 </p:sld>
 </file>
 
-<file path=ppt/slides/slide28.xml><?xml version="1.0" encoding="utf-8"?>
+<file path=ppt/slides/slide29.xml><?xml version="1.0" encoding="utf-8"?>
 <p:sld xmlns:a="http://schemas.openxmlformats.org/drawingml/2006/main" xmlns:r="http://schemas.openxmlformats.org/officeDocument/2006/relationships" xmlns:p="http://schemas.openxmlformats.org/presentationml/2006/main">
   <p:cSld>
     <p:spTree>
@@ -16614,7 +17441,177 @@
 </p:sld>
 </file>
 
-<file path=ppt/slides/slide29.xml><?xml version="1.0" encoding="utf-8"?>
+<file path=ppt/slides/slide3.xml><?xml version="1.0" encoding="utf-8"?>
+<p:sld xmlns:a="http://schemas.openxmlformats.org/drawingml/2006/main" xmlns:r="http://schemas.openxmlformats.org/officeDocument/2006/relationships" xmlns:p="http://schemas.openxmlformats.org/presentationml/2006/main">
+  <p:cSld>
+    <p:spTree>
+      <p:nvGrpSpPr>
+        <p:cNvPr id="1" name=""/>
+        <p:cNvGrpSpPr/>
+        <p:nvPr/>
+      </p:nvGrpSpPr>
+      <p:grpSpPr>
+        <a:xfrm>
+          <a:off x="0" y="0"/>
+          <a:ext cx="0" cy="0"/>
+          <a:chOff x="0" y="0"/>
+          <a:chExt cx="0" cy="0"/>
+        </a:xfrm>
+      </p:grpSpPr>
+      <p:sp>
+        <p:nvSpPr>
+          <p:cNvPr id="4" name="TextBox 3"/>
+          <p:cNvSpPr txBox="1"/>
+          <p:nvPr/>
+        </p:nvSpPr>
+        <p:spPr>
+          <a:xfrm>
+            <a:off x="762000" y="2362200"/>
+            <a:ext cx="7543800" cy="1754326"/>
+          </a:xfrm>
+          <a:prstGeom prst="rect">
+            <a:avLst/>
+          </a:prstGeom>
+          <a:noFill/>
+        </p:spPr>
+        <p:txBody>
+          <a:bodyPr wrap="square" rtlCol="0">
+            <a:spAutoFit/>
+          </a:bodyPr>
+          <a:lstStyle/>
+          <a:p>
+            <a:r>
+              <a:rPr lang="en-US" dirty="0" smtClean="0">
+                <a:solidFill>
+                  <a:schemeClr val="accent6">
+                    <a:lumMod val="75000"/>
+                  </a:schemeClr>
+                </a:solidFill>
+              </a:rPr>
+              <a:t>This tutorial explains </a:t>
+            </a:r>
+            <a:r>
+              <a:rPr lang="en-US" dirty="0" err="1" smtClean="0">
+                <a:solidFill>
+                  <a:schemeClr val="accent6">
+                    <a:lumMod val="75000"/>
+                  </a:schemeClr>
+                </a:solidFill>
+              </a:rPr>
+              <a:t>PowerPointLabs</a:t>
+            </a:r>
+            <a:r>
+              <a:rPr lang="en-US" dirty="0" smtClean="0">
+                <a:solidFill>
+                  <a:schemeClr val="accent6">
+                    <a:lumMod val="75000"/>
+                  </a:schemeClr>
+                </a:solidFill>
+              </a:rPr>
+              <a:t>’ features at the point you installed the plugin. </a:t>
+            </a:r>
+          </a:p>
+          <a:p>
+            <a:endParaRPr lang="en-US" dirty="0" smtClean="0">
+              <a:solidFill>
+                <a:schemeClr val="accent6">
+                  <a:lumMod val="75000"/>
+                </a:schemeClr>
+              </a:solidFill>
+            </a:endParaRPr>
+          </a:p>
+          <a:p>
+            <a:endParaRPr lang="en-US" dirty="0">
+              <a:solidFill>
+                <a:schemeClr val="accent6">
+                  <a:lumMod val="75000"/>
+                </a:schemeClr>
+              </a:solidFill>
+            </a:endParaRPr>
+          </a:p>
+          <a:p>
+            <a:r>
+              <a:rPr lang="en-US" dirty="0" smtClean="0">
+                <a:solidFill>
+                  <a:schemeClr val="accent6">
+                    <a:lumMod val="75000"/>
+                  </a:schemeClr>
+                </a:solidFill>
+              </a:rPr>
+              <a:t>If you installed the plugin some time back, please refer to the </a:t>
+            </a:r>
+            <a:r>
+              <a:rPr lang="en-US" i="1" dirty="0" smtClean="0">
+                <a:solidFill>
+                  <a:schemeClr val="accent6">
+                    <a:lumMod val="75000"/>
+                  </a:schemeClr>
+                </a:solidFill>
+              </a:rPr>
+              <a:t>Documentation</a:t>
+            </a:r>
+            <a:r>
+              <a:rPr lang="en-US" dirty="0" smtClean="0">
+                <a:solidFill>
+                  <a:schemeClr val="accent6">
+                    <a:lumMod val="75000"/>
+                  </a:schemeClr>
+                </a:solidFill>
+              </a:rPr>
+              <a:t> page of </a:t>
+            </a:r>
+            <a:r>
+              <a:rPr lang="en-US" dirty="0" smtClean="0">
+                <a:solidFill>
+                  <a:schemeClr val="accent6">
+                    <a:lumMod val="75000"/>
+                  </a:schemeClr>
+                </a:solidFill>
+                <a:hlinkClick r:id="rId2"/>
+              </a:rPr>
+              <a:t>our website</a:t>
+            </a:r>
+            <a:r>
+              <a:rPr lang="en-US" dirty="0" smtClean="0">
+                <a:solidFill>
+                  <a:schemeClr val="accent6">
+                    <a:lumMod val="75000"/>
+                  </a:schemeClr>
+                </a:solidFill>
+              </a:rPr>
+              <a:t> for more up-to-date instructions.</a:t>
+            </a:r>
+            <a:endParaRPr lang="en-SG" dirty="0">
+              <a:solidFill>
+                <a:schemeClr val="accent6">
+                  <a:lumMod val="75000"/>
+                </a:schemeClr>
+              </a:solidFill>
+            </a:endParaRPr>
+          </a:p>
+        </p:txBody>
+      </p:sp>
+    </p:spTree>
+    <p:extLst>
+      <p:ext uri="{BB962C8B-B14F-4D97-AF65-F5344CB8AC3E}">
+        <p14:creationId xmlns:p14="http://schemas.microsoft.com/office/powerpoint/2010/main" val="1906505232"/>
+      </p:ext>
+    </p:extLst>
+  </p:cSld>
+  <p:clrMapOvr>
+    <a:masterClrMapping/>
+  </p:clrMapOvr>
+  <p:timing>
+    <p:tnLst>
+      <p:par>
+        <p:cTn id="1" dur="indefinite" restart="never" nodeType="tmRoot"/>
+      </p:par>
+    </p:tnLst>
+  </p:timing>
+</p:sld>
+</file>
+
+<file path=ppt/slides/slide30.xml><?xml version="1.0" encoding="utf-8"?>
 <p:sld xmlns:a="http://schemas.openxmlformats.org/drawingml/2006/main" xmlns:r="http://schemas.openxmlformats.org/officeDocument/2006/relationships" xmlns:p="http://schemas.openxmlformats.org/presentationml/2006/main">
   <p:cSld>
     <p:spTree>
@@ -16878,177 +17875,7 @@
 </p:sld>
 </file>
 
-<file path=ppt/slides/slide3.xml><?xml version="1.0" encoding="utf-8"?>
-<p:sld xmlns:a="http://schemas.openxmlformats.org/drawingml/2006/main" xmlns:r="http://schemas.openxmlformats.org/officeDocument/2006/relationships" xmlns:p="http://schemas.openxmlformats.org/presentationml/2006/main">
-  <p:cSld>
-    <p:spTree>
-      <p:nvGrpSpPr>
-        <p:cNvPr id="1" name=""/>
-        <p:cNvGrpSpPr/>
-        <p:nvPr/>
-      </p:nvGrpSpPr>
-      <p:grpSpPr>
-        <a:xfrm>
-          <a:off x="0" y="0"/>
-          <a:ext cx="0" cy="0"/>
-          <a:chOff x="0" y="0"/>
-          <a:chExt cx="0" cy="0"/>
-        </a:xfrm>
-      </p:grpSpPr>
-      <p:sp>
-        <p:nvSpPr>
-          <p:cNvPr id="4" name="TextBox 3"/>
-          <p:cNvSpPr txBox="1"/>
-          <p:nvPr/>
-        </p:nvSpPr>
-        <p:spPr>
-          <a:xfrm>
-            <a:off x="762000" y="2362200"/>
-            <a:ext cx="7543800" cy="1754326"/>
-          </a:xfrm>
-          <a:prstGeom prst="rect">
-            <a:avLst/>
-          </a:prstGeom>
-          <a:noFill/>
-        </p:spPr>
-        <p:txBody>
-          <a:bodyPr wrap="square" rtlCol="0">
-            <a:spAutoFit/>
-          </a:bodyPr>
-          <a:lstStyle/>
-          <a:p>
-            <a:r>
-              <a:rPr lang="en-US" dirty="0" smtClean="0">
-                <a:solidFill>
-                  <a:schemeClr val="accent6">
-                    <a:lumMod val="75000"/>
-                  </a:schemeClr>
-                </a:solidFill>
-              </a:rPr>
-              <a:t>This tutorial explains </a:t>
-            </a:r>
-            <a:r>
-              <a:rPr lang="en-US" dirty="0" err="1" smtClean="0">
-                <a:solidFill>
-                  <a:schemeClr val="accent6">
-                    <a:lumMod val="75000"/>
-                  </a:schemeClr>
-                </a:solidFill>
-              </a:rPr>
-              <a:t>PowerPointLabs</a:t>
-            </a:r>
-            <a:r>
-              <a:rPr lang="en-US" dirty="0" smtClean="0">
-                <a:solidFill>
-                  <a:schemeClr val="accent6">
-                    <a:lumMod val="75000"/>
-                  </a:schemeClr>
-                </a:solidFill>
-              </a:rPr>
-              <a:t>’ features at the point you installed the plugin. </a:t>
-            </a:r>
-          </a:p>
-          <a:p>
-            <a:endParaRPr lang="en-US" dirty="0" smtClean="0">
-              <a:solidFill>
-                <a:schemeClr val="accent6">
-                  <a:lumMod val="75000"/>
-                </a:schemeClr>
-              </a:solidFill>
-            </a:endParaRPr>
-          </a:p>
-          <a:p>
-            <a:endParaRPr lang="en-US" dirty="0">
-              <a:solidFill>
-                <a:schemeClr val="accent6">
-                  <a:lumMod val="75000"/>
-                </a:schemeClr>
-              </a:solidFill>
-            </a:endParaRPr>
-          </a:p>
-          <a:p>
-            <a:r>
-              <a:rPr lang="en-US" dirty="0" smtClean="0">
-                <a:solidFill>
-                  <a:schemeClr val="accent6">
-                    <a:lumMod val="75000"/>
-                  </a:schemeClr>
-                </a:solidFill>
-              </a:rPr>
-              <a:t>If you installed the plugin some time back, please refer to the </a:t>
-            </a:r>
-            <a:r>
-              <a:rPr lang="en-US" i="1" dirty="0" smtClean="0">
-                <a:solidFill>
-                  <a:schemeClr val="accent6">
-                    <a:lumMod val="75000"/>
-                  </a:schemeClr>
-                </a:solidFill>
-              </a:rPr>
-              <a:t>Documentation</a:t>
-            </a:r>
-            <a:r>
-              <a:rPr lang="en-US" dirty="0" smtClean="0">
-                <a:solidFill>
-                  <a:schemeClr val="accent6">
-                    <a:lumMod val="75000"/>
-                  </a:schemeClr>
-                </a:solidFill>
-              </a:rPr>
-              <a:t> page of </a:t>
-            </a:r>
-            <a:r>
-              <a:rPr lang="en-US" dirty="0" smtClean="0">
-                <a:solidFill>
-                  <a:schemeClr val="accent6">
-                    <a:lumMod val="75000"/>
-                  </a:schemeClr>
-                </a:solidFill>
-                <a:hlinkClick r:id="rId2"/>
-              </a:rPr>
-              <a:t>our website</a:t>
-            </a:r>
-            <a:r>
-              <a:rPr lang="en-US" dirty="0" smtClean="0">
-                <a:solidFill>
-                  <a:schemeClr val="accent6">
-                    <a:lumMod val="75000"/>
-                  </a:schemeClr>
-                </a:solidFill>
-              </a:rPr>
-              <a:t> for more up-to-date instructions.</a:t>
-            </a:r>
-            <a:endParaRPr lang="en-SG" dirty="0">
-              <a:solidFill>
-                <a:schemeClr val="accent6">
-                  <a:lumMod val="75000"/>
-                </a:schemeClr>
-              </a:solidFill>
-            </a:endParaRPr>
-          </a:p>
-        </p:txBody>
-      </p:sp>
-    </p:spTree>
-    <p:extLst>
-      <p:ext uri="{BB962C8B-B14F-4D97-AF65-F5344CB8AC3E}">
-        <p14:creationId xmlns:p14="http://schemas.microsoft.com/office/powerpoint/2010/main" val="1906505232"/>
-      </p:ext>
-    </p:extLst>
-  </p:cSld>
-  <p:clrMapOvr>
-    <a:masterClrMapping/>
-  </p:clrMapOvr>
-  <p:timing>
-    <p:tnLst>
-      <p:par>
-        <p:cTn id="1" dur="indefinite" restart="never" nodeType="tmRoot"/>
-      </p:par>
-    </p:tnLst>
-  </p:timing>
-</p:sld>
-</file>
-
-<file path=ppt/slides/slide30.xml><?xml version="1.0" encoding="utf-8"?>
+<file path=ppt/slides/slide31.xml><?xml version="1.0" encoding="utf-8"?>
 <p:sld xmlns:a="http://schemas.openxmlformats.org/drawingml/2006/main" xmlns:r="http://schemas.openxmlformats.org/officeDocument/2006/relationships" xmlns:p="http://schemas.openxmlformats.org/presentationml/2006/main">
   <p:cSld>
     <p:spTree>
@@ -17950,7 +18777,7 @@
 </p:sld>
 </file>
 
-<file path=ppt/slides/slide31.xml><?xml version="1.0" encoding="utf-8"?>
+<file path=ppt/slides/slide32.xml><?xml version="1.0" encoding="utf-8"?>
 <p:sld xmlns:a="http://schemas.openxmlformats.org/drawingml/2006/main" xmlns:r="http://schemas.openxmlformats.org/officeDocument/2006/relationships" xmlns:p="http://schemas.openxmlformats.org/presentationml/2006/main">
   <p:cSld>
     <p:spTree>
@@ -18826,7 +19653,7 @@
 </p:sld>
 </file>
 
-<file path=ppt/slides/slide32.xml><?xml version="1.0" encoding="utf-8"?>
+<file path=ppt/slides/slide33.xml><?xml version="1.0" encoding="utf-8"?>
 <p:sld xmlns:a="http://schemas.openxmlformats.org/drawingml/2006/main" xmlns:r="http://schemas.openxmlformats.org/officeDocument/2006/relationships" xmlns:p="http://schemas.openxmlformats.org/presentationml/2006/main">
   <p:cSld>
     <p:spTree>
@@ -19120,7 +19947,7 @@
 </p:sld>
 </file>
 
-<file path=ppt/slides/slide33.xml><?xml version="1.0" encoding="utf-8"?>
+<file path=ppt/slides/slide34.xml><?xml version="1.0" encoding="utf-8"?>
 <p:sld xmlns:a="http://schemas.openxmlformats.org/drawingml/2006/main" xmlns:r="http://schemas.openxmlformats.org/officeDocument/2006/relationships" xmlns:p="http://schemas.openxmlformats.org/presentationml/2006/main" show="0">
   <p:cSld name="PPAck201401021130490549">
     <p:spTree>
@@ -19257,6 +20084,167 @@
 </file>
 
 <file path=ppt/slides/slide4.xml><?xml version="1.0" encoding="utf-8"?>
+<p:sld xmlns:a="http://schemas.openxmlformats.org/drawingml/2006/main" xmlns:r="http://schemas.openxmlformats.org/officeDocument/2006/relationships" xmlns:p="http://schemas.openxmlformats.org/presentationml/2006/main">
+  <p:cSld>
+    <p:spTree>
+      <p:nvGrpSpPr>
+        <p:cNvPr id="1" name=""/>
+        <p:cNvGrpSpPr/>
+        <p:nvPr/>
+      </p:nvGrpSpPr>
+      <p:grpSpPr>
+        <a:xfrm>
+          <a:off x="0" y="0"/>
+          <a:ext cx="0" cy="0"/>
+          <a:chOff x="0" y="0"/>
+          <a:chExt cx="0" cy="0"/>
+        </a:xfrm>
+      </p:grpSpPr>
+      <p:sp>
+        <p:nvSpPr>
+          <p:cNvPr id="4" name="[TextBox 3]"/>
+          <p:cNvSpPr txBox="1"/>
+          <p:nvPr/>
+        </p:nvSpPr>
+        <p:spPr>
+          <a:xfrm>
+            <a:off x="609600" y="2362199"/>
+            <a:ext cx="7848600" cy="1754326"/>
+          </a:xfrm>
+          <a:prstGeom prst="rect">
+            <a:avLst/>
+          </a:prstGeom>
+          <a:noFill/>
+        </p:spPr>
+        <p:txBody>
+          <a:bodyPr wrap="square" rtlCol="0">
+            <a:spAutoFit/>
+          </a:bodyPr>
+          <a:lstStyle/>
+          <a:p>
+            <a:r>
+              <a:rPr lang="en-US" dirty="0" smtClean="0">
+                <a:solidFill>
+                  <a:schemeClr val="accent6">
+                    <a:lumMod val="75000"/>
+                  </a:schemeClr>
+                </a:solidFill>
+              </a:rPr>
+              <a:t>Some buttons may appear to be disabled like this:</a:t>
+            </a:r>
+          </a:p>
+          <a:p>
+            <a:endParaRPr lang="en-US" dirty="0">
+              <a:solidFill>
+                <a:schemeClr val="accent6">
+                  <a:lumMod val="75000"/>
+                </a:schemeClr>
+              </a:solidFill>
+            </a:endParaRPr>
+          </a:p>
+          <a:p>
+            <a:endParaRPr lang="en-US" dirty="0" smtClean="0">
+              <a:solidFill>
+                <a:schemeClr val="accent6">
+                  <a:lumMod val="75000"/>
+                </a:schemeClr>
+              </a:solidFill>
+            </a:endParaRPr>
+          </a:p>
+          <a:p>
+            <a:endParaRPr lang="en-US" dirty="0" smtClean="0">
+              <a:solidFill>
+                <a:schemeClr val="accent6">
+                  <a:lumMod val="75000"/>
+                </a:schemeClr>
+              </a:solidFill>
+            </a:endParaRPr>
+          </a:p>
+          <a:p>
+            <a:r>
+              <a:rPr lang="en-US" dirty="0" smtClean="0">
+                <a:solidFill>
+                  <a:schemeClr val="accent6">
+                    <a:lumMod val="75000"/>
+                  </a:schemeClr>
+                </a:solidFill>
+              </a:rPr>
+              <a:t>You can move the mouse pointer onto the gray buttons and follow the instructions given in their tooltips to activate the </a:t>
+            </a:r>
+            <a:r>
+              <a:rPr lang="en-US" dirty="0" smtClean="0">
+                <a:solidFill>
+                  <a:schemeClr val="accent6">
+                    <a:lumMod val="75000"/>
+                  </a:schemeClr>
+                </a:solidFill>
+              </a:rPr>
+              <a:t>features</a:t>
+            </a:r>
+            <a:r>
+              <a:rPr lang="en-US" dirty="0">
+                <a:solidFill>
+                  <a:schemeClr val="accent6">
+                    <a:lumMod val="75000"/>
+                  </a:schemeClr>
+                </a:solidFill>
+              </a:rPr>
+              <a:t>.</a:t>
+            </a:r>
+            <a:endParaRPr lang="en-US" dirty="0" smtClean="0">
+              <a:solidFill>
+                <a:schemeClr val="accent6">
+                  <a:lumMod val="75000"/>
+                </a:schemeClr>
+              </a:solidFill>
+            </a:endParaRPr>
+          </a:p>
+        </p:txBody>
+      </p:sp>
+      <p:pic>
+        <p:nvPicPr>
+          <p:cNvPr id="6" name="图片 5"/>
+          <p:cNvPicPr>
+            <a:picLocks noChangeAspect="1"/>
+          </p:cNvPicPr>
+          <p:nvPr/>
+        </p:nvPicPr>
+        <p:blipFill>
+          <a:blip r:embed="rId2">
+            <a:extLst>
+              <a:ext uri="{28A0092B-C50C-407E-A947-70E740481C1C}">
+                <a14:useLocalDpi xmlns:a14="http://schemas.microsoft.com/office/drawing/2010/main" val="0"/>
+              </a:ext>
+            </a:extLst>
+          </a:blip>
+          <a:stretch>
+            <a:fillRect/>
+          </a:stretch>
+        </p:blipFill>
+        <p:spPr>
+          <a:xfrm>
+            <a:off x="5562600" y="1830525"/>
+            <a:ext cx="2458065" cy="1143000"/>
+          </a:xfrm>
+          <a:prstGeom prst="rect">
+            <a:avLst/>
+          </a:prstGeom>
+        </p:spPr>
+      </p:pic>
+    </p:spTree>
+    <p:extLst>
+      <p:ext uri="{BB962C8B-B14F-4D97-AF65-F5344CB8AC3E}">
+        <p14:creationId xmlns:p14="http://schemas.microsoft.com/office/powerpoint/2010/main" val="2165000948"/>
+      </p:ext>
+    </p:extLst>
+  </p:cSld>
+  <p:clrMapOvr>
+    <a:masterClrMapping/>
+  </p:clrMapOvr>
+</p:sld>
+</file>
+
+<file path=ppt/slides/slide5.xml><?xml version="1.0" encoding="utf-8"?>
 <p:sld xmlns:a="http://schemas.openxmlformats.org/drawingml/2006/main" xmlns:r="http://schemas.openxmlformats.org/officeDocument/2006/relationships" xmlns:p="http://schemas.openxmlformats.org/presentationml/2006/main">
   <p:cSld>
     <p:spTree>
@@ -20282,7 +21270,7 @@
 </p:sld>
 </file>
 
-<file path=ppt/slides/slide5.xml><?xml version="1.0" encoding="utf-8"?>
+<file path=ppt/slides/slide6.xml><?xml version="1.0" encoding="utf-8"?>
 <p:sld xmlns:a="http://schemas.openxmlformats.org/drawingml/2006/main" xmlns:r="http://schemas.openxmlformats.org/officeDocument/2006/relationships" xmlns:p="http://schemas.openxmlformats.org/presentationml/2006/main">
   <p:cSld name="PPTLabsHighlightBulletsSlide201404021559127370">
     <p:spTree>
@@ -20721,7 +21709,7 @@
 </p:sld>
 </file>
 
-<file path=ppt/slides/slide6.xml><?xml version="1.0" encoding="utf-8"?>
+<file path=ppt/slides/slide7.xml><?xml version="1.0" encoding="utf-8"?>
 <p:sld xmlns:a="http://schemas.openxmlformats.org/drawingml/2006/main" xmlns:r="http://schemas.openxmlformats.org/officeDocument/2006/relationships" xmlns:p="http://schemas.openxmlformats.org/presentationml/2006/main">
   <p:cSld>
     <p:spTree>
@@ -21157,7 +22145,7 @@
 </p:sld>
 </file>
 
-<file path=ppt/slides/slide7.xml><?xml version="1.0" encoding="utf-8"?>
+<file path=ppt/slides/slide8.xml><?xml version="1.0" encoding="utf-8"?>
 <p:sld xmlns:a="http://schemas.openxmlformats.org/drawingml/2006/main" xmlns:r="http://schemas.openxmlformats.org/officeDocument/2006/relationships" xmlns:p="http://schemas.openxmlformats.org/presentationml/2006/main">
   <p:cSld>
     <p:spTree>
@@ -21454,7 +22442,7 @@
 </p:sld>
 </file>
 
-<file path=ppt/slides/slide8.xml><?xml version="1.0" encoding="utf-8"?>
+<file path=ppt/slides/slide9.xml><?xml version="1.0" encoding="utf-8"?>
 <p:sld xmlns:a="http://schemas.openxmlformats.org/drawingml/2006/main" xmlns:r="http://schemas.openxmlformats.org/officeDocument/2006/relationships" xmlns:p="http://schemas.openxmlformats.org/presentationml/2006/main">
   <p:cSld>
     <p:spTree>
@@ -22572,831 +23560,6 @@
     <p:extLst>
       <p:ext uri="{BB962C8B-B14F-4D97-AF65-F5344CB8AC3E}">
         <p14:creationId xmlns:p14="http://schemas.microsoft.com/office/powerpoint/2010/main" val="1173125886"/>
-      </p:ext>
-    </p:extLst>
-  </p:cSld>
-  <p:clrMapOvr>
-    <a:masterClrMapping/>
-  </p:clrMapOvr>
-  <p:timing>
-    <p:tnLst>
-      <p:par>
-        <p:cTn id="1" dur="indefinite" restart="never" nodeType="tmRoot"/>
-      </p:par>
-    </p:tnLst>
-  </p:timing>
-</p:sld>
-</file>
-
-<file path=ppt/slides/slide9.xml><?xml version="1.0" encoding="utf-8"?>
-<p:sld xmlns:a="http://schemas.openxmlformats.org/drawingml/2006/main" xmlns:r="http://schemas.openxmlformats.org/officeDocument/2006/relationships" xmlns:p="http://schemas.openxmlformats.org/presentationml/2006/main">
-  <p:cSld>
-    <p:spTree>
-      <p:nvGrpSpPr>
-        <p:cNvPr id="1" name=""/>
-        <p:cNvGrpSpPr/>
-        <p:nvPr/>
-      </p:nvGrpSpPr>
-      <p:grpSpPr>
-        <a:xfrm>
-          <a:off x="0" y="0"/>
-          <a:ext cx="0" cy="0"/>
-          <a:chOff x="0" y="0"/>
-          <a:chExt cx="0" cy="0"/>
-        </a:xfrm>
-      </p:grpSpPr>
-      <p:sp>
-        <p:nvSpPr>
-          <p:cNvPr id="31" name="TextBox 30"/>
-          <p:cNvSpPr txBox="1"/>
-          <p:nvPr/>
-        </p:nvSpPr>
-        <p:spPr>
-          <a:xfrm>
-            <a:off x="304800" y="533400"/>
-            <a:ext cx="8384190" cy="800219"/>
-          </a:xfrm>
-          <a:prstGeom prst="rect">
-            <a:avLst/>
-          </a:prstGeom>
-          <a:noFill/>
-        </p:spPr>
-        <p:txBody>
-          <a:bodyPr wrap="square" rtlCol="0">
-            <a:spAutoFit/>
-          </a:bodyPr>
-          <a:lstStyle/>
-          <a:p>
-            <a:r>
-              <a:rPr lang="en-US" sz="2800" b="1" dirty="0" smtClean="0">
-                <a:solidFill>
-                  <a:schemeClr val="accent6">
-                    <a:lumMod val="75000"/>
-                  </a:schemeClr>
-                </a:solidFill>
-              </a:rPr>
-              <a:t>3.</a:t>
-            </a:r>
-            <a:r>
-              <a:rPr lang="en-US" dirty="0" smtClean="0">
-                <a:solidFill>
-                  <a:schemeClr val="accent6">
-                    <a:lumMod val="75000"/>
-                  </a:schemeClr>
-                </a:solidFill>
-              </a:rPr>
-              <a:t> Did you notice the new slide with a spotlight? You can press </a:t>
-            </a:r>
-            <a:r>
-              <a:rPr lang="en-US" dirty="0" err="1" smtClean="0">
-                <a:solidFill>
-                  <a:schemeClr val="accent6">
-                    <a:lumMod val="75000"/>
-                  </a:schemeClr>
-                </a:solidFill>
-              </a:rPr>
-              <a:t>Ctrl+Z</a:t>
-            </a:r>
-            <a:r>
-              <a:rPr lang="en-US" dirty="0" smtClean="0">
-                <a:solidFill>
-                  <a:schemeClr val="accent6">
-                    <a:lumMod val="75000"/>
-                  </a:schemeClr>
-                </a:solidFill>
-              </a:rPr>
-              <a:t> (Undo) to reverse the effect.</a:t>
-            </a:r>
-            <a:endParaRPr lang="en-SG" dirty="0">
-              <a:solidFill>
-                <a:schemeClr val="accent6">
-                  <a:lumMod val="75000"/>
-                </a:schemeClr>
-              </a:solidFill>
-            </a:endParaRPr>
-          </a:p>
-        </p:txBody>
-      </p:sp>
-      <p:pic>
-        <p:nvPicPr>
-          <p:cNvPr id="10242" name="Picture 2"/>
-          <p:cNvPicPr>
-            <a:picLocks noChangeAspect="1" noChangeArrowheads="1"/>
-          </p:cNvPicPr>
-          <p:nvPr/>
-        </p:nvPicPr>
-        <p:blipFill>
-          <a:blip r:embed="rId2">
-            <a:extLst>
-              <a:ext uri="{28A0092B-C50C-407E-A947-70E740481C1C}">
-                <a14:useLocalDpi xmlns:a14="http://schemas.microsoft.com/office/drawing/2010/main" val="0"/>
-              </a:ext>
-            </a:extLst>
-          </a:blip>
-          <a:srcRect/>
-          <a:stretch>
-            <a:fillRect/>
-          </a:stretch>
-        </p:blipFill>
-        <p:spPr bwMode="auto">
-          <a:xfrm>
-            <a:off x="762000" y="1447800"/>
-            <a:ext cx="2210895" cy="1658171"/>
-          </a:xfrm>
-          <a:prstGeom prst="rect">
-            <a:avLst/>
-          </a:prstGeom>
-          <a:ln>
-            <a:noFill/>
-          </a:ln>
-          <a:effectLst>
-            <a:outerShdw blurRad="190500" algn="tl" rotWithShape="0">
-              <a:srgbClr val="000000">
-                <a:alpha val="70000"/>
-              </a:srgbClr>
-            </a:outerShdw>
-          </a:effectLst>
-          <a:extLst>
-            <a:ext uri="{909E8E84-426E-40DD-AFC4-6F175D3DCCD1}">
-              <a14:hiddenFill xmlns:a14="http://schemas.microsoft.com/office/drawing/2010/main">
-                <a:solidFill>
-                  <a:schemeClr val="accent1"/>
-                </a:solidFill>
-              </a14:hiddenFill>
-            </a:ext>
-            <a:ext uri="{91240B29-F687-4F45-9708-019B960494DF}">
-              <a14:hiddenLine xmlns:a14="http://schemas.microsoft.com/office/drawing/2010/main" w="9525">
-                <a:solidFill>
-                  <a:schemeClr val="tx1"/>
-                </a:solidFill>
-                <a:miter lim="800000"/>
-                <a:headEnd/>
-                <a:tailEnd/>
-              </a14:hiddenLine>
-            </a:ext>
-          </a:extLst>
-        </p:spPr>
-      </p:pic>
-      <p:sp>
-        <p:nvSpPr>
-          <p:cNvPr id="18" name="TextBox 17"/>
-          <p:cNvSpPr txBox="1"/>
-          <p:nvPr/>
-        </p:nvSpPr>
-        <p:spPr>
-          <a:xfrm>
-            <a:off x="304800" y="3505200"/>
-            <a:ext cx="8384190" cy="800219"/>
-          </a:xfrm>
-          <a:prstGeom prst="rect">
-            <a:avLst/>
-          </a:prstGeom>
-          <a:noFill/>
-        </p:spPr>
-        <p:txBody>
-          <a:bodyPr wrap="square" rtlCol="0">
-            <a:spAutoFit/>
-          </a:bodyPr>
-          <a:lstStyle/>
-          <a:p>
-            <a:r>
-              <a:rPr lang="en-US" sz="2800" b="1" dirty="0" smtClean="0">
-                <a:solidFill>
-                  <a:schemeClr val="accent6">
-                    <a:lumMod val="75000"/>
-                  </a:schemeClr>
-                </a:solidFill>
-              </a:rPr>
-              <a:t>4.</a:t>
-            </a:r>
-            <a:r>
-              <a:rPr lang="en-US" dirty="0" smtClean="0">
-                <a:solidFill>
-                  <a:schemeClr val="accent6">
-                    <a:lumMod val="75000"/>
-                  </a:schemeClr>
-                </a:solidFill>
-              </a:rPr>
-              <a:t> You can also adjust the darkness (transparency) and softness (soft edges) of the spotlight.</a:t>
-            </a:r>
-            <a:endParaRPr lang="en-SG" dirty="0">
-              <a:solidFill>
-                <a:schemeClr val="accent6">
-                  <a:lumMod val="75000"/>
-                </a:schemeClr>
-              </a:solidFill>
-            </a:endParaRPr>
-          </a:p>
-        </p:txBody>
-      </p:sp>
-      <p:sp>
-        <p:nvSpPr>
-          <p:cNvPr id="20" name="TextBox 19"/>
-          <p:cNvSpPr txBox="1"/>
-          <p:nvPr/>
-        </p:nvSpPr>
-        <p:spPr>
-          <a:xfrm>
-            <a:off x="5257800" y="5849171"/>
-            <a:ext cx="2226136" cy="738664"/>
-          </a:xfrm>
-          <a:prstGeom prst="rect">
-            <a:avLst/>
-          </a:prstGeom>
-          <a:noFill/>
-        </p:spPr>
-        <p:txBody>
-          <a:bodyPr wrap="square" rtlCol="0">
-            <a:spAutoFit/>
-          </a:bodyPr>
-          <a:lstStyle/>
-          <a:p>
-            <a:r>
-              <a:rPr lang="en-US" sz="2400" b="1" dirty="0" smtClean="0">
-                <a:solidFill>
-                  <a:schemeClr val="accent6">
-                    <a:lumMod val="75000"/>
-                  </a:schemeClr>
-                </a:solidFill>
-              </a:rPr>
-              <a:t>b.</a:t>
-            </a:r>
-            <a:r>
-              <a:rPr lang="en-US" sz="1600" dirty="0" smtClean="0">
-                <a:solidFill>
-                  <a:schemeClr val="accent6">
-                    <a:lumMod val="75000"/>
-                  </a:schemeClr>
-                </a:solidFill>
-              </a:rPr>
-              <a:t> </a:t>
-            </a:r>
-            <a:r>
-              <a:rPr lang="en-US" dirty="0" smtClean="0">
-                <a:solidFill>
-                  <a:schemeClr val="accent6">
-                    <a:lumMod val="75000"/>
-                  </a:schemeClr>
-                </a:solidFill>
-              </a:rPr>
-              <a:t>Select the shadow-like shape.</a:t>
-            </a:r>
-            <a:endParaRPr lang="en-SG" dirty="0">
-              <a:solidFill>
-                <a:schemeClr val="accent6">
-                  <a:lumMod val="75000"/>
-                </a:schemeClr>
-              </a:solidFill>
-            </a:endParaRPr>
-          </a:p>
-        </p:txBody>
-      </p:sp>
-      <p:sp>
-        <p:nvSpPr>
-          <p:cNvPr id="21" name="TextBox 20"/>
-          <p:cNvSpPr txBox="1"/>
-          <p:nvPr/>
-        </p:nvSpPr>
-        <p:spPr>
-          <a:xfrm>
-            <a:off x="381000" y="5849171"/>
-            <a:ext cx="1995311" cy="738664"/>
-          </a:xfrm>
-          <a:prstGeom prst="rect">
-            <a:avLst/>
-          </a:prstGeom>
-          <a:noFill/>
-        </p:spPr>
-        <p:txBody>
-          <a:bodyPr wrap="square" rtlCol="0">
-            <a:spAutoFit/>
-          </a:bodyPr>
-          <a:lstStyle/>
-          <a:p>
-            <a:r>
-              <a:rPr lang="en-US" sz="2400" b="1" dirty="0" smtClean="0">
-                <a:solidFill>
-                  <a:schemeClr val="accent6">
-                    <a:lumMod val="75000"/>
-                  </a:schemeClr>
-                </a:solidFill>
-              </a:rPr>
-              <a:t>a.</a:t>
-            </a:r>
-            <a:r>
-              <a:rPr lang="en-US" sz="1600" dirty="0" smtClean="0">
-                <a:solidFill>
-                  <a:schemeClr val="accent6">
-                    <a:lumMod val="75000"/>
-                  </a:schemeClr>
-                </a:solidFill>
-              </a:rPr>
-              <a:t> </a:t>
-            </a:r>
-            <a:r>
-              <a:rPr lang="en-US" dirty="0" smtClean="0">
-                <a:solidFill>
-                  <a:schemeClr val="accent6">
-                    <a:lumMod val="75000"/>
-                  </a:schemeClr>
-                </a:solidFill>
-              </a:rPr>
-              <a:t>Adjust these </a:t>
-            </a:r>
-            <a:br>
-              <a:rPr lang="en-US" dirty="0" smtClean="0">
-                <a:solidFill>
-                  <a:schemeClr val="accent6">
-                    <a:lumMod val="75000"/>
-                  </a:schemeClr>
-                </a:solidFill>
-              </a:rPr>
-            </a:br>
-            <a:r>
-              <a:rPr lang="en-US" dirty="0" smtClean="0">
-                <a:solidFill>
-                  <a:schemeClr val="accent6">
-                    <a:lumMod val="75000"/>
-                  </a:schemeClr>
-                </a:solidFill>
-              </a:rPr>
-              <a:t>settings.</a:t>
-            </a:r>
-            <a:endParaRPr lang="en-SG" dirty="0">
-              <a:solidFill>
-                <a:schemeClr val="accent6">
-                  <a:lumMod val="75000"/>
-                </a:schemeClr>
-              </a:solidFill>
-            </a:endParaRPr>
-          </a:p>
-        </p:txBody>
-      </p:sp>
-      <p:pic>
-        <p:nvPicPr>
-          <p:cNvPr id="10244" name="Picture 4"/>
-          <p:cNvPicPr>
-            <a:picLocks noChangeAspect="1" noChangeArrowheads="1"/>
-          </p:cNvPicPr>
-          <p:nvPr/>
-        </p:nvPicPr>
-        <p:blipFill>
-          <a:blip r:embed="rId3">
-            <a:extLst>
-              <a:ext uri="{28A0092B-C50C-407E-A947-70E740481C1C}">
-                <a14:useLocalDpi xmlns:a14="http://schemas.microsoft.com/office/drawing/2010/main" val="0"/>
-              </a:ext>
-            </a:extLst>
-          </a:blip>
-          <a:srcRect/>
-          <a:stretch>
-            <a:fillRect/>
-          </a:stretch>
-        </p:blipFill>
-        <p:spPr bwMode="auto">
-          <a:xfrm>
-            <a:off x="7848600" y="4419599"/>
-            <a:ext cx="838200" cy="1167493"/>
-          </a:xfrm>
-          <a:prstGeom prst="rect">
-            <a:avLst/>
-          </a:prstGeom>
-          <a:noFill/>
-          <a:ln>
-            <a:noFill/>
-          </a:ln>
-          <a:extLst>
-            <a:ext uri="{909E8E84-426E-40DD-AFC4-6F175D3DCCD1}">
-              <a14:hiddenFill xmlns:a14="http://schemas.microsoft.com/office/drawing/2010/main">
-                <a:solidFill>
-                  <a:schemeClr val="accent1"/>
-                </a:solidFill>
-              </a14:hiddenFill>
-            </a:ext>
-            <a:ext uri="{91240B29-F687-4F45-9708-019B960494DF}">
-              <a14:hiddenLine xmlns:a14="http://schemas.microsoft.com/office/drawing/2010/main" w="9525">
-                <a:solidFill>
-                  <a:schemeClr val="tx1"/>
-                </a:solidFill>
-                <a:miter lim="800000"/>
-                <a:headEnd/>
-                <a:tailEnd/>
-              </a14:hiddenLine>
-            </a:ext>
-          </a:extLst>
-        </p:spPr>
-      </p:pic>
-      <p:sp>
-        <p:nvSpPr>
-          <p:cNvPr id="24" name="TextBox 23"/>
-          <p:cNvSpPr txBox="1"/>
-          <p:nvPr/>
-        </p:nvSpPr>
-        <p:spPr>
-          <a:xfrm>
-            <a:off x="7756064" y="5849171"/>
-            <a:ext cx="1311736" cy="738664"/>
-          </a:xfrm>
-          <a:prstGeom prst="rect">
-            <a:avLst/>
-          </a:prstGeom>
-          <a:noFill/>
-        </p:spPr>
-        <p:txBody>
-          <a:bodyPr wrap="square" rtlCol="0">
-            <a:spAutoFit/>
-          </a:bodyPr>
-          <a:lstStyle/>
-          <a:p>
-            <a:r>
-              <a:rPr lang="en-US" sz="2400" b="1" dirty="0" smtClean="0">
-                <a:solidFill>
-                  <a:schemeClr val="accent6">
-                    <a:lumMod val="75000"/>
-                  </a:schemeClr>
-                </a:solidFill>
-              </a:rPr>
-              <a:t>c.</a:t>
-            </a:r>
-            <a:r>
-              <a:rPr lang="en-US" sz="1600" dirty="0" smtClean="0">
-                <a:solidFill>
-                  <a:schemeClr val="accent6">
-                    <a:lumMod val="75000"/>
-                  </a:schemeClr>
-                </a:solidFill>
-              </a:rPr>
-              <a:t> </a:t>
-            </a:r>
-            <a:r>
-              <a:rPr lang="en-US" dirty="0" smtClean="0">
-                <a:solidFill>
-                  <a:schemeClr val="accent6">
-                    <a:lumMod val="75000"/>
-                  </a:schemeClr>
-                </a:solidFill>
-              </a:rPr>
-              <a:t>Click </a:t>
-            </a:r>
-            <a:br>
-              <a:rPr lang="en-US" dirty="0" smtClean="0">
-                <a:solidFill>
-                  <a:schemeClr val="accent6">
-                    <a:lumMod val="75000"/>
-                  </a:schemeClr>
-                </a:solidFill>
-              </a:rPr>
-            </a:br>
-            <a:r>
-              <a:rPr lang="en-US" dirty="0" smtClean="0">
-                <a:solidFill>
-                  <a:schemeClr val="accent6">
-                    <a:lumMod val="75000"/>
-                  </a:schemeClr>
-                </a:solidFill>
-              </a:rPr>
-              <a:t>this button.</a:t>
-            </a:r>
-            <a:endParaRPr lang="en-SG" dirty="0">
-              <a:solidFill>
-                <a:schemeClr val="accent6">
-                  <a:lumMod val="75000"/>
-                </a:schemeClr>
-              </a:solidFill>
-            </a:endParaRPr>
-          </a:p>
-        </p:txBody>
-      </p:sp>
-      <p:pic>
-        <p:nvPicPr>
-          <p:cNvPr id="10245" name="Picture 5"/>
-          <p:cNvPicPr>
-            <a:picLocks noChangeAspect="1" noChangeArrowheads="1"/>
-          </p:cNvPicPr>
-          <p:nvPr/>
-        </p:nvPicPr>
-        <p:blipFill>
-          <a:blip r:embed="rId4" cstate="print">
-            <a:extLst>
-              <a:ext uri="{28A0092B-C50C-407E-A947-70E740481C1C}">
-                <a14:useLocalDpi xmlns:a14="http://schemas.microsoft.com/office/drawing/2010/main" val="0"/>
-              </a:ext>
-            </a:extLst>
-          </a:blip>
-          <a:srcRect/>
-          <a:stretch>
-            <a:fillRect/>
-          </a:stretch>
-        </p:blipFill>
-        <p:spPr bwMode="auto">
-          <a:xfrm>
-            <a:off x="5227320" y="4424138"/>
-            <a:ext cx="1904689" cy="1429572"/>
-          </a:xfrm>
-          <a:prstGeom prst="rect">
-            <a:avLst/>
-          </a:prstGeom>
-          <a:noFill/>
-          <a:ln>
-            <a:noFill/>
-          </a:ln>
-          <a:effectLst/>
-          <a:extLst>
-            <a:ext uri="{909E8E84-426E-40DD-AFC4-6F175D3DCCD1}">
-              <a14:hiddenFill xmlns:a14="http://schemas.microsoft.com/office/drawing/2010/main">
-                <a:solidFill>
-                  <a:schemeClr val="accent1"/>
-                </a:solidFill>
-              </a14:hiddenFill>
-            </a:ext>
-            <a:ext uri="{91240B29-F687-4F45-9708-019B960494DF}">
-              <a14:hiddenLine xmlns:a14="http://schemas.microsoft.com/office/drawing/2010/main" w="9525">
-                <a:solidFill>
-                  <a:schemeClr val="tx1"/>
-                </a:solidFill>
-                <a:miter lim="800000"/>
-                <a:headEnd/>
-                <a:tailEnd/>
-              </a14:hiddenLine>
-            </a:ext>
-            <a:ext uri="{AF507438-7753-43E0-B8FC-AC1667EBCBE1}">
-              <a14:hiddenEffects xmlns:a14="http://schemas.microsoft.com/office/drawing/2010/main">
-                <a:effectLst>
-                  <a:outerShdw dist="35921" dir="2700000" algn="ctr" rotWithShape="0">
-                    <a:schemeClr val="bg2"/>
-                  </a:outerShdw>
-                </a:effectLst>
-              </a14:hiddenEffects>
-            </a:ext>
-          </a:extLst>
-        </p:spPr>
-      </p:pic>
-      <p:pic>
-        <p:nvPicPr>
-          <p:cNvPr id="1026" name="Picture 2"/>
-          <p:cNvPicPr>
-            <a:picLocks noChangeAspect="1" noChangeArrowheads="1"/>
-          </p:cNvPicPr>
-          <p:nvPr/>
-        </p:nvPicPr>
-        <p:blipFill>
-          <a:blip r:embed="rId5">
-            <a:extLst>
-              <a:ext uri="{28A0092B-C50C-407E-A947-70E740481C1C}">
-                <a14:useLocalDpi xmlns:a14="http://schemas.microsoft.com/office/drawing/2010/main" val="0"/>
-              </a:ext>
-            </a:extLst>
-          </a:blip>
-          <a:srcRect/>
-          <a:stretch>
-            <a:fillRect/>
-          </a:stretch>
-        </p:blipFill>
-        <p:spPr bwMode="auto">
-          <a:xfrm>
-            <a:off x="2376311" y="4976954"/>
-            <a:ext cx="2500489" cy="1119046"/>
-          </a:xfrm>
-          <a:prstGeom prst="roundRect">
-            <a:avLst>
-              <a:gd name="adj" fmla="val 3977"/>
-            </a:avLst>
-          </a:prstGeom>
-          <a:noFill/>
-          <a:ln>
-            <a:noFill/>
-          </a:ln>
-          <a:effectLst/>
-          <a:extLst>
-            <a:ext uri="{909E8E84-426E-40DD-AFC4-6F175D3DCCD1}">
-              <a14:hiddenFill xmlns:a14="http://schemas.microsoft.com/office/drawing/2010/main">
-                <a:solidFill>
-                  <a:schemeClr val="accent1"/>
-                </a:solidFill>
-              </a14:hiddenFill>
-            </a:ext>
-            <a:ext uri="{91240B29-F687-4F45-9708-019B960494DF}">
-              <a14:hiddenLine xmlns:a14="http://schemas.microsoft.com/office/drawing/2010/main" w="9525">
-                <a:solidFill>
-                  <a:schemeClr val="tx1"/>
-                </a:solidFill>
-                <a:miter lim="800000"/>
-                <a:headEnd/>
-                <a:tailEnd/>
-              </a14:hiddenLine>
-            </a:ext>
-            <a:ext uri="{AF507438-7753-43E0-B8FC-AC1667EBCBE1}">
-              <a14:hiddenEffects xmlns:a14="http://schemas.microsoft.com/office/drawing/2010/main">
-                <a:effectLst>
-                  <a:outerShdw dist="35921" dir="2700000" algn="ctr" rotWithShape="0">
-                    <a:schemeClr val="bg2"/>
-                  </a:outerShdw>
-                </a:effectLst>
-              </a14:hiddenEffects>
-            </a:ext>
-          </a:extLst>
-        </p:spPr>
-      </p:pic>
-      <p:pic>
-        <p:nvPicPr>
-          <p:cNvPr id="1027" name="Picture 3"/>
-          <p:cNvPicPr>
-            <a:picLocks noChangeAspect="1" noChangeArrowheads="1"/>
-          </p:cNvPicPr>
-          <p:nvPr/>
-        </p:nvPicPr>
-        <p:blipFill>
-          <a:blip r:embed="rId6">
-            <a:extLst>
-              <a:ext uri="{28A0092B-C50C-407E-A947-70E740481C1C}">
-                <a14:useLocalDpi xmlns:a14="http://schemas.microsoft.com/office/drawing/2010/main" val="0"/>
-              </a:ext>
-            </a:extLst>
-          </a:blip>
-          <a:srcRect/>
-          <a:stretch>
-            <a:fillRect/>
-          </a:stretch>
-        </p:blipFill>
-        <p:spPr bwMode="auto">
-          <a:xfrm>
-            <a:off x="416065" y="4280964"/>
-            <a:ext cx="1694356" cy="1270767"/>
-          </a:xfrm>
-          <a:prstGeom prst="rect">
-            <a:avLst/>
-          </a:prstGeom>
-          <a:noFill/>
-          <a:ln>
-            <a:noFill/>
-          </a:ln>
-          <a:effectLst/>
-          <a:extLst>
-            <a:ext uri="{909E8E84-426E-40DD-AFC4-6F175D3DCCD1}">
-              <a14:hiddenFill xmlns:a14="http://schemas.microsoft.com/office/drawing/2010/main">
-                <a:solidFill>
-                  <a:schemeClr val="accent1"/>
-                </a:solidFill>
-              </a14:hiddenFill>
-            </a:ext>
-            <a:ext uri="{91240B29-F687-4F45-9708-019B960494DF}">
-              <a14:hiddenLine xmlns:a14="http://schemas.microsoft.com/office/drawing/2010/main" w="9525">
-                <a:solidFill>
-                  <a:schemeClr val="tx1"/>
-                </a:solidFill>
-                <a:miter lim="800000"/>
-                <a:headEnd/>
-                <a:tailEnd/>
-              </a14:hiddenLine>
-            </a:ext>
-            <a:ext uri="{AF507438-7753-43E0-B8FC-AC1667EBCBE1}">
-              <a14:hiddenEffects xmlns:a14="http://schemas.microsoft.com/office/drawing/2010/main">
-                <a:effectLst>
-                  <a:outerShdw dist="35921" dir="2700000" algn="ctr" rotWithShape="0">
-                    <a:schemeClr val="bg2"/>
-                  </a:outerShdw>
-                </a:effectLst>
-              </a14:hiddenEffects>
-            </a:ext>
-          </a:extLst>
-        </p:spPr>
-      </p:pic>
-      <p:sp>
-        <p:nvSpPr>
-          <p:cNvPr id="2" name="Flowchart: Connector 1"/>
-          <p:cNvSpPr/>
-          <p:nvPr/>
-        </p:nvSpPr>
-        <p:spPr>
-          <a:xfrm>
-            <a:off x="1825520" y="5276419"/>
-            <a:ext cx="368721" cy="368721"/>
-          </a:xfrm>
-          <a:prstGeom prst="flowChartConnector">
-            <a:avLst/>
-          </a:prstGeom>
-          <a:noFill/>
-          <a:ln w="38100">
-            <a:solidFill>
-              <a:schemeClr val="accent6"/>
-            </a:solidFill>
-          </a:ln>
-        </p:spPr>
-        <p:style>
-          <a:lnRef idx="2">
-            <a:schemeClr val="accent1">
-              <a:shade val="50000"/>
-            </a:schemeClr>
-          </a:lnRef>
-          <a:fillRef idx="1">
-            <a:schemeClr val="accent1"/>
-          </a:fillRef>
-          <a:effectRef idx="0">
-            <a:schemeClr val="accent1"/>
-          </a:effectRef>
-          <a:fontRef idx="minor">
-            <a:schemeClr val="lt1"/>
-          </a:fontRef>
-        </p:style>
-        <p:txBody>
-          <a:bodyPr rtlCol="0" anchor="ctr"/>
-          <a:lstStyle/>
-          <a:p>
-            <a:pPr algn="ctr"/>
-            <a:endParaRPr lang="en-US"/>
-          </a:p>
-        </p:txBody>
-      </p:sp>
-      <p:sp>
-        <p:nvSpPr>
-          <p:cNvPr id="3" name="Freeform 2"/>
-          <p:cNvSpPr/>
-          <p:nvPr/>
-        </p:nvSpPr>
-        <p:spPr>
-          <a:xfrm>
-            <a:off x="2003320" y="5653834"/>
-            <a:ext cx="304800" cy="203200"/>
-          </a:xfrm>
-          <a:custGeom>
-            <a:avLst/>
-            <a:gdLst>
-              <a:gd name="connsiteX0" fmla="*/ 0 w 304800"/>
-              <a:gd name="connsiteY0" fmla="*/ 0 h 203200"/>
-              <a:gd name="connsiteX1" fmla="*/ 76200 w 304800"/>
-              <a:gd name="connsiteY1" fmla="*/ 165100 h 203200"/>
-              <a:gd name="connsiteX2" fmla="*/ 304800 w 304800"/>
-              <a:gd name="connsiteY2" fmla="*/ 203200 h 203200"/>
-            </a:gdLst>
-            <a:ahLst/>
-            <a:cxnLst>
-              <a:cxn ang="0">
-                <a:pos x="connsiteX0" y="connsiteY0"/>
-              </a:cxn>
-              <a:cxn ang="0">
-                <a:pos x="connsiteX1" y="connsiteY1"/>
-              </a:cxn>
-              <a:cxn ang="0">
-                <a:pos x="connsiteX2" y="connsiteY2"/>
-              </a:cxn>
-            </a:cxnLst>
-            <a:rect l="l" t="t" r="r" b="b"/>
-            <a:pathLst>
-              <a:path w="304800" h="203200">
-                <a:moveTo>
-                  <a:pt x="0" y="0"/>
-                </a:moveTo>
-                <a:cubicBezTo>
-                  <a:pt x="12700" y="65616"/>
-                  <a:pt x="25400" y="131233"/>
-                  <a:pt x="76200" y="165100"/>
-                </a:cubicBezTo>
-                <a:cubicBezTo>
-                  <a:pt x="127000" y="198967"/>
-                  <a:pt x="215900" y="201083"/>
-                  <a:pt x="304800" y="203200"/>
-                </a:cubicBezTo>
-              </a:path>
-            </a:pathLst>
-          </a:custGeom>
-          <a:noFill/>
-          <a:ln w="38100">
-            <a:solidFill>
-              <a:schemeClr val="accent6"/>
-            </a:solidFill>
-            <a:headEnd type="none" w="med" len="med"/>
-            <a:tailEnd type="triangle" w="med" len="med"/>
-          </a:ln>
-        </p:spPr>
-        <p:style>
-          <a:lnRef idx="2">
-            <a:schemeClr val="accent1">
-              <a:shade val="50000"/>
-            </a:schemeClr>
-          </a:lnRef>
-          <a:fillRef idx="1">
-            <a:schemeClr val="accent1"/>
-          </a:fillRef>
-          <a:effectRef idx="0">
-            <a:schemeClr val="accent1"/>
-          </a:effectRef>
-          <a:fontRef idx="minor">
-            <a:schemeClr val="lt1"/>
-          </a:fontRef>
-        </p:style>
-        <p:txBody>
-          <a:bodyPr rtlCol="0" anchor="ctr"/>
-          <a:lstStyle/>
-          <a:p>
-            <a:pPr algn="ctr"/>
-            <a:endParaRPr lang="en-US"/>
-          </a:p>
-        </p:txBody>
-      </p:sp>
-    </p:spTree>
-    <p:extLst>
-      <p:ext uri="{BB962C8B-B14F-4D97-AF65-F5344CB8AC3E}">
-        <p14:creationId xmlns:p14="http://schemas.microsoft.com/office/powerpoint/2010/main" val="2709547285"/>
       </p:ext>
     </p:extLst>
   </p:cSld>

</xml_diff>

<commit_message>
Refined the tutorial file for Colors Lab and Shapes Lab. Fixes #559 as well
</commit_message>
<xml_diff>
--- a/doc/PowerPointLabs Quick Tutorial.pptx
+++ b/doc/PowerPointLabs Quick Tutorial.pptx
@@ -220,7 +220,7 @@
       </p14:sectionLst>
     </p:ext>
     <p:ext uri="{EFAFB233-063F-42B5-8137-9DF3F51BA10A}">
-      <p15:sldGuideLst xmlns:p15="http://schemas.microsoft.com/office/powerpoint/2012/main">
+      <p15:sldGuideLst xmlns:p15="http://schemas.microsoft.com/office/powerpoint/2012/main" xmlns="">
         <p15:guide id="1" orient="horz" pos="2160">
           <p15:clr>
             <a:srgbClr val="A4A3A4"/>
@@ -444,7 +444,7 @@
           <a:p>
             <a:fld id="{3E86CC0F-BBF3-4E07-94E0-0549B7D560A9}" type="datetimeFigureOut">
               <a:rPr lang="en-SG" smtClean="0"/>
-              <a:t>22/7/2014</a:t>
+              <a:t>17/8/2014</a:t>
             </a:fld>
             <a:endParaRPr lang="en-SG"/>
           </a:p>
@@ -1583,7 +1583,7 @@
             <a:fld id="{1D8BD707-D9CF-40AE-B4C6-C98DA3205C09}" type="datetimeFigureOut">
               <a:rPr lang="en-US" smtClean="0"/>
               <a:pPr/>
-              <a:t>7/22/2014</a:t>
+              <a:t>8/17/2014</a:t>
             </a:fld>
             <a:endParaRPr lang="en-US"/>
           </a:p>
@@ -1750,7 +1750,7 @@
             <a:fld id="{1D8BD707-D9CF-40AE-B4C6-C98DA3205C09}" type="datetimeFigureOut">
               <a:rPr lang="en-US" smtClean="0"/>
               <a:pPr/>
-              <a:t>7/22/2014</a:t>
+              <a:t>8/17/2014</a:t>
             </a:fld>
             <a:endParaRPr lang="en-US"/>
           </a:p>
@@ -1927,7 +1927,7 @@
             <a:fld id="{1D8BD707-D9CF-40AE-B4C6-C98DA3205C09}" type="datetimeFigureOut">
               <a:rPr lang="en-US" smtClean="0"/>
               <a:pPr/>
-              <a:t>7/22/2014</a:t>
+              <a:t>8/17/2014</a:t>
             </a:fld>
             <a:endParaRPr lang="en-US"/>
           </a:p>
@@ -2094,7 +2094,7 @@
             <a:fld id="{1D8BD707-D9CF-40AE-B4C6-C98DA3205C09}" type="datetimeFigureOut">
               <a:rPr lang="en-US" smtClean="0"/>
               <a:pPr/>
-              <a:t>7/22/2014</a:t>
+              <a:t>8/17/2014</a:t>
             </a:fld>
             <a:endParaRPr lang="en-US"/>
           </a:p>
@@ -2337,7 +2337,7 @@
             <a:fld id="{1D8BD707-D9CF-40AE-B4C6-C98DA3205C09}" type="datetimeFigureOut">
               <a:rPr lang="en-US" smtClean="0"/>
               <a:pPr/>
-              <a:t>7/22/2014</a:t>
+              <a:t>8/17/2014</a:t>
             </a:fld>
             <a:endParaRPr lang="en-US"/>
           </a:p>
@@ -2622,7 +2622,7 @@
             <a:fld id="{1D8BD707-D9CF-40AE-B4C6-C98DA3205C09}" type="datetimeFigureOut">
               <a:rPr lang="en-US" smtClean="0"/>
               <a:pPr/>
-              <a:t>7/22/2014</a:t>
+              <a:t>8/17/2014</a:t>
             </a:fld>
             <a:endParaRPr lang="en-US"/>
           </a:p>
@@ -3041,7 +3041,7 @@
             <a:fld id="{1D8BD707-D9CF-40AE-B4C6-C98DA3205C09}" type="datetimeFigureOut">
               <a:rPr lang="en-US" smtClean="0"/>
               <a:pPr/>
-              <a:t>7/22/2014</a:t>
+              <a:t>8/17/2014</a:t>
             </a:fld>
             <a:endParaRPr lang="en-US"/>
           </a:p>
@@ -3156,7 +3156,7 @@
             <a:fld id="{1D8BD707-D9CF-40AE-B4C6-C98DA3205C09}" type="datetimeFigureOut">
               <a:rPr lang="en-US" smtClean="0"/>
               <a:pPr/>
-              <a:t>7/22/2014</a:t>
+              <a:t>8/17/2014</a:t>
             </a:fld>
             <a:endParaRPr lang="en-US"/>
           </a:p>
@@ -3248,7 +3248,7 @@
             <a:fld id="{1D8BD707-D9CF-40AE-B4C6-C98DA3205C09}" type="datetimeFigureOut">
               <a:rPr lang="en-US" smtClean="0"/>
               <a:pPr/>
-              <a:t>7/22/2014</a:t>
+              <a:t>8/17/2014</a:t>
             </a:fld>
             <a:endParaRPr lang="en-US"/>
           </a:p>
@@ -3522,7 +3522,7 @@
             <a:fld id="{1D8BD707-D9CF-40AE-B4C6-C98DA3205C09}" type="datetimeFigureOut">
               <a:rPr lang="en-US" smtClean="0"/>
               <a:pPr/>
-              <a:t>7/22/2014</a:t>
+              <a:t>8/17/2014</a:t>
             </a:fld>
             <a:endParaRPr lang="en-US"/>
           </a:p>
@@ -3772,7 +3772,7 @@
             <a:fld id="{1D8BD707-D9CF-40AE-B4C6-C98DA3205C09}" type="datetimeFigureOut">
               <a:rPr lang="en-US" smtClean="0"/>
               <a:pPr/>
-              <a:t>7/22/2014</a:t>
+              <a:t>8/17/2014</a:t>
             </a:fld>
             <a:endParaRPr lang="en-US"/>
           </a:p>
@@ -3982,7 +3982,7 @@
             <a:fld id="{1D8BD707-D9CF-40AE-B4C6-C98DA3205C09}" type="datetimeFigureOut">
               <a:rPr lang="en-US" smtClean="0"/>
               <a:pPr/>
-              <a:t>7/22/2014</a:t>
+              <a:t>8/17/2014</a:t>
             </a:fld>
             <a:endParaRPr lang="en-US"/>
           </a:p>
@@ -17050,7 +17050,27 @@
                   </a:schemeClr>
                 </a:solidFill>
               </a:rPr>
-              <a:t>bring you the Shapes Lab Panel.</a:t>
+              <a:t>bring </a:t>
+            </a:r>
+            <a:r>
+              <a:rPr lang="en-US" dirty="0" smtClean="0">
+                <a:solidFill>
+                  <a:schemeClr val="accent6">
+                    <a:lumMod val="75000"/>
+                  </a:schemeClr>
+                </a:solidFill>
+              </a:rPr>
+              <a:t>up </a:t>
+            </a:r>
+            <a:r>
+              <a:rPr lang="en-US" dirty="0" smtClean="0">
+                <a:solidFill>
+                  <a:schemeClr val="accent6">
+                    <a:lumMod val="75000"/>
+                  </a:schemeClr>
+                </a:solidFill>
+              </a:rPr>
+              <a:t>the Shapes Lab Panel.</a:t>
             </a:r>
             <a:endParaRPr lang="en-SG" dirty="0">
               <a:solidFill>
@@ -17124,7 +17144,7 @@
         <p:spPr>
           <a:xfrm>
             <a:off x="457199" y="2968585"/>
-            <a:ext cx="3505200" cy="1908215"/>
+            <a:ext cx="3505200" cy="1631216"/>
           </a:xfrm>
           <a:prstGeom prst="rect">
             <a:avLst/>
@@ -17155,7 +17175,97 @@
                   </a:schemeClr>
                 </a:solidFill>
               </a:rPr>
-              <a:t> Right click on the shape you want to add into the Lab, and select “Add to Custom Shapes”. Then you should see your shape in the panel and waiting for name editing.</a:t>
+              <a:t> Right click </a:t>
+            </a:r>
+            <a:r>
+              <a:rPr lang="en-US" dirty="0" smtClean="0">
+                <a:solidFill>
+                  <a:schemeClr val="accent6">
+                    <a:lumMod val="75000"/>
+                  </a:schemeClr>
+                </a:solidFill>
+              </a:rPr>
+              <a:t>the ‘house’ </a:t>
+            </a:r>
+            <a:r>
+              <a:rPr lang="en-US" dirty="0" smtClean="0">
+                <a:solidFill>
+                  <a:schemeClr val="accent6">
+                    <a:lumMod val="75000"/>
+                  </a:schemeClr>
+                </a:solidFill>
+              </a:rPr>
+              <a:t>shape </a:t>
+            </a:r>
+            <a:r>
+              <a:rPr lang="en-US" dirty="0" smtClean="0">
+                <a:solidFill>
+                  <a:schemeClr val="accent6">
+                    <a:lumMod val="75000"/>
+                  </a:schemeClr>
+                </a:solidFill>
+              </a:rPr>
+              <a:t>below and choose “Add </a:t>
+            </a:r>
+            <a:r>
+              <a:rPr lang="en-US" dirty="0" smtClean="0">
+                <a:solidFill>
+                  <a:schemeClr val="accent6">
+                    <a:lumMod val="75000"/>
+                  </a:schemeClr>
+                </a:solidFill>
+              </a:rPr>
+              <a:t>to </a:t>
+            </a:r>
+            <a:r>
+              <a:rPr lang="en-US" dirty="0" smtClean="0">
+                <a:solidFill>
+                  <a:schemeClr val="accent6">
+                    <a:lumMod val="75000"/>
+                  </a:schemeClr>
+                </a:solidFill>
+              </a:rPr>
+              <a:t>Shapes Lab”. </a:t>
+            </a:r>
+            <a:r>
+              <a:rPr lang="en-US" dirty="0" smtClean="0">
+                <a:solidFill>
+                  <a:schemeClr val="accent6">
+                    <a:lumMod val="75000"/>
+                  </a:schemeClr>
+                </a:solidFill>
+              </a:rPr>
+              <a:t>Then you should see your shape in the </a:t>
+            </a:r>
+            <a:r>
+              <a:rPr lang="en-US" dirty="0" smtClean="0">
+                <a:solidFill>
+                  <a:schemeClr val="accent6">
+                    <a:lumMod val="75000"/>
+                  </a:schemeClr>
+                </a:solidFill>
+              </a:rPr>
+              <a:t>panel, waitin</a:t>
+            </a:r>
+            <a:r>
+              <a:rPr lang="en-US" dirty="0" smtClean="0">
+                <a:solidFill>
+                  <a:schemeClr val="accent6">
+                    <a:lumMod val="75000"/>
+                  </a:schemeClr>
+                </a:solidFill>
+              </a:rPr>
+              <a:t>g for you to give it a name</a:t>
+            </a:r>
+            <a:r>
+              <a:rPr lang="en-US" dirty="0" smtClean="0">
+                <a:solidFill>
+                  <a:schemeClr val="accent6">
+                    <a:lumMod val="75000"/>
+                  </a:schemeClr>
+                </a:solidFill>
+              </a:rPr>
+              <a:t>.</a:t>
             </a:r>
             <a:endParaRPr lang="en-SG" dirty="0">
               <a:solidFill>
@@ -17167,258 +17277,161 @@
           </a:p>
         </p:txBody>
       </p:sp>
-      <p:grpSp>
-        <p:nvGrpSpPr>
-          <p:cNvPr id="22" name="Group 21"/>
-          <p:cNvGrpSpPr/>
+      <p:sp>
+        <p:nvSpPr>
+          <p:cNvPr id="4" name="Rectangle 3"/>
+          <p:cNvSpPr/>
           <p:nvPr/>
-        </p:nvGrpSpPr>
-        <p:grpSpPr>
+        </p:nvSpPr>
+        <p:spPr>
           <a:xfrm>
-            <a:off x="2382672" y="5373574"/>
-            <a:ext cx="3810000" cy="897017"/>
-            <a:chOff x="228600" y="4817982"/>
-            <a:chExt cx="3810000" cy="897017"/>
+            <a:off x="3048000" y="5181600"/>
+            <a:ext cx="1066800" cy="1165191"/>
           </a:xfrm>
-        </p:grpSpPr>
-        <p:sp>
-          <p:nvSpPr>
-            <p:cNvPr id="23" name="Rounded Rectangle 22"/>
-            <p:cNvSpPr/>
-            <p:nvPr/>
-          </p:nvSpPr>
-          <p:spPr>
-            <a:xfrm>
-              <a:off x="228600" y="4894183"/>
-              <a:ext cx="1219200" cy="762000"/>
-            </a:xfrm>
-            <a:prstGeom prst="roundRect">
-              <a:avLst/>
-            </a:prstGeom>
-            <a:solidFill>
-              <a:srgbClr val="00B050"/>
-            </a:solidFill>
-          </p:spPr>
-          <p:style>
-            <a:lnRef idx="2">
-              <a:schemeClr val="accent1">
-                <a:shade val="50000"/>
-              </a:schemeClr>
-            </a:lnRef>
-            <a:fillRef idx="1">
-              <a:schemeClr val="accent1"/>
-            </a:fillRef>
-            <a:effectRef idx="0">
-              <a:schemeClr val="accent1"/>
-            </a:effectRef>
-            <a:fontRef idx="minor">
-              <a:schemeClr val="lt1"/>
-            </a:fontRef>
-          </p:style>
-          <p:txBody>
-            <a:bodyPr rtlCol="0" anchor="ctr"/>
-            <a:lstStyle/>
-            <a:p>
-              <a:pPr algn="ctr"/>
-              <a:r>
-                <a:rPr lang="en-US" altLang="zh-CN" sz="3200" b="1" dirty="0" smtClean="0">
-                  <a:ln w="10160">
-                    <a:solidFill>
-                      <a:schemeClr val="accent5"/>
-                    </a:solidFill>
-                    <a:prstDash val="solid"/>
-                  </a:ln>
-                  <a:solidFill>
-                    <a:srgbClr val="FFFFFF"/>
-                  </a:solidFill>
-                  <a:effectLst>
-                    <a:outerShdw blurRad="38100" dist="22860" dir="5400000" algn="tl" rotWithShape="0">
-                      <a:srgbClr val="000000">
-                        <a:alpha val="30000"/>
-                      </a:srgbClr>
-                    </a:outerShdw>
-                  </a:effectLst>
-                </a:rPr>
-                <a:t>Right</a:t>
-              </a:r>
-              <a:endParaRPr lang="zh-CN" altLang="en-US" sz="3200" b="1" dirty="0">
-                <a:ln w="10160">
-                  <a:solidFill>
-                    <a:schemeClr val="accent5"/>
-                  </a:solidFill>
-                  <a:prstDash val="solid"/>
-                </a:ln>
-                <a:solidFill>
-                  <a:srgbClr val="FFFFFF"/>
-                </a:solidFill>
-                <a:effectLst>
-                  <a:outerShdw blurRad="38100" dist="22860" dir="5400000" algn="tl" rotWithShape="0">
-                    <a:srgbClr val="000000">
-                      <a:alpha val="30000"/>
-                    </a:srgbClr>
-                  </a:outerShdw>
-                </a:effectLst>
-              </a:endParaRPr>
-            </a:p>
-          </p:txBody>
-        </p:sp>
-        <p:sp>
-          <p:nvSpPr>
-            <p:cNvPr id="24" name="Rectangle 23"/>
-            <p:cNvSpPr/>
-            <p:nvPr/>
-          </p:nvSpPr>
-          <p:spPr>
-            <a:xfrm>
-              <a:off x="1600200" y="4894183"/>
-              <a:ext cx="1219200" cy="744617"/>
-            </a:xfrm>
-            <a:prstGeom prst="rect">
-              <a:avLst/>
-            </a:prstGeom>
-            <a:solidFill>
-              <a:srgbClr val="00B0F0"/>
-            </a:solidFill>
-          </p:spPr>
-          <p:style>
-            <a:lnRef idx="2">
-              <a:schemeClr val="accent1">
-                <a:shade val="50000"/>
-              </a:schemeClr>
-            </a:lnRef>
-            <a:fillRef idx="1">
-              <a:schemeClr val="accent1"/>
-            </a:fillRef>
-            <a:effectRef idx="0">
-              <a:schemeClr val="accent1"/>
-            </a:effectRef>
-            <a:fontRef idx="minor">
-              <a:schemeClr val="lt1"/>
-            </a:fontRef>
-          </p:style>
-          <p:txBody>
-            <a:bodyPr rtlCol="0" anchor="ctr"/>
-            <a:lstStyle/>
-            <a:p>
-              <a:pPr algn="ctr"/>
-              <a:r>
-                <a:rPr lang="en-US" altLang="zh-CN" sz="3200" b="1" dirty="0" smtClean="0">
-                  <a:ln w="10160">
-                    <a:solidFill>
-                      <a:schemeClr val="accent5"/>
-                    </a:solidFill>
-                    <a:prstDash val="solid"/>
-                  </a:ln>
-                  <a:solidFill>
-                    <a:srgbClr val="FFFFFF"/>
-                  </a:solidFill>
-                  <a:effectLst>
-                    <a:outerShdw blurRad="38100" dist="22860" dir="5400000" algn="tl" rotWithShape="0">
-                      <a:srgbClr val="000000">
-                        <a:alpha val="30000"/>
-                      </a:srgbClr>
-                    </a:outerShdw>
-                  </a:effectLst>
-                </a:rPr>
-                <a:t>Click</a:t>
-              </a:r>
-              <a:endParaRPr lang="zh-CN" altLang="en-US" sz="3200" dirty="0"/>
-            </a:p>
-          </p:txBody>
-        </p:sp>
-        <p:sp>
-          <p:nvSpPr>
-            <p:cNvPr id="25" name="Oval 24"/>
-            <p:cNvSpPr/>
-            <p:nvPr/>
-          </p:nvSpPr>
-          <p:spPr>
-            <a:xfrm>
-              <a:off x="2971800" y="4817982"/>
-              <a:ext cx="1066800" cy="897017"/>
-            </a:xfrm>
-            <a:prstGeom prst="ellipse">
-              <a:avLst/>
-            </a:prstGeom>
-            <a:solidFill>
-              <a:srgbClr val="FFC000"/>
-            </a:solidFill>
-          </p:spPr>
-          <p:style>
-            <a:lnRef idx="2">
-              <a:schemeClr val="accent1">
-                <a:shade val="50000"/>
-              </a:schemeClr>
-            </a:lnRef>
-            <a:fillRef idx="1">
-              <a:schemeClr val="accent1"/>
-            </a:fillRef>
-            <a:effectRef idx="0">
-              <a:schemeClr val="accent1"/>
-            </a:effectRef>
-            <a:fontRef idx="minor">
-              <a:schemeClr val="lt1"/>
-            </a:fontRef>
-          </p:style>
-          <p:txBody>
-            <a:bodyPr rtlCol="0" anchor="ctr"/>
-            <a:lstStyle/>
-            <a:p>
-              <a:pPr algn="ctr"/>
-              <a:r>
-                <a:rPr lang="en-US" altLang="zh-CN" sz="3200" b="1" dirty="0">
-                  <a:ln w="10160">
-                    <a:solidFill>
-                      <a:schemeClr val="accent5"/>
-                    </a:solidFill>
-                    <a:prstDash val="solid"/>
-                  </a:ln>
-                  <a:solidFill>
-                    <a:srgbClr val="FFFFFF"/>
-                  </a:solidFill>
-                  <a:effectLst>
-                    <a:outerShdw blurRad="38100" dist="22860" dir="5400000" algn="tl" rotWithShape="0">
-                      <a:srgbClr val="000000">
-                        <a:alpha val="30000"/>
-                      </a:srgbClr>
-                    </a:outerShdw>
-                  </a:effectLst>
-                </a:rPr>
-                <a:t>Me!</a:t>
-              </a:r>
-              <a:endParaRPr lang="zh-CN" altLang="en-US" sz="3200" dirty="0"/>
-            </a:p>
-          </p:txBody>
-        </p:sp>
-      </p:grpSp>
+          <a:custGeom>
+            <a:avLst/>
+            <a:gdLst/>
+            <a:ahLst/>
+            <a:cxnLst/>
+            <a:rect l="l" t="t" r="r" b="b"/>
+            <a:pathLst>
+              <a:path w="1066800" h="1165191">
+                <a:moveTo>
+                  <a:pt x="533400" y="582595"/>
+                </a:moveTo>
+                <a:lnTo>
+                  <a:pt x="533400" y="838200"/>
+                </a:lnTo>
+                <a:lnTo>
+                  <a:pt x="800100" y="838200"/>
+                </a:lnTo>
+                <a:lnTo>
+                  <a:pt x="800100" y="582595"/>
+                </a:lnTo>
+                <a:close/>
+                <a:moveTo>
+                  <a:pt x="533400" y="0"/>
+                </a:moveTo>
+                <a:lnTo>
+                  <a:pt x="1066800" y="533400"/>
+                </a:lnTo>
+                <a:lnTo>
+                  <a:pt x="952500" y="533400"/>
+                </a:lnTo>
+                <a:lnTo>
+                  <a:pt x="952500" y="1165191"/>
+                </a:lnTo>
+                <a:lnTo>
+                  <a:pt x="457200" y="1165191"/>
+                </a:lnTo>
+                <a:lnTo>
+                  <a:pt x="457200" y="582595"/>
+                </a:lnTo>
+                <a:lnTo>
+                  <a:pt x="190500" y="582595"/>
+                </a:lnTo>
+                <a:lnTo>
+                  <a:pt x="190500" y="1165191"/>
+                </a:lnTo>
+                <a:lnTo>
+                  <a:pt x="114300" y="1165191"/>
+                </a:lnTo>
+                <a:lnTo>
+                  <a:pt x="114300" y="533400"/>
+                </a:lnTo>
+                <a:lnTo>
+                  <a:pt x="0" y="533400"/>
+                </a:lnTo>
+                <a:close/>
+              </a:path>
+            </a:pathLst>
+          </a:custGeom>
+        </p:spPr>
+        <p:style>
+          <a:lnRef idx="0">
+            <a:schemeClr val="accent1"/>
+          </a:lnRef>
+          <a:fillRef idx="3">
+            <a:schemeClr val="accent1"/>
+          </a:fillRef>
+          <a:effectRef idx="3">
+            <a:schemeClr val="accent1"/>
+          </a:effectRef>
+          <a:fontRef idx="minor">
+            <a:schemeClr val="lt1"/>
+          </a:fontRef>
+        </p:style>
+        <p:txBody>
+          <a:bodyPr rtlCol="0" anchor="ctr"/>
+          <a:lstStyle/>
+          <a:p>
+            <a:pPr algn="ctr"/>
+            <a:endParaRPr lang="en-SG"/>
+          </a:p>
+        </p:txBody>
+      </p:sp>
       <p:pic>
         <p:nvPicPr>
-          <p:cNvPr id="26" name="[Picture 25]"/>
+          <p:cNvPr id="1027" name="Picture 3"/>
           <p:cNvPicPr>
-            <a:picLocks noChangeAspect="1"/>
+            <a:picLocks noChangeAspect="1" noChangeArrowheads="1"/>
           </p:cNvPicPr>
           <p:nvPr/>
         </p:nvPicPr>
         <p:blipFill>
-          <a:blip r:embed="rId5"/>
+          <a:blip r:embed="rId5">
+            <a:extLst>
+              <a:ext uri="{28A0092B-C50C-407E-A947-70E740481C1C}">
+                <a14:useLocalDpi xmlns:a14="http://schemas.microsoft.com/office/drawing/2010/main" val="0"/>
+              </a:ext>
+            </a:extLst>
+          </a:blip>
+          <a:srcRect/>
           <a:stretch>
             <a:fillRect/>
           </a:stretch>
         </p:blipFill>
-        <p:spPr>
+        <p:spPr bwMode="auto">
           <a:xfrm>
-            <a:off x="3962399" y="2891380"/>
-            <a:ext cx="4907639" cy="1766910"/>
+            <a:off x="3962737" y="2890597"/>
+            <a:ext cx="4906963" cy="1768476"/>
           </a:xfrm>
           <a:prstGeom prst="rect">
             <a:avLst/>
           </a:prstGeom>
+          <a:noFill/>
           <a:ln>
             <a:noFill/>
           </a:ln>
-          <a:effectLst>
-            <a:softEdge rad="112500"/>
-          </a:effectLst>
+          <a:effectLst/>
+          <a:extLst>
+            <a:ext uri="{909E8E84-426E-40DD-AFC4-6F175D3DCCD1}">
+              <a14:hiddenFill xmlns:a14="http://schemas.microsoft.com/office/drawing/2010/main">
+                <a:solidFill>
+                  <a:schemeClr val="accent1"/>
+                </a:solidFill>
+              </a14:hiddenFill>
+            </a:ext>
+            <a:ext uri="{91240B29-F687-4F45-9708-019B960494DF}">
+              <a14:hiddenLine xmlns:a14="http://schemas.microsoft.com/office/drawing/2010/main" w="9525">
+                <a:solidFill>
+                  <a:schemeClr val="tx1"/>
+                </a:solidFill>
+                <a:miter lim="800000"/>
+                <a:headEnd/>
+                <a:tailEnd/>
+              </a14:hiddenLine>
+            </a:ext>
+            <a:ext uri="{AF507438-7753-43E0-B8FC-AC1667EBCBE1}">
+              <a14:hiddenEffects xmlns:a14="http://schemas.microsoft.com/office/drawing/2010/main">
+                <a:effectLst>
+                  <a:outerShdw dist="35921" dir="2700000" algn="ctr" rotWithShape="0">
+                    <a:schemeClr val="bg2"/>
+                  </a:outerShdw>
+                </a:effectLst>
+              </a14:hiddenEffects>
+            </a:ext>
+          </a:extLst>
         </p:spPr>
       </p:pic>
     </p:spTree>
@@ -17636,8 +17649,8 @@
         </p:nvSpPr>
         <p:spPr>
           <a:xfrm>
-            <a:off x="457200" y="838200"/>
-            <a:ext cx="3505200" cy="1354217"/>
+            <a:off x="457200" y="611187"/>
+            <a:ext cx="3505200" cy="800219"/>
           </a:xfrm>
           <a:prstGeom prst="rect">
             <a:avLst/>
@@ -17668,41 +17681,41 @@
                   </a:schemeClr>
                 </a:solidFill>
               </a:rPr>
-              <a:t> After finishing name editing, press enter to confirm. Alternatively, you could click on any where else to confirm the change.</a:t>
+              <a:t> After </a:t>
+            </a:r>
+            <a:r>
+              <a:rPr lang="en-US" dirty="0" smtClean="0">
+                <a:solidFill>
+                  <a:schemeClr val="accent6">
+                    <a:lumMod val="75000"/>
+                  </a:schemeClr>
+                </a:solidFill>
+              </a:rPr>
+              <a:t>entering a name</a:t>
+            </a:r>
+            <a:r>
+              <a:rPr lang="en-US" dirty="0" smtClean="0">
+                <a:solidFill>
+                  <a:schemeClr val="accent6">
+                    <a:lumMod val="75000"/>
+                  </a:schemeClr>
+                </a:solidFill>
+              </a:rPr>
+              <a:t>, </a:t>
+            </a:r>
+            <a:r>
+              <a:rPr lang="en-US" dirty="0" smtClean="0">
+                <a:solidFill>
+                  <a:schemeClr val="accent6">
+                    <a:lumMod val="75000"/>
+                  </a:schemeClr>
+                </a:solidFill>
+              </a:rPr>
+              <a:t>press enter to confirm. </a:t>
             </a:r>
           </a:p>
         </p:txBody>
       </p:sp>
-      <p:pic>
-        <p:nvPicPr>
-          <p:cNvPr id="2" name="Picture 1"/>
-          <p:cNvPicPr>
-            <a:picLocks noChangeAspect="1"/>
-          </p:cNvPicPr>
-          <p:nvPr/>
-        </p:nvPicPr>
-        <p:blipFill>
-          <a:blip r:embed="rId3"/>
-          <a:stretch>
-            <a:fillRect/>
-          </a:stretch>
-        </p:blipFill>
-        <p:spPr>
-          <a:xfrm>
-            <a:off x="3962399" y="762000"/>
-            <a:ext cx="4907639" cy="1447800"/>
-          </a:xfrm>
-          <a:prstGeom prst="rect">
-            <a:avLst/>
-          </a:prstGeom>
-          <a:ln>
-            <a:noFill/>
-          </a:ln>
-          <a:effectLst>
-            <a:softEdge rad="112500"/>
-          </a:effectLst>
-        </p:spPr>
-      </p:pic>
       <p:sp>
         <p:nvSpPr>
           <p:cNvPr id="12" name="[TextBox 6]"/>
@@ -17711,8 +17724,8 @@
         </p:nvSpPr>
         <p:spPr>
           <a:xfrm>
-            <a:off x="449237" y="3128090"/>
-            <a:ext cx="3505201" cy="1631216"/>
+            <a:off x="449237" y="3354387"/>
+            <a:ext cx="3505201" cy="2462213"/>
           </a:xfrm>
           <a:prstGeom prst="rect">
             <a:avLst/>
@@ -17726,6 +17739,16 @@
           <a:lstStyle/>
           <a:p>
             <a:r>
+              <a:rPr lang="en-US" sz="2800" b="1" dirty="0">
+                <a:solidFill>
+                  <a:schemeClr val="accent6">
+                    <a:lumMod val="75000"/>
+                  </a:schemeClr>
+                </a:solidFill>
+              </a:rPr>
+              <a:t>5</a:t>
+            </a:r>
+            <a:r>
               <a:rPr lang="en-US" sz="2800" b="1" dirty="0" smtClean="0">
                 <a:solidFill>
                   <a:schemeClr val="accent6">
@@ -17733,7 +17756,7 @@
                   </a:schemeClr>
                 </a:solidFill>
               </a:rPr>
-              <a:t>4.</a:t>
+              <a:t>.</a:t>
             </a:r>
             <a:r>
               <a:rPr lang="en-US" dirty="0" smtClean="0">
@@ -17743,7 +17766,27 @@
                   </a:schemeClr>
                 </a:solidFill>
               </a:rPr>
-              <a:t> B</a:t>
+              <a:t>  </a:t>
+            </a:r>
+            <a:r>
+              <a:rPr lang="en-US" dirty="0" smtClean="0">
+                <a:solidFill>
+                  <a:schemeClr val="accent6">
+                    <a:lumMod val="75000"/>
+                  </a:schemeClr>
+                </a:solidFill>
+              </a:rPr>
+              <a:t>To delete or rename the saved shape, right-click and choose the appropriate action from the context menu</a:t>
+            </a:r>
+            <a:r>
+              <a:rPr lang="en-US" altLang="zh-CN" dirty="0">
+                <a:solidFill>
+                  <a:schemeClr val="accent6">
+                    <a:lumMod val="75000"/>
+                  </a:schemeClr>
+                </a:solidFill>
+              </a:rPr>
+              <a:t>. </a:t>
             </a:r>
             <a:r>
               <a:rPr lang="en-US" altLang="zh-CN" dirty="0" smtClean="0">
@@ -17753,7 +17796,26 @@
                   </a:schemeClr>
                 </a:solidFill>
               </a:rPr>
-              <a:t>y </a:t>
+              <a:t/>
+            </a:r>
+            <a:br>
+              <a:rPr lang="en-US" altLang="zh-CN" dirty="0" smtClean="0">
+                <a:solidFill>
+                  <a:schemeClr val="accent6">
+                    <a:lumMod val="75000"/>
+                  </a:schemeClr>
+                </a:solidFill>
+              </a:rPr>
+            </a:br>
+            <a:r>
+              <a:rPr lang="en-US" altLang="zh-CN" dirty="0" smtClean="0">
+                <a:solidFill>
+                  <a:schemeClr val="accent6">
+                    <a:lumMod val="75000"/>
+                  </a:schemeClr>
+                </a:solidFill>
+              </a:rPr>
+              <a:t>Right-click </a:t>
             </a:r>
             <a:r>
               <a:rPr lang="en-US" altLang="zh-CN" dirty="0">
@@ -17763,7 +17825,7 @@
                   </a:schemeClr>
                 </a:solidFill>
               </a:rPr>
-              <a:t>right clicking on the </a:t>
+              <a:t>an empty area of the Shapes </a:t>
             </a:r>
             <a:r>
               <a:rPr lang="en-US" altLang="zh-CN" dirty="0" smtClean="0">
@@ -17773,17 +17835,17 @@
                   </a:schemeClr>
                 </a:solidFill>
               </a:rPr>
-              <a:t>shape,</a:t>
-            </a:r>
-            <a:r>
-              <a:rPr lang="en-US" dirty="0" smtClean="0">
-                <a:solidFill>
-                  <a:schemeClr val="accent6">
-                    <a:lumMod val="75000"/>
-                  </a:schemeClr>
-                </a:solidFill>
-              </a:rPr>
-              <a:t> you can Add, Remove or Rename the shape. As a short cut to </a:t>
+              <a:t>Lab </a:t>
+            </a:r>
+            <a:r>
+              <a:rPr lang="en-US" altLang="zh-CN" dirty="0">
+                <a:solidFill>
+                  <a:schemeClr val="accent6">
+                    <a:lumMod val="75000"/>
+                  </a:schemeClr>
+                </a:solidFill>
+              </a:rPr>
+              <a:t>to change the </a:t>
             </a:r>
             <a:r>
               <a:rPr lang="en-US" altLang="zh-CN" dirty="0" smtClean="0">
@@ -17793,28 +17855,17 @@
                   </a:schemeClr>
                 </a:solidFill>
               </a:rPr>
-              <a:t>add a shape </a:t>
-            </a:r>
-            <a:r>
-              <a:rPr lang="en-US" altLang="zh-CN" dirty="0">
-                <a:solidFill>
-                  <a:schemeClr val="accent6">
-                    <a:lumMod val="75000"/>
-                  </a:schemeClr>
-                </a:solidFill>
-              </a:rPr>
-              <a:t>into the </a:t>
-            </a:r>
-            <a:r>
-              <a:rPr lang="en-US" altLang="zh-CN" dirty="0" smtClean="0">
-                <a:solidFill>
-                  <a:schemeClr val="accent6">
-                    <a:lumMod val="75000"/>
-                  </a:schemeClr>
-                </a:solidFill>
-              </a:rPr>
-              <a:t>slide, simply double click on the shape.</a:t>
-            </a:r>
+              <a:t>location where shapes are saved.</a:t>
+            </a:r>
+            <a:endParaRPr lang="en-US" dirty="0">
+              <a:solidFill>
+                <a:schemeClr val="accent6">
+                  <a:lumMod val="75000"/>
+                </a:schemeClr>
+              </a:solidFill>
+            </a:endParaRPr>
+          </a:p>
+          <a:p>
             <a:endParaRPr lang="en-US" dirty="0" smtClean="0">
               <a:solidFill>
                 <a:schemeClr val="accent6">
@@ -17825,6 +17876,206 @@
           </a:p>
         </p:txBody>
       </p:sp>
+      <p:pic>
+        <p:nvPicPr>
+          <p:cNvPr id="2051" name="Picture 3"/>
+          <p:cNvPicPr>
+            <a:picLocks noChangeAspect="1" noChangeArrowheads="1"/>
+          </p:cNvPicPr>
+          <p:nvPr/>
+        </p:nvPicPr>
+        <p:blipFill>
+          <a:blip r:embed="rId3">
+            <a:extLst>
+              <a:ext uri="{28A0092B-C50C-407E-A947-70E740481C1C}">
+                <a14:useLocalDpi xmlns:a14="http://schemas.microsoft.com/office/drawing/2010/main" val="0"/>
+              </a:ext>
+            </a:extLst>
+          </a:blip>
+          <a:srcRect/>
+          <a:stretch>
+            <a:fillRect/>
+          </a:stretch>
+        </p:blipFill>
+        <p:spPr bwMode="auto">
+          <a:xfrm>
+            <a:off x="3962737" y="533400"/>
+            <a:ext cx="4906963" cy="1450975"/>
+          </a:xfrm>
+          <a:prstGeom prst="rect">
+            <a:avLst/>
+          </a:prstGeom>
+          <a:noFill/>
+          <a:ln>
+            <a:noFill/>
+          </a:ln>
+          <a:effectLst/>
+          <a:extLst>
+            <a:ext uri="{909E8E84-426E-40DD-AFC4-6F175D3DCCD1}">
+              <a14:hiddenFill xmlns:a14="http://schemas.microsoft.com/office/drawing/2010/main">
+                <a:solidFill>
+                  <a:schemeClr val="accent1"/>
+                </a:solidFill>
+              </a14:hiddenFill>
+            </a:ext>
+            <a:ext uri="{91240B29-F687-4F45-9708-019B960494DF}">
+              <a14:hiddenLine xmlns:a14="http://schemas.microsoft.com/office/drawing/2010/main" w="9525">
+                <a:solidFill>
+                  <a:schemeClr val="tx1"/>
+                </a:solidFill>
+                <a:miter lim="800000"/>
+                <a:headEnd/>
+                <a:tailEnd/>
+              </a14:hiddenLine>
+            </a:ext>
+            <a:ext uri="{AF507438-7753-43E0-B8FC-AC1667EBCBE1}">
+              <a14:hiddenEffects xmlns:a14="http://schemas.microsoft.com/office/drawing/2010/main">
+                <a:effectLst>
+                  <a:outerShdw dist="35921" dir="2700000" algn="ctr" rotWithShape="0">
+                    <a:schemeClr val="bg2"/>
+                  </a:outerShdw>
+                </a:effectLst>
+              </a14:hiddenEffects>
+            </a:ext>
+          </a:extLst>
+        </p:spPr>
+      </p:pic>
+      <p:sp>
+        <p:nvSpPr>
+          <p:cNvPr id="13" name="[TextBox 6]"/>
+          <p:cNvSpPr txBox="1"/>
+          <p:nvPr/>
+        </p:nvSpPr>
+        <p:spPr>
+          <a:xfrm>
+            <a:off x="457200" y="2211387"/>
+            <a:ext cx="8412837" cy="800219"/>
+          </a:xfrm>
+          <a:prstGeom prst="rect">
+            <a:avLst/>
+          </a:prstGeom>
+          <a:noFill/>
+        </p:spPr>
+        <p:txBody>
+          <a:bodyPr wrap="square" rtlCol="0">
+            <a:spAutoFit/>
+          </a:bodyPr>
+          <a:lstStyle/>
+          <a:p>
+            <a:r>
+              <a:rPr lang="en-US" sz="2800" b="1" dirty="0" smtClean="0">
+                <a:solidFill>
+                  <a:schemeClr val="accent6">
+                    <a:lumMod val="75000"/>
+                  </a:schemeClr>
+                </a:solidFill>
+              </a:rPr>
+              <a:t>4.</a:t>
+            </a:r>
+            <a:r>
+              <a:rPr lang="en-US" dirty="0" smtClean="0">
+                <a:solidFill>
+                  <a:schemeClr val="accent6">
+                    <a:lumMod val="75000"/>
+                  </a:schemeClr>
+                </a:solidFill>
+              </a:rPr>
+              <a:t> </a:t>
+            </a:r>
+            <a:r>
+              <a:rPr lang="en-US" dirty="0" smtClean="0">
+                <a:solidFill>
+                  <a:schemeClr val="accent6">
+                    <a:lumMod val="75000"/>
+                  </a:schemeClr>
+                </a:solidFill>
+              </a:rPr>
+              <a:t>Doubl</a:t>
+            </a:r>
+            <a:r>
+              <a:rPr lang="en-US" dirty="0" smtClean="0">
+                <a:solidFill>
+                  <a:schemeClr val="accent6">
+                    <a:lumMod val="75000"/>
+                  </a:schemeClr>
+                </a:solidFill>
+              </a:rPr>
+              <a:t>e-click the ‘House’ shape in the Shapes Lab panel to add a copy of it to this slide.</a:t>
+            </a:r>
+            <a:endParaRPr lang="en-US" dirty="0" smtClean="0">
+              <a:solidFill>
+                <a:schemeClr val="accent6">
+                  <a:lumMod val="75000"/>
+                </a:schemeClr>
+              </a:solidFill>
+            </a:endParaRPr>
+          </a:p>
+        </p:txBody>
+      </p:sp>
+      <p:pic>
+        <p:nvPicPr>
+          <p:cNvPr id="15" name="Picture 3"/>
+          <p:cNvPicPr>
+            <a:picLocks noChangeAspect="1" noChangeArrowheads="1"/>
+          </p:cNvPicPr>
+          <p:nvPr/>
+        </p:nvPicPr>
+        <p:blipFill>
+          <a:blip r:embed="rId3">
+            <a:extLst>
+              <a:ext uri="{28A0092B-C50C-407E-A947-70E740481C1C}">
+                <a14:useLocalDpi xmlns:a14="http://schemas.microsoft.com/office/drawing/2010/main" val="0"/>
+              </a:ext>
+            </a:extLst>
+          </a:blip>
+          <a:srcRect/>
+          <a:stretch>
+            <a:fillRect/>
+          </a:stretch>
+        </p:blipFill>
+        <p:spPr bwMode="auto">
+          <a:xfrm>
+            <a:off x="3963074" y="3420741"/>
+            <a:ext cx="4906963" cy="1450975"/>
+          </a:xfrm>
+          <a:prstGeom prst="rect">
+            <a:avLst/>
+          </a:prstGeom>
+          <a:noFill/>
+          <a:ln>
+            <a:noFill/>
+          </a:ln>
+          <a:effectLst/>
+          <a:extLst>
+            <a:ext uri="{909E8E84-426E-40DD-AFC4-6F175D3DCCD1}">
+              <a14:hiddenFill xmlns:a14="http://schemas.microsoft.com/office/drawing/2010/main">
+                <a:solidFill>
+                  <a:schemeClr val="accent1"/>
+                </a:solidFill>
+              </a14:hiddenFill>
+            </a:ext>
+            <a:ext uri="{91240B29-F687-4F45-9708-019B960494DF}">
+              <a14:hiddenLine xmlns:a14="http://schemas.microsoft.com/office/drawing/2010/main" w="9525">
+                <a:solidFill>
+                  <a:schemeClr val="tx1"/>
+                </a:solidFill>
+                <a:miter lim="800000"/>
+                <a:headEnd/>
+                <a:tailEnd/>
+              </a14:hiddenLine>
+            </a:ext>
+            <a:ext uri="{AF507438-7753-43E0-B8FC-AC1667EBCBE1}">
+              <a14:hiddenEffects xmlns:a14="http://schemas.microsoft.com/office/drawing/2010/main">
+                <a:effectLst>
+                  <a:outerShdw dist="35921" dir="2700000" algn="ctr" rotWithShape="0">
+                    <a:schemeClr val="bg2"/>
+                  </a:outerShdw>
+                </a:effectLst>
+              </a14:hiddenEffects>
+            </a:ext>
+          </a:extLst>
+        </p:spPr>
+      </p:pic>
       <p:pic>
         <p:nvPicPr>
           <p:cNvPr id="6" name="Picture 5"/>
@@ -17833,16 +18084,15 @@
           </p:cNvPicPr>
           <p:nvPr/>
         </p:nvPicPr>
-        <p:blipFill>
+        <p:blipFill rotWithShape="1">
           <a:blip r:embed="rId4"/>
-          <a:stretch>
-            <a:fillRect/>
-          </a:stretch>
+          <a:srcRect l="18854" t="45493" r="40573" b="13465"/>
+          <a:stretch/>
         </p:blipFill>
         <p:spPr>
           <a:xfrm>
-            <a:off x="3962398" y="2930506"/>
-            <a:ext cx="4907639" cy="2174894"/>
+            <a:off x="4800600" y="4636086"/>
+            <a:ext cx="1991175" cy="892629"/>
           </a:xfrm>
           <a:prstGeom prst="rect">
             <a:avLst/>
@@ -17850,11 +18100,115 @@
           <a:ln>
             <a:noFill/>
           </a:ln>
-          <a:effectLst>
-            <a:softEdge rad="112500"/>
-          </a:effectLst>
+          <a:effectLst/>
         </p:spPr>
       </p:pic>
+      <p:pic>
+        <p:nvPicPr>
+          <p:cNvPr id="2052" name="Picture 4"/>
+          <p:cNvPicPr>
+            <a:picLocks noChangeAspect="1" noChangeArrowheads="1"/>
+          </p:cNvPicPr>
+          <p:nvPr/>
+        </p:nvPicPr>
+        <p:blipFill>
+          <a:blip r:embed="rId5">
+            <a:extLst>
+              <a:ext uri="{28A0092B-C50C-407E-A947-70E740481C1C}">
+                <a14:useLocalDpi xmlns:a14="http://schemas.microsoft.com/office/drawing/2010/main" val="0"/>
+              </a:ext>
+            </a:extLst>
+          </a:blip>
+          <a:srcRect/>
+          <a:stretch>
+            <a:fillRect/>
+          </a:stretch>
+        </p:blipFill>
+        <p:spPr bwMode="auto">
+          <a:xfrm>
+            <a:off x="7162800" y="4636085"/>
+            <a:ext cx="1531919" cy="522515"/>
+          </a:xfrm>
+          <a:prstGeom prst="rect">
+            <a:avLst/>
+          </a:prstGeom>
+          <a:noFill/>
+          <a:ln>
+            <a:noFill/>
+          </a:ln>
+          <a:extLst>
+            <a:ext uri="{909E8E84-426E-40DD-AFC4-6F175D3DCCD1}">
+              <a14:hiddenFill xmlns:a14="http://schemas.microsoft.com/office/drawing/2010/main">
+                <a:solidFill>
+                  <a:schemeClr val="accent1"/>
+                </a:solidFill>
+              </a14:hiddenFill>
+            </a:ext>
+            <a:ext uri="{91240B29-F687-4F45-9708-019B960494DF}">
+              <a14:hiddenLine xmlns:a14="http://schemas.microsoft.com/office/drawing/2010/main" w="9525">
+                <a:solidFill>
+                  <a:schemeClr val="tx1"/>
+                </a:solidFill>
+                <a:miter lim="800000"/>
+                <a:headEnd/>
+                <a:tailEnd/>
+              </a14:hiddenLine>
+            </a:ext>
+          </a:extLst>
+        </p:spPr>
+      </p:pic>
+      <p:sp>
+        <p:nvSpPr>
+          <p:cNvPr id="16" name="[TextBox 6]"/>
+          <p:cNvSpPr txBox="1"/>
+          <p:nvPr/>
+        </p:nvSpPr>
+        <p:spPr>
+          <a:xfrm>
+            <a:off x="457200" y="5912139"/>
+            <a:ext cx="8102931" cy="738664"/>
+          </a:xfrm>
+          <a:prstGeom prst="rect">
+            <a:avLst/>
+          </a:prstGeom>
+          <a:noFill/>
+        </p:spPr>
+        <p:txBody>
+          <a:bodyPr wrap="square" rtlCol="0">
+            <a:spAutoFit/>
+          </a:bodyPr>
+          <a:lstStyle/>
+          <a:p>
+            <a:r>
+              <a:rPr lang="en-US" altLang="zh-CN" sz="2400" b="1" dirty="0" smtClean="0">
+                <a:solidFill>
+                  <a:schemeClr val="accent6">
+                    <a:lumMod val="75000"/>
+                  </a:schemeClr>
+                </a:solidFill>
+              </a:rPr>
+              <a:t>Tip</a:t>
+            </a:r>
+            <a:r>
+              <a:rPr lang="en-US" altLang="zh-CN" dirty="0" smtClean="0">
+                <a:solidFill>
+                  <a:schemeClr val="accent6">
+                    <a:lumMod val="75000"/>
+                  </a:schemeClr>
+                </a:solidFill>
+              </a:rPr>
+              <a:t>: Save shapes in a shared folder (e.g. a Dropbox folder) to share saved shapes among multiple computers. </a:t>
+            </a:r>
+            <a:endParaRPr lang="en-US" dirty="0" smtClean="0">
+              <a:solidFill>
+                <a:schemeClr val="accent6">
+                  <a:lumMod val="75000"/>
+                </a:schemeClr>
+              </a:solidFill>
+            </a:endParaRPr>
+          </a:p>
+        </p:txBody>
+      </p:sp>
     </p:spTree>
     <p:extLst>
       <p:ext uri="{BB962C8B-B14F-4D97-AF65-F5344CB8AC3E}">
@@ -18832,7 +19186,7 @@
         </p:nvSpPr>
         <p:spPr>
           <a:xfrm>
-            <a:off x="685800" y="1044410"/>
+            <a:off x="685800" y="511010"/>
             <a:ext cx="5105400" cy="1354217"/>
           </a:xfrm>
           <a:prstGeom prst="rect">
@@ -18961,7 +19315,7 @@
         </p:blipFill>
         <p:spPr>
           <a:xfrm>
-            <a:off x="1959395" y="838200"/>
+            <a:off x="1959395" y="304800"/>
             <a:ext cx="622852" cy="914400"/>
           </a:xfrm>
           <a:prstGeom prst="rect">
@@ -18977,7 +19331,7 @@
         </p:nvSpPr>
         <p:spPr>
           <a:xfrm>
-            <a:off x="685800" y="2435733"/>
+            <a:off x="685800" y="1902333"/>
             <a:ext cx="4800600" cy="523220"/>
           </a:xfrm>
           <a:prstGeom prst="rect">
@@ -19009,7 +19363,17 @@
                   </a:schemeClr>
                 </a:solidFill>
               </a:rPr>
-              <a:t> Select the following shape:</a:t>
+              <a:t> Select the </a:t>
+            </a:r>
+            <a:r>
+              <a:rPr lang="en-US" dirty="0" smtClean="0">
+                <a:solidFill>
+                  <a:schemeClr val="accent6">
+                    <a:lumMod val="75000"/>
+                  </a:schemeClr>
+                </a:solidFill>
+              </a:rPr>
+              <a:t>shape below:</a:t>
             </a:r>
             <a:endParaRPr lang="en-SG" dirty="0">
               <a:solidFill>
@@ -19029,8 +19393,8 @@
         </p:nvSpPr>
         <p:spPr>
           <a:xfrm>
-            <a:off x="685800" y="4059294"/>
-            <a:ext cx="4953000" cy="2185214"/>
+            <a:off x="685800" y="3525894"/>
+            <a:ext cx="4953000" cy="1908215"/>
           </a:xfrm>
           <a:prstGeom prst="rect">
             <a:avLst/>
@@ -19061,7 +19425,7 @@
                   </a:schemeClr>
                 </a:solidFill>
               </a:rPr>
-              <a:t> Then you can </a:t>
+              <a:t> </a:t>
             </a:r>
             <a:r>
               <a:rPr lang="en-US" b="1" dirty="0" smtClean="0">
@@ -19071,7 +19435,17 @@
                   </a:schemeClr>
                 </a:solidFill>
               </a:rPr>
-              <a:t>drag</a:t>
+              <a:t>D</a:t>
+            </a:r>
+            <a:r>
+              <a:rPr lang="en-US" b="1" dirty="0" smtClean="0">
+                <a:solidFill>
+                  <a:schemeClr val="accent6">
+                    <a:lumMod val="75000"/>
+                  </a:schemeClr>
+                </a:solidFill>
+              </a:rPr>
+              <a:t>rag</a:t>
             </a:r>
             <a:r>
               <a:rPr lang="en-US" dirty="0" smtClean="0">
@@ -19081,7 +19455,37 @@
                   </a:schemeClr>
                 </a:solidFill>
               </a:rPr>
-              <a:t> or </a:t>
+              <a:t> the            </a:t>
+            </a:r>
+            <a:r>
+              <a:rPr lang="en-US" dirty="0" smtClean="0">
+                <a:solidFill>
+                  <a:schemeClr val="accent6">
+                    <a:lumMod val="75000"/>
+                  </a:schemeClr>
+                </a:solidFill>
+              </a:rPr>
+              <a:t>button </a:t>
+            </a:r>
+            <a:r>
+              <a:rPr lang="en-US" dirty="0" smtClean="0">
+                <a:solidFill>
+                  <a:schemeClr val="accent6">
+                    <a:lumMod val="75000"/>
+                  </a:schemeClr>
+                </a:solidFill>
+              </a:rPr>
+              <a:t>in the </a:t>
+            </a:r>
+            <a:r>
+              <a:rPr lang="en-US" dirty="0" smtClean="0">
+                <a:solidFill>
+                  <a:schemeClr val="accent6">
+                    <a:lumMod val="75000"/>
+                  </a:schemeClr>
+                </a:solidFill>
+              </a:rPr>
+              <a:t>panel to change the selected shape’s </a:t>
             </a:r>
             <a:r>
               <a:rPr lang="en-US" b="1" dirty="0" smtClean="0">
@@ -19091,7 +19495,17 @@
                   </a:schemeClr>
                 </a:solidFill>
               </a:rPr>
-              <a:t>click</a:t>
+              <a:t>FONT</a:t>
+            </a:r>
+            <a:r>
+              <a:rPr lang="en-US" dirty="0">
+                <a:solidFill>
+                  <a:schemeClr val="accent6">
+                    <a:lumMod val="75000"/>
+                  </a:schemeClr>
+                </a:solidFill>
+              </a:rPr>
+              <a:t> </a:t>
             </a:r>
             <a:r>
               <a:rPr lang="en-US" dirty="0" smtClean="0">
@@ -19101,20 +19515,9 @@
                   </a:schemeClr>
                 </a:solidFill>
               </a:rPr>
-              <a:t> this            button in </a:t>
-            </a:r>
-          </a:p>
-          <a:p>
-            <a:endParaRPr lang="en-US" dirty="0">
-              <a:solidFill>
-                <a:schemeClr val="accent6">
-                  <a:lumMod val="75000"/>
-                </a:schemeClr>
-              </a:solidFill>
-            </a:endParaRPr>
-          </a:p>
-          <a:p>
-            <a:r>
+              <a:t>color.</a:t>
+            </a:r>
+            <a:br>
               <a:rPr lang="en-US" dirty="0" smtClean="0">
                 <a:solidFill>
                   <a:schemeClr val="accent6">
@@ -19122,28 +19525,7 @@
                   </a:schemeClr>
                 </a:solidFill>
               </a:rPr>
-              <a:t>the panel to change the selected shape’s </a:t>
-            </a:r>
-            <a:r>
-              <a:rPr lang="en-US" b="1" dirty="0" smtClean="0">
-                <a:solidFill>
-                  <a:schemeClr val="accent6">
-                    <a:lumMod val="75000"/>
-                  </a:schemeClr>
-                </a:solidFill>
-              </a:rPr>
-              <a:t>FONT</a:t>
-            </a:r>
-            <a:r>
-              <a:rPr lang="en-US" dirty="0">
-                <a:solidFill>
-                  <a:schemeClr val="accent6">
-                    <a:lumMod val="75000"/>
-                  </a:schemeClr>
-                </a:solidFill>
-              </a:rPr>
-              <a:t> </a:t>
-            </a:r>
+            </a:br>
             <a:endParaRPr lang="en-US" dirty="0" smtClean="0">
               <a:solidFill>
                 <a:schemeClr val="accent6">
@@ -19153,75 +19535,83 @@
             </a:endParaRPr>
           </a:p>
           <a:p>
-            <a:endParaRPr lang="en-US" dirty="0">
+            <a:r>
+              <a:rPr lang="en-US" dirty="0" smtClean="0">
+                <a:solidFill>
+                  <a:schemeClr val="accent6">
+                    <a:lumMod val="75000"/>
+                  </a:schemeClr>
+                </a:solidFill>
+              </a:rPr>
+              <a:t>Drag this</a:t>
+            </a:r>
+            <a:r>
+              <a:rPr lang="en-SG" dirty="0" smtClean="0">
+                <a:solidFill>
+                  <a:schemeClr val="accent6">
+                    <a:lumMod val="75000"/>
+                  </a:schemeClr>
+                </a:solidFill>
+              </a:rPr>
+              <a:t>             </a:t>
+            </a:r>
+            <a:r>
+              <a:rPr lang="en-SG" dirty="0" smtClean="0">
+                <a:solidFill>
+                  <a:schemeClr val="accent6">
+                    <a:lumMod val="75000"/>
+                  </a:schemeClr>
+                </a:solidFill>
+              </a:rPr>
+              <a:t>button to change its </a:t>
+            </a:r>
+            <a:r>
+              <a:rPr lang="en-SG" b="1" dirty="0" smtClean="0">
+                <a:solidFill>
+                  <a:schemeClr val="accent6">
+                    <a:lumMod val="75000"/>
+                  </a:schemeClr>
+                </a:solidFill>
+              </a:rPr>
+              <a:t>LINE</a:t>
+            </a:r>
+            <a:r>
+              <a:rPr lang="en-SG" dirty="0">
+                <a:solidFill>
+                  <a:schemeClr val="accent6">
+                    <a:lumMod val="75000"/>
+                  </a:schemeClr>
+                </a:solidFill>
+              </a:rPr>
+              <a:t> </a:t>
+            </a:r>
+            <a:r>
+              <a:rPr lang="en-SG" dirty="0" err="1" smtClean="0">
+                <a:solidFill>
+                  <a:schemeClr val="accent6">
+                    <a:lumMod val="75000"/>
+                  </a:schemeClr>
+                </a:solidFill>
+              </a:rPr>
+              <a:t>color</a:t>
+            </a:r>
+            <a:r>
+              <a:rPr lang="en-SG" dirty="0">
+                <a:solidFill>
+                  <a:schemeClr val="accent6">
+                    <a:lumMod val="75000"/>
+                  </a:schemeClr>
+                </a:solidFill>
+              </a:rPr>
+              <a:t>.</a:t>
+            </a:r>
+            <a:endParaRPr lang="en-SG" dirty="0" smtClean="0">
               <a:solidFill>
                 <a:schemeClr val="accent6">
                   <a:lumMod val="75000"/>
                 </a:schemeClr>
               </a:solidFill>
             </a:endParaRPr>
-          </a:p>
-          <a:p>
-            <a:r>
-              <a:rPr lang="en-US" dirty="0" smtClean="0">
-                <a:solidFill>
-                  <a:schemeClr val="accent6">
-                    <a:lumMod val="75000"/>
-                  </a:schemeClr>
-                </a:solidFill>
-              </a:rPr>
-              <a:t>color, or this</a:t>
-            </a:r>
-            <a:r>
-              <a:rPr lang="en-SG" dirty="0" smtClean="0">
-                <a:solidFill>
-                  <a:schemeClr val="accent6">
-                    <a:lumMod val="75000"/>
-                  </a:schemeClr>
-                </a:solidFill>
-              </a:rPr>
-              <a:t>             button to change its </a:t>
-            </a:r>
-            <a:r>
-              <a:rPr lang="en-SG" b="1" dirty="0" smtClean="0">
-                <a:solidFill>
-                  <a:schemeClr val="accent6">
-                    <a:lumMod val="75000"/>
-                  </a:schemeClr>
-                </a:solidFill>
-              </a:rPr>
-              <a:t>LINE</a:t>
-            </a:r>
-            <a:r>
-              <a:rPr lang="en-SG" dirty="0">
-                <a:solidFill>
-                  <a:schemeClr val="accent6">
-                    <a:lumMod val="75000"/>
-                  </a:schemeClr>
-                </a:solidFill>
-              </a:rPr>
-              <a:t> </a:t>
-            </a:r>
-            <a:r>
-              <a:rPr lang="en-SG" dirty="0" err="1" smtClean="0">
-                <a:solidFill>
-                  <a:schemeClr val="accent6">
-                    <a:lumMod val="75000"/>
-                  </a:schemeClr>
-                </a:solidFill>
-              </a:rPr>
-              <a:t>color</a:t>
-            </a:r>
-            <a:r>
-              <a:rPr lang="en-SG" dirty="0" smtClean="0">
-                <a:solidFill>
-                  <a:schemeClr val="accent6">
-                    <a:lumMod val="75000"/>
-                  </a:schemeClr>
-                </a:solidFill>
-              </a:rPr>
-              <a:t>, </a:t>
-            </a:r>
           </a:p>
           <a:p>
             <a:endParaRPr lang="en-SG" dirty="0">
@@ -19241,7 +19631,27 @@
                   </a:schemeClr>
                 </a:solidFill>
               </a:rPr>
-              <a:t>or this            button to change its </a:t>
+              <a:t>or </a:t>
+            </a:r>
+            <a:r>
+              <a:rPr lang="en-SG" dirty="0" smtClean="0">
+                <a:solidFill>
+                  <a:schemeClr val="accent6">
+                    <a:lumMod val="75000"/>
+                  </a:schemeClr>
+                </a:solidFill>
+              </a:rPr>
+              <a:t>         button </a:t>
+            </a:r>
+            <a:r>
+              <a:rPr lang="en-SG" dirty="0" smtClean="0">
+                <a:solidFill>
+                  <a:schemeClr val="accent6">
+                    <a:lumMod val="75000"/>
+                  </a:schemeClr>
+                </a:solidFill>
+              </a:rPr>
+              <a:t>to change its </a:t>
             </a:r>
             <a:r>
               <a:rPr lang="en-SG" b="1" dirty="0" smtClean="0">
@@ -19301,7 +19711,7 @@
         </p:nvSpPr>
         <p:spPr>
           <a:xfrm>
-            <a:off x="1314450" y="3053602"/>
+            <a:off x="1314450" y="2520202"/>
             <a:ext cx="3516134" cy="803374"/>
           </a:xfrm>
           <a:prstGeom prst="roundRect">
@@ -19375,7 +19785,7 @@
         </p:blipFill>
         <p:spPr>
           <a:xfrm>
-            <a:off x="4000552" y="4153943"/>
+            <a:off x="1981200" y="3620171"/>
             <a:ext cx="419048" cy="428571"/>
           </a:xfrm>
           <a:prstGeom prst="rect">
@@ -19405,7 +19815,7 @@
         </p:blipFill>
         <p:spPr>
           <a:xfrm>
-            <a:off x="2040077" y="5272315"/>
+            <a:off x="1749871" y="4527173"/>
             <a:ext cx="419048" cy="428571"/>
           </a:xfrm>
           <a:prstGeom prst="rect">
@@ -19435,7 +19845,7 @@
         </p:blipFill>
         <p:spPr>
           <a:xfrm>
-            <a:off x="1447800" y="5815937"/>
+            <a:off x="1004252" y="5056075"/>
             <a:ext cx="419048" cy="428571"/>
           </a:xfrm>
           <a:prstGeom prst="rect">
@@ -19443,6 +19853,251 @@
           </a:prstGeom>
         </p:spPr>
       </p:pic>
+      <p:sp>
+        <p:nvSpPr>
+          <p:cNvPr id="13" name="[Picture 3]"/>
+          <p:cNvSpPr txBox="1"/>
+          <p:nvPr/>
+        </p:nvSpPr>
+        <p:spPr>
+          <a:xfrm>
+            <a:off x="762000" y="5903892"/>
+            <a:ext cx="4953000" cy="800219"/>
+          </a:xfrm>
+          <a:prstGeom prst="rect">
+            <a:avLst/>
+          </a:prstGeom>
+          <a:noFill/>
+        </p:spPr>
+        <p:txBody>
+          <a:bodyPr wrap="square" rtlCol="0">
+            <a:spAutoFit/>
+          </a:bodyPr>
+          <a:lstStyle/>
+          <a:p>
+            <a:r>
+              <a:rPr lang="en-US" sz="2800" b="1" dirty="0" smtClean="0">
+                <a:solidFill>
+                  <a:schemeClr val="accent6">
+                    <a:lumMod val="75000"/>
+                  </a:schemeClr>
+                </a:solidFill>
+              </a:rPr>
+              <a:t>3.</a:t>
+            </a:r>
+            <a:r>
+              <a:rPr lang="en-US" dirty="0" smtClean="0">
+                <a:solidFill>
+                  <a:schemeClr val="accent6">
+                    <a:lumMod val="75000"/>
+                  </a:schemeClr>
+                </a:solidFill>
+              </a:rPr>
+              <a:t> </a:t>
+            </a:r>
+            <a:r>
+              <a:rPr lang="en-US" b="1" dirty="0">
+                <a:solidFill>
+                  <a:schemeClr val="accent6">
+                    <a:lumMod val="75000"/>
+                  </a:schemeClr>
+                </a:solidFill>
+              </a:rPr>
+              <a:t>D</a:t>
+            </a:r>
+            <a:r>
+              <a:rPr lang="en-US" b="1" dirty="0" smtClean="0">
+                <a:solidFill>
+                  <a:schemeClr val="accent6">
+                    <a:lumMod val="75000"/>
+                  </a:schemeClr>
+                </a:solidFill>
+              </a:rPr>
+              <a:t>rag</a:t>
+            </a:r>
+            <a:r>
+              <a:rPr lang="en-US" dirty="0" smtClean="0">
+                <a:solidFill>
+                  <a:schemeClr val="accent6">
+                    <a:lumMod val="75000"/>
+                  </a:schemeClr>
+                </a:solidFill>
+              </a:rPr>
+              <a:t> the            button  to change the main color of the panel</a:t>
+            </a:r>
+            <a:r>
+              <a:rPr lang="en-SG" dirty="0" smtClean="0">
+                <a:solidFill>
+                  <a:schemeClr val="accent6">
+                    <a:lumMod val="75000"/>
+                  </a:schemeClr>
+                </a:solidFill>
+              </a:rPr>
+              <a:t>.</a:t>
+            </a:r>
+            <a:endParaRPr lang="en-SG" dirty="0">
+              <a:solidFill>
+                <a:schemeClr val="accent6">
+                  <a:lumMod val="75000"/>
+                </a:schemeClr>
+              </a:solidFill>
+            </a:endParaRPr>
+          </a:p>
+        </p:txBody>
+      </p:sp>
+      <p:pic>
+        <p:nvPicPr>
+          <p:cNvPr id="3074" name="Picture 2"/>
+          <p:cNvPicPr>
+            <a:picLocks noChangeAspect="1" noChangeArrowheads="1"/>
+          </p:cNvPicPr>
+          <p:nvPr/>
+        </p:nvPicPr>
+        <p:blipFill>
+          <a:blip r:embed="rId7">
+            <a:extLst>
+              <a:ext uri="{28A0092B-C50C-407E-A947-70E740481C1C}">
+                <a14:useLocalDpi xmlns:a14="http://schemas.microsoft.com/office/drawing/2010/main" val="0"/>
+              </a:ext>
+            </a:extLst>
+          </a:blip>
+          <a:srcRect/>
+          <a:stretch>
+            <a:fillRect/>
+          </a:stretch>
+        </p:blipFill>
+        <p:spPr bwMode="auto">
+          <a:xfrm>
+            <a:off x="2027933" y="5903892"/>
+            <a:ext cx="485775" cy="485775"/>
+          </a:xfrm>
+          <a:prstGeom prst="rect">
+            <a:avLst/>
+          </a:prstGeom>
+          <a:noFill/>
+          <a:ln>
+            <a:noFill/>
+          </a:ln>
+          <a:extLst>
+            <a:ext uri="{909E8E84-426E-40DD-AFC4-6F175D3DCCD1}">
+              <a14:hiddenFill xmlns:a14="http://schemas.microsoft.com/office/drawing/2010/main">
+                <a:solidFill>
+                  <a:schemeClr val="accent1"/>
+                </a:solidFill>
+              </a14:hiddenFill>
+            </a:ext>
+            <a:ext uri="{91240B29-F687-4F45-9708-019B960494DF}">
+              <a14:hiddenLine xmlns:a14="http://schemas.microsoft.com/office/drawing/2010/main" w="9525">
+                <a:solidFill>
+                  <a:schemeClr val="tx1"/>
+                </a:solidFill>
+                <a:miter lim="800000"/>
+                <a:headEnd/>
+                <a:tailEnd/>
+              </a14:hiddenLine>
+            </a:ext>
+          </a:extLst>
+        </p:spPr>
+      </p:pic>
+      <p:sp>
+        <p:nvSpPr>
+          <p:cNvPr id="5" name="Freeform 4"/>
+          <p:cNvSpPr/>
+          <p:nvPr/>
+        </p:nvSpPr>
+        <p:spPr>
+          <a:xfrm>
+            <a:off x="2590800" y="1513114"/>
+            <a:ext cx="3298371" cy="4506686"/>
+          </a:xfrm>
+          <a:custGeom>
+            <a:avLst/>
+            <a:gdLst>
+              <a:gd name="connsiteX0" fmla="*/ 0 w 3298371"/>
+              <a:gd name="connsiteY0" fmla="*/ 4430486 h 4449153"/>
+              <a:gd name="connsiteX1" fmla="*/ 2710543 w 3298371"/>
+              <a:gd name="connsiteY1" fmla="*/ 3951515 h 4449153"/>
+              <a:gd name="connsiteX2" fmla="*/ 2688771 w 3298371"/>
+              <a:gd name="connsiteY2" fmla="*/ 1110343 h 4449153"/>
+              <a:gd name="connsiteX3" fmla="*/ 3298371 w 3298371"/>
+              <a:gd name="connsiteY3" fmla="*/ 0 h 4449153"/>
+            </a:gdLst>
+            <a:ahLst/>
+            <a:cxnLst>
+              <a:cxn ang="0">
+                <a:pos x="connsiteX0" y="connsiteY0"/>
+              </a:cxn>
+              <a:cxn ang="0">
+                <a:pos x="connsiteX1" y="connsiteY1"/>
+              </a:cxn>
+              <a:cxn ang="0">
+                <a:pos x="connsiteX2" y="connsiteY2"/>
+              </a:cxn>
+              <a:cxn ang="0">
+                <a:pos x="connsiteX3" y="connsiteY3"/>
+              </a:cxn>
+            </a:cxnLst>
+            <a:rect l="l" t="t" r="r" b="b"/>
+            <a:pathLst>
+              <a:path w="3298371" h="4449153">
+                <a:moveTo>
+                  <a:pt x="0" y="4430486"/>
+                </a:moveTo>
+                <a:cubicBezTo>
+                  <a:pt x="1131207" y="4467679"/>
+                  <a:pt x="2262415" y="4504872"/>
+                  <a:pt x="2710543" y="3951515"/>
+                </a:cubicBezTo>
+                <a:cubicBezTo>
+                  <a:pt x="3158671" y="3398158"/>
+                  <a:pt x="2590800" y="1768929"/>
+                  <a:pt x="2688771" y="1110343"/>
+                </a:cubicBezTo>
+                <a:cubicBezTo>
+                  <a:pt x="2786742" y="451757"/>
+                  <a:pt x="3042556" y="225878"/>
+                  <a:pt x="3298371" y="0"/>
+                </a:cubicBezTo>
+              </a:path>
+            </a:pathLst>
+          </a:custGeom>
+          <a:noFill/>
+          <a:ln w="28575">
+            <a:solidFill>
+              <a:schemeClr val="accent6">
+                <a:lumMod val="20000"/>
+                <a:lumOff val="80000"/>
+              </a:schemeClr>
+            </a:solidFill>
+            <a:headEnd type="none" w="med" len="med"/>
+            <a:tailEnd type="triangle" w="med" len="med"/>
+          </a:ln>
+        </p:spPr>
+        <p:style>
+          <a:lnRef idx="2">
+            <a:schemeClr val="accent1">
+              <a:shade val="50000"/>
+            </a:schemeClr>
+          </a:lnRef>
+          <a:fillRef idx="1">
+            <a:schemeClr val="accent1"/>
+          </a:fillRef>
+          <a:effectRef idx="0">
+            <a:schemeClr val="accent1"/>
+          </a:effectRef>
+          <a:fontRef idx="minor">
+            <a:schemeClr val="lt1"/>
+          </a:fontRef>
+        </p:style>
+        <p:txBody>
+          <a:bodyPr rtlCol="0" anchor="ctr"/>
+          <a:lstStyle/>
+          <a:p>
+            <a:pPr algn="ctr"/>
+            <a:endParaRPr lang="en-SG"/>
+          </a:p>
+        </p:txBody>
+      </p:sp>
     </p:spTree>
     <p:extLst>
       <p:ext uri="{BB962C8B-B14F-4D97-AF65-F5344CB8AC3E}">
@@ -19623,6 +20278,59 @@
                       </p:childTnLst>
                     </p:cTn>
                   </p:par>
+                  <p:par>
+                    <p:cTn id="18" fill="hold">
+                      <p:stCondLst>
+                        <p:cond delay="indefinite"/>
+                      </p:stCondLst>
+                      <p:childTnLst>
+                        <p:par>
+                          <p:cTn id="19" fill="hold">
+                            <p:stCondLst>
+                              <p:cond delay="0"/>
+                            </p:stCondLst>
+                            <p:childTnLst>
+                              <p:par>
+                                <p:cTn id="20" presetID="10" presetClass="entr" presetSubtype="0" fill="hold" grpId="0" nodeType="clickEffect">
+                                  <p:stCondLst>
+                                    <p:cond delay="0"/>
+                                  </p:stCondLst>
+                                  <p:childTnLst>
+                                    <p:set>
+                                      <p:cBhvr>
+                                        <p:cTn id="21" dur="1" fill="hold">
+                                          <p:stCondLst>
+                                            <p:cond delay="0"/>
+                                          </p:stCondLst>
+                                        </p:cTn>
+                                        <p:tgtEl>
+                                          <p:spTgt spid="13"/>
+                                        </p:tgtEl>
+                                        <p:attrNameLst>
+                                          <p:attrName>style.visibility</p:attrName>
+                                        </p:attrNameLst>
+                                      </p:cBhvr>
+                                      <p:to>
+                                        <p:strVal val="visible"/>
+                                      </p:to>
+                                    </p:set>
+                                    <p:animEffect transition="in" filter="fade">
+                                      <p:cBhvr>
+                                        <p:cTn id="22" dur="500"/>
+                                        <p:tgtEl>
+                                          <p:spTgt spid="13"/>
+                                        </p:tgtEl>
+                                      </p:cBhvr>
+                                    </p:animEffect>
+                                  </p:childTnLst>
+                                </p:cTn>
+                              </p:par>
+                            </p:childTnLst>
+                          </p:cTn>
+                        </p:par>
+                      </p:childTnLst>
+                    </p:cTn>
+                  </p:par>
                 </p:childTnLst>
               </p:cTn>
               <p:prevCondLst>
@@ -19648,6 +20356,7 @@
       <p:bldP spid="7" grpId="0"/>
       <p:bldP spid="9" grpId="0"/>
       <p:bldP spid="11" grpId="0"/>
+      <p:bldP spid="13" grpId="0"/>
     </p:bldLst>
   </p:timing>
 </p:sld>
@@ -19679,7 +20388,7 @@
         <p:spPr>
           <a:xfrm>
             <a:off x="609600" y="1447800"/>
-            <a:ext cx="8001000" cy="2831544"/>
+            <a:ext cx="8001000" cy="3046988"/>
           </a:xfrm>
           <a:prstGeom prst="rect">
             <a:avLst/>
@@ -19717,16 +20426,6 @@
           <a:p>
             <a:pPr algn="ctr"/>
             <a:r>
-              <a:rPr lang="en-US" smtClean="0">
-                <a:solidFill>
-                  <a:schemeClr val="accent6">
-                    <a:lumMod val="75000"/>
-                  </a:schemeClr>
-                </a:solidFill>
-              </a:rPr>
-              <a:t>For </a:t>
-            </a:r>
-            <a:r>
               <a:rPr lang="en-US" dirty="0" smtClean="0">
                 <a:solidFill>
                   <a:schemeClr val="accent6">
@@ -19734,7 +20433,46 @@
                   </a:schemeClr>
                 </a:solidFill>
               </a:rPr>
-              <a:t>find more information about these features (and how to tackle common issues), visit the </a:t>
+              <a:t>For find more information about these </a:t>
+            </a:r>
+            <a:r>
+              <a:rPr lang="en-US" dirty="0" smtClean="0">
+                <a:solidFill>
+                  <a:schemeClr val="accent6">
+                    <a:lumMod val="75000"/>
+                  </a:schemeClr>
+                </a:solidFill>
+              </a:rPr>
+              <a:t>features, </a:t>
+            </a:r>
+            <a:br>
+              <a:rPr lang="en-US" dirty="0" smtClean="0">
+                <a:solidFill>
+                  <a:schemeClr val="accent6">
+                    <a:lumMod val="75000"/>
+                  </a:schemeClr>
+                </a:solidFill>
+              </a:rPr>
+            </a:br>
+            <a:r>
+              <a:rPr lang="en-US" dirty="0" smtClean="0">
+                <a:solidFill>
+                  <a:schemeClr val="accent6">
+                    <a:lumMod val="75000"/>
+                  </a:schemeClr>
+                </a:solidFill>
+              </a:rPr>
+              <a:t>visit </a:t>
+            </a:r>
+            <a:r>
+              <a:rPr lang="en-US" dirty="0" smtClean="0">
+                <a:solidFill>
+                  <a:schemeClr val="accent6">
+                    <a:lumMod val="75000"/>
+                  </a:schemeClr>
+                </a:solidFill>
+              </a:rPr>
+              <a:t>the </a:t>
             </a:r>
             <a:r>
               <a:rPr lang="en-US" dirty="0" smtClean="0">
@@ -19778,7 +20516,17 @@
                   </a:schemeClr>
                 </a:solidFill>
               </a:rPr>
-              <a:t>We’d love to hear your feedback. </a:t>
+              <a:t>To give feedback or ask a question, </a:t>
+            </a:r>
+            <a:r>
+              <a:rPr lang="en-US" dirty="0" smtClean="0">
+                <a:solidFill>
+                  <a:schemeClr val="accent6">
+                    <a:lumMod val="75000"/>
+                  </a:schemeClr>
+                </a:solidFill>
+              </a:rPr>
+              <a:t/>
             </a:r>
             <a:br>
               <a:rPr lang="en-US" dirty="0" smtClean="0">
@@ -19797,7 +20545,7 @@
                   </a:schemeClr>
                 </a:solidFill>
               </a:rPr>
-              <a:t>Contact us at </a:t>
+              <a:t>contact </a:t>
             </a:r>
             <a:r>
               <a:rPr lang="en-US" dirty="0" smtClean="0">
@@ -19806,6 +20554,16 @@
                     <a:lumMod val="75000"/>
                   </a:schemeClr>
                 </a:solidFill>
+              </a:rPr>
+              <a:t>us at </a:t>
+            </a:r>
+            <a:r>
+              <a:rPr lang="en-US" dirty="0" smtClean="0">
+                <a:solidFill>
+                  <a:schemeClr val="accent6">
+                    <a:lumMod val="75000"/>
+                  </a:schemeClr>
+                </a:solidFill>
                 <a:hlinkClick r:id="rId3"/>
               </a:rPr>
               <a:t>pptlabs@comp.nus.edu.sg</a:t>
@@ -19820,6 +20578,16 @@
               </a:rPr>
               <a:t> </a:t>
             </a:r>
+          </a:p>
+          <a:p>
+            <a:pPr algn="ctr"/>
+            <a:endParaRPr lang="en-US" dirty="0" smtClean="0">
+              <a:solidFill>
+                <a:schemeClr val="accent6">
+                  <a:lumMod val="75000"/>
+                </a:schemeClr>
+              </a:solidFill>
+            </a:endParaRPr>
           </a:p>
           <a:p>
             <a:pPr algn="ctr"/>
@@ -20169,17 +20937,7 @@
                   </a:schemeClr>
                 </a:solidFill>
               </a:rPr>
-              <a:t>You can move the mouse pointer onto the gray buttons and follow the instructions given in their tooltips to activate the </a:t>
-            </a:r>
-            <a:r>
-              <a:rPr lang="en-US" dirty="0" smtClean="0">
-                <a:solidFill>
-                  <a:schemeClr val="accent6">
-                    <a:lumMod val="75000"/>
-                  </a:schemeClr>
-                </a:solidFill>
-              </a:rPr>
-              <a:t>features</a:t>
+              <a:t>You can move the mouse pointer onto the gray buttons and follow the instructions given in their tooltips to activate the features</a:t>
             </a:r>
             <a:r>
               <a:rPr lang="en-US" dirty="0">

</xml_diff>

<commit_message>
Update icons and phrasing of tutorial slides.
In particular, the Highlight Points section was changed - it previously
referred to Highlight Text instead.
</commit_message>
<xml_diff>
--- a/doc/PowerPointLabs Quick Tutorial.pptx
+++ b/doc/PowerPointLabs Quick Tutorial.pptx
@@ -444,7 +444,7 @@
           <a:p>
             <a:fld id="{3E86CC0F-BBF3-4E07-94E0-0549B7D560A9}" type="datetimeFigureOut">
               <a:rPr lang="en-SG" smtClean="0"/>
-              <a:t>10/9/2014</a:t>
+              <a:t>1/1/2015</a:t>
             </a:fld>
             <a:endParaRPr lang="en-SG"/>
           </a:p>
@@ -1583,7 +1583,7 @@
             <a:fld id="{1D8BD707-D9CF-40AE-B4C6-C98DA3205C09}" type="datetimeFigureOut">
               <a:rPr lang="en-US" smtClean="0"/>
               <a:pPr/>
-              <a:t>9/10/2014</a:t>
+              <a:t>1/1/2015</a:t>
             </a:fld>
             <a:endParaRPr lang="en-US"/>
           </a:p>
@@ -1750,7 +1750,7 @@
             <a:fld id="{1D8BD707-D9CF-40AE-B4C6-C98DA3205C09}" type="datetimeFigureOut">
               <a:rPr lang="en-US" smtClean="0"/>
               <a:pPr/>
-              <a:t>9/10/2014</a:t>
+              <a:t>1/1/2015</a:t>
             </a:fld>
             <a:endParaRPr lang="en-US"/>
           </a:p>
@@ -1927,7 +1927,7 @@
             <a:fld id="{1D8BD707-D9CF-40AE-B4C6-C98DA3205C09}" type="datetimeFigureOut">
               <a:rPr lang="en-US" smtClean="0"/>
               <a:pPr/>
-              <a:t>9/10/2014</a:t>
+              <a:t>1/1/2015</a:t>
             </a:fld>
             <a:endParaRPr lang="en-US"/>
           </a:p>
@@ -2094,7 +2094,7 @@
             <a:fld id="{1D8BD707-D9CF-40AE-B4C6-C98DA3205C09}" type="datetimeFigureOut">
               <a:rPr lang="en-US" smtClean="0"/>
               <a:pPr/>
-              <a:t>9/10/2014</a:t>
+              <a:t>1/1/2015</a:t>
             </a:fld>
             <a:endParaRPr lang="en-US"/>
           </a:p>
@@ -2337,7 +2337,7 @@
             <a:fld id="{1D8BD707-D9CF-40AE-B4C6-C98DA3205C09}" type="datetimeFigureOut">
               <a:rPr lang="en-US" smtClean="0"/>
               <a:pPr/>
-              <a:t>9/10/2014</a:t>
+              <a:t>1/1/2015</a:t>
             </a:fld>
             <a:endParaRPr lang="en-US"/>
           </a:p>
@@ -2622,7 +2622,7 @@
             <a:fld id="{1D8BD707-D9CF-40AE-B4C6-C98DA3205C09}" type="datetimeFigureOut">
               <a:rPr lang="en-US" smtClean="0"/>
               <a:pPr/>
-              <a:t>9/10/2014</a:t>
+              <a:t>1/1/2015</a:t>
             </a:fld>
             <a:endParaRPr lang="en-US"/>
           </a:p>
@@ -3041,7 +3041,7 @@
             <a:fld id="{1D8BD707-D9CF-40AE-B4C6-C98DA3205C09}" type="datetimeFigureOut">
               <a:rPr lang="en-US" smtClean="0"/>
               <a:pPr/>
-              <a:t>9/10/2014</a:t>
+              <a:t>1/1/2015</a:t>
             </a:fld>
             <a:endParaRPr lang="en-US"/>
           </a:p>
@@ -3156,7 +3156,7 @@
             <a:fld id="{1D8BD707-D9CF-40AE-B4C6-C98DA3205C09}" type="datetimeFigureOut">
               <a:rPr lang="en-US" smtClean="0"/>
               <a:pPr/>
-              <a:t>9/10/2014</a:t>
+              <a:t>1/1/2015</a:t>
             </a:fld>
             <a:endParaRPr lang="en-US"/>
           </a:p>
@@ -3248,7 +3248,7 @@
             <a:fld id="{1D8BD707-D9CF-40AE-B4C6-C98DA3205C09}" type="datetimeFigureOut">
               <a:rPr lang="en-US" smtClean="0"/>
               <a:pPr/>
-              <a:t>9/10/2014</a:t>
+              <a:t>1/1/2015</a:t>
             </a:fld>
             <a:endParaRPr lang="en-US"/>
           </a:p>
@@ -3522,7 +3522,7 @@
             <a:fld id="{1D8BD707-D9CF-40AE-B4C6-C98DA3205C09}" type="datetimeFigureOut">
               <a:rPr lang="en-US" smtClean="0"/>
               <a:pPr/>
-              <a:t>9/10/2014</a:t>
+              <a:t>1/1/2015</a:t>
             </a:fld>
             <a:endParaRPr lang="en-US"/>
           </a:p>
@@ -3772,7 +3772,7 @@
             <a:fld id="{1D8BD707-D9CF-40AE-B4C6-C98DA3205C09}" type="datetimeFigureOut">
               <a:rPr lang="en-US" smtClean="0"/>
               <a:pPr/>
-              <a:t>9/10/2014</a:t>
+              <a:t>1/1/2015</a:t>
             </a:fld>
             <a:endParaRPr lang="en-US"/>
           </a:p>
@@ -3982,7 +3982,7 @@
             <a:fld id="{1D8BD707-D9CF-40AE-B4C6-C98DA3205C09}" type="datetimeFigureOut">
               <a:rPr lang="en-US" smtClean="0"/>
               <a:pPr/>
-              <a:t>9/10/2014</a:t>
+              <a:t>1/1/2015</a:t>
             </a:fld>
             <a:endParaRPr lang="en-US"/>
           </a:p>
@@ -4525,6 +4525,37 @@
           <a:chExt cx="0" cy="0"/>
         </a:xfrm>
       </p:grpSpPr>
+      <p:pic>
+        <p:nvPicPr>
+          <p:cNvPr id="5" name="Picture 4"/>
+          <p:cNvPicPr>
+            <a:picLocks noChangeAspect="1"/>
+          </p:cNvPicPr>
+          <p:nvPr/>
+        </p:nvPicPr>
+        <p:blipFill>
+          <a:blip r:embed="rId2"/>
+          <a:stretch>
+            <a:fillRect/>
+          </a:stretch>
+        </p:blipFill>
+        <p:spPr>
+          <a:xfrm>
+            <a:off x="1090999" y="4239950"/>
+            <a:ext cx="1021603" cy="1294991"/>
+          </a:xfrm>
+          <a:prstGeom prst="rect">
+            <a:avLst/>
+          </a:prstGeom>
+          <a:effectLst>
+            <a:outerShdw blurRad="63500" sx="102000" sy="102000" algn="ctr" rotWithShape="0">
+              <a:prstClr val="black">
+                <a:alpha val="40000"/>
+              </a:prstClr>
+            </a:outerShdw>
+          </a:effectLst>
+        </p:spPr>
+      </p:pic>
       <p:sp>
         <p:nvSpPr>
           <p:cNvPr id="31" name="TextBox 30"/>
@@ -4606,7 +4637,7 @@
           <p:nvPr/>
         </p:nvPicPr>
         <p:blipFill>
-          <a:blip r:embed="rId2">
+          <a:blip r:embed="rId3">
             <a:extLst>
               <a:ext uri="{28A0092B-C50C-407E-A947-70E740481C1C}">
                 <a14:useLocalDpi xmlns:a14="http://schemas.microsoft.com/office/drawing/2010/main" val="0"/>
@@ -4718,7 +4749,7 @@
         <p:spPr>
           <a:xfrm>
             <a:off x="5257800" y="5849171"/>
-            <a:ext cx="2226136" cy="738664"/>
+            <a:ext cx="2226136" cy="892552"/>
           </a:xfrm>
           <a:prstGeom prst="rect">
             <a:avLst/>
@@ -4732,7 +4763,7 @@
           <a:lstStyle/>
           <a:p>
             <a:r>
-              <a:rPr lang="en-US" sz="2400" b="1" dirty="0" smtClean="0">
+              <a:rPr lang="en-US" b="1" dirty="0" smtClean="0">
                 <a:solidFill>
                   <a:schemeClr val="accent6">
                     <a:lumMod val="75000"/>
@@ -4752,14 +4783,14 @@
               <a:t> </a:t>
             </a:r>
             <a:r>
-              <a:rPr lang="en-US" dirty="0" smtClean="0">
-                <a:solidFill>
-                  <a:schemeClr val="accent6">
-                    <a:lumMod val="75000"/>
-                  </a:schemeClr>
-                </a:solidFill>
-              </a:rPr>
-              <a:t>Select the shadow-like shape.</a:t>
+              <a:rPr lang="en-US" sz="1600" dirty="0" smtClean="0">
+                <a:solidFill>
+                  <a:schemeClr val="accent6">
+                    <a:lumMod val="75000"/>
+                  </a:schemeClr>
+                </a:solidFill>
+              </a:rPr>
+              <a:t>On the original slide, select the transparent spotlight shape.</a:t>
             </a:r>
             <a:endParaRPr lang="en-SG" dirty="0">
               <a:solidFill>
@@ -4852,60 +4883,6 @@
           </a:p>
         </p:txBody>
       </p:sp>
-      <p:pic>
-        <p:nvPicPr>
-          <p:cNvPr id="10244" name="Picture 4"/>
-          <p:cNvPicPr>
-            <a:picLocks noChangeAspect="1" noChangeArrowheads="1"/>
-          </p:cNvPicPr>
-          <p:nvPr/>
-        </p:nvPicPr>
-        <p:blipFill>
-          <a:blip r:embed="rId3">
-            <a:extLst>
-              <a:ext uri="{28A0092B-C50C-407E-A947-70E740481C1C}">
-                <a14:useLocalDpi xmlns:a14="http://schemas.microsoft.com/office/drawing/2010/main" val="0"/>
-              </a:ext>
-            </a:extLst>
-          </a:blip>
-          <a:srcRect/>
-          <a:stretch>
-            <a:fillRect/>
-          </a:stretch>
-        </p:blipFill>
-        <p:spPr bwMode="auto">
-          <a:xfrm>
-            <a:off x="7848600" y="4419599"/>
-            <a:ext cx="838200" cy="1167493"/>
-          </a:xfrm>
-          <a:prstGeom prst="rect">
-            <a:avLst/>
-          </a:prstGeom>
-          <a:noFill/>
-          <a:ln>
-            <a:noFill/>
-          </a:ln>
-          <a:extLst>
-            <a:ext uri="{909E8E84-426E-40DD-AFC4-6F175D3DCCD1}">
-              <a14:hiddenFill xmlns:a14="http://schemas.microsoft.com/office/drawing/2010/main">
-                <a:solidFill>
-                  <a:schemeClr val="accent1"/>
-                </a:solidFill>
-              </a14:hiddenFill>
-            </a:ext>
-            <a:ext uri="{91240B29-F687-4F45-9708-019B960494DF}">
-              <a14:hiddenLine xmlns:a14="http://schemas.microsoft.com/office/drawing/2010/main" w="9525">
-                <a:solidFill>
-                  <a:schemeClr val="tx1"/>
-                </a:solidFill>
-                <a:miter lim="800000"/>
-                <a:headEnd/>
-                <a:tailEnd/>
-              </a14:hiddenLine>
-            </a:ext>
-          </a:extLst>
-        </p:spPr>
-      </p:pic>
       <p:sp>
         <p:nvSpPr>
           <p:cNvPr id="24" name="TextBox 23"/>
@@ -4914,8 +4891,8 @@
         </p:nvSpPr>
         <p:spPr>
           <a:xfrm>
-            <a:off x="7756064" y="5849171"/>
-            <a:ext cx="1311736" cy="738664"/>
+            <a:off x="7543799" y="5889248"/>
+            <a:ext cx="1524000" cy="892552"/>
           </a:xfrm>
           <a:prstGeom prst="rect">
             <a:avLst/>
@@ -4929,7 +4906,7 @@
           <a:lstStyle/>
           <a:p>
             <a:r>
-              <a:rPr lang="en-US" sz="2400" b="1" dirty="0" smtClean="0">
+              <a:rPr lang="en-US" sz="2000" b="1" dirty="0" smtClean="0">
                 <a:solidFill>
                   <a:schemeClr val="accent6">
                     <a:lumMod val="75000"/>
@@ -4939,6 +4916,16 @@
               <a:t>c.</a:t>
             </a:r>
             <a:r>
+              <a:rPr lang="en-US" sz="1400" dirty="0" smtClean="0">
+                <a:solidFill>
+                  <a:schemeClr val="accent6">
+                    <a:lumMod val="75000"/>
+                  </a:schemeClr>
+                </a:solidFill>
+              </a:rPr>
+              <a:t> </a:t>
+            </a:r>
+            <a:r>
               <a:rPr lang="en-US" sz="1600" dirty="0" smtClean="0">
                 <a:solidFill>
                   <a:schemeClr val="accent6">
@@ -4946,20 +4933,10 @@
                   </a:schemeClr>
                 </a:solidFill>
               </a:rPr>
-              <a:t> </a:t>
-            </a:r>
-            <a:r>
-              <a:rPr lang="en-US" dirty="0" smtClean="0">
-                <a:solidFill>
-                  <a:schemeClr val="accent6">
-                    <a:lumMod val="75000"/>
-                  </a:schemeClr>
-                </a:solidFill>
-              </a:rPr>
               <a:t>Click </a:t>
             </a:r>
             <a:br>
-              <a:rPr lang="en-US" dirty="0" smtClean="0">
+              <a:rPr lang="en-US" sz="1600" dirty="0" smtClean="0">
                 <a:solidFill>
                   <a:schemeClr val="accent6">
                     <a:lumMod val="75000"/>
@@ -4968,16 +4945,16 @@
               </a:rPr>
             </a:br>
             <a:r>
-              <a:rPr lang="en-US" dirty="0" smtClean="0">
-                <a:solidFill>
-                  <a:schemeClr val="accent6">
-                    <a:lumMod val="75000"/>
-                  </a:schemeClr>
-                </a:solidFill>
-              </a:rPr>
-              <a:t>this button.</a:t>
-            </a:r>
-            <a:endParaRPr lang="en-SG" dirty="0">
+              <a:rPr lang="en-US" sz="1600" dirty="0" smtClean="0">
+                <a:solidFill>
+                  <a:schemeClr val="accent6">
+                    <a:lumMod val="75000"/>
+                  </a:schemeClr>
+                </a:solidFill>
+              </a:rPr>
+              <a:t>Create Spotlight again.</a:t>
+            </a:r>
+            <a:endParaRPr lang="en-SG" sz="1600" dirty="0">
               <a:solidFill>
                 <a:schemeClr val="accent6">
                   <a:lumMod val="75000"/>
@@ -4987,200 +4964,6 @@
           </a:p>
         </p:txBody>
       </p:sp>
-      <p:pic>
-        <p:nvPicPr>
-          <p:cNvPr id="10245" name="Picture 5"/>
-          <p:cNvPicPr>
-            <a:picLocks noChangeAspect="1" noChangeArrowheads="1"/>
-          </p:cNvPicPr>
-          <p:nvPr/>
-        </p:nvPicPr>
-        <p:blipFill>
-          <a:blip r:embed="rId4" cstate="print">
-            <a:extLst>
-              <a:ext uri="{28A0092B-C50C-407E-A947-70E740481C1C}">
-                <a14:useLocalDpi xmlns:a14="http://schemas.microsoft.com/office/drawing/2010/main" val="0"/>
-              </a:ext>
-            </a:extLst>
-          </a:blip>
-          <a:srcRect/>
-          <a:stretch>
-            <a:fillRect/>
-          </a:stretch>
-        </p:blipFill>
-        <p:spPr bwMode="auto">
-          <a:xfrm>
-            <a:off x="5227320" y="4424138"/>
-            <a:ext cx="1904689" cy="1429572"/>
-          </a:xfrm>
-          <a:prstGeom prst="rect">
-            <a:avLst/>
-          </a:prstGeom>
-          <a:noFill/>
-          <a:ln>
-            <a:noFill/>
-          </a:ln>
-          <a:effectLst/>
-          <a:extLst>
-            <a:ext uri="{909E8E84-426E-40DD-AFC4-6F175D3DCCD1}">
-              <a14:hiddenFill xmlns:a14="http://schemas.microsoft.com/office/drawing/2010/main">
-                <a:solidFill>
-                  <a:schemeClr val="accent1"/>
-                </a:solidFill>
-              </a14:hiddenFill>
-            </a:ext>
-            <a:ext uri="{91240B29-F687-4F45-9708-019B960494DF}">
-              <a14:hiddenLine xmlns:a14="http://schemas.microsoft.com/office/drawing/2010/main" w="9525">
-                <a:solidFill>
-                  <a:schemeClr val="tx1"/>
-                </a:solidFill>
-                <a:miter lim="800000"/>
-                <a:headEnd/>
-                <a:tailEnd/>
-              </a14:hiddenLine>
-            </a:ext>
-            <a:ext uri="{AF507438-7753-43E0-B8FC-AC1667EBCBE1}">
-              <a14:hiddenEffects xmlns:a14="http://schemas.microsoft.com/office/drawing/2010/main">
-                <a:effectLst>
-                  <a:outerShdw dist="35921" dir="2700000" algn="ctr" rotWithShape="0">
-                    <a:schemeClr val="bg2"/>
-                  </a:outerShdw>
-                </a:effectLst>
-              </a14:hiddenEffects>
-            </a:ext>
-          </a:extLst>
-        </p:spPr>
-      </p:pic>
-      <p:pic>
-        <p:nvPicPr>
-          <p:cNvPr id="1026" name="Picture 2"/>
-          <p:cNvPicPr>
-            <a:picLocks noChangeAspect="1" noChangeArrowheads="1"/>
-          </p:cNvPicPr>
-          <p:nvPr/>
-        </p:nvPicPr>
-        <p:blipFill>
-          <a:blip r:embed="rId5">
-            <a:extLst>
-              <a:ext uri="{28A0092B-C50C-407E-A947-70E740481C1C}">
-                <a14:useLocalDpi xmlns:a14="http://schemas.microsoft.com/office/drawing/2010/main" val="0"/>
-              </a:ext>
-            </a:extLst>
-          </a:blip>
-          <a:srcRect/>
-          <a:stretch>
-            <a:fillRect/>
-          </a:stretch>
-        </p:blipFill>
-        <p:spPr bwMode="auto">
-          <a:xfrm>
-            <a:off x="2376311" y="4976954"/>
-            <a:ext cx="2500489" cy="1119046"/>
-          </a:xfrm>
-          <a:prstGeom prst="roundRect">
-            <a:avLst>
-              <a:gd name="adj" fmla="val 3977"/>
-            </a:avLst>
-          </a:prstGeom>
-          <a:noFill/>
-          <a:ln>
-            <a:noFill/>
-          </a:ln>
-          <a:effectLst/>
-          <a:extLst>
-            <a:ext uri="{909E8E84-426E-40DD-AFC4-6F175D3DCCD1}">
-              <a14:hiddenFill xmlns:a14="http://schemas.microsoft.com/office/drawing/2010/main">
-                <a:solidFill>
-                  <a:schemeClr val="accent1"/>
-                </a:solidFill>
-              </a14:hiddenFill>
-            </a:ext>
-            <a:ext uri="{91240B29-F687-4F45-9708-019B960494DF}">
-              <a14:hiddenLine xmlns:a14="http://schemas.microsoft.com/office/drawing/2010/main" w="9525">
-                <a:solidFill>
-                  <a:schemeClr val="tx1"/>
-                </a:solidFill>
-                <a:miter lim="800000"/>
-                <a:headEnd/>
-                <a:tailEnd/>
-              </a14:hiddenLine>
-            </a:ext>
-            <a:ext uri="{AF507438-7753-43E0-B8FC-AC1667EBCBE1}">
-              <a14:hiddenEffects xmlns:a14="http://schemas.microsoft.com/office/drawing/2010/main">
-                <a:effectLst>
-                  <a:outerShdw dist="35921" dir="2700000" algn="ctr" rotWithShape="0">
-                    <a:schemeClr val="bg2"/>
-                  </a:outerShdw>
-                </a:effectLst>
-              </a14:hiddenEffects>
-            </a:ext>
-          </a:extLst>
-        </p:spPr>
-      </p:pic>
-      <p:pic>
-        <p:nvPicPr>
-          <p:cNvPr id="1027" name="Picture 3"/>
-          <p:cNvPicPr>
-            <a:picLocks noChangeAspect="1" noChangeArrowheads="1"/>
-          </p:cNvPicPr>
-          <p:nvPr/>
-        </p:nvPicPr>
-        <p:blipFill>
-          <a:blip r:embed="rId6">
-            <a:extLst>
-              <a:ext uri="{28A0092B-C50C-407E-A947-70E740481C1C}">
-                <a14:useLocalDpi xmlns:a14="http://schemas.microsoft.com/office/drawing/2010/main" val="0"/>
-              </a:ext>
-            </a:extLst>
-          </a:blip>
-          <a:srcRect/>
-          <a:stretch>
-            <a:fillRect/>
-          </a:stretch>
-        </p:blipFill>
-        <p:spPr bwMode="auto">
-          <a:xfrm>
-            <a:off x="416065" y="4280964"/>
-            <a:ext cx="1694356" cy="1270767"/>
-          </a:xfrm>
-          <a:prstGeom prst="rect">
-            <a:avLst/>
-          </a:prstGeom>
-          <a:noFill/>
-          <a:ln>
-            <a:noFill/>
-          </a:ln>
-          <a:effectLst/>
-          <a:extLst>
-            <a:ext uri="{909E8E84-426E-40DD-AFC4-6F175D3DCCD1}">
-              <a14:hiddenFill xmlns:a14="http://schemas.microsoft.com/office/drawing/2010/main">
-                <a:solidFill>
-                  <a:schemeClr val="accent1"/>
-                </a:solidFill>
-              </a14:hiddenFill>
-            </a:ext>
-            <a:ext uri="{91240B29-F687-4F45-9708-019B960494DF}">
-              <a14:hiddenLine xmlns:a14="http://schemas.microsoft.com/office/drawing/2010/main" w="9525">
-                <a:solidFill>
-                  <a:schemeClr val="tx1"/>
-                </a:solidFill>
-                <a:miter lim="800000"/>
-                <a:headEnd/>
-                <a:tailEnd/>
-              </a14:hiddenLine>
-            </a:ext>
-            <a:ext uri="{AF507438-7753-43E0-B8FC-AC1667EBCBE1}">
-              <a14:hiddenEffects xmlns:a14="http://schemas.microsoft.com/office/drawing/2010/main">
-                <a:effectLst>
-                  <a:outerShdw dist="35921" dir="2700000" algn="ctr" rotWithShape="0">
-                    <a:schemeClr val="bg2"/>
-                  </a:outerShdw>
-                </a:effectLst>
-              </a14:hiddenEffects>
-            </a:ext>
-          </a:extLst>
-        </p:spPr>
-      </p:pic>
       <p:sp>
         <p:nvSpPr>
           <p:cNvPr id="2" name="Flowchart: Connector 1"/>
@@ -5313,6 +5096,240 @@
           </a:p>
         </p:txBody>
       </p:sp>
+      <p:pic>
+        <p:nvPicPr>
+          <p:cNvPr id="6" name="Picture 5"/>
+          <p:cNvPicPr>
+            <a:picLocks noChangeAspect="1"/>
+          </p:cNvPicPr>
+          <p:nvPr/>
+        </p:nvPicPr>
+        <p:blipFill>
+          <a:blip r:embed="rId4"/>
+          <a:stretch>
+            <a:fillRect/>
+          </a:stretch>
+        </p:blipFill>
+        <p:spPr>
+          <a:xfrm>
+            <a:off x="2344389" y="5100672"/>
+            <a:ext cx="2531004" cy="1452984"/>
+          </a:xfrm>
+          <a:prstGeom prst="rect">
+            <a:avLst/>
+          </a:prstGeom>
+        </p:spPr>
+      </p:pic>
+      <p:sp>
+        <p:nvSpPr>
+          <p:cNvPr id="19" name="Freeform 11"/>
+          <p:cNvSpPr/>
+          <p:nvPr/>
+        </p:nvSpPr>
+        <p:spPr>
+          <a:xfrm>
+            <a:off x="5451335" y="4534019"/>
+            <a:ext cx="1728786" cy="1253493"/>
+          </a:xfrm>
+          <a:custGeom>
+            <a:avLst/>
+            <a:gdLst>
+              <a:gd name="connsiteX0" fmla="*/ 175215 w 2787004"/>
+              <a:gd name="connsiteY0" fmla="*/ 5476 h 1741193"/>
+              <a:gd name="connsiteX1" fmla="*/ 169739 w 2787004"/>
+              <a:gd name="connsiteY1" fmla="*/ 443512 h 1741193"/>
+              <a:gd name="connsiteX2" fmla="*/ 0 w 2787004"/>
+              <a:gd name="connsiteY2" fmla="*/ 1067713 h 1741193"/>
+              <a:gd name="connsiteX3" fmla="*/ 5476 w 2787004"/>
+              <a:gd name="connsiteY3" fmla="*/ 1741193 h 1741193"/>
+              <a:gd name="connsiteX4" fmla="*/ 2787004 w 2787004"/>
+              <a:gd name="connsiteY4" fmla="*/ 1735718 h 1741193"/>
+              <a:gd name="connsiteX5" fmla="*/ 2781528 w 2787004"/>
+              <a:gd name="connsiteY5" fmla="*/ 1067713 h 1741193"/>
+              <a:gd name="connsiteX6" fmla="*/ 1138894 w 2787004"/>
+              <a:gd name="connsiteY6" fmla="*/ 421610 h 1741193"/>
+              <a:gd name="connsiteX7" fmla="*/ 1133418 w 2787004"/>
+              <a:gd name="connsiteY7" fmla="*/ 0 h 1741193"/>
+              <a:gd name="connsiteX8" fmla="*/ 175215 w 2787004"/>
+              <a:gd name="connsiteY8" fmla="*/ 5476 h 1741193"/>
+              <a:gd name="connsiteX0" fmla="*/ 175215 w 2787004"/>
+              <a:gd name="connsiteY0" fmla="*/ 5476 h 1741193"/>
+              <a:gd name="connsiteX1" fmla="*/ 169739 w 2787004"/>
+              <a:gd name="connsiteY1" fmla="*/ 443512 h 1741193"/>
+              <a:gd name="connsiteX2" fmla="*/ 0 w 2787004"/>
+              <a:gd name="connsiteY2" fmla="*/ 1067713 h 1741193"/>
+              <a:gd name="connsiteX3" fmla="*/ 5476 w 2787004"/>
+              <a:gd name="connsiteY3" fmla="*/ 1741193 h 1741193"/>
+              <a:gd name="connsiteX4" fmla="*/ 2787004 w 2787004"/>
+              <a:gd name="connsiteY4" fmla="*/ 1735718 h 1741193"/>
+              <a:gd name="connsiteX5" fmla="*/ 2770923 w 2787004"/>
+              <a:gd name="connsiteY5" fmla="*/ 1041041 h 1741193"/>
+              <a:gd name="connsiteX6" fmla="*/ 1138894 w 2787004"/>
+              <a:gd name="connsiteY6" fmla="*/ 421610 h 1741193"/>
+              <a:gd name="connsiteX7" fmla="*/ 1133418 w 2787004"/>
+              <a:gd name="connsiteY7" fmla="*/ 0 h 1741193"/>
+              <a:gd name="connsiteX8" fmla="*/ 175215 w 2787004"/>
+              <a:gd name="connsiteY8" fmla="*/ 5476 h 1741193"/>
+              <a:gd name="connsiteX0" fmla="*/ 175215 w 2787378"/>
+              <a:gd name="connsiteY0" fmla="*/ 5476 h 1741193"/>
+              <a:gd name="connsiteX1" fmla="*/ 169739 w 2787378"/>
+              <a:gd name="connsiteY1" fmla="*/ 443512 h 1741193"/>
+              <a:gd name="connsiteX2" fmla="*/ 0 w 2787378"/>
+              <a:gd name="connsiteY2" fmla="*/ 1067713 h 1741193"/>
+              <a:gd name="connsiteX3" fmla="*/ 5476 w 2787378"/>
+              <a:gd name="connsiteY3" fmla="*/ 1741193 h 1741193"/>
+              <a:gd name="connsiteX4" fmla="*/ 2787004 w 2787378"/>
+              <a:gd name="connsiteY4" fmla="*/ 1735718 h 1741193"/>
+              <a:gd name="connsiteX5" fmla="*/ 2786831 w 2787378"/>
+              <a:gd name="connsiteY5" fmla="*/ 1035706 h 1741193"/>
+              <a:gd name="connsiteX6" fmla="*/ 1138894 w 2787378"/>
+              <a:gd name="connsiteY6" fmla="*/ 421610 h 1741193"/>
+              <a:gd name="connsiteX7" fmla="*/ 1133418 w 2787378"/>
+              <a:gd name="connsiteY7" fmla="*/ 0 h 1741193"/>
+              <a:gd name="connsiteX8" fmla="*/ 175215 w 2787378"/>
+              <a:gd name="connsiteY8" fmla="*/ 5476 h 1741193"/>
+            </a:gdLst>
+            <a:ahLst/>
+            <a:cxnLst>
+              <a:cxn ang="0">
+                <a:pos x="connsiteX0" y="connsiteY0"/>
+              </a:cxn>
+              <a:cxn ang="0">
+                <a:pos x="connsiteX1" y="connsiteY1"/>
+              </a:cxn>
+              <a:cxn ang="0">
+                <a:pos x="connsiteX2" y="connsiteY2"/>
+              </a:cxn>
+              <a:cxn ang="0">
+                <a:pos x="connsiteX3" y="connsiteY3"/>
+              </a:cxn>
+              <a:cxn ang="0">
+                <a:pos x="connsiteX4" y="connsiteY4"/>
+              </a:cxn>
+              <a:cxn ang="0">
+                <a:pos x="connsiteX5" y="connsiteY5"/>
+              </a:cxn>
+              <a:cxn ang="0">
+                <a:pos x="connsiteX6" y="connsiteY6"/>
+              </a:cxn>
+              <a:cxn ang="0">
+                <a:pos x="connsiteX7" y="connsiteY7"/>
+              </a:cxn>
+              <a:cxn ang="0">
+                <a:pos x="connsiteX8" y="connsiteY8"/>
+              </a:cxn>
+            </a:cxnLst>
+            <a:rect l="l" t="t" r="r" b="b"/>
+            <a:pathLst>
+              <a:path w="2787378" h="1741193">
+                <a:moveTo>
+                  <a:pt x="175215" y="5476"/>
+                </a:moveTo>
+                <a:cubicBezTo>
+                  <a:pt x="173390" y="151488"/>
+                  <a:pt x="171564" y="297500"/>
+                  <a:pt x="169739" y="443512"/>
+                </a:cubicBezTo>
+                <a:lnTo>
+                  <a:pt x="0" y="1067713"/>
+                </a:lnTo>
+                <a:cubicBezTo>
+                  <a:pt x="1825" y="1292206"/>
+                  <a:pt x="3651" y="1516700"/>
+                  <a:pt x="5476" y="1741193"/>
+                </a:cubicBezTo>
+                <a:lnTo>
+                  <a:pt x="2787004" y="1735718"/>
+                </a:lnTo>
+                <a:cubicBezTo>
+                  <a:pt x="2785179" y="1513050"/>
+                  <a:pt x="2788656" y="1258374"/>
+                  <a:pt x="2786831" y="1035706"/>
+                </a:cubicBezTo>
+                <a:cubicBezTo>
+                  <a:pt x="2239286" y="820338"/>
+                  <a:pt x="1686439" y="636978"/>
+                  <a:pt x="1138894" y="421610"/>
+                </a:cubicBezTo>
+                <a:cubicBezTo>
+                  <a:pt x="1137069" y="281073"/>
+                  <a:pt x="1135243" y="140537"/>
+                  <a:pt x="1133418" y="0"/>
+                </a:cubicBezTo>
+                <a:lnTo>
+                  <a:pt x="175215" y="5476"/>
+                </a:lnTo>
+                <a:close/>
+              </a:path>
+            </a:pathLst>
+          </a:custGeom>
+          <a:solidFill>
+            <a:srgbClr val="AAAAAA">
+              <a:alpha val="30000"/>
+            </a:srgbClr>
+          </a:solidFill>
+          <a:ln w="25400" cap="flat" cmpd="sng" algn="ctr">
+            <a:solidFill>
+              <a:srgbClr val="000000"/>
+            </a:solidFill>
+            <a:prstDash val="solid"/>
+          </a:ln>
+          <a:effectLst/>
+        </p:spPr>
+        <p:style>
+          <a:lnRef idx="2">
+            <a:schemeClr val="dk1"/>
+          </a:lnRef>
+          <a:fillRef idx="1">
+            <a:schemeClr val="lt1"/>
+          </a:fillRef>
+          <a:effectRef idx="0">
+            <a:schemeClr val="dk1"/>
+          </a:effectRef>
+          <a:fontRef idx="minor">
+            <a:schemeClr val="dk1"/>
+          </a:fontRef>
+        </p:style>
+        <p:txBody>
+          <a:bodyPr rtlCol="0" anchor="ctr"/>
+          <a:lstStyle/>
+          <a:p>
+            <a:pPr algn="ctr"/>
+            <a:endParaRPr lang="en-US" sz="4400"/>
+          </a:p>
+        </p:txBody>
+      </p:sp>
+      <p:pic>
+        <p:nvPicPr>
+          <p:cNvPr id="22" name="Picture 21"/>
+          <p:cNvPicPr>
+            <a:picLocks noChangeAspect="1"/>
+          </p:cNvPicPr>
+          <p:nvPr/>
+        </p:nvPicPr>
+        <p:blipFill>
+          <a:blip r:embed="rId2"/>
+          <a:stretch>
+            <a:fillRect/>
+          </a:stretch>
+        </p:blipFill>
+        <p:spPr>
+          <a:xfrm>
+            <a:off x="7946607" y="4876180"/>
+            <a:ext cx="718385" cy="910630"/>
+          </a:xfrm>
+          <a:prstGeom prst="rect">
+            <a:avLst/>
+          </a:prstGeom>
+          <a:effectLst>
+            <a:outerShdw blurRad="63500" sx="102000" sy="102000" algn="ctr" rotWithShape="0">
+              <a:prstClr val="black">
+                <a:alpha val="40000"/>
+              </a:prstClr>
+            </a:outerShdw>
+          </a:effectLst>
+        </p:spPr>
+      </p:pic>
     </p:spTree>
     <p:extLst>
       <p:ext uri="{BB962C8B-B14F-4D97-AF65-F5344CB8AC3E}">
@@ -5326,9 +5343,111 @@
   <p:timing>
     <p:tnLst>
       <p:par>
-        <p:cTn id="1" dur="indefinite" restart="never" nodeType="tmRoot"/>
+        <p:cTn id="1" dur="indefinite" restart="never" nodeType="tmRoot">
+          <p:childTnLst>
+            <p:seq concurrent="1" nextAc="seek">
+              <p:cTn id="2" dur="indefinite" nodeType="mainSeq">
+                <p:childTnLst>
+                  <p:par>
+                    <p:cTn id="3" fill="hold">
+                      <p:stCondLst>
+                        <p:cond delay="indefinite"/>
+                        <p:cond evt="onBegin" delay="0">
+                          <p:tn val="2"/>
+                        </p:cond>
+                      </p:stCondLst>
+                      <p:childTnLst>
+                        <p:par>
+                          <p:cTn id="4" fill="hold">
+                            <p:stCondLst>
+                              <p:cond delay="0"/>
+                            </p:stCondLst>
+                            <p:childTnLst>
+                              <p:par>
+                                <p:cTn id="5" presetID="1" presetClass="entr" presetSubtype="0" fill="hold" grpId="0" nodeType="withEffect">
+                                  <p:stCondLst>
+                                    <p:cond delay="0"/>
+                                  </p:stCondLst>
+                                  <p:childTnLst>
+                                    <p:set>
+                                      <p:cBhvr>
+                                        <p:cTn id="6" dur="1" fill="hold">
+                                          <p:stCondLst>
+                                            <p:cond delay="0"/>
+                                          </p:stCondLst>
+                                        </p:cTn>
+                                        <p:tgtEl>
+                                          <p:spTgt spid="19"/>
+                                        </p:tgtEl>
+                                        <p:attrNameLst>
+                                          <p:attrName>style.visibility</p:attrName>
+                                        </p:attrNameLst>
+                                      </p:cBhvr>
+                                      <p:to>
+                                        <p:strVal val="visible"/>
+                                      </p:to>
+                                    </p:set>
+                                  </p:childTnLst>
+                                </p:cTn>
+                              </p:par>
+                              <p:par>
+                                <p:cTn id="7" presetID="1" presetClass="exit" presetSubtype="0" fill="hold" grpId="1" nodeType="withEffect">
+                                  <p:stCondLst>
+                                    <p:cond delay="0"/>
+                                  </p:stCondLst>
+                                  <p:childTnLst>
+                                    <p:set>
+                                      <p:cBhvr>
+                                        <p:cTn id="8" dur="1" fill="hold">
+                                          <p:stCondLst>
+                                            <p:cond delay="0"/>
+                                          </p:stCondLst>
+                                        </p:cTn>
+                                        <p:tgtEl>
+                                          <p:spTgt spid="19"/>
+                                        </p:tgtEl>
+                                        <p:attrNameLst>
+                                          <p:attrName>style.visibility</p:attrName>
+                                        </p:attrNameLst>
+                                      </p:cBhvr>
+                                      <p:to>
+                                        <p:strVal val="hidden"/>
+                                      </p:to>
+                                    </p:set>
+                                  </p:childTnLst>
+                                </p:cTn>
+                              </p:par>
+                            </p:childTnLst>
+                          </p:cTn>
+                        </p:par>
+                      </p:childTnLst>
+                    </p:cTn>
+                  </p:par>
+                </p:childTnLst>
+              </p:cTn>
+              <p:prevCondLst>
+                <p:cond evt="onPrev" delay="0">
+                  <p:tgtEl>
+                    <p:sldTgt/>
+                  </p:tgtEl>
+                </p:cond>
+              </p:prevCondLst>
+              <p:nextCondLst>
+                <p:cond evt="onNext" delay="0">
+                  <p:tgtEl>
+                    <p:sldTgt/>
+                  </p:tgtEl>
+                </p:cond>
+              </p:nextCondLst>
+            </p:seq>
+          </p:childTnLst>
+        </p:cTn>
       </p:par>
     </p:tnLst>
+    <p:bldLst>
+      <p:bldP spid="19" grpId="0" animBg="1"/>
+      <p:bldP spid="19" grpId="1" animBg="1"/>
+    </p:bldLst>
   </p:timing>
 </p:sld>
 </file>
@@ -5400,7 +5519,17 @@
                   </a:schemeClr>
                 </a:solidFill>
               </a:rPr>
-              <a:t> feature</a:t>
+              <a:t> </a:t>
+            </a:r>
+            <a:r>
+              <a:rPr lang="en-US" dirty="0" smtClean="0">
+                <a:solidFill>
+                  <a:schemeClr val="accent6">
+                    <a:lumMod val="75000"/>
+                  </a:schemeClr>
+                </a:solidFill>
+              </a:rPr>
+              <a:t>feature.</a:t>
             </a:r>
             <a:endParaRPr lang="en-SG" dirty="0">
               <a:solidFill>
@@ -5831,7 +5960,7 @@
 
 <file path=ppt/slides/slide12.xml><?xml version="1.0" encoding="utf-8"?>
 <p:sld xmlns:a="http://schemas.openxmlformats.org/drawingml/2006/main" xmlns:r="http://schemas.openxmlformats.org/officeDocument/2006/relationships" xmlns:p="http://schemas.openxmlformats.org/presentationml/2006/main">
-  <p:cSld name="PPSlideStart201402171123497521">
+  <p:cSld name="PPSlideStart201501011916293652">
     <p:spTree>
       <p:nvGrpSpPr>
         <p:cNvPr id="1" name=""/>
@@ -6201,53 +6330,33 @@
       </p:sp>
       <p:pic>
         <p:nvPicPr>
-          <p:cNvPr id="6146" name="Picture 2"/>
+          <p:cNvPr id="3" name="Picture 2"/>
           <p:cNvPicPr>
-            <a:picLocks noChangeAspect="1" noChangeArrowheads="1"/>
+            <a:picLocks noChangeAspect="1"/>
           </p:cNvPicPr>
           <p:nvPr/>
         </p:nvPicPr>
         <p:blipFill>
-          <a:blip r:embed="rId2">
-            <a:extLst>
-              <a:ext uri="{28A0092B-C50C-407E-A947-70E740481C1C}">
-                <a14:useLocalDpi xmlns:a14="http://schemas.microsoft.com/office/drawing/2010/main" val="0"/>
-              </a:ext>
-            </a:extLst>
-          </a:blip>
-          <a:srcRect/>
+          <a:blip r:embed="rId2"/>
           <a:stretch>
             <a:fillRect/>
           </a:stretch>
         </p:blipFill>
-        <p:spPr bwMode="auto">
+        <p:spPr>
           <a:xfrm>
-            <a:off x="1376796" y="5986655"/>
-            <a:ext cx="819150" cy="714375"/>
+            <a:off x="1367120" y="5968101"/>
+            <a:ext cx="847725" cy="733425"/>
           </a:xfrm>
           <a:prstGeom prst="rect">
             <a:avLst/>
           </a:prstGeom>
-          <a:noFill/>
-          <a:ln w="9525">
-            <a:solidFill>
-              <a:schemeClr val="bg1">
-                <a:lumMod val="85000"/>
-              </a:schemeClr>
-            </a:solidFill>
-            <a:miter lim="800000"/>
-            <a:headEnd/>
-            <a:tailEnd/>
-          </a:ln>
-          <a:extLst>
-            <a:ext uri="{909E8E84-426E-40DD-AFC4-6F175D3DCCD1}">
-              <a14:hiddenFill xmlns:a14="http://schemas.microsoft.com/office/drawing/2010/main">
-                <a:solidFill>
-                  <a:schemeClr val="accent1"/>
-                </a:solidFill>
-              </a14:hiddenFill>
-            </a:ext>
-          </a:extLst>
+          <a:effectLst>
+            <a:outerShdw blurRad="63500" sx="102000" sy="102000" algn="ctr" rotWithShape="0">
+              <a:prstClr val="black">
+                <a:alpha val="40000"/>
+              </a:prstClr>
+            </a:outerShdw>
+          </a:effectLst>
         </p:spPr>
       </p:pic>
     </p:spTree>
@@ -6260,11 +6369,11 @@
   <p:clrMapOvr>
     <a:masterClrMapping/>
   </p:clrMapOvr>
-  <mc:AlternateContent xmlns:mc="http://schemas.openxmlformats.org/markup-compatibility/2006" xmlns:p14="http://schemas.microsoft.com/office/powerpoint/2010/main">
-    <mc:Choice Requires="p14">
-      <p:transition p14:dur="0"/>
+  <mc:AlternateContent xmlns:mc="http://schemas.openxmlformats.org/markup-compatibility/2006">
+    <mc:Choice xmlns:p14="http://schemas.microsoft.com/office/powerpoint/2010/main" Requires="p14">
+      <p:transition p14:dur="10"/>
     </mc:Choice>
-    <mc:Fallback xmlns="">
+    <mc:Fallback>
       <p:transition/>
     </mc:Fallback>
   </mc:AlternateContent>
@@ -6280,7 +6389,7 @@
 
 <file path=ppt/slides/slide13.xml><?xml version="1.0" encoding="utf-8"?>
 <p:sld xmlns:a="http://schemas.openxmlformats.org/drawingml/2006/main" xmlns:r="http://schemas.openxmlformats.org/officeDocument/2006/relationships" xmlns:p="http://schemas.openxmlformats.org/presentationml/2006/main">
-  <p:cSld name="PPSlideEnd201402171123497691">
+  <p:cSld name="PPSlideEnd201501011916293662">
     <p:spTree>
       <p:nvGrpSpPr>
         <p:cNvPr id="1" name=""/>
@@ -6516,11 +6625,11 @@
   <p:clrMapOvr>
     <a:masterClrMapping/>
   </p:clrMapOvr>
-  <mc:AlternateContent xmlns:mc="http://schemas.openxmlformats.org/markup-compatibility/2006" xmlns:p14="http://schemas.microsoft.com/office/powerpoint/2010/main">
-    <mc:Choice Requires="p14">
+  <mc:AlternateContent xmlns:mc="http://schemas.openxmlformats.org/markup-compatibility/2006">
+    <mc:Choice xmlns:p14="http://schemas.microsoft.com/office/powerpoint/2010/main" Requires="p14">
       <p:transition p14:dur="0"/>
     </mc:Choice>
-    <mc:Fallback xmlns="">
+    <mc:Fallback>
       <p:transition/>
     </mc:Fallback>
   </mc:AlternateContent>
@@ -7205,53 +7314,33 @@
       </mc:AlternateContent>
       <p:pic>
         <p:nvPicPr>
-          <p:cNvPr id="13317" name="Picture 5"/>
+          <p:cNvPr id="2" name="Picture 1"/>
           <p:cNvPicPr>
-            <a:picLocks noChangeAspect="1" noChangeArrowheads="1"/>
+            <a:picLocks noChangeAspect="1"/>
           </p:cNvPicPr>
           <p:nvPr/>
         </p:nvPicPr>
         <p:blipFill>
-          <a:blip r:embed="rId9">
-            <a:extLst>
-              <a:ext uri="{28A0092B-C50C-407E-A947-70E740481C1C}">
-                <a14:useLocalDpi xmlns:a14="http://schemas.microsoft.com/office/drawing/2010/main" val="0"/>
-              </a:ext>
-            </a:extLst>
-          </a:blip>
-          <a:srcRect/>
+          <a:blip r:embed="rId9"/>
           <a:stretch>
             <a:fillRect/>
           </a:stretch>
         </p:blipFill>
-        <p:spPr bwMode="auto">
+        <p:spPr>
           <a:xfrm>
-            <a:off x="3021934" y="5218318"/>
-            <a:ext cx="859837" cy="953882"/>
+            <a:off x="3043918" y="5288600"/>
+            <a:ext cx="600075" cy="695325"/>
           </a:xfrm>
           <a:prstGeom prst="rect">
             <a:avLst/>
           </a:prstGeom>
-          <a:noFill/>
-          <a:ln w="9525">
-            <a:solidFill>
-              <a:schemeClr val="bg1">
-                <a:lumMod val="85000"/>
-              </a:schemeClr>
-            </a:solidFill>
-            <a:miter lim="800000"/>
-            <a:headEnd/>
-            <a:tailEnd/>
-          </a:ln>
-          <a:extLst>
-            <a:ext uri="{909E8E84-426E-40DD-AFC4-6F175D3DCCD1}">
-              <a14:hiddenFill xmlns:a14="http://schemas.microsoft.com/office/drawing/2010/main">
-                <a:solidFill>
-                  <a:schemeClr val="accent1"/>
-                </a:solidFill>
-              </a14:hiddenFill>
-            </a:ext>
-          </a:extLst>
+          <a:effectLst>
+            <a:outerShdw blurRad="63500" sx="102000" sy="102000" algn="ctr" rotWithShape="0">
+              <a:prstClr val="black">
+                <a:alpha val="40000"/>
+              </a:prstClr>
+            </a:outerShdw>
+          </a:effectLst>
         </p:spPr>
       </p:pic>
     </p:spTree>
@@ -7331,7 +7420,17 @@
                   </a:schemeClr>
                 </a:solidFill>
               </a:rPr>
-              <a:t>Animate in slide</a:t>
+              <a:t>Animate </a:t>
+            </a:r>
+            <a:r>
+              <a:rPr lang="en-US" b="1" dirty="0" smtClean="0">
+                <a:solidFill>
+                  <a:schemeClr val="accent6">
+                    <a:lumMod val="75000"/>
+                  </a:schemeClr>
+                </a:solidFill>
+              </a:rPr>
+              <a:t>In Slide</a:t>
             </a:r>
             <a:r>
               <a:rPr lang="en-US" dirty="0" smtClean="0">
@@ -7341,7 +7440,7 @@
                   </a:schemeClr>
                 </a:solidFill>
               </a:rPr>
-              <a:t> feature</a:t>
+              <a:t> feature.</a:t>
             </a:r>
             <a:endParaRPr lang="en-SG" dirty="0">
               <a:solidFill>
@@ -8171,57 +8270,6 @@
           </a:p>
         </p:txBody>
       </p:sp>
-      <p:pic>
-        <p:nvPicPr>
-          <p:cNvPr id="1026" name="Picture 2"/>
-          <p:cNvPicPr>
-            <a:picLocks noChangeAspect="1" noChangeArrowheads="1"/>
-          </p:cNvPicPr>
-          <p:nvPr/>
-        </p:nvPicPr>
-        <p:blipFill>
-          <a:blip r:embed="rId4">
-            <a:extLst>
-              <a:ext uri="{28A0092B-C50C-407E-A947-70E740481C1C}">
-                <a14:useLocalDpi xmlns:a14="http://schemas.microsoft.com/office/drawing/2010/main" val="0"/>
-              </a:ext>
-            </a:extLst>
-          </a:blip>
-          <a:srcRect/>
-          <a:stretch>
-            <a:fillRect/>
-          </a:stretch>
-        </p:blipFill>
-        <p:spPr bwMode="auto">
-          <a:xfrm>
-            <a:off x="6971691" y="509336"/>
-            <a:ext cx="466725" cy="657225"/>
-          </a:xfrm>
-          <a:prstGeom prst="rect">
-            <a:avLst/>
-          </a:prstGeom>
-          <a:noFill/>
-          <a:ln w="9525">
-            <a:solidFill>
-              <a:schemeClr val="bg1">
-                <a:lumMod val="85000"/>
-              </a:schemeClr>
-            </a:solidFill>
-            <a:miter lim="800000"/>
-            <a:headEnd/>
-            <a:tailEnd/>
-          </a:ln>
-          <a:extLst>
-            <a:ext uri="{909E8E84-426E-40DD-AFC4-6F175D3DCCD1}">
-              <a14:hiddenFill xmlns:a14="http://schemas.microsoft.com/office/drawing/2010/main">
-                <a:solidFill>
-                  <a:schemeClr val="accent1"/>
-                </a:solidFill>
-              </a14:hiddenFill>
-            </a:ext>
-          </a:extLst>
-        </p:spPr>
-      </p:pic>
       <p:sp>
         <p:nvSpPr>
           <p:cNvPr id="9" name="TextBox 8"/>
@@ -8302,7 +8350,7 @@
           <p:nvPr/>
         </p:nvPicPr>
         <p:blipFill>
-          <a:blip r:embed="rId5">
+          <a:blip r:embed="rId4">
             <a:extLst>
               <a:ext uri="{28A0092B-C50C-407E-A947-70E740481C1C}">
                 <a14:useLocalDpi xmlns:a14="http://schemas.microsoft.com/office/drawing/2010/main" val="0"/>
@@ -8348,6 +8396,37 @@
               </a14:hiddenLine>
             </a:ext>
           </a:extLst>
+        </p:spPr>
+      </p:pic>
+      <p:pic>
+        <p:nvPicPr>
+          <p:cNvPr id="3" name="Picture 2"/>
+          <p:cNvPicPr>
+            <a:picLocks noChangeAspect="1"/>
+          </p:cNvPicPr>
+          <p:nvPr/>
+        </p:nvPicPr>
+        <p:blipFill>
+          <a:blip r:embed="rId5"/>
+          <a:stretch>
+            <a:fillRect/>
+          </a:stretch>
+        </p:blipFill>
+        <p:spPr>
+          <a:xfrm>
+            <a:off x="6981825" y="428625"/>
+            <a:ext cx="485775" cy="714375"/>
+          </a:xfrm>
+          <a:prstGeom prst="rect">
+            <a:avLst/>
+          </a:prstGeom>
+          <a:effectLst>
+            <a:outerShdw blurRad="63500" sx="102000" sy="102000" algn="ctr" rotWithShape="0">
+              <a:prstClr val="black">
+                <a:alpha val="40000"/>
+              </a:prstClr>
+            </a:outerShdw>
+          </a:effectLst>
         </p:spPr>
       </p:pic>
     </p:spTree>
@@ -9235,7 +9314,17 @@
                   </a:schemeClr>
                 </a:solidFill>
               </a:rPr>
-              <a:t>Auto zoom </a:t>
+              <a:t>Auto </a:t>
+            </a:r>
+            <a:r>
+              <a:rPr lang="en-US" b="1" dirty="0" smtClean="0">
+                <a:solidFill>
+                  <a:schemeClr val="accent6">
+                    <a:lumMod val="75000"/>
+                  </a:schemeClr>
+                </a:solidFill>
+              </a:rPr>
+              <a:t>Zoom </a:t>
             </a:r>
             <a:r>
               <a:rPr lang="en-US" dirty="0" smtClean="0">
@@ -9680,7 +9769,27 @@
                   </a:schemeClr>
                 </a:solidFill>
               </a:rPr>
-              <a:t> Select the blue rectangle s in any order (</a:t>
+              <a:t> Select the blue </a:t>
+            </a:r>
+            <a:r>
+              <a:rPr lang="en-US" dirty="0" smtClean="0">
+                <a:solidFill>
+                  <a:schemeClr val="accent6">
+                    <a:lumMod val="75000"/>
+                  </a:schemeClr>
+                </a:solidFill>
+              </a:rPr>
+              <a:t>rectangles </a:t>
+            </a:r>
+            <a:r>
+              <a:rPr lang="en-US" dirty="0" smtClean="0">
+                <a:solidFill>
+                  <a:schemeClr val="accent6">
+                    <a:lumMod val="75000"/>
+                  </a:schemeClr>
+                </a:solidFill>
+              </a:rPr>
+              <a:t>in any order (</a:t>
             </a:r>
             <a:r>
               <a:rPr lang="en-US" dirty="0" err="1" smtClean="0">
@@ -11520,7 +11629,27 @@
                   </a:schemeClr>
                 </a:solidFill>
               </a:rPr>
-              <a:t> Select the blue rectangle and click  the                button.</a:t>
+              <a:t> Select the blue rectangle and click </a:t>
+            </a:r>
+            <a:r>
+              <a:rPr lang="en-US" dirty="0" smtClean="0">
+                <a:solidFill>
+                  <a:schemeClr val="accent6">
+                    <a:lumMod val="75000"/>
+                  </a:schemeClr>
+                </a:solidFill>
+              </a:rPr>
+              <a:t>the                </a:t>
+            </a:r>
+            <a:r>
+              <a:rPr lang="en-US" dirty="0" smtClean="0">
+                <a:solidFill>
+                  <a:schemeClr val="accent6">
+                    <a:lumMod val="75000"/>
+                  </a:schemeClr>
+                </a:solidFill>
+              </a:rPr>
+              <a:t>button.</a:t>
             </a:r>
             <a:endParaRPr lang="en-SG" dirty="0">
               <a:solidFill>
@@ -11683,53 +11812,33 @@
       </p:pic>
       <p:pic>
         <p:nvPicPr>
-          <p:cNvPr id="2050" name="Picture 2" descr="https://lh3.googleusercontent.com/R6W83U2d1JkOFMeYLbmqerTI4yEtMf-f4BeMJ3ZypqlW3Hke61IvywGjRmIhYOJClVg6URUsNjxisSc2DbtJd88i8KbNtmC2PJyP7NCLLKi07InZW8BfaCKmUQ"/>
+          <p:cNvPr id="2" name="Picture 1"/>
           <p:cNvPicPr>
-            <a:picLocks noChangeAspect="1" noChangeArrowheads="1"/>
+            <a:picLocks noChangeAspect="1"/>
           </p:cNvPicPr>
           <p:nvPr/>
         </p:nvPicPr>
         <p:blipFill>
-          <a:blip r:embed="rId13">
-            <a:extLst>
-              <a:ext uri="{28A0092B-C50C-407E-A947-70E740481C1C}">
-                <a14:useLocalDpi xmlns:a14="http://schemas.microsoft.com/office/drawing/2010/main" val="0"/>
-              </a:ext>
-            </a:extLst>
-          </a:blip>
-          <a:srcRect/>
+          <a:blip r:embed="rId13"/>
           <a:stretch>
             <a:fillRect/>
           </a:stretch>
         </p:blipFill>
-        <p:spPr bwMode="auto">
+        <p:spPr>
           <a:xfrm>
-            <a:off x="4560503" y="513954"/>
-            <a:ext cx="773497" cy="1091996"/>
+            <a:off x="4614020" y="340660"/>
+            <a:ext cx="581025" cy="916728"/>
           </a:xfrm>
           <a:prstGeom prst="rect">
             <a:avLst/>
           </a:prstGeom>
-          <a:noFill/>
-          <a:ln w="9525">
-            <a:solidFill>
-              <a:schemeClr val="bg1">
-                <a:lumMod val="85000"/>
-              </a:schemeClr>
-            </a:solidFill>
-            <a:miter lim="800000"/>
-            <a:headEnd/>
-            <a:tailEnd/>
-          </a:ln>
-          <a:extLst>
-            <a:ext uri="{909E8E84-426E-40DD-AFC4-6F175D3DCCD1}">
-              <a14:hiddenFill xmlns:a14="http://schemas.microsoft.com/office/drawing/2010/main">
-                <a:solidFill>
-                  <a:srgbClr val="FFFFFF"/>
-                </a:solidFill>
-              </a14:hiddenFill>
-            </a:ext>
-          </a:extLst>
+          <a:effectLst>
+            <a:outerShdw blurRad="63500" sx="102000" sy="102000" algn="ctr" rotWithShape="0">
+              <a:prstClr val="black">
+                <a:alpha val="40000"/>
+              </a:prstClr>
+            </a:outerShdw>
+          </a:effectLst>
         </p:spPr>
       </p:pic>
     </p:spTree>
@@ -13501,53 +13610,33 @@
       </p:sp>
       <p:pic>
         <p:nvPicPr>
-          <p:cNvPr id="3074" name="Picture 2" descr="https://lh5.googleusercontent.com/RiGAbJUVjt04HKmNmsqFl1MOYtPUEXRzeG_Vev_sTKVu51FdRzPHJwAanTzIdZtB3O52btkhy_7nJuTZPbaVwwdHd_eOc8_BFVnAyj2rY7IssqTAlfycb-JPJA"/>
+          <p:cNvPr id="2" name="Picture 1"/>
           <p:cNvPicPr>
-            <a:picLocks noChangeAspect="1" noChangeArrowheads="1"/>
+            <a:picLocks noChangeAspect="1"/>
           </p:cNvPicPr>
           <p:nvPr/>
         </p:nvPicPr>
         <p:blipFill>
-          <a:blip r:embed="rId12">
-            <a:extLst>
-              <a:ext uri="{28A0092B-C50C-407E-A947-70E740481C1C}">
-                <a14:useLocalDpi xmlns:a14="http://schemas.microsoft.com/office/drawing/2010/main" val="0"/>
-              </a:ext>
-            </a:extLst>
-          </a:blip>
-          <a:srcRect/>
+          <a:blip r:embed="rId12"/>
           <a:stretch>
             <a:fillRect/>
           </a:stretch>
         </p:blipFill>
-        <p:spPr bwMode="auto">
+        <p:spPr>
           <a:xfrm>
-            <a:off x="4533900" y="511946"/>
-            <a:ext cx="647700" cy="964661"/>
+            <a:off x="4620235" y="381000"/>
+            <a:ext cx="530108" cy="836392"/>
           </a:xfrm>
           <a:prstGeom prst="rect">
             <a:avLst/>
           </a:prstGeom>
-          <a:noFill/>
-          <a:ln w="9525">
-            <a:solidFill>
-              <a:schemeClr val="bg1">
-                <a:lumMod val="85000"/>
-              </a:schemeClr>
-            </a:solidFill>
-            <a:miter lim="800000"/>
-            <a:headEnd/>
-            <a:tailEnd/>
-          </a:ln>
-          <a:extLst>
-            <a:ext uri="{909E8E84-426E-40DD-AFC4-6F175D3DCCD1}">
-              <a14:hiddenFill xmlns:a14="http://schemas.microsoft.com/office/drawing/2010/main">
-                <a:solidFill>
-                  <a:srgbClr val="FFFFFF"/>
-                </a:solidFill>
-              </a14:hiddenFill>
-            </a:ext>
-          </a:extLst>
+          <a:effectLst>
+            <a:outerShdw blurRad="63500" sx="102000" sy="102000" algn="ctr" rotWithShape="0">
+              <a:prstClr val="black">
+                <a:alpha val="40000"/>
+              </a:prstClr>
+            </a:outerShdw>
+          </a:effectLst>
         </p:spPr>
       </p:pic>
     </p:spTree>
@@ -13635,7 +13724,17 @@
                   </a:schemeClr>
                 </a:solidFill>
               </a:rPr>
-              <a:t>Auto crop</a:t>
+              <a:t>Auto </a:t>
+            </a:r>
+            <a:r>
+              <a:rPr lang="en-US" b="1" dirty="0" smtClean="0">
+                <a:solidFill>
+                  <a:schemeClr val="accent6">
+                    <a:lumMod val="75000"/>
+                  </a:schemeClr>
+                </a:solidFill>
+              </a:rPr>
+              <a:t>Crop</a:t>
             </a:r>
             <a:r>
               <a:rPr lang="en-US" dirty="0" smtClean="0">
@@ -13645,7 +13744,7 @@
                   </a:schemeClr>
                 </a:solidFill>
               </a:rPr>
-              <a:t> feature</a:t>
+              <a:t> feature.</a:t>
             </a:r>
             <a:endParaRPr lang="en-SG" dirty="0">
               <a:solidFill>
@@ -14137,57 +14236,6 @@
       </p:sp>
       <p:pic>
         <p:nvPicPr>
-          <p:cNvPr id="4098" name="Picture 2" descr="https://lh5.googleusercontent.com/DTiGBT0_tLq8w9oUQPkuJhJHa8skEBcs9JxuDvMSN69hx3sd03WpEo1NFwYfOH56V1RhgCwGysyGPX8JuJ5Iqa7-3VSN0d6LWtne6SiJcfC4TxOTaRAk-hTAkQ"/>
-          <p:cNvPicPr>
-            <a:picLocks noChangeAspect="1" noChangeArrowheads="1"/>
-          </p:cNvPicPr>
-          <p:nvPr/>
-        </p:nvPicPr>
-        <p:blipFill>
-          <a:blip r:embed="rId4">
-            <a:extLst>
-              <a:ext uri="{28A0092B-C50C-407E-A947-70E740481C1C}">
-                <a14:useLocalDpi xmlns:a14="http://schemas.microsoft.com/office/drawing/2010/main" val="0"/>
-              </a:ext>
-            </a:extLst>
-          </a:blip>
-          <a:srcRect/>
-          <a:stretch>
-            <a:fillRect/>
-          </a:stretch>
-        </p:blipFill>
-        <p:spPr bwMode="auto">
-          <a:xfrm>
-            <a:off x="5474527" y="450660"/>
-            <a:ext cx="621473" cy="844265"/>
-          </a:xfrm>
-          <a:prstGeom prst="rect">
-            <a:avLst/>
-          </a:prstGeom>
-          <a:noFill/>
-          <a:ln w="9525">
-            <a:solidFill>
-              <a:schemeClr val="bg1">
-                <a:lumMod val="85000"/>
-              </a:schemeClr>
-            </a:solidFill>
-            <a:miter lim="800000"/>
-            <a:headEnd/>
-            <a:tailEnd/>
-          </a:ln>
-          <a:extLst>
-            <a:ext uri="{909E8E84-426E-40DD-AFC4-6F175D3DCCD1}">
-              <a14:hiddenFill xmlns:a14="http://schemas.microsoft.com/office/drawing/2010/main">
-                <a:solidFill>
-                  <a:srgbClr val="FFFFFF"/>
-                </a:solidFill>
-              </a14:hiddenFill>
-            </a:ext>
-          </a:extLst>
-        </p:spPr>
-      </p:pic>
-      <p:pic>
-        <p:nvPicPr>
           <p:cNvPr id="4099" name="Picture 3" descr="C:\Users\dcsdcr\AppData\Local\Microsoft\Windows\Temporary Internet Files\Content.IE5\0BIO7UD5\MP900422113[1].jpg"/>
           <p:cNvPicPr>
             <a:picLocks noChangeAspect="1" noChangeArrowheads="1"/>
@@ -14195,7 +14243,7 @@
           <p:nvPr/>
         </p:nvPicPr>
         <p:blipFill rotWithShape="1">
-          <a:blip r:embed="rId5">
+          <a:blip r:embed="rId4">
             <a:extLst>
               <a:ext uri="{28A0092B-C50C-407E-A947-70E740481C1C}">
                 <a14:useLocalDpi xmlns:a14="http://schemas.microsoft.com/office/drawing/2010/main" val="0"/>
@@ -14498,6 +14546,37 @@
           </a:p>
         </p:txBody>
       </p:sp>
+      <p:pic>
+        <p:nvPicPr>
+          <p:cNvPr id="4" name="Picture 3"/>
+          <p:cNvPicPr>
+            <a:picLocks noChangeAspect="1"/>
+          </p:cNvPicPr>
+          <p:nvPr/>
+        </p:nvPicPr>
+        <p:blipFill>
+          <a:blip r:embed="rId5"/>
+          <a:stretch>
+            <a:fillRect/>
+          </a:stretch>
+        </p:blipFill>
+        <p:spPr>
+          <a:xfrm>
+            <a:off x="5564271" y="443755"/>
+            <a:ext cx="466725" cy="714375"/>
+          </a:xfrm>
+          <a:prstGeom prst="rect">
+            <a:avLst/>
+          </a:prstGeom>
+          <a:effectLst>
+            <a:outerShdw blurRad="63500" sx="102000" sy="102000" algn="ctr" rotWithShape="0">
+              <a:prstClr val="black">
+                <a:alpha val="40000"/>
+              </a:prstClr>
+            </a:outerShdw>
+          </a:effectLst>
+        </p:spPr>
+      </p:pic>
     </p:spTree>
     <p:extLst>
       <p:ext uri="{BB962C8B-B14F-4D97-AF65-F5344CB8AC3E}">
@@ -14862,7 +14941,17 @@
                   </a:schemeClr>
                 </a:solidFill>
               </a:rPr>
-              <a:t>Auto narrate </a:t>
+              <a:t>Auto </a:t>
+            </a:r>
+            <a:r>
+              <a:rPr lang="en-US" b="1" dirty="0" smtClean="0">
+                <a:solidFill>
+                  <a:schemeClr val="accent6">
+                    <a:lumMod val="75000"/>
+                  </a:schemeClr>
+                </a:solidFill>
+              </a:rPr>
+              <a:t>Narrate </a:t>
             </a:r>
             <a:r>
               <a:rPr lang="en-US" dirty="0" smtClean="0">
@@ -14882,7 +14971,17 @@
                   </a:schemeClr>
                 </a:solidFill>
               </a:rPr>
-              <a:t>Auto captions </a:t>
+              <a:t>Auto </a:t>
+            </a:r>
+            <a:r>
+              <a:rPr lang="en-US" b="1" dirty="0" smtClean="0">
+                <a:solidFill>
+                  <a:schemeClr val="accent6">
+                    <a:lumMod val="75000"/>
+                  </a:schemeClr>
+                </a:solidFill>
+              </a:rPr>
+              <a:t>Captions </a:t>
             </a:r>
             <a:r>
               <a:rPr lang="en-US" dirty="0" smtClean="0">
@@ -14892,7 +14991,7 @@
                   </a:schemeClr>
                 </a:solidFill>
               </a:rPr>
-              <a:t>features</a:t>
+              <a:t>features.</a:t>
             </a:r>
             <a:endParaRPr lang="en-SG" dirty="0">
               <a:solidFill>
@@ -15578,7 +15677,7 @@
       </p:sp>
       <p:pic>
         <p:nvPicPr>
-          <p:cNvPr id="2050" name="[Picture 2]"/>
+          <p:cNvPr id="2051" name="[Picture 3]"/>
           <p:cNvPicPr>
             <a:picLocks noChangeAspect="1" noChangeArrowheads="1"/>
           </p:cNvPicPr>
@@ -15586,57 +15685,6 @@
         </p:nvPicPr>
         <p:blipFill>
           <a:blip r:embed="rId3">
-            <a:extLst>
-              <a:ext uri="{28A0092B-C50C-407E-A947-70E740481C1C}">
-                <a14:useLocalDpi xmlns:a14="http://schemas.microsoft.com/office/drawing/2010/main" val="0"/>
-              </a:ext>
-            </a:extLst>
-          </a:blip>
-          <a:srcRect/>
-          <a:stretch>
-            <a:fillRect/>
-          </a:stretch>
-        </p:blipFill>
-        <p:spPr bwMode="auto">
-          <a:xfrm>
-            <a:off x="1905000" y="278642"/>
-            <a:ext cx="533400" cy="914400"/>
-          </a:xfrm>
-          <a:prstGeom prst="rect">
-            <a:avLst/>
-          </a:prstGeom>
-          <a:noFill/>
-          <a:ln w="9525">
-            <a:solidFill>
-              <a:schemeClr val="bg1">
-                <a:lumMod val="85000"/>
-              </a:schemeClr>
-            </a:solidFill>
-            <a:miter lim="800000"/>
-            <a:headEnd/>
-            <a:tailEnd/>
-          </a:ln>
-          <a:extLst>
-            <a:ext uri="{909E8E84-426E-40DD-AFC4-6F175D3DCCD1}">
-              <a14:hiddenFill xmlns:a14="http://schemas.microsoft.com/office/drawing/2010/main">
-                <a:solidFill>
-                  <a:schemeClr val="accent1"/>
-                </a:solidFill>
-              </a14:hiddenFill>
-            </a:ext>
-          </a:extLst>
-        </p:spPr>
-      </p:pic>
-      <p:pic>
-        <p:nvPicPr>
-          <p:cNvPr id="2051" name="[Picture 3]"/>
-          <p:cNvPicPr>
-            <a:picLocks noChangeAspect="1" noChangeArrowheads="1"/>
-          </p:cNvPicPr>
-          <p:nvPr/>
-        </p:nvPicPr>
-        <p:blipFill>
-          <a:blip r:embed="rId4">
             <a:extLst>
               <a:ext uri="{28A0092B-C50C-407E-A947-70E740481C1C}">
                 <a14:useLocalDpi xmlns:a14="http://schemas.microsoft.com/office/drawing/2010/main" val="0"/>
@@ -15721,7 +15769,27 @@
                   </a:schemeClr>
                 </a:solidFill>
               </a:rPr>
-              <a:t> Click the                 button to generate sub-titles (captions) as well. </a:t>
+              <a:t> Click the                 button to generate </a:t>
+            </a:r>
+            <a:r>
+              <a:rPr lang="en-US" dirty="0" smtClean="0">
+                <a:solidFill>
+                  <a:schemeClr val="accent6">
+                    <a:lumMod val="75000"/>
+                  </a:schemeClr>
+                </a:solidFill>
+              </a:rPr>
+              <a:t>subtitles </a:t>
+            </a:r>
+            <a:r>
+              <a:rPr lang="en-US" dirty="0" smtClean="0">
+                <a:solidFill>
+                  <a:schemeClr val="accent6">
+                    <a:lumMod val="75000"/>
+                  </a:schemeClr>
+                </a:solidFill>
+              </a:rPr>
+              <a:t>(captions) as well. </a:t>
             </a:r>
             <a:br>
               <a:rPr lang="en-US" dirty="0" smtClean="0">
@@ -15778,7 +15846,27 @@
                   </a:schemeClr>
                 </a:solidFill>
               </a:rPr>
-              <a:t>Play again to experience both audio and captions at the same time.</a:t>
+              <a:t>Play again to experience </a:t>
+            </a:r>
+            <a:r>
+              <a:rPr lang="en-US" dirty="0" smtClean="0">
+                <a:solidFill>
+                  <a:schemeClr val="accent6">
+                    <a:lumMod val="75000"/>
+                  </a:schemeClr>
+                </a:solidFill>
+              </a:rPr>
+              <a:t>both the </a:t>
+            </a:r>
+            <a:r>
+              <a:rPr lang="en-US" dirty="0" smtClean="0">
+                <a:solidFill>
+                  <a:schemeClr val="accent6">
+                    <a:lumMod val="75000"/>
+                  </a:schemeClr>
+                </a:solidFill>
+              </a:rPr>
+              <a:t>audio and captions at the same time.</a:t>
             </a:r>
             <a:endParaRPr lang="en-SG" dirty="0">
               <a:solidFill>
@@ -15792,53 +15880,64 @@
       </p:sp>
       <p:pic>
         <p:nvPicPr>
-          <p:cNvPr id="2052" name="[Picture 4]"/>
+          <p:cNvPr id="2" name="Picture 1"/>
           <p:cNvPicPr>
-            <a:picLocks noChangeAspect="1" noChangeArrowheads="1"/>
+            <a:picLocks noChangeAspect="1"/>
           </p:cNvPicPr>
           <p:nvPr/>
         </p:nvPicPr>
         <p:blipFill>
-          <a:blip r:embed="rId5">
-            <a:extLst>
-              <a:ext uri="{28A0092B-C50C-407E-A947-70E740481C1C}">
-                <a14:useLocalDpi xmlns:a14="http://schemas.microsoft.com/office/drawing/2010/main" val="0"/>
-              </a:ext>
-            </a:extLst>
-          </a:blip>
-          <a:srcRect/>
+          <a:blip r:embed="rId4"/>
           <a:stretch>
             <a:fillRect/>
           </a:stretch>
         </p:blipFill>
-        <p:spPr bwMode="auto">
+        <p:spPr>
           <a:xfrm>
-            <a:off x="2057400" y="4665583"/>
-            <a:ext cx="597074" cy="838200"/>
+            <a:off x="1934695" y="437590"/>
+            <a:ext cx="485775" cy="714375"/>
           </a:xfrm>
           <a:prstGeom prst="rect">
             <a:avLst/>
           </a:prstGeom>
-          <a:noFill/>
-          <a:ln w="9525">
-            <a:solidFill>
-              <a:schemeClr val="bg1">
-                <a:lumMod val="85000"/>
-              </a:schemeClr>
-            </a:solidFill>
-            <a:miter lim="800000"/>
-            <a:headEnd/>
-            <a:tailEnd/>
-          </a:ln>
-          <a:extLst>
-            <a:ext uri="{909E8E84-426E-40DD-AFC4-6F175D3DCCD1}">
-              <a14:hiddenFill xmlns:a14="http://schemas.microsoft.com/office/drawing/2010/main">
-                <a:solidFill>
-                  <a:schemeClr val="accent1"/>
-                </a:solidFill>
-              </a14:hiddenFill>
-            </a:ext>
-          </a:extLst>
+          <a:effectLst>
+            <a:outerShdw blurRad="63500" sx="102000" sy="102000" algn="ctr" rotWithShape="0">
+              <a:prstClr val="black">
+                <a:alpha val="40000"/>
+              </a:prstClr>
+            </a:outerShdw>
+          </a:effectLst>
+        </p:spPr>
+      </p:pic>
+      <p:pic>
+        <p:nvPicPr>
+          <p:cNvPr id="3" name="Picture 2"/>
+          <p:cNvPicPr>
+            <a:picLocks noChangeAspect="1"/>
+          </p:cNvPicPr>
+          <p:nvPr/>
+        </p:nvPicPr>
+        <p:blipFill>
+          <a:blip r:embed="rId5"/>
+          <a:stretch>
+            <a:fillRect/>
+          </a:stretch>
+        </p:blipFill>
+        <p:spPr>
+          <a:xfrm>
+            <a:off x="2066365" y="4723853"/>
+            <a:ext cx="523875" cy="676275"/>
+          </a:xfrm>
+          <a:prstGeom prst="rect">
+            <a:avLst/>
+          </a:prstGeom>
+          <a:effectLst>
+            <a:outerShdw blurRad="63500" sx="102000" sy="102000" algn="ctr" rotWithShape="0">
+              <a:prstClr val="black">
+                <a:alpha val="40000"/>
+              </a:prstClr>
+            </a:outerShdw>
+          </a:effectLst>
         </p:spPr>
       </p:pic>
     </p:spTree>
@@ -16010,7 +16109,7 @@
         <p:spPr>
           <a:xfrm>
             <a:off x="685800" y="4038600"/>
-            <a:ext cx="4800600" cy="2462213"/>
+            <a:ext cx="4800600" cy="2185214"/>
           </a:xfrm>
           <a:prstGeom prst="rect">
             <a:avLst/>
@@ -16062,7 +16161,27 @@
                   </a:schemeClr>
                 </a:solidFill>
               </a:rPr>
-              <a:t>click           button to start recording. When you </a:t>
+              <a:t>click           </a:t>
+            </a:r>
+            <a:r>
+              <a:rPr lang="en-US" dirty="0" smtClean="0">
+                <a:solidFill>
+                  <a:schemeClr val="accent6">
+                    <a:lumMod val="75000"/>
+                  </a:schemeClr>
+                </a:solidFill>
+              </a:rPr>
+              <a:t>to </a:t>
+            </a:r>
+            <a:r>
+              <a:rPr lang="en-US" dirty="0" smtClean="0">
+                <a:solidFill>
+                  <a:schemeClr val="accent6">
+                    <a:lumMod val="75000"/>
+                  </a:schemeClr>
+                </a:solidFill>
+              </a:rPr>
+              <a:t>start recording. When you </a:t>
             </a:r>
           </a:p>
           <a:p>
@@ -16083,8 +16202,45 @@
                   </a:schemeClr>
                 </a:solidFill>
               </a:rPr>
-              <a:t>click          button, the record will be auto-</a:t>
-            </a:r>
+              <a:t>click          , </a:t>
+            </a:r>
+            <a:r>
+              <a:rPr lang="en-US" dirty="0" smtClean="0">
+                <a:solidFill>
+                  <a:schemeClr val="accent6">
+                    <a:lumMod val="75000"/>
+                  </a:schemeClr>
+                </a:solidFill>
+              </a:rPr>
+              <a:t>the record will be </a:t>
+            </a:r>
+            <a:r>
+              <a:rPr lang="en-US" dirty="0" smtClean="0">
+                <a:solidFill>
+                  <a:schemeClr val="accent6">
+                    <a:lumMod val="75000"/>
+                  </a:schemeClr>
+                </a:solidFill>
+              </a:rPr>
+              <a:t>embedded </a:t>
+            </a:r>
+            <a:r>
+              <a:rPr lang="en-US" dirty="0" smtClean="0">
+                <a:solidFill>
+                  <a:schemeClr val="accent6">
+                    <a:lumMod val="75000"/>
+                  </a:schemeClr>
+                </a:solidFill>
+              </a:rPr>
+              <a:t>on the </a:t>
+            </a:r>
+            <a:endParaRPr lang="en-US" dirty="0" smtClean="0">
+              <a:solidFill>
+                <a:schemeClr val="accent6">
+                  <a:lumMod val="75000"/>
+                </a:schemeClr>
+              </a:solidFill>
+            </a:endParaRPr>
           </a:p>
           <a:p>
             <a:endParaRPr lang="en-US" dirty="0">
@@ -16104,7 +16260,27 @@
                   </a:schemeClr>
                 </a:solidFill>
               </a:rPr>
-              <a:t>embedded on the slide, and you can check it in the panel.</a:t>
+              <a:t>slide</a:t>
+            </a:r>
+            <a:r>
+              <a:rPr lang="en-US" dirty="0" smtClean="0">
+                <a:solidFill>
+                  <a:schemeClr val="accent6">
+                    <a:lumMod val="75000"/>
+                  </a:schemeClr>
+                </a:solidFill>
+              </a:rPr>
+              <a:t>, </a:t>
+            </a:r>
+            <a:r>
+              <a:rPr lang="en-US" dirty="0" smtClean="0">
+                <a:solidFill>
+                  <a:schemeClr val="accent6">
+                    <a:lumMod val="75000"/>
+                  </a:schemeClr>
+                </a:solidFill>
+              </a:rPr>
+              <a:t>and can be checked in the panel as well.</a:t>
             </a:r>
             <a:endParaRPr lang="en-SG" dirty="0">
               <a:solidFill>
@@ -16137,6 +16313,13 @@
           <a:prstGeom prst="rect">
             <a:avLst/>
           </a:prstGeom>
+          <a:effectLst>
+            <a:outerShdw blurRad="63500" sx="102000" sy="102000" algn="ctr" rotWithShape="0">
+              <a:prstClr val="black">
+                <a:alpha val="40000"/>
+              </a:prstClr>
+            </a:outerShdw>
+          </a:effectLst>
         </p:spPr>
       </p:pic>
       <p:pic>
@@ -16631,17 +16814,17 @@
                   </a:schemeClr>
                 </a:solidFill>
               </a:rPr>
-              <a:t>Shapes Lab </a:t>
-            </a:r>
-            <a:r>
-              <a:rPr lang="en-US" dirty="0" smtClean="0">
-                <a:solidFill>
-                  <a:schemeClr val="accent6">
-                    <a:lumMod val="75000"/>
-                  </a:schemeClr>
-                </a:solidFill>
-              </a:rPr>
-              <a:t>feature</a:t>
+              <a:t>Shapes </a:t>
+            </a:r>
+            <a:r>
+              <a:rPr lang="en-US" b="1" dirty="0" smtClean="0">
+                <a:solidFill>
+                  <a:schemeClr val="accent6">
+                    <a:lumMod val="75000"/>
+                  </a:schemeClr>
+                </a:solidFill>
+              </a:rPr>
+              <a:t>Lab.</a:t>
             </a:r>
             <a:endParaRPr lang="en-SG" dirty="0">
               <a:solidFill>
@@ -17029,8 +17212,25 @@
                   </a:schemeClr>
                 </a:solidFill>
               </a:rPr>
-              <a:t> Click the                button, it will </a:t>
-            </a:r>
+              <a:t> Click the                </a:t>
+            </a:r>
+            <a:r>
+              <a:rPr lang="en-US" dirty="0" smtClean="0">
+                <a:solidFill>
+                  <a:schemeClr val="accent6">
+                    <a:lumMod val="75000"/>
+                  </a:schemeClr>
+                </a:solidFill>
+              </a:rPr>
+              <a:t>button to</a:t>
+            </a:r>
+            <a:endParaRPr lang="en-US" dirty="0" smtClean="0">
+              <a:solidFill>
+                <a:schemeClr val="accent6">
+                  <a:lumMod val="75000"/>
+                </a:schemeClr>
+              </a:solidFill>
+            </a:endParaRPr>
           </a:p>
           <a:p>
             <a:endParaRPr lang="en-US" dirty="0" smtClean="0">
@@ -17078,12 +17278,19 @@
         </p:blipFill>
         <p:spPr>
           <a:xfrm>
-            <a:off x="1752600" y="732504"/>
+            <a:off x="1752600" y="669749"/>
             <a:ext cx="609600" cy="975360"/>
           </a:xfrm>
           <a:prstGeom prst="rect">
             <a:avLst/>
           </a:prstGeom>
+          <a:effectLst>
+            <a:outerShdw blurRad="63500" sx="102000" sy="102000" algn="ctr" rotWithShape="0">
+              <a:prstClr val="black">
+                <a:alpha val="40000"/>
+              </a:prstClr>
+            </a:outerShdw>
+          </a:effectLst>
         </p:spPr>
       </p:pic>
       <p:sp>
@@ -17928,6 +18135,16 @@
           <a:lstStyle/>
           <a:p>
             <a:r>
+              <a:rPr lang="en-US" dirty="0">
+                <a:solidFill>
+                  <a:schemeClr val="accent6">
+                    <a:lumMod val="75000"/>
+                  </a:schemeClr>
+                </a:solidFill>
+              </a:rPr>
+              <a:t>L</a:t>
+            </a:r>
+            <a:r>
               <a:rPr lang="en-US" dirty="0" smtClean="0">
                 <a:solidFill>
                   <a:schemeClr val="accent6">
@@ -17935,7 +18152,27 @@
                   </a:schemeClr>
                 </a:solidFill>
               </a:rPr>
-              <a:t>Next, let’s try the </a:t>
+              <a:t>et’s </a:t>
+            </a:r>
+            <a:r>
+              <a:rPr lang="en-US" dirty="0" smtClean="0">
+                <a:solidFill>
+                  <a:schemeClr val="accent6">
+                    <a:lumMod val="75000"/>
+                  </a:schemeClr>
+                </a:solidFill>
+              </a:rPr>
+              <a:t>try </a:t>
+            </a:r>
+            <a:r>
+              <a:rPr lang="en-US" dirty="0" smtClean="0">
+                <a:solidFill>
+                  <a:schemeClr val="accent6">
+                    <a:lumMod val="75000"/>
+                  </a:schemeClr>
+                </a:solidFill>
+              </a:rPr>
+              <a:t>out the </a:t>
             </a:r>
             <a:r>
               <a:rPr lang="en-US" b="1" dirty="0" smtClean="0">
@@ -17945,7 +18182,17 @@
                   </a:schemeClr>
                 </a:solidFill>
               </a:rPr>
-              <a:t>Colors Lab </a:t>
+              <a:t>Colors </a:t>
+            </a:r>
+            <a:r>
+              <a:rPr lang="en-US" b="1" dirty="0" smtClean="0">
+                <a:solidFill>
+                  <a:schemeClr val="accent6">
+                    <a:lumMod val="75000"/>
+                  </a:schemeClr>
+                </a:solidFill>
+              </a:rPr>
+              <a:t>Lab </a:t>
             </a:r>
             <a:r>
               <a:rPr lang="en-US" dirty="0" smtClean="0">
@@ -17955,7 +18202,7 @@
                   </a:schemeClr>
                 </a:solidFill>
               </a:rPr>
-              <a:t>feature</a:t>
+              <a:t>now.</a:t>
             </a:r>
             <a:endParaRPr lang="en-SG" dirty="0">
               <a:solidFill>
@@ -18787,6 +19034,13 @@
   <p:clrMapOvr>
     <a:masterClrMapping/>
   </p:clrMapOvr>
+  <p:timing>
+    <p:tnLst>
+      <p:par>
+        <p:cTn id="1" dur="indefinite" restart="never" nodeType="tmRoot"/>
+      </p:par>
+    </p:tnLst>
+  </p:timing>
 </p:sld>
 </file>
 
@@ -18974,12 +19228,19 @@
         </p:blipFill>
         <p:spPr>
           <a:xfrm>
-            <a:off x="1959395" y="304800"/>
+            <a:off x="1956690" y="304800"/>
             <a:ext cx="622852" cy="914400"/>
           </a:xfrm>
           <a:prstGeom prst="rect">
             <a:avLst/>
           </a:prstGeom>
+          <a:effectLst>
+            <a:outerShdw blurRad="63500" sx="102000" sy="102000" algn="ctr" rotWithShape="0">
+              <a:prstClr val="black">
+                <a:alpha val="40000"/>
+              </a:prstClr>
+            </a:outerShdw>
+          </a:effectLst>
         </p:spPr>
       </p:pic>
       <p:sp>
@@ -19989,7 +20250,27 @@
                   </a:schemeClr>
                 </a:solidFill>
               </a:rPr>
-              <a:t>Thanks for taking the quick tutorial.</a:t>
+              <a:t>Thanks for taking </a:t>
+            </a:r>
+            <a:r>
+              <a:rPr lang="en-US" sz="2000" b="1" dirty="0" smtClean="0">
+                <a:solidFill>
+                  <a:schemeClr val="accent6">
+                    <a:lumMod val="75000"/>
+                  </a:schemeClr>
+                </a:solidFill>
+              </a:rPr>
+              <a:t>this quick </a:t>
+            </a:r>
+            <a:r>
+              <a:rPr lang="en-US" sz="2000" b="1" dirty="0" smtClean="0">
+                <a:solidFill>
+                  <a:schemeClr val="accent6">
+                    <a:lumMod val="75000"/>
+                  </a:schemeClr>
+                </a:solidFill>
+              </a:rPr>
+              <a:t>tutorial.</a:t>
             </a:r>
           </a:p>
           <a:p>
@@ -20271,35 +20552,6 @@
           <a:chExt cx="0" cy="0"/>
         </a:xfrm>
       </p:grpSpPr>
-      <p:pic>
-        <p:nvPicPr>
-          <p:cNvPr id="4" name="Content Placeholder 3"/>
-          <p:cNvPicPr>
-            <a:picLocks noGrp="1"/>
-          </p:cNvPicPr>
-          <p:nvPr>
-            <p:ph idx="1"/>
-          </p:nvPr>
-        </p:nvPicPr>
-        <p:blipFill>
-          <a:blip r:embed="rId2">
-            <a:extLst>
-              <a:ext uri="{28A0092B-C50C-407E-A947-70E740481C1C}">
-                <a14:useLocalDpi xmlns:a14="http://schemas.microsoft.com/office/drawing/2010/main" val="0"/>
-              </a:ext>
-            </a:extLst>
-          </a:blip>
-          <a:stretch>
-            <a:fillRect/>
-          </a:stretch>
-        </p:blipFill>
-        <p:spPr>
-          <a:xfrm>
-            <a:off x="1074665" y="1600200"/>
-            <a:ext cx="6994670" cy="4525963"/>
-          </a:xfrm>
-        </p:spPr>
-      </p:pic>
       <p:sp>
         <p:nvSpPr>
           <p:cNvPr id="5" name="TextBox 4"/>
@@ -20362,6 +20614,36 @@
           </a:p>
         </p:txBody>
       </p:sp>
+      <p:pic>
+        <p:nvPicPr>
+          <p:cNvPr id="7" name="Picture 6"/>
+          <p:cNvPicPr>
+            <a:picLocks/>
+          </p:cNvPicPr>
+          <p:nvPr/>
+        </p:nvPicPr>
+        <p:blipFill>
+          <a:blip r:embed="rId2">
+            <a:extLst>
+              <a:ext uri="{28A0092B-C50C-407E-A947-70E740481C1C}">
+                <a14:useLocalDpi xmlns:a14="http://schemas.microsoft.com/office/drawing/2010/main" val="0"/>
+              </a:ext>
+            </a:extLst>
+          </a:blip>
+          <a:stretch>
+            <a:fillRect/>
+          </a:stretch>
+        </p:blipFill>
+        <p:spPr>
+          <a:xfrm>
+            <a:off x="649224" y="992124"/>
+            <a:ext cx="7845552" cy="4873752"/>
+          </a:xfrm>
+          <a:prstGeom prst="rect">
+            <a:avLst/>
+          </a:prstGeom>
+        </p:spPr>
+      </p:pic>
     </p:spTree>
     <p:extLst>
       <p:ext uri="{BB962C8B-B14F-4D97-AF65-F5344CB8AC3E}">
@@ -20538,6 +20820,13 @@
   <p:clrMapOvr>
     <a:masterClrMapping/>
   </p:clrMapOvr>
+  <p:timing>
+    <p:tnLst>
+      <p:par>
+        <p:cTn id="1" dur="indefinite" restart="never" nodeType="tmRoot"/>
+      </p:par>
+    </p:tnLst>
+  </p:timing>
 </p:sld>
 </file>
 
@@ -20598,7 +20887,17 @@
                   </a:schemeClr>
                 </a:solidFill>
               </a:rPr>
-              <a:t>Highlight bullet points</a:t>
+              <a:t>Highlight </a:t>
+            </a:r>
+            <a:r>
+              <a:rPr lang="en-US" b="1" dirty="0" smtClean="0">
+                <a:solidFill>
+                  <a:schemeClr val="accent6">
+                    <a:lumMod val="75000"/>
+                  </a:schemeClr>
+                </a:solidFill>
+              </a:rPr>
+              <a:t>Points</a:t>
             </a:r>
             <a:r>
               <a:rPr lang="en-US" dirty="0" smtClean="0">
@@ -20608,7 +20907,7 @@
                   </a:schemeClr>
                 </a:solidFill>
               </a:rPr>
-              <a:t> feature</a:t>
+              <a:t> feature.</a:t>
             </a:r>
             <a:endParaRPr lang="en-SG" dirty="0">
               <a:solidFill>
@@ -21680,7 +21979,17 @@
                   </a:schemeClr>
                 </a:solidFill>
               </a:rPr>
-              <a:t> While this slide is selected, click the               button in the                        ribbon</a:t>
+              <a:t> While this slide is selected, click the               button in the                        </a:t>
+            </a:r>
+            <a:r>
+              <a:rPr lang="en-US" dirty="0" smtClean="0">
+                <a:solidFill>
+                  <a:schemeClr val="accent6">
+                    <a:lumMod val="75000"/>
+                  </a:schemeClr>
+                </a:solidFill>
+              </a:rPr>
+              <a:t>ribbon.</a:t>
             </a:r>
             <a:endParaRPr lang="en-SG" dirty="0">
               <a:solidFill>
@@ -21692,109 +22001,6 @@
           </a:p>
         </p:txBody>
       </p:sp>
-      <p:pic>
-        <p:nvPicPr>
-          <p:cNvPr id="5" name="Picture 2"/>
-          <p:cNvPicPr>
-            <a:picLocks noChangeAspect="1" noChangeArrowheads="1"/>
-          </p:cNvPicPr>
-          <p:nvPr/>
-        </p:nvPicPr>
-        <p:blipFill>
-          <a:blip r:embed="rId2">
-            <a:extLst>
-              <a:ext uri="{28A0092B-C50C-407E-A947-70E740481C1C}">
-                <a14:useLocalDpi xmlns:a14="http://schemas.microsoft.com/office/drawing/2010/main" val="0"/>
-              </a:ext>
-            </a:extLst>
-          </a:blip>
-          <a:srcRect/>
-          <a:stretch>
-            <a:fillRect/>
-          </a:stretch>
-        </p:blipFill>
-        <p:spPr bwMode="auto">
-          <a:xfrm>
-            <a:off x="6525640" y="457200"/>
-            <a:ext cx="1143000" cy="333375"/>
-          </a:xfrm>
-          <a:prstGeom prst="rect">
-            <a:avLst/>
-          </a:prstGeom>
-          <a:noFill/>
-          <a:ln>
-            <a:noFill/>
-          </a:ln>
-          <a:extLst>
-            <a:ext uri="{909E8E84-426E-40DD-AFC4-6F175D3DCCD1}">
-              <a14:hiddenFill xmlns:a14="http://schemas.microsoft.com/office/drawing/2010/main">
-                <a:solidFill>
-                  <a:schemeClr val="accent1"/>
-                </a:solidFill>
-              </a14:hiddenFill>
-            </a:ext>
-            <a:ext uri="{91240B29-F687-4F45-9708-019B960494DF}">
-              <a14:hiddenLine xmlns:a14="http://schemas.microsoft.com/office/drawing/2010/main" w="9525">
-                <a:solidFill>
-                  <a:schemeClr val="tx1"/>
-                </a:solidFill>
-                <a:miter lim="800000"/>
-                <a:headEnd/>
-                <a:tailEnd/>
-              </a14:hiddenLine>
-            </a:ext>
-          </a:extLst>
-        </p:spPr>
-      </p:pic>
-      <p:pic>
-        <p:nvPicPr>
-          <p:cNvPr id="1027" name="Picture 3"/>
-          <p:cNvPicPr>
-            <a:picLocks noChangeAspect="1" noChangeArrowheads="1"/>
-          </p:cNvPicPr>
-          <p:nvPr/>
-        </p:nvPicPr>
-        <p:blipFill rotWithShape="1">
-          <a:blip r:embed="rId3">
-            <a:extLst>
-              <a:ext uri="{28A0092B-C50C-407E-A947-70E740481C1C}">
-                <a14:useLocalDpi xmlns:a14="http://schemas.microsoft.com/office/drawing/2010/main" val="0"/>
-              </a:ext>
-            </a:extLst>
-          </a:blip>
-          <a:srcRect r="52590"/>
-          <a:stretch/>
-        </p:blipFill>
-        <p:spPr bwMode="auto">
-          <a:xfrm>
-            <a:off x="4495800" y="304800"/>
-            <a:ext cx="661988" cy="763621"/>
-          </a:xfrm>
-          <a:prstGeom prst="rect">
-            <a:avLst/>
-          </a:prstGeom>
-          <a:noFill/>
-          <a:ln w="9525">
-            <a:solidFill>
-              <a:schemeClr val="bg1">
-                <a:lumMod val="85000"/>
-              </a:schemeClr>
-            </a:solidFill>
-            <a:miter lim="800000"/>
-            <a:headEnd/>
-            <a:tailEnd/>
-          </a:ln>
-          <a:extLst>
-            <a:ext uri="{909E8E84-426E-40DD-AFC4-6F175D3DCCD1}">
-              <a14:hiddenFill xmlns:a14="http://schemas.microsoft.com/office/drawing/2010/main">
-                <a:solidFill>
-                  <a:schemeClr val="accent1"/>
-                </a:solidFill>
-              </a14:hiddenFill>
-            </a:ext>
-          </a:extLst>
-        </p:spPr>
-      </p:pic>
       <p:sp>
         <p:nvSpPr>
           <p:cNvPr id="10" name="Rectangle 9"/>
@@ -21886,7 +22092,7 @@
           <p:nvPr/>
         </p:nvPicPr>
         <p:blipFill>
-          <a:blip r:embed="rId4">
+          <a:blip r:embed="rId2">
             <a:extLst>
               <a:ext uri="{28A0092B-C50C-407E-A947-70E740481C1C}">
                 <a14:useLocalDpi xmlns:a14="http://schemas.microsoft.com/office/drawing/2010/main" val="0"/>
@@ -21986,6 +22192,61 @@
           </a:p>
         </p:txBody>
       </p:sp>
+      <p:pic>
+        <p:nvPicPr>
+          <p:cNvPr id="2" name="Picture 1"/>
+          <p:cNvPicPr>
+            <a:picLocks noChangeAspect="1"/>
+          </p:cNvPicPr>
+          <p:nvPr/>
+        </p:nvPicPr>
+        <p:blipFill>
+          <a:blip r:embed="rId3"/>
+          <a:stretch>
+            <a:fillRect/>
+          </a:stretch>
+        </p:blipFill>
+        <p:spPr>
+          <a:xfrm>
+            <a:off x="4519612" y="245939"/>
+            <a:ext cx="661988" cy="886391"/>
+          </a:xfrm>
+          <a:prstGeom prst="rect">
+            <a:avLst/>
+          </a:prstGeom>
+          <a:effectLst>
+            <a:outerShdw blurRad="63500" sx="102000" sy="102000" algn="ctr" rotWithShape="0">
+              <a:prstClr val="black">
+                <a:alpha val="40000"/>
+              </a:prstClr>
+            </a:outerShdw>
+          </a:effectLst>
+        </p:spPr>
+      </p:pic>
+      <p:pic>
+        <p:nvPicPr>
+          <p:cNvPr id="8" name="Picture 7"/>
+          <p:cNvPicPr>
+            <a:picLocks noChangeAspect="1"/>
+          </p:cNvPicPr>
+          <p:nvPr/>
+        </p:nvPicPr>
+        <p:blipFill>
+          <a:blip r:embed="rId4"/>
+          <a:stretch>
+            <a:fillRect/>
+          </a:stretch>
+        </p:blipFill>
+        <p:spPr>
+          <a:xfrm>
+            <a:off x="6477000" y="447631"/>
+            <a:ext cx="1190791" cy="314369"/>
+          </a:xfrm>
+          <a:prstGeom prst="rect">
+            <a:avLst/>
+          </a:prstGeom>
+        </p:spPr>
+      </p:pic>
     </p:spTree>
     <p:extLst>
       <p:ext uri="{BB962C8B-B14F-4D97-AF65-F5344CB8AC3E}">
@@ -22151,55 +22412,6 @@
           </a:p>
         </p:txBody>
       </p:sp>
-      <p:pic>
-        <p:nvPicPr>
-          <p:cNvPr id="1027" name="Picture 3"/>
-          <p:cNvPicPr>
-            <a:picLocks noChangeAspect="1" noChangeArrowheads="1"/>
-          </p:cNvPicPr>
-          <p:nvPr/>
-        </p:nvPicPr>
-        <p:blipFill rotWithShape="1">
-          <a:blip r:embed="rId2">
-            <a:extLst>
-              <a:ext uri="{28A0092B-C50C-407E-A947-70E740481C1C}">
-                <a14:useLocalDpi xmlns:a14="http://schemas.microsoft.com/office/drawing/2010/main" val="0"/>
-              </a:ext>
-            </a:extLst>
-          </a:blip>
-          <a:srcRect l="44471" r="492"/>
-          <a:stretch/>
-        </p:blipFill>
-        <p:spPr bwMode="auto">
-          <a:xfrm>
-            <a:off x="4489315" y="285345"/>
-            <a:ext cx="768485" cy="763621"/>
-          </a:xfrm>
-          <a:prstGeom prst="rect">
-            <a:avLst/>
-          </a:prstGeom>
-          <a:noFill/>
-          <a:ln w="9525">
-            <a:solidFill>
-              <a:schemeClr val="bg1">
-                <a:lumMod val="85000"/>
-              </a:schemeClr>
-            </a:solidFill>
-            <a:miter lim="800000"/>
-            <a:headEnd/>
-            <a:tailEnd/>
-          </a:ln>
-          <a:extLst>
-            <a:ext uri="{909E8E84-426E-40DD-AFC4-6F175D3DCCD1}">
-              <a14:hiddenFill xmlns:a14="http://schemas.microsoft.com/office/drawing/2010/main">
-                <a:solidFill>
-                  <a:schemeClr val="accent1"/>
-                </a:solidFill>
-              </a14:hiddenFill>
-            </a:ext>
-          </a:extLst>
-        </p:spPr>
-      </p:pic>
       <p:sp>
         <p:nvSpPr>
           <p:cNvPr id="10" name="Rectangle 9"/>
@@ -22301,7 +22513,7 @@
           <p:nvPr/>
         </p:nvPicPr>
         <p:blipFill>
-          <a:blip r:embed="rId3">
+          <a:blip r:embed="rId2">
             <a:extLst>
               <a:ext uri="{28A0092B-C50C-407E-A947-70E740481C1C}">
                 <a14:useLocalDpi xmlns:a14="http://schemas.microsoft.com/office/drawing/2010/main" val="0"/>
@@ -22389,7 +22601,7 @@
                   </a:schemeClr>
                 </a:solidFill>
               </a:rPr>
-              <a:t> More ways of using this feature can be found in our web site </a:t>
+              <a:t> More ways of using this </a:t>
             </a:r>
             <a:r>
               <a:rPr lang="en-US" dirty="0" smtClean="0">
@@ -22398,7 +22610,47 @@
                     <a:lumMod val="75000"/>
                   </a:schemeClr>
                 </a:solidFill>
-                <a:hlinkClick r:id="rId4"/>
+              </a:rPr>
+              <a:t>feature – for instance, to highlight arbitrary segments </a:t>
+            </a:r>
+            <a:r>
+              <a:rPr lang="en-US" dirty="0">
+                <a:solidFill>
+                  <a:schemeClr val="accent6">
+                    <a:lumMod val="75000"/>
+                  </a:schemeClr>
+                </a:solidFill>
+              </a:rPr>
+              <a:t>of text – can </a:t>
+            </a:r>
+            <a:r>
+              <a:rPr lang="en-US" dirty="0" smtClean="0">
+                <a:solidFill>
+                  <a:schemeClr val="accent6">
+                    <a:lumMod val="75000"/>
+                  </a:schemeClr>
+                </a:solidFill>
+              </a:rPr>
+              <a:t>be found </a:t>
+            </a:r>
+            <a:r>
+              <a:rPr lang="en-US" dirty="0" smtClean="0">
+                <a:solidFill>
+                  <a:schemeClr val="accent6">
+                    <a:lumMod val="75000"/>
+                  </a:schemeClr>
+                </a:solidFill>
+              </a:rPr>
+              <a:t>on our website </a:t>
+            </a:r>
+            <a:r>
+              <a:rPr lang="en-US" dirty="0" smtClean="0">
+                <a:solidFill>
+                  <a:schemeClr val="accent6">
+                    <a:lumMod val="75000"/>
+                  </a:schemeClr>
+                </a:solidFill>
+                <a:hlinkClick r:id="rId3"/>
               </a:rPr>
               <a:t>http://PowerPointLabs.info/docs.html</a:t>
             </a:r>
@@ -22422,6 +22674,37 @@
           </a:p>
         </p:txBody>
       </p:sp>
+      <p:pic>
+        <p:nvPicPr>
+          <p:cNvPr id="2" name="Picture 1"/>
+          <p:cNvPicPr>
+            <a:picLocks noChangeAspect="1"/>
+          </p:cNvPicPr>
+          <p:nvPr/>
+        </p:nvPicPr>
+        <p:blipFill>
+          <a:blip r:embed="rId4"/>
+          <a:stretch>
+            <a:fillRect/>
+          </a:stretch>
+        </p:blipFill>
+        <p:spPr>
+          <a:xfrm>
+            <a:off x="4562475" y="228600"/>
+            <a:ext cx="695325" cy="714375"/>
+          </a:xfrm>
+          <a:prstGeom prst="rect">
+            <a:avLst/>
+          </a:prstGeom>
+          <a:effectLst>
+            <a:outerShdw blurRad="63500" sx="102000" sy="102000" algn="ctr" rotWithShape="0">
+              <a:prstClr val="black">
+                <a:alpha val="40000"/>
+              </a:prstClr>
+            </a:outerShdw>
+          </a:effectLst>
+        </p:spPr>
+      </p:pic>
     </p:spTree>
     <p:extLst>
       <p:ext uri="{BB962C8B-B14F-4D97-AF65-F5344CB8AC3E}">
@@ -22509,7 +22792,17 @@
                   </a:schemeClr>
                 </a:solidFill>
               </a:rPr>
-              <a:t> feature</a:t>
+              <a:t> </a:t>
+            </a:r>
+            <a:r>
+              <a:rPr lang="en-US" dirty="0" smtClean="0">
+                <a:solidFill>
+                  <a:schemeClr val="accent6">
+                    <a:lumMod val="75000"/>
+                  </a:schemeClr>
+                </a:solidFill>
+              </a:rPr>
+              <a:t>feature.</a:t>
             </a:r>
             <a:endParaRPr lang="en-SG" dirty="0">
               <a:solidFill>
@@ -22815,7 +23108,17 @@
                   </a:schemeClr>
                 </a:solidFill>
               </a:rPr>
-              <a:t>click the              button in the                        ribbon</a:t>
+              <a:t>click the              button in the                        </a:t>
+            </a:r>
+            <a:r>
+              <a:rPr lang="en-US" dirty="0" smtClean="0">
+                <a:solidFill>
+                  <a:schemeClr val="accent6">
+                    <a:lumMod val="75000"/>
+                  </a:schemeClr>
+                </a:solidFill>
+              </a:rPr>
+              <a:t>ribbon.</a:t>
             </a:r>
             <a:endParaRPr lang="en-SG" dirty="0">
               <a:solidFill>
@@ -22827,57 +23130,6 @@
           </a:p>
         </p:txBody>
       </p:sp>
-      <p:pic>
-        <p:nvPicPr>
-          <p:cNvPr id="3075" name="Picture 3"/>
-          <p:cNvPicPr>
-            <a:picLocks noChangeAspect="1" noChangeArrowheads="1"/>
-          </p:cNvPicPr>
-          <p:nvPr/>
-        </p:nvPicPr>
-        <p:blipFill>
-          <a:blip r:embed="rId2">
-            <a:extLst>
-              <a:ext uri="{28A0092B-C50C-407E-A947-70E740481C1C}">
-                <a14:useLocalDpi xmlns:a14="http://schemas.microsoft.com/office/drawing/2010/main" val="0"/>
-              </a:ext>
-            </a:extLst>
-          </a:blip>
-          <a:srcRect/>
-          <a:stretch>
-            <a:fillRect/>
-          </a:stretch>
-        </p:blipFill>
-        <p:spPr bwMode="auto">
-          <a:xfrm>
-            <a:off x="4589117" y="946162"/>
-            <a:ext cx="542925" cy="666750"/>
-          </a:xfrm>
-          <a:prstGeom prst="rect">
-            <a:avLst/>
-          </a:prstGeom>
-          <a:noFill/>
-          <a:ln w="9525">
-            <a:solidFill>
-              <a:schemeClr val="bg1">
-                <a:lumMod val="85000"/>
-              </a:schemeClr>
-            </a:solidFill>
-            <a:miter lim="800000"/>
-            <a:headEnd/>
-            <a:tailEnd/>
-          </a:ln>
-          <a:extLst>
-            <a:ext uri="{909E8E84-426E-40DD-AFC4-6F175D3DCCD1}">
-              <a14:hiddenFill xmlns:a14="http://schemas.microsoft.com/office/drawing/2010/main">
-                <a:solidFill>
-                  <a:schemeClr val="accent1"/>
-                </a:solidFill>
-              </a14:hiddenFill>
-            </a:ext>
-          </a:extLst>
-        </p:spPr>
-      </p:pic>
       <p:sp>
         <p:nvSpPr>
           <p:cNvPr id="4" name="phase A"/>
@@ -23762,7 +24014,7 @@
       </p:sp>
       <mc:AlternateContent xmlns:mc="http://schemas.openxmlformats.org/markup-compatibility/2006" xmlns:p14="http://schemas.microsoft.com/office/powerpoint/2010/main">
         <mc:Choice Requires="p14">
-          <p:contentPart p14:bwMode="auto" r:id="rId3">
+          <p:contentPart p14:bwMode="auto" r:id="rId2">
             <p14:nvContentPartPr>
               <p14:cNvPr id="22" name="Ink 21"/>
               <p14:cNvContentPartPr/>
@@ -23851,6 +24103,37 @@
               </a14:hiddenLine>
             </a:ext>
           </a:extLst>
+        </p:spPr>
+      </p:pic>
+      <p:pic>
+        <p:nvPicPr>
+          <p:cNvPr id="16" name="Picture 4"/>
+          <p:cNvPicPr>
+            <a:picLocks noChangeAspect="1"/>
+          </p:cNvPicPr>
+          <p:nvPr/>
+        </p:nvPicPr>
+        <p:blipFill>
+          <a:blip r:embed="rId6"/>
+          <a:stretch>
+            <a:fillRect/>
+          </a:stretch>
+        </p:blipFill>
+        <p:spPr>
+          <a:xfrm>
+            <a:off x="4572000" y="938230"/>
+            <a:ext cx="640705" cy="812162"/>
+          </a:xfrm>
+          <a:prstGeom prst="rect">
+            <a:avLst/>
+          </a:prstGeom>
+          <a:effectLst>
+            <a:outerShdw blurRad="63500" sx="102000" sy="102000" algn="ctr" rotWithShape="0">
+              <a:prstClr val="black">
+                <a:alpha val="40000"/>
+              </a:prstClr>
+            </a:outerShdw>
+          </a:effectLst>
         </p:spPr>
       </p:pic>
     </p:spTree>

</xml_diff>

<commit_message>
Removed a duplicate slide
</commit_message>
<xml_diff>
--- a/doc/PowerPointLabs Quick Tutorial.pptx
+++ b/doc/PowerPointLabs Quick Tutorial.pptx
@@ -5,7 +5,7 @@
     <p:sldMasterId id="2147483648" r:id="rId1"/>
   </p:sldMasterIdLst>
   <p:notesMasterIdLst>
-    <p:notesMasterId r:id="rId43"/>
+    <p:notesMasterId r:id="rId42"/>
   </p:notesMasterIdLst>
   <p:sldIdLst>
     <p:sldId id="296" r:id="rId2"/>
@@ -23,32 +23,31 @@
     <p:sldId id="311" r:id="rId14"/>
     <p:sldId id="304" r:id="rId15"/>
     <p:sldId id="308" r:id="rId16"/>
-    <p:sldId id="307" r:id="rId17"/>
-    <p:sldId id="346" r:id="rId18"/>
-    <p:sldId id="312" r:id="rId19"/>
-    <p:sldId id="313" r:id="rId20"/>
-    <p:sldId id="324" r:id="rId21"/>
-    <p:sldId id="314" r:id="rId22"/>
-    <p:sldId id="322" r:id="rId23"/>
-    <p:sldId id="325" r:id="rId24"/>
-    <p:sldId id="309" r:id="rId25"/>
-    <p:sldId id="327" r:id="rId26"/>
-    <p:sldId id="310" r:id="rId27"/>
-    <p:sldId id="326" r:id="rId28"/>
-    <p:sldId id="331" r:id="rId29"/>
-    <p:sldId id="332" r:id="rId30"/>
-    <p:sldId id="333" r:id="rId31"/>
-    <p:sldId id="334" r:id="rId32"/>
-    <p:sldId id="335" r:id="rId33"/>
-    <p:sldId id="336" r:id="rId34"/>
-    <p:sldId id="347" r:id="rId35"/>
-    <p:sldId id="338" r:id="rId36"/>
-    <p:sldId id="339" r:id="rId37"/>
-    <p:sldId id="340" r:id="rId38"/>
-    <p:sldId id="345" r:id="rId39"/>
-    <p:sldId id="344" r:id="rId40"/>
-    <p:sldId id="305" r:id="rId41"/>
-    <p:sldId id="299" r:id="rId42"/>
+    <p:sldId id="346" r:id="rId17"/>
+    <p:sldId id="312" r:id="rId18"/>
+    <p:sldId id="313" r:id="rId19"/>
+    <p:sldId id="324" r:id="rId20"/>
+    <p:sldId id="314" r:id="rId21"/>
+    <p:sldId id="322" r:id="rId22"/>
+    <p:sldId id="325" r:id="rId23"/>
+    <p:sldId id="309" r:id="rId24"/>
+    <p:sldId id="327" r:id="rId25"/>
+    <p:sldId id="310" r:id="rId26"/>
+    <p:sldId id="326" r:id="rId27"/>
+    <p:sldId id="331" r:id="rId28"/>
+    <p:sldId id="332" r:id="rId29"/>
+    <p:sldId id="333" r:id="rId30"/>
+    <p:sldId id="334" r:id="rId31"/>
+    <p:sldId id="335" r:id="rId32"/>
+    <p:sldId id="336" r:id="rId33"/>
+    <p:sldId id="347" r:id="rId34"/>
+    <p:sldId id="338" r:id="rId35"/>
+    <p:sldId id="339" r:id="rId36"/>
+    <p:sldId id="340" r:id="rId37"/>
+    <p:sldId id="345" r:id="rId38"/>
+    <p:sldId id="344" r:id="rId39"/>
+    <p:sldId id="305" r:id="rId40"/>
+    <p:sldId id="299" r:id="rId41"/>
   </p:sldIdLst>
   <p:sldSz cx="9144000" cy="6858000" type="screen4x3"/>
   <p:notesSz cx="6858000" cy="9144000"/>
@@ -179,7 +178,6 @@
             <p14:sldId id="311"/>
             <p14:sldId id="304"/>
             <p14:sldId id="308"/>
-            <p14:sldId id="307"/>
             <p14:sldId id="346"/>
           </p14:sldIdLst>
         </p14:section>
@@ -238,7 +236,7 @@
       </p14:sectionLst>
     </p:ext>
     <p:ext uri="{EFAFB233-063F-42B5-8137-9DF3F51BA10A}">
-      <p15:sldGuideLst xmlns:p15="http://schemas.microsoft.com/office/powerpoint/2012/main" xmlns="">
+      <p15:sldGuideLst xmlns="" xmlns:p15="http://schemas.microsoft.com/office/powerpoint/2012/main">
         <p15:guide id="1" orient="horz" pos="2160">
           <p15:clr>
             <a:srgbClr val="A4A3A4"/>
@@ -462,7 +460,7 @@
           <a:p>
             <a:fld id="{3E86CC0F-BBF3-4E07-94E0-0549B7D560A9}" type="datetimeFigureOut">
               <a:rPr lang="en-SG" smtClean="0"/>
-              <a:t>1/1/2015</a:t>
+              <a:t>19/3/2015</a:t>
             </a:fld>
             <a:endParaRPr lang="en-SG"/>
           </a:p>
@@ -990,90 +988,6 @@
 </p:notes>
 </file>
 
-<file path=ppt/notesSlides/notesSlide12.xml><?xml version="1.0" encoding="utf-8"?>
-<p:notes xmlns:a="http://schemas.openxmlformats.org/drawingml/2006/main" xmlns:r="http://schemas.openxmlformats.org/officeDocument/2006/relationships" xmlns:p="http://schemas.openxmlformats.org/presentationml/2006/main">
-  <p:cSld>
-    <p:spTree>
-      <p:nvGrpSpPr>
-        <p:cNvPr id="1" name=""/>
-        <p:cNvGrpSpPr/>
-        <p:nvPr/>
-      </p:nvGrpSpPr>
-      <p:grpSpPr>
-        <a:xfrm>
-          <a:off x="0" y="0"/>
-          <a:ext cx="0" cy="0"/>
-          <a:chOff x="0" y="0"/>
-          <a:chExt cx="0" cy="0"/>
-        </a:xfrm>
-      </p:grpSpPr>
-      <p:sp>
-        <p:nvSpPr>
-          <p:cNvPr id="2" name="Slide Image Placeholder 1"/>
-          <p:cNvSpPr>
-            <a:spLocks noGrp="1" noRot="1" noChangeAspect="1"/>
-          </p:cNvSpPr>
-          <p:nvPr>
-            <p:ph type="sldImg"/>
-          </p:nvPr>
-        </p:nvSpPr>
-        <p:spPr/>
-      </p:sp>
-      <p:sp>
-        <p:nvSpPr>
-          <p:cNvPr id="3" name="Notes Placeholder 2"/>
-          <p:cNvSpPr>
-            <a:spLocks noGrp="1"/>
-          </p:cNvSpPr>
-          <p:nvPr>
-            <p:ph type="body" idx="1"/>
-          </p:nvPr>
-        </p:nvSpPr>
-        <p:spPr/>
-        <p:txBody>
-          <a:bodyPr/>
-          <a:lstStyle/>
-          <a:p>
-            <a:endParaRPr lang="en-SG" dirty="0"/>
-          </a:p>
-        </p:txBody>
-      </p:sp>
-      <p:sp>
-        <p:nvSpPr>
-          <p:cNvPr id="4" name="Slide Number Placeholder 3"/>
-          <p:cNvSpPr>
-            <a:spLocks noGrp="1"/>
-          </p:cNvSpPr>
-          <p:nvPr>
-            <p:ph type="sldNum" sz="quarter" idx="10"/>
-          </p:nvPr>
-        </p:nvSpPr>
-        <p:spPr/>
-        <p:txBody>
-          <a:bodyPr/>
-          <a:lstStyle/>
-          <a:p>
-            <a:fld id="{0015B511-83B7-463E-ACD1-0C1C081EBBC4}" type="slidenum">
-              <a:rPr lang="en-SG" smtClean="0"/>
-              <a:t>39</a:t>
-            </a:fld>
-            <a:endParaRPr lang="en-SG"/>
-          </a:p>
-        </p:txBody>
-      </p:sp>
-    </p:spTree>
-    <p:extLst>
-      <p:ext uri="{BB962C8B-B14F-4D97-AF65-F5344CB8AC3E}">
-        <p14:creationId xmlns:p14="http://schemas.microsoft.com/office/powerpoint/2010/main" val="1548716900"/>
-      </p:ext>
-    </p:extLst>
-  </p:cSld>
-  <p:clrMapOvr>
-    <a:masterClrMapping/>
-  </p:clrMapOvr>
-</p:notes>
-</file>
-
 <file path=ppt/notesSlides/notesSlide2.xml><?xml version="1.0" encoding="utf-8"?>
 <p:notes xmlns:a="http://schemas.openxmlformats.org/drawingml/2006/main" xmlns:r="http://schemas.openxmlformats.org/officeDocument/2006/relationships" xmlns:p="http://schemas.openxmlformats.org/presentationml/2006/main">
   <p:cSld>
@@ -1120,12 +1034,28 @@
           <a:p>
             <a:r>
               <a:rPr lang="en-US" dirty="0" smtClean="0"/>
-              <a:t>Picture</a:t>
+              <a:t>This will</a:t>
             </a:r>
             <a:r>
               <a:rPr lang="en-US" baseline="0" dirty="0" smtClean="0"/>
-              <a:t> credit: Wikipedia</a:t>
-            </a:r>
+              <a:t> play at the beginning.</a:t>
+            </a:r>
+          </a:p>
+          <a:p>
+            <a:r>
+              <a:rPr lang="en-US" baseline="0" dirty="0" smtClean="0"/>
+              <a:t>[</a:t>
+            </a:r>
+            <a:r>
+              <a:rPr lang="en-US" baseline="0" dirty="0" err="1" smtClean="0"/>
+              <a:t>afterClick</a:t>
+            </a:r>
+            <a:r>
+              <a:rPr lang="en-US" baseline="0" dirty="0" smtClean="0"/>
+              <a:t>] This will play after you click.</a:t>
+            </a:r>
+          </a:p>
+          <a:p>
             <a:endParaRPr lang="en-SG" dirty="0"/>
           </a:p>
         </p:txBody>
@@ -1147,7 +1077,7 @@
           <a:p>
             <a:fld id="{0015B511-83B7-463E-ACD1-0C1C081EBBC4}" type="slidenum">
               <a:rPr lang="en-SG" smtClean="0"/>
-              <a:t>17</a:t>
+              <a:t>23</a:t>
             </a:fld>
             <a:endParaRPr lang="en-SG"/>
           </a:p>
@@ -1363,7 +1293,7 @@
           <a:p>
             <a:fld id="{0015B511-83B7-463E-ACD1-0C1C081EBBC4}" type="slidenum">
               <a:rPr lang="en-SG" smtClean="0"/>
-              <a:t>25</a:t>
+              <a:t>26</a:t>
             </a:fld>
             <a:endParaRPr lang="en-SG"/>
           </a:p>
@@ -1427,30 +1357,27 @@
           <a:lstStyle/>
           <a:p>
             <a:r>
-              <a:rPr lang="en-US" dirty="0" smtClean="0"/>
+              <a:rPr lang="en-US" altLang="zh-CN" dirty="0" smtClean="0"/>
               <a:t>This will</a:t>
             </a:r>
             <a:r>
-              <a:rPr lang="en-US" baseline="0" dirty="0" smtClean="0"/>
+              <a:rPr lang="en-US" altLang="zh-CN" baseline="0" dirty="0" smtClean="0"/>
               <a:t> play at the beginning.</a:t>
             </a:r>
           </a:p>
           <a:p>
             <a:r>
-              <a:rPr lang="en-US" baseline="0" dirty="0" smtClean="0"/>
+              <a:rPr lang="en-US" altLang="zh-CN" baseline="0" dirty="0" smtClean="0"/>
               <a:t>[</a:t>
             </a:r>
             <a:r>
-              <a:rPr lang="en-US" baseline="0" dirty="0" err="1" smtClean="0"/>
+              <a:rPr lang="en-US" altLang="zh-CN" baseline="0" dirty="0" err="1" smtClean="0"/>
               <a:t>afterClick</a:t>
             </a:r>
             <a:r>
-              <a:rPr lang="en-US" baseline="0" dirty="0" smtClean="0"/>
+              <a:rPr lang="en-US" altLang="zh-CN" baseline="0" dirty="0" smtClean="0"/>
               <a:t>] This will play after you click.</a:t>
             </a:r>
-          </a:p>
-          <a:p>
-            <a:endParaRPr lang="en-SG" dirty="0"/>
           </a:p>
         </p:txBody>
       </p:sp>
@@ -1480,7 +1407,7 @@
     </p:spTree>
     <p:extLst>
       <p:ext uri="{BB962C8B-B14F-4D97-AF65-F5344CB8AC3E}">
-        <p14:creationId xmlns:p14="http://schemas.microsoft.com/office/powerpoint/2010/main" val="1548716900"/>
+        <p14:creationId xmlns:p14="http://schemas.microsoft.com/office/powerpoint/2010/main" val="2911926025"/>
       </p:ext>
     </p:extLst>
   </p:cSld>
@@ -1534,28 +1461,7 @@
           <a:bodyPr/>
           <a:lstStyle/>
           <a:p>
-            <a:r>
-              <a:rPr lang="en-US" altLang="zh-CN" dirty="0" smtClean="0"/>
-              <a:t>This will</a:t>
-            </a:r>
-            <a:r>
-              <a:rPr lang="en-US" altLang="zh-CN" baseline="0" dirty="0" smtClean="0"/>
-              <a:t> play at the beginning.</a:t>
-            </a:r>
-          </a:p>
-          <a:p>
-            <a:r>
-              <a:rPr lang="en-US" altLang="zh-CN" baseline="0" dirty="0" smtClean="0"/>
-              <a:t>[</a:t>
-            </a:r>
-            <a:r>
-              <a:rPr lang="en-US" altLang="zh-CN" baseline="0" dirty="0" err="1" smtClean="0"/>
-              <a:t>afterClick</a:t>
-            </a:r>
-            <a:r>
-              <a:rPr lang="en-US" altLang="zh-CN" baseline="0" dirty="0" smtClean="0"/>
-              <a:t>] This will play after you click.</a:t>
-            </a:r>
+            <a:endParaRPr lang="en-SG" dirty="0"/>
           </a:p>
         </p:txBody>
       </p:sp>
@@ -1576,7 +1482,7 @@
           <a:p>
             <a:fld id="{0015B511-83B7-463E-ACD1-0C1C081EBBC4}" type="slidenum">
               <a:rPr lang="en-SG" smtClean="0"/>
-              <a:t>28</a:t>
+              <a:t>29</a:t>
             </a:fld>
             <a:endParaRPr lang="en-SG"/>
           </a:p>
@@ -1585,7 +1491,7 @@
     </p:spTree>
     <p:extLst>
       <p:ext uri="{BB962C8B-B14F-4D97-AF65-F5344CB8AC3E}">
-        <p14:creationId xmlns:p14="http://schemas.microsoft.com/office/powerpoint/2010/main" val="2911926025"/>
+        <p14:creationId xmlns:p14="http://schemas.microsoft.com/office/powerpoint/2010/main" val="2803535550"/>
       </p:ext>
     </p:extLst>
   </p:cSld>
@@ -1669,7 +1575,7 @@
     </p:spTree>
     <p:extLst>
       <p:ext uri="{BB962C8B-B14F-4D97-AF65-F5344CB8AC3E}">
-        <p14:creationId xmlns:p14="http://schemas.microsoft.com/office/powerpoint/2010/main" val="2803535550"/>
+        <p14:creationId xmlns:p14="http://schemas.microsoft.com/office/powerpoint/2010/main" val="1473495396"/>
       </p:ext>
     </p:extLst>
   </p:cSld>
@@ -1744,7 +1650,7 @@
           <a:p>
             <a:fld id="{0015B511-83B7-463E-ACD1-0C1C081EBBC4}" type="slidenum">
               <a:rPr lang="en-SG" smtClean="0"/>
-              <a:t>31</a:t>
+              <a:t>35</a:t>
             </a:fld>
             <a:endParaRPr lang="en-SG"/>
           </a:p>
@@ -1753,7 +1659,7 @@
     </p:spTree>
     <p:extLst>
       <p:ext uri="{BB962C8B-B14F-4D97-AF65-F5344CB8AC3E}">
-        <p14:creationId xmlns:p14="http://schemas.microsoft.com/office/powerpoint/2010/main" val="1473495396"/>
+        <p14:creationId xmlns:p14="http://schemas.microsoft.com/office/powerpoint/2010/main" val="1548716900"/>
       </p:ext>
     </p:extLst>
   </p:cSld>
@@ -2029,7 +1935,7 @@
             <a:fld id="{1D8BD707-D9CF-40AE-B4C6-C98DA3205C09}" type="datetimeFigureOut">
               <a:rPr lang="en-US" smtClean="0"/>
               <a:pPr/>
-              <a:t>1/1/2015</a:t>
+              <a:t>3/19/2015</a:t>
             </a:fld>
             <a:endParaRPr lang="en-US"/>
           </a:p>
@@ -2196,7 +2102,7 @@
             <a:fld id="{1D8BD707-D9CF-40AE-B4C6-C98DA3205C09}" type="datetimeFigureOut">
               <a:rPr lang="en-US" smtClean="0"/>
               <a:pPr/>
-              <a:t>1/1/2015</a:t>
+              <a:t>3/19/2015</a:t>
             </a:fld>
             <a:endParaRPr lang="en-US"/>
           </a:p>
@@ -2373,7 +2279,7 @@
             <a:fld id="{1D8BD707-D9CF-40AE-B4C6-C98DA3205C09}" type="datetimeFigureOut">
               <a:rPr lang="en-US" smtClean="0"/>
               <a:pPr/>
-              <a:t>1/1/2015</a:t>
+              <a:t>3/19/2015</a:t>
             </a:fld>
             <a:endParaRPr lang="en-US"/>
           </a:p>
@@ -2540,7 +2446,7 @@
             <a:fld id="{1D8BD707-D9CF-40AE-B4C6-C98DA3205C09}" type="datetimeFigureOut">
               <a:rPr lang="en-US" smtClean="0"/>
               <a:pPr/>
-              <a:t>1/1/2015</a:t>
+              <a:t>3/19/2015</a:t>
             </a:fld>
             <a:endParaRPr lang="en-US"/>
           </a:p>
@@ -2783,7 +2689,7 @@
             <a:fld id="{1D8BD707-D9CF-40AE-B4C6-C98DA3205C09}" type="datetimeFigureOut">
               <a:rPr lang="en-US" smtClean="0"/>
               <a:pPr/>
-              <a:t>1/1/2015</a:t>
+              <a:t>3/19/2015</a:t>
             </a:fld>
             <a:endParaRPr lang="en-US"/>
           </a:p>
@@ -3068,7 +2974,7 @@
             <a:fld id="{1D8BD707-D9CF-40AE-B4C6-C98DA3205C09}" type="datetimeFigureOut">
               <a:rPr lang="en-US" smtClean="0"/>
               <a:pPr/>
-              <a:t>1/1/2015</a:t>
+              <a:t>3/19/2015</a:t>
             </a:fld>
             <a:endParaRPr lang="en-US"/>
           </a:p>
@@ -3487,7 +3393,7 @@
             <a:fld id="{1D8BD707-D9CF-40AE-B4C6-C98DA3205C09}" type="datetimeFigureOut">
               <a:rPr lang="en-US" smtClean="0"/>
               <a:pPr/>
-              <a:t>1/1/2015</a:t>
+              <a:t>3/19/2015</a:t>
             </a:fld>
             <a:endParaRPr lang="en-US"/>
           </a:p>
@@ -3602,7 +3508,7 @@
             <a:fld id="{1D8BD707-D9CF-40AE-B4C6-C98DA3205C09}" type="datetimeFigureOut">
               <a:rPr lang="en-US" smtClean="0"/>
               <a:pPr/>
-              <a:t>1/1/2015</a:t>
+              <a:t>3/19/2015</a:t>
             </a:fld>
             <a:endParaRPr lang="en-US"/>
           </a:p>
@@ -3694,7 +3600,7 @@
             <a:fld id="{1D8BD707-D9CF-40AE-B4C6-C98DA3205C09}" type="datetimeFigureOut">
               <a:rPr lang="en-US" smtClean="0"/>
               <a:pPr/>
-              <a:t>1/1/2015</a:t>
+              <a:t>3/19/2015</a:t>
             </a:fld>
             <a:endParaRPr lang="en-US"/>
           </a:p>
@@ -3968,7 +3874,7 @@
             <a:fld id="{1D8BD707-D9CF-40AE-B4C6-C98DA3205C09}" type="datetimeFigureOut">
               <a:rPr lang="en-US" smtClean="0"/>
               <a:pPr/>
-              <a:t>1/1/2015</a:t>
+              <a:t>3/19/2015</a:t>
             </a:fld>
             <a:endParaRPr lang="en-US"/>
           </a:p>
@@ -4218,7 +4124,7 @@
             <a:fld id="{1D8BD707-D9CF-40AE-B4C6-C98DA3205C09}" type="datetimeFigureOut">
               <a:rPr lang="en-US" smtClean="0"/>
               <a:pPr/>
-              <a:t>1/1/2015</a:t>
+              <a:t>3/19/2015</a:t>
             </a:fld>
             <a:endParaRPr lang="en-US"/>
           </a:p>
@@ -4428,7 +4334,7 @@
             <a:fld id="{1D8BD707-D9CF-40AE-B4C6-C98DA3205C09}" type="datetimeFigureOut">
               <a:rPr lang="en-US" smtClean="0"/>
               <a:pPr/>
-              <a:t>1/1/2015</a:t>
+              <a:t>3/19/2015</a:t>
             </a:fld>
             <a:endParaRPr lang="en-US"/>
           </a:p>
@@ -5019,16 +4925,6 @@
                 </a:solidFill>
               </a14:hiddenFill>
             </a:ext>
-            <a:ext uri="{91240B29-F687-4F45-9708-019B960494DF}">
-              <a14:hiddenLine xmlns:a14="http://schemas.microsoft.com/office/drawing/2010/main" w="9525">
-                <a:solidFill>
-                  <a:schemeClr val="tx1"/>
-                </a:solidFill>
-                <a:miter lim="800000"/>
-                <a:headEnd/>
-                <a:tailEnd/>
-              </a14:hiddenLine>
-            </a:ext>
           </a:extLst>
         </p:spPr>
       </p:pic>
@@ -5204,37 +5100,7 @@
                   </a:schemeClr>
                 </a:solidFill>
               </a:rPr>
-              <a:t> You can also adjust the darkness (</a:t>
-            </a:r>
-            <a:r>
-              <a:rPr lang="en-US" dirty="0" smtClean="0">
-                <a:solidFill>
-                  <a:schemeClr val="accent6">
-                    <a:lumMod val="75000"/>
-                  </a:schemeClr>
-                </a:solidFill>
-              </a:rPr>
-              <a:t>transparency), softness of the edges, and the color </a:t>
-            </a:r>
-            <a:r>
-              <a:rPr lang="en-US" dirty="0" smtClean="0">
-                <a:solidFill>
-                  <a:schemeClr val="accent6">
-                    <a:lumMod val="75000"/>
-                  </a:schemeClr>
-                </a:solidFill>
-              </a:rPr>
-              <a:t>of the </a:t>
-            </a:r>
-            <a:r>
-              <a:rPr lang="en-US" dirty="0" smtClean="0">
-                <a:solidFill>
-                  <a:schemeClr val="accent6">
-                    <a:lumMod val="75000"/>
-                  </a:schemeClr>
-                </a:solidFill>
-              </a:rPr>
-              <a:t>spotlight</a:t>
+              <a:t> You can also adjust the darkness (transparency), softness of the edges, and the color of the spotlight</a:t>
             </a:r>
             <a:r>
               <a:rPr lang="en-US" dirty="0">
@@ -6717,11 +6583,11 @@
   <p:clrMapOvr>
     <a:masterClrMapping/>
   </p:clrMapOvr>
-  <mc:AlternateContent xmlns:mc="http://schemas.openxmlformats.org/markup-compatibility/2006">
-    <mc:Choice xmlns:p14="http://schemas.microsoft.com/office/powerpoint/2010/main" Requires="p14">
+  <mc:AlternateContent xmlns:mc="http://schemas.openxmlformats.org/markup-compatibility/2006" xmlns:p14="http://schemas.microsoft.com/office/powerpoint/2010/main">
+    <mc:Choice Requires="p14">
       <p:transition p14:dur="0"/>
     </mc:Choice>
-    <mc:Fallback>
+    <mc:Fallback xmlns="">
       <p:transition/>
     </mc:Fallback>
   </mc:AlternateContent>
@@ -8071,534 +7937,6 @@
         <p:blipFill rotWithShape="1">
           <a:blip r:embed="rId3">
             <a:duotone>
-              <a:schemeClr val="bg2">
-                <a:shade val="45000"/>
-                <a:satMod val="135000"/>
-              </a:schemeClr>
-              <a:prstClr val="white"/>
-            </a:duotone>
-            <a:extLst>
-              <a:ext uri="{28A0092B-C50C-407E-A947-70E740481C1C}">
-                <a14:useLocalDpi xmlns:a14="http://schemas.microsoft.com/office/drawing/2010/main" val="0"/>
-              </a:ext>
-            </a:extLst>
-          </a:blip>
-          <a:srcRect l="1320" t="1116" r="1244" b="19055"/>
-          <a:stretch/>
-        </p:blipFill>
-        <p:spPr bwMode="auto">
-          <a:xfrm>
-            <a:off x="1752600" y="1535278"/>
-            <a:ext cx="5487764" cy="3932649"/>
-          </a:xfrm>
-          <a:prstGeom prst="rect">
-            <a:avLst/>
-          </a:prstGeom>
-          <a:noFill/>
-          <a:extLst>
-            <a:ext uri="{909E8E84-426E-40DD-AFC4-6F175D3DCCD1}">
-              <a14:hiddenFill xmlns:a14="http://schemas.microsoft.com/office/drawing/2010/main">
-                <a:solidFill>
-                  <a:srgbClr val="FFFFFF"/>
-                </a:solidFill>
-              </a14:hiddenFill>
-            </a:ext>
-          </a:extLst>
-        </p:spPr>
-      </p:pic>
-      <p:sp>
-        <p:nvSpPr>
-          <p:cNvPr id="2" name="Flowchart: Connector 1"/>
-          <p:cNvSpPr/>
-          <p:nvPr/>
-        </p:nvSpPr>
-        <p:spPr>
-          <a:xfrm>
-            <a:off x="2895600" y="1567060"/>
-            <a:ext cx="796703" cy="796703"/>
-          </a:xfrm>
-          <a:prstGeom prst="flowChartConnector">
-            <a:avLst/>
-          </a:prstGeom>
-          <a:noFill/>
-          <a:ln w="38100">
-            <a:solidFill>
-              <a:srgbClr val="0070C0"/>
-            </a:solidFill>
-            <a:prstDash val="solid"/>
-          </a:ln>
-        </p:spPr>
-        <p:style>
-          <a:lnRef idx="2">
-            <a:schemeClr val="accent1">
-              <a:shade val="50000"/>
-            </a:schemeClr>
-          </a:lnRef>
-          <a:fillRef idx="1">
-            <a:schemeClr val="accent1"/>
-          </a:fillRef>
-          <a:effectRef idx="0">
-            <a:schemeClr val="accent1"/>
-          </a:effectRef>
-          <a:fontRef idx="minor">
-            <a:schemeClr val="lt1"/>
-          </a:fontRef>
-        </p:style>
-        <p:txBody>
-          <a:bodyPr rtlCol="0" anchor="ctr"/>
-          <a:lstStyle/>
-          <a:p>
-            <a:pPr algn="ctr"/>
-            <a:endParaRPr lang="en-SG"/>
-          </a:p>
-        </p:txBody>
-      </p:sp>
-      <p:sp>
-        <p:nvSpPr>
-          <p:cNvPr id="6" name="Flowchart: Connector 5"/>
-          <p:cNvSpPr>
-            <a:spLocks/>
-          </p:cNvSpPr>
-          <p:nvPr/>
-        </p:nvSpPr>
-        <p:spPr>
-          <a:xfrm>
-            <a:off x="3563888" y="3531588"/>
-            <a:ext cx="796703" cy="796703"/>
-          </a:xfrm>
-          <a:prstGeom prst="flowChartConnector">
-            <a:avLst/>
-          </a:prstGeom>
-          <a:noFill/>
-          <a:ln w="38100">
-            <a:solidFill>
-              <a:srgbClr val="0070C0"/>
-            </a:solidFill>
-            <a:prstDash val="solid"/>
-          </a:ln>
-        </p:spPr>
-        <p:style>
-          <a:lnRef idx="2">
-            <a:schemeClr val="accent1">
-              <a:shade val="50000"/>
-            </a:schemeClr>
-          </a:lnRef>
-          <a:fillRef idx="1">
-            <a:schemeClr val="accent1"/>
-          </a:fillRef>
-          <a:effectRef idx="0">
-            <a:schemeClr val="accent1"/>
-          </a:effectRef>
-          <a:fontRef idx="minor">
-            <a:schemeClr val="lt1"/>
-          </a:fontRef>
-        </p:style>
-        <p:txBody>
-          <a:bodyPr rtlCol="0" anchor="ctr"/>
-          <a:lstStyle/>
-          <a:p>
-            <a:pPr algn="ctr"/>
-            <a:endParaRPr lang="en-SG"/>
-          </a:p>
-        </p:txBody>
-      </p:sp>
-      <p:sp>
-        <p:nvSpPr>
-          <p:cNvPr id="11" name="Flowchart: Connector 10"/>
-          <p:cNvSpPr>
-            <a:spLocks/>
-          </p:cNvSpPr>
-          <p:nvPr/>
-        </p:nvSpPr>
-        <p:spPr>
-          <a:xfrm>
-            <a:off x="5334000" y="1585533"/>
-            <a:ext cx="796703" cy="796703"/>
-          </a:xfrm>
-          <a:prstGeom prst="flowChartConnector">
-            <a:avLst/>
-          </a:prstGeom>
-          <a:noFill/>
-          <a:ln w="38100">
-            <a:solidFill>
-              <a:srgbClr val="0070C0"/>
-            </a:solidFill>
-            <a:prstDash val="solid"/>
-          </a:ln>
-        </p:spPr>
-        <p:style>
-          <a:lnRef idx="2">
-            <a:schemeClr val="accent1">
-              <a:shade val="50000"/>
-            </a:schemeClr>
-          </a:lnRef>
-          <a:fillRef idx="1">
-            <a:schemeClr val="accent1"/>
-          </a:fillRef>
-          <a:effectRef idx="0">
-            <a:schemeClr val="accent1"/>
-          </a:effectRef>
-          <a:fontRef idx="minor">
-            <a:schemeClr val="lt1"/>
-          </a:fontRef>
-        </p:style>
-        <p:txBody>
-          <a:bodyPr rtlCol="0" anchor="ctr"/>
-          <a:lstStyle/>
-          <a:p>
-            <a:pPr algn="ctr"/>
-            <a:endParaRPr lang="en-SG"/>
-          </a:p>
-        </p:txBody>
-      </p:sp>
-      <p:sp>
-        <p:nvSpPr>
-          <p:cNvPr id="12" name="Flowchart: Connector 11"/>
-          <p:cNvSpPr>
-            <a:spLocks/>
-          </p:cNvSpPr>
-          <p:nvPr/>
-        </p:nvSpPr>
-        <p:spPr>
-          <a:xfrm>
-            <a:off x="5446627" y="3929939"/>
-            <a:ext cx="1368152" cy="1368152"/>
-          </a:xfrm>
-          <a:prstGeom prst="flowChartConnector">
-            <a:avLst/>
-          </a:prstGeom>
-          <a:noFill/>
-          <a:ln w="38100">
-            <a:solidFill>
-              <a:srgbClr val="0070C0"/>
-            </a:solidFill>
-            <a:prstDash val="solid"/>
-          </a:ln>
-        </p:spPr>
-        <p:style>
-          <a:lnRef idx="2">
-            <a:schemeClr val="accent1">
-              <a:shade val="50000"/>
-            </a:schemeClr>
-          </a:lnRef>
-          <a:fillRef idx="1">
-            <a:schemeClr val="accent1"/>
-          </a:fillRef>
-          <a:effectRef idx="0">
-            <a:schemeClr val="accent1"/>
-          </a:effectRef>
-          <a:fontRef idx="minor">
-            <a:schemeClr val="lt1"/>
-          </a:fontRef>
-        </p:style>
-        <p:txBody>
-          <a:bodyPr rtlCol="0" anchor="ctr"/>
-          <a:lstStyle/>
-          <a:p>
-            <a:pPr algn="ctr"/>
-            <a:endParaRPr lang="en-SG"/>
-          </a:p>
-        </p:txBody>
-      </p:sp>
-      <p:sp>
-        <p:nvSpPr>
-          <p:cNvPr id="7" name="TextBox 6"/>
-          <p:cNvSpPr txBox="1"/>
-          <p:nvPr/>
-        </p:nvSpPr>
-        <p:spPr>
-          <a:xfrm>
-            <a:off x="533400" y="479318"/>
-            <a:ext cx="8001000" cy="523220"/>
-          </a:xfrm>
-          <a:prstGeom prst="rect">
-            <a:avLst/>
-          </a:prstGeom>
-          <a:noFill/>
-        </p:spPr>
-        <p:txBody>
-          <a:bodyPr wrap="square" rtlCol="0">
-            <a:spAutoFit/>
-          </a:bodyPr>
-          <a:lstStyle/>
-          <a:p>
-            <a:r>
-              <a:rPr lang="en-US" sz="2800" b="1" dirty="0" smtClean="0">
-                <a:solidFill>
-                  <a:schemeClr val="accent6">
-                    <a:lumMod val="75000"/>
-                  </a:schemeClr>
-                </a:solidFill>
-              </a:rPr>
-              <a:t>1.</a:t>
-            </a:r>
-            <a:r>
-              <a:rPr lang="en-US" dirty="0" smtClean="0">
-                <a:solidFill>
-                  <a:schemeClr val="accent6">
-                    <a:lumMod val="75000"/>
-                  </a:schemeClr>
-                </a:solidFill>
-              </a:rPr>
-              <a:t> Select the four blue circles in any order (</a:t>
-            </a:r>
-            <a:r>
-              <a:rPr lang="en-US" dirty="0" err="1" smtClean="0">
-                <a:solidFill>
-                  <a:schemeClr val="accent6">
-                    <a:lumMod val="75000"/>
-                  </a:schemeClr>
-                </a:solidFill>
-              </a:rPr>
-              <a:t>Ctrl+click</a:t>
-            </a:r>
-            <a:r>
-              <a:rPr lang="en-US" dirty="0" smtClean="0">
-                <a:solidFill>
-                  <a:schemeClr val="accent6">
-                    <a:lumMod val="75000"/>
-                  </a:schemeClr>
-                </a:solidFill>
-              </a:rPr>
-              <a:t>) and click  the            button.</a:t>
-            </a:r>
-            <a:endParaRPr lang="en-SG" dirty="0">
-              <a:solidFill>
-                <a:schemeClr val="accent6">
-                  <a:lumMod val="75000"/>
-                </a:schemeClr>
-              </a:solidFill>
-            </a:endParaRPr>
-          </a:p>
-        </p:txBody>
-      </p:sp>
-      <p:pic>
-        <p:nvPicPr>
-          <p:cNvPr id="1026" name="Picture 2"/>
-          <p:cNvPicPr>
-            <a:picLocks noChangeAspect="1" noChangeArrowheads="1"/>
-          </p:cNvPicPr>
-          <p:nvPr/>
-        </p:nvPicPr>
-        <p:blipFill>
-          <a:blip r:embed="rId4">
-            <a:extLst>
-              <a:ext uri="{28A0092B-C50C-407E-A947-70E740481C1C}">
-                <a14:useLocalDpi xmlns:a14="http://schemas.microsoft.com/office/drawing/2010/main" val="0"/>
-              </a:ext>
-            </a:extLst>
-          </a:blip>
-          <a:srcRect/>
-          <a:stretch>
-            <a:fillRect/>
-          </a:stretch>
-        </p:blipFill>
-        <p:spPr bwMode="auto">
-          <a:xfrm>
-            <a:off x="6971691" y="509336"/>
-            <a:ext cx="466725" cy="657225"/>
-          </a:xfrm>
-          <a:prstGeom prst="rect">
-            <a:avLst/>
-          </a:prstGeom>
-          <a:noFill/>
-          <a:ln w="9525">
-            <a:solidFill>
-              <a:schemeClr val="bg1">
-                <a:lumMod val="85000"/>
-              </a:schemeClr>
-            </a:solidFill>
-            <a:miter lim="800000"/>
-            <a:headEnd/>
-            <a:tailEnd/>
-          </a:ln>
-          <a:extLst>
-            <a:ext uri="{909E8E84-426E-40DD-AFC4-6F175D3DCCD1}">
-              <a14:hiddenFill xmlns:a14="http://schemas.microsoft.com/office/drawing/2010/main">
-                <a:solidFill>
-                  <a:schemeClr val="accent1"/>
-                </a:solidFill>
-              </a14:hiddenFill>
-            </a:ext>
-          </a:extLst>
-        </p:spPr>
-      </p:pic>
-      <p:sp>
-        <p:nvSpPr>
-          <p:cNvPr id="9" name="TextBox 8"/>
-          <p:cNvSpPr txBox="1"/>
-          <p:nvPr/>
-        </p:nvSpPr>
-        <p:spPr>
-          <a:xfrm>
-            <a:off x="457200" y="6019800"/>
-            <a:ext cx="8534400" cy="800219"/>
-          </a:xfrm>
-          <a:prstGeom prst="rect">
-            <a:avLst/>
-          </a:prstGeom>
-          <a:noFill/>
-        </p:spPr>
-        <p:txBody>
-          <a:bodyPr wrap="square" rtlCol="0">
-            <a:spAutoFit/>
-          </a:bodyPr>
-          <a:lstStyle/>
-          <a:p>
-            <a:r>
-              <a:rPr lang="en-US" sz="2800" b="1" dirty="0" smtClean="0">
-                <a:solidFill>
-                  <a:schemeClr val="accent6">
-                    <a:lumMod val="75000"/>
-                  </a:schemeClr>
-                </a:solidFill>
-              </a:rPr>
-              <a:t>2.</a:t>
-            </a:r>
-            <a:r>
-              <a:rPr lang="en-US" dirty="0" smtClean="0">
-                <a:solidFill>
-                  <a:schemeClr val="accent6">
-                    <a:lumMod val="75000"/>
-                  </a:schemeClr>
-                </a:solidFill>
-              </a:rPr>
-              <a:t> When you ‘play’ the slide show (      ), you should see a single circle animated </a:t>
-            </a:r>
-            <a:br>
-              <a:rPr lang="en-US" dirty="0" smtClean="0">
-                <a:solidFill>
-                  <a:schemeClr val="accent6">
-                    <a:lumMod val="75000"/>
-                  </a:schemeClr>
-                </a:solidFill>
-              </a:rPr>
-            </a:br>
-            <a:r>
-              <a:rPr lang="en-US" dirty="0" smtClean="0">
-                <a:solidFill>
-                  <a:schemeClr val="accent6">
-                    <a:lumMod val="75000"/>
-                  </a:schemeClr>
-                </a:solidFill>
-              </a:rPr>
-              <a:t>           in the order you selected the four circles previously. </a:t>
-            </a:r>
-            <a:endParaRPr lang="en-SG" dirty="0">
-              <a:solidFill>
-                <a:schemeClr val="accent6">
-                  <a:lumMod val="75000"/>
-                </a:schemeClr>
-              </a:solidFill>
-            </a:endParaRPr>
-          </a:p>
-        </p:txBody>
-      </p:sp>
-      <p:pic>
-        <p:nvPicPr>
-          <p:cNvPr id="10" name="Picture 8"/>
-          <p:cNvPicPr>
-            <a:picLocks noChangeAspect="1" noChangeArrowheads="1"/>
-          </p:cNvPicPr>
-          <p:nvPr/>
-        </p:nvPicPr>
-        <p:blipFill>
-          <a:blip r:embed="rId5">
-            <a:extLst>
-              <a:ext uri="{28A0092B-C50C-407E-A947-70E740481C1C}">
-                <a14:useLocalDpi xmlns:a14="http://schemas.microsoft.com/office/drawing/2010/main" val="0"/>
-              </a:ext>
-            </a:extLst>
-          </a:blip>
-          <a:srcRect/>
-          <a:stretch>
-            <a:fillRect/>
-          </a:stretch>
-        </p:blipFill>
-        <p:spPr bwMode="auto">
-          <a:xfrm>
-            <a:off x="3902864" y="6188078"/>
-            <a:ext cx="304800" cy="286871"/>
-          </a:xfrm>
-          <a:prstGeom prst="rect">
-            <a:avLst/>
-          </a:prstGeom>
-          <a:noFill/>
-          <a:ln>
-            <a:noFill/>
-          </a:ln>
-          <a:effectLst>
-            <a:softEdge rad="31750"/>
-          </a:effectLst>
-          <a:extLst>
-            <a:ext uri="{909E8E84-426E-40DD-AFC4-6F175D3DCCD1}">
-              <a14:hiddenFill xmlns:a14="http://schemas.microsoft.com/office/drawing/2010/main">
-                <a:solidFill>
-                  <a:schemeClr val="accent1"/>
-                </a:solidFill>
-              </a14:hiddenFill>
-            </a:ext>
-            <a:ext uri="{91240B29-F687-4F45-9708-019B960494DF}">
-              <a14:hiddenLine xmlns:a14="http://schemas.microsoft.com/office/drawing/2010/main" w="9525">
-                <a:solidFill>
-                  <a:schemeClr val="tx1"/>
-                </a:solidFill>
-                <a:miter lim="800000"/>
-                <a:headEnd/>
-                <a:tailEnd/>
-              </a14:hiddenLine>
-            </a:ext>
-          </a:extLst>
-        </p:spPr>
-      </p:pic>
-    </p:spTree>
-    <p:extLst>
-      <p:ext uri="{BB962C8B-B14F-4D97-AF65-F5344CB8AC3E}">
-        <p14:creationId xmlns:p14="http://schemas.microsoft.com/office/powerpoint/2010/main" val="2496893479"/>
-      </p:ext>
-    </p:extLst>
-  </p:cSld>
-  <p:clrMapOvr>
-    <a:masterClrMapping/>
-  </p:clrMapOvr>
-  <p:timing>
-    <p:tnLst>
-      <p:par>
-        <p:cTn id="1" dur="indefinite" restart="never" nodeType="tmRoot"/>
-      </p:par>
-    </p:tnLst>
-  </p:timing>
-</p:sld>
-</file>
-
-<file path=ppt/slides/slide17.xml><?xml version="1.0" encoding="utf-8"?>
-<p:sld xmlns:a="http://schemas.openxmlformats.org/drawingml/2006/main" xmlns:r="http://schemas.openxmlformats.org/officeDocument/2006/relationships" xmlns:p="http://schemas.openxmlformats.org/presentationml/2006/main">
-  <p:cSld>
-    <p:spTree>
-      <p:nvGrpSpPr>
-        <p:cNvPr id="1" name=""/>
-        <p:cNvGrpSpPr/>
-        <p:nvPr/>
-      </p:nvGrpSpPr>
-      <p:grpSpPr>
-        <a:xfrm>
-          <a:off x="0" y="0"/>
-          <a:ext cx="0" cy="0"/>
-          <a:chOff x="0" y="0"/>
-          <a:chExt cx="0" cy="0"/>
-        </a:xfrm>
-      </p:grpSpPr>
-      <p:pic>
-        <p:nvPicPr>
-          <p:cNvPr id="5122" name="Picture 2" descr="File:AmineTreating.png"/>
-          <p:cNvPicPr>
-            <a:picLocks noChangeAspect="1" noChangeArrowheads="1"/>
-          </p:cNvPicPr>
-          <p:nvPr/>
-        </p:nvPicPr>
-        <p:blipFill rotWithShape="1">
-          <a:blip r:embed="rId3">
-            <a:duotone>
               <a:prstClr val="black"/>
               <a:schemeClr val="accent6">
                 <a:tint val="45000"/>
@@ -9119,7 +8457,7 @@
 </p:sld>
 </file>
 
-<file path=ppt/slides/slide18.xml><?xml version="1.0" encoding="utf-8"?>
+<file path=ppt/slides/slide17.xml><?xml version="1.0" encoding="utf-8"?>
 <p:sld xmlns:a="http://schemas.openxmlformats.org/drawingml/2006/main" xmlns:r="http://schemas.openxmlformats.org/officeDocument/2006/relationships" xmlns:p="http://schemas.openxmlformats.org/presentationml/2006/main">
   <p:cSld>
     <p:spTree>
@@ -10372,7 +9710,7 @@
 </p:sld>
 </file>
 
-<file path=ppt/slides/slide19.xml><?xml version="1.0" encoding="utf-8"?>
+<file path=ppt/slides/slide18.xml><?xml version="1.0" encoding="utf-8"?>
 <p:sld xmlns:a="http://schemas.openxmlformats.org/drawingml/2006/main" xmlns:r="http://schemas.openxmlformats.org/officeDocument/2006/relationships" xmlns:p="http://schemas.openxmlformats.org/presentationml/2006/main">
   <p:cSld>
     <p:spTree>
@@ -11416,233 +10754,7 @@
 </p:sld>
 </file>
 
-<file path=ppt/slides/slide2.xml><?xml version="1.0" encoding="utf-8"?>
-<p:sld xmlns:a="http://schemas.openxmlformats.org/drawingml/2006/main" xmlns:r="http://schemas.openxmlformats.org/officeDocument/2006/relationships" xmlns:p="http://schemas.openxmlformats.org/presentationml/2006/main">
-  <p:cSld>
-    <p:spTree>
-      <p:nvGrpSpPr>
-        <p:cNvPr id="1" name=""/>
-        <p:cNvGrpSpPr/>
-        <p:nvPr/>
-      </p:nvGrpSpPr>
-      <p:grpSpPr>
-        <a:xfrm>
-          <a:off x="0" y="0"/>
-          <a:ext cx="0" cy="0"/>
-          <a:chOff x="0" y="0"/>
-          <a:chExt cx="0" cy="0"/>
-        </a:xfrm>
-      </p:grpSpPr>
-      <p:sp>
-        <p:nvSpPr>
-          <p:cNvPr id="4" name="TextBox 3"/>
-          <p:cNvSpPr txBox="1"/>
-          <p:nvPr/>
-        </p:nvSpPr>
-        <p:spPr>
-          <a:xfrm>
-            <a:off x="533400" y="479318"/>
-            <a:ext cx="8001000" cy="369332"/>
-          </a:xfrm>
-          <a:prstGeom prst="rect">
-            <a:avLst/>
-          </a:prstGeom>
-          <a:noFill/>
-        </p:spPr>
-        <p:txBody>
-          <a:bodyPr wrap="square" rtlCol="0">
-            <a:spAutoFit/>
-          </a:bodyPr>
-          <a:lstStyle/>
-          <a:p>
-            <a:r>
-              <a:rPr lang="en-US" dirty="0" smtClean="0">
-                <a:solidFill>
-                  <a:schemeClr val="accent6">
-                    <a:lumMod val="75000"/>
-                  </a:schemeClr>
-                </a:solidFill>
-              </a:rPr>
-              <a:t>Please go through this tutorial in the ‘edit’ mode, not ‘slideshow’ mode. </a:t>
-            </a:r>
-            <a:endParaRPr lang="en-SG" dirty="0">
-              <a:solidFill>
-                <a:schemeClr val="accent6">
-                  <a:lumMod val="75000"/>
-                </a:schemeClr>
-              </a:solidFill>
-            </a:endParaRPr>
-          </a:p>
-        </p:txBody>
-      </p:sp>
-      <p:pic>
-        <p:nvPicPr>
-          <p:cNvPr id="4099" name="Picture 3"/>
-          <p:cNvPicPr>
-            <a:picLocks noChangeAspect="1" noChangeArrowheads="1"/>
-          </p:cNvPicPr>
-          <p:nvPr/>
-        </p:nvPicPr>
-        <p:blipFill>
-          <a:blip r:embed="rId2">
-            <a:extLst>
-              <a:ext uri="{28A0092B-C50C-407E-A947-70E740481C1C}">
-                <a14:useLocalDpi xmlns:a14="http://schemas.microsoft.com/office/drawing/2010/main" val="0"/>
-              </a:ext>
-            </a:extLst>
-          </a:blip>
-          <a:srcRect/>
-          <a:stretch>
-            <a:fillRect/>
-          </a:stretch>
-        </p:blipFill>
-        <p:spPr bwMode="auto">
-          <a:xfrm>
-            <a:off x="914400" y="1351584"/>
-            <a:ext cx="5943600" cy="2547257"/>
-          </a:xfrm>
-          <a:prstGeom prst="rect">
-            <a:avLst/>
-          </a:prstGeom>
-          <a:noFill/>
-          <a:ln>
-            <a:noFill/>
-          </a:ln>
-          <a:extLst>
-            <a:ext uri="{909E8E84-426E-40DD-AFC4-6F175D3DCCD1}">
-              <a14:hiddenFill xmlns:a14="http://schemas.microsoft.com/office/drawing/2010/main">
-                <a:solidFill>
-                  <a:schemeClr val="accent1"/>
-                </a:solidFill>
-              </a14:hiddenFill>
-            </a:ext>
-            <a:ext uri="{91240B29-F687-4F45-9708-019B960494DF}">
-              <a14:hiddenLine xmlns:a14="http://schemas.microsoft.com/office/drawing/2010/main" w="9525">
-                <a:solidFill>
-                  <a:schemeClr val="tx1"/>
-                </a:solidFill>
-                <a:miter lim="800000"/>
-                <a:headEnd/>
-                <a:tailEnd/>
-              </a14:hiddenLine>
-            </a:ext>
-          </a:extLst>
-        </p:spPr>
-      </p:pic>
-      <p:pic>
-        <p:nvPicPr>
-          <p:cNvPr id="4100" name="Picture 4"/>
-          <p:cNvPicPr>
-            <a:picLocks noChangeAspect="1" noChangeArrowheads="1"/>
-          </p:cNvPicPr>
-          <p:nvPr/>
-        </p:nvPicPr>
-        <p:blipFill>
-          <a:blip r:embed="rId3">
-            <a:extLst>
-              <a:ext uri="{28A0092B-C50C-407E-A947-70E740481C1C}">
-                <a14:useLocalDpi xmlns:a14="http://schemas.microsoft.com/office/drawing/2010/main" val="0"/>
-              </a:ext>
-            </a:extLst>
-          </a:blip>
-          <a:srcRect/>
-          <a:stretch>
-            <a:fillRect/>
-          </a:stretch>
-        </p:blipFill>
-        <p:spPr bwMode="auto">
-          <a:xfrm>
-            <a:off x="2057400" y="4572000"/>
-            <a:ext cx="5886450" cy="1495425"/>
-          </a:xfrm>
-          <a:prstGeom prst="rect">
-            <a:avLst/>
-          </a:prstGeom>
-          <a:noFill/>
-          <a:ln>
-            <a:noFill/>
-          </a:ln>
-          <a:extLst>
-            <a:ext uri="{909E8E84-426E-40DD-AFC4-6F175D3DCCD1}">
-              <a14:hiddenFill xmlns:a14="http://schemas.microsoft.com/office/drawing/2010/main">
-                <a:solidFill>
-                  <a:schemeClr val="accent1"/>
-                </a:solidFill>
-              </a14:hiddenFill>
-            </a:ext>
-            <a:ext uri="{91240B29-F687-4F45-9708-019B960494DF}">
-              <a14:hiddenLine xmlns:a14="http://schemas.microsoft.com/office/drawing/2010/main" w="9525">
-                <a:solidFill>
-                  <a:schemeClr val="tx1"/>
-                </a:solidFill>
-                <a:miter lim="800000"/>
-                <a:headEnd/>
-                <a:tailEnd/>
-              </a14:hiddenLine>
-            </a:ext>
-          </a:extLst>
-        </p:spPr>
-      </p:pic>
-      <mc:AlternateContent xmlns:mc="http://schemas.openxmlformats.org/markup-compatibility/2006" xmlns:p14="http://schemas.microsoft.com/office/powerpoint/2010/main">
-        <mc:Choice Requires="p14">
-          <p:contentPart p14:bwMode="auto" r:id="rId4">
-            <p14:nvContentPartPr>
-              <p14:cNvPr id="7" name="Ink 6"/>
-              <p14:cNvContentPartPr/>
-              <p14:nvPr/>
-            </p14:nvContentPartPr>
-            <p14:xfrm rot="14982472">
-              <a:off x="4609435" y="5997540"/>
-              <a:ext cx="414720" cy="761040"/>
-            </p14:xfrm>
-          </p:contentPart>
-        </mc:Choice>
-        <mc:Fallback xmlns="">
-          <p:pic>
-            <p:nvPicPr>
-              <p:cNvPr id="7" name="Ink 6"/>
-              <p:cNvPicPr/>
-              <p:nvPr/>
-            </p:nvPicPr>
-            <p:blipFill>
-              <a:blip r:embed="rId5"/>
-              <a:stretch>
-                <a:fillRect/>
-              </a:stretch>
-            </p:blipFill>
-            <p:spPr>
-              <a:xfrm rot="14982472">
-                <a:off x="4584235" y="5981700"/>
-                <a:ext cx="470160" cy="807120"/>
-              </a:xfrm>
-              <a:prstGeom prst="rect">
-                <a:avLst/>
-              </a:prstGeom>
-            </p:spPr>
-          </p:pic>
-        </mc:Fallback>
-      </mc:AlternateContent>
-    </p:spTree>
-    <p:extLst>
-      <p:ext uri="{BB962C8B-B14F-4D97-AF65-F5344CB8AC3E}">
-        <p14:creationId xmlns:p14="http://schemas.microsoft.com/office/powerpoint/2010/main" val="2489789640"/>
-      </p:ext>
-    </p:extLst>
-  </p:cSld>
-  <p:clrMapOvr>
-    <a:masterClrMapping/>
-  </p:clrMapOvr>
-  <p:timing>
-    <p:tnLst>
-      <p:par>
-        <p:cTn id="1" dur="indefinite" restart="never" nodeType="tmRoot"/>
-      </p:par>
-    </p:tnLst>
-  </p:timing>
-</p:sld>
-</file>
-
-<file path=ppt/slides/slide20.xml><?xml version="1.0" encoding="utf-8"?>
+<file path=ppt/slides/slide19.xml><?xml version="1.0" encoding="utf-8"?>
 <p:sld xmlns:a="http://schemas.openxmlformats.org/drawingml/2006/main" xmlns:r="http://schemas.openxmlformats.org/officeDocument/2006/relationships" xmlns:p="http://schemas.openxmlformats.org/presentationml/2006/main">
   <p:cSld>
     <p:spTree>
@@ -12746,7 +11858,233 @@
 </p:sld>
 </file>
 
-<file path=ppt/slides/slide21.xml><?xml version="1.0" encoding="utf-8"?>
+<file path=ppt/slides/slide2.xml><?xml version="1.0" encoding="utf-8"?>
+<p:sld xmlns:a="http://schemas.openxmlformats.org/drawingml/2006/main" xmlns:r="http://schemas.openxmlformats.org/officeDocument/2006/relationships" xmlns:p="http://schemas.openxmlformats.org/presentationml/2006/main">
+  <p:cSld>
+    <p:spTree>
+      <p:nvGrpSpPr>
+        <p:cNvPr id="1" name=""/>
+        <p:cNvGrpSpPr/>
+        <p:nvPr/>
+      </p:nvGrpSpPr>
+      <p:grpSpPr>
+        <a:xfrm>
+          <a:off x="0" y="0"/>
+          <a:ext cx="0" cy="0"/>
+          <a:chOff x="0" y="0"/>
+          <a:chExt cx="0" cy="0"/>
+        </a:xfrm>
+      </p:grpSpPr>
+      <p:sp>
+        <p:nvSpPr>
+          <p:cNvPr id="4" name="TextBox 3"/>
+          <p:cNvSpPr txBox="1"/>
+          <p:nvPr/>
+        </p:nvSpPr>
+        <p:spPr>
+          <a:xfrm>
+            <a:off x="533400" y="479318"/>
+            <a:ext cx="8001000" cy="369332"/>
+          </a:xfrm>
+          <a:prstGeom prst="rect">
+            <a:avLst/>
+          </a:prstGeom>
+          <a:noFill/>
+        </p:spPr>
+        <p:txBody>
+          <a:bodyPr wrap="square" rtlCol="0">
+            <a:spAutoFit/>
+          </a:bodyPr>
+          <a:lstStyle/>
+          <a:p>
+            <a:r>
+              <a:rPr lang="en-US" dirty="0" smtClean="0">
+                <a:solidFill>
+                  <a:schemeClr val="accent6">
+                    <a:lumMod val="75000"/>
+                  </a:schemeClr>
+                </a:solidFill>
+              </a:rPr>
+              <a:t>Please go through this tutorial in the ‘edit’ mode, not ‘slideshow’ mode. </a:t>
+            </a:r>
+            <a:endParaRPr lang="en-SG" dirty="0">
+              <a:solidFill>
+                <a:schemeClr val="accent6">
+                  <a:lumMod val="75000"/>
+                </a:schemeClr>
+              </a:solidFill>
+            </a:endParaRPr>
+          </a:p>
+        </p:txBody>
+      </p:sp>
+      <p:pic>
+        <p:nvPicPr>
+          <p:cNvPr id="4099" name="Picture 3"/>
+          <p:cNvPicPr>
+            <a:picLocks noChangeAspect="1" noChangeArrowheads="1"/>
+          </p:cNvPicPr>
+          <p:nvPr/>
+        </p:nvPicPr>
+        <p:blipFill>
+          <a:blip r:embed="rId2">
+            <a:extLst>
+              <a:ext uri="{28A0092B-C50C-407E-A947-70E740481C1C}">
+                <a14:useLocalDpi xmlns:a14="http://schemas.microsoft.com/office/drawing/2010/main" val="0"/>
+              </a:ext>
+            </a:extLst>
+          </a:blip>
+          <a:srcRect/>
+          <a:stretch>
+            <a:fillRect/>
+          </a:stretch>
+        </p:blipFill>
+        <p:spPr bwMode="auto">
+          <a:xfrm>
+            <a:off x="914400" y="1351584"/>
+            <a:ext cx="5943600" cy="2547257"/>
+          </a:xfrm>
+          <a:prstGeom prst="rect">
+            <a:avLst/>
+          </a:prstGeom>
+          <a:noFill/>
+          <a:ln>
+            <a:noFill/>
+          </a:ln>
+          <a:extLst>
+            <a:ext uri="{909E8E84-426E-40DD-AFC4-6F175D3DCCD1}">
+              <a14:hiddenFill xmlns:a14="http://schemas.microsoft.com/office/drawing/2010/main">
+                <a:solidFill>
+                  <a:schemeClr val="accent1"/>
+                </a:solidFill>
+              </a14:hiddenFill>
+            </a:ext>
+            <a:ext uri="{91240B29-F687-4F45-9708-019B960494DF}">
+              <a14:hiddenLine xmlns:a14="http://schemas.microsoft.com/office/drawing/2010/main" w="9525">
+                <a:solidFill>
+                  <a:schemeClr val="tx1"/>
+                </a:solidFill>
+                <a:miter lim="800000"/>
+                <a:headEnd/>
+                <a:tailEnd/>
+              </a14:hiddenLine>
+            </a:ext>
+          </a:extLst>
+        </p:spPr>
+      </p:pic>
+      <p:pic>
+        <p:nvPicPr>
+          <p:cNvPr id="4100" name="Picture 4"/>
+          <p:cNvPicPr>
+            <a:picLocks noChangeAspect="1" noChangeArrowheads="1"/>
+          </p:cNvPicPr>
+          <p:nvPr/>
+        </p:nvPicPr>
+        <p:blipFill>
+          <a:blip r:embed="rId3">
+            <a:extLst>
+              <a:ext uri="{28A0092B-C50C-407E-A947-70E740481C1C}">
+                <a14:useLocalDpi xmlns:a14="http://schemas.microsoft.com/office/drawing/2010/main" val="0"/>
+              </a:ext>
+            </a:extLst>
+          </a:blip>
+          <a:srcRect/>
+          <a:stretch>
+            <a:fillRect/>
+          </a:stretch>
+        </p:blipFill>
+        <p:spPr bwMode="auto">
+          <a:xfrm>
+            <a:off x="2057400" y="4572000"/>
+            <a:ext cx="5886450" cy="1495425"/>
+          </a:xfrm>
+          <a:prstGeom prst="rect">
+            <a:avLst/>
+          </a:prstGeom>
+          <a:noFill/>
+          <a:ln>
+            <a:noFill/>
+          </a:ln>
+          <a:extLst>
+            <a:ext uri="{909E8E84-426E-40DD-AFC4-6F175D3DCCD1}">
+              <a14:hiddenFill xmlns:a14="http://schemas.microsoft.com/office/drawing/2010/main">
+                <a:solidFill>
+                  <a:schemeClr val="accent1"/>
+                </a:solidFill>
+              </a14:hiddenFill>
+            </a:ext>
+            <a:ext uri="{91240B29-F687-4F45-9708-019B960494DF}">
+              <a14:hiddenLine xmlns:a14="http://schemas.microsoft.com/office/drawing/2010/main" w="9525">
+                <a:solidFill>
+                  <a:schemeClr val="tx1"/>
+                </a:solidFill>
+                <a:miter lim="800000"/>
+                <a:headEnd/>
+                <a:tailEnd/>
+              </a14:hiddenLine>
+            </a:ext>
+          </a:extLst>
+        </p:spPr>
+      </p:pic>
+      <mc:AlternateContent xmlns:mc="http://schemas.openxmlformats.org/markup-compatibility/2006" xmlns:p14="http://schemas.microsoft.com/office/powerpoint/2010/main">
+        <mc:Choice Requires="p14">
+          <p:contentPart p14:bwMode="auto" r:id="rId4">
+            <p14:nvContentPartPr>
+              <p14:cNvPr id="7" name="Ink 6"/>
+              <p14:cNvContentPartPr/>
+              <p14:nvPr/>
+            </p14:nvContentPartPr>
+            <p14:xfrm rot="14982472">
+              <a:off x="4609435" y="5997540"/>
+              <a:ext cx="414720" cy="761040"/>
+            </p14:xfrm>
+          </p:contentPart>
+        </mc:Choice>
+        <mc:Fallback xmlns="">
+          <p:pic>
+            <p:nvPicPr>
+              <p:cNvPr id="7" name="Ink 6"/>
+              <p:cNvPicPr/>
+              <p:nvPr/>
+            </p:nvPicPr>
+            <p:blipFill>
+              <a:blip r:embed="rId5"/>
+              <a:stretch>
+                <a:fillRect/>
+              </a:stretch>
+            </p:blipFill>
+            <p:spPr>
+              <a:xfrm rot="14982472">
+                <a:off x="4584235" y="5981700"/>
+                <a:ext cx="470160" cy="807120"/>
+              </a:xfrm>
+              <a:prstGeom prst="rect">
+                <a:avLst/>
+              </a:prstGeom>
+            </p:spPr>
+          </p:pic>
+        </mc:Fallback>
+      </mc:AlternateContent>
+    </p:spTree>
+    <p:extLst>
+      <p:ext uri="{BB962C8B-B14F-4D97-AF65-F5344CB8AC3E}">
+        <p14:creationId xmlns:p14="http://schemas.microsoft.com/office/powerpoint/2010/main" val="2489789640"/>
+      </p:ext>
+    </p:extLst>
+  </p:cSld>
+  <p:clrMapOvr>
+    <a:masterClrMapping/>
+  </p:clrMapOvr>
+  <p:timing>
+    <p:tnLst>
+      <p:par>
+        <p:cTn id="1" dur="indefinite" restart="never" nodeType="tmRoot"/>
+      </p:par>
+    </p:tnLst>
+  </p:timing>
+</p:sld>
+</file>
+
+<file path=ppt/slides/slide20.xml><?xml version="1.0" encoding="utf-8"?>
 <p:sld xmlns:a="http://schemas.openxmlformats.org/drawingml/2006/main" xmlns:r="http://schemas.openxmlformats.org/officeDocument/2006/relationships" xmlns:p="http://schemas.openxmlformats.org/presentationml/2006/main">
   <p:cSld>
     <p:bg>
@@ -13292,7 +12630,7 @@
 </p:sld>
 </file>
 
-<file path=ppt/slides/slide22.xml><?xml version="1.0" encoding="utf-8"?>
+<file path=ppt/slides/slide21.xml><?xml version="1.0" encoding="utf-8"?>
 <p:sld xmlns:a="http://schemas.openxmlformats.org/drawingml/2006/main" xmlns:r="http://schemas.openxmlformats.org/officeDocument/2006/relationships" xmlns:p="http://schemas.openxmlformats.org/presentationml/2006/main">
   <p:cSld>
     <p:spTree>
@@ -14347,7 +13685,7 @@
 </p:sld>
 </file>
 
-<file path=ppt/slides/slide23.xml><?xml version="1.0" encoding="utf-8"?>
+<file path=ppt/slides/slide22.xml><?xml version="1.0" encoding="utf-8"?>
 <p:sld xmlns:a="http://schemas.openxmlformats.org/drawingml/2006/main" xmlns:r="http://schemas.openxmlformats.org/officeDocument/2006/relationships" xmlns:p="http://schemas.openxmlformats.org/presentationml/2006/main">
   <p:cSld>
     <p:spTree>
@@ -14739,7 +14077,7 @@
 </p:sld>
 </file>
 
-<file path=ppt/slides/slide24.xml><?xml version="1.0" encoding="utf-8"?>
+<file path=ppt/slides/slide23.xml><?xml version="1.0" encoding="utf-8"?>
 <p:sld xmlns:a="http://schemas.openxmlformats.org/drawingml/2006/main" xmlns:r="http://schemas.openxmlformats.org/officeDocument/2006/relationships" xmlns:p="http://schemas.openxmlformats.org/presentationml/2006/main">
   <p:cSld>
     <p:spTree>
@@ -15329,7 +14667,7 @@
 </p:sld>
 </file>
 
-<file path=ppt/slides/slide25.xml><?xml version="1.0" encoding="utf-8"?>
+<file path=ppt/slides/slide24.xml><?xml version="1.0" encoding="utf-8"?>
 <p:sld xmlns:a="http://schemas.openxmlformats.org/drawingml/2006/main" xmlns:r="http://schemas.openxmlformats.org/officeDocument/2006/relationships" xmlns:p="http://schemas.openxmlformats.org/presentationml/2006/main">
   <p:cSld>
     <p:spTree>
@@ -15616,7 +14954,7 @@
 </p:sld>
 </file>
 
-<file path=ppt/slides/slide26.xml><?xml version="1.0" encoding="utf-8"?>
+<file path=ppt/slides/slide25.xml><?xml version="1.0" encoding="utf-8"?>
 <p:sld xmlns:a="http://schemas.openxmlformats.org/drawingml/2006/main" xmlns:r="http://schemas.openxmlformats.org/officeDocument/2006/relationships" xmlns:p="http://schemas.openxmlformats.org/presentationml/2006/main">
   <p:cSld>
     <p:spTree>
@@ -16261,7 +15599,7 @@
 </p:sld>
 </file>
 
-<file path=ppt/slides/slide27.xml><?xml version="1.0" encoding="utf-8"?>
+<file path=ppt/slides/slide26.xml><?xml version="1.0" encoding="utf-8"?>
 <p:sld xmlns:a="http://schemas.openxmlformats.org/drawingml/2006/main" xmlns:r="http://schemas.openxmlformats.org/officeDocument/2006/relationships" xmlns:p="http://schemas.openxmlformats.org/presentationml/2006/main">
   <p:cSld>
     <p:spTree>
@@ -16589,17 +15927,7 @@
                   </a:schemeClr>
                 </a:solidFill>
               </a:rPr>
-              <a:t>Play again to experience both audio and captions at the same time</a:t>
-            </a:r>
-            <a:r>
-              <a:rPr lang="en-US" dirty="0" smtClean="0">
-                <a:solidFill>
-                  <a:schemeClr val="accent6">
-                    <a:lumMod val="75000"/>
-                  </a:schemeClr>
-                </a:solidFill>
-              </a:rPr>
-              <a:t>.</a:t>
+              <a:t>Play again to experience both audio and captions at the same time.</a:t>
             </a:r>
           </a:p>
           <a:p>
@@ -16713,7 +16041,7 @@
 </p:sld>
 </file>
 
-<file path=ppt/slides/slide28.xml><?xml version="1.0" encoding="utf-8"?>
+<file path=ppt/slides/slide27.xml><?xml version="1.0" encoding="utf-8"?>
 <p:sld xmlns:a="http://schemas.openxmlformats.org/drawingml/2006/main" xmlns:r="http://schemas.openxmlformats.org/officeDocument/2006/relationships" xmlns:p="http://schemas.openxmlformats.org/presentationml/2006/main">
   <p:cSld>
     <p:spTree>
@@ -16770,55 +16098,8 @@
                   </a:schemeClr>
                 </a:solidFill>
               </a:rPr>
-              <a:t> To record an </a:t>
-            </a:r>
-            <a:r>
-              <a:rPr lang="en-US" dirty="0" smtClean="0">
-                <a:solidFill>
-                  <a:schemeClr val="accent6">
-                    <a:lumMod val="75000"/>
-                  </a:schemeClr>
-                </a:solidFill>
-              </a:rPr>
-              <a:t>audio in your own voice, </a:t>
-            </a:r>
-            <a:r>
-              <a:rPr lang="en-US" dirty="0" smtClean="0">
-                <a:solidFill>
-                  <a:schemeClr val="accent6">
-                    <a:lumMod val="75000"/>
-                  </a:schemeClr>
-                </a:solidFill>
-              </a:rPr>
-              <a:t>click the drop down menu </a:t>
-            </a:r>
-            <a:r>
-              <a:rPr lang="en-US" dirty="0" smtClean="0">
-                <a:solidFill>
-                  <a:schemeClr val="accent6">
-                    <a:lumMod val="75000"/>
-                  </a:schemeClr>
-                </a:solidFill>
-              </a:rPr>
-              <a:t> of                 </a:t>
-            </a:r>
-            <a:r>
-              <a:rPr lang="en-US" dirty="0" smtClean="0">
-                <a:solidFill>
-                  <a:schemeClr val="accent6">
-                    <a:lumMod val="75000"/>
-                  </a:schemeClr>
-                </a:solidFill>
-              </a:rPr>
-              <a:t>button. </a:t>
-            </a:r>
-            <a:endParaRPr lang="en-US" dirty="0" smtClean="0">
-              <a:solidFill>
-                <a:schemeClr val="accent6">
-                  <a:lumMod val="75000"/>
-                </a:schemeClr>
-              </a:solidFill>
-            </a:endParaRPr>
+              <a:t> To record an audio in your own voice, click the drop down menu  of                 button. </a:t>
+            </a:r>
           </a:p>
           <a:p>
             <a:endParaRPr lang="en-US" dirty="0" smtClean="0">
@@ -17213,7 +16494,7 @@
 </p:sld>
 </file>
 
-<file path=ppt/slides/slide29.xml><?xml version="1.0" encoding="utf-8"?>
+<file path=ppt/slides/slide28.xml><?xml version="1.0" encoding="utf-8"?>
 <p:sld xmlns:a="http://schemas.openxmlformats.org/drawingml/2006/main" xmlns:r="http://schemas.openxmlformats.org/officeDocument/2006/relationships" xmlns:p="http://schemas.openxmlformats.org/presentationml/2006/main">
   <p:cSld>
     <p:spTree>
@@ -17611,177 +16892,7 @@
 </p:sld>
 </file>
 
-<file path=ppt/slides/slide3.xml><?xml version="1.0" encoding="utf-8"?>
-<p:sld xmlns:a="http://schemas.openxmlformats.org/drawingml/2006/main" xmlns:r="http://schemas.openxmlformats.org/officeDocument/2006/relationships" xmlns:p="http://schemas.openxmlformats.org/presentationml/2006/main">
-  <p:cSld>
-    <p:spTree>
-      <p:nvGrpSpPr>
-        <p:cNvPr id="1" name=""/>
-        <p:cNvGrpSpPr/>
-        <p:nvPr/>
-      </p:nvGrpSpPr>
-      <p:grpSpPr>
-        <a:xfrm>
-          <a:off x="0" y="0"/>
-          <a:ext cx="0" cy="0"/>
-          <a:chOff x="0" y="0"/>
-          <a:chExt cx="0" cy="0"/>
-        </a:xfrm>
-      </p:grpSpPr>
-      <p:sp>
-        <p:nvSpPr>
-          <p:cNvPr id="4" name="TextBox 3"/>
-          <p:cNvSpPr txBox="1"/>
-          <p:nvPr/>
-        </p:nvSpPr>
-        <p:spPr>
-          <a:xfrm>
-            <a:off x="762000" y="2362200"/>
-            <a:ext cx="7543800" cy="1754326"/>
-          </a:xfrm>
-          <a:prstGeom prst="rect">
-            <a:avLst/>
-          </a:prstGeom>
-          <a:noFill/>
-        </p:spPr>
-        <p:txBody>
-          <a:bodyPr wrap="square" rtlCol="0">
-            <a:spAutoFit/>
-          </a:bodyPr>
-          <a:lstStyle/>
-          <a:p>
-            <a:r>
-              <a:rPr lang="en-US" dirty="0" smtClean="0">
-                <a:solidFill>
-                  <a:schemeClr val="accent6">
-                    <a:lumMod val="75000"/>
-                  </a:schemeClr>
-                </a:solidFill>
-              </a:rPr>
-              <a:t>This tutorial explains </a:t>
-            </a:r>
-            <a:r>
-              <a:rPr lang="en-US" dirty="0" err="1" smtClean="0">
-                <a:solidFill>
-                  <a:schemeClr val="accent6">
-                    <a:lumMod val="75000"/>
-                  </a:schemeClr>
-                </a:solidFill>
-              </a:rPr>
-              <a:t>PowerPointLabs</a:t>
-            </a:r>
-            <a:r>
-              <a:rPr lang="en-US" dirty="0" smtClean="0">
-                <a:solidFill>
-                  <a:schemeClr val="accent6">
-                    <a:lumMod val="75000"/>
-                  </a:schemeClr>
-                </a:solidFill>
-              </a:rPr>
-              <a:t>’ features at the point you installed the plugin. </a:t>
-            </a:r>
-          </a:p>
-          <a:p>
-            <a:endParaRPr lang="en-US" dirty="0" smtClean="0">
-              <a:solidFill>
-                <a:schemeClr val="accent6">
-                  <a:lumMod val="75000"/>
-                </a:schemeClr>
-              </a:solidFill>
-            </a:endParaRPr>
-          </a:p>
-          <a:p>
-            <a:endParaRPr lang="en-US" dirty="0">
-              <a:solidFill>
-                <a:schemeClr val="accent6">
-                  <a:lumMod val="75000"/>
-                </a:schemeClr>
-              </a:solidFill>
-            </a:endParaRPr>
-          </a:p>
-          <a:p>
-            <a:r>
-              <a:rPr lang="en-US" dirty="0" smtClean="0">
-                <a:solidFill>
-                  <a:schemeClr val="accent6">
-                    <a:lumMod val="75000"/>
-                  </a:schemeClr>
-                </a:solidFill>
-              </a:rPr>
-              <a:t>If you installed the plugin some time back, please refer to the </a:t>
-            </a:r>
-            <a:r>
-              <a:rPr lang="en-US" i="1" dirty="0" smtClean="0">
-                <a:solidFill>
-                  <a:schemeClr val="accent6">
-                    <a:lumMod val="75000"/>
-                  </a:schemeClr>
-                </a:solidFill>
-              </a:rPr>
-              <a:t>Documentation</a:t>
-            </a:r>
-            <a:r>
-              <a:rPr lang="en-US" dirty="0" smtClean="0">
-                <a:solidFill>
-                  <a:schemeClr val="accent6">
-                    <a:lumMod val="75000"/>
-                  </a:schemeClr>
-                </a:solidFill>
-              </a:rPr>
-              <a:t> page of </a:t>
-            </a:r>
-            <a:r>
-              <a:rPr lang="en-US" dirty="0" smtClean="0">
-                <a:solidFill>
-                  <a:schemeClr val="accent6">
-                    <a:lumMod val="75000"/>
-                  </a:schemeClr>
-                </a:solidFill>
-                <a:hlinkClick r:id="rId2"/>
-              </a:rPr>
-              <a:t>our website</a:t>
-            </a:r>
-            <a:r>
-              <a:rPr lang="en-US" dirty="0" smtClean="0">
-                <a:solidFill>
-                  <a:schemeClr val="accent6">
-                    <a:lumMod val="75000"/>
-                  </a:schemeClr>
-                </a:solidFill>
-              </a:rPr>
-              <a:t> for more up-to-date instructions.</a:t>
-            </a:r>
-            <a:endParaRPr lang="en-SG" dirty="0">
-              <a:solidFill>
-                <a:schemeClr val="accent6">
-                  <a:lumMod val="75000"/>
-                </a:schemeClr>
-              </a:solidFill>
-            </a:endParaRPr>
-          </a:p>
-        </p:txBody>
-      </p:sp>
-    </p:spTree>
-    <p:extLst>
-      <p:ext uri="{BB962C8B-B14F-4D97-AF65-F5344CB8AC3E}">
-        <p14:creationId xmlns:p14="http://schemas.microsoft.com/office/powerpoint/2010/main" val="1906505232"/>
-      </p:ext>
-    </p:extLst>
-  </p:cSld>
-  <p:clrMapOvr>
-    <a:masterClrMapping/>
-  </p:clrMapOvr>
-  <p:timing>
-    <p:tnLst>
-      <p:par>
-        <p:cTn id="1" dur="indefinite" restart="never" nodeType="tmRoot"/>
-      </p:par>
-    </p:tnLst>
-  </p:timing>
-</p:sld>
-</file>
-
-<file path=ppt/slides/slide30.xml><?xml version="1.0" encoding="utf-8"?>
+<file path=ppt/slides/slide29.xml><?xml version="1.0" encoding="utf-8"?>
 <p:sld xmlns:a="http://schemas.openxmlformats.org/drawingml/2006/main" xmlns:r="http://schemas.openxmlformats.org/officeDocument/2006/relationships" xmlns:p="http://schemas.openxmlformats.org/presentationml/2006/main">
   <p:cSld>
     <p:spTree>
@@ -17946,27 +17057,7 @@
                   </a:schemeClr>
                 </a:solidFill>
               </a:rPr>
-              <a:t> Right click the ‘house’ shape </a:t>
-            </a:r>
-            <a:r>
-              <a:rPr lang="en-US" dirty="0" smtClean="0">
-                <a:solidFill>
-                  <a:schemeClr val="accent6">
-                    <a:lumMod val="75000"/>
-                  </a:schemeClr>
-                </a:solidFill>
-              </a:rPr>
-              <a:t>above and </a:t>
-            </a:r>
-            <a:r>
-              <a:rPr lang="en-US" dirty="0" smtClean="0">
-                <a:solidFill>
-                  <a:schemeClr val="accent6">
-                    <a:lumMod val="75000"/>
-                  </a:schemeClr>
-                </a:solidFill>
-              </a:rPr>
-              <a:t>choose “Add to Shapes Lab”. Then you should see your shape in the panel, waiting for you to give it a name.</a:t>
+              <a:t> Right click the ‘house’ shape above and choose “Add to Shapes Lab”. Then you should see your shape in the panel, waiting for you to give it a name.</a:t>
             </a:r>
             <a:endParaRPr lang="en-SG" dirty="0">
               <a:solidFill>
@@ -18247,7 +17338,177 @@
 </p:sld>
 </file>
 
-<file path=ppt/slides/slide31.xml><?xml version="1.0" encoding="utf-8"?>
+<file path=ppt/slides/slide3.xml><?xml version="1.0" encoding="utf-8"?>
+<p:sld xmlns:a="http://schemas.openxmlformats.org/drawingml/2006/main" xmlns:r="http://schemas.openxmlformats.org/officeDocument/2006/relationships" xmlns:p="http://schemas.openxmlformats.org/presentationml/2006/main">
+  <p:cSld>
+    <p:spTree>
+      <p:nvGrpSpPr>
+        <p:cNvPr id="1" name=""/>
+        <p:cNvGrpSpPr/>
+        <p:nvPr/>
+      </p:nvGrpSpPr>
+      <p:grpSpPr>
+        <a:xfrm>
+          <a:off x="0" y="0"/>
+          <a:ext cx="0" cy="0"/>
+          <a:chOff x="0" y="0"/>
+          <a:chExt cx="0" cy="0"/>
+        </a:xfrm>
+      </p:grpSpPr>
+      <p:sp>
+        <p:nvSpPr>
+          <p:cNvPr id="4" name="TextBox 3"/>
+          <p:cNvSpPr txBox="1"/>
+          <p:nvPr/>
+        </p:nvSpPr>
+        <p:spPr>
+          <a:xfrm>
+            <a:off x="762000" y="2362200"/>
+            <a:ext cx="7543800" cy="1754326"/>
+          </a:xfrm>
+          <a:prstGeom prst="rect">
+            <a:avLst/>
+          </a:prstGeom>
+          <a:noFill/>
+        </p:spPr>
+        <p:txBody>
+          <a:bodyPr wrap="square" rtlCol="0">
+            <a:spAutoFit/>
+          </a:bodyPr>
+          <a:lstStyle/>
+          <a:p>
+            <a:r>
+              <a:rPr lang="en-US" dirty="0" smtClean="0">
+                <a:solidFill>
+                  <a:schemeClr val="accent6">
+                    <a:lumMod val="75000"/>
+                  </a:schemeClr>
+                </a:solidFill>
+              </a:rPr>
+              <a:t>This tutorial explains </a:t>
+            </a:r>
+            <a:r>
+              <a:rPr lang="en-US" dirty="0" err="1" smtClean="0">
+                <a:solidFill>
+                  <a:schemeClr val="accent6">
+                    <a:lumMod val="75000"/>
+                  </a:schemeClr>
+                </a:solidFill>
+              </a:rPr>
+              <a:t>PowerPointLabs</a:t>
+            </a:r>
+            <a:r>
+              <a:rPr lang="en-US" dirty="0" smtClean="0">
+                <a:solidFill>
+                  <a:schemeClr val="accent6">
+                    <a:lumMod val="75000"/>
+                  </a:schemeClr>
+                </a:solidFill>
+              </a:rPr>
+              <a:t>’ features at the point you installed the plugin. </a:t>
+            </a:r>
+          </a:p>
+          <a:p>
+            <a:endParaRPr lang="en-US" dirty="0" smtClean="0">
+              <a:solidFill>
+                <a:schemeClr val="accent6">
+                  <a:lumMod val="75000"/>
+                </a:schemeClr>
+              </a:solidFill>
+            </a:endParaRPr>
+          </a:p>
+          <a:p>
+            <a:endParaRPr lang="en-US" dirty="0">
+              <a:solidFill>
+                <a:schemeClr val="accent6">
+                  <a:lumMod val="75000"/>
+                </a:schemeClr>
+              </a:solidFill>
+            </a:endParaRPr>
+          </a:p>
+          <a:p>
+            <a:r>
+              <a:rPr lang="en-US" dirty="0" smtClean="0">
+                <a:solidFill>
+                  <a:schemeClr val="accent6">
+                    <a:lumMod val="75000"/>
+                  </a:schemeClr>
+                </a:solidFill>
+              </a:rPr>
+              <a:t>If you installed the plugin some time back, please refer to the </a:t>
+            </a:r>
+            <a:r>
+              <a:rPr lang="en-US" i="1" dirty="0" smtClean="0">
+                <a:solidFill>
+                  <a:schemeClr val="accent6">
+                    <a:lumMod val="75000"/>
+                  </a:schemeClr>
+                </a:solidFill>
+              </a:rPr>
+              <a:t>Documentation</a:t>
+            </a:r>
+            <a:r>
+              <a:rPr lang="en-US" dirty="0" smtClean="0">
+                <a:solidFill>
+                  <a:schemeClr val="accent6">
+                    <a:lumMod val="75000"/>
+                  </a:schemeClr>
+                </a:solidFill>
+              </a:rPr>
+              <a:t> page of </a:t>
+            </a:r>
+            <a:r>
+              <a:rPr lang="en-US" dirty="0" smtClean="0">
+                <a:solidFill>
+                  <a:schemeClr val="accent6">
+                    <a:lumMod val="75000"/>
+                  </a:schemeClr>
+                </a:solidFill>
+                <a:hlinkClick r:id="rId2"/>
+              </a:rPr>
+              <a:t>our website</a:t>
+            </a:r>
+            <a:r>
+              <a:rPr lang="en-US" dirty="0" smtClean="0">
+                <a:solidFill>
+                  <a:schemeClr val="accent6">
+                    <a:lumMod val="75000"/>
+                  </a:schemeClr>
+                </a:solidFill>
+              </a:rPr>
+              <a:t> for more up-to-date instructions.</a:t>
+            </a:r>
+            <a:endParaRPr lang="en-SG" dirty="0">
+              <a:solidFill>
+                <a:schemeClr val="accent6">
+                  <a:lumMod val="75000"/>
+                </a:schemeClr>
+              </a:solidFill>
+            </a:endParaRPr>
+          </a:p>
+        </p:txBody>
+      </p:sp>
+    </p:spTree>
+    <p:extLst>
+      <p:ext uri="{BB962C8B-B14F-4D97-AF65-F5344CB8AC3E}">
+        <p14:creationId xmlns:p14="http://schemas.microsoft.com/office/powerpoint/2010/main" val="1906505232"/>
+      </p:ext>
+    </p:extLst>
+  </p:cSld>
+  <p:clrMapOvr>
+    <a:masterClrMapping/>
+  </p:clrMapOvr>
+  <p:timing>
+    <p:tnLst>
+      <p:par>
+        <p:cTn id="1" dur="indefinite" restart="never" nodeType="tmRoot"/>
+      </p:par>
+    </p:tnLst>
+  </p:timing>
+</p:sld>
+</file>
+
+<file path=ppt/slides/slide30.xml><?xml version="1.0" encoding="utf-8"?>
 <p:sld xmlns:a="http://schemas.openxmlformats.org/drawingml/2006/main" xmlns:r="http://schemas.openxmlformats.org/officeDocument/2006/relationships" xmlns:p="http://schemas.openxmlformats.org/presentationml/2006/main">
   <p:cSld>
     <p:spTree>
@@ -18351,16 +17612,6 @@
               </a:rPr>
               <a:t>: Save shapes in a shared folder (e.g. a Dropbox folder) </a:t>
             </a:r>
-            <a:r>
-              <a:rPr lang="en-US" altLang="zh-CN" dirty="0" smtClean="0">
-                <a:solidFill>
-                  <a:schemeClr val="accent6">
-                    <a:lumMod val="75000"/>
-                  </a:schemeClr>
-                </a:solidFill>
-              </a:rPr>
-              <a:t/>
-            </a:r>
             <a:br>
               <a:rPr lang="en-US" altLang="zh-CN" dirty="0" smtClean="0">
                 <a:solidFill>
@@ -18378,17 +17629,7 @@
                   </a:schemeClr>
                 </a:solidFill>
               </a:rPr>
-              <a:t>to </a:t>
-            </a:r>
-            <a:r>
-              <a:rPr lang="en-US" altLang="zh-CN" dirty="0" smtClean="0">
-                <a:solidFill>
-                  <a:schemeClr val="accent6">
-                    <a:lumMod val="75000"/>
-                  </a:schemeClr>
-                </a:solidFill>
-              </a:rPr>
-              <a:t>share saved shapes among multiple computers. </a:t>
+              <a:t>to share saved shapes among multiple computers. </a:t>
             </a:r>
             <a:endParaRPr lang="en-US" dirty="0" smtClean="0">
               <a:solidFill>
@@ -18480,17 +17721,7 @@
                   </a:schemeClr>
                 </a:solidFill>
               </a:rPr>
-              <a:t>  To </a:t>
-            </a:r>
-            <a:r>
-              <a:rPr lang="en-US" dirty="0" smtClean="0">
-                <a:solidFill>
-                  <a:schemeClr val="accent6">
-                    <a:lumMod val="75000"/>
-                  </a:schemeClr>
-                </a:solidFill>
-              </a:rPr>
-              <a:t>delete or rename the saved shape, right-click and choose the appropriate action from the context menu</a:t>
+              <a:t>  To delete or rename the saved shape, right-click and choose the appropriate action from the context menu</a:t>
             </a:r>
             <a:r>
               <a:rPr lang="en-US" altLang="zh-CN" dirty="0">
@@ -18712,7 +17943,7 @@
 </p:sld>
 </file>
 
-<file path=ppt/slides/slide32.xml><?xml version="1.0" encoding="utf-8"?>
+<file path=ppt/slides/slide31.xml><?xml version="1.0" encoding="utf-8"?>
 <p:sld xmlns:a="http://schemas.openxmlformats.org/drawingml/2006/main" xmlns:r="http://schemas.openxmlformats.org/officeDocument/2006/relationships" xmlns:p="http://schemas.openxmlformats.org/presentationml/2006/main">
   <p:cSld>
     <p:spTree>
@@ -19636,7 +18867,7 @@
 </p:sld>
 </file>
 
-<file path=ppt/slides/slide33.xml><?xml version="1.0" encoding="utf-8"?>
+<file path=ppt/slides/slide32.xml><?xml version="1.0" encoding="utf-8"?>
 <p:sld xmlns:a="http://schemas.openxmlformats.org/drawingml/2006/main" xmlns:r="http://schemas.openxmlformats.org/officeDocument/2006/relationships" xmlns:p="http://schemas.openxmlformats.org/presentationml/2006/main">
   <p:cSld>
     <p:spTree>
@@ -19879,17 +19110,7 @@
                   </a:schemeClr>
                 </a:solidFill>
               </a:rPr>
-              <a:t> </a:t>
-            </a:r>
-            <a:r>
-              <a:rPr lang="en-US" dirty="0" smtClean="0">
-                <a:solidFill>
-                  <a:schemeClr val="accent6">
-                    <a:lumMod val="75000"/>
-                  </a:schemeClr>
-                </a:solidFill>
-              </a:rPr>
-              <a:t>Click this button           to change the main color of the panel.</a:t>
+              <a:t> Click this button           to change the main color of the panel.</a:t>
             </a:r>
           </a:p>
           <a:p>
@@ -20238,7 +19459,7 @@
 </p:sld>
 </file>
 
-<file path=ppt/slides/slide34.xml><?xml version="1.0" encoding="utf-8"?>
+<file path=ppt/slides/slide33.xml><?xml version="1.0" encoding="utf-8"?>
 <p:sld xmlns:a="http://schemas.openxmlformats.org/drawingml/2006/main" xmlns:r="http://schemas.openxmlformats.org/officeDocument/2006/relationships" xmlns:p="http://schemas.openxmlformats.org/presentationml/2006/main">
   <p:cSld>
     <p:spTree>
@@ -20325,17 +19546,7 @@
                   </a:schemeClr>
                 </a:solidFill>
               </a:rPr>
-              <a:t> </a:t>
-            </a:r>
-            <a:r>
-              <a:rPr lang="en-US" dirty="0" smtClean="0">
-                <a:solidFill>
-                  <a:schemeClr val="accent6">
-                    <a:lumMod val="75000"/>
-                  </a:schemeClr>
-                </a:solidFill>
-              </a:rPr>
-              <a:t>Select the shape below:</a:t>
+              <a:t> Select the shape below:</a:t>
             </a:r>
             <a:endParaRPr lang="en-SG" dirty="0">
               <a:solidFill>
@@ -20437,17 +19648,7 @@
                   </a:schemeClr>
                 </a:solidFill>
               </a:rPr>
-              <a:t>color</a:t>
-            </a:r>
-            <a:r>
-              <a:rPr lang="en-US" dirty="0" smtClean="0">
-                <a:solidFill>
-                  <a:schemeClr val="accent6">
-                    <a:lumMod val="75000"/>
-                  </a:schemeClr>
-                </a:solidFill>
-              </a:rPr>
-              <a:t>. </a:t>
+              <a:t>color. </a:t>
             </a:r>
             <a:r>
               <a:rPr lang="en-US" dirty="0">
@@ -20494,17 +19695,7 @@
                   </a:schemeClr>
                 </a:solidFill>
               </a:rPr>
-              <a:t>Drag </a:t>
-            </a:r>
-            <a:r>
-              <a:rPr lang="en-US" dirty="0" smtClean="0">
-                <a:solidFill>
-                  <a:schemeClr val="accent6">
-                    <a:lumMod val="75000"/>
-                  </a:schemeClr>
-                </a:solidFill>
-              </a:rPr>
-              <a:t>the</a:t>
+              <a:t>Drag the</a:t>
             </a:r>
             <a:r>
               <a:rPr lang="en-SG" dirty="0" smtClean="0">
@@ -20514,17 +19705,7 @@
                   </a:schemeClr>
                 </a:solidFill>
               </a:rPr>
-              <a:t>             </a:t>
-            </a:r>
-            <a:r>
-              <a:rPr lang="en-SG" dirty="0" smtClean="0">
-                <a:solidFill>
-                  <a:schemeClr val="accent6">
-                    <a:lumMod val="75000"/>
-                  </a:schemeClr>
-                </a:solidFill>
-              </a:rPr>
-              <a:t>button to change its </a:t>
+              <a:t>             button to change its </a:t>
             </a:r>
             <a:r>
               <a:rPr lang="en-SG" b="1" dirty="0" smtClean="0">
@@ -20663,17 +19844,7 @@
                   </a:schemeClr>
                 </a:solidFill>
               </a:rPr>
-              <a:t> clicking any of those three buttons let you choos</a:t>
-            </a:r>
-            <a:r>
-              <a:rPr lang="en-US" dirty="0" smtClean="0">
-                <a:solidFill>
-                  <a:schemeClr val="accent6">
-                    <a:lumMod val="75000"/>
-                  </a:schemeClr>
-                </a:solidFill>
-              </a:rPr>
-              <a:t>e a color from the standard color palette.</a:t>
+              <a:t> clicking any of those three buttons let you choose a color from the standard color palette.</a:t>
             </a:r>
             <a:endParaRPr lang="en-SG" dirty="0">
               <a:solidFill>
@@ -20855,7 +20026,7 @@
 </p:sld>
 </file>
 
-<file path=ppt/slides/slide35.xml><?xml version="1.0" encoding="utf-8"?>
+<file path=ppt/slides/slide34.xml><?xml version="1.0" encoding="utf-8"?>
 <p:sld xmlns:a="http://schemas.openxmlformats.org/drawingml/2006/main" xmlns:r="http://schemas.openxmlformats.org/officeDocument/2006/relationships" xmlns:p="http://schemas.openxmlformats.org/presentationml/2006/main">
   <p:cSld>
     <p:spTree>
@@ -20912,17 +20083,7 @@
                   </a:schemeClr>
                 </a:solidFill>
               </a:rPr>
-              <a:t>Effects </a:t>
-            </a:r>
-            <a:r>
-              <a:rPr lang="en-US" b="1" dirty="0" smtClean="0">
-                <a:solidFill>
-                  <a:schemeClr val="accent6">
-                    <a:lumMod val="75000"/>
-                  </a:schemeClr>
-                </a:solidFill>
-              </a:rPr>
-              <a:t>Lab </a:t>
+              <a:t>Effects Lab </a:t>
             </a:r>
             <a:r>
               <a:rPr lang="en-US" dirty="0" smtClean="0">
@@ -21382,7 +20543,7 @@
 </p:sld>
 </file>
 
-<file path=ppt/slides/slide36.xml><?xml version="1.0" encoding="utf-8"?>
+<file path=ppt/slides/slide35.xml><?xml version="1.0" encoding="utf-8"?>
 <p:sld xmlns:a="http://schemas.openxmlformats.org/drawingml/2006/main" xmlns:r="http://schemas.openxmlformats.org/officeDocument/2006/relationships" xmlns:p="http://schemas.openxmlformats.org/presentationml/2006/main">
   <p:cSld>
     <p:spTree>
@@ -21478,17 +20639,7 @@
                   </a:schemeClr>
                 </a:solidFill>
               </a:rPr>
-              <a:t> Select the </a:t>
-            </a:r>
-            <a:r>
-              <a:rPr lang="en-US" dirty="0" smtClean="0">
-                <a:solidFill>
-                  <a:schemeClr val="accent6">
-                    <a:lumMod val="75000"/>
-                  </a:schemeClr>
-                </a:solidFill>
-              </a:rPr>
-              <a:t>picture below, click              and choose </a:t>
+              <a:t> Select the picture below, click              and choose </a:t>
             </a:r>
             <a:r>
               <a:rPr lang="en-US" dirty="0" smtClean="0">
@@ -21528,16 +20679,6 @@
                 </a:solidFill>
               </a:rPr>
               <a:t>  </a:t>
-            </a:r>
-            <a:r>
-              <a:rPr lang="en-US" dirty="0" smtClean="0">
-                <a:solidFill>
-                  <a:schemeClr val="accent6">
-                    <a:lumMod val="75000"/>
-                  </a:schemeClr>
-                </a:solidFill>
-              </a:rPr>
-              <a:t/>
             </a:r>
             <a:br>
               <a:rPr lang="en-US" dirty="0" smtClean="0">
@@ -21625,15 +20766,344 @@
                 </a:solidFill>
               </a14:hiddenFill>
             </a:ext>
-            <a:ext uri="{91240B29-F687-4F45-9708-019B960494DF}">
-              <a14:hiddenLine xmlns:a14="http://schemas.microsoft.com/office/drawing/2010/main" w="9525">
-                <a:solidFill>
-                  <a:schemeClr val="tx1"/>
-                </a:solidFill>
-                <a:miter lim="800000"/>
-                <a:headEnd/>
-                <a:tailEnd/>
-              </a14:hiddenLine>
+          </a:extLst>
+        </p:spPr>
+      </p:pic>
+      <p:sp>
+        <p:nvSpPr>
+          <p:cNvPr id="5" name="Rectangle 4"/>
+          <p:cNvSpPr/>
+          <p:nvPr/>
+        </p:nvSpPr>
+        <p:spPr>
+          <a:xfrm>
+            <a:off x="616638" y="5638800"/>
+            <a:ext cx="7917761" cy="646331"/>
+          </a:xfrm>
+          <a:prstGeom prst="rect">
+            <a:avLst/>
+          </a:prstGeom>
+        </p:spPr>
+        <p:txBody>
+          <a:bodyPr wrap="square">
+            <a:spAutoFit/>
+          </a:bodyPr>
+          <a:lstStyle/>
+          <a:p>
+            <a:r>
+              <a:rPr lang="en-US" b="1" dirty="0" smtClean="0">
+                <a:solidFill>
+                  <a:schemeClr val="accent6">
+                    <a:lumMod val="75000"/>
+                  </a:schemeClr>
+                </a:solidFill>
+              </a:rPr>
+              <a:t>Tip:</a:t>
+            </a:r>
+            <a:r>
+              <a:rPr lang="en-US" dirty="0" smtClean="0">
+                <a:solidFill>
+                  <a:schemeClr val="accent6">
+                    <a:lumMod val="75000"/>
+                  </a:schemeClr>
+                </a:solidFill>
+              </a:rPr>
+              <a:t> After a picture has been made transparent, you can adjust transparency by right-clicking the picture and choosing  </a:t>
+            </a:r>
+            <a:r>
+              <a:rPr lang="en-US" dirty="0">
+                <a:solidFill>
+                  <a:srgbClr val="0070C0"/>
+                </a:solidFill>
+                <a:latin typeface="Consolas" panose="020B0609020204030204" pitchFamily="49" charset="0"/>
+                <a:cs typeface="Consolas" panose="020B0609020204030204" pitchFamily="49" charset="0"/>
+              </a:rPr>
+              <a:t>format picture </a:t>
+            </a:r>
+            <a:r>
+              <a:rPr lang="en-US" dirty="0" smtClean="0">
+                <a:solidFill>
+                  <a:schemeClr val="accent6">
+                    <a:lumMod val="75000"/>
+                  </a:schemeClr>
+                </a:solidFill>
+                <a:sym typeface="Wingdings" panose="05000000000000000000" pitchFamily="2" charset="2"/>
+              </a:rPr>
+              <a:t> </a:t>
+            </a:r>
+            <a:r>
+              <a:rPr lang="en-US" dirty="0">
+                <a:solidFill>
+                  <a:srgbClr val="0070C0"/>
+                </a:solidFill>
+                <a:latin typeface="Consolas" panose="020B0609020204030204" pitchFamily="49" charset="0"/>
+                <a:cs typeface="Consolas" panose="020B0609020204030204" pitchFamily="49" charset="0"/>
+                <a:sym typeface="Wingdings" panose="05000000000000000000" pitchFamily="2" charset="2"/>
+              </a:rPr>
+              <a:t>fill</a:t>
+            </a:r>
+            <a:r>
+              <a:rPr lang="en-US" dirty="0" smtClean="0">
+                <a:solidFill>
+                  <a:schemeClr val="accent6">
+                    <a:lumMod val="75000"/>
+                  </a:schemeClr>
+                </a:solidFill>
+              </a:rPr>
+              <a:t>.</a:t>
+            </a:r>
+            <a:endParaRPr lang="en-SG" dirty="0">
+              <a:solidFill>
+                <a:schemeClr val="accent6">
+                  <a:lumMod val="75000"/>
+                </a:schemeClr>
+              </a:solidFill>
+            </a:endParaRPr>
+          </a:p>
+        </p:txBody>
+      </p:sp>
+    </p:spTree>
+    <p:extLst>
+      <p:ext uri="{BB962C8B-B14F-4D97-AF65-F5344CB8AC3E}">
+        <p14:creationId xmlns:p14="http://schemas.microsoft.com/office/powerpoint/2010/main" val="3667589300"/>
+      </p:ext>
+    </p:extLst>
+  </p:cSld>
+  <p:clrMapOvr>
+    <a:masterClrMapping/>
+  </p:clrMapOvr>
+  <p:timing>
+    <p:tnLst>
+      <p:par>
+        <p:cTn id="1" dur="indefinite" restart="never" nodeType="tmRoot"/>
+      </p:par>
+    </p:tnLst>
+  </p:timing>
+</p:sld>
+</file>
+
+<file path=ppt/slides/slide36.xml><?xml version="1.0" encoding="utf-8"?>
+<p:sld xmlns:a="http://schemas.openxmlformats.org/drawingml/2006/main" xmlns:r="http://schemas.openxmlformats.org/officeDocument/2006/relationships" xmlns:p="http://schemas.openxmlformats.org/presentationml/2006/main">
+  <p:cSld>
+    <p:spTree>
+      <p:nvGrpSpPr>
+        <p:cNvPr id="1" name=""/>
+        <p:cNvGrpSpPr/>
+        <p:nvPr/>
+      </p:nvGrpSpPr>
+      <p:grpSpPr>
+        <a:xfrm>
+          <a:off x="0" y="0"/>
+          <a:ext cx="0" cy="0"/>
+          <a:chOff x="0" y="0"/>
+          <a:chExt cx="0" cy="0"/>
+        </a:xfrm>
+      </p:grpSpPr>
+      <p:pic>
+        <p:nvPicPr>
+          <p:cNvPr id="4101" name="Picture 5" descr="C:\Users\dcsdcr\AppData\Local\Microsoft\Windows\Temporary Internet Files\Content.IE5\X5YV3EZ2\MP900178526[1].jpg"/>
+          <p:cNvPicPr>
+            <a:picLocks noChangeAspect="1" noChangeArrowheads="1"/>
+          </p:cNvPicPr>
+          <p:nvPr/>
+        </p:nvPicPr>
+        <p:blipFill rotWithShape="1">
+          <a:blip r:embed="rId3">
+            <a:extLst>
+              <a:ext uri="{28A0092B-C50C-407E-A947-70E740481C1C}">
+                <a14:useLocalDpi xmlns:a14="http://schemas.microsoft.com/office/drawing/2010/main" val="0"/>
+              </a:ext>
+            </a:extLst>
+          </a:blip>
+          <a:srcRect t="12470" b="33433"/>
+          <a:stretch/>
+        </p:blipFill>
+        <p:spPr bwMode="auto">
+          <a:xfrm>
+            <a:off x="1143000" y="2256816"/>
+            <a:ext cx="3519278" cy="2848583"/>
+          </a:xfrm>
+          <a:prstGeom prst="rect">
+            <a:avLst/>
+          </a:prstGeom>
+          <a:noFill/>
+          <a:extLst>
+            <a:ext uri="{909E8E84-426E-40DD-AFC4-6F175D3DCCD1}">
+              <a14:hiddenFill xmlns:a14="http://schemas.microsoft.com/office/drawing/2010/main">
+                <a:solidFill>
+                  <a:srgbClr val="FFFFFF"/>
+                </a:solidFill>
+              </a14:hiddenFill>
+            </a:ext>
+          </a:extLst>
+        </p:spPr>
+      </p:pic>
+      <p:sp>
+        <p:nvSpPr>
+          <p:cNvPr id="7" name="TextBox 6"/>
+          <p:cNvSpPr txBox="1"/>
+          <p:nvPr/>
+        </p:nvSpPr>
+        <p:spPr>
+          <a:xfrm>
+            <a:off x="533400" y="479318"/>
+            <a:ext cx="8001000" cy="1631216"/>
+          </a:xfrm>
+          <a:prstGeom prst="rect">
+            <a:avLst/>
+          </a:prstGeom>
+          <a:noFill/>
+        </p:spPr>
+        <p:txBody>
+          <a:bodyPr wrap="square" rtlCol="0">
+            <a:spAutoFit/>
+          </a:bodyPr>
+          <a:lstStyle/>
+          <a:p>
+            <a:r>
+              <a:rPr lang="en-US" sz="2800" b="1" dirty="0" smtClean="0">
+                <a:solidFill>
+                  <a:schemeClr val="accent6">
+                    <a:lumMod val="75000"/>
+                  </a:schemeClr>
+                </a:solidFill>
+              </a:rPr>
+              <a:t>1.</a:t>
+            </a:r>
+            <a:r>
+              <a:rPr lang="en-US" dirty="0" smtClean="0">
+                <a:solidFill>
+                  <a:schemeClr val="accent6">
+                    <a:lumMod val="75000"/>
+                  </a:schemeClr>
+                </a:solidFill>
+              </a:rPr>
+              <a:t> Select the blue circle below, click              and choose either </a:t>
+            </a:r>
+            <a:r>
+              <a:rPr lang="en-US" dirty="0" smtClean="0">
+                <a:solidFill>
+                  <a:srgbClr val="0070C0"/>
+                </a:solidFill>
+                <a:latin typeface="Consolas" panose="020B0609020204030204" pitchFamily="49" charset="0"/>
+                <a:cs typeface="Consolas" panose="020B0609020204030204" pitchFamily="49" charset="0"/>
+              </a:rPr>
+              <a:t>Magnifying Glass</a:t>
+            </a:r>
+            <a:r>
+              <a:rPr lang="en-US" dirty="0" smtClean="0">
+                <a:solidFill>
+                  <a:schemeClr val="accent6">
+                    <a:lumMod val="75000"/>
+                  </a:schemeClr>
+                </a:solidFill>
+              </a:rPr>
+              <a:t> option.  </a:t>
+            </a:r>
+            <a:br>
+              <a:rPr lang="en-US" dirty="0" smtClean="0">
+                <a:solidFill>
+                  <a:schemeClr val="accent6">
+                    <a:lumMod val="75000"/>
+                  </a:schemeClr>
+                </a:solidFill>
+              </a:rPr>
+            </a:br>
+            <a:r>
+              <a:rPr lang="en-US" dirty="0" smtClean="0">
+                <a:solidFill>
+                  <a:schemeClr val="accent6">
+                    <a:lumMod val="75000"/>
+                  </a:schemeClr>
+                </a:solidFill>
+              </a:rPr>
+              <a:t>It will create a magnified version of the area covered by the circle. </a:t>
+            </a:r>
+            <a:br>
+              <a:rPr lang="en-US" dirty="0" smtClean="0">
+                <a:solidFill>
+                  <a:schemeClr val="accent6">
+                    <a:lumMod val="75000"/>
+                  </a:schemeClr>
+                </a:solidFill>
+              </a:rPr>
+            </a:br>
+            <a:r>
+              <a:rPr lang="en-US" dirty="0" smtClean="0">
+                <a:solidFill>
+                  <a:schemeClr val="accent6">
+                    <a:lumMod val="75000"/>
+                  </a:schemeClr>
+                </a:solidFill>
+              </a:rPr>
+              <a:t/>
+            </a:r>
+            <a:br>
+              <a:rPr lang="en-US" dirty="0" smtClean="0">
+                <a:solidFill>
+                  <a:schemeClr val="accent6">
+                    <a:lumMod val="75000"/>
+                  </a:schemeClr>
+                </a:solidFill>
+              </a:rPr>
+            </a:br>
+            <a:endParaRPr lang="en-SG" dirty="0">
+              <a:solidFill>
+                <a:schemeClr val="accent6">
+                  <a:lumMod val="75000"/>
+                </a:schemeClr>
+              </a:solidFill>
+            </a:endParaRPr>
+          </a:p>
+        </p:txBody>
+      </p:sp>
+      <p:pic>
+        <p:nvPicPr>
+          <p:cNvPr id="6146" name="Picture 2"/>
+          <p:cNvPicPr>
+            <a:picLocks noChangeAspect="1" noChangeArrowheads="1"/>
+          </p:cNvPicPr>
+          <p:nvPr/>
+        </p:nvPicPr>
+        <p:blipFill>
+          <a:blip r:embed="rId4">
+            <a:extLst>
+              <a:ext uri="{28A0092B-C50C-407E-A947-70E740481C1C}">
+                <a14:useLocalDpi xmlns:a14="http://schemas.microsoft.com/office/drawing/2010/main" val="0"/>
+              </a:ext>
+            </a:extLst>
+          </a:blip>
+          <a:srcRect/>
+          <a:stretch>
+            <a:fillRect/>
+          </a:stretch>
+        </p:blipFill>
+        <p:spPr bwMode="auto">
+          <a:xfrm>
+            <a:off x="4114800" y="304800"/>
+            <a:ext cx="533400" cy="834887"/>
+          </a:xfrm>
+          <a:prstGeom prst="rect">
+            <a:avLst/>
+          </a:prstGeom>
+          <a:noFill/>
+          <a:ln w="9525">
+            <a:solidFill>
+              <a:schemeClr val="bg1">
+                <a:lumMod val="85000"/>
+              </a:schemeClr>
+            </a:solidFill>
+            <a:miter lim="800000"/>
+            <a:headEnd/>
+            <a:tailEnd/>
+          </a:ln>
+          <a:extLst>
+            <a:ext uri="{909E8E84-426E-40DD-AFC4-6F175D3DCCD1}">
+              <a14:hiddenFill xmlns:a14="http://schemas.microsoft.com/office/drawing/2010/main">
+                <a:solidFill>
+                  <a:schemeClr val="accent1"/>
+                </a:solidFill>
+              </a14:hiddenFill>
             </a:ext>
           </a:extLst>
         </p:spPr>
@@ -21677,49 +21147,7 @@
                   </a:schemeClr>
                 </a:solidFill>
               </a:rPr>
-              <a:t> After a picture has been made transparent, you can adjust transparency by right-clicking the picture and choosing  </a:t>
-            </a:r>
-            <a:r>
-              <a:rPr lang="en-US" dirty="0">
-                <a:solidFill>
-                  <a:srgbClr val="0070C0"/>
-                </a:solidFill>
-                <a:latin typeface="Consolas" panose="020B0609020204030204" pitchFamily="49" charset="0"/>
-                <a:cs typeface="Consolas" panose="020B0609020204030204" pitchFamily="49" charset="0"/>
-              </a:rPr>
-              <a:t>format picture </a:t>
-            </a:r>
-            <a:r>
-              <a:rPr lang="en-US" dirty="0" smtClean="0">
-                <a:solidFill>
-                  <a:schemeClr val="accent6">
-                    <a:lumMod val="75000"/>
-                  </a:schemeClr>
-                </a:solidFill>
-                <a:sym typeface="Wingdings" panose="05000000000000000000" pitchFamily="2" charset="2"/>
-              </a:rPr>
-              <a:t> </a:t>
-            </a:r>
-            <a:r>
-              <a:rPr lang="en-US" dirty="0">
-                <a:solidFill>
-                  <a:srgbClr val="0070C0"/>
-                </a:solidFill>
-                <a:latin typeface="Consolas" panose="020B0609020204030204" pitchFamily="49" charset="0"/>
-                <a:cs typeface="Consolas" panose="020B0609020204030204" pitchFamily="49" charset="0"/>
-                <a:sym typeface="Wingdings" panose="05000000000000000000" pitchFamily="2" charset="2"/>
-              </a:rPr>
-              <a:t>fill</a:t>
-            </a:r>
-            <a:r>
-              <a:rPr lang="en-US" dirty="0" smtClean="0">
-                <a:solidFill>
-                  <a:schemeClr val="accent6">
-                    <a:lumMod val="75000"/>
-                  </a:schemeClr>
-                </a:solidFill>
-              </a:rPr>
-              <a:t>.</a:t>
+              <a:t> You can resize the newly created shape to match the magnifying level you need</a:t>
             </a:r>
             <a:endParaRPr lang="en-SG" dirty="0">
               <a:solidFill>
@@ -21731,10 +21159,62 @@
           </a:p>
         </p:txBody>
       </p:sp>
+      <p:sp>
+        <p:nvSpPr>
+          <p:cNvPr id="2" name="Flowchart: Connector 1"/>
+          <p:cNvSpPr/>
+          <p:nvPr/>
+        </p:nvSpPr>
+        <p:spPr>
+          <a:xfrm>
+            <a:off x="3048000" y="2866820"/>
+            <a:ext cx="785508" cy="785508"/>
+          </a:xfrm>
+          <a:prstGeom prst="flowChartConnector">
+            <a:avLst/>
+          </a:prstGeom>
+          <a:solidFill>
+            <a:schemeClr val="tx2">
+              <a:lumMod val="20000"/>
+              <a:lumOff val="80000"/>
+              <a:alpha val="45000"/>
+            </a:schemeClr>
+          </a:solidFill>
+          <a:ln w="57150">
+            <a:solidFill>
+              <a:srgbClr val="0070C0"/>
+            </a:solidFill>
+          </a:ln>
+        </p:spPr>
+        <p:style>
+          <a:lnRef idx="2">
+            <a:schemeClr val="accent1">
+              <a:shade val="50000"/>
+            </a:schemeClr>
+          </a:lnRef>
+          <a:fillRef idx="1">
+            <a:schemeClr val="accent1"/>
+          </a:fillRef>
+          <a:effectRef idx="0">
+            <a:schemeClr val="accent1"/>
+          </a:effectRef>
+          <a:fontRef idx="minor">
+            <a:schemeClr val="lt1"/>
+          </a:fontRef>
+        </p:style>
+        <p:txBody>
+          <a:bodyPr lIns="228600" tIns="114300" rIns="228600" bIns="114300" rtlCol="0" anchor="ctr"/>
+          <a:lstStyle/>
+          <a:p>
+            <a:pPr algn="ctr"/>
+            <a:endParaRPr lang="en-SG"/>
+          </a:p>
+        </p:txBody>
+      </p:sp>
     </p:spTree>
     <p:extLst>
       <p:ext uri="{BB962C8B-B14F-4D97-AF65-F5344CB8AC3E}">
-        <p14:creationId xmlns:p14="http://schemas.microsoft.com/office/powerpoint/2010/main" val="3667589300"/>
+        <p14:creationId xmlns:p14="http://schemas.microsoft.com/office/powerpoint/2010/main" val="1242374340"/>
       </p:ext>
     </p:extLst>
   </p:cSld>
@@ -21847,37 +21327,7 @@
                   </a:schemeClr>
                 </a:solidFill>
               </a:rPr>
-              <a:t> Select the </a:t>
-            </a:r>
-            <a:r>
-              <a:rPr lang="en-US" dirty="0" smtClean="0">
-                <a:solidFill>
-                  <a:schemeClr val="accent6">
-                    <a:lumMod val="75000"/>
-                  </a:schemeClr>
-                </a:solidFill>
-              </a:rPr>
-              <a:t>blue </a:t>
-            </a:r>
-            <a:r>
-              <a:rPr lang="en-US" dirty="0" smtClean="0">
-                <a:solidFill>
-                  <a:schemeClr val="accent6">
-                    <a:lumMod val="75000"/>
-                  </a:schemeClr>
-                </a:solidFill>
-              </a:rPr>
-              <a:t>circle </a:t>
-            </a:r>
-            <a:r>
-              <a:rPr lang="en-US" dirty="0" smtClean="0">
-                <a:solidFill>
-                  <a:schemeClr val="accent6">
-                    <a:lumMod val="75000"/>
-                  </a:schemeClr>
-                </a:solidFill>
-              </a:rPr>
-              <a:t>below, click              and choose either </a:t>
+              <a:t> Select the blue circle below, click              and choose either </a:t>
             </a:r>
             <a:r>
               <a:rPr lang="en-US" dirty="0" smtClean="0">
@@ -21887,7 +21337,7 @@
                 <a:latin typeface="Consolas" panose="020B0609020204030204" pitchFamily="49" charset="0"/>
                 <a:cs typeface="Consolas" panose="020B0609020204030204" pitchFamily="49" charset="0"/>
               </a:rPr>
-              <a:t>Magnifying Glass</a:t>
+              <a:t>blur remainder </a:t>
             </a:r>
             <a:r>
               <a:rPr lang="en-US" dirty="0" smtClean="0">
@@ -21897,7 +21347,27 @@
                   </a:schemeClr>
                 </a:solidFill>
               </a:rPr>
-              <a:t> option.  </a:t>
+              <a:t>or </a:t>
+            </a:r>
+            <a:r>
+              <a:rPr lang="en-US" dirty="0">
+                <a:solidFill>
+                  <a:srgbClr val="0070C0"/>
+                </a:solidFill>
+                <a:latin typeface="Consolas" panose="020B0609020204030204" pitchFamily="49" charset="0"/>
+                <a:cs typeface="Consolas" panose="020B0609020204030204" pitchFamily="49" charset="0"/>
+              </a:rPr>
+              <a:t>recolor remainder</a:t>
+            </a:r>
+            <a:r>
+              <a:rPr lang="en-US" dirty="0" smtClean="0">
+                <a:solidFill>
+                  <a:schemeClr val="accent6">
+                    <a:lumMod val="75000"/>
+                  </a:schemeClr>
+                </a:solidFill>
+              </a:rPr>
+              <a:t>.  </a:t>
             </a:r>
             <a:br>
               <a:rPr lang="en-US" dirty="0" smtClean="0">
@@ -21916,37 +21386,7 @@
                   </a:schemeClr>
                 </a:solidFill>
               </a:rPr>
-              <a:t>It will create a magnified version of the area covered by the circle</a:t>
-            </a:r>
-            <a:r>
-              <a:rPr lang="en-US" dirty="0" smtClean="0">
-                <a:solidFill>
-                  <a:schemeClr val="accent6">
-                    <a:lumMod val="75000"/>
-                  </a:schemeClr>
-                </a:solidFill>
-              </a:rPr>
-              <a:t>.</a:t>
-            </a:r>
-            <a:r>
-              <a:rPr lang="en-US" dirty="0" smtClean="0">
-                <a:solidFill>
-                  <a:schemeClr val="accent6">
-                    <a:lumMod val="75000"/>
-                  </a:schemeClr>
-                </a:solidFill>
-              </a:rPr>
-              <a:t> </a:t>
-            </a:r>
-            <a:r>
-              <a:rPr lang="en-US" dirty="0" smtClean="0">
-                <a:solidFill>
-                  <a:schemeClr val="accent6">
-                    <a:lumMod val="75000"/>
-                  </a:schemeClr>
-                </a:solidFill>
-              </a:rPr>
-              <a:t/>
+              <a:t>It will create a new slide with the desired effect. </a:t>
             </a:r>
             <a:br>
               <a:rPr lang="en-US" dirty="0" smtClean="0">
@@ -22033,455 +21473,6 @@
                   <a:schemeClr val="accent1"/>
                 </a:solidFill>
               </a14:hiddenFill>
-            </a:ext>
-            <a:ext uri="{91240B29-F687-4F45-9708-019B960494DF}">
-              <a14:hiddenLine xmlns:a14="http://schemas.microsoft.com/office/drawing/2010/main" w="9525">
-                <a:solidFill>
-                  <a:schemeClr val="tx1"/>
-                </a:solidFill>
-                <a:miter lim="800000"/>
-                <a:headEnd/>
-                <a:tailEnd/>
-              </a14:hiddenLine>
-            </a:ext>
-          </a:extLst>
-        </p:spPr>
-      </p:pic>
-      <p:sp>
-        <p:nvSpPr>
-          <p:cNvPr id="5" name="Rectangle 4"/>
-          <p:cNvSpPr/>
-          <p:nvPr/>
-        </p:nvSpPr>
-        <p:spPr>
-          <a:xfrm>
-            <a:off x="616638" y="5638800"/>
-            <a:ext cx="7917761" cy="646331"/>
-          </a:xfrm>
-          <a:prstGeom prst="rect">
-            <a:avLst/>
-          </a:prstGeom>
-        </p:spPr>
-        <p:txBody>
-          <a:bodyPr wrap="square">
-            <a:spAutoFit/>
-          </a:bodyPr>
-          <a:lstStyle/>
-          <a:p>
-            <a:r>
-              <a:rPr lang="en-US" b="1" dirty="0" smtClean="0">
-                <a:solidFill>
-                  <a:schemeClr val="accent6">
-                    <a:lumMod val="75000"/>
-                  </a:schemeClr>
-                </a:solidFill>
-              </a:rPr>
-              <a:t>Tip:</a:t>
-            </a:r>
-            <a:r>
-              <a:rPr lang="en-US" dirty="0" smtClean="0">
-                <a:solidFill>
-                  <a:schemeClr val="accent6">
-                    <a:lumMod val="75000"/>
-                  </a:schemeClr>
-                </a:solidFill>
-              </a:rPr>
-              <a:t> You can resize the newly created shape to match the magnifying level you need</a:t>
-            </a:r>
-            <a:endParaRPr lang="en-SG" dirty="0">
-              <a:solidFill>
-                <a:schemeClr val="accent6">
-                  <a:lumMod val="75000"/>
-                </a:schemeClr>
-              </a:solidFill>
-            </a:endParaRPr>
-          </a:p>
-        </p:txBody>
-      </p:sp>
-      <p:sp>
-        <p:nvSpPr>
-          <p:cNvPr id="2" name="Flowchart: Connector 1"/>
-          <p:cNvSpPr/>
-          <p:nvPr/>
-        </p:nvSpPr>
-        <p:spPr>
-          <a:xfrm>
-            <a:off x="3048000" y="2866820"/>
-            <a:ext cx="785508" cy="785508"/>
-          </a:xfrm>
-          <a:prstGeom prst="flowChartConnector">
-            <a:avLst/>
-          </a:prstGeom>
-          <a:solidFill>
-            <a:schemeClr val="tx2">
-              <a:lumMod val="20000"/>
-              <a:lumOff val="80000"/>
-              <a:alpha val="45000"/>
-            </a:schemeClr>
-          </a:solidFill>
-          <a:ln w="57150">
-            <a:solidFill>
-              <a:srgbClr val="0070C0"/>
-            </a:solidFill>
-          </a:ln>
-        </p:spPr>
-        <p:style>
-          <a:lnRef idx="2">
-            <a:schemeClr val="accent1">
-              <a:shade val="50000"/>
-            </a:schemeClr>
-          </a:lnRef>
-          <a:fillRef idx="1">
-            <a:schemeClr val="accent1"/>
-          </a:fillRef>
-          <a:effectRef idx="0">
-            <a:schemeClr val="accent1"/>
-          </a:effectRef>
-          <a:fontRef idx="minor">
-            <a:schemeClr val="lt1"/>
-          </a:fontRef>
-        </p:style>
-        <p:txBody>
-          <a:bodyPr lIns="228600" tIns="114300" rIns="228600" bIns="114300" rtlCol="0" anchor="ctr"/>
-          <a:lstStyle/>
-          <a:p>
-            <a:pPr algn="ctr"/>
-            <a:endParaRPr lang="en-SG"/>
-          </a:p>
-        </p:txBody>
-      </p:sp>
-    </p:spTree>
-    <p:extLst>
-      <p:ext uri="{BB962C8B-B14F-4D97-AF65-F5344CB8AC3E}">
-        <p14:creationId xmlns:p14="http://schemas.microsoft.com/office/powerpoint/2010/main" val="1242374340"/>
-      </p:ext>
-    </p:extLst>
-  </p:cSld>
-  <p:clrMapOvr>
-    <a:masterClrMapping/>
-  </p:clrMapOvr>
-  <p:timing>
-    <p:tnLst>
-      <p:par>
-        <p:cTn id="1" dur="indefinite" restart="never" nodeType="tmRoot"/>
-      </p:par>
-    </p:tnLst>
-  </p:timing>
-</p:sld>
-</file>
-
-<file path=ppt/slides/slide38.xml><?xml version="1.0" encoding="utf-8"?>
-<p:sld xmlns:a="http://schemas.openxmlformats.org/drawingml/2006/main" xmlns:r="http://schemas.openxmlformats.org/officeDocument/2006/relationships" xmlns:p="http://schemas.openxmlformats.org/presentationml/2006/main">
-  <p:cSld>
-    <p:spTree>
-      <p:nvGrpSpPr>
-        <p:cNvPr id="1" name=""/>
-        <p:cNvGrpSpPr/>
-        <p:nvPr/>
-      </p:nvGrpSpPr>
-      <p:grpSpPr>
-        <a:xfrm>
-          <a:off x="0" y="0"/>
-          <a:ext cx="0" cy="0"/>
-          <a:chOff x="0" y="0"/>
-          <a:chExt cx="0" cy="0"/>
-        </a:xfrm>
-      </p:grpSpPr>
-      <p:pic>
-        <p:nvPicPr>
-          <p:cNvPr id="4101" name="Picture 5" descr="C:\Users\dcsdcr\AppData\Local\Microsoft\Windows\Temporary Internet Files\Content.IE5\X5YV3EZ2\MP900178526[1].jpg"/>
-          <p:cNvPicPr>
-            <a:picLocks noChangeAspect="1" noChangeArrowheads="1"/>
-          </p:cNvPicPr>
-          <p:nvPr/>
-        </p:nvPicPr>
-        <p:blipFill rotWithShape="1">
-          <a:blip r:embed="rId3">
-            <a:extLst>
-              <a:ext uri="{28A0092B-C50C-407E-A947-70E740481C1C}">
-                <a14:useLocalDpi xmlns:a14="http://schemas.microsoft.com/office/drawing/2010/main" val="0"/>
-              </a:ext>
-            </a:extLst>
-          </a:blip>
-          <a:srcRect t="12470" b="33433"/>
-          <a:stretch/>
-        </p:blipFill>
-        <p:spPr bwMode="auto">
-          <a:xfrm>
-            <a:off x="1143000" y="2256816"/>
-            <a:ext cx="3519278" cy="2848583"/>
-          </a:xfrm>
-          <a:prstGeom prst="rect">
-            <a:avLst/>
-          </a:prstGeom>
-          <a:noFill/>
-          <a:extLst>
-            <a:ext uri="{909E8E84-426E-40DD-AFC4-6F175D3DCCD1}">
-              <a14:hiddenFill xmlns:a14="http://schemas.microsoft.com/office/drawing/2010/main">
-                <a:solidFill>
-                  <a:srgbClr val="FFFFFF"/>
-                </a:solidFill>
-              </a14:hiddenFill>
-            </a:ext>
-          </a:extLst>
-        </p:spPr>
-      </p:pic>
-      <p:sp>
-        <p:nvSpPr>
-          <p:cNvPr id="7" name="TextBox 6"/>
-          <p:cNvSpPr txBox="1"/>
-          <p:nvPr/>
-        </p:nvSpPr>
-        <p:spPr>
-          <a:xfrm>
-            <a:off x="533400" y="479318"/>
-            <a:ext cx="8001000" cy="1631216"/>
-          </a:xfrm>
-          <a:prstGeom prst="rect">
-            <a:avLst/>
-          </a:prstGeom>
-          <a:noFill/>
-        </p:spPr>
-        <p:txBody>
-          <a:bodyPr wrap="square" rtlCol="0">
-            <a:spAutoFit/>
-          </a:bodyPr>
-          <a:lstStyle/>
-          <a:p>
-            <a:r>
-              <a:rPr lang="en-US" sz="2800" b="1" dirty="0" smtClean="0">
-                <a:solidFill>
-                  <a:schemeClr val="accent6">
-                    <a:lumMod val="75000"/>
-                  </a:schemeClr>
-                </a:solidFill>
-              </a:rPr>
-              <a:t>1.</a:t>
-            </a:r>
-            <a:r>
-              <a:rPr lang="en-US" dirty="0" smtClean="0">
-                <a:solidFill>
-                  <a:schemeClr val="accent6">
-                    <a:lumMod val="75000"/>
-                  </a:schemeClr>
-                </a:solidFill>
-              </a:rPr>
-              <a:t> Select the </a:t>
-            </a:r>
-            <a:r>
-              <a:rPr lang="en-US" dirty="0" smtClean="0">
-                <a:solidFill>
-                  <a:schemeClr val="accent6">
-                    <a:lumMod val="75000"/>
-                  </a:schemeClr>
-                </a:solidFill>
-              </a:rPr>
-              <a:t>blue </a:t>
-            </a:r>
-            <a:r>
-              <a:rPr lang="en-US" dirty="0" smtClean="0">
-                <a:solidFill>
-                  <a:schemeClr val="accent6">
-                    <a:lumMod val="75000"/>
-                  </a:schemeClr>
-                </a:solidFill>
-              </a:rPr>
-              <a:t>circle </a:t>
-            </a:r>
-            <a:r>
-              <a:rPr lang="en-US" dirty="0" smtClean="0">
-                <a:solidFill>
-                  <a:schemeClr val="accent6">
-                    <a:lumMod val="75000"/>
-                  </a:schemeClr>
-                </a:solidFill>
-              </a:rPr>
-              <a:t>below, click              and choose either </a:t>
-            </a:r>
-            <a:r>
-              <a:rPr lang="en-US" dirty="0" smtClean="0">
-                <a:solidFill>
-                  <a:srgbClr val="0070C0"/>
-                </a:solidFill>
-                <a:latin typeface="Consolas" panose="020B0609020204030204" pitchFamily="49" charset="0"/>
-                <a:cs typeface="Consolas" panose="020B0609020204030204" pitchFamily="49" charset="0"/>
-              </a:rPr>
-              <a:t>blur remainder </a:t>
-            </a:r>
-            <a:r>
-              <a:rPr lang="en-US" dirty="0" smtClean="0">
-                <a:solidFill>
-                  <a:schemeClr val="accent6">
-                    <a:lumMod val="75000"/>
-                  </a:schemeClr>
-                </a:solidFill>
-              </a:rPr>
-              <a:t>or </a:t>
-            </a:r>
-            <a:r>
-              <a:rPr lang="en-US" dirty="0">
-                <a:solidFill>
-                  <a:srgbClr val="0070C0"/>
-                </a:solidFill>
-                <a:latin typeface="Consolas" panose="020B0609020204030204" pitchFamily="49" charset="0"/>
-                <a:cs typeface="Consolas" panose="020B0609020204030204" pitchFamily="49" charset="0"/>
-              </a:rPr>
-              <a:t>recolor remainder</a:t>
-            </a:r>
-            <a:r>
-              <a:rPr lang="en-US" dirty="0" smtClean="0">
-                <a:solidFill>
-                  <a:schemeClr val="accent6">
-                    <a:lumMod val="75000"/>
-                  </a:schemeClr>
-                </a:solidFill>
-              </a:rPr>
-              <a:t>.  </a:t>
-            </a:r>
-            <a:br>
-              <a:rPr lang="en-US" dirty="0" smtClean="0">
-                <a:solidFill>
-                  <a:schemeClr val="accent6">
-                    <a:lumMod val="75000"/>
-                  </a:schemeClr>
-                </a:solidFill>
-              </a:rPr>
-            </a:br>
-            <a:r>
-              <a:rPr lang="en-US" dirty="0" smtClean="0">
-                <a:solidFill>
-                  <a:schemeClr val="accent6">
-                    <a:lumMod val="75000"/>
-                  </a:schemeClr>
-                </a:solidFill>
-              </a:rPr>
-              <a:t>It will create a new slide with the desired </a:t>
-            </a:r>
-            <a:r>
-              <a:rPr lang="en-US" dirty="0" smtClean="0">
-                <a:solidFill>
-                  <a:schemeClr val="accent6">
-                    <a:lumMod val="75000"/>
-                  </a:schemeClr>
-                </a:solidFill>
-              </a:rPr>
-              <a:t>effect.</a:t>
-            </a:r>
-            <a:r>
-              <a:rPr lang="en-US" dirty="0" smtClean="0">
-                <a:solidFill>
-                  <a:schemeClr val="accent6">
-                    <a:lumMod val="75000"/>
-                  </a:schemeClr>
-                </a:solidFill>
-              </a:rPr>
-              <a:t> </a:t>
-            </a:r>
-            <a:r>
-              <a:rPr lang="en-US" dirty="0" smtClean="0">
-                <a:solidFill>
-                  <a:schemeClr val="accent6">
-                    <a:lumMod val="75000"/>
-                  </a:schemeClr>
-                </a:solidFill>
-              </a:rPr>
-              <a:t/>
-            </a:r>
-            <a:br>
-              <a:rPr lang="en-US" dirty="0" smtClean="0">
-                <a:solidFill>
-                  <a:schemeClr val="accent6">
-                    <a:lumMod val="75000"/>
-                  </a:schemeClr>
-                </a:solidFill>
-              </a:rPr>
-            </a:br>
-            <a:r>
-              <a:rPr lang="en-US" dirty="0" smtClean="0">
-                <a:solidFill>
-                  <a:schemeClr val="accent6">
-                    <a:lumMod val="75000"/>
-                  </a:schemeClr>
-                </a:solidFill>
-              </a:rPr>
-              <a:t/>
-            </a:r>
-            <a:br>
-              <a:rPr lang="en-US" dirty="0" smtClean="0">
-                <a:solidFill>
-                  <a:schemeClr val="accent6">
-                    <a:lumMod val="75000"/>
-                  </a:schemeClr>
-                </a:solidFill>
-              </a:rPr>
-            </a:br>
-            <a:endParaRPr lang="en-SG" dirty="0">
-              <a:solidFill>
-                <a:schemeClr val="accent6">
-                  <a:lumMod val="75000"/>
-                </a:schemeClr>
-              </a:solidFill>
-            </a:endParaRPr>
-          </a:p>
-        </p:txBody>
-      </p:sp>
-      <p:pic>
-        <p:nvPicPr>
-          <p:cNvPr id="6146" name="Picture 2"/>
-          <p:cNvPicPr>
-            <a:picLocks noChangeAspect="1" noChangeArrowheads="1"/>
-          </p:cNvPicPr>
-          <p:nvPr/>
-        </p:nvPicPr>
-        <p:blipFill>
-          <a:blip r:embed="rId4">
-            <a:extLst>
-              <a:ext uri="{28A0092B-C50C-407E-A947-70E740481C1C}">
-                <a14:useLocalDpi xmlns:a14="http://schemas.microsoft.com/office/drawing/2010/main" val="0"/>
-              </a:ext>
-            </a:extLst>
-          </a:blip>
-          <a:srcRect/>
-          <a:stretch>
-            <a:fillRect/>
-          </a:stretch>
-        </p:blipFill>
-        <p:spPr bwMode="auto">
-          <a:xfrm>
-            <a:off x="4114800" y="304800"/>
-            <a:ext cx="533400" cy="834887"/>
-          </a:xfrm>
-          <a:prstGeom prst="rect">
-            <a:avLst/>
-          </a:prstGeom>
-          <a:noFill/>
-          <a:ln w="9525">
-            <a:solidFill>
-              <a:schemeClr val="bg1">
-                <a:lumMod val="85000"/>
-              </a:schemeClr>
-            </a:solidFill>
-            <a:miter lim="800000"/>
-            <a:headEnd/>
-            <a:tailEnd/>
-          </a:ln>
-          <a:extLst>
-            <a:ext uri="{909E8E84-426E-40DD-AFC4-6F175D3DCCD1}">
-              <a14:hiddenFill xmlns:a14="http://schemas.microsoft.com/office/drawing/2010/main">
-                <a:solidFill>
-                  <a:schemeClr val="accent1"/>
-                </a:solidFill>
-              </a14:hiddenFill>
-            </a:ext>
-            <a:ext uri="{91240B29-F687-4F45-9708-019B960494DF}">
-              <a14:hiddenLine xmlns:a14="http://schemas.microsoft.com/office/drawing/2010/main" w="9525">
-                <a:solidFill>
-                  <a:schemeClr val="tx1"/>
-                </a:solidFill>
-                <a:miter lim="800000"/>
-                <a:headEnd/>
-                <a:tailEnd/>
-              </a14:hiddenLine>
             </a:ext>
           </a:extLst>
         </p:spPr>
@@ -22609,7 +21600,7 @@
 </p:sld>
 </file>
 
-<file path=ppt/slides/slide39.xml><?xml version="1.0" encoding="utf-8"?>
+<file path=ppt/slides/slide38.xml><?xml version="1.0" encoding="utf-8"?>
 <p:sld xmlns:a="http://schemas.openxmlformats.org/drawingml/2006/main" xmlns:r="http://schemas.openxmlformats.org/officeDocument/2006/relationships" xmlns:p="http://schemas.openxmlformats.org/presentationml/2006/main">
   <p:cSld>
     <p:spTree>
@@ -22891,6 +21882,319 @@
 </p:sld>
 </file>
 
+<file path=ppt/slides/slide39.xml><?xml version="1.0" encoding="utf-8"?>
+<p:sld xmlns:a="http://schemas.openxmlformats.org/drawingml/2006/main" xmlns:r="http://schemas.openxmlformats.org/officeDocument/2006/relationships" xmlns:p="http://schemas.openxmlformats.org/presentationml/2006/main">
+  <p:cSld>
+    <p:spTree>
+      <p:nvGrpSpPr>
+        <p:cNvPr id="1" name=""/>
+        <p:cNvGrpSpPr/>
+        <p:nvPr/>
+      </p:nvGrpSpPr>
+      <p:grpSpPr>
+        <a:xfrm>
+          <a:off x="0" y="0"/>
+          <a:ext cx="0" cy="0"/>
+          <a:chOff x="0" y="0"/>
+          <a:chExt cx="0" cy="0"/>
+        </a:xfrm>
+      </p:grpSpPr>
+      <p:sp>
+        <p:nvSpPr>
+          <p:cNvPr id="16" name="TextBox 15"/>
+          <p:cNvSpPr txBox="1"/>
+          <p:nvPr/>
+        </p:nvSpPr>
+        <p:spPr>
+          <a:xfrm>
+            <a:off x="609600" y="1447800"/>
+            <a:ext cx="8001000" cy="3046988"/>
+          </a:xfrm>
+          <a:prstGeom prst="rect">
+            <a:avLst/>
+          </a:prstGeom>
+          <a:noFill/>
+        </p:spPr>
+        <p:txBody>
+          <a:bodyPr wrap="square" rtlCol="0">
+            <a:spAutoFit/>
+          </a:bodyPr>
+          <a:lstStyle/>
+          <a:p>
+            <a:pPr algn="ctr"/>
+            <a:r>
+              <a:rPr lang="en-US" sz="2000" b="1" dirty="0" smtClean="0">
+                <a:solidFill>
+                  <a:schemeClr val="accent6">
+                    <a:lumMod val="75000"/>
+                  </a:schemeClr>
+                </a:solidFill>
+              </a:rPr>
+              <a:t>Thanks for taking the quick tutorial.</a:t>
+            </a:r>
+          </a:p>
+          <a:p>
+            <a:pPr algn="ctr"/>
+            <a:endParaRPr lang="en-US" dirty="0">
+              <a:solidFill>
+                <a:schemeClr val="accent6">
+                  <a:lumMod val="75000"/>
+                </a:schemeClr>
+              </a:solidFill>
+            </a:endParaRPr>
+          </a:p>
+          <a:p>
+            <a:pPr algn="ctr"/>
+            <a:r>
+              <a:rPr lang="en-US" dirty="0" smtClean="0">
+                <a:solidFill>
+                  <a:schemeClr val="accent6">
+                    <a:lumMod val="75000"/>
+                  </a:schemeClr>
+                </a:solidFill>
+              </a:rPr>
+              <a:t>For find more information about these features, </a:t>
+            </a:r>
+            <a:br>
+              <a:rPr lang="en-US" dirty="0" smtClean="0">
+                <a:solidFill>
+                  <a:schemeClr val="accent6">
+                    <a:lumMod val="75000"/>
+                  </a:schemeClr>
+                </a:solidFill>
+              </a:rPr>
+            </a:br>
+            <a:r>
+              <a:rPr lang="en-US" dirty="0" smtClean="0">
+                <a:solidFill>
+                  <a:schemeClr val="accent6">
+                    <a:lumMod val="75000"/>
+                  </a:schemeClr>
+                </a:solidFill>
+              </a:rPr>
+              <a:t>visit the </a:t>
+            </a:r>
+            <a:r>
+              <a:rPr lang="en-US" dirty="0" smtClean="0">
+                <a:solidFill>
+                  <a:schemeClr val="accent6">
+                    <a:lumMod val="75000"/>
+                  </a:schemeClr>
+                </a:solidFill>
+                <a:hlinkClick r:id="rId2"/>
+              </a:rPr>
+              <a:t>documentation on our website</a:t>
+            </a:r>
+            <a:r>
+              <a:rPr lang="en-US" dirty="0" smtClean="0">
+                <a:solidFill>
+                  <a:schemeClr val="accent6">
+                    <a:lumMod val="75000"/>
+                  </a:schemeClr>
+                </a:solidFill>
+              </a:rPr>
+              <a:t>.</a:t>
+            </a:r>
+          </a:p>
+          <a:p>
+            <a:pPr algn="ctr"/>
+            <a:endParaRPr lang="en-US" dirty="0">
+              <a:solidFill>
+                <a:schemeClr val="accent6">
+                  <a:lumMod val="75000"/>
+                </a:schemeClr>
+              </a:solidFill>
+            </a:endParaRPr>
+          </a:p>
+          <a:p>
+            <a:pPr algn="ctr"/>
+            <a:r>
+              <a:rPr lang="en-US" dirty="0" smtClean="0">
+                <a:solidFill>
+                  <a:schemeClr val="accent6">
+                    <a:lumMod val="75000"/>
+                  </a:schemeClr>
+                </a:solidFill>
+              </a:rPr>
+              <a:t>To give feedback or ask a question, </a:t>
+            </a:r>
+            <a:br>
+              <a:rPr lang="en-US" dirty="0" smtClean="0">
+                <a:solidFill>
+                  <a:schemeClr val="accent6">
+                    <a:lumMod val="75000"/>
+                  </a:schemeClr>
+                </a:solidFill>
+              </a:rPr>
+            </a:br>
+            <a:r>
+              <a:rPr lang="en-US" dirty="0" smtClean="0">
+                <a:solidFill>
+                  <a:schemeClr val="accent6">
+                    <a:lumMod val="75000"/>
+                  </a:schemeClr>
+                </a:solidFill>
+              </a:rPr>
+              <a:t>contact us at </a:t>
+            </a:r>
+            <a:r>
+              <a:rPr lang="en-US" dirty="0" smtClean="0">
+                <a:solidFill>
+                  <a:schemeClr val="accent6">
+                    <a:lumMod val="75000"/>
+                  </a:schemeClr>
+                </a:solidFill>
+                <a:hlinkClick r:id="rId3"/>
+              </a:rPr>
+              <a:t>pptlabs@comp.nus.edu.sg</a:t>
+            </a:r>
+            <a:r>
+              <a:rPr lang="en-US" dirty="0" smtClean="0">
+                <a:solidFill>
+                  <a:schemeClr val="accent6">
+                    <a:lumMod val="75000"/>
+                  </a:schemeClr>
+                </a:solidFill>
+              </a:rPr>
+              <a:t> </a:t>
+            </a:r>
+          </a:p>
+          <a:p>
+            <a:pPr algn="ctr"/>
+            <a:endParaRPr lang="en-US" dirty="0" smtClean="0">
+              <a:solidFill>
+                <a:schemeClr val="accent6">
+                  <a:lumMod val="75000"/>
+                </a:schemeClr>
+              </a:solidFill>
+            </a:endParaRPr>
+          </a:p>
+          <a:p>
+            <a:pPr algn="ctr"/>
+            <a:endParaRPr lang="en-US" dirty="0">
+              <a:solidFill>
+                <a:schemeClr val="accent6">
+                  <a:lumMod val="75000"/>
+                </a:schemeClr>
+              </a:solidFill>
+            </a:endParaRPr>
+          </a:p>
+          <a:p>
+            <a:pPr algn="ctr"/>
+            <a:r>
+              <a:rPr lang="en-US" sz="2800" b="1" dirty="0" smtClean="0">
+                <a:solidFill>
+                  <a:srgbClr val="0070C0"/>
+                </a:solidFill>
+              </a:rPr>
+              <a:t>Happy </a:t>
+            </a:r>
+            <a:r>
+              <a:rPr lang="en-US" sz="2800" b="1" dirty="0" err="1" smtClean="0">
+                <a:solidFill>
+                  <a:srgbClr val="0070C0"/>
+                </a:solidFill>
+              </a:rPr>
+              <a:t>PowerPointing</a:t>
+            </a:r>
+            <a:r>
+              <a:rPr lang="en-US" sz="2800" b="1" dirty="0" smtClean="0">
+                <a:solidFill>
+                  <a:srgbClr val="0070C0"/>
+                </a:solidFill>
+              </a:rPr>
+              <a:t>!</a:t>
+            </a:r>
+            <a:endParaRPr lang="en-SG" sz="2800" b="1" dirty="0">
+              <a:solidFill>
+                <a:srgbClr val="0070C0"/>
+              </a:solidFill>
+            </a:endParaRPr>
+          </a:p>
+        </p:txBody>
+      </p:sp>
+      <p:pic>
+        <p:nvPicPr>
+          <p:cNvPr id="17" name="Picture 3"/>
+          <p:cNvPicPr>
+            <a:picLocks noChangeAspect="1" noChangeArrowheads="1"/>
+          </p:cNvPicPr>
+          <p:nvPr/>
+        </p:nvPicPr>
+        <p:blipFill rotWithShape="1">
+          <a:blip r:embed="rId4" cstate="print">
+            <a:extLst>
+              <a:ext uri="{28A0092B-C50C-407E-A947-70E740481C1C}">
+                <a14:useLocalDpi xmlns:a14="http://schemas.microsoft.com/office/drawing/2010/main" val="0"/>
+              </a:ext>
+            </a:extLst>
+          </a:blip>
+          <a:srcRect t="16468" r="7308" b="29338"/>
+          <a:stretch/>
+        </p:blipFill>
+        <p:spPr bwMode="auto">
+          <a:xfrm>
+            <a:off x="3491502" y="4953000"/>
+            <a:ext cx="2237196" cy="603487"/>
+          </a:xfrm>
+          <a:prstGeom prst="rect">
+            <a:avLst/>
+          </a:prstGeom>
+          <a:noFill/>
+          <a:ln>
+            <a:noFill/>
+          </a:ln>
+          <a:effectLst/>
+          <a:extLst>
+            <a:ext uri="{909E8E84-426E-40DD-AFC4-6F175D3DCCD1}">
+              <a14:hiddenFill xmlns:a14="http://schemas.microsoft.com/office/drawing/2010/main">
+                <a:solidFill>
+                  <a:schemeClr val="accent1"/>
+                </a:solidFill>
+              </a14:hiddenFill>
+            </a:ext>
+            <a:ext uri="{91240B29-F687-4F45-9708-019B960494DF}">
+              <a14:hiddenLine xmlns:a14="http://schemas.microsoft.com/office/drawing/2010/main" w="9525">
+                <a:solidFill>
+                  <a:schemeClr val="tx1"/>
+                </a:solidFill>
+                <a:miter lim="800000"/>
+                <a:headEnd/>
+                <a:tailEnd/>
+              </a14:hiddenLine>
+            </a:ext>
+            <a:ext uri="{AF507438-7753-43E0-B8FC-AC1667EBCBE1}">
+              <a14:hiddenEffects xmlns:a14="http://schemas.microsoft.com/office/drawing/2010/main">
+                <a:effectLst>
+                  <a:outerShdw dist="35921" dir="2700000" algn="ctr" rotWithShape="0">
+                    <a:schemeClr val="bg2"/>
+                  </a:outerShdw>
+                </a:effectLst>
+              </a14:hiddenEffects>
+            </a:ext>
+          </a:extLst>
+        </p:spPr>
+      </p:pic>
+    </p:spTree>
+    <p:extLst>
+      <p:ext uri="{BB962C8B-B14F-4D97-AF65-F5344CB8AC3E}">
+        <p14:creationId xmlns:p14="http://schemas.microsoft.com/office/powerpoint/2010/main" val="3913713940"/>
+      </p:ext>
+    </p:extLst>
+  </p:cSld>
+  <p:clrMapOvr>
+    <a:masterClrMapping/>
+  </p:clrMapOvr>
+  <p:timing>
+    <p:tnLst>
+      <p:par>
+        <p:cTn id="1" dur="indefinite" restart="never" nodeType="tmRoot"/>
+      </p:par>
+    </p:tnLst>
+  </p:timing>
+</p:sld>
+</file>
+
 <file path=ppt/slides/slide4.xml><?xml version="1.0" encoding="utf-8"?>
 <p:sld xmlns:a="http://schemas.openxmlformats.org/drawingml/2006/main" xmlns:r="http://schemas.openxmlformats.org/officeDocument/2006/relationships" xmlns:p="http://schemas.openxmlformats.org/presentationml/2006/main">
   <p:cSld>
@@ -23040,319 +22344,6 @@
 </file>
 
 <file path=ppt/slides/slide40.xml><?xml version="1.0" encoding="utf-8"?>
-<p:sld xmlns:a="http://schemas.openxmlformats.org/drawingml/2006/main" xmlns:r="http://schemas.openxmlformats.org/officeDocument/2006/relationships" xmlns:p="http://schemas.openxmlformats.org/presentationml/2006/main">
-  <p:cSld>
-    <p:spTree>
-      <p:nvGrpSpPr>
-        <p:cNvPr id="1" name=""/>
-        <p:cNvGrpSpPr/>
-        <p:nvPr/>
-      </p:nvGrpSpPr>
-      <p:grpSpPr>
-        <a:xfrm>
-          <a:off x="0" y="0"/>
-          <a:ext cx="0" cy="0"/>
-          <a:chOff x="0" y="0"/>
-          <a:chExt cx="0" cy="0"/>
-        </a:xfrm>
-      </p:grpSpPr>
-      <p:sp>
-        <p:nvSpPr>
-          <p:cNvPr id="16" name="TextBox 15"/>
-          <p:cNvSpPr txBox="1"/>
-          <p:nvPr/>
-        </p:nvSpPr>
-        <p:spPr>
-          <a:xfrm>
-            <a:off x="609600" y="1447800"/>
-            <a:ext cx="8001000" cy="3046988"/>
-          </a:xfrm>
-          <a:prstGeom prst="rect">
-            <a:avLst/>
-          </a:prstGeom>
-          <a:noFill/>
-        </p:spPr>
-        <p:txBody>
-          <a:bodyPr wrap="square" rtlCol="0">
-            <a:spAutoFit/>
-          </a:bodyPr>
-          <a:lstStyle/>
-          <a:p>
-            <a:pPr algn="ctr"/>
-            <a:r>
-              <a:rPr lang="en-US" sz="2000" b="1" dirty="0" smtClean="0">
-                <a:solidFill>
-                  <a:schemeClr val="accent6">
-                    <a:lumMod val="75000"/>
-                  </a:schemeClr>
-                </a:solidFill>
-              </a:rPr>
-              <a:t>Thanks for taking the quick tutorial.</a:t>
-            </a:r>
-          </a:p>
-          <a:p>
-            <a:pPr algn="ctr"/>
-            <a:endParaRPr lang="en-US" dirty="0">
-              <a:solidFill>
-                <a:schemeClr val="accent6">
-                  <a:lumMod val="75000"/>
-                </a:schemeClr>
-              </a:solidFill>
-            </a:endParaRPr>
-          </a:p>
-          <a:p>
-            <a:pPr algn="ctr"/>
-            <a:r>
-              <a:rPr lang="en-US" dirty="0" smtClean="0">
-                <a:solidFill>
-                  <a:schemeClr val="accent6">
-                    <a:lumMod val="75000"/>
-                  </a:schemeClr>
-                </a:solidFill>
-              </a:rPr>
-              <a:t>For find more information about these features, </a:t>
-            </a:r>
-            <a:br>
-              <a:rPr lang="en-US" dirty="0" smtClean="0">
-                <a:solidFill>
-                  <a:schemeClr val="accent6">
-                    <a:lumMod val="75000"/>
-                  </a:schemeClr>
-                </a:solidFill>
-              </a:rPr>
-            </a:br>
-            <a:r>
-              <a:rPr lang="en-US" dirty="0" smtClean="0">
-                <a:solidFill>
-                  <a:schemeClr val="accent6">
-                    <a:lumMod val="75000"/>
-                  </a:schemeClr>
-                </a:solidFill>
-              </a:rPr>
-              <a:t>visit the </a:t>
-            </a:r>
-            <a:r>
-              <a:rPr lang="en-US" dirty="0" smtClean="0">
-                <a:solidFill>
-                  <a:schemeClr val="accent6">
-                    <a:lumMod val="75000"/>
-                  </a:schemeClr>
-                </a:solidFill>
-                <a:hlinkClick r:id="rId2"/>
-              </a:rPr>
-              <a:t>documentation on our website</a:t>
-            </a:r>
-            <a:r>
-              <a:rPr lang="en-US" dirty="0" smtClean="0">
-                <a:solidFill>
-                  <a:schemeClr val="accent6">
-                    <a:lumMod val="75000"/>
-                  </a:schemeClr>
-                </a:solidFill>
-              </a:rPr>
-              <a:t>.</a:t>
-            </a:r>
-          </a:p>
-          <a:p>
-            <a:pPr algn="ctr"/>
-            <a:endParaRPr lang="en-US" dirty="0">
-              <a:solidFill>
-                <a:schemeClr val="accent6">
-                  <a:lumMod val="75000"/>
-                </a:schemeClr>
-              </a:solidFill>
-            </a:endParaRPr>
-          </a:p>
-          <a:p>
-            <a:pPr algn="ctr"/>
-            <a:r>
-              <a:rPr lang="en-US" dirty="0" smtClean="0">
-                <a:solidFill>
-                  <a:schemeClr val="accent6">
-                    <a:lumMod val="75000"/>
-                  </a:schemeClr>
-                </a:solidFill>
-              </a:rPr>
-              <a:t>To give feedback or ask a question, </a:t>
-            </a:r>
-            <a:br>
-              <a:rPr lang="en-US" dirty="0" smtClean="0">
-                <a:solidFill>
-                  <a:schemeClr val="accent6">
-                    <a:lumMod val="75000"/>
-                  </a:schemeClr>
-                </a:solidFill>
-              </a:rPr>
-            </a:br>
-            <a:r>
-              <a:rPr lang="en-US" dirty="0" smtClean="0">
-                <a:solidFill>
-                  <a:schemeClr val="accent6">
-                    <a:lumMod val="75000"/>
-                  </a:schemeClr>
-                </a:solidFill>
-              </a:rPr>
-              <a:t>contact us at </a:t>
-            </a:r>
-            <a:r>
-              <a:rPr lang="en-US" dirty="0" smtClean="0">
-                <a:solidFill>
-                  <a:schemeClr val="accent6">
-                    <a:lumMod val="75000"/>
-                  </a:schemeClr>
-                </a:solidFill>
-                <a:hlinkClick r:id="rId3"/>
-              </a:rPr>
-              <a:t>pptlabs@comp.nus.edu.sg</a:t>
-            </a:r>
-            <a:r>
-              <a:rPr lang="en-US" dirty="0" smtClean="0">
-                <a:solidFill>
-                  <a:schemeClr val="accent6">
-                    <a:lumMod val="75000"/>
-                  </a:schemeClr>
-                </a:solidFill>
-              </a:rPr>
-              <a:t> </a:t>
-            </a:r>
-          </a:p>
-          <a:p>
-            <a:pPr algn="ctr"/>
-            <a:endParaRPr lang="en-US" dirty="0" smtClean="0">
-              <a:solidFill>
-                <a:schemeClr val="accent6">
-                  <a:lumMod val="75000"/>
-                </a:schemeClr>
-              </a:solidFill>
-            </a:endParaRPr>
-          </a:p>
-          <a:p>
-            <a:pPr algn="ctr"/>
-            <a:endParaRPr lang="en-US" dirty="0">
-              <a:solidFill>
-                <a:schemeClr val="accent6">
-                  <a:lumMod val="75000"/>
-                </a:schemeClr>
-              </a:solidFill>
-            </a:endParaRPr>
-          </a:p>
-          <a:p>
-            <a:pPr algn="ctr"/>
-            <a:r>
-              <a:rPr lang="en-US" sz="2800" b="1" dirty="0" smtClean="0">
-                <a:solidFill>
-                  <a:srgbClr val="0070C0"/>
-                </a:solidFill>
-              </a:rPr>
-              <a:t>Happy </a:t>
-            </a:r>
-            <a:r>
-              <a:rPr lang="en-US" sz="2800" b="1" dirty="0" err="1" smtClean="0">
-                <a:solidFill>
-                  <a:srgbClr val="0070C0"/>
-                </a:solidFill>
-              </a:rPr>
-              <a:t>PowerPointing</a:t>
-            </a:r>
-            <a:r>
-              <a:rPr lang="en-US" sz="2800" b="1" dirty="0" smtClean="0">
-                <a:solidFill>
-                  <a:srgbClr val="0070C0"/>
-                </a:solidFill>
-              </a:rPr>
-              <a:t>!</a:t>
-            </a:r>
-            <a:endParaRPr lang="en-SG" sz="2800" b="1" dirty="0">
-              <a:solidFill>
-                <a:srgbClr val="0070C0"/>
-              </a:solidFill>
-            </a:endParaRPr>
-          </a:p>
-        </p:txBody>
-      </p:sp>
-      <p:pic>
-        <p:nvPicPr>
-          <p:cNvPr id="17" name="Picture 3"/>
-          <p:cNvPicPr>
-            <a:picLocks noChangeAspect="1" noChangeArrowheads="1"/>
-          </p:cNvPicPr>
-          <p:nvPr/>
-        </p:nvPicPr>
-        <p:blipFill rotWithShape="1">
-          <a:blip r:embed="rId4" cstate="print">
-            <a:extLst>
-              <a:ext uri="{28A0092B-C50C-407E-A947-70E740481C1C}">
-                <a14:useLocalDpi xmlns:a14="http://schemas.microsoft.com/office/drawing/2010/main" val="0"/>
-              </a:ext>
-            </a:extLst>
-          </a:blip>
-          <a:srcRect t="16468" r="7308" b="29338"/>
-          <a:stretch/>
-        </p:blipFill>
-        <p:spPr bwMode="auto">
-          <a:xfrm>
-            <a:off x="3491502" y="4953000"/>
-            <a:ext cx="2237196" cy="603487"/>
-          </a:xfrm>
-          <a:prstGeom prst="rect">
-            <a:avLst/>
-          </a:prstGeom>
-          <a:noFill/>
-          <a:ln>
-            <a:noFill/>
-          </a:ln>
-          <a:effectLst/>
-          <a:extLst>
-            <a:ext uri="{909E8E84-426E-40DD-AFC4-6F175D3DCCD1}">
-              <a14:hiddenFill xmlns:a14="http://schemas.microsoft.com/office/drawing/2010/main">
-                <a:solidFill>
-                  <a:schemeClr val="accent1"/>
-                </a:solidFill>
-              </a14:hiddenFill>
-            </a:ext>
-            <a:ext uri="{91240B29-F687-4F45-9708-019B960494DF}">
-              <a14:hiddenLine xmlns:a14="http://schemas.microsoft.com/office/drawing/2010/main" w="9525">
-                <a:solidFill>
-                  <a:schemeClr val="tx1"/>
-                </a:solidFill>
-                <a:miter lim="800000"/>
-                <a:headEnd/>
-                <a:tailEnd/>
-              </a14:hiddenLine>
-            </a:ext>
-            <a:ext uri="{AF507438-7753-43E0-B8FC-AC1667EBCBE1}">
-              <a14:hiddenEffects xmlns:a14="http://schemas.microsoft.com/office/drawing/2010/main">
-                <a:effectLst>
-                  <a:outerShdw dist="35921" dir="2700000" algn="ctr" rotWithShape="0">
-                    <a:schemeClr val="bg2"/>
-                  </a:outerShdw>
-                </a:effectLst>
-              </a14:hiddenEffects>
-            </a:ext>
-          </a:extLst>
-        </p:spPr>
-      </p:pic>
-    </p:spTree>
-    <p:extLst>
-      <p:ext uri="{BB962C8B-B14F-4D97-AF65-F5344CB8AC3E}">
-        <p14:creationId xmlns:p14="http://schemas.microsoft.com/office/powerpoint/2010/main" val="3913713940"/>
-      </p:ext>
-    </p:extLst>
-  </p:cSld>
-  <p:clrMapOvr>
-    <a:masterClrMapping/>
-  </p:clrMapOvr>
-  <p:timing>
-    <p:tnLst>
-      <p:par>
-        <p:cTn id="1" dur="indefinite" restart="never" nodeType="tmRoot"/>
-      </p:par>
-    </p:tnLst>
-  </p:timing>
-</p:sld>
-</file>
-
-<file path=ppt/slides/slide41.xml><?xml version="1.0" encoding="utf-8"?>
 <p:sld xmlns:a="http://schemas.openxmlformats.org/drawingml/2006/main" xmlns:r="http://schemas.openxmlformats.org/officeDocument/2006/relationships" xmlns:p="http://schemas.openxmlformats.org/presentationml/2006/main" show="0">
   <p:cSld name="PPAck201401021130490549">
     <p:spTree>
@@ -24647,27 +23638,7 @@
                   </a:schemeClr>
                 </a:solidFill>
               </a:rPr>
-              <a:t> </a:t>
-            </a:r>
-            <a:r>
-              <a:rPr lang="en-US" dirty="0" smtClean="0">
-                <a:solidFill>
-                  <a:schemeClr val="accent6">
-                    <a:lumMod val="75000"/>
-                  </a:schemeClr>
-                </a:solidFill>
-              </a:rPr>
-              <a:t>While this slide is selected, click the                 button </a:t>
-            </a:r>
-            <a:r>
-              <a:rPr lang="en-US" dirty="0" smtClean="0">
-                <a:solidFill>
-                  <a:schemeClr val="accent6">
-                    <a:lumMod val="75000"/>
-                  </a:schemeClr>
-                </a:solidFill>
-              </a:rPr>
-              <a:t>in the                       ribbon.</a:t>
+              <a:t> While this slide is selected, click the                 button in the                       ribbon.</a:t>
             </a:r>
             <a:endParaRPr lang="en-SG" dirty="0">
               <a:solidFill>
@@ -25116,27 +24087,7 @@
                   </a:schemeClr>
                 </a:solidFill>
               </a:rPr>
-              <a:t> </a:t>
-            </a:r>
-            <a:r>
-              <a:rPr lang="en-US" dirty="0" smtClean="0">
-                <a:solidFill>
-                  <a:schemeClr val="accent6">
-                    <a:lumMod val="75000"/>
-                  </a:schemeClr>
-                </a:solidFill>
-              </a:rPr>
-              <a:t>While this slide is selected, click the               button </a:t>
-            </a:r>
-            <a:r>
-              <a:rPr lang="en-US" dirty="0" smtClean="0">
-                <a:solidFill>
-                  <a:schemeClr val="accent6">
-                    <a:lumMod val="75000"/>
-                  </a:schemeClr>
-                </a:solidFill>
-              </a:rPr>
-              <a:t>instead.</a:t>
+              <a:t> While this slide is selected, click the               button instead.</a:t>
             </a:r>
             <a:br>
               <a:rPr lang="en-US" dirty="0" smtClean="0">
@@ -25382,16 +24333,6 @@
                   <a:schemeClr val="accent1"/>
                 </a:solidFill>
               </a14:hiddenFill>
-            </a:ext>
-            <a:ext uri="{91240B29-F687-4F45-9708-019B960494DF}">
-              <a14:hiddenLine xmlns:a14="http://schemas.microsoft.com/office/drawing/2010/main" w="9525">
-                <a:solidFill>
-                  <a:schemeClr val="tx1"/>
-                </a:solidFill>
-                <a:miter lim="800000"/>
-                <a:headEnd/>
-                <a:tailEnd/>
-              </a14:hiddenLine>
             </a:ext>
           </a:extLst>
         </p:spPr>

</xml_diff>